<commit_message>
Added new slides and corrections
</commit_message>
<xml_diff>
--- a/slides/1_Introduction.pptx
+++ b/slides/1_Introduction.pptx
@@ -12706,7 +12706,7 @@
                 </a:pPr>
                 <a:r>
                   <a:rPr lang="en-US" sz="3200" dirty="0"/>
-                  <a:t>Creating </a:t>
+                  <a:t>Commonly used </a:t>
                 </a:r>
                 <a:r>
                   <a:rPr lang="en-US" sz="3200" b="1" dirty="0"/>
@@ -12945,11 +12945,7 @@
                 <a:pPr lvl="1"/>
                 <a:r>
                   <a:rPr lang="en-US" sz="2600" dirty="0"/>
-                  <a:t>Usually, less than optimal </a:t>
-                </a:r>
-                <a:r>
-                  <a:rPr lang="en-US" sz="2600"/>
-                  <a:t>properties – lumpy   </a:t>
+                  <a:t>Usually, less than optimal properties – lumpy   </a:t>
                 </a:r>
                 <a:endParaRPr lang="en-US" sz="1600" dirty="0"/>
               </a:p>

</xml_diff>

<commit_message>
Update to slide cover
</commit_message>
<xml_diff>
--- a/slides/1_Introduction.pptx
+++ b/slides/1_Introduction.pptx
@@ -224,7 +224,7 @@
           <a:p>
             <a:fld id="{2F3ABF1A-8818-4472-8518-E71DC7B5D2F7}" type="datetimeFigureOut">
               <a:rPr lang="en-US" smtClean="0"/>
-              <a:t>5/29/2021</a:t>
+              <a:t>6/10/2021</a:t>
             </a:fld>
             <a:endParaRPr lang="en-US"/>
           </a:p>
@@ -1070,7 +1070,7 @@
           <a:p>
             <a:fld id="{6E4A31BF-7266-4BEB-918B-ADC21C630A6F}" type="datetimeFigureOut">
               <a:rPr lang="en-US" smtClean="0"/>
-              <a:t>5/29/2021</a:t>
+              <a:t>6/10/2021</a:t>
             </a:fld>
             <a:endParaRPr lang="en-US"/>
           </a:p>
@@ -1268,7 +1268,7 @@
           <a:p>
             <a:fld id="{6E4A31BF-7266-4BEB-918B-ADC21C630A6F}" type="datetimeFigureOut">
               <a:rPr lang="en-US" smtClean="0"/>
-              <a:t>5/29/2021</a:t>
+              <a:t>6/10/2021</a:t>
             </a:fld>
             <a:endParaRPr lang="en-US"/>
           </a:p>
@@ -1476,7 +1476,7 @@
           <a:p>
             <a:fld id="{6E4A31BF-7266-4BEB-918B-ADC21C630A6F}" type="datetimeFigureOut">
               <a:rPr lang="en-US" smtClean="0"/>
-              <a:t>5/29/2021</a:t>
+              <a:t>6/10/2021</a:t>
             </a:fld>
             <a:endParaRPr lang="en-US"/>
           </a:p>
@@ -1674,7 +1674,7 @@
           <a:p>
             <a:fld id="{6E4A31BF-7266-4BEB-918B-ADC21C630A6F}" type="datetimeFigureOut">
               <a:rPr lang="en-US" smtClean="0"/>
-              <a:t>5/29/2021</a:t>
+              <a:t>6/10/2021</a:t>
             </a:fld>
             <a:endParaRPr lang="en-US"/>
           </a:p>
@@ -1949,7 +1949,7 @@
           <a:p>
             <a:fld id="{6E4A31BF-7266-4BEB-918B-ADC21C630A6F}" type="datetimeFigureOut">
               <a:rPr lang="en-US" smtClean="0"/>
-              <a:t>5/29/2021</a:t>
+              <a:t>6/10/2021</a:t>
             </a:fld>
             <a:endParaRPr lang="en-US"/>
           </a:p>
@@ -2214,7 +2214,7 @@
           <a:p>
             <a:fld id="{6E4A31BF-7266-4BEB-918B-ADC21C630A6F}" type="datetimeFigureOut">
               <a:rPr lang="en-US" smtClean="0"/>
-              <a:t>5/29/2021</a:t>
+              <a:t>6/10/2021</a:t>
             </a:fld>
             <a:endParaRPr lang="en-US"/>
           </a:p>
@@ -2626,7 +2626,7 @@
           <a:p>
             <a:fld id="{6E4A31BF-7266-4BEB-918B-ADC21C630A6F}" type="datetimeFigureOut">
               <a:rPr lang="en-US" smtClean="0"/>
-              <a:t>5/29/2021</a:t>
+              <a:t>6/10/2021</a:t>
             </a:fld>
             <a:endParaRPr lang="en-US"/>
           </a:p>
@@ -2767,7 +2767,7 @@
           <a:p>
             <a:fld id="{6E4A31BF-7266-4BEB-918B-ADC21C630A6F}" type="datetimeFigureOut">
               <a:rPr lang="en-US" smtClean="0"/>
-              <a:t>5/29/2021</a:t>
+              <a:t>6/10/2021</a:t>
             </a:fld>
             <a:endParaRPr lang="en-US"/>
           </a:p>
@@ -2880,7 +2880,7 @@
           <a:p>
             <a:fld id="{6E4A31BF-7266-4BEB-918B-ADC21C630A6F}" type="datetimeFigureOut">
               <a:rPr lang="en-US" smtClean="0"/>
-              <a:t>5/29/2021</a:t>
+              <a:t>6/10/2021</a:t>
             </a:fld>
             <a:endParaRPr lang="en-US"/>
           </a:p>
@@ -3191,7 +3191,7 @@
           <a:p>
             <a:fld id="{6E4A31BF-7266-4BEB-918B-ADC21C630A6F}" type="datetimeFigureOut">
               <a:rPr lang="en-US" smtClean="0"/>
-              <a:t>5/29/2021</a:t>
+              <a:t>6/10/2021</a:t>
             </a:fld>
             <a:endParaRPr lang="en-US"/>
           </a:p>
@@ -3479,7 +3479,7 @@
           <a:p>
             <a:fld id="{6E4A31BF-7266-4BEB-918B-ADC21C630A6F}" type="datetimeFigureOut">
               <a:rPr lang="en-US" smtClean="0"/>
-              <a:t>5/29/2021</a:t>
+              <a:t>6/10/2021</a:t>
             </a:fld>
             <a:endParaRPr lang="en-US"/>
           </a:p>
@@ -3720,7 +3720,7 @@
           <a:p>
             <a:fld id="{6E4A31BF-7266-4BEB-918B-ADC21C630A6F}" type="datetimeFigureOut">
               <a:rPr lang="en-US" smtClean="0"/>
-              <a:t>5/29/2021</a:t>
+              <a:t>6/10/2021</a:t>
             </a:fld>
             <a:endParaRPr lang="en-US"/>
           </a:p>
@@ -4279,6 +4279,46 @@
           </a:extLst>
         </p:spPr>
       </p:pic>
+      <p:sp>
+        <p:nvSpPr>
+          <p:cNvPr id="5" name="TextBox 4">
+            <a:extLst>
+              <a:ext uri="{FF2B5EF4-FFF2-40B4-BE49-F238E27FC236}">
+                <a16:creationId xmlns:a16="http://schemas.microsoft.com/office/drawing/2014/main" id="{E89681F1-0F76-4799-8371-9552B4345F58}"/>
+              </a:ext>
+            </a:extLst>
+          </p:cNvPr>
+          <p:cNvSpPr txBox="1"/>
+          <p:nvPr/>
+        </p:nvSpPr>
+        <p:spPr>
+          <a:xfrm>
+            <a:off x="3348567" y="6421967"/>
+            <a:ext cx="5744633" cy="369332"/>
+          </a:xfrm>
+          <a:prstGeom prst="rect">
+            <a:avLst/>
+          </a:prstGeom>
+          <a:noFill/>
+        </p:spPr>
+        <p:txBody>
+          <a:bodyPr wrap="square" rtlCol="0">
+            <a:spAutoFit/>
+          </a:bodyPr>
+          <a:lstStyle/>
+          <a:p>
+            <a:pPr algn="ctr"/>
+            <a:r>
+              <a:rPr lang="en-US" sz="1100" dirty="0"/>
+              <a:t>Copyright 2021, Stephen F Elston. All rights reserved</a:t>
+            </a:r>
+            <a:r>
+              <a:rPr lang="en-US" dirty="0"/>
+              <a:t>.</a:t>
+            </a:r>
+          </a:p>
+        </p:txBody>
+      </p:sp>
     </p:spTree>
     <p:extLst>
       <p:ext uri="{BB962C8B-B14F-4D97-AF65-F5344CB8AC3E}">
@@ -4309,8 +4349,8 @@
           <a:chExt cx="0" cy="0"/>
         </a:xfrm>
       </p:grpSpPr>
-      <mc:AlternateContent xmlns:mc="http://schemas.openxmlformats.org/markup-compatibility/2006">
-        <mc:Choice xmlns:a14="http://schemas.microsoft.com/office/drawing/2010/main" Requires="a14">
+      <mc:AlternateContent xmlns:mc="http://schemas.openxmlformats.org/markup-compatibility/2006" xmlns:a14="http://schemas.microsoft.com/office/drawing/2010/main">
+        <mc:Choice Requires="a14">
           <p:sp>
             <p:nvSpPr>
               <p:cNvPr id="3" name="Content Placeholder 2">
@@ -4418,7 +4458,7 @@
             </p:txBody>
           </p:sp>
         </mc:Choice>
-        <mc:Fallback>
+        <mc:Fallback xmlns="">
           <p:sp>
             <p:nvSpPr>
               <p:cNvPr id="3" name="Content Placeholder 2">
@@ -4823,8 +4863,8 @@
           <a:chExt cx="0" cy="0"/>
         </a:xfrm>
       </p:grpSpPr>
-      <mc:AlternateContent xmlns:mc="http://schemas.openxmlformats.org/markup-compatibility/2006">
-        <mc:Choice xmlns:a14="http://schemas.microsoft.com/office/drawing/2010/main" Requires="a14">
+      <mc:AlternateContent xmlns:mc="http://schemas.openxmlformats.org/markup-compatibility/2006" xmlns:a14="http://schemas.microsoft.com/office/drawing/2010/main">
+        <mc:Choice Requires="a14">
           <p:sp>
             <p:nvSpPr>
               <p:cNvPr id="3" name="Content Placeholder 2">
@@ -5101,7 +5141,7 @@
             </p:txBody>
           </p:sp>
         </mc:Choice>
-        <mc:Fallback>
+        <mc:Fallback xmlns="">
           <p:sp>
             <p:nvSpPr>
               <p:cNvPr id="3" name="Content Placeholder 2">
@@ -7384,8 +7424,8 @@
           </a:p>
         </p:txBody>
       </p:sp>
-      <mc:AlternateContent xmlns:mc="http://schemas.openxmlformats.org/markup-compatibility/2006">
-        <mc:Choice xmlns:a14="http://schemas.microsoft.com/office/drawing/2010/main" Requires="a14">
+      <mc:AlternateContent xmlns:mc="http://schemas.openxmlformats.org/markup-compatibility/2006" xmlns:a14="http://schemas.microsoft.com/office/drawing/2010/main">
+        <mc:Choice Requires="a14">
           <p:sp>
             <p:nvSpPr>
               <p:cNvPr id="16" name="TextBox 15">
@@ -7414,6 +7454,7 @@
               </a:bodyPr>
               <a:lstStyle/>
               <a:p>
+                <a:pPr/>
                 <a14:m>
                   <m:oMathPara xmlns:m="http://schemas.openxmlformats.org/officeDocument/2006/math">
                     <m:oMathParaPr>
@@ -7483,7 +7524,7 @@
             </p:txBody>
           </p:sp>
         </mc:Choice>
-        <mc:Fallback>
+        <mc:Fallback xmlns="">
           <p:sp>
             <p:nvSpPr>
               <p:cNvPr id="16" name="TextBox 15">
@@ -10023,8 +10064,8 @@
           </a:p>
         </p:txBody>
       </p:sp>
-      <mc:AlternateContent xmlns:mc="http://schemas.openxmlformats.org/markup-compatibility/2006">
-        <mc:Choice xmlns:a14="http://schemas.microsoft.com/office/drawing/2010/main" Requires="a14">
+      <mc:AlternateContent xmlns:mc="http://schemas.openxmlformats.org/markup-compatibility/2006" xmlns:a14="http://schemas.microsoft.com/office/drawing/2010/main">
+        <mc:Choice Requires="a14">
           <p:sp>
             <p:nvSpPr>
               <p:cNvPr id="16" name="TextBox 15">
@@ -10123,7 +10164,7 @@
             </p:txBody>
           </p:sp>
         </mc:Choice>
-        <mc:Fallback>
+        <mc:Fallback xmlns="">
           <p:sp>
             <p:nvSpPr>
               <p:cNvPr id="16" name="TextBox 15">
@@ -11233,8 +11274,8 @@
           <a:chExt cx="0" cy="0"/>
         </a:xfrm>
       </p:grpSpPr>
-      <mc:AlternateContent xmlns:mc="http://schemas.openxmlformats.org/markup-compatibility/2006">
-        <mc:Choice xmlns:a14="http://schemas.microsoft.com/office/drawing/2010/main" Requires="a14">
+      <mc:AlternateContent xmlns:mc="http://schemas.openxmlformats.org/markup-compatibility/2006" xmlns:a14="http://schemas.microsoft.com/office/drawing/2010/main">
+        <mc:Choice Requires="a14">
           <p:sp>
             <p:nvSpPr>
               <p:cNvPr id="3" name="Content Placeholder 2">
@@ -11406,7 +11447,7 @@
             </p:txBody>
           </p:sp>
         </mc:Choice>
-        <mc:Fallback>
+        <mc:Fallback xmlns="">
           <p:sp>
             <p:nvSpPr>
               <p:cNvPr id="3" name="Content Placeholder 2">
@@ -11811,8 +11852,8 @@
           <a:chExt cx="0" cy="0"/>
         </a:xfrm>
       </p:grpSpPr>
-      <mc:AlternateContent xmlns:mc="http://schemas.openxmlformats.org/markup-compatibility/2006">
-        <mc:Choice xmlns:a14="http://schemas.microsoft.com/office/drawing/2010/main" Requires="a14">
+      <mc:AlternateContent xmlns:mc="http://schemas.openxmlformats.org/markup-compatibility/2006" xmlns:a14="http://schemas.microsoft.com/office/drawing/2010/main">
+        <mc:Choice Requires="a14">
           <p:sp>
             <p:nvSpPr>
               <p:cNvPr id="3" name="Content Placeholder 2">
@@ -11972,7 +12013,7 @@
             </p:txBody>
           </p:sp>
         </mc:Choice>
-        <mc:Fallback>
+        <mc:Fallback xmlns="">
           <p:sp>
             <p:nvSpPr>
               <p:cNvPr id="3" name="Content Placeholder 2">
@@ -12671,8 +12712,8 @@
           <a:chExt cx="0" cy="0"/>
         </a:xfrm>
       </p:grpSpPr>
-      <mc:AlternateContent xmlns:mc="http://schemas.openxmlformats.org/markup-compatibility/2006">
-        <mc:Choice xmlns:a14="http://schemas.microsoft.com/office/drawing/2010/main" Requires="a14">
+      <mc:AlternateContent xmlns:mc="http://schemas.openxmlformats.org/markup-compatibility/2006" xmlns:a14="http://schemas.microsoft.com/office/drawing/2010/main">
+        <mc:Choice Requires="a14">
           <p:sp>
             <p:nvSpPr>
               <p:cNvPr id="3" name="Content Placeholder 2">
@@ -12952,7 +12993,7 @@
             </p:txBody>
           </p:sp>
         </mc:Choice>
-        <mc:Fallback>
+        <mc:Fallback xmlns="">
           <p:sp>
             <p:nvSpPr>
               <p:cNvPr id="3" name="Content Placeholder 2">
@@ -14368,8 +14409,8 @@
           <a:chExt cx="0" cy="0"/>
         </a:xfrm>
       </p:grpSpPr>
-      <mc:AlternateContent xmlns:mc="http://schemas.openxmlformats.org/markup-compatibility/2006">
-        <mc:Choice xmlns:a14="http://schemas.microsoft.com/office/drawing/2010/main" Requires="a14">
+      <mc:AlternateContent xmlns:mc="http://schemas.openxmlformats.org/markup-compatibility/2006" xmlns:a14="http://schemas.microsoft.com/office/drawing/2010/main">
+        <mc:Choice Requires="a14">
           <p:sp>
             <p:nvSpPr>
               <p:cNvPr id="3" name="Content Placeholder 2">
@@ -14600,7 +14641,7 @@
             </p:txBody>
           </p:sp>
         </mc:Choice>
-        <mc:Fallback>
+        <mc:Fallback xmlns="">
           <p:sp>
             <p:nvSpPr>
               <p:cNvPr id="3" name="Content Placeholder 2">

</xml_diff>

<commit_message>
Initial commit of data sources document
</commit_message>
<xml_diff>
--- a/slides/1_Introduction.pptx
+++ b/slides/1_Introduction.pptx
@@ -228,7 +228,7 @@
           <a:p>
             <a:fld id="{2F3ABF1A-8818-4472-8518-E71DC7B5D2F7}" type="datetimeFigureOut">
               <a:rPr lang="en-US" smtClean="0"/>
-              <a:t>6/20/2021</a:t>
+              <a:t>6/13/2022</a:t>
             </a:fld>
             <a:endParaRPr lang="en-US"/>
           </a:p>
@@ -1074,7 +1074,7 @@
           <a:p>
             <a:fld id="{6E4A31BF-7266-4BEB-918B-ADC21C630A6F}" type="datetimeFigureOut">
               <a:rPr lang="en-US" smtClean="0"/>
-              <a:t>6/20/2021</a:t>
+              <a:t>6/13/2022</a:t>
             </a:fld>
             <a:endParaRPr lang="en-US"/>
           </a:p>
@@ -1272,7 +1272,7 @@
           <a:p>
             <a:fld id="{6E4A31BF-7266-4BEB-918B-ADC21C630A6F}" type="datetimeFigureOut">
               <a:rPr lang="en-US" smtClean="0"/>
-              <a:t>6/20/2021</a:t>
+              <a:t>6/13/2022</a:t>
             </a:fld>
             <a:endParaRPr lang="en-US"/>
           </a:p>
@@ -1480,7 +1480,7 @@
           <a:p>
             <a:fld id="{6E4A31BF-7266-4BEB-918B-ADC21C630A6F}" type="datetimeFigureOut">
               <a:rPr lang="en-US" smtClean="0"/>
-              <a:t>6/20/2021</a:t>
+              <a:t>6/13/2022</a:t>
             </a:fld>
             <a:endParaRPr lang="en-US"/>
           </a:p>
@@ -1678,7 +1678,7 @@
           <a:p>
             <a:fld id="{6E4A31BF-7266-4BEB-918B-ADC21C630A6F}" type="datetimeFigureOut">
               <a:rPr lang="en-US" smtClean="0"/>
-              <a:t>6/20/2021</a:t>
+              <a:t>6/13/2022</a:t>
             </a:fld>
             <a:endParaRPr lang="en-US"/>
           </a:p>
@@ -1953,7 +1953,7 @@
           <a:p>
             <a:fld id="{6E4A31BF-7266-4BEB-918B-ADC21C630A6F}" type="datetimeFigureOut">
               <a:rPr lang="en-US" smtClean="0"/>
-              <a:t>6/20/2021</a:t>
+              <a:t>6/13/2022</a:t>
             </a:fld>
             <a:endParaRPr lang="en-US"/>
           </a:p>
@@ -2218,7 +2218,7 @@
           <a:p>
             <a:fld id="{6E4A31BF-7266-4BEB-918B-ADC21C630A6F}" type="datetimeFigureOut">
               <a:rPr lang="en-US" smtClean="0"/>
-              <a:t>6/20/2021</a:t>
+              <a:t>6/13/2022</a:t>
             </a:fld>
             <a:endParaRPr lang="en-US"/>
           </a:p>
@@ -2630,7 +2630,7 @@
           <a:p>
             <a:fld id="{6E4A31BF-7266-4BEB-918B-ADC21C630A6F}" type="datetimeFigureOut">
               <a:rPr lang="en-US" smtClean="0"/>
-              <a:t>6/20/2021</a:t>
+              <a:t>6/13/2022</a:t>
             </a:fld>
             <a:endParaRPr lang="en-US"/>
           </a:p>
@@ -2771,7 +2771,7 @@
           <a:p>
             <a:fld id="{6E4A31BF-7266-4BEB-918B-ADC21C630A6F}" type="datetimeFigureOut">
               <a:rPr lang="en-US" smtClean="0"/>
-              <a:t>6/20/2021</a:t>
+              <a:t>6/13/2022</a:t>
             </a:fld>
             <a:endParaRPr lang="en-US"/>
           </a:p>
@@ -2884,7 +2884,7 @@
           <a:p>
             <a:fld id="{6E4A31BF-7266-4BEB-918B-ADC21C630A6F}" type="datetimeFigureOut">
               <a:rPr lang="en-US" smtClean="0"/>
-              <a:t>6/20/2021</a:t>
+              <a:t>6/13/2022</a:t>
             </a:fld>
             <a:endParaRPr lang="en-US"/>
           </a:p>
@@ -3195,7 +3195,7 @@
           <a:p>
             <a:fld id="{6E4A31BF-7266-4BEB-918B-ADC21C630A6F}" type="datetimeFigureOut">
               <a:rPr lang="en-US" smtClean="0"/>
-              <a:t>6/20/2021</a:t>
+              <a:t>6/13/2022</a:t>
             </a:fld>
             <a:endParaRPr lang="en-US"/>
           </a:p>
@@ -3483,7 +3483,7 @@
           <a:p>
             <a:fld id="{6E4A31BF-7266-4BEB-918B-ADC21C630A6F}" type="datetimeFigureOut">
               <a:rPr lang="en-US" smtClean="0"/>
-              <a:t>6/20/2021</a:t>
+              <a:t>6/13/2022</a:t>
             </a:fld>
             <a:endParaRPr lang="en-US"/>
           </a:p>
@@ -3724,7 +3724,7 @@
           <a:p>
             <a:fld id="{6E4A31BF-7266-4BEB-918B-ADC21C630A6F}" type="datetimeFigureOut">
               <a:rPr lang="en-US" smtClean="0"/>
-              <a:t>6/20/2021</a:t>
+              <a:t>6/13/2022</a:t>
             </a:fld>
             <a:endParaRPr lang="en-US"/>
           </a:p>
@@ -5229,8 +5229,8 @@
           <a:chExt cx="0" cy="0"/>
         </a:xfrm>
       </p:grpSpPr>
-      <mc:AlternateContent xmlns:mc="http://schemas.openxmlformats.org/markup-compatibility/2006">
-        <mc:Choice xmlns:a14="http://schemas.microsoft.com/office/drawing/2010/main" Requires="a14">
+      <mc:AlternateContent xmlns:mc="http://schemas.openxmlformats.org/markup-compatibility/2006" xmlns:a14="http://schemas.microsoft.com/office/drawing/2010/main">
+        <mc:Choice Requires="a14">
           <p:sp>
             <p:nvSpPr>
               <p:cNvPr id="3" name="Content Placeholder 2">
@@ -5364,7 +5364,7 @@
             </p:txBody>
           </p:sp>
         </mc:Choice>
-        <mc:Fallback>
+        <mc:Fallback xmlns="">
           <p:sp>
             <p:nvSpPr>
               <p:cNvPr id="3" name="Content Placeholder 2">
@@ -5916,8 +5916,8 @@
           <a:chExt cx="0" cy="0"/>
         </a:xfrm>
       </p:grpSpPr>
-      <mc:AlternateContent xmlns:mc="http://schemas.openxmlformats.org/markup-compatibility/2006">
-        <mc:Choice xmlns:a14="http://schemas.microsoft.com/office/drawing/2010/main" Requires="a14">
+      <mc:AlternateContent xmlns:mc="http://schemas.openxmlformats.org/markup-compatibility/2006" xmlns:a14="http://schemas.microsoft.com/office/drawing/2010/main">
+        <mc:Choice Requires="a14">
           <p:sp>
             <p:nvSpPr>
               <p:cNvPr id="3" name="Content Placeholder 2">
@@ -6170,7 +6170,7 @@
             </p:txBody>
           </p:sp>
         </mc:Choice>
-        <mc:Fallback>
+        <mc:Fallback xmlns="">
           <p:sp>
             <p:nvSpPr>
               <p:cNvPr id="3" name="Content Placeholder 2">
@@ -12360,8 +12360,8 @@
           <a:chExt cx="0" cy="0"/>
         </a:xfrm>
       </p:grpSpPr>
-      <mc:AlternateContent xmlns:mc="http://schemas.openxmlformats.org/markup-compatibility/2006">
-        <mc:Choice xmlns:a14="http://schemas.microsoft.com/office/drawing/2010/main" Requires="a14">
+      <mc:AlternateContent xmlns:mc="http://schemas.openxmlformats.org/markup-compatibility/2006" xmlns:a14="http://schemas.microsoft.com/office/drawing/2010/main">
+        <mc:Choice Requires="a14">
           <p:sp>
             <p:nvSpPr>
               <p:cNvPr id="3" name="Content Placeholder 2">
@@ -12533,7 +12533,7 @@
             </p:txBody>
           </p:sp>
         </mc:Choice>
-        <mc:Fallback>
+        <mc:Fallback xmlns="">
           <p:sp>
             <p:nvSpPr>
               <p:cNvPr id="3" name="Content Placeholder 2">
@@ -13798,8 +13798,8 @@
           <a:chExt cx="0" cy="0"/>
         </a:xfrm>
       </p:grpSpPr>
-      <mc:AlternateContent xmlns:mc="http://schemas.openxmlformats.org/markup-compatibility/2006">
-        <mc:Choice xmlns:a14="http://schemas.microsoft.com/office/drawing/2010/main" Requires="a14">
+      <mc:AlternateContent xmlns:mc="http://schemas.openxmlformats.org/markup-compatibility/2006" xmlns:a14="http://schemas.microsoft.com/office/drawing/2010/main">
+        <mc:Choice Requires="a14">
           <p:sp>
             <p:nvSpPr>
               <p:cNvPr id="3" name="Content Placeholder 2">
@@ -14122,7 +14122,7 @@
             </p:txBody>
           </p:sp>
         </mc:Choice>
-        <mc:Fallback>
+        <mc:Fallback xmlns="">
           <p:sp>
             <p:nvSpPr>
               <p:cNvPr id="3" name="Content Placeholder 2">
@@ -14821,8 +14821,8 @@
           <a:chExt cx="0" cy="0"/>
         </a:xfrm>
       </p:grpSpPr>
-      <mc:AlternateContent xmlns:mc="http://schemas.openxmlformats.org/markup-compatibility/2006">
-        <mc:Choice xmlns:a14="http://schemas.microsoft.com/office/drawing/2010/main" Requires="a14">
+      <mc:AlternateContent xmlns:mc="http://schemas.openxmlformats.org/markup-compatibility/2006" xmlns:a14="http://schemas.microsoft.com/office/drawing/2010/main">
+        <mc:Choice Requires="a14">
           <p:sp>
             <p:nvSpPr>
               <p:cNvPr id="3" name="Content Placeholder 2">
@@ -15101,7 +15101,7 @@
             </p:txBody>
           </p:sp>
         </mc:Choice>
-        <mc:Fallback>
+        <mc:Fallback xmlns="">
           <p:sp>
             <p:nvSpPr>
               <p:cNvPr id="3" name="Content Placeholder 2">
@@ -15849,8 +15849,8 @@
           <a:chExt cx="0" cy="0"/>
         </a:xfrm>
       </p:grpSpPr>
-      <mc:AlternateContent xmlns:mc="http://schemas.openxmlformats.org/markup-compatibility/2006">
-        <mc:Choice xmlns:a14="http://schemas.microsoft.com/office/drawing/2010/main" Requires="a14">
+      <mc:AlternateContent xmlns:mc="http://schemas.openxmlformats.org/markup-compatibility/2006" xmlns:a14="http://schemas.microsoft.com/office/drawing/2010/main">
+        <mc:Choice Requires="a14">
           <p:sp>
             <p:nvSpPr>
               <p:cNvPr id="3" name="Content Placeholder 2">
@@ -15963,7 +15963,7 @@
             </p:txBody>
           </p:sp>
         </mc:Choice>
-        <mc:Fallback>
+        <mc:Fallback xmlns="">
           <p:sp>
             <p:nvSpPr>
               <p:cNvPr id="3" name="Content Placeholder 2">
@@ -16538,7 +16538,7 @@
             </a:pPr>
             <a:r>
               <a:rPr lang="en-US" sz="3200" dirty="0"/>
-              <a:t>Data mining is the science </a:t>
+              <a:t>Data mining is the science of </a:t>
             </a:r>
             <a:r>
               <a:rPr lang="en-US" sz="3200" b="1" dirty="0"/>
@@ -16591,9 +16591,12 @@
             </a:r>
           </a:p>
           <a:p>
-            <a:pPr lvl="1"/>
             <a:r>
-              <a:rPr lang="en-US" b="1" dirty="0"/>
+              <a:rPr lang="en-US" b="1" dirty="0">
+                <a:solidFill>
+                  <a:srgbClr val="C00000"/>
+                </a:solidFill>
+              </a:rPr>
               <a:t>Try lots of ideas, fail fast, keep the ones that work! </a:t>
             </a:r>
           </a:p>
@@ -20067,8 +20070,8 @@
           <a:chExt cx="0" cy="0"/>
         </a:xfrm>
       </p:grpSpPr>
-      <mc:AlternateContent xmlns:mc="http://schemas.openxmlformats.org/markup-compatibility/2006">
-        <mc:Choice xmlns:a14="http://schemas.microsoft.com/office/drawing/2010/main" Requires="a14">
+      <mc:AlternateContent xmlns:mc="http://schemas.openxmlformats.org/markup-compatibility/2006" xmlns:a14="http://schemas.microsoft.com/office/drawing/2010/main">
+        <mc:Choice Requires="a14">
           <p:sp>
             <p:nvSpPr>
               <p:cNvPr id="3" name="Content Placeholder 2">
@@ -20299,7 +20302,7 @@
             </p:txBody>
           </p:sp>
         </mc:Choice>
-        <mc:Fallback>
+        <mc:Fallback xmlns="">
           <p:sp>
             <p:nvSpPr>
               <p:cNvPr id="3" name="Content Placeholder 2">
@@ -26482,6 +26485,17 @@
             <a:pPr lvl="1"/>
             <a:r>
               <a:rPr lang="en-US" b="1" dirty="0"/>
+              <a:t>Mathematics:</a:t>
+            </a:r>
+            <a:r>
+              <a:rPr lang="en-US" dirty="0"/>
+              <a:t> How do we represent data as say a graph</a:t>
+            </a:r>
+          </a:p>
+          <a:p>
+            <a:pPr lvl="1"/>
+            <a:r>
+              <a:rPr lang="en-US" b="1" dirty="0"/>
               <a:t>Algorithms: </a:t>
             </a:r>
             <a:r>
@@ -26900,6 +26914,55 @@
                                           <p:spTgt spid="3">
                                             <p:txEl>
                                               <p:pRg st="6" end="6"/>
+                                            </p:txEl>
+                                          </p:spTgt>
+                                        </p:tgtEl>
+                                        <p:attrNameLst>
+                                          <p:attrName>style.visibility</p:attrName>
+                                        </p:attrNameLst>
+                                      </p:cBhvr>
+                                      <p:to>
+                                        <p:strVal val="visible"/>
+                                      </p:to>
+                                    </p:set>
+                                  </p:childTnLst>
+                                </p:cTn>
+                              </p:par>
+                            </p:childTnLst>
+                          </p:cTn>
+                        </p:par>
+                      </p:childTnLst>
+                    </p:cTn>
+                  </p:par>
+                  <p:par>
+                    <p:cTn id="31" fill="hold">
+                      <p:stCondLst>
+                        <p:cond delay="indefinite"/>
+                      </p:stCondLst>
+                      <p:childTnLst>
+                        <p:par>
+                          <p:cTn id="32" fill="hold">
+                            <p:stCondLst>
+                              <p:cond delay="0"/>
+                            </p:stCondLst>
+                            <p:childTnLst>
+                              <p:par>
+                                <p:cTn id="33" presetID="1" presetClass="entr" presetSubtype="0" fill="hold" nodeType="clickEffect">
+                                  <p:stCondLst>
+                                    <p:cond delay="0"/>
+                                  </p:stCondLst>
+                                  <p:childTnLst>
+                                    <p:set>
+                                      <p:cBhvr>
+                                        <p:cTn id="34" dur="1" fill="hold">
+                                          <p:stCondLst>
+                                            <p:cond delay="0"/>
+                                          </p:stCondLst>
+                                        </p:cTn>
+                                        <p:tgtEl>
+                                          <p:spTgt spid="3">
+                                            <p:txEl>
+                                              <p:pRg st="7" end="7"/>
                                             </p:txEl>
                                           </p:spTgt>
                                         </p:tgtEl>

</xml_diff>

<commit_message>
Updates and additions to slides
</commit_message>
<xml_diff>
--- a/slides/1_Introduction.pptx
+++ b/slides/1_Introduction.pptx
@@ -5,7 +5,7 @@
     <p:sldMasterId id="2147483648" r:id="rId1"/>
   </p:sldMasterIdLst>
   <p:notesMasterIdLst>
-    <p:notesMasterId r:id="rId41"/>
+    <p:notesMasterId r:id="rId46"/>
   </p:notesMasterIdLst>
   <p:sldIdLst>
     <p:sldId id="256" r:id="rId2"/>
@@ -42,11 +42,16 @@
     <p:sldId id="372" r:id="rId33"/>
     <p:sldId id="361" r:id="rId34"/>
     <p:sldId id="368" r:id="rId35"/>
-    <p:sldId id="371" r:id="rId36"/>
-    <p:sldId id="369" r:id="rId37"/>
-    <p:sldId id="373" r:id="rId38"/>
-    <p:sldId id="370" r:id="rId39"/>
-    <p:sldId id="384" r:id="rId40"/>
+    <p:sldId id="390" r:id="rId36"/>
+    <p:sldId id="391" r:id="rId37"/>
+    <p:sldId id="392" r:id="rId38"/>
+    <p:sldId id="393" r:id="rId39"/>
+    <p:sldId id="394" r:id="rId40"/>
+    <p:sldId id="371" r:id="rId41"/>
+    <p:sldId id="369" r:id="rId42"/>
+    <p:sldId id="373" r:id="rId43"/>
+    <p:sldId id="370" r:id="rId44"/>
+    <p:sldId id="384" r:id="rId45"/>
   </p:sldIdLst>
   <p:sldSz cx="12192000" cy="6858000"/>
   <p:notesSz cx="6858000" cy="9144000"/>
@@ -654,7 +659,7 @@
           <a:p>
             <a:fld id="{F33E01E3-981B-4CB5-81ED-65C622C255CB}" type="slidenum">
               <a:rPr lang="en-US" smtClean="0"/>
-              <a:t>35</a:t>
+              <a:t>40</a:t>
             </a:fld>
             <a:endParaRPr lang="en-US"/>
           </a:p>
@@ -741,7 +746,7 @@
           <a:p>
             <a:fld id="{F33E01E3-981B-4CB5-81ED-65C622C255CB}" type="slidenum">
               <a:rPr lang="en-US" smtClean="0"/>
-              <a:t>36</a:t>
+              <a:t>41</a:t>
             </a:fld>
             <a:endParaRPr lang="en-US"/>
           </a:p>
@@ -828,7 +833,7 @@
           <a:p>
             <a:fld id="{F33E01E3-981B-4CB5-81ED-65C622C255CB}" type="slidenum">
               <a:rPr lang="en-US" smtClean="0"/>
-              <a:t>37</a:t>
+              <a:t>42</a:t>
             </a:fld>
             <a:endParaRPr lang="en-US"/>
           </a:p>
@@ -915,7 +920,7 @@
           <a:p>
             <a:fld id="{F33E01E3-981B-4CB5-81ED-65C622C255CB}" type="slidenum">
               <a:rPr lang="en-US" smtClean="0"/>
-              <a:t>38</a:t>
+              <a:t>43</a:t>
             </a:fld>
             <a:endParaRPr lang="en-US"/>
           </a:p>
@@ -31374,8 +31379,8 @@
           <a:chExt cx="0" cy="0"/>
         </a:xfrm>
       </p:grpSpPr>
-      <mc:AlternateContent xmlns:mc="http://schemas.openxmlformats.org/markup-compatibility/2006" xmlns:a14="http://schemas.microsoft.com/office/drawing/2010/main">
-        <mc:Choice Requires="a14">
+      <mc:AlternateContent xmlns:mc="http://schemas.openxmlformats.org/markup-compatibility/2006">
+        <mc:Choice xmlns:a14="http://schemas.microsoft.com/office/drawing/2010/main" Requires="a14">
           <p:sp>
             <p:nvSpPr>
               <p:cNvPr id="3" name="Content Placeholder 2">
@@ -31427,7 +31432,7 @@
                 </a:r>
                 <a:r>
                   <a:rPr lang="en-US" sz="3200" b="1" dirty="0"/>
-                  <a:t>false positive rate </a:t>
+                  <a:t>false discovery rate (FDR) </a:t>
                 </a:r>
                 <a:r>
                   <a:rPr lang="en-US" sz="3200" dirty="0"/>
@@ -31548,7 +31553,7 @@
             </p:txBody>
           </p:sp>
         </mc:Choice>
-        <mc:Fallback xmlns="">
+        <mc:Fallback>
           <p:sp>
             <p:nvSpPr>
               <p:cNvPr id="3" name="Content Placeholder 2">
@@ -31652,6 +31657,2664 @@
     <p:extLst>
       <p:ext uri="{BB962C8B-B14F-4D97-AF65-F5344CB8AC3E}">
         <p14:creationId xmlns:p14="http://schemas.microsoft.com/office/powerpoint/2010/main" val="1442343126"/>
+      </p:ext>
+    </p:extLst>
+  </p:cSld>
+  <p:clrMapOvr>
+    <a:masterClrMapping/>
+  </p:clrMapOvr>
+  <p:timing>
+    <p:tnLst>
+      <p:par>
+        <p:cTn id="1" dur="indefinite" restart="never" nodeType="tmRoot">
+          <p:childTnLst>
+            <p:seq concurrent="1" nextAc="seek">
+              <p:cTn id="2" dur="indefinite" nodeType="mainSeq">
+                <p:childTnLst>
+                  <p:par>
+                    <p:cTn id="3" fill="hold">
+                      <p:stCondLst>
+                        <p:cond delay="indefinite"/>
+                      </p:stCondLst>
+                      <p:childTnLst>
+                        <p:par>
+                          <p:cTn id="4" fill="hold">
+                            <p:stCondLst>
+                              <p:cond delay="0"/>
+                            </p:stCondLst>
+                            <p:childTnLst>
+                              <p:par>
+                                <p:cTn id="5" presetID="1" presetClass="entr" presetSubtype="0" fill="hold" nodeType="clickEffect">
+                                  <p:stCondLst>
+                                    <p:cond delay="0"/>
+                                  </p:stCondLst>
+                                  <p:childTnLst>
+                                    <p:set>
+                                      <p:cBhvr>
+                                        <p:cTn id="6" dur="1" fill="hold">
+                                          <p:stCondLst>
+                                            <p:cond delay="0"/>
+                                          </p:stCondLst>
+                                        </p:cTn>
+                                        <p:tgtEl>
+                                          <p:spTgt spid="3">
+                                            <p:txEl>
+                                              <p:pRg st="1" end="1"/>
+                                            </p:txEl>
+                                          </p:spTgt>
+                                        </p:tgtEl>
+                                        <p:attrNameLst>
+                                          <p:attrName>style.visibility</p:attrName>
+                                        </p:attrNameLst>
+                                      </p:cBhvr>
+                                      <p:to>
+                                        <p:strVal val="visible"/>
+                                      </p:to>
+                                    </p:set>
+                                  </p:childTnLst>
+                                </p:cTn>
+                              </p:par>
+                            </p:childTnLst>
+                          </p:cTn>
+                        </p:par>
+                      </p:childTnLst>
+                    </p:cTn>
+                  </p:par>
+                  <p:par>
+                    <p:cTn id="7" fill="hold">
+                      <p:stCondLst>
+                        <p:cond delay="indefinite"/>
+                      </p:stCondLst>
+                      <p:childTnLst>
+                        <p:par>
+                          <p:cTn id="8" fill="hold">
+                            <p:stCondLst>
+                              <p:cond delay="0"/>
+                            </p:stCondLst>
+                            <p:childTnLst>
+                              <p:par>
+                                <p:cTn id="9" presetID="1" presetClass="entr" presetSubtype="0" fill="hold" nodeType="clickEffect">
+                                  <p:stCondLst>
+                                    <p:cond delay="0"/>
+                                  </p:stCondLst>
+                                  <p:childTnLst>
+                                    <p:set>
+                                      <p:cBhvr>
+                                        <p:cTn id="10" dur="1" fill="hold">
+                                          <p:stCondLst>
+                                            <p:cond delay="0"/>
+                                          </p:stCondLst>
+                                        </p:cTn>
+                                        <p:tgtEl>
+                                          <p:spTgt spid="3">
+                                            <p:txEl>
+                                              <p:pRg st="2" end="2"/>
+                                            </p:txEl>
+                                          </p:spTgt>
+                                        </p:tgtEl>
+                                        <p:attrNameLst>
+                                          <p:attrName>style.visibility</p:attrName>
+                                        </p:attrNameLst>
+                                      </p:cBhvr>
+                                      <p:to>
+                                        <p:strVal val="visible"/>
+                                      </p:to>
+                                    </p:set>
+                                  </p:childTnLst>
+                                </p:cTn>
+                              </p:par>
+                            </p:childTnLst>
+                          </p:cTn>
+                        </p:par>
+                      </p:childTnLst>
+                    </p:cTn>
+                  </p:par>
+                  <p:par>
+                    <p:cTn id="11" fill="hold">
+                      <p:stCondLst>
+                        <p:cond delay="indefinite"/>
+                      </p:stCondLst>
+                      <p:childTnLst>
+                        <p:par>
+                          <p:cTn id="12" fill="hold">
+                            <p:stCondLst>
+                              <p:cond delay="0"/>
+                            </p:stCondLst>
+                            <p:childTnLst>
+                              <p:par>
+                                <p:cTn id="13" presetID="1" presetClass="entr" presetSubtype="0" fill="hold" nodeType="clickEffect">
+                                  <p:stCondLst>
+                                    <p:cond delay="0"/>
+                                  </p:stCondLst>
+                                  <p:childTnLst>
+                                    <p:set>
+                                      <p:cBhvr>
+                                        <p:cTn id="14" dur="1" fill="hold">
+                                          <p:stCondLst>
+                                            <p:cond delay="0"/>
+                                          </p:stCondLst>
+                                        </p:cTn>
+                                        <p:tgtEl>
+                                          <p:spTgt spid="3">
+                                            <p:txEl>
+                                              <p:pRg st="3" end="3"/>
+                                            </p:txEl>
+                                          </p:spTgt>
+                                        </p:tgtEl>
+                                        <p:attrNameLst>
+                                          <p:attrName>style.visibility</p:attrName>
+                                        </p:attrNameLst>
+                                      </p:cBhvr>
+                                      <p:to>
+                                        <p:strVal val="visible"/>
+                                      </p:to>
+                                    </p:set>
+                                  </p:childTnLst>
+                                </p:cTn>
+                              </p:par>
+                            </p:childTnLst>
+                          </p:cTn>
+                        </p:par>
+                      </p:childTnLst>
+                    </p:cTn>
+                  </p:par>
+                  <p:par>
+                    <p:cTn id="15" fill="hold">
+                      <p:stCondLst>
+                        <p:cond delay="indefinite"/>
+                      </p:stCondLst>
+                      <p:childTnLst>
+                        <p:par>
+                          <p:cTn id="16" fill="hold">
+                            <p:stCondLst>
+                              <p:cond delay="0"/>
+                            </p:stCondLst>
+                            <p:childTnLst>
+                              <p:par>
+                                <p:cTn id="17" presetID="1" presetClass="entr" presetSubtype="0" fill="hold" nodeType="clickEffect">
+                                  <p:stCondLst>
+                                    <p:cond delay="0"/>
+                                  </p:stCondLst>
+                                  <p:childTnLst>
+                                    <p:set>
+                                      <p:cBhvr>
+                                        <p:cTn id="18" dur="1" fill="hold">
+                                          <p:stCondLst>
+                                            <p:cond delay="0"/>
+                                          </p:stCondLst>
+                                        </p:cTn>
+                                        <p:tgtEl>
+                                          <p:spTgt spid="3">
+                                            <p:txEl>
+                                              <p:pRg st="4" end="4"/>
+                                            </p:txEl>
+                                          </p:spTgt>
+                                        </p:tgtEl>
+                                        <p:attrNameLst>
+                                          <p:attrName>style.visibility</p:attrName>
+                                        </p:attrNameLst>
+                                      </p:cBhvr>
+                                      <p:to>
+                                        <p:strVal val="visible"/>
+                                      </p:to>
+                                    </p:set>
+                                  </p:childTnLst>
+                                </p:cTn>
+                              </p:par>
+                            </p:childTnLst>
+                          </p:cTn>
+                        </p:par>
+                      </p:childTnLst>
+                    </p:cTn>
+                  </p:par>
+                  <p:par>
+                    <p:cTn id="19" fill="hold">
+                      <p:stCondLst>
+                        <p:cond delay="indefinite"/>
+                      </p:stCondLst>
+                      <p:childTnLst>
+                        <p:par>
+                          <p:cTn id="20" fill="hold">
+                            <p:stCondLst>
+                              <p:cond delay="0"/>
+                            </p:stCondLst>
+                            <p:childTnLst>
+                              <p:par>
+                                <p:cTn id="21" presetID="1" presetClass="entr" presetSubtype="0" fill="hold" nodeType="clickEffect">
+                                  <p:stCondLst>
+                                    <p:cond delay="0"/>
+                                  </p:stCondLst>
+                                  <p:childTnLst>
+                                    <p:set>
+                                      <p:cBhvr>
+                                        <p:cTn id="22" dur="1" fill="hold">
+                                          <p:stCondLst>
+                                            <p:cond delay="0"/>
+                                          </p:stCondLst>
+                                        </p:cTn>
+                                        <p:tgtEl>
+                                          <p:spTgt spid="3">
+                                            <p:txEl>
+                                              <p:pRg st="5" end="5"/>
+                                            </p:txEl>
+                                          </p:spTgt>
+                                        </p:tgtEl>
+                                        <p:attrNameLst>
+                                          <p:attrName>style.visibility</p:attrName>
+                                        </p:attrNameLst>
+                                      </p:cBhvr>
+                                      <p:to>
+                                        <p:strVal val="visible"/>
+                                      </p:to>
+                                    </p:set>
+                                  </p:childTnLst>
+                                </p:cTn>
+                              </p:par>
+                            </p:childTnLst>
+                          </p:cTn>
+                        </p:par>
+                      </p:childTnLst>
+                    </p:cTn>
+                  </p:par>
+                </p:childTnLst>
+              </p:cTn>
+              <p:prevCondLst>
+                <p:cond evt="onPrev" delay="0">
+                  <p:tgtEl>
+                    <p:sldTgt/>
+                  </p:tgtEl>
+                </p:cond>
+              </p:prevCondLst>
+              <p:nextCondLst>
+                <p:cond evt="onNext" delay="0">
+                  <p:tgtEl>
+                    <p:sldTgt/>
+                  </p:tgtEl>
+                </p:cond>
+              </p:nextCondLst>
+            </p:seq>
+          </p:childTnLst>
+        </p:cTn>
+      </p:par>
+    </p:tnLst>
+  </p:timing>
+</p:sld>
+</file>
+
+<file path=ppt/slides/slide35.xml><?xml version="1.0" encoding="utf-8"?>
+<p:sld xmlns:a="http://schemas.openxmlformats.org/drawingml/2006/main" xmlns:r="http://schemas.openxmlformats.org/officeDocument/2006/relationships" xmlns:p="http://schemas.openxmlformats.org/presentationml/2006/main">
+  <p:cSld>
+    <p:spTree>
+      <p:nvGrpSpPr>
+        <p:cNvPr id="1" name=""/>
+        <p:cNvGrpSpPr/>
+        <p:nvPr/>
+      </p:nvGrpSpPr>
+      <p:grpSpPr>
+        <a:xfrm>
+          <a:off x="0" y="0"/>
+          <a:ext cx="0" cy="0"/>
+          <a:chOff x="0" y="0"/>
+          <a:chExt cx="0" cy="0"/>
+        </a:xfrm>
+      </p:grpSpPr>
+      <p:sp>
+        <p:nvSpPr>
+          <p:cNvPr id="3" name="Content Placeholder 2">
+            <a:extLst>
+              <a:ext uri="{FF2B5EF4-FFF2-40B4-BE49-F238E27FC236}">
+                <a16:creationId xmlns:a16="http://schemas.microsoft.com/office/drawing/2014/main" id="{258E6AF3-7615-4BD1-878E-A94C93E98F90}"/>
+              </a:ext>
+            </a:extLst>
+          </p:cNvPr>
+          <p:cNvSpPr>
+            <a:spLocks noGrp="1"/>
+          </p:cNvSpPr>
+          <p:nvPr>
+            <p:ph idx="1"/>
+          </p:nvPr>
+        </p:nvSpPr>
+        <p:spPr>
+          <a:xfrm>
+            <a:off x="640237" y="1154757"/>
+            <a:ext cx="5128967" cy="5436747"/>
+          </a:xfrm>
+        </p:spPr>
+        <p:txBody>
+          <a:bodyPr>
+            <a:normAutofit/>
+          </a:bodyPr>
+          <a:lstStyle/>
+          <a:p>
+            <a:pPr marL="0" indent="0">
+              <a:buNone/>
+            </a:pPr>
+            <a:r>
+              <a:rPr lang="en-US" dirty="0"/>
+              <a:t>Data dredging leads often leads to </a:t>
+            </a:r>
+            <a:r>
+              <a:rPr lang="en-US" b="1" dirty="0"/>
+              <a:t>false positive</a:t>
+            </a:r>
+            <a:r>
+              <a:rPr lang="en-US" dirty="0"/>
+              <a:t> results   </a:t>
+            </a:r>
+          </a:p>
+          <a:p>
+            <a:r>
+              <a:rPr lang="en-US" dirty="0"/>
+              <a:t>Consider two </a:t>
+            </a:r>
+            <a:r>
+              <a:rPr lang="en-US" dirty="0" err="1"/>
+              <a:t>iid</a:t>
+            </a:r>
+            <a:r>
+              <a:rPr lang="en-US" dirty="0"/>
+              <a:t> Normal random variables   </a:t>
+            </a:r>
+          </a:p>
+          <a:p>
+            <a:r>
+              <a:rPr lang="en-US" dirty="0"/>
+              <a:t>Variables are independent and uncorrelated </a:t>
+            </a:r>
+          </a:p>
+        </p:txBody>
+      </p:sp>
+      <p:sp>
+        <p:nvSpPr>
+          <p:cNvPr id="6" name="Title 1">
+            <a:extLst>
+              <a:ext uri="{FF2B5EF4-FFF2-40B4-BE49-F238E27FC236}">
+                <a16:creationId xmlns:a16="http://schemas.microsoft.com/office/drawing/2014/main" id="{CD29F70F-B868-451B-A65D-8721F4C7A2D9}"/>
+              </a:ext>
+            </a:extLst>
+          </p:cNvPr>
+          <p:cNvSpPr txBox="1">
+            <a:spLocks/>
+          </p:cNvSpPr>
+          <p:nvPr/>
+        </p:nvSpPr>
+        <p:spPr>
+          <a:xfrm>
+            <a:off x="838200" y="-635"/>
+            <a:ext cx="10515600" cy="1325563"/>
+          </a:xfrm>
+          <a:prstGeom prst="rect">
+            <a:avLst/>
+          </a:prstGeom>
+        </p:spPr>
+        <p:txBody>
+          <a:bodyPr vert="horz" lIns="91440" tIns="45720" rIns="91440" bIns="45720" rtlCol="0" anchor="ctr">
+            <a:normAutofit/>
+          </a:bodyPr>
+          <a:lstStyle>
+            <a:lvl1pPr algn="l" defTabSz="914400" rtl="0" eaLnBrk="1" latinLnBrk="0" hangingPunct="1">
+              <a:lnSpc>
+                <a:spcPct val="90000"/>
+              </a:lnSpc>
+              <a:spcBef>
+                <a:spcPct val="0"/>
+              </a:spcBef>
+              <a:buNone/>
+              <a:defRPr sz="4400" kern="1200">
+                <a:solidFill>
+                  <a:schemeClr val="tx1"/>
+                </a:solidFill>
+                <a:latin typeface="+mj-lt"/>
+                <a:ea typeface="+mj-ea"/>
+                <a:cs typeface="+mj-cs"/>
+              </a:defRPr>
+            </a:lvl1pPr>
+          </a:lstStyle>
+          <a:p>
+            <a:r>
+              <a:rPr lang="en-US" dirty="0">
+                <a:latin typeface="+mn-lt"/>
+              </a:rPr>
+              <a:t>Pitfalls of Data Mining </a:t>
+            </a:r>
+          </a:p>
+        </p:txBody>
+      </p:sp>
+      <p:pic>
+        <p:nvPicPr>
+          <p:cNvPr id="4" name="Picture 3">
+            <a:extLst>
+              <a:ext uri="{FF2B5EF4-FFF2-40B4-BE49-F238E27FC236}">
+                <a16:creationId xmlns:a16="http://schemas.microsoft.com/office/drawing/2014/main" id="{D47C2DE9-BC24-1D70-4D71-9B2D1296DDD0}"/>
+              </a:ext>
+            </a:extLst>
+          </p:cNvPr>
+          <p:cNvPicPr>
+            <a:picLocks noChangeAspect="1"/>
+          </p:cNvPicPr>
+          <p:nvPr/>
+        </p:nvPicPr>
+        <p:blipFill>
+          <a:blip r:embed="rId2"/>
+          <a:stretch>
+            <a:fillRect/>
+          </a:stretch>
+        </p:blipFill>
+        <p:spPr>
+          <a:xfrm>
+            <a:off x="5590933" y="1257450"/>
+            <a:ext cx="6529080" cy="5401532"/>
+          </a:xfrm>
+          <a:prstGeom prst="rect">
+            <a:avLst/>
+          </a:prstGeom>
+        </p:spPr>
+      </p:pic>
+    </p:spTree>
+    <p:extLst>
+      <p:ext uri="{BB962C8B-B14F-4D97-AF65-F5344CB8AC3E}">
+        <p14:creationId xmlns:p14="http://schemas.microsoft.com/office/powerpoint/2010/main" val="916498014"/>
+      </p:ext>
+    </p:extLst>
+  </p:cSld>
+  <p:clrMapOvr>
+    <a:masterClrMapping/>
+  </p:clrMapOvr>
+  <p:timing>
+    <p:tnLst>
+      <p:par>
+        <p:cTn id="1" dur="indefinite" restart="never" nodeType="tmRoot">
+          <p:childTnLst>
+            <p:seq concurrent="1" nextAc="seek">
+              <p:cTn id="2" dur="indefinite" nodeType="mainSeq">
+                <p:childTnLst>
+                  <p:par>
+                    <p:cTn id="3" fill="hold">
+                      <p:stCondLst>
+                        <p:cond delay="indefinite"/>
+                      </p:stCondLst>
+                      <p:childTnLst>
+                        <p:par>
+                          <p:cTn id="4" fill="hold">
+                            <p:stCondLst>
+                              <p:cond delay="0"/>
+                            </p:stCondLst>
+                            <p:childTnLst>
+                              <p:par>
+                                <p:cTn id="5" presetID="1" presetClass="entr" presetSubtype="0" fill="hold" nodeType="clickEffect">
+                                  <p:stCondLst>
+                                    <p:cond delay="0"/>
+                                  </p:stCondLst>
+                                  <p:childTnLst>
+                                    <p:set>
+                                      <p:cBhvr>
+                                        <p:cTn id="6" dur="1" fill="hold">
+                                          <p:stCondLst>
+                                            <p:cond delay="0"/>
+                                          </p:stCondLst>
+                                        </p:cTn>
+                                        <p:tgtEl>
+                                          <p:spTgt spid="3">
+                                            <p:txEl>
+                                              <p:pRg st="1" end="1"/>
+                                            </p:txEl>
+                                          </p:spTgt>
+                                        </p:tgtEl>
+                                        <p:attrNameLst>
+                                          <p:attrName>style.visibility</p:attrName>
+                                        </p:attrNameLst>
+                                      </p:cBhvr>
+                                      <p:to>
+                                        <p:strVal val="visible"/>
+                                      </p:to>
+                                    </p:set>
+                                  </p:childTnLst>
+                                </p:cTn>
+                              </p:par>
+                              <p:par>
+                                <p:cTn id="7" presetID="1" presetClass="entr" presetSubtype="0" fill="hold" nodeType="withEffect">
+                                  <p:stCondLst>
+                                    <p:cond delay="0"/>
+                                  </p:stCondLst>
+                                  <p:childTnLst>
+                                    <p:set>
+                                      <p:cBhvr>
+                                        <p:cTn id="8" dur="1" fill="hold">
+                                          <p:stCondLst>
+                                            <p:cond delay="0"/>
+                                          </p:stCondLst>
+                                        </p:cTn>
+                                        <p:tgtEl>
+                                          <p:spTgt spid="4"/>
+                                        </p:tgtEl>
+                                        <p:attrNameLst>
+                                          <p:attrName>style.visibility</p:attrName>
+                                        </p:attrNameLst>
+                                      </p:cBhvr>
+                                      <p:to>
+                                        <p:strVal val="visible"/>
+                                      </p:to>
+                                    </p:set>
+                                  </p:childTnLst>
+                                </p:cTn>
+                              </p:par>
+                            </p:childTnLst>
+                          </p:cTn>
+                        </p:par>
+                      </p:childTnLst>
+                    </p:cTn>
+                  </p:par>
+                  <p:par>
+                    <p:cTn id="9" fill="hold">
+                      <p:stCondLst>
+                        <p:cond delay="indefinite"/>
+                      </p:stCondLst>
+                      <p:childTnLst>
+                        <p:par>
+                          <p:cTn id="10" fill="hold">
+                            <p:stCondLst>
+                              <p:cond delay="0"/>
+                            </p:stCondLst>
+                            <p:childTnLst>
+                              <p:par>
+                                <p:cTn id="11" presetID="1" presetClass="entr" presetSubtype="0" fill="hold" nodeType="clickEffect">
+                                  <p:stCondLst>
+                                    <p:cond delay="0"/>
+                                  </p:stCondLst>
+                                  <p:childTnLst>
+                                    <p:set>
+                                      <p:cBhvr>
+                                        <p:cTn id="12" dur="1" fill="hold">
+                                          <p:stCondLst>
+                                            <p:cond delay="0"/>
+                                          </p:stCondLst>
+                                        </p:cTn>
+                                        <p:tgtEl>
+                                          <p:spTgt spid="3">
+                                            <p:txEl>
+                                              <p:pRg st="2" end="2"/>
+                                            </p:txEl>
+                                          </p:spTgt>
+                                        </p:tgtEl>
+                                        <p:attrNameLst>
+                                          <p:attrName>style.visibility</p:attrName>
+                                        </p:attrNameLst>
+                                      </p:cBhvr>
+                                      <p:to>
+                                        <p:strVal val="visible"/>
+                                      </p:to>
+                                    </p:set>
+                                  </p:childTnLst>
+                                </p:cTn>
+                              </p:par>
+                            </p:childTnLst>
+                          </p:cTn>
+                        </p:par>
+                      </p:childTnLst>
+                    </p:cTn>
+                  </p:par>
+                </p:childTnLst>
+              </p:cTn>
+              <p:prevCondLst>
+                <p:cond evt="onPrev" delay="0">
+                  <p:tgtEl>
+                    <p:sldTgt/>
+                  </p:tgtEl>
+                </p:cond>
+              </p:prevCondLst>
+              <p:nextCondLst>
+                <p:cond evt="onNext" delay="0">
+                  <p:tgtEl>
+                    <p:sldTgt/>
+                  </p:tgtEl>
+                </p:cond>
+              </p:nextCondLst>
+            </p:seq>
+          </p:childTnLst>
+        </p:cTn>
+      </p:par>
+    </p:tnLst>
+  </p:timing>
+</p:sld>
+</file>
+
+<file path=ppt/slides/slide36.xml><?xml version="1.0" encoding="utf-8"?>
+<p:sld xmlns:a="http://schemas.openxmlformats.org/drawingml/2006/main" xmlns:r="http://schemas.openxmlformats.org/officeDocument/2006/relationships" xmlns:p="http://schemas.openxmlformats.org/presentationml/2006/main">
+  <p:cSld>
+    <p:spTree>
+      <p:nvGrpSpPr>
+        <p:cNvPr id="1" name=""/>
+        <p:cNvGrpSpPr/>
+        <p:nvPr/>
+      </p:nvGrpSpPr>
+      <p:grpSpPr>
+        <a:xfrm>
+          <a:off x="0" y="0"/>
+          <a:ext cx="0" cy="0"/>
+          <a:chOff x="0" y="0"/>
+          <a:chExt cx="0" cy="0"/>
+        </a:xfrm>
+      </p:grpSpPr>
+      <p:sp>
+        <p:nvSpPr>
+          <p:cNvPr id="3" name="Content Placeholder 2">
+            <a:extLst>
+              <a:ext uri="{FF2B5EF4-FFF2-40B4-BE49-F238E27FC236}">
+                <a16:creationId xmlns:a16="http://schemas.microsoft.com/office/drawing/2014/main" id="{258E6AF3-7615-4BD1-878E-A94C93E98F90}"/>
+              </a:ext>
+            </a:extLst>
+          </p:cNvPr>
+          <p:cNvSpPr>
+            <a:spLocks noGrp="1"/>
+          </p:cNvSpPr>
+          <p:nvPr>
+            <p:ph idx="1"/>
+          </p:nvPr>
+        </p:nvSpPr>
+        <p:spPr>
+          <a:xfrm>
+            <a:off x="640237" y="1154757"/>
+            <a:ext cx="5128967" cy="5436747"/>
+          </a:xfrm>
+        </p:spPr>
+        <p:txBody>
+          <a:bodyPr>
+            <a:normAutofit/>
+          </a:bodyPr>
+          <a:lstStyle/>
+          <a:p>
+            <a:pPr marL="0" indent="0">
+              <a:buNone/>
+            </a:pPr>
+            <a:r>
+              <a:rPr lang="en-US" dirty="0"/>
+              <a:t>Data dredging leads often leads to </a:t>
+            </a:r>
+            <a:r>
+              <a:rPr lang="en-US" b="1" dirty="0"/>
+              <a:t>false positive</a:t>
+            </a:r>
+            <a:r>
+              <a:rPr lang="en-US" dirty="0"/>
+              <a:t> results   </a:t>
+            </a:r>
+          </a:p>
+          <a:p>
+            <a:r>
+              <a:rPr lang="en-US" dirty="0"/>
+              <a:t>Increase sample size one at a time</a:t>
+            </a:r>
+          </a:p>
+          <a:p>
+            <a:r>
+              <a:rPr lang="en-US" dirty="0"/>
+              <a:t>Compute regression line for each sample </a:t>
+            </a:r>
+          </a:p>
+          <a:p>
+            <a:r>
+              <a:rPr lang="en-US" dirty="0"/>
+              <a:t>Compute p-value of slope coefficient  </a:t>
+            </a:r>
+          </a:p>
+          <a:p>
+            <a:r>
+              <a:rPr lang="en-US" dirty="0"/>
+              <a:t>Results in false positive! </a:t>
+            </a:r>
+          </a:p>
+          <a:p>
+            <a:pPr marL="0" indent="0">
+              <a:buNone/>
+            </a:pPr>
+            <a:r>
+              <a:rPr lang="en-US" sz="2200" dirty="0">
+                <a:solidFill>
+                  <a:schemeClr val="accent1"/>
+                </a:solidFill>
+              </a:rPr>
+              <a:t>Full example and code in </a:t>
+            </a:r>
+            <a:r>
+              <a:rPr lang="en-US" sz="2200" dirty="0" err="1">
+                <a:solidFill>
+                  <a:schemeClr val="accent1"/>
+                </a:solidFill>
+              </a:rPr>
+              <a:t>SupplementaryMaterials</a:t>
+            </a:r>
+            <a:r>
+              <a:rPr lang="en-US" sz="2200" dirty="0">
+                <a:solidFill>
+                  <a:schemeClr val="accent1"/>
+                </a:solidFill>
+              </a:rPr>
+              <a:t> directory of GitHub repositor</a:t>
+            </a:r>
+          </a:p>
+        </p:txBody>
+      </p:sp>
+      <p:sp>
+        <p:nvSpPr>
+          <p:cNvPr id="6" name="Title 1">
+            <a:extLst>
+              <a:ext uri="{FF2B5EF4-FFF2-40B4-BE49-F238E27FC236}">
+                <a16:creationId xmlns:a16="http://schemas.microsoft.com/office/drawing/2014/main" id="{CD29F70F-B868-451B-A65D-8721F4C7A2D9}"/>
+              </a:ext>
+            </a:extLst>
+          </p:cNvPr>
+          <p:cNvSpPr txBox="1">
+            <a:spLocks/>
+          </p:cNvSpPr>
+          <p:nvPr/>
+        </p:nvSpPr>
+        <p:spPr>
+          <a:xfrm>
+            <a:off x="838200" y="-635"/>
+            <a:ext cx="10515600" cy="1325563"/>
+          </a:xfrm>
+          <a:prstGeom prst="rect">
+            <a:avLst/>
+          </a:prstGeom>
+        </p:spPr>
+        <p:txBody>
+          <a:bodyPr vert="horz" lIns="91440" tIns="45720" rIns="91440" bIns="45720" rtlCol="0" anchor="ctr">
+            <a:normAutofit/>
+          </a:bodyPr>
+          <a:lstStyle>
+            <a:lvl1pPr algn="l" defTabSz="914400" rtl="0" eaLnBrk="1" latinLnBrk="0" hangingPunct="1">
+              <a:lnSpc>
+                <a:spcPct val="90000"/>
+              </a:lnSpc>
+              <a:spcBef>
+                <a:spcPct val="0"/>
+              </a:spcBef>
+              <a:buNone/>
+              <a:defRPr sz="4400" kern="1200">
+                <a:solidFill>
+                  <a:schemeClr val="tx1"/>
+                </a:solidFill>
+                <a:latin typeface="+mj-lt"/>
+                <a:ea typeface="+mj-ea"/>
+                <a:cs typeface="+mj-cs"/>
+              </a:defRPr>
+            </a:lvl1pPr>
+          </a:lstStyle>
+          <a:p>
+            <a:r>
+              <a:rPr lang="en-US" dirty="0">
+                <a:latin typeface="+mn-lt"/>
+              </a:rPr>
+              <a:t>Pitfalls of Data Mining </a:t>
+            </a:r>
+          </a:p>
+        </p:txBody>
+      </p:sp>
+      <p:pic>
+        <p:nvPicPr>
+          <p:cNvPr id="5" name="Picture 4">
+            <a:extLst>
+              <a:ext uri="{FF2B5EF4-FFF2-40B4-BE49-F238E27FC236}">
+                <a16:creationId xmlns:a16="http://schemas.microsoft.com/office/drawing/2014/main" id="{D2B8AFAC-2D77-00F0-1170-CD02E07F0A59}"/>
+              </a:ext>
+            </a:extLst>
+          </p:cNvPr>
+          <p:cNvPicPr>
+            <a:picLocks noChangeAspect="1"/>
+          </p:cNvPicPr>
+          <p:nvPr/>
+        </p:nvPicPr>
+        <p:blipFill>
+          <a:blip r:embed="rId2"/>
+          <a:stretch>
+            <a:fillRect/>
+          </a:stretch>
+        </p:blipFill>
+        <p:spPr>
+          <a:xfrm>
+            <a:off x="5769204" y="1006719"/>
+            <a:ext cx="6324961" cy="5639178"/>
+          </a:xfrm>
+          <a:prstGeom prst="rect">
+            <a:avLst/>
+          </a:prstGeom>
+        </p:spPr>
+      </p:pic>
+    </p:spTree>
+    <p:extLst>
+      <p:ext uri="{BB962C8B-B14F-4D97-AF65-F5344CB8AC3E}">
+        <p14:creationId xmlns:p14="http://schemas.microsoft.com/office/powerpoint/2010/main" val="1186234960"/>
+      </p:ext>
+    </p:extLst>
+  </p:cSld>
+  <p:clrMapOvr>
+    <a:masterClrMapping/>
+  </p:clrMapOvr>
+  <p:timing>
+    <p:tnLst>
+      <p:par>
+        <p:cTn id="1" dur="indefinite" restart="never" nodeType="tmRoot">
+          <p:childTnLst>
+            <p:seq concurrent="1" nextAc="seek">
+              <p:cTn id="2" dur="indefinite" nodeType="mainSeq">
+                <p:childTnLst>
+                  <p:par>
+                    <p:cTn id="3" fill="hold">
+                      <p:stCondLst>
+                        <p:cond delay="indefinite"/>
+                      </p:stCondLst>
+                      <p:childTnLst>
+                        <p:par>
+                          <p:cTn id="4" fill="hold">
+                            <p:stCondLst>
+                              <p:cond delay="0"/>
+                            </p:stCondLst>
+                            <p:childTnLst>
+                              <p:par>
+                                <p:cTn id="5" presetID="1" presetClass="entr" presetSubtype="0" fill="hold" nodeType="clickEffect">
+                                  <p:stCondLst>
+                                    <p:cond delay="0"/>
+                                  </p:stCondLst>
+                                  <p:childTnLst>
+                                    <p:set>
+                                      <p:cBhvr>
+                                        <p:cTn id="6" dur="1" fill="hold">
+                                          <p:stCondLst>
+                                            <p:cond delay="0"/>
+                                          </p:stCondLst>
+                                        </p:cTn>
+                                        <p:tgtEl>
+                                          <p:spTgt spid="3">
+                                            <p:txEl>
+                                              <p:pRg st="1" end="1"/>
+                                            </p:txEl>
+                                          </p:spTgt>
+                                        </p:tgtEl>
+                                        <p:attrNameLst>
+                                          <p:attrName>style.visibility</p:attrName>
+                                        </p:attrNameLst>
+                                      </p:cBhvr>
+                                      <p:to>
+                                        <p:strVal val="visible"/>
+                                      </p:to>
+                                    </p:set>
+                                  </p:childTnLst>
+                                </p:cTn>
+                              </p:par>
+                            </p:childTnLst>
+                          </p:cTn>
+                        </p:par>
+                      </p:childTnLst>
+                    </p:cTn>
+                  </p:par>
+                  <p:par>
+                    <p:cTn id="7" fill="hold">
+                      <p:stCondLst>
+                        <p:cond delay="indefinite"/>
+                      </p:stCondLst>
+                      <p:childTnLst>
+                        <p:par>
+                          <p:cTn id="8" fill="hold">
+                            <p:stCondLst>
+                              <p:cond delay="0"/>
+                            </p:stCondLst>
+                            <p:childTnLst>
+                              <p:par>
+                                <p:cTn id="9" presetID="1" presetClass="entr" presetSubtype="0" fill="hold" nodeType="clickEffect">
+                                  <p:stCondLst>
+                                    <p:cond delay="0"/>
+                                  </p:stCondLst>
+                                  <p:childTnLst>
+                                    <p:set>
+                                      <p:cBhvr>
+                                        <p:cTn id="10" dur="1" fill="hold">
+                                          <p:stCondLst>
+                                            <p:cond delay="0"/>
+                                          </p:stCondLst>
+                                        </p:cTn>
+                                        <p:tgtEl>
+                                          <p:spTgt spid="3">
+                                            <p:txEl>
+                                              <p:pRg st="2" end="2"/>
+                                            </p:txEl>
+                                          </p:spTgt>
+                                        </p:tgtEl>
+                                        <p:attrNameLst>
+                                          <p:attrName>style.visibility</p:attrName>
+                                        </p:attrNameLst>
+                                      </p:cBhvr>
+                                      <p:to>
+                                        <p:strVal val="visible"/>
+                                      </p:to>
+                                    </p:set>
+                                  </p:childTnLst>
+                                </p:cTn>
+                              </p:par>
+                            </p:childTnLst>
+                          </p:cTn>
+                        </p:par>
+                      </p:childTnLst>
+                    </p:cTn>
+                  </p:par>
+                  <p:par>
+                    <p:cTn id="11" fill="hold">
+                      <p:stCondLst>
+                        <p:cond delay="indefinite"/>
+                      </p:stCondLst>
+                      <p:childTnLst>
+                        <p:par>
+                          <p:cTn id="12" fill="hold">
+                            <p:stCondLst>
+                              <p:cond delay="0"/>
+                            </p:stCondLst>
+                            <p:childTnLst>
+                              <p:par>
+                                <p:cTn id="13" presetID="1" presetClass="entr" presetSubtype="0" fill="hold" nodeType="clickEffect">
+                                  <p:stCondLst>
+                                    <p:cond delay="0"/>
+                                  </p:stCondLst>
+                                  <p:childTnLst>
+                                    <p:set>
+                                      <p:cBhvr>
+                                        <p:cTn id="14" dur="1" fill="hold">
+                                          <p:stCondLst>
+                                            <p:cond delay="0"/>
+                                          </p:stCondLst>
+                                        </p:cTn>
+                                        <p:tgtEl>
+                                          <p:spTgt spid="3">
+                                            <p:txEl>
+                                              <p:pRg st="3" end="3"/>
+                                            </p:txEl>
+                                          </p:spTgt>
+                                        </p:tgtEl>
+                                        <p:attrNameLst>
+                                          <p:attrName>style.visibility</p:attrName>
+                                        </p:attrNameLst>
+                                      </p:cBhvr>
+                                      <p:to>
+                                        <p:strVal val="visible"/>
+                                      </p:to>
+                                    </p:set>
+                                  </p:childTnLst>
+                                </p:cTn>
+                              </p:par>
+                              <p:par>
+                                <p:cTn id="15" presetID="1" presetClass="entr" presetSubtype="0" fill="hold" nodeType="withEffect">
+                                  <p:stCondLst>
+                                    <p:cond delay="0"/>
+                                  </p:stCondLst>
+                                  <p:childTnLst>
+                                    <p:set>
+                                      <p:cBhvr>
+                                        <p:cTn id="16" dur="1" fill="hold">
+                                          <p:stCondLst>
+                                            <p:cond delay="0"/>
+                                          </p:stCondLst>
+                                        </p:cTn>
+                                        <p:tgtEl>
+                                          <p:spTgt spid="5"/>
+                                        </p:tgtEl>
+                                        <p:attrNameLst>
+                                          <p:attrName>style.visibility</p:attrName>
+                                        </p:attrNameLst>
+                                      </p:cBhvr>
+                                      <p:to>
+                                        <p:strVal val="visible"/>
+                                      </p:to>
+                                    </p:set>
+                                  </p:childTnLst>
+                                </p:cTn>
+                              </p:par>
+                            </p:childTnLst>
+                          </p:cTn>
+                        </p:par>
+                      </p:childTnLst>
+                    </p:cTn>
+                  </p:par>
+                  <p:par>
+                    <p:cTn id="17" fill="hold">
+                      <p:stCondLst>
+                        <p:cond delay="indefinite"/>
+                      </p:stCondLst>
+                      <p:childTnLst>
+                        <p:par>
+                          <p:cTn id="18" fill="hold">
+                            <p:stCondLst>
+                              <p:cond delay="0"/>
+                            </p:stCondLst>
+                            <p:childTnLst>
+                              <p:par>
+                                <p:cTn id="19" presetID="1" presetClass="entr" presetSubtype="0" fill="hold" nodeType="clickEffect">
+                                  <p:stCondLst>
+                                    <p:cond delay="0"/>
+                                  </p:stCondLst>
+                                  <p:childTnLst>
+                                    <p:set>
+                                      <p:cBhvr>
+                                        <p:cTn id="20" dur="1" fill="hold">
+                                          <p:stCondLst>
+                                            <p:cond delay="0"/>
+                                          </p:stCondLst>
+                                        </p:cTn>
+                                        <p:tgtEl>
+                                          <p:spTgt spid="3">
+                                            <p:txEl>
+                                              <p:pRg st="4" end="4"/>
+                                            </p:txEl>
+                                          </p:spTgt>
+                                        </p:tgtEl>
+                                        <p:attrNameLst>
+                                          <p:attrName>style.visibility</p:attrName>
+                                        </p:attrNameLst>
+                                      </p:cBhvr>
+                                      <p:to>
+                                        <p:strVal val="visible"/>
+                                      </p:to>
+                                    </p:set>
+                                  </p:childTnLst>
+                                </p:cTn>
+                              </p:par>
+                            </p:childTnLst>
+                          </p:cTn>
+                        </p:par>
+                      </p:childTnLst>
+                    </p:cTn>
+                  </p:par>
+                  <p:par>
+                    <p:cTn id="21" fill="hold">
+                      <p:stCondLst>
+                        <p:cond delay="indefinite"/>
+                      </p:stCondLst>
+                      <p:childTnLst>
+                        <p:par>
+                          <p:cTn id="22" fill="hold">
+                            <p:stCondLst>
+                              <p:cond delay="0"/>
+                            </p:stCondLst>
+                            <p:childTnLst>
+                              <p:par>
+                                <p:cTn id="23" presetID="1" presetClass="entr" presetSubtype="0" fill="hold" nodeType="clickEffect">
+                                  <p:stCondLst>
+                                    <p:cond delay="0"/>
+                                  </p:stCondLst>
+                                  <p:childTnLst>
+                                    <p:set>
+                                      <p:cBhvr>
+                                        <p:cTn id="24" dur="1" fill="hold">
+                                          <p:stCondLst>
+                                            <p:cond delay="0"/>
+                                          </p:stCondLst>
+                                        </p:cTn>
+                                        <p:tgtEl>
+                                          <p:spTgt spid="3">
+                                            <p:txEl>
+                                              <p:pRg st="5" end="5"/>
+                                            </p:txEl>
+                                          </p:spTgt>
+                                        </p:tgtEl>
+                                        <p:attrNameLst>
+                                          <p:attrName>style.visibility</p:attrName>
+                                        </p:attrNameLst>
+                                      </p:cBhvr>
+                                      <p:to>
+                                        <p:strVal val="visible"/>
+                                      </p:to>
+                                    </p:set>
+                                  </p:childTnLst>
+                                </p:cTn>
+                              </p:par>
+                            </p:childTnLst>
+                          </p:cTn>
+                        </p:par>
+                      </p:childTnLst>
+                    </p:cTn>
+                  </p:par>
+                </p:childTnLst>
+              </p:cTn>
+              <p:prevCondLst>
+                <p:cond evt="onPrev" delay="0">
+                  <p:tgtEl>
+                    <p:sldTgt/>
+                  </p:tgtEl>
+                </p:cond>
+              </p:prevCondLst>
+              <p:nextCondLst>
+                <p:cond evt="onNext" delay="0">
+                  <p:tgtEl>
+                    <p:sldTgt/>
+                  </p:tgtEl>
+                </p:cond>
+              </p:nextCondLst>
+            </p:seq>
+          </p:childTnLst>
+        </p:cTn>
+      </p:par>
+    </p:tnLst>
+  </p:timing>
+</p:sld>
+</file>
+
+<file path=ppt/slides/slide37.xml><?xml version="1.0" encoding="utf-8"?>
+<p:sld xmlns:a="http://schemas.openxmlformats.org/drawingml/2006/main" xmlns:r="http://schemas.openxmlformats.org/officeDocument/2006/relationships" xmlns:p="http://schemas.openxmlformats.org/presentationml/2006/main">
+  <p:cSld>
+    <p:spTree>
+      <p:nvGrpSpPr>
+        <p:cNvPr id="1" name=""/>
+        <p:cNvGrpSpPr/>
+        <p:nvPr/>
+      </p:nvGrpSpPr>
+      <p:grpSpPr>
+        <a:xfrm>
+          <a:off x="0" y="0"/>
+          <a:ext cx="0" cy="0"/>
+          <a:chOff x="0" y="0"/>
+          <a:chExt cx="0" cy="0"/>
+        </a:xfrm>
+      </p:grpSpPr>
+      <p:sp>
+        <p:nvSpPr>
+          <p:cNvPr id="3" name="Content Placeholder 2">
+            <a:extLst>
+              <a:ext uri="{FF2B5EF4-FFF2-40B4-BE49-F238E27FC236}">
+                <a16:creationId xmlns:a16="http://schemas.microsoft.com/office/drawing/2014/main" id="{258E6AF3-7615-4BD1-878E-A94C93E98F90}"/>
+              </a:ext>
+            </a:extLst>
+          </p:cNvPr>
+          <p:cNvSpPr>
+            <a:spLocks noGrp="1"/>
+          </p:cNvSpPr>
+          <p:nvPr>
+            <p:ph idx="1"/>
+          </p:nvPr>
+        </p:nvSpPr>
+        <p:spPr>
+          <a:xfrm>
+            <a:off x="640237" y="1154757"/>
+            <a:ext cx="5128967" cy="5436747"/>
+          </a:xfrm>
+        </p:spPr>
+        <p:txBody>
+          <a:bodyPr>
+            <a:normAutofit/>
+          </a:bodyPr>
+          <a:lstStyle/>
+          <a:p>
+            <a:pPr marL="0" indent="0">
+              <a:buNone/>
+            </a:pPr>
+            <a:r>
+              <a:rPr lang="en-US" dirty="0"/>
+              <a:t>Correlations alone can be misleading</a:t>
+            </a:r>
+          </a:p>
+          <a:p>
+            <a:r>
+              <a:rPr lang="en-US" dirty="0"/>
+              <a:t>Can eating chocolate help you win a Nobel prize?</a:t>
+            </a:r>
+          </a:p>
+          <a:p>
+            <a:r>
+              <a:rPr lang="en-US" dirty="0"/>
+              <a:t>Consider log chocolate consumption and log Nobel prizes for 18 countries  </a:t>
+            </a:r>
+          </a:p>
+          <a:p>
+            <a:r>
+              <a:rPr lang="en-US" dirty="0"/>
+              <a:t>The high correlation between these variables looks promising!</a:t>
+            </a:r>
+          </a:p>
+        </p:txBody>
+      </p:sp>
+      <p:sp>
+        <p:nvSpPr>
+          <p:cNvPr id="6" name="Title 1">
+            <a:extLst>
+              <a:ext uri="{FF2B5EF4-FFF2-40B4-BE49-F238E27FC236}">
+                <a16:creationId xmlns:a16="http://schemas.microsoft.com/office/drawing/2014/main" id="{CD29F70F-B868-451B-A65D-8721F4C7A2D9}"/>
+              </a:ext>
+            </a:extLst>
+          </p:cNvPr>
+          <p:cNvSpPr txBox="1">
+            <a:spLocks/>
+          </p:cNvSpPr>
+          <p:nvPr/>
+        </p:nvSpPr>
+        <p:spPr>
+          <a:xfrm>
+            <a:off x="838200" y="-635"/>
+            <a:ext cx="10515600" cy="1325563"/>
+          </a:xfrm>
+          <a:prstGeom prst="rect">
+            <a:avLst/>
+          </a:prstGeom>
+        </p:spPr>
+        <p:txBody>
+          <a:bodyPr vert="horz" lIns="91440" tIns="45720" rIns="91440" bIns="45720" rtlCol="0" anchor="ctr">
+            <a:normAutofit/>
+          </a:bodyPr>
+          <a:lstStyle>
+            <a:lvl1pPr algn="l" defTabSz="914400" rtl="0" eaLnBrk="1" latinLnBrk="0" hangingPunct="1">
+              <a:lnSpc>
+                <a:spcPct val="90000"/>
+              </a:lnSpc>
+              <a:spcBef>
+                <a:spcPct val="0"/>
+              </a:spcBef>
+              <a:buNone/>
+              <a:defRPr sz="4400" kern="1200">
+                <a:solidFill>
+                  <a:schemeClr val="tx1"/>
+                </a:solidFill>
+                <a:latin typeface="+mj-lt"/>
+                <a:ea typeface="+mj-ea"/>
+                <a:cs typeface="+mj-cs"/>
+              </a:defRPr>
+            </a:lvl1pPr>
+          </a:lstStyle>
+          <a:p>
+            <a:r>
+              <a:rPr lang="en-US" dirty="0">
+                <a:latin typeface="+mn-lt"/>
+              </a:rPr>
+              <a:t>Pitfalls of Data Mining </a:t>
+            </a:r>
+          </a:p>
+        </p:txBody>
+      </p:sp>
+      <p:pic>
+        <p:nvPicPr>
+          <p:cNvPr id="5" name="Picture 4">
+            <a:extLst>
+              <a:ext uri="{FF2B5EF4-FFF2-40B4-BE49-F238E27FC236}">
+                <a16:creationId xmlns:a16="http://schemas.microsoft.com/office/drawing/2014/main" id="{8C9B9E92-634C-5E76-1042-2328B2EE110F}"/>
+              </a:ext>
+            </a:extLst>
+          </p:cNvPr>
+          <p:cNvPicPr>
+            <a:picLocks noChangeAspect="1"/>
+          </p:cNvPicPr>
+          <p:nvPr/>
+        </p:nvPicPr>
+        <p:blipFill>
+          <a:blip r:embed="rId2"/>
+          <a:stretch>
+            <a:fillRect/>
+          </a:stretch>
+        </p:blipFill>
+        <p:spPr>
+          <a:xfrm>
+            <a:off x="5557101" y="947184"/>
+            <a:ext cx="6523348" cy="5800645"/>
+          </a:xfrm>
+          <a:prstGeom prst="rect">
+            <a:avLst/>
+          </a:prstGeom>
+        </p:spPr>
+      </p:pic>
+      <p:pic>
+        <p:nvPicPr>
+          <p:cNvPr id="8" name="Picture 7">
+            <a:extLst>
+              <a:ext uri="{FF2B5EF4-FFF2-40B4-BE49-F238E27FC236}">
+                <a16:creationId xmlns:a16="http://schemas.microsoft.com/office/drawing/2014/main" id="{9B2BF97A-70C9-E5C8-51F8-B2FDF82ABF0D}"/>
+              </a:ext>
+            </a:extLst>
+          </p:cNvPr>
+          <p:cNvPicPr>
+            <a:picLocks noChangeAspect="1"/>
+          </p:cNvPicPr>
+          <p:nvPr/>
+        </p:nvPicPr>
+        <p:blipFill>
+          <a:blip r:embed="rId3"/>
+          <a:stretch>
+            <a:fillRect/>
+          </a:stretch>
+        </p:blipFill>
+        <p:spPr>
+          <a:xfrm>
+            <a:off x="8305880" y="4849291"/>
+            <a:ext cx="3290728" cy="1061525"/>
+          </a:xfrm>
+          <a:prstGeom prst="rect">
+            <a:avLst/>
+          </a:prstGeom>
+        </p:spPr>
+      </p:pic>
+    </p:spTree>
+    <p:extLst>
+      <p:ext uri="{BB962C8B-B14F-4D97-AF65-F5344CB8AC3E}">
+        <p14:creationId xmlns:p14="http://schemas.microsoft.com/office/powerpoint/2010/main" val="2245637609"/>
+      </p:ext>
+    </p:extLst>
+  </p:cSld>
+  <p:clrMapOvr>
+    <a:masterClrMapping/>
+  </p:clrMapOvr>
+  <p:timing>
+    <p:tnLst>
+      <p:par>
+        <p:cTn id="1" dur="indefinite" restart="never" nodeType="tmRoot">
+          <p:childTnLst>
+            <p:seq concurrent="1" nextAc="seek">
+              <p:cTn id="2" dur="indefinite" nodeType="mainSeq">
+                <p:childTnLst>
+                  <p:par>
+                    <p:cTn id="3" fill="hold">
+                      <p:stCondLst>
+                        <p:cond delay="indefinite"/>
+                      </p:stCondLst>
+                      <p:childTnLst>
+                        <p:par>
+                          <p:cTn id="4" fill="hold">
+                            <p:stCondLst>
+                              <p:cond delay="0"/>
+                            </p:stCondLst>
+                            <p:childTnLst>
+                              <p:par>
+                                <p:cTn id="5" presetID="1" presetClass="entr" presetSubtype="0" fill="hold" nodeType="clickEffect">
+                                  <p:stCondLst>
+                                    <p:cond delay="0"/>
+                                  </p:stCondLst>
+                                  <p:childTnLst>
+                                    <p:set>
+                                      <p:cBhvr>
+                                        <p:cTn id="6" dur="1" fill="hold">
+                                          <p:stCondLst>
+                                            <p:cond delay="0"/>
+                                          </p:stCondLst>
+                                        </p:cTn>
+                                        <p:tgtEl>
+                                          <p:spTgt spid="3">
+                                            <p:txEl>
+                                              <p:pRg st="1" end="1"/>
+                                            </p:txEl>
+                                          </p:spTgt>
+                                        </p:tgtEl>
+                                        <p:attrNameLst>
+                                          <p:attrName>style.visibility</p:attrName>
+                                        </p:attrNameLst>
+                                      </p:cBhvr>
+                                      <p:to>
+                                        <p:strVal val="visible"/>
+                                      </p:to>
+                                    </p:set>
+                                  </p:childTnLst>
+                                </p:cTn>
+                              </p:par>
+                            </p:childTnLst>
+                          </p:cTn>
+                        </p:par>
+                      </p:childTnLst>
+                    </p:cTn>
+                  </p:par>
+                  <p:par>
+                    <p:cTn id="7" fill="hold">
+                      <p:stCondLst>
+                        <p:cond delay="indefinite"/>
+                      </p:stCondLst>
+                      <p:childTnLst>
+                        <p:par>
+                          <p:cTn id="8" fill="hold">
+                            <p:stCondLst>
+                              <p:cond delay="0"/>
+                            </p:stCondLst>
+                            <p:childTnLst>
+                              <p:par>
+                                <p:cTn id="9" presetID="1" presetClass="entr" presetSubtype="0" fill="hold" nodeType="clickEffect">
+                                  <p:stCondLst>
+                                    <p:cond delay="0"/>
+                                  </p:stCondLst>
+                                  <p:childTnLst>
+                                    <p:set>
+                                      <p:cBhvr>
+                                        <p:cTn id="10" dur="1" fill="hold">
+                                          <p:stCondLst>
+                                            <p:cond delay="0"/>
+                                          </p:stCondLst>
+                                        </p:cTn>
+                                        <p:tgtEl>
+                                          <p:spTgt spid="3">
+                                            <p:txEl>
+                                              <p:pRg st="2" end="2"/>
+                                            </p:txEl>
+                                          </p:spTgt>
+                                        </p:tgtEl>
+                                        <p:attrNameLst>
+                                          <p:attrName>style.visibility</p:attrName>
+                                        </p:attrNameLst>
+                                      </p:cBhvr>
+                                      <p:to>
+                                        <p:strVal val="visible"/>
+                                      </p:to>
+                                    </p:set>
+                                  </p:childTnLst>
+                                </p:cTn>
+                              </p:par>
+                              <p:par>
+                                <p:cTn id="11" presetID="1" presetClass="entr" presetSubtype="0" fill="hold" nodeType="withEffect">
+                                  <p:stCondLst>
+                                    <p:cond delay="0"/>
+                                  </p:stCondLst>
+                                  <p:childTnLst>
+                                    <p:set>
+                                      <p:cBhvr>
+                                        <p:cTn id="12" dur="1" fill="hold">
+                                          <p:stCondLst>
+                                            <p:cond delay="0"/>
+                                          </p:stCondLst>
+                                        </p:cTn>
+                                        <p:tgtEl>
+                                          <p:spTgt spid="5"/>
+                                        </p:tgtEl>
+                                        <p:attrNameLst>
+                                          <p:attrName>style.visibility</p:attrName>
+                                        </p:attrNameLst>
+                                      </p:cBhvr>
+                                      <p:to>
+                                        <p:strVal val="visible"/>
+                                      </p:to>
+                                    </p:set>
+                                  </p:childTnLst>
+                                </p:cTn>
+                              </p:par>
+                            </p:childTnLst>
+                          </p:cTn>
+                        </p:par>
+                      </p:childTnLst>
+                    </p:cTn>
+                  </p:par>
+                  <p:par>
+                    <p:cTn id="13" fill="hold">
+                      <p:stCondLst>
+                        <p:cond delay="indefinite"/>
+                      </p:stCondLst>
+                      <p:childTnLst>
+                        <p:par>
+                          <p:cTn id="14" fill="hold">
+                            <p:stCondLst>
+                              <p:cond delay="0"/>
+                            </p:stCondLst>
+                            <p:childTnLst>
+                              <p:par>
+                                <p:cTn id="15" presetID="1" presetClass="entr" presetSubtype="0" fill="hold" nodeType="clickEffect">
+                                  <p:stCondLst>
+                                    <p:cond delay="0"/>
+                                  </p:stCondLst>
+                                  <p:childTnLst>
+                                    <p:set>
+                                      <p:cBhvr>
+                                        <p:cTn id="16" dur="1" fill="hold">
+                                          <p:stCondLst>
+                                            <p:cond delay="0"/>
+                                          </p:stCondLst>
+                                        </p:cTn>
+                                        <p:tgtEl>
+                                          <p:spTgt spid="3">
+                                            <p:txEl>
+                                              <p:pRg st="3" end="3"/>
+                                            </p:txEl>
+                                          </p:spTgt>
+                                        </p:tgtEl>
+                                        <p:attrNameLst>
+                                          <p:attrName>style.visibility</p:attrName>
+                                        </p:attrNameLst>
+                                      </p:cBhvr>
+                                      <p:to>
+                                        <p:strVal val="visible"/>
+                                      </p:to>
+                                    </p:set>
+                                  </p:childTnLst>
+                                </p:cTn>
+                              </p:par>
+                              <p:par>
+                                <p:cTn id="17" presetID="1" presetClass="entr" presetSubtype="0" fill="hold" nodeType="withEffect">
+                                  <p:stCondLst>
+                                    <p:cond delay="0"/>
+                                  </p:stCondLst>
+                                  <p:childTnLst>
+                                    <p:set>
+                                      <p:cBhvr>
+                                        <p:cTn id="18" dur="1" fill="hold">
+                                          <p:stCondLst>
+                                            <p:cond delay="0"/>
+                                          </p:stCondLst>
+                                        </p:cTn>
+                                        <p:tgtEl>
+                                          <p:spTgt spid="8"/>
+                                        </p:tgtEl>
+                                        <p:attrNameLst>
+                                          <p:attrName>style.visibility</p:attrName>
+                                        </p:attrNameLst>
+                                      </p:cBhvr>
+                                      <p:to>
+                                        <p:strVal val="visible"/>
+                                      </p:to>
+                                    </p:set>
+                                  </p:childTnLst>
+                                </p:cTn>
+                              </p:par>
+                            </p:childTnLst>
+                          </p:cTn>
+                        </p:par>
+                      </p:childTnLst>
+                    </p:cTn>
+                  </p:par>
+                </p:childTnLst>
+              </p:cTn>
+              <p:prevCondLst>
+                <p:cond evt="onPrev" delay="0">
+                  <p:tgtEl>
+                    <p:sldTgt/>
+                  </p:tgtEl>
+                </p:cond>
+              </p:prevCondLst>
+              <p:nextCondLst>
+                <p:cond evt="onNext" delay="0">
+                  <p:tgtEl>
+                    <p:sldTgt/>
+                  </p:tgtEl>
+                </p:cond>
+              </p:nextCondLst>
+            </p:seq>
+          </p:childTnLst>
+        </p:cTn>
+      </p:par>
+    </p:tnLst>
+  </p:timing>
+</p:sld>
+</file>
+
+<file path=ppt/slides/slide38.xml><?xml version="1.0" encoding="utf-8"?>
+<p:sld xmlns:a="http://schemas.openxmlformats.org/drawingml/2006/main" xmlns:r="http://schemas.openxmlformats.org/officeDocument/2006/relationships" xmlns:p="http://schemas.openxmlformats.org/presentationml/2006/main">
+  <p:cSld>
+    <p:spTree>
+      <p:nvGrpSpPr>
+        <p:cNvPr id="1" name=""/>
+        <p:cNvGrpSpPr/>
+        <p:nvPr/>
+      </p:nvGrpSpPr>
+      <p:grpSpPr>
+        <a:xfrm>
+          <a:off x="0" y="0"/>
+          <a:ext cx="0" cy="0"/>
+          <a:chOff x="0" y="0"/>
+          <a:chExt cx="0" cy="0"/>
+        </a:xfrm>
+      </p:grpSpPr>
+      <p:sp>
+        <p:nvSpPr>
+          <p:cNvPr id="3" name="Content Placeholder 2">
+            <a:extLst>
+              <a:ext uri="{FF2B5EF4-FFF2-40B4-BE49-F238E27FC236}">
+                <a16:creationId xmlns:a16="http://schemas.microsoft.com/office/drawing/2014/main" id="{258E6AF3-7615-4BD1-878E-A94C93E98F90}"/>
+              </a:ext>
+            </a:extLst>
+          </p:cNvPr>
+          <p:cNvSpPr>
+            <a:spLocks noGrp="1"/>
+          </p:cNvSpPr>
+          <p:nvPr>
+            <p:ph idx="1"/>
+          </p:nvPr>
+        </p:nvSpPr>
+        <p:spPr>
+          <a:xfrm>
+            <a:off x="640237" y="1154757"/>
+            <a:ext cx="5128967" cy="5436747"/>
+          </a:xfrm>
+        </p:spPr>
+        <p:txBody>
+          <a:bodyPr>
+            <a:normAutofit/>
+          </a:bodyPr>
+          <a:lstStyle/>
+          <a:p>
+            <a:pPr marL="0" indent="0">
+              <a:buNone/>
+            </a:pPr>
+            <a:r>
+              <a:rPr lang="en-US" dirty="0"/>
+              <a:t>Correlations alone can be misleading</a:t>
+            </a:r>
+          </a:p>
+          <a:p>
+            <a:r>
+              <a:rPr lang="en-US" dirty="0"/>
+              <a:t>Log of GDP is also a good predictor of  winning Nobel prizes    </a:t>
+            </a:r>
+          </a:p>
+          <a:p>
+            <a:r>
+              <a:rPr lang="en-US" dirty="0"/>
+              <a:t>And with a high correlation</a:t>
+            </a:r>
+          </a:p>
+        </p:txBody>
+      </p:sp>
+      <p:sp>
+        <p:nvSpPr>
+          <p:cNvPr id="6" name="Title 1">
+            <a:extLst>
+              <a:ext uri="{FF2B5EF4-FFF2-40B4-BE49-F238E27FC236}">
+                <a16:creationId xmlns:a16="http://schemas.microsoft.com/office/drawing/2014/main" id="{CD29F70F-B868-451B-A65D-8721F4C7A2D9}"/>
+              </a:ext>
+            </a:extLst>
+          </p:cNvPr>
+          <p:cNvSpPr txBox="1">
+            <a:spLocks/>
+          </p:cNvSpPr>
+          <p:nvPr/>
+        </p:nvSpPr>
+        <p:spPr>
+          <a:xfrm>
+            <a:off x="838200" y="-635"/>
+            <a:ext cx="10515600" cy="1325563"/>
+          </a:xfrm>
+          <a:prstGeom prst="rect">
+            <a:avLst/>
+          </a:prstGeom>
+        </p:spPr>
+        <p:txBody>
+          <a:bodyPr vert="horz" lIns="91440" tIns="45720" rIns="91440" bIns="45720" rtlCol="0" anchor="ctr">
+            <a:normAutofit/>
+          </a:bodyPr>
+          <a:lstStyle>
+            <a:lvl1pPr algn="l" defTabSz="914400" rtl="0" eaLnBrk="1" latinLnBrk="0" hangingPunct="1">
+              <a:lnSpc>
+                <a:spcPct val="90000"/>
+              </a:lnSpc>
+              <a:spcBef>
+                <a:spcPct val="0"/>
+              </a:spcBef>
+              <a:buNone/>
+              <a:defRPr sz="4400" kern="1200">
+                <a:solidFill>
+                  <a:schemeClr val="tx1"/>
+                </a:solidFill>
+                <a:latin typeface="+mj-lt"/>
+                <a:ea typeface="+mj-ea"/>
+                <a:cs typeface="+mj-cs"/>
+              </a:defRPr>
+            </a:lvl1pPr>
+          </a:lstStyle>
+          <a:p>
+            <a:r>
+              <a:rPr lang="en-US" dirty="0">
+                <a:latin typeface="+mn-lt"/>
+              </a:rPr>
+              <a:t>Pitfalls of Data Mining </a:t>
+            </a:r>
+          </a:p>
+        </p:txBody>
+      </p:sp>
+      <p:pic>
+        <p:nvPicPr>
+          <p:cNvPr id="4" name="Picture 3">
+            <a:extLst>
+              <a:ext uri="{FF2B5EF4-FFF2-40B4-BE49-F238E27FC236}">
+                <a16:creationId xmlns:a16="http://schemas.microsoft.com/office/drawing/2014/main" id="{F84BEE28-3651-C39F-DB99-013247C132EC}"/>
+              </a:ext>
+            </a:extLst>
+          </p:cNvPr>
+          <p:cNvPicPr>
+            <a:picLocks noChangeAspect="1"/>
+          </p:cNvPicPr>
+          <p:nvPr/>
+        </p:nvPicPr>
+        <p:blipFill>
+          <a:blip r:embed="rId2"/>
+          <a:stretch>
+            <a:fillRect/>
+          </a:stretch>
+        </p:blipFill>
+        <p:spPr>
+          <a:xfrm>
+            <a:off x="5820426" y="1036948"/>
+            <a:ext cx="6210253" cy="5476973"/>
+          </a:xfrm>
+          <a:prstGeom prst="rect">
+            <a:avLst/>
+          </a:prstGeom>
+        </p:spPr>
+      </p:pic>
+      <p:pic>
+        <p:nvPicPr>
+          <p:cNvPr id="9" name="Picture 8">
+            <a:extLst>
+              <a:ext uri="{FF2B5EF4-FFF2-40B4-BE49-F238E27FC236}">
+                <a16:creationId xmlns:a16="http://schemas.microsoft.com/office/drawing/2014/main" id="{457DC88A-6B3E-6B20-44EA-5D2B0F437810}"/>
+              </a:ext>
+            </a:extLst>
+          </p:cNvPr>
+          <p:cNvPicPr>
+            <a:picLocks noChangeAspect="1"/>
+          </p:cNvPicPr>
+          <p:nvPr/>
+        </p:nvPicPr>
+        <p:blipFill>
+          <a:blip r:embed="rId3"/>
+          <a:stretch>
+            <a:fillRect/>
+          </a:stretch>
+        </p:blipFill>
+        <p:spPr>
+          <a:xfrm>
+            <a:off x="7390615" y="5076772"/>
+            <a:ext cx="4582760" cy="838548"/>
+          </a:xfrm>
+          <a:prstGeom prst="rect">
+            <a:avLst/>
+          </a:prstGeom>
+        </p:spPr>
+      </p:pic>
+    </p:spTree>
+    <p:extLst>
+      <p:ext uri="{BB962C8B-B14F-4D97-AF65-F5344CB8AC3E}">
+        <p14:creationId xmlns:p14="http://schemas.microsoft.com/office/powerpoint/2010/main" val="277908670"/>
+      </p:ext>
+    </p:extLst>
+  </p:cSld>
+  <p:clrMapOvr>
+    <a:masterClrMapping/>
+  </p:clrMapOvr>
+  <p:timing>
+    <p:tnLst>
+      <p:par>
+        <p:cTn id="1" dur="indefinite" restart="never" nodeType="tmRoot">
+          <p:childTnLst>
+            <p:seq concurrent="1" nextAc="seek">
+              <p:cTn id="2" dur="indefinite" nodeType="mainSeq">
+                <p:childTnLst>
+                  <p:par>
+                    <p:cTn id="3" fill="hold">
+                      <p:stCondLst>
+                        <p:cond delay="indefinite"/>
+                      </p:stCondLst>
+                      <p:childTnLst>
+                        <p:par>
+                          <p:cTn id="4" fill="hold">
+                            <p:stCondLst>
+                              <p:cond delay="0"/>
+                            </p:stCondLst>
+                            <p:childTnLst>
+                              <p:par>
+                                <p:cTn id="5" presetID="1" presetClass="entr" presetSubtype="0" fill="hold" nodeType="clickEffect">
+                                  <p:stCondLst>
+                                    <p:cond delay="0"/>
+                                  </p:stCondLst>
+                                  <p:childTnLst>
+                                    <p:set>
+                                      <p:cBhvr>
+                                        <p:cTn id="6" dur="1" fill="hold">
+                                          <p:stCondLst>
+                                            <p:cond delay="0"/>
+                                          </p:stCondLst>
+                                        </p:cTn>
+                                        <p:tgtEl>
+                                          <p:spTgt spid="3">
+                                            <p:txEl>
+                                              <p:pRg st="1" end="1"/>
+                                            </p:txEl>
+                                          </p:spTgt>
+                                        </p:tgtEl>
+                                        <p:attrNameLst>
+                                          <p:attrName>style.visibility</p:attrName>
+                                        </p:attrNameLst>
+                                      </p:cBhvr>
+                                      <p:to>
+                                        <p:strVal val="visible"/>
+                                      </p:to>
+                                    </p:set>
+                                  </p:childTnLst>
+                                </p:cTn>
+                              </p:par>
+                              <p:par>
+                                <p:cTn id="7" presetID="1" presetClass="entr" presetSubtype="0" fill="hold" nodeType="withEffect">
+                                  <p:stCondLst>
+                                    <p:cond delay="0"/>
+                                  </p:stCondLst>
+                                  <p:childTnLst>
+                                    <p:set>
+                                      <p:cBhvr>
+                                        <p:cTn id="8" dur="1" fill="hold">
+                                          <p:stCondLst>
+                                            <p:cond delay="0"/>
+                                          </p:stCondLst>
+                                        </p:cTn>
+                                        <p:tgtEl>
+                                          <p:spTgt spid="4"/>
+                                        </p:tgtEl>
+                                        <p:attrNameLst>
+                                          <p:attrName>style.visibility</p:attrName>
+                                        </p:attrNameLst>
+                                      </p:cBhvr>
+                                      <p:to>
+                                        <p:strVal val="visible"/>
+                                      </p:to>
+                                    </p:set>
+                                  </p:childTnLst>
+                                </p:cTn>
+                              </p:par>
+                            </p:childTnLst>
+                          </p:cTn>
+                        </p:par>
+                      </p:childTnLst>
+                    </p:cTn>
+                  </p:par>
+                  <p:par>
+                    <p:cTn id="9" fill="hold">
+                      <p:stCondLst>
+                        <p:cond delay="indefinite"/>
+                      </p:stCondLst>
+                      <p:childTnLst>
+                        <p:par>
+                          <p:cTn id="10" fill="hold">
+                            <p:stCondLst>
+                              <p:cond delay="0"/>
+                            </p:stCondLst>
+                            <p:childTnLst>
+                              <p:par>
+                                <p:cTn id="11" presetID="1" presetClass="entr" presetSubtype="0" fill="hold" nodeType="clickEffect">
+                                  <p:stCondLst>
+                                    <p:cond delay="0"/>
+                                  </p:stCondLst>
+                                  <p:childTnLst>
+                                    <p:set>
+                                      <p:cBhvr>
+                                        <p:cTn id="12" dur="1" fill="hold">
+                                          <p:stCondLst>
+                                            <p:cond delay="0"/>
+                                          </p:stCondLst>
+                                        </p:cTn>
+                                        <p:tgtEl>
+                                          <p:spTgt spid="3">
+                                            <p:txEl>
+                                              <p:pRg st="2" end="2"/>
+                                            </p:txEl>
+                                          </p:spTgt>
+                                        </p:tgtEl>
+                                        <p:attrNameLst>
+                                          <p:attrName>style.visibility</p:attrName>
+                                        </p:attrNameLst>
+                                      </p:cBhvr>
+                                      <p:to>
+                                        <p:strVal val="visible"/>
+                                      </p:to>
+                                    </p:set>
+                                  </p:childTnLst>
+                                </p:cTn>
+                              </p:par>
+                              <p:par>
+                                <p:cTn id="13" presetID="1" presetClass="entr" presetSubtype="0" fill="hold" nodeType="withEffect">
+                                  <p:stCondLst>
+                                    <p:cond delay="0"/>
+                                  </p:stCondLst>
+                                  <p:childTnLst>
+                                    <p:set>
+                                      <p:cBhvr>
+                                        <p:cTn id="14" dur="1" fill="hold">
+                                          <p:stCondLst>
+                                            <p:cond delay="0"/>
+                                          </p:stCondLst>
+                                        </p:cTn>
+                                        <p:tgtEl>
+                                          <p:spTgt spid="9"/>
+                                        </p:tgtEl>
+                                        <p:attrNameLst>
+                                          <p:attrName>style.visibility</p:attrName>
+                                        </p:attrNameLst>
+                                      </p:cBhvr>
+                                      <p:to>
+                                        <p:strVal val="visible"/>
+                                      </p:to>
+                                    </p:set>
+                                  </p:childTnLst>
+                                </p:cTn>
+                              </p:par>
+                            </p:childTnLst>
+                          </p:cTn>
+                        </p:par>
+                      </p:childTnLst>
+                    </p:cTn>
+                  </p:par>
+                </p:childTnLst>
+              </p:cTn>
+              <p:prevCondLst>
+                <p:cond evt="onPrev" delay="0">
+                  <p:tgtEl>
+                    <p:sldTgt/>
+                  </p:tgtEl>
+                </p:cond>
+              </p:prevCondLst>
+              <p:nextCondLst>
+                <p:cond evt="onNext" delay="0">
+                  <p:tgtEl>
+                    <p:sldTgt/>
+                  </p:tgtEl>
+                </p:cond>
+              </p:nextCondLst>
+            </p:seq>
+          </p:childTnLst>
+        </p:cTn>
+      </p:par>
+    </p:tnLst>
+  </p:timing>
+</p:sld>
+</file>
+
+<file path=ppt/slides/slide39.xml><?xml version="1.0" encoding="utf-8"?>
+<p:sld xmlns:a="http://schemas.openxmlformats.org/drawingml/2006/main" xmlns:r="http://schemas.openxmlformats.org/officeDocument/2006/relationships" xmlns:p="http://schemas.openxmlformats.org/presentationml/2006/main">
+  <p:cSld>
+    <p:spTree>
+      <p:nvGrpSpPr>
+        <p:cNvPr id="1" name=""/>
+        <p:cNvGrpSpPr/>
+        <p:nvPr/>
+      </p:nvGrpSpPr>
+      <p:grpSpPr>
+        <a:xfrm>
+          <a:off x="0" y="0"/>
+          <a:ext cx="0" cy="0"/>
+          <a:chOff x="0" y="0"/>
+          <a:chExt cx="0" cy="0"/>
+        </a:xfrm>
+      </p:grpSpPr>
+      <p:sp>
+        <p:nvSpPr>
+          <p:cNvPr id="3" name="Content Placeholder 2">
+            <a:extLst>
+              <a:ext uri="{FF2B5EF4-FFF2-40B4-BE49-F238E27FC236}">
+                <a16:creationId xmlns:a16="http://schemas.microsoft.com/office/drawing/2014/main" id="{258E6AF3-7615-4BD1-878E-A94C93E98F90}"/>
+              </a:ext>
+            </a:extLst>
+          </p:cNvPr>
+          <p:cNvSpPr>
+            <a:spLocks noGrp="1"/>
+          </p:cNvSpPr>
+          <p:nvPr>
+            <p:ph idx="1"/>
+          </p:nvPr>
+        </p:nvSpPr>
+        <p:spPr>
+          <a:xfrm>
+            <a:off x="640237" y="1154757"/>
+            <a:ext cx="5128967" cy="5436747"/>
+          </a:xfrm>
+        </p:spPr>
+        <p:txBody>
+          <a:bodyPr>
+            <a:normAutofit/>
+          </a:bodyPr>
+          <a:lstStyle/>
+          <a:p>
+            <a:pPr marL="0" indent="0">
+              <a:buNone/>
+            </a:pPr>
+            <a:r>
+              <a:rPr lang="en-US" dirty="0"/>
+              <a:t>Correlations alone can be misleading</a:t>
+            </a:r>
+          </a:p>
+          <a:p>
+            <a:r>
+              <a:rPr lang="en-US" dirty="0"/>
+              <a:t>Log of GDP is also a good predictor of  chocolate consumption     </a:t>
+            </a:r>
+          </a:p>
+          <a:p>
+            <a:r>
+              <a:rPr lang="en-US" dirty="0"/>
+              <a:t>And with high correlation</a:t>
+            </a:r>
+          </a:p>
+          <a:p>
+            <a:r>
+              <a:rPr lang="en-US" dirty="0"/>
+              <a:t>This is an example of </a:t>
+            </a:r>
+            <a:r>
+              <a:rPr lang="en-US" b="1" dirty="0">
+                <a:hlinkClick r:id="rId2"/>
+              </a:rPr>
+              <a:t>Simpson’s </a:t>
+            </a:r>
+            <a:r>
+              <a:rPr lang="en-US" b="1" dirty="0" err="1">
+                <a:hlinkClick r:id="rId2"/>
+              </a:rPr>
+              <a:t>pardox</a:t>
+            </a:r>
+            <a:endParaRPr lang="en-US" dirty="0"/>
+          </a:p>
+          <a:p>
+            <a:pPr marL="0" indent="0">
+              <a:buNone/>
+            </a:pPr>
+            <a:r>
+              <a:rPr lang="en-US" sz="2000" dirty="0">
+                <a:solidFill>
+                  <a:schemeClr val="accent1"/>
+                </a:solidFill>
+              </a:rPr>
+              <a:t>Full example and code in </a:t>
+            </a:r>
+            <a:r>
+              <a:rPr lang="en-US" sz="2000" dirty="0" err="1">
+                <a:solidFill>
+                  <a:schemeClr val="accent1"/>
+                </a:solidFill>
+              </a:rPr>
+              <a:t>SupplementaryMaterials</a:t>
+            </a:r>
+            <a:r>
+              <a:rPr lang="en-US" sz="2000" dirty="0">
+                <a:solidFill>
+                  <a:schemeClr val="accent1"/>
+                </a:solidFill>
+              </a:rPr>
+              <a:t> directory of GitHub repositor</a:t>
+            </a:r>
+          </a:p>
+          <a:p>
+            <a:endParaRPr lang="en-US" sz="3200" b="1" dirty="0"/>
+          </a:p>
+          <a:p>
+            <a:endParaRPr lang="en-US" sz="3200" b="1" dirty="0"/>
+          </a:p>
+        </p:txBody>
+      </p:sp>
+      <p:sp>
+        <p:nvSpPr>
+          <p:cNvPr id="6" name="Title 1">
+            <a:extLst>
+              <a:ext uri="{FF2B5EF4-FFF2-40B4-BE49-F238E27FC236}">
+                <a16:creationId xmlns:a16="http://schemas.microsoft.com/office/drawing/2014/main" id="{CD29F70F-B868-451B-A65D-8721F4C7A2D9}"/>
+              </a:ext>
+            </a:extLst>
+          </p:cNvPr>
+          <p:cNvSpPr txBox="1">
+            <a:spLocks/>
+          </p:cNvSpPr>
+          <p:nvPr/>
+        </p:nvSpPr>
+        <p:spPr>
+          <a:xfrm>
+            <a:off x="838200" y="-635"/>
+            <a:ext cx="10515600" cy="1325563"/>
+          </a:xfrm>
+          <a:prstGeom prst="rect">
+            <a:avLst/>
+          </a:prstGeom>
+        </p:spPr>
+        <p:txBody>
+          <a:bodyPr vert="horz" lIns="91440" tIns="45720" rIns="91440" bIns="45720" rtlCol="0" anchor="ctr">
+            <a:normAutofit/>
+          </a:bodyPr>
+          <a:lstStyle>
+            <a:lvl1pPr algn="l" defTabSz="914400" rtl="0" eaLnBrk="1" latinLnBrk="0" hangingPunct="1">
+              <a:lnSpc>
+                <a:spcPct val="90000"/>
+              </a:lnSpc>
+              <a:spcBef>
+                <a:spcPct val="0"/>
+              </a:spcBef>
+              <a:buNone/>
+              <a:defRPr sz="4400" kern="1200">
+                <a:solidFill>
+                  <a:schemeClr val="tx1"/>
+                </a:solidFill>
+                <a:latin typeface="+mj-lt"/>
+                <a:ea typeface="+mj-ea"/>
+                <a:cs typeface="+mj-cs"/>
+              </a:defRPr>
+            </a:lvl1pPr>
+          </a:lstStyle>
+          <a:p>
+            <a:r>
+              <a:rPr lang="en-US" dirty="0">
+                <a:latin typeface="+mn-lt"/>
+              </a:rPr>
+              <a:t>Pitfalls of Data Mining </a:t>
+            </a:r>
+          </a:p>
+        </p:txBody>
+      </p:sp>
+      <p:pic>
+        <p:nvPicPr>
+          <p:cNvPr id="5" name="Picture 4">
+            <a:extLst>
+              <a:ext uri="{FF2B5EF4-FFF2-40B4-BE49-F238E27FC236}">
+                <a16:creationId xmlns:a16="http://schemas.microsoft.com/office/drawing/2014/main" id="{E16E1B14-1F1D-FEA1-B32B-C4BAAAB710A4}"/>
+              </a:ext>
+            </a:extLst>
+          </p:cNvPr>
+          <p:cNvPicPr>
+            <a:picLocks noChangeAspect="1"/>
+          </p:cNvPicPr>
+          <p:nvPr/>
+        </p:nvPicPr>
+        <p:blipFill>
+          <a:blip r:embed="rId3"/>
+          <a:stretch>
+            <a:fillRect/>
+          </a:stretch>
+        </p:blipFill>
+        <p:spPr>
+          <a:xfrm>
+            <a:off x="5715363" y="1097361"/>
+            <a:ext cx="6275532" cy="5565527"/>
+          </a:xfrm>
+          <a:prstGeom prst="rect">
+            <a:avLst/>
+          </a:prstGeom>
+        </p:spPr>
+      </p:pic>
+      <p:pic>
+        <p:nvPicPr>
+          <p:cNvPr id="8" name="Picture 7">
+            <a:extLst>
+              <a:ext uri="{FF2B5EF4-FFF2-40B4-BE49-F238E27FC236}">
+                <a16:creationId xmlns:a16="http://schemas.microsoft.com/office/drawing/2014/main" id="{32AE6293-4F1B-A5AC-D8C8-2E3FD8A4C6CC}"/>
+              </a:ext>
+            </a:extLst>
+          </p:cNvPr>
+          <p:cNvPicPr>
+            <a:picLocks noChangeAspect="1"/>
+          </p:cNvPicPr>
+          <p:nvPr/>
+        </p:nvPicPr>
+        <p:blipFill>
+          <a:blip r:embed="rId4"/>
+          <a:stretch>
+            <a:fillRect/>
+          </a:stretch>
+        </p:blipFill>
+        <p:spPr>
+          <a:xfrm>
+            <a:off x="6231197" y="1375204"/>
+            <a:ext cx="3627434" cy="666808"/>
+          </a:xfrm>
+          <a:prstGeom prst="rect">
+            <a:avLst/>
+          </a:prstGeom>
+        </p:spPr>
+      </p:pic>
+    </p:spTree>
+    <p:extLst>
+      <p:ext uri="{BB962C8B-B14F-4D97-AF65-F5344CB8AC3E}">
+        <p14:creationId xmlns:p14="http://schemas.microsoft.com/office/powerpoint/2010/main" val="759576278"/>
+      </p:ext>
+    </p:extLst>
+  </p:cSld>
+  <p:clrMapOvr>
+    <a:masterClrMapping/>
+  </p:clrMapOvr>
+  <p:timing>
+    <p:tnLst>
+      <p:par>
+        <p:cTn id="1" dur="indefinite" restart="never" nodeType="tmRoot">
+          <p:childTnLst>
+            <p:seq concurrent="1" nextAc="seek">
+              <p:cTn id="2" dur="indefinite" nodeType="mainSeq">
+                <p:childTnLst>
+                  <p:par>
+                    <p:cTn id="3" fill="hold">
+                      <p:stCondLst>
+                        <p:cond delay="indefinite"/>
+                      </p:stCondLst>
+                      <p:childTnLst>
+                        <p:par>
+                          <p:cTn id="4" fill="hold">
+                            <p:stCondLst>
+                              <p:cond delay="0"/>
+                            </p:stCondLst>
+                            <p:childTnLst>
+                              <p:par>
+                                <p:cTn id="5" presetID="1" presetClass="entr" presetSubtype="0" fill="hold" nodeType="clickEffect">
+                                  <p:stCondLst>
+                                    <p:cond delay="0"/>
+                                  </p:stCondLst>
+                                  <p:childTnLst>
+                                    <p:set>
+                                      <p:cBhvr>
+                                        <p:cTn id="6" dur="1" fill="hold">
+                                          <p:stCondLst>
+                                            <p:cond delay="0"/>
+                                          </p:stCondLst>
+                                        </p:cTn>
+                                        <p:tgtEl>
+                                          <p:spTgt spid="3">
+                                            <p:txEl>
+                                              <p:pRg st="1" end="1"/>
+                                            </p:txEl>
+                                          </p:spTgt>
+                                        </p:tgtEl>
+                                        <p:attrNameLst>
+                                          <p:attrName>style.visibility</p:attrName>
+                                        </p:attrNameLst>
+                                      </p:cBhvr>
+                                      <p:to>
+                                        <p:strVal val="visible"/>
+                                      </p:to>
+                                    </p:set>
+                                  </p:childTnLst>
+                                </p:cTn>
+                              </p:par>
+                              <p:par>
+                                <p:cTn id="7" presetID="1" presetClass="entr" presetSubtype="0" fill="hold" nodeType="withEffect">
+                                  <p:stCondLst>
+                                    <p:cond delay="0"/>
+                                  </p:stCondLst>
+                                  <p:childTnLst>
+                                    <p:set>
+                                      <p:cBhvr>
+                                        <p:cTn id="8" dur="1" fill="hold">
+                                          <p:stCondLst>
+                                            <p:cond delay="0"/>
+                                          </p:stCondLst>
+                                        </p:cTn>
+                                        <p:tgtEl>
+                                          <p:spTgt spid="5"/>
+                                        </p:tgtEl>
+                                        <p:attrNameLst>
+                                          <p:attrName>style.visibility</p:attrName>
+                                        </p:attrNameLst>
+                                      </p:cBhvr>
+                                      <p:to>
+                                        <p:strVal val="visible"/>
+                                      </p:to>
+                                    </p:set>
+                                  </p:childTnLst>
+                                </p:cTn>
+                              </p:par>
+                            </p:childTnLst>
+                          </p:cTn>
+                        </p:par>
+                      </p:childTnLst>
+                    </p:cTn>
+                  </p:par>
+                  <p:par>
+                    <p:cTn id="9" fill="hold">
+                      <p:stCondLst>
+                        <p:cond delay="indefinite"/>
+                      </p:stCondLst>
+                      <p:childTnLst>
+                        <p:par>
+                          <p:cTn id="10" fill="hold">
+                            <p:stCondLst>
+                              <p:cond delay="0"/>
+                            </p:stCondLst>
+                            <p:childTnLst>
+                              <p:par>
+                                <p:cTn id="11" presetID="1" presetClass="entr" presetSubtype="0" fill="hold" nodeType="clickEffect">
+                                  <p:stCondLst>
+                                    <p:cond delay="0"/>
+                                  </p:stCondLst>
+                                  <p:childTnLst>
+                                    <p:set>
+                                      <p:cBhvr>
+                                        <p:cTn id="12" dur="1" fill="hold">
+                                          <p:stCondLst>
+                                            <p:cond delay="0"/>
+                                          </p:stCondLst>
+                                        </p:cTn>
+                                        <p:tgtEl>
+                                          <p:spTgt spid="3">
+                                            <p:txEl>
+                                              <p:pRg st="2" end="2"/>
+                                            </p:txEl>
+                                          </p:spTgt>
+                                        </p:tgtEl>
+                                        <p:attrNameLst>
+                                          <p:attrName>style.visibility</p:attrName>
+                                        </p:attrNameLst>
+                                      </p:cBhvr>
+                                      <p:to>
+                                        <p:strVal val="visible"/>
+                                      </p:to>
+                                    </p:set>
+                                  </p:childTnLst>
+                                </p:cTn>
+                              </p:par>
+                              <p:par>
+                                <p:cTn id="13" presetID="1" presetClass="entr" presetSubtype="0" fill="hold" nodeType="withEffect">
+                                  <p:stCondLst>
+                                    <p:cond delay="0"/>
+                                  </p:stCondLst>
+                                  <p:childTnLst>
+                                    <p:set>
+                                      <p:cBhvr>
+                                        <p:cTn id="14" dur="1" fill="hold">
+                                          <p:stCondLst>
+                                            <p:cond delay="0"/>
+                                          </p:stCondLst>
+                                        </p:cTn>
+                                        <p:tgtEl>
+                                          <p:spTgt spid="8"/>
+                                        </p:tgtEl>
+                                        <p:attrNameLst>
+                                          <p:attrName>style.visibility</p:attrName>
+                                        </p:attrNameLst>
+                                      </p:cBhvr>
+                                      <p:to>
+                                        <p:strVal val="visible"/>
+                                      </p:to>
+                                    </p:set>
+                                  </p:childTnLst>
+                                </p:cTn>
+                              </p:par>
+                            </p:childTnLst>
+                          </p:cTn>
+                        </p:par>
+                      </p:childTnLst>
+                    </p:cTn>
+                  </p:par>
+                  <p:par>
+                    <p:cTn id="15" fill="hold">
+                      <p:stCondLst>
+                        <p:cond delay="indefinite"/>
+                      </p:stCondLst>
+                      <p:childTnLst>
+                        <p:par>
+                          <p:cTn id="16" fill="hold">
+                            <p:stCondLst>
+                              <p:cond delay="0"/>
+                            </p:stCondLst>
+                            <p:childTnLst>
+                              <p:par>
+                                <p:cTn id="17" presetID="1" presetClass="entr" presetSubtype="0" fill="hold" nodeType="clickEffect">
+                                  <p:stCondLst>
+                                    <p:cond delay="0"/>
+                                  </p:stCondLst>
+                                  <p:childTnLst>
+                                    <p:set>
+                                      <p:cBhvr>
+                                        <p:cTn id="18" dur="1" fill="hold">
+                                          <p:stCondLst>
+                                            <p:cond delay="0"/>
+                                          </p:stCondLst>
+                                        </p:cTn>
+                                        <p:tgtEl>
+                                          <p:spTgt spid="3">
+                                            <p:txEl>
+                                              <p:pRg st="3" end="3"/>
+                                            </p:txEl>
+                                          </p:spTgt>
+                                        </p:tgtEl>
+                                        <p:attrNameLst>
+                                          <p:attrName>style.visibility</p:attrName>
+                                        </p:attrNameLst>
+                                      </p:cBhvr>
+                                      <p:to>
+                                        <p:strVal val="visible"/>
+                                      </p:to>
+                                    </p:set>
+                                  </p:childTnLst>
+                                </p:cTn>
+                              </p:par>
+                            </p:childTnLst>
+                          </p:cTn>
+                        </p:par>
+                      </p:childTnLst>
+                    </p:cTn>
+                  </p:par>
+                  <p:par>
+                    <p:cTn id="19" fill="hold">
+                      <p:stCondLst>
+                        <p:cond delay="indefinite"/>
+                      </p:stCondLst>
+                      <p:childTnLst>
+                        <p:par>
+                          <p:cTn id="20" fill="hold">
+                            <p:stCondLst>
+                              <p:cond delay="0"/>
+                            </p:stCondLst>
+                            <p:childTnLst>
+                              <p:par>
+                                <p:cTn id="21" presetID="1" presetClass="entr" presetSubtype="0" fill="hold" nodeType="clickEffect">
+                                  <p:stCondLst>
+                                    <p:cond delay="0"/>
+                                  </p:stCondLst>
+                                  <p:childTnLst>
+                                    <p:set>
+                                      <p:cBhvr>
+                                        <p:cTn id="22" dur="1" fill="hold">
+                                          <p:stCondLst>
+                                            <p:cond delay="0"/>
+                                          </p:stCondLst>
+                                        </p:cTn>
+                                        <p:tgtEl>
+                                          <p:spTgt spid="3">
+                                            <p:txEl>
+                                              <p:pRg st="4" end="4"/>
+                                            </p:txEl>
+                                          </p:spTgt>
+                                        </p:tgtEl>
+                                        <p:attrNameLst>
+                                          <p:attrName>style.visibility</p:attrName>
+                                        </p:attrNameLst>
+                                      </p:cBhvr>
+                                      <p:to>
+                                        <p:strVal val="visible"/>
+                                      </p:to>
+                                    </p:set>
+                                  </p:childTnLst>
+                                </p:cTn>
+                              </p:par>
+                            </p:childTnLst>
+                          </p:cTn>
+                        </p:par>
+                      </p:childTnLst>
+                    </p:cTn>
+                  </p:par>
+                </p:childTnLst>
+              </p:cTn>
+              <p:prevCondLst>
+                <p:cond evt="onPrev" delay="0">
+                  <p:tgtEl>
+                    <p:sldTgt/>
+                  </p:tgtEl>
+                </p:cond>
+              </p:prevCondLst>
+              <p:nextCondLst>
+                <p:cond evt="onNext" delay="0">
+                  <p:tgtEl>
+                    <p:sldTgt/>
+                  </p:tgtEl>
+                </p:cond>
+              </p:nextCondLst>
+            </p:seq>
+          </p:childTnLst>
+        </p:cTn>
+      </p:par>
+    </p:tnLst>
+  </p:timing>
+</p:sld>
+</file>
+
+<file path=ppt/slides/slide4.xml><?xml version="1.0" encoding="utf-8"?>
+<p:sld xmlns:a="http://schemas.openxmlformats.org/drawingml/2006/main" xmlns:r="http://schemas.openxmlformats.org/officeDocument/2006/relationships" xmlns:p="http://schemas.openxmlformats.org/presentationml/2006/main">
+  <p:cSld>
+    <p:spTree>
+      <p:nvGrpSpPr>
+        <p:cNvPr id="1" name=""/>
+        <p:cNvGrpSpPr/>
+        <p:nvPr/>
+      </p:nvGrpSpPr>
+      <p:grpSpPr>
+        <a:xfrm>
+          <a:off x="0" y="0"/>
+          <a:ext cx="0" cy="0"/>
+          <a:chOff x="0" y="0"/>
+          <a:chExt cx="0" cy="0"/>
+        </a:xfrm>
+      </p:grpSpPr>
+      <p:sp>
+        <p:nvSpPr>
+          <p:cNvPr id="3" name="Content Placeholder 2">
+            <a:extLst>
+              <a:ext uri="{FF2B5EF4-FFF2-40B4-BE49-F238E27FC236}">
+                <a16:creationId xmlns:a16="http://schemas.microsoft.com/office/drawing/2014/main" id="{258E6AF3-7615-4BD1-878E-A94C93E98F90}"/>
+              </a:ext>
+            </a:extLst>
+          </p:cNvPr>
+          <p:cNvSpPr>
+            <a:spLocks noGrp="1"/>
+          </p:cNvSpPr>
+          <p:nvPr>
+            <p:ph idx="1"/>
+          </p:nvPr>
+        </p:nvSpPr>
+        <p:spPr/>
+        <p:txBody>
+          <a:bodyPr/>
+          <a:lstStyle/>
+          <a:p>
+            <a:pPr marL="0" indent="0">
+              <a:buNone/>
+            </a:pPr>
+            <a:r>
+              <a:rPr lang="en-US" sz="3200" dirty="0"/>
+              <a:t>Data mining (KDD) is generally performed at </a:t>
+            </a:r>
+            <a:r>
+              <a:rPr lang="en-US" sz="3200" b="1" dirty="0"/>
+              <a:t>large scale </a:t>
+            </a:r>
+          </a:p>
+          <a:p>
+            <a:r>
+              <a:rPr lang="en-US" dirty="0"/>
+              <a:t>Dataset size has grown nearly exponentially  </a:t>
+            </a:r>
+          </a:p>
+          <a:p>
+            <a:r>
+              <a:rPr lang="en-US" dirty="0"/>
+              <a:t>More importantly, </a:t>
+            </a:r>
+            <a:r>
+              <a:rPr lang="en-US" b="1" dirty="0"/>
+              <a:t>dataset and problem complexity has grown</a:t>
+            </a:r>
+          </a:p>
+          <a:p>
+            <a:r>
+              <a:rPr lang="en-US" dirty="0"/>
+              <a:t>Data mining is at the intersection of several subjects   </a:t>
+            </a:r>
+          </a:p>
+          <a:p>
+            <a:pPr lvl="1"/>
+            <a:r>
+              <a:rPr lang="en-US" b="1" dirty="0"/>
+              <a:t>Statistics:</a:t>
+            </a:r>
+            <a:r>
+              <a:rPr lang="en-US" dirty="0"/>
+              <a:t> What of significance can we learn from the data? </a:t>
+            </a:r>
+          </a:p>
+          <a:p>
+            <a:pPr lvl="1"/>
+            <a:r>
+              <a:rPr lang="en-US" b="1" dirty="0"/>
+              <a:t>Mathematics:</a:t>
+            </a:r>
+            <a:r>
+              <a:rPr lang="en-US" dirty="0"/>
+              <a:t> How do we represent data as, say, a graph?</a:t>
+            </a:r>
+          </a:p>
+          <a:p>
+            <a:pPr lvl="1"/>
+            <a:r>
+              <a:rPr lang="en-US" b="1" dirty="0"/>
+              <a:t>Algorithms: </a:t>
+            </a:r>
+            <a:r>
+              <a:rPr lang="en-US" dirty="0"/>
+              <a:t>How do we efficiently find important relationships in large datasets? </a:t>
+            </a:r>
+          </a:p>
+          <a:p>
+            <a:pPr lvl="1"/>
+            <a:r>
+              <a:rPr lang="en-US" b="1" dirty="0"/>
+              <a:t>Technology:</a:t>
+            </a:r>
+            <a:r>
+              <a:rPr lang="en-US" dirty="0"/>
+              <a:t> How do we manage and process massive datasets? </a:t>
+            </a:r>
+            <a:endParaRPr lang="en-US" b="1" dirty="0"/>
+          </a:p>
+        </p:txBody>
+      </p:sp>
+      <p:sp>
+        <p:nvSpPr>
+          <p:cNvPr id="6" name="Title 1">
+            <a:extLst>
+              <a:ext uri="{FF2B5EF4-FFF2-40B4-BE49-F238E27FC236}">
+                <a16:creationId xmlns:a16="http://schemas.microsoft.com/office/drawing/2014/main" id="{CD29F70F-B868-451B-A65D-8721F4C7A2D9}"/>
+              </a:ext>
+            </a:extLst>
+          </p:cNvPr>
+          <p:cNvSpPr txBox="1">
+            <a:spLocks/>
+          </p:cNvSpPr>
+          <p:nvPr/>
+        </p:nvSpPr>
+        <p:spPr>
+          <a:xfrm>
+            <a:off x="838200" y="-635"/>
+            <a:ext cx="10515600" cy="1325563"/>
+          </a:xfrm>
+          <a:prstGeom prst="rect">
+            <a:avLst/>
+          </a:prstGeom>
+        </p:spPr>
+        <p:txBody>
+          <a:bodyPr vert="horz" lIns="91440" tIns="45720" rIns="91440" bIns="45720" rtlCol="0" anchor="ctr">
+            <a:normAutofit/>
+          </a:bodyPr>
+          <a:lstStyle>
+            <a:lvl1pPr algn="l" defTabSz="914400" rtl="0" eaLnBrk="1" latinLnBrk="0" hangingPunct="1">
+              <a:lnSpc>
+                <a:spcPct val="90000"/>
+              </a:lnSpc>
+              <a:spcBef>
+                <a:spcPct val="0"/>
+              </a:spcBef>
+              <a:buNone/>
+              <a:defRPr sz="4400" kern="1200">
+                <a:solidFill>
+                  <a:schemeClr val="tx1"/>
+                </a:solidFill>
+                <a:latin typeface="+mj-lt"/>
+                <a:ea typeface="+mj-ea"/>
+                <a:cs typeface="+mj-cs"/>
+              </a:defRPr>
+            </a:lvl1pPr>
+          </a:lstStyle>
+          <a:p>
+            <a:r>
+              <a:rPr lang="en-US" dirty="0">
+                <a:latin typeface="+mn-lt"/>
+              </a:rPr>
+              <a:t>What is data mining?</a:t>
+            </a:r>
+          </a:p>
+        </p:txBody>
+      </p:sp>
+    </p:spTree>
+    <p:extLst>
+      <p:ext uri="{BB962C8B-B14F-4D97-AF65-F5344CB8AC3E}">
+        <p14:creationId xmlns:p14="http://schemas.microsoft.com/office/powerpoint/2010/main" val="69986985"/>
       </p:ext>
     </p:extLst>
   </p:cSld>
@@ -31960,6 +34623,104 @@
                       </p:childTnLst>
                     </p:cTn>
                   </p:par>
+                  <p:par>
+                    <p:cTn id="27" fill="hold">
+                      <p:stCondLst>
+                        <p:cond delay="indefinite"/>
+                      </p:stCondLst>
+                      <p:childTnLst>
+                        <p:par>
+                          <p:cTn id="28" fill="hold">
+                            <p:stCondLst>
+                              <p:cond delay="0"/>
+                            </p:stCondLst>
+                            <p:childTnLst>
+                              <p:par>
+                                <p:cTn id="29" presetID="1" presetClass="entr" presetSubtype="0" fill="hold" nodeType="clickEffect">
+                                  <p:stCondLst>
+                                    <p:cond delay="0"/>
+                                  </p:stCondLst>
+                                  <p:childTnLst>
+                                    <p:set>
+                                      <p:cBhvr>
+                                        <p:cTn id="30" dur="1" fill="hold">
+                                          <p:stCondLst>
+                                            <p:cond delay="0"/>
+                                          </p:stCondLst>
+                                        </p:cTn>
+                                        <p:tgtEl>
+                                          <p:spTgt spid="3">
+                                            <p:txEl>
+                                              <p:pRg st="6" end="6"/>
+                                            </p:txEl>
+                                          </p:spTgt>
+                                        </p:tgtEl>
+                                        <p:attrNameLst>
+                                          <p:attrName>style.visibility</p:attrName>
+                                        </p:attrNameLst>
+                                      </p:cBhvr>
+                                      <p:to>
+                                        <p:strVal val="visible"/>
+                                      </p:to>
+                                    </p:set>
+                                  </p:childTnLst>
+                                </p:cTn>
+                              </p:par>
+                            </p:childTnLst>
+                          </p:cTn>
+                        </p:par>
+                      </p:childTnLst>
+                    </p:cTn>
+                  </p:par>
+                  <p:par>
+                    <p:cTn id="31" fill="hold">
+                      <p:stCondLst>
+                        <p:cond delay="indefinite"/>
+                      </p:stCondLst>
+                      <p:childTnLst>
+                        <p:par>
+                          <p:cTn id="32" fill="hold">
+                            <p:stCondLst>
+                              <p:cond delay="0"/>
+                            </p:stCondLst>
+                            <p:childTnLst>
+                              <p:par>
+                                <p:cTn id="33" presetID="1" presetClass="entr" presetSubtype="0" fill="hold" nodeType="clickEffect">
+                                  <p:stCondLst>
+                                    <p:cond delay="0"/>
+                                  </p:stCondLst>
+                                  <p:childTnLst>
+                                    <p:set>
+                                      <p:cBhvr>
+                                        <p:cTn id="34" dur="1" fill="hold">
+                                          <p:stCondLst>
+                                            <p:cond delay="0"/>
+                                          </p:stCondLst>
+                                        </p:cTn>
+                                        <p:tgtEl>
+                                          <p:spTgt spid="3">
+                                            <p:txEl>
+                                              <p:pRg st="7" end="7"/>
+                                            </p:txEl>
+                                          </p:spTgt>
+                                        </p:tgtEl>
+                                        <p:attrNameLst>
+                                          <p:attrName>style.visibility</p:attrName>
+                                        </p:attrNameLst>
+                                      </p:cBhvr>
+                                      <p:to>
+                                        <p:strVal val="visible"/>
+                                      </p:to>
+                                    </p:set>
+                                  </p:childTnLst>
+                                </p:cTn>
+                              </p:par>
+                            </p:childTnLst>
+                          </p:cTn>
+                        </p:par>
+                      </p:childTnLst>
+                    </p:cTn>
+                  </p:par>
                 </p:childTnLst>
               </p:cTn>
               <p:prevCondLst>
@@ -31985,7 +34746,7 @@
 </p:sld>
 </file>
 
-<file path=ppt/slides/slide35.xml><?xml version="1.0" encoding="utf-8"?>
+<file path=ppt/slides/slide40.xml><?xml version="1.0" encoding="utf-8"?>
 <p:sld xmlns:a="http://schemas.openxmlformats.org/drawingml/2006/main" xmlns:r="http://schemas.openxmlformats.org/officeDocument/2006/relationships" xmlns:p="http://schemas.openxmlformats.org/presentationml/2006/main">
   <p:cSld>
     <p:spTree>
@@ -32697,7 +35458,7 @@
 </p:sld>
 </file>
 
-<file path=ppt/slides/slide36.xml><?xml version="1.0" encoding="utf-8"?>
+<file path=ppt/slides/slide41.xml><?xml version="1.0" encoding="utf-8"?>
 <p:sld xmlns:a="http://schemas.openxmlformats.org/drawingml/2006/main" xmlns:r="http://schemas.openxmlformats.org/officeDocument/2006/relationships" xmlns:p="http://schemas.openxmlformats.org/presentationml/2006/main">
   <p:cSld>
     <p:spTree>
@@ -33616,7 +36377,7 @@
 </p:sld>
 </file>
 
-<file path=ppt/slides/slide37.xml><?xml version="1.0" encoding="utf-8"?>
+<file path=ppt/slides/slide42.xml><?xml version="1.0" encoding="utf-8"?>
 <p:sld xmlns:a="http://schemas.openxmlformats.org/drawingml/2006/main" xmlns:r="http://schemas.openxmlformats.org/officeDocument/2006/relationships" xmlns:p="http://schemas.openxmlformats.org/presentationml/2006/main">
   <p:cSld>
     <p:spTree>
@@ -34819,7 +37580,7 @@
 </p:sld>
 </file>
 
-<file path=ppt/slides/slide38.xml><?xml version="1.0" encoding="utf-8"?>
+<file path=ppt/slides/slide43.xml><?xml version="1.0" encoding="utf-8"?>
 <p:sld xmlns:a="http://schemas.openxmlformats.org/drawingml/2006/main" xmlns:r="http://schemas.openxmlformats.org/officeDocument/2006/relationships" xmlns:p="http://schemas.openxmlformats.org/presentationml/2006/main">
   <p:cSld>
     <p:spTree>
@@ -36012,7 +38773,7 @@
 </p:sld>
 </file>
 
-<file path=ppt/slides/slide39.xml><?xml version="1.0" encoding="utf-8"?>
+<file path=ppt/slides/slide44.xml><?xml version="1.0" encoding="utf-8"?>
 <p:sld xmlns:a="http://schemas.openxmlformats.org/drawingml/2006/main" xmlns:r="http://schemas.openxmlformats.org/officeDocument/2006/relationships" xmlns:p="http://schemas.openxmlformats.org/presentationml/2006/main">
   <p:cSld>
     <p:spTree>
@@ -36446,616 +39207,6 @@
                                           <p:spTgt spid="3">
                                             <p:txEl>
                                               <p:pRg st="5" end="5"/>
-                                            </p:txEl>
-                                          </p:spTgt>
-                                        </p:tgtEl>
-                                        <p:attrNameLst>
-                                          <p:attrName>style.visibility</p:attrName>
-                                        </p:attrNameLst>
-                                      </p:cBhvr>
-                                      <p:to>
-                                        <p:strVal val="visible"/>
-                                      </p:to>
-                                    </p:set>
-                                  </p:childTnLst>
-                                </p:cTn>
-                              </p:par>
-                            </p:childTnLst>
-                          </p:cTn>
-                        </p:par>
-                      </p:childTnLst>
-                    </p:cTn>
-                  </p:par>
-                </p:childTnLst>
-              </p:cTn>
-              <p:prevCondLst>
-                <p:cond evt="onPrev" delay="0">
-                  <p:tgtEl>
-                    <p:sldTgt/>
-                  </p:tgtEl>
-                </p:cond>
-              </p:prevCondLst>
-              <p:nextCondLst>
-                <p:cond evt="onNext" delay="0">
-                  <p:tgtEl>
-                    <p:sldTgt/>
-                  </p:tgtEl>
-                </p:cond>
-              </p:nextCondLst>
-            </p:seq>
-          </p:childTnLst>
-        </p:cTn>
-      </p:par>
-    </p:tnLst>
-  </p:timing>
-</p:sld>
-</file>
-
-<file path=ppt/slides/slide4.xml><?xml version="1.0" encoding="utf-8"?>
-<p:sld xmlns:a="http://schemas.openxmlformats.org/drawingml/2006/main" xmlns:r="http://schemas.openxmlformats.org/officeDocument/2006/relationships" xmlns:p="http://schemas.openxmlformats.org/presentationml/2006/main">
-  <p:cSld>
-    <p:spTree>
-      <p:nvGrpSpPr>
-        <p:cNvPr id="1" name=""/>
-        <p:cNvGrpSpPr/>
-        <p:nvPr/>
-      </p:nvGrpSpPr>
-      <p:grpSpPr>
-        <a:xfrm>
-          <a:off x="0" y="0"/>
-          <a:ext cx="0" cy="0"/>
-          <a:chOff x="0" y="0"/>
-          <a:chExt cx="0" cy="0"/>
-        </a:xfrm>
-      </p:grpSpPr>
-      <p:sp>
-        <p:nvSpPr>
-          <p:cNvPr id="3" name="Content Placeholder 2">
-            <a:extLst>
-              <a:ext uri="{FF2B5EF4-FFF2-40B4-BE49-F238E27FC236}">
-                <a16:creationId xmlns:a16="http://schemas.microsoft.com/office/drawing/2014/main" id="{258E6AF3-7615-4BD1-878E-A94C93E98F90}"/>
-              </a:ext>
-            </a:extLst>
-          </p:cNvPr>
-          <p:cNvSpPr>
-            <a:spLocks noGrp="1"/>
-          </p:cNvSpPr>
-          <p:nvPr>
-            <p:ph idx="1"/>
-          </p:nvPr>
-        </p:nvSpPr>
-        <p:spPr/>
-        <p:txBody>
-          <a:bodyPr/>
-          <a:lstStyle/>
-          <a:p>
-            <a:pPr marL="0" indent="0">
-              <a:buNone/>
-            </a:pPr>
-            <a:r>
-              <a:rPr lang="en-US" sz="3200" dirty="0"/>
-              <a:t>Data mining (KDD) is generally performed at </a:t>
-            </a:r>
-            <a:r>
-              <a:rPr lang="en-US" sz="3200" b="1" dirty="0"/>
-              <a:t>large scale </a:t>
-            </a:r>
-          </a:p>
-          <a:p>
-            <a:r>
-              <a:rPr lang="en-US" dirty="0"/>
-              <a:t>Dataset size has grown nearly exponentially  </a:t>
-            </a:r>
-          </a:p>
-          <a:p>
-            <a:r>
-              <a:rPr lang="en-US" dirty="0"/>
-              <a:t>More importantly, </a:t>
-            </a:r>
-            <a:r>
-              <a:rPr lang="en-US" b="1" dirty="0"/>
-              <a:t>dataset and problem complexity has grown</a:t>
-            </a:r>
-          </a:p>
-          <a:p>
-            <a:r>
-              <a:rPr lang="en-US" dirty="0"/>
-              <a:t>Data mining is at the intersection of several subjects   </a:t>
-            </a:r>
-          </a:p>
-          <a:p>
-            <a:pPr lvl="1"/>
-            <a:r>
-              <a:rPr lang="en-US" b="1" dirty="0"/>
-              <a:t>Statistics:</a:t>
-            </a:r>
-            <a:r>
-              <a:rPr lang="en-US" dirty="0"/>
-              <a:t> What of significance can we learn from the data? </a:t>
-            </a:r>
-          </a:p>
-          <a:p>
-            <a:pPr lvl="1"/>
-            <a:r>
-              <a:rPr lang="en-US" b="1" dirty="0"/>
-              <a:t>Mathematics:</a:t>
-            </a:r>
-            <a:r>
-              <a:rPr lang="en-US" dirty="0"/>
-              <a:t> How do we represent data as, say, a graph?</a:t>
-            </a:r>
-          </a:p>
-          <a:p>
-            <a:pPr lvl="1"/>
-            <a:r>
-              <a:rPr lang="en-US" b="1" dirty="0"/>
-              <a:t>Algorithms: </a:t>
-            </a:r>
-            <a:r>
-              <a:rPr lang="en-US" dirty="0"/>
-              <a:t>How do we efficiently find important relationships in large datasets? </a:t>
-            </a:r>
-          </a:p>
-          <a:p>
-            <a:pPr lvl="1"/>
-            <a:r>
-              <a:rPr lang="en-US" b="1" dirty="0"/>
-              <a:t>Technology:</a:t>
-            </a:r>
-            <a:r>
-              <a:rPr lang="en-US" dirty="0"/>
-              <a:t> How do we manage and process massive datasets? </a:t>
-            </a:r>
-            <a:endParaRPr lang="en-US" b="1" dirty="0"/>
-          </a:p>
-        </p:txBody>
-      </p:sp>
-      <p:sp>
-        <p:nvSpPr>
-          <p:cNvPr id="6" name="Title 1">
-            <a:extLst>
-              <a:ext uri="{FF2B5EF4-FFF2-40B4-BE49-F238E27FC236}">
-                <a16:creationId xmlns:a16="http://schemas.microsoft.com/office/drawing/2014/main" id="{CD29F70F-B868-451B-A65D-8721F4C7A2D9}"/>
-              </a:ext>
-            </a:extLst>
-          </p:cNvPr>
-          <p:cNvSpPr txBox="1">
-            <a:spLocks/>
-          </p:cNvSpPr>
-          <p:nvPr/>
-        </p:nvSpPr>
-        <p:spPr>
-          <a:xfrm>
-            <a:off x="838200" y="-635"/>
-            <a:ext cx="10515600" cy="1325563"/>
-          </a:xfrm>
-          <a:prstGeom prst="rect">
-            <a:avLst/>
-          </a:prstGeom>
-        </p:spPr>
-        <p:txBody>
-          <a:bodyPr vert="horz" lIns="91440" tIns="45720" rIns="91440" bIns="45720" rtlCol="0" anchor="ctr">
-            <a:normAutofit/>
-          </a:bodyPr>
-          <a:lstStyle>
-            <a:lvl1pPr algn="l" defTabSz="914400" rtl="0" eaLnBrk="1" latinLnBrk="0" hangingPunct="1">
-              <a:lnSpc>
-                <a:spcPct val="90000"/>
-              </a:lnSpc>
-              <a:spcBef>
-                <a:spcPct val="0"/>
-              </a:spcBef>
-              <a:buNone/>
-              <a:defRPr sz="4400" kern="1200">
-                <a:solidFill>
-                  <a:schemeClr val="tx1"/>
-                </a:solidFill>
-                <a:latin typeface="+mj-lt"/>
-                <a:ea typeface="+mj-ea"/>
-                <a:cs typeface="+mj-cs"/>
-              </a:defRPr>
-            </a:lvl1pPr>
-          </a:lstStyle>
-          <a:p>
-            <a:r>
-              <a:rPr lang="en-US" dirty="0">
-                <a:latin typeface="+mn-lt"/>
-              </a:rPr>
-              <a:t>What is data mining?</a:t>
-            </a:r>
-          </a:p>
-        </p:txBody>
-      </p:sp>
-    </p:spTree>
-    <p:extLst>
-      <p:ext uri="{BB962C8B-B14F-4D97-AF65-F5344CB8AC3E}">
-        <p14:creationId xmlns:p14="http://schemas.microsoft.com/office/powerpoint/2010/main" val="69986985"/>
-      </p:ext>
-    </p:extLst>
-  </p:cSld>
-  <p:clrMapOvr>
-    <a:masterClrMapping/>
-  </p:clrMapOvr>
-  <p:timing>
-    <p:tnLst>
-      <p:par>
-        <p:cTn id="1" dur="indefinite" restart="never" nodeType="tmRoot">
-          <p:childTnLst>
-            <p:seq concurrent="1" nextAc="seek">
-              <p:cTn id="2" dur="indefinite" nodeType="mainSeq">
-                <p:childTnLst>
-                  <p:par>
-                    <p:cTn id="3" fill="hold">
-                      <p:stCondLst>
-                        <p:cond delay="indefinite"/>
-                      </p:stCondLst>
-                      <p:childTnLst>
-                        <p:par>
-                          <p:cTn id="4" fill="hold">
-                            <p:stCondLst>
-                              <p:cond delay="0"/>
-                            </p:stCondLst>
-                            <p:childTnLst>
-                              <p:par>
-                                <p:cTn id="5" presetID="1" presetClass="entr" presetSubtype="0" fill="hold" nodeType="clickEffect">
-                                  <p:stCondLst>
-                                    <p:cond delay="0"/>
-                                  </p:stCondLst>
-                                  <p:childTnLst>
-                                    <p:set>
-                                      <p:cBhvr>
-                                        <p:cTn id="6" dur="1" fill="hold">
-                                          <p:stCondLst>
-                                            <p:cond delay="0"/>
-                                          </p:stCondLst>
-                                        </p:cTn>
-                                        <p:tgtEl>
-                                          <p:spTgt spid="3">
-                                            <p:txEl>
-                                              <p:pRg st="0" end="0"/>
-                                            </p:txEl>
-                                          </p:spTgt>
-                                        </p:tgtEl>
-                                        <p:attrNameLst>
-                                          <p:attrName>style.visibility</p:attrName>
-                                        </p:attrNameLst>
-                                      </p:cBhvr>
-                                      <p:to>
-                                        <p:strVal val="visible"/>
-                                      </p:to>
-                                    </p:set>
-                                  </p:childTnLst>
-                                </p:cTn>
-                              </p:par>
-                            </p:childTnLst>
-                          </p:cTn>
-                        </p:par>
-                      </p:childTnLst>
-                    </p:cTn>
-                  </p:par>
-                  <p:par>
-                    <p:cTn id="7" fill="hold">
-                      <p:stCondLst>
-                        <p:cond delay="indefinite"/>
-                      </p:stCondLst>
-                      <p:childTnLst>
-                        <p:par>
-                          <p:cTn id="8" fill="hold">
-                            <p:stCondLst>
-                              <p:cond delay="0"/>
-                            </p:stCondLst>
-                            <p:childTnLst>
-                              <p:par>
-                                <p:cTn id="9" presetID="1" presetClass="entr" presetSubtype="0" fill="hold" nodeType="clickEffect">
-                                  <p:stCondLst>
-                                    <p:cond delay="0"/>
-                                  </p:stCondLst>
-                                  <p:childTnLst>
-                                    <p:set>
-                                      <p:cBhvr>
-                                        <p:cTn id="10" dur="1" fill="hold">
-                                          <p:stCondLst>
-                                            <p:cond delay="0"/>
-                                          </p:stCondLst>
-                                        </p:cTn>
-                                        <p:tgtEl>
-                                          <p:spTgt spid="3">
-                                            <p:txEl>
-                                              <p:pRg st="1" end="1"/>
-                                            </p:txEl>
-                                          </p:spTgt>
-                                        </p:tgtEl>
-                                        <p:attrNameLst>
-                                          <p:attrName>style.visibility</p:attrName>
-                                        </p:attrNameLst>
-                                      </p:cBhvr>
-                                      <p:to>
-                                        <p:strVal val="visible"/>
-                                      </p:to>
-                                    </p:set>
-                                  </p:childTnLst>
-                                </p:cTn>
-                              </p:par>
-                            </p:childTnLst>
-                          </p:cTn>
-                        </p:par>
-                      </p:childTnLst>
-                    </p:cTn>
-                  </p:par>
-                  <p:par>
-                    <p:cTn id="11" fill="hold">
-                      <p:stCondLst>
-                        <p:cond delay="indefinite"/>
-                      </p:stCondLst>
-                      <p:childTnLst>
-                        <p:par>
-                          <p:cTn id="12" fill="hold">
-                            <p:stCondLst>
-                              <p:cond delay="0"/>
-                            </p:stCondLst>
-                            <p:childTnLst>
-                              <p:par>
-                                <p:cTn id="13" presetID="1" presetClass="entr" presetSubtype="0" fill="hold" nodeType="clickEffect">
-                                  <p:stCondLst>
-                                    <p:cond delay="0"/>
-                                  </p:stCondLst>
-                                  <p:childTnLst>
-                                    <p:set>
-                                      <p:cBhvr>
-                                        <p:cTn id="14" dur="1" fill="hold">
-                                          <p:stCondLst>
-                                            <p:cond delay="0"/>
-                                          </p:stCondLst>
-                                        </p:cTn>
-                                        <p:tgtEl>
-                                          <p:spTgt spid="3">
-                                            <p:txEl>
-                                              <p:pRg st="2" end="2"/>
-                                            </p:txEl>
-                                          </p:spTgt>
-                                        </p:tgtEl>
-                                        <p:attrNameLst>
-                                          <p:attrName>style.visibility</p:attrName>
-                                        </p:attrNameLst>
-                                      </p:cBhvr>
-                                      <p:to>
-                                        <p:strVal val="visible"/>
-                                      </p:to>
-                                    </p:set>
-                                  </p:childTnLst>
-                                </p:cTn>
-                              </p:par>
-                            </p:childTnLst>
-                          </p:cTn>
-                        </p:par>
-                      </p:childTnLst>
-                    </p:cTn>
-                  </p:par>
-                  <p:par>
-                    <p:cTn id="15" fill="hold">
-                      <p:stCondLst>
-                        <p:cond delay="indefinite"/>
-                      </p:stCondLst>
-                      <p:childTnLst>
-                        <p:par>
-                          <p:cTn id="16" fill="hold">
-                            <p:stCondLst>
-                              <p:cond delay="0"/>
-                            </p:stCondLst>
-                            <p:childTnLst>
-                              <p:par>
-                                <p:cTn id="17" presetID="1" presetClass="entr" presetSubtype="0" fill="hold" nodeType="clickEffect">
-                                  <p:stCondLst>
-                                    <p:cond delay="0"/>
-                                  </p:stCondLst>
-                                  <p:childTnLst>
-                                    <p:set>
-                                      <p:cBhvr>
-                                        <p:cTn id="18" dur="1" fill="hold">
-                                          <p:stCondLst>
-                                            <p:cond delay="0"/>
-                                          </p:stCondLst>
-                                        </p:cTn>
-                                        <p:tgtEl>
-                                          <p:spTgt spid="3">
-                                            <p:txEl>
-                                              <p:pRg st="3" end="3"/>
-                                            </p:txEl>
-                                          </p:spTgt>
-                                        </p:tgtEl>
-                                        <p:attrNameLst>
-                                          <p:attrName>style.visibility</p:attrName>
-                                        </p:attrNameLst>
-                                      </p:cBhvr>
-                                      <p:to>
-                                        <p:strVal val="visible"/>
-                                      </p:to>
-                                    </p:set>
-                                  </p:childTnLst>
-                                </p:cTn>
-                              </p:par>
-                            </p:childTnLst>
-                          </p:cTn>
-                        </p:par>
-                      </p:childTnLst>
-                    </p:cTn>
-                  </p:par>
-                  <p:par>
-                    <p:cTn id="19" fill="hold">
-                      <p:stCondLst>
-                        <p:cond delay="indefinite"/>
-                      </p:stCondLst>
-                      <p:childTnLst>
-                        <p:par>
-                          <p:cTn id="20" fill="hold">
-                            <p:stCondLst>
-                              <p:cond delay="0"/>
-                            </p:stCondLst>
-                            <p:childTnLst>
-                              <p:par>
-                                <p:cTn id="21" presetID="1" presetClass="entr" presetSubtype="0" fill="hold" nodeType="clickEffect">
-                                  <p:stCondLst>
-                                    <p:cond delay="0"/>
-                                  </p:stCondLst>
-                                  <p:childTnLst>
-                                    <p:set>
-                                      <p:cBhvr>
-                                        <p:cTn id="22" dur="1" fill="hold">
-                                          <p:stCondLst>
-                                            <p:cond delay="0"/>
-                                          </p:stCondLst>
-                                        </p:cTn>
-                                        <p:tgtEl>
-                                          <p:spTgt spid="3">
-                                            <p:txEl>
-                                              <p:pRg st="4" end="4"/>
-                                            </p:txEl>
-                                          </p:spTgt>
-                                        </p:tgtEl>
-                                        <p:attrNameLst>
-                                          <p:attrName>style.visibility</p:attrName>
-                                        </p:attrNameLst>
-                                      </p:cBhvr>
-                                      <p:to>
-                                        <p:strVal val="visible"/>
-                                      </p:to>
-                                    </p:set>
-                                  </p:childTnLst>
-                                </p:cTn>
-                              </p:par>
-                            </p:childTnLst>
-                          </p:cTn>
-                        </p:par>
-                      </p:childTnLst>
-                    </p:cTn>
-                  </p:par>
-                  <p:par>
-                    <p:cTn id="23" fill="hold">
-                      <p:stCondLst>
-                        <p:cond delay="indefinite"/>
-                      </p:stCondLst>
-                      <p:childTnLst>
-                        <p:par>
-                          <p:cTn id="24" fill="hold">
-                            <p:stCondLst>
-                              <p:cond delay="0"/>
-                            </p:stCondLst>
-                            <p:childTnLst>
-                              <p:par>
-                                <p:cTn id="25" presetID="1" presetClass="entr" presetSubtype="0" fill="hold" nodeType="clickEffect">
-                                  <p:stCondLst>
-                                    <p:cond delay="0"/>
-                                  </p:stCondLst>
-                                  <p:childTnLst>
-                                    <p:set>
-                                      <p:cBhvr>
-                                        <p:cTn id="26" dur="1" fill="hold">
-                                          <p:stCondLst>
-                                            <p:cond delay="0"/>
-                                          </p:stCondLst>
-                                        </p:cTn>
-                                        <p:tgtEl>
-                                          <p:spTgt spid="3">
-                                            <p:txEl>
-                                              <p:pRg st="5" end="5"/>
-                                            </p:txEl>
-                                          </p:spTgt>
-                                        </p:tgtEl>
-                                        <p:attrNameLst>
-                                          <p:attrName>style.visibility</p:attrName>
-                                        </p:attrNameLst>
-                                      </p:cBhvr>
-                                      <p:to>
-                                        <p:strVal val="visible"/>
-                                      </p:to>
-                                    </p:set>
-                                  </p:childTnLst>
-                                </p:cTn>
-                              </p:par>
-                            </p:childTnLst>
-                          </p:cTn>
-                        </p:par>
-                      </p:childTnLst>
-                    </p:cTn>
-                  </p:par>
-                  <p:par>
-                    <p:cTn id="27" fill="hold">
-                      <p:stCondLst>
-                        <p:cond delay="indefinite"/>
-                      </p:stCondLst>
-                      <p:childTnLst>
-                        <p:par>
-                          <p:cTn id="28" fill="hold">
-                            <p:stCondLst>
-                              <p:cond delay="0"/>
-                            </p:stCondLst>
-                            <p:childTnLst>
-                              <p:par>
-                                <p:cTn id="29" presetID="1" presetClass="entr" presetSubtype="0" fill="hold" nodeType="clickEffect">
-                                  <p:stCondLst>
-                                    <p:cond delay="0"/>
-                                  </p:stCondLst>
-                                  <p:childTnLst>
-                                    <p:set>
-                                      <p:cBhvr>
-                                        <p:cTn id="30" dur="1" fill="hold">
-                                          <p:stCondLst>
-                                            <p:cond delay="0"/>
-                                          </p:stCondLst>
-                                        </p:cTn>
-                                        <p:tgtEl>
-                                          <p:spTgt spid="3">
-                                            <p:txEl>
-                                              <p:pRg st="6" end="6"/>
-                                            </p:txEl>
-                                          </p:spTgt>
-                                        </p:tgtEl>
-                                        <p:attrNameLst>
-                                          <p:attrName>style.visibility</p:attrName>
-                                        </p:attrNameLst>
-                                      </p:cBhvr>
-                                      <p:to>
-                                        <p:strVal val="visible"/>
-                                      </p:to>
-                                    </p:set>
-                                  </p:childTnLst>
-                                </p:cTn>
-                              </p:par>
-                            </p:childTnLst>
-                          </p:cTn>
-                        </p:par>
-                      </p:childTnLst>
-                    </p:cTn>
-                  </p:par>
-                  <p:par>
-                    <p:cTn id="31" fill="hold">
-                      <p:stCondLst>
-                        <p:cond delay="indefinite"/>
-                      </p:stCondLst>
-                      <p:childTnLst>
-                        <p:par>
-                          <p:cTn id="32" fill="hold">
-                            <p:stCondLst>
-                              <p:cond delay="0"/>
-                            </p:stCondLst>
-                            <p:childTnLst>
-                              <p:par>
-                                <p:cTn id="33" presetID="1" presetClass="entr" presetSubtype="0" fill="hold" nodeType="clickEffect">
-                                  <p:stCondLst>
-                                    <p:cond delay="0"/>
-                                  </p:stCondLst>
-                                  <p:childTnLst>
-                                    <p:set>
-                                      <p:cBhvr>
-                                        <p:cTn id="34" dur="1" fill="hold">
-                                          <p:stCondLst>
-                                            <p:cond delay="0"/>
-                                          </p:stCondLst>
-                                        </p:cTn>
-                                        <p:tgtEl>
-                                          <p:spTgt spid="3">
-                                            <p:txEl>
-                                              <p:pRg st="7" end="7"/>
                                             </p:txEl>
                                           </p:spTgt>
                                         </p:tgtEl>
@@ -38364,17 +40515,8 @@
               <a:rPr lang="en-US" sz="2800" b="0" dirty="0">
                 <a:cs typeface="Arial" panose="020B0604020202020204" pitchFamily="34" charset="0"/>
               </a:rPr>
-              <a:t>Inventor/coinventor on </a:t>
-            </a:r>
-            <a:r>
-              <a:rPr lang="en-US" sz="2800" b="0">
-                <a:cs typeface="Arial" panose="020B0604020202020204" pitchFamily="34" charset="0"/>
-              </a:rPr>
-              <a:t>5 issued patents</a:t>
-            </a:r>
-            <a:endParaRPr lang="en-US" sz="2800" b="0" dirty="0">
-              <a:cs typeface="Arial" panose="020B0604020202020204" pitchFamily="34" charset="0"/>
-            </a:endParaRPr>
+              <a:t>Inventor/coinventor on 5 issued patents</a:t>
+            </a:r>
           </a:p>
           <a:p>
             <a:pPr>

</xml_diff>

<commit_message>
Added late assignment policy
</commit_message>
<xml_diff>
--- a/slides/1_Introduction.pptx
+++ b/slides/1_Introduction.pptx
@@ -5,7 +5,7 @@
     <p:sldMasterId id="2147483648" r:id="rId1"/>
   </p:sldMasterIdLst>
   <p:notesMasterIdLst>
-    <p:notesMasterId r:id="rId46"/>
+    <p:notesMasterId r:id="rId47"/>
   </p:notesMasterIdLst>
   <p:sldIdLst>
     <p:sldId id="256" r:id="rId2"/>
@@ -20,38 +20,39 @@
     <p:sldId id="381" r:id="rId11"/>
     <p:sldId id="355" r:id="rId12"/>
     <p:sldId id="388" r:id="rId13"/>
-    <p:sldId id="387" r:id="rId14"/>
-    <p:sldId id="382" r:id="rId15"/>
-    <p:sldId id="357" r:id="rId16"/>
-    <p:sldId id="385" r:id="rId17"/>
-    <p:sldId id="359" r:id="rId18"/>
-    <p:sldId id="386" r:id="rId19"/>
-    <p:sldId id="360" r:id="rId20"/>
-    <p:sldId id="374" r:id="rId21"/>
-    <p:sldId id="375" r:id="rId22"/>
-    <p:sldId id="376" r:id="rId23"/>
-    <p:sldId id="377" r:id="rId24"/>
-    <p:sldId id="378" r:id="rId25"/>
-    <p:sldId id="379" r:id="rId26"/>
-    <p:sldId id="380" r:id="rId27"/>
-    <p:sldId id="362" r:id="rId28"/>
-    <p:sldId id="364" r:id="rId29"/>
-    <p:sldId id="365" r:id="rId30"/>
-    <p:sldId id="363" r:id="rId31"/>
-    <p:sldId id="366" r:id="rId32"/>
-    <p:sldId id="372" r:id="rId33"/>
-    <p:sldId id="361" r:id="rId34"/>
-    <p:sldId id="368" r:id="rId35"/>
-    <p:sldId id="390" r:id="rId36"/>
-    <p:sldId id="391" r:id="rId37"/>
-    <p:sldId id="392" r:id="rId38"/>
-    <p:sldId id="393" r:id="rId39"/>
-    <p:sldId id="394" r:id="rId40"/>
-    <p:sldId id="371" r:id="rId41"/>
-    <p:sldId id="369" r:id="rId42"/>
-    <p:sldId id="373" r:id="rId43"/>
-    <p:sldId id="370" r:id="rId44"/>
-    <p:sldId id="384" r:id="rId45"/>
+    <p:sldId id="395" r:id="rId14"/>
+    <p:sldId id="387" r:id="rId15"/>
+    <p:sldId id="382" r:id="rId16"/>
+    <p:sldId id="357" r:id="rId17"/>
+    <p:sldId id="385" r:id="rId18"/>
+    <p:sldId id="359" r:id="rId19"/>
+    <p:sldId id="386" r:id="rId20"/>
+    <p:sldId id="360" r:id="rId21"/>
+    <p:sldId id="374" r:id="rId22"/>
+    <p:sldId id="375" r:id="rId23"/>
+    <p:sldId id="376" r:id="rId24"/>
+    <p:sldId id="377" r:id="rId25"/>
+    <p:sldId id="378" r:id="rId26"/>
+    <p:sldId id="379" r:id="rId27"/>
+    <p:sldId id="380" r:id="rId28"/>
+    <p:sldId id="362" r:id="rId29"/>
+    <p:sldId id="364" r:id="rId30"/>
+    <p:sldId id="365" r:id="rId31"/>
+    <p:sldId id="363" r:id="rId32"/>
+    <p:sldId id="366" r:id="rId33"/>
+    <p:sldId id="372" r:id="rId34"/>
+    <p:sldId id="361" r:id="rId35"/>
+    <p:sldId id="368" r:id="rId36"/>
+    <p:sldId id="390" r:id="rId37"/>
+    <p:sldId id="391" r:id="rId38"/>
+    <p:sldId id="392" r:id="rId39"/>
+    <p:sldId id="393" r:id="rId40"/>
+    <p:sldId id="394" r:id="rId41"/>
+    <p:sldId id="371" r:id="rId42"/>
+    <p:sldId id="369" r:id="rId43"/>
+    <p:sldId id="373" r:id="rId44"/>
+    <p:sldId id="370" r:id="rId45"/>
+    <p:sldId id="384" r:id="rId46"/>
   </p:sldIdLst>
   <p:sldSz cx="12192000" cy="6858000"/>
   <p:notesSz cx="6858000" cy="9144000"/>
@@ -240,7 +241,7 @@
           <a:p>
             <a:fld id="{2F3ABF1A-8818-4472-8518-E71DC7B5D2F7}" type="datetimeFigureOut">
               <a:rPr lang="en-US" smtClean="0"/>
-              <a:t>6/18/2022</a:t>
+              <a:t>6/21/2022</a:t>
             </a:fld>
             <a:endParaRPr lang="en-US"/>
           </a:p>
@@ -572,7 +573,7 @@
           <a:p>
             <a:fld id="{F33E01E3-981B-4CB5-81ED-65C622C255CB}" type="slidenum">
               <a:rPr lang="en-US" smtClean="0"/>
-              <a:t>31</a:t>
+              <a:t>32</a:t>
             </a:fld>
             <a:endParaRPr lang="en-US"/>
           </a:p>
@@ -659,7 +660,7 @@
           <a:p>
             <a:fld id="{F33E01E3-981B-4CB5-81ED-65C622C255CB}" type="slidenum">
               <a:rPr lang="en-US" smtClean="0"/>
-              <a:t>40</a:t>
+              <a:t>41</a:t>
             </a:fld>
             <a:endParaRPr lang="en-US"/>
           </a:p>
@@ -746,7 +747,7 @@
           <a:p>
             <a:fld id="{F33E01E3-981B-4CB5-81ED-65C622C255CB}" type="slidenum">
               <a:rPr lang="en-US" smtClean="0"/>
-              <a:t>41</a:t>
+              <a:t>42</a:t>
             </a:fld>
             <a:endParaRPr lang="en-US"/>
           </a:p>
@@ -833,7 +834,7 @@
           <a:p>
             <a:fld id="{F33E01E3-981B-4CB5-81ED-65C622C255CB}" type="slidenum">
               <a:rPr lang="en-US" smtClean="0"/>
-              <a:t>42</a:t>
+              <a:t>43</a:t>
             </a:fld>
             <a:endParaRPr lang="en-US"/>
           </a:p>
@@ -920,7 +921,7 @@
           <a:p>
             <a:fld id="{F33E01E3-981B-4CB5-81ED-65C622C255CB}" type="slidenum">
               <a:rPr lang="en-US" smtClean="0"/>
-              <a:t>43</a:t>
+              <a:t>44</a:t>
             </a:fld>
             <a:endParaRPr lang="en-US"/>
           </a:p>
@@ -1086,7 +1087,7 @@
           <a:p>
             <a:fld id="{6E4A31BF-7266-4BEB-918B-ADC21C630A6F}" type="datetimeFigureOut">
               <a:rPr lang="en-US" smtClean="0"/>
-              <a:t>6/18/2022</a:t>
+              <a:t>6/21/2022</a:t>
             </a:fld>
             <a:endParaRPr lang="en-US"/>
           </a:p>
@@ -1284,7 +1285,7 @@
           <a:p>
             <a:fld id="{6E4A31BF-7266-4BEB-918B-ADC21C630A6F}" type="datetimeFigureOut">
               <a:rPr lang="en-US" smtClean="0"/>
-              <a:t>6/18/2022</a:t>
+              <a:t>6/21/2022</a:t>
             </a:fld>
             <a:endParaRPr lang="en-US"/>
           </a:p>
@@ -1492,7 +1493,7 @@
           <a:p>
             <a:fld id="{6E4A31BF-7266-4BEB-918B-ADC21C630A6F}" type="datetimeFigureOut">
               <a:rPr lang="en-US" smtClean="0"/>
-              <a:t>6/18/2022</a:t>
+              <a:t>6/21/2022</a:t>
             </a:fld>
             <a:endParaRPr lang="en-US"/>
           </a:p>
@@ -1690,7 +1691,7 @@
           <a:p>
             <a:fld id="{6E4A31BF-7266-4BEB-918B-ADC21C630A6F}" type="datetimeFigureOut">
               <a:rPr lang="en-US" smtClean="0"/>
-              <a:t>6/18/2022</a:t>
+              <a:t>6/21/2022</a:t>
             </a:fld>
             <a:endParaRPr lang="en-US"/>
           </a:p>
@@ -1965,7 +1966,7 @@
           <a:p>
             <a:fld id="{6E4A31BF-7266-4BEB-918B-ADC21C630A6F}" type="datetimeFigureOut">
               <a:rPr lang="en-US" smtClean="0"/>
-              <a:t>6/18/2022</a:t>
+              <a:t>6/21/2022</a:t>
             </a:fld>
             <a:endParaRPr lang="en-US"/>
           </a:p>
@@ -2230,7 +2231,7 @@
           <a:p>
             <a:fld id="{6E4A31BF-7266-4BEB-918B-ADC21C630A6F}" type="datetimeFigureOut">
               <a:rPr lang="en-US" smtClean="0"/>
-              <a:t>6/18/2022</a:t>
+              <a:t>6/21/2022</a:t>
             </a:fld>
             <a:endParaRPr lang="en-US"/>
           </a:p>
@@ -2642,7 +2643,7 @@
           <a:p>
             <a:fld id="{6E4A31BF-7266-4BEB-918B-ADC21C630A6F}" type="datetimeFigureOut">
               <a:rPr lang="en-US" smtClean="0"/>
-              <a:t>6/18/2022</a:t>
+              <a:t>6/21/2022</a:t>
             </a:fld>
             <a:endParaRPr lang="en-US"/>
           </a:p>
@@ -2783,7 +2784,7 @@
           <a:p>
             <a:fld id="{6E4A31BF-7266-4BEB-918B-ADC21C630A6F}" type="datetimeFigureOut">
               <a:rPr lang="en-US" smtClean="0"/>
-              <a:t>6/18/2022</a:t>
+              <a:t>6/21/2022</a:t>
             </a:fld>
             <a:endParaRPr lang="en-US"/>
           </a:p>
@@ -2896,7 +2897,7 @@
           <a:p>
             <a:fld id="{6E4A31BF-7266-4BEB-918B-ADC21C630A6F}" type="datetimeFigureOut">
               <a:rPr lang="en-US" smtClean="0"/>
-              <a:t>6/18/2022</a:t>
+              <a:t>6/21/2022</a:t>
             </a:fld>
             <a:endParaRPr lang="en-US"/>
           </a:p>
@@ -3207,7 +3208,7 @@
           <a:p>
             <a:fld id="{6E4A31BF-7266-4BEB-918B-ADC21C630A6F}" type="datetimeFigureOut">
               <a:rPr lang="en-US" smtClean="0"/>
-              <a:t>6/18/2022</a:t>
+              <a:t>6/21/2022</a:t>
             </a:fld>
             <a:endParaRPr lang="en-US"/>
           </a:p>
@@ -3495,7 +3496,7 @@
           <a:p>
             <a:fld id="{6E4A31BF-7266-4BEB-918B-ADC21C630A6F}" type="datetimeFigureOut">
               <a:rPr lang="en-US" smtClean="0"/>
-              <a:t>6/18/2022</a:t>
+              <a:t>6/21/2022</a:t>
             </a:fld>
             <a:endParaRPr lang="en-US"/>
           </a:p>
@@ -3736,7 +3737,7 @@
           <a:p>
             <a:fld id="{6E4A31BF-7266-4BEB-918B-ADC21C630A6F}" type="datetimeFigureOut">
               <a:rPr lang="en-US" smtClean="0"/>
-              <a:t>6/18/2022</a:t>
+              <a:t>6/21/2022</a:t>
             </a:fld>
             <a:endParaRPr lang="en-US"/>
           </a:p>
@@ -6284,6 +6285,202 @@
             </a:pPr>
             <a:r>
               <a:rPr lang="en-US" dirty="0"/>
+              <a:t>Timely release of assignment solutions is an important part of the learning process </a:t>
+            </a:r>
+          </a:p>
+          <a:p>
+            <a:r>
+              <a:rPr lang="en-US" b="1" dirty="0"/>
+              <a:t>Do not fall behind! </a:t>
+            </a:r>
+            <a:r>
+              <a:rPr lang="en-US" dirty="0"/>
+              <a:t>In a 7 week session there is very </a:t>
+            </a:r>
+            <a:r>
+              <a:rPr lang="en-US" b="1" dirty="0"/>
+              <a:t>little time to “catch-up”</a:t>
+            </a:r>
+            <a:endParaRPr lang="en-US" dirty="0"/>
+          </a:p>
+          <a:p>
+            <a:r>
+              <a:rPr lang="en-US" dirty="0"/>
+              <a:t>Late assignment policy:   </a:t>
+            </a:r>
+          </a:p>
+          <a:p>
+            <a:pPr lvl="1"/>
+            <a:r>
+              <a:rPr lang="en-US" dirty="0"/>
+              <a:t>Up to one day late - no penalty  </a:t>
+            </a:r>
+          </a:p>
+          <a:p>
+            <a:pPr lvl="1"/>
+            <a:r>
+              <a:rPr lang="en-US" dirty="0"/>
+              <a:t>Up to 4 days late - less 20% </a:t>
+            </a:r>
+          </a:p>
+          <a:p>
+            <a:pPr lvl="1"/>
+            <a:r>
+              <a:rPr lang="en-US" dirty="0"/>
+              <a:t>More than 4 days late - no credit   </a:t>
+            </a:r>
+          </a:p>
+          <a:p>
+            <a:pPr lvl="1"/>
+            <a:endParaRPr lang="en-US" dirty="0"/>
+          </a:p>
+          <a:p>
+            <a:pPr marL="0" indent="0">
+              <a:buNone/>
+            </a:pPr>
+            <a:r>
+              <a:rPr lang="en-US" dirty="0">
+                <a:solidFill>
+                  <a:srgbClr val="C00000"/>
+                </a:solidFill>
+              </a:rPr>
+              <a:t>Make sure you turn in work </a:t>
+            </a:r>
+            <a:r>
+              <a:rPr lang="en-US">
+                <a:solidFill>
+                  <a:srgbClr val="C00000"/>
+                </a:solidFill>
+              </a:rPr>
+              <a:t>on time!</a:t>
+            </a:r>
+            <a:endParaRPr lang="en-US" dirty="0">
+              <a:solidFill>
+                <a:srgbClr val="C00000"/>
+              </a:solidFill>
+            </a:endParaRPr>
+          </a:p>
+        </p:txBody>
+      </p:sp>
+      <p:sp>
+        <p:nvSpPr>
+          <p:cNvPr id="6" name="Title 1">
+            <a:extLst>
+              <a:ext uri="{FF2B5EF4-FFF2-40B4-BE49-F238E27FC236}">
+                <a16:creationId xmlns:a16="http://schemas.microsoft.com/office/drawing/2014/main" id="{CD29F70F-B868-451B-A65D-8721F4C7A2D9}"/>
+              </a:ext>
+            </a:extLst>
+          </p:cNvPr>
+          <p:cNvSpPr txBox="1">
+            <a:spLocks/>
+          </p:cNvSpPr>
+          <p:nvPr/>
+        </p:nvSpPr>
+        <p:spPr>
+          <a:xfrm>
+            <a:off x="838200" y="-635"/>
+            <a:ext cx="10515600" cy="1325563"/>
+          </a:xfrm>
+          <a:prstGeom prst="rect">
+            <a:avLst/>
+          </a:prstGeom>
+        </p:spPr>
+        <p:txBody>
+          <a:bodyPr vert="horz" lIns="91440" tIns="45720" rIns="91440" bIns="45720" rtlCol="0" anchor="ctr">
+            <a:normAutofit/>
+          </a:bodyPr>
+          <a:lstStyle>
+            <a:lvl1pPr algn="l" defTabSz="914400" rtl="0" eaLnBrk="1" latinLnBrk="0" hangingPunct="1">
+              <a:lnSpc>
+                <a:spcPct val="90000"/>
+              </a:lnSpc>
+              <a:spcBef>
+                <a:spcPct val="0"/>
+              </a:spcBef>
+              <a:buNone/>
+              <a:defRPr sz="4400" kern="1200">
+                <a:solidFill>
+                  <a:schemeClr val="tx1"/>
+                </a:solidFill>
+                <a:latin typeface="+mj-lt"/>
+                <a:ea typeface="+mj-ea"/>
+                <a:cs typeface="+mj-cs"/>
+              </a:defRPr>
+            </a:lvl1pPr>
+          </a:lstStyle>
+          <a:p>
+            <a:r>
+              <a:rPr lang="en-US" dirty="0">
+                <a:latin typeface="+mn-lt"/>
+              </a:rPr>
+              <a:t>Late Assignment Policy</a:t>
+            </a:r>
+          </a:p>
+        </p:txBody>
+      </p:sp>
+    </p:spTree>
+    <p:extLst>
+      <p:ext uri="{BB962C8B-B14F-4D97-AF65-F5344CB8AC3E}">
+        <p14:creationId xmlns:p14="http://schemas.microsoft.com/office/powerpoint/2010/main" val="1228520043"/>
+      </p:ext>
+    </p:extLst>
+  </p:cSld>
+  <p:clrMapOvr>
+    <a:masterClrMapping/>
+  </p:clrMapOvr>
+</p:sld>
+</file>
+
+<file path=ppt/slides/slide14.xml><?xml version="1.0" encoding="utf-8"?>
+<p:sld xmlns:a="http://schemas.openxmlformats.org/drawingml/2006/main" xmlns:r="http://schemas.openxmlformats.org/officeDocument/2006/relationships" xmlns:p="http://schemas.openxmlformats.org/presentationml/2006/main">
+  <p:cSld>
+    <p:spTree>
+      <p:nvGrpSpPr>
+        <p:cNvPr id="1" name=""/>
+        <p:cNvGrpSpPr/>
+        <p:nvPr/>
+      </p:nvGrpSpPr>
+      <p:grpSpPr>
+        <a:xfrm>
+          <a:off x="0" y="0"/>
+          <a:ext cx="0" cy="0"/>
+          <a:chOff x="0" y="0"/>
+          <a:chExt cx="0" cy="0"/>
+        </a:xfrm>
+      </p:grpSpPr>
+      <p:sp>
+        <p:nvSpPr>
+          <p:cNvPr id="3" name="Content Placeholder 2">
+            <a:extLst>
+              <a:ext uri="{FF2B5EF4-FFF2-40B4-BE49-F238E27FC236}">
+                <a16:creationId xmlns:a16="http://schemas.microsoft.com/office/drawing/2014/main" id="{258E6AF3-7615-4BD1-878E-A94C93E98F90}"/>
+              </a:ext>
+            </a:extLst>
+          </p:cNvPr>
+          <p:cNvSpPr>
+            <a:spLocks noGrp="1"/>
+          </p:cNvSpPr>
+          <p:nvPr>
+            <p:ph idx="1"/>
+          </p:nvPr>
+        </p:nvSpPr>
+        <p:spPr>
+          <a:xfrm>
+            <a:off x="838200" y="1324927"/>
+            <a:ext cx="10515600" cy="4898217"/>
+          </a:xfrm>
+        </p:spPr>
+        <p:txBody>
+          <a:bodyPr>
+            <a:normAutofit/>
+          </a:bodyPr>
+          <a:lstStyle/>
+          <a:p>
+            <a:pPr marL="0" indent="0">
+              <a:buNone/>
+            </a:pPr>
+            <a:r>
+              <a:rPr lang="en-US" dirty="0"/>
               <a:t>Difficulties created by size and complexity of Data</a:t>
             </a:r>
           </a:p>
@@ -6975,7 +7172,7 @@
 </p:sld>
 </file>
 
-<file path=ppt/slides/slide14.xml><?xml version="1.0" encoding="utf-8"?>
+<file path=ppt/slides/slide15.xml><?xml version="1.0" encoding="utf-8"?>
 <p:sld xmlns:a="http://schemas.openxmlformats.org/drawingml/2006/main" xmlns:r="http://schemas.openxmlformats.org/officeDocument/2006/relationships" xmlns:p="http://schemas.openxmlformats.org/presentationml/2006/main">
   <p:cSld>
     <p:spTree>
@@ -7851,7 +8048,7 @@
 </p:sld>
 </file>
 
-<file path=ppt/slides/slide15.xml><?xml version="1.0" encoding="utf-8"?>
+<file path=ppt/slides/slide16.xml><?xml version="1.0" encoding="utf-8"?>
 <p:sld xmlns:a="http://schemas.openxmlformats.org/drawingml/2006/main" xmlns:r="http://schemas.openxmlformats.org/officeDocument/2006/relationships" xmlns:p="http://schemas.openxmlformats.org/presentationml/2006/main">
   <p:cSld>
     <p:spTree>
@@ -8538,7 +8735,7 @@
 </p:sld>
 </file>
 
-<file path=ppt/slides/slide16.xml><?xml version="1.0" encoding="utf-8"?>
+<file path=ppt/slides/slide17.xml><?xml version="1.0" encoding="utf-8"?>
 <p:sld xmlns:a="http://schemas.openxmlformats.org/drawingml/2006/main" xmlns:r="http://schemas.openxmlformats.org/officeDocument/2006/relationships" xmlns:p="http://schemas.openxmlformats.org/presentationml/2006/main">
   <p:cSld>
     <p:spTree>
@@ -9051,7 +9248,7 @@
 </p:sld>
 </file>
 
-<file path=ppt/slides/slide17.xml><?xml version="1.0" encoding="utf-8"?>
+<file path=ppt/slides/slide18.xml><?xml version="1.0" encoding="utf-8"?>
 <p:sld xmlns:a="http://schemas.openxmlformats.org/drawingml/2006/main" xmlns:r="http://schemas.openxmlformats.org/officeDocument/2006/relationships" xmlns:p="http://schemas.openxmlformats.org/presentationml/2006/main">
   <p:cSld>
     <p:spTree>
@@ -9873,7 +10070,7 @@
 </p:sld>
 </file>
 
-<file path=ppt/slides/slide18.xml><?xml version="1.0" encoding="utf-8"?>
+<file path=ppt/slides/slide19.xml><?xml version="1.0" encoding="utf-8"?>
 <p:sld xmlns:a="http://schemas.openxmlformats.org/drawingml/2006/main" xmlns:r="http://schemas.openxmlformats.org/officeDocument/2006/relationships" xmlns:p="http://schemas.openxmlformats.org/presentationml/2006/main">
   <p:cSld>
     <p:spTree>
@@ -12281,633 +12478,6 @@
 </p:sld>
 </file>
 
-<file path=ppt/slides/slide19.xml><?xml version="1.0" encoding="utf-8"?>
-<p:sld xmlns:a="http://schemas.openxmlformats.org/drawingml/2006/main" xmlns:r="http://schemas.openxmlformats.org/officeDocument/2006/relationships" xmlns:p="http://schemas.openxmlformats.org/presentationml/2006/main">
-  <p:cSld>
-    <p:spTree>
-      <p:nvGrpSpPr>
-        <p:cNvPr id="1" name=""/>
-        <p:cNvGrpSpPr/>
-        <p:nvPr/>
-      </p:nvGrpSpPr>
-      <p:grpSpPr>
-        <a:xfrm>
-          <a:off x="0" y="0"/>
-          <a:ext cx="0" cy="0"/>
-          <a:chOff x="0" y="0"/>
-          <a:chExt cx="0" cy="0"/>
-        </a:xfrm>
-      </p:grpSpPr>
-      <mc:AlternateContent xmlns:mc="http://schemas.openxmlformats.org/markup-compatibility/2006" xmlns:a14="http://schemas.microsoft.com/office/drawing/2010/main">
-        <mc:Choice Requires="a14">
-          <p:sp>
-            <p:nvSpPr>
-              <p:cNvPr id="3" name="Content Placeholder 2">
-                <a:extLst>
-                  <a:ext uri="{FF2B5EF4-FFF2-40B4-BE49-F238E27FC236}">
-                    <a16:creationId xmlns:a16="http://schemas.microsoft.com/office/drawing/2014/main" id="{258E6AF3-7615-4BD1-878E-A94C93E98F90}"/>
-                  </a:ext>
-                </a:extLst>
-              </p:cNvPr>
-              <p:cNvSpPr>
-                <a:spLocks noGrp="1"/>
-              </p:cNvSpPr>
-              <p:nvPr>
-                <p:ph idx="1"/>
-              </p:nvPr>
-            </p:nvSpPr>
-            <p:spPr>
-              <a:xfrm>
-                <a:off x="838200" y="1324928"/>
-                <a:ext cx="10515600" cy="5133349"/>
-              </a:xfrm>
-            </p:spPr>
-            <p:txBody>
-              <a:bodyPr>
-                <a:normAutofit/>
-              </a:bodyPr>
-              <a:lstStyle/>
-              <a:p>
-                <a:pPr marL="0" indent="0">
-                  <a:buNone/>
-                </a:pPr>
-                <a:r>
-                  <a:rPr lang="en-US" sz="3200" dirty="0"/>
-                  <a:t>What are </a:t>
-                </a:r>
-                <a:r>
-                  <a:rPr lang="en-US" sz="3200" b="1" dirty="0"/>
-                  <a:t>hash functions</a:t>
-                </a:r>
-                <a:r>
-                  <a:rPr lang="en-US" sz="3200" dirty="0"/>
-                  <a:t>?   </a:t>
-                </a:r>
-              </a:p>
-              <a:p>
-                <a:r>
-                  <a:rPr lang="en-US" sz="3000" dirty="0"/>
-                  <a:t>Hash key</a:t>
-                </a:r>
-                <a:r>
-                  <a:rPr lang="en-US" dirty="0"/>
-                  <a:t>s used to rapidly index </a:t>
-                </a:r>
-                <a:r>
-                  <a:rPr lang="en-US" b="1" dirty="0"/>
-                  <a:t>hash tables</a:t>
-                </a:r>
-              </a:p>
-              <a:p>
-                <a:r>
-                  <a:rPr lang="en-US" sz="3000" dirty="0"/>
-                  <a:t>Hash index is computed from a key using a </a:t>
-                </a:r>
-                <a:r>
-                  <a:rPr lang="en-US" sz="3000" b="1" dirty="0"/>
-                  <a:t>hash function</a:t>
-                </a:r>
-              </a:p>
-              <a:p>
-                <a:pPr marL="0" indent="0">
-                  <a:buNone/>
-                </a:pPr>
-                <a14:m>
-                  <m:oMathPara xmlns:m="http://schemas.openxmlformats.org/officeDocument/2006/math">
-                    <m:oMathParaPr>
-                      <m:jc m:val="centerGroup"/>
-                    </m:oMathParaPr>
-                    <m:oMath xmlns:m="http://schemas.openxmlformats.org/officeDocument/2006/math">
-                      <m:r>
-                        <a:rPr lang="en-US" sz="3200" i="1">
-                          <a:latin typeface="Cambria Math" panose="02040503050406030204" pitchFamily="18" charset="0"/>
-                        </a:rPr>
-                        <m:t>h</m:t>
-                      </m:r>
-                      <m:r>
-                        <a:rPr lang="en-US" sz="3200" i="1">
-                          <a:latin typeface="Cambria Math" panose="02040503050406030204" pitchFamily="18" charset="0"/>
-                        </a:rPr>
-                        <m:t>=</m:t>
-                      </m:r>
-                      <m:r>
-                        <a:rPr lang="en-US" sz="3200" i="1">
-                          <a:latin typeface="Cambria Math" panose="02040503050406030204" pitchFamily="18" charset="0"/>
-                        </a:rPr>
-                        <m:t>𝑓</m:t>
-                      </m:r>
-                      <m:d>
-                        <m:dPr>
-                          <m:ctrlPr>
-                            <a:rPr lang="en-US" sz="3200" i="1">
-                              <a:latin typeface="Cambria Math" panose="02040503050406030204" pitchFamily="18" charset="0"/>
-                            </a:rPr>
-                          </m:ctrlPr>
-                        </m:dPr>
-                        <m:e>
-                          <m:r>
-                            <a:rPr lang="en-US" sz="3200" i="1">
-                              <a:latin typeface="Cambria Math" panose="02040503050406030204" pitchFamily="18" charset="0"/>
-                            </a:rPr>
-                            <m:t>𝐾</m:t>
-                          </m:r>
-                        </m:e>
-                      </m:d>
-                    </m:oMath>
-                  </m:oMathPara>
-                </a14:m>
-                <a:endParaRPr lang="en-US" sz="3000" dirty="0"/>
-              </a:p>
-              <a:p>
-                <a:r>
-                  <a:rPr lang="en-US" sz="3000" dirty="0"/>
-                  <a:t>Same hash used for insertions and deletions in table</a:t>
-                </a:r>
-              </a:p>
-              <a:p>
-                <a:pPr marL="0" indent="0">
-                  <a:buNone/>
-                </a:pPr>
-                <a:endParaRPr lang="en-US" sz="3000" dirty="0"/>
-              </a:p>
-              <a:p>
-                <a:pPr marL="0" indent="0">
-                  <a:buNone/>
-                </a:pPr>
-                <a:r>
-                  <a:rPr lang="en-US" sz="2000" dirty="0"/>
-                  <a:t>You can find more about hash functions and hash tables in many sources online, including </a:t>
-                </a:r>
-                <a:r>
-                  <a:rPr lang="en-US" sz="2000" dirty="0">
-                    <a:hlinkClick r:id="rId2">
-                      <a:extLst>
-                        <a:ext uri="{A12FA001-AC4F-418D-AE19-62706E023703}">
-                          <ahyp:hlinkClr xmlns:ahyp="http://schemas.microsoft.com/office/drawing/2018/hyperlinkcolor" val="tx"/>
-                        </a:ext>
-                      </a:extLst>
-                    </a:hlinkClick>
-                  </a:rPr>
-                  <a:t>here</a:t>
-                </a:r>
-                <a:r>
-                  <a:rPr lang="en-US" sz="2000" dirty="0"/>
-                  <a:t> or </a:t>
-                </a:r>
-                <a:r>
-                  <a:rPr lang="en-US" sz="2000" dirty="0">
-                    <a:hlinkClick r:id="rId3">
-                      <a:extLst>
-                        <a:ext uri="{A12FA001-AC4F-418D-AE19-62706E023703}">
-                          <ahyp:hlinkClr xmlns:ahyp="http://schemas.microsoft.com/office/drawing/2018/hyperlinkcolor" val="tx"/>
-                        </a:ext>
-                      </a:extLst>
-                    </a:hlinkClick>
-                  </a:rPr>
-                  <a:t>here</a:t>
-                </a:r>
-                <a:endParaRPr lang="en-US" sz="2000" dirty="0"/>
-              </a:p>
-            </p:txBody>
-          </p:sp>
-        </mc:Choice>
-        <mc:Fallback xmlns="">
-          <p:sp>
-            <p:nvSpPr>
-              <p:cNvPr id="3" name="Content Placeholder 2">
-                <a:extLst>
-                  <a:ext uri="{FF2B5EF4-FFF2-40B4-BE49-F238E27FC236}">
-                    <a16:creationId xmlns:a16="http://schemas.microsoft.com/office/drawing/2014/main" id="{258E6AF3-7615-4BD1-878E-A94C93E98F90}"/>
-                  </a:ext>
-                </a:extLst>
-              </p:cNvPr>
-              <p:cNvSpPr>
-                <a:spLocks noGrp="1" noRot="1" noChangeAspect="1" noMove="1" noResize="1" noEditPoints="1" noAdjustHandles="1" noChangeArrowheads="1" noChangeShapeType="1" noTextEdit="1"/>
-              </p:cNvSpPr>
-              <p:nvPr>
-                <p:ph idx="1"/>
-              </p:nvPr>
-            </p:nvSpPr>
-            <p:spPr>
-              <a:xfrm>
-                <a:off x="838200" y="1324928"/>
-                <a:ext cx="10515600" cy="5133349"/>
-              </a:xfrm>
-              <a:blipFill>
-                <a:blip r:embed="rId4"/>
-                <a:stretch>
-                  <a:fillRect l="-1507" t="-2494"/>
-                </a:stretch>
-              </a:blipFill>
-            </p:spPr>
-            <p:txBody>
-              <a:bodyPr/>
-              <a:lstStyle/>
-              <a:p>
-                <a:r>
-                  <a:rPr lang="en-US">
-                    <a:noFill/>
-                  </a:rPr>
-                  <a:t> </a:t>
-                </a:r>
-              </a:p>
-            </p:txBody>
-          </p:sp>
-        </mc:Fallback>
-      </mc:AlternateContent>
-      <p:sp>
-        <p:nvSpPr>
-          <p:cNvPr id="6" name="Title 1">
-            <a:extLst>
-              <a:ext uri="{FF2B5EF4-FFF2-40B4-BE49-F238E27FC236}">
-                <a16:creationId xmlns:a16="http://schemas.microsoft.com/office/drawing/2014/main" id="{CD29F70F-B868-451B-A65D-8721F4C7A2D9}"/>
-              </a:ext>
-            </a:extLst>
-          </p:cNvPr>
-          <p:cNvSpPr txBox="1">
-            <a:spLocks/>
-          </p:cNvSpPr>
-          <p:nvPr/>
-        </p:nvSpPr>
-        <p:spPr>
-          <a:xfrm>
-            <a:off x="838200" y="-635"/>
-            <a:ext cx="10515600" cy="1325563"/>
-          </a:xfrm>
-          <a:prstGeom prst="rect">
-            <a:avLst/>
-          </a:prstGeom>
-        </p:spPr>
-        <p:txBody>
-          <a:bodyPr vert="horz" lIns="91440" tIns="45720" rIns="91440" bIns="45720" rtlCol="0" anchor="ctr">
-            <a:normAutofit/>
-          </a:bodyPr>
-          <a:lstStyle>
-            <a:lvl1pPr algn="l" defTabSz="914400" rtl="0" eaLnBrk="1" latinLnBrk="0" hangingPunct="1">
-              <a:lnSpc>
-                <a:spcPct val="90000"/>
-              </a:lnSpc>
-              <a:spcBef>
-                <a:spcPct val="0"/>
-              </a:spcBef>
-              <a:buNone/>
-              <a:defRPr sz="4400" kern="1200">
-                <a:solidFill>
-                  <a:schemeClr val="tx1"/>
-                </a:solidFill>
-                <a:latin typeface="+mj-lt"/>
-                <a:ea typeface="+mj-ea"/>
-                <a:cs typeface="+mj-cs"/>
-              </a:defRPr>
-            </a:lvl1pPr>
-          </a:lstStyle>
-          <a:p>
-            <a:r>
-              <a:rPr lang="en-US" dirty="0">
-                <a:latin typeface="+mn-lt"/>
-              </a:rPr>
-              <a:t>Introduction to Hashing</a:t>
-            </a:r>
-          </a:p>
-        </p:txBody>
-      </p:sp>
-    </p:spTree>
-    <p:extLst>
-      <p:ext uri="{BB962C8B-B14F-4D97-AF65-F5344CB8AC3E}">
-        <p14:creationId xmlns:p14="http://schemas.microsoft.com/office/powerpoint/2010/main" val="3903915400"/>
-      </p:ext>
-    </p:extLst>
-  </p:cSld>
-  <p:clrMapOvr>
-    <a:masterClrMapping/>
-  </p:clrMapOvr>
-  <p:timing>
-    <p:tnLst>
-      <p:par>
-        <p:cTn id="1" dur="indefinite" restart="never" nodeType="tmRoot">
-          <p:childTnLst>
-            <p:seq concurrent="1" nextAc="seek">
-              <p:cTn id="2" dur="indefinite" nodeType="mainSeq">
-                <p:childTnLst>
-                  <p:par>
-                    <p:cTn id="3" fill="hold">
-                      <p:stCondLst>
-                        <p:cond delay="indefinite"/>
-                      </p:stCondLst>
-                      <p:childTnLst>
-                        <p:par>
-                          <p:cTn id="4" fill="hold">
-                            <p:stCondLst>
-                              <p:cond delay="0"/>
-                            </p:stCondLst>
-                            <p:childTnLst>
-                              <p:par>
-                                <p:cTn id="5" presetID="1" presetClass="entr" presetSubtype="0" fill="hold" nodeType="clickEffect">
-                                  <p:stCondLst>
-                                    <p:cond delay="0"/>
-                                  </p:stCondLst>
-                                  <p:childTnLst>
-                                    <p:set>
-                                      <p:cBhvr>
-                                        <p:cTn id="6" dur="1" fill="hold">
-                                          <p:stCondLst>
-                                            <p:cond delay="0"/>
-                                          </p:stCondLst>
-                                        </p:cTn>
-                                        <p:tgtEl>
-                                          <p:spTgt spid="3">
-                                            <p:txEl>
-                                              <p:pRg st="0" end="0"/>
-                                            </p:txEl>
-                                          </p:spTgt>
-                                        </p:tgtEl>
-                                        <p:attrNameLst>
-                                          <p:attrName>style.visibility</p:attrName>
-                                        </p:attrNameLst>
-                                      </p:cBhvr>
-                                      <p:to>
-                                        <p:strVal val="visible"/>
-                                      </p:to>
-                                    </p:set>
-                                  </p:childTnLst>
-                                </p:cTn>
-                              </p:par>
-                            </p:childTnLst>
-                          </p:cTn>
-                        </p:par>
-                      </p:childTnLst>
-                    </p:cTn>
-                  </p:par>
-                  <p:par>
-                    <p:cTn id="7" fill="hold">
-                      <p:stCondLst>
-                        <p:cond delay="indefinite"/>
-                      </p:stCondLst>
-                      <p:childTnLst>
-                        <p:par>
-                          <p:cTn id="8" fill="hold">
-                            <p:stCondLst>
-                              <p:cond delay="0"/>
-                            </p:stCondLst>
-                            <p:childTnLst>
-                              <p:par>
-                                <p:cTn id="9" presetID="1" presetClass="entr" presetSubtype="0" fill="hold" nodeType="clickEffect">
-                                  <p:stCondLst>
-                                    <p:cond delay="0"/>
-                                  </p:stCondLst>
-                                  <p:childTnLst>
-                                    <p:set>
-                                      <p:cBhvr>
-                                        <p:cTn id="10" dur="1" fill="hold">
-                                          <p:stCondLst>
-                                            <p:cond delay="0"/>
-                                          </p:stCondLst>
-                                        </p:cTn>
-                                        <p:tgtEl>
-                                          <p:spTgt spid="3">
-                                            <p:txEl>
-                                              <p:pRg st="1" end="1"/>
-                                            </p:txEl>
-                                          </p:spTgt>
-                                        </p:tgtEl>
-                                        <p:attrNameLst>
-                                          <p:attrName>style.visibility</p:attrName>
-                                        </p:attrNameLst>
-                                      </p:cBhvr>
-                                      <p:to>
-                                        <p:strVal val="visible"/>
-                                      </p:to>
-                                    </p:set>
-                                  </p:childTnLst>
-                                </p:cTn>
-                              </p:par>
-                            </p:childTnLst>
-                          </p:cTn>
-                        </p:par>
-                      </p:childTnLst>
-                    </p:cTn>
-                  </p:par>
-                  <p:par>
-                    <p:cTn id="11" fill="hold">
-                      <p:stCondLst>
-                        <p:cond delay="indefinite"/>
-                      </p:stCondLst>
-                      <p:childTnLst>
-                        <p:par>
-                          <p:cTn id="12" fill="hold">
-                            <p:stCondLst>
-                              <p:cond delay="0"/>
-                            </p:stCondLst>
-                            <p:childTnLst>
-                              <p:par>
-                                <p:cTn id="13" presetID="1" presetClass="entr" presetSubtype="0" fill="hold" nodeType="clickEffect">
-                                  <p:stCondLst>
-                                    <p:cond delay="0"/>
-                                  </p:stCondLst>
-                                  <p:childTnLst>
-                                    <p:set>
-                                      <p:cBhvr>
-                                        <p:cTn id="14" dur="1" fill="hold">
-                                          <p:stCondLst>
-                                            <p:cond delay="0"/>
-                                          </p:stCondLst>
-                                        </p:cTn>
-                                        <p:tgtEl>
-                                          <p:spTgt spid="3">
-                                            <p:txEl>
-                                              <p:pRg st="2" end="2"/>
-                                            </p:txEl>
-                                          </p:spTgt>
-                                        </p:tgtEl>
-                                        <p:attrNameLst>
-                                          <p:attrName>style.visibility</p:attrName>
-                                        </p:attrNameLst>
-                                      </p:cBhvr>
-                                      <p:to>
-                                        <p:strVal val="visible"/>
-                                      </p:to>
-                                    </p:set>
-                                  </p:childTnLst>
-                                </p:cTn>
-                              </p:par>
-                            </p:childTnLst>
-                          </p:cTn>
-                        </p:par>
-                      </p:childTnLst>
-                    </p:cTn>
-                  </p:par>
-                  <p:par>
-                    <p:cTn id="15" fill="hold">
-                      <p:stCondLst>
-                        <p:cond delay="indefinite"/>
-                      </p:stCondLst>
-                      <p:childTnLst>
-                        <p:par>
-                          <p:cTn id="16" fill="hold">
-                            <p:stCondLst>
-                              <p:cond delay="0"/>
-                            </p:stCondLst>
-                            <p:childTnLst>
-                              <p:par>
-                                <p:cTn id="17" presetID="1" presetClass="entr" presetSubtype="0" fill="hold" nodeType="clickEffect">
-                                  <p:stCondLst>
-                                    <p:cond delay="0"/>
-                                  </p:stCondLst>
-                                  <p:childTnLst>
-                                    <p:set>
-                                      <p:cBhvr>
-                                        <p:cTn id="18" dur="1" fill="hold">
-                                          <p:stCondLst>
-                                            <p:cond delay="0"/>
-                                          </p:stCondLst>
-                                        </p:cTn>
-                                        <p:tgtEl>
-                                          <p:spTgt spid="3">
-                                            <p:txEl>
-                                              <p:pRg st="3" end="3"/>
-                                            </p:txEl>
-                                          </p:spTgt>
-                                        </p:tgtEl>
-                                        <p:attrNameLst>
-                                          <p:attrName>style.visibility</p:attrName>
-                                        </p:attrNameLst>
-                                      </p:cBhvr>
-                                      <p:to>
-                                        <p:strVal val="visible"/>
-                                      </p:to>
-                                    </p:set>
-                                  </p:childTnLst>
-                                </p:cTn>
-                              </p:par>
-                            </p:childTnLst>
-                          </p:cTn>
-                        </p:par>
-                      </p:childTnLst>
-                    </p:cTn>
-                  </p:par>
-                  <p:par>
-                    <p:cTn id="19" fill="hold">
-                      <p:stCondLst>
-                        <p:cond delay="indefinite"/>
-                      </p:stCondLst>
-                      <p:childTnLst>
-                        <p:par>
-                          <p:cTn id="20" fill="hold">
-                            <p:stCondLst>
-                              <p:cond delay="0"/>
-                            </p:stCondLst>
-                            <p:childTnLst>
-                              <p:par>
-                                <p:cTn id="21" presetID="1" presetClass="entr" presetSubtype="0" fill="hold" nodeType="clickEffect">
-                                  <p:stCondLst>
-                                    <p:cond delay="0"/>
-                                  </p:stCondLst>
-                                  <p:childTnLst>
-                                    <p:set>
-                                      <p:cBhvr>
-                                        <p:cTn id="22" dur="1" fill="hold">
-                                          <p:stCondLst>
-                                            <p:cond delay="0"/>
-                                          </p:stCondLst>
-                                        </p:cTn>
-                                        <p:tgtEl>
-                                          <p:spTgt spid="3">
-                                            <p:txEl>
-                                              <p:pRg st="4" end="4"/>
-                                            </p:txEl>
-                                          </p:spTgt>
-                                        </p:tgtEl>
-                                        <p:attrNameLst>
-                                          <p:attrName>style.visibility</p:attrName>
-                                        </p:attrNameLst>
-                                      </p:cBhvr>
-                                      <p:to>
-                                        <p:strVal val="visible"/>
-                                      </p:to>
-                                    </p:set>
-                                  </p:childTnLst>
-                                </p:cTn>
-                              </p:par>
-                            </p:childTnLst>
-                          </p:cTn>
-                        </p:par>
-                      </p:childTnLst>
-                    </p:cTn>
-                  </p:par>
-                  <p:par>
-                    <p:cTn id="23" fill="hold">
-                      <p:stCondLst>
-                        <p:cond delay="indefinite"/>
-                      </p:stCondLst>
-                      <p:childTnLst>
-                        <p:par>
-                          <p:cTn id="24" fill="hold">
-                            <p:stCondLst>
-                              <p:cond delay="0"/>
-                            </p:stCondLst>
-                            <p:childTnLst>
-                              <p:par>
-                                <p:cTn id="25" presetID="1" presetClass="entr" presetSubtype="0" fill="hold" nodeType="clickEffect">
-                                  <p:stCondLst>
-                                    <p:cond delay="0"/>
-                                  </p:stCondLst>
-                                  <p:childTnLst>
-                                    <p:set>
-                                      <p:cBhvr>
-                                        <p:cTn id="26" dur="1" fill="hold">
-                                          <p:stCondLst>
-                                            <p:cond delay="0"/>
-                                          </p:stCondLst>
-                                        </p:cTn>
-                                        <p:tgtEl>
-                                          <p:spTgt spid="3">
-                                            <p:txEl>
-                                              <p:pRg st="6" end="6"/>
-                                            </p:txEl>
-                                          </p:spTgt>
-                                        </p:tgtEl>
-                                        <p:attrNameLst>
-                                          <p:attrName>style.visibility</p:attrName>
-                                        </p:attrNameLst>
-                                      </p:cBhvr>
-                                      <p:to>
-                                        <p:strVal val="visible"/>
-                                      </p:to>
-                                    </p:set>
-                                  </p:childTnLst>
-                                </p:cTn>
-                              </p:par>
-                            </p:childTnLst>
-                          </p:cTn>
-                        </p:par>
-                      </p:childTnLst>
-                    </p:cTn>
-                  </p:par>
-                </p:childTnLst>
-              </p:cTn>
-              <p:prevCondLst>
-                <p:cond evt="onPrev" delay="0">
-                  <p:tgtEl>
-                    <p:sldTgt/>
-                  </p:tgtEl>
-                </p:cond>
-              </p:prevCondLst>
-              <p:nextCondLst>
-                <p:cond evt="onNext" delay="0">
-                  <p:tgtEl>
-                    <p:sldTgt/>
-                  </p:tgtEl>
-                </p:cond>
-              </p:nextCondLst>
-            </p:seq>
-          </p:childTnLst>
-        </p:cTn>
-      </p:par>
-    </p:tnLst>
-  </p:timing>
-</p:sld>
-</file>
-
 <file path=ppt/slides/slide2.xml><?xml version="1.0" encoding="utf-8"?>
 <p:sld xmlns:a="http://schemas.openxmlformats.org/drawingml/2006/main" xmlns:r="http://schemas.openxmlformats.org/officeDocument/2006/relationships" xmlns:p="http://schemas.openxmlformats.org/presentationml/2006/main">
   <p:cSld>
@@ -13438,6 +13008,633 @@
 </file>
 
 <file path=ppt/slides/slide20.xml><?xml version="1.0" encoding="utf-8"?>
+<p:sld xmlns:a="http://schemas.openxmlformats.org/drawingml/2006/main" xmlns:r="http://schemas.openxmlformats.org/officeDocument/2006/relationships" xmlns:p="http://schemas.openxmlformats.org/presentationml/2006/main">
+  <p:cSld>
+    <p:spTree>
+      <p:nvGrpSpPr>
+        <p:cNvPr id="1" name=""/>
+        <p:cNvGrpSpPr/>
+        <p:nvPr/>
+      </p:nvGrpSpPr>
+      <p:grpSpPr>
+        <a:xfrm>
+          <a:off x="0" y="0"/>
+          <a:ext cx="0" cy="0"/>
+          <a:chOff x="0" y="0"/>
+          <a:chExt cx="0" cy="0"/>
+        </a:xfrm>
+      </p:grpSpPr>
+      <mc:AlternateContent xmlns:mc="http://schemas.openxmlformats.org/markup-compatibility/2006" xmlns:a14="http://schemas.microsoft.com/office/drawing/2010/main">
+        <mc:Choice Requires="a14">
+          <p:sp>
+            <p:nvSpPr>
+              <p:cNvPr id="3" name="Content Placeholder 2">
+                <a:extLst>
+                  <a:ext uri="{FF2B5EF4-FFF2-40B4-BE49-F238E27FC236}">
+                    <a16:creationId xmlns:a16="http://schemas.microsoft.com/office/drawing/2014/main" id="{258E6AF3-7615-4BD1-878E-A94C93E98F90}"/>
+                  </a:ext>
+                </a:extLst>
+              </p:cNvPr>
+              <p:cNvSpPr>
+                <a:spLocks noGrp="1"/>
+              </p:cNvSpPr>
+              <p:nvPr>
+                <p:ph idx="1"/>
+              </p:nvPr>
+            </p:nvSpPr>
+            <p:spPr>
+              <a:xfrm>
+                <a:off x="838200" y="1324928"/>
+                <a:ext cx="10515600" cy="5133349"/>
+              </a:xfrm>
+            </p:spPr>
+            <p:txBody>
+              <a:bodyPr>
+                <a:normAutofit/>
+              </a:bodyPr>
+              <a:lstStyle/>
+              <a:p>
+                <a:pPr marL="0" indent="0">
+                  <a:buNone/>
+                </a:pPr>
+                <a:r>
+                  <a:rPr lang="en-US" sz="3200" dirty="0"/>
+                  <a:t>What are </a:t>
+                </a:r>
+                <a:r>
+                  <a:rPr lang="en-US" sz="3200" b="1" dirty="0"/>
+                  <a:t>hash functions</a:t>
+                </a:r>
+                <a:r>
+                  <a:rPr lang="en-US" sz="3200" dirty="0"/>
+                  <a:t>?   </a:t>
+                </a:r>
+              </a:p>
+              <a:p>
+                <a:r>
+                  <a:rPr lang="en-US" sz="3000" dirty="0"/>
+                  <a:t>Hash key</a:t>
+                </a:r>
+                <a:r>
+                  <a:rPr lang="en-US" dirty="0"/>
+                  <a:t>s used to rapidly index </a:t>
+                </a:r>
+                <a:r>
+                  <a:rPr lang="en-US" b="1" dirty="0"/>
+                  <a:t>hash tables</a:t>
+                </a:r>
+              </a:p>
+              <a:p>
+                <a:r>
+                  <a:rPr lang="en-US" sz="3000" dirty="0"/>
+                  <a:t>Hash index is computed from a key using a </a:t>
+                </a:r>
+                <a:r>
+                  <a:rPr lang="en-US" sz="3000" b="1" dirty="0"/>
+                  <a:t>hash function</a:t>
+                </a:r>
+              </a:p>
+              <a:p>
+                <a:pPr marL="0" indent="0">
+                  <a:buNone/>
+                </a:pPr>
+                <a14:m>
+                  <m:oMathPara xmlns:m="http://schemas.openxmlformats.org/officeDocument/2006/math">
+                    <m:oMathParaPr>
+                      <m:jc m:val="centerGroup"/>
+                    </m:oMathParaPr>
+                    <m:oMath xmlns:m="http://schemas.openxmlformats.org/officeDocument/2006/math">
+                      <m:r>
+                        <a:rPr lang="en-US" sz="3200" i="1">
+                          <a:latin typeface="Cambria Math" panose="02040503050406030204" pitchFamily="18" charset="0"/>
+                        </a:rPr>
+                        <m:t>h</m:t>
+                      </m:r>
+                      <m:r>
+                        <a:rPr lang="en-US" sz="3200" i="1">
+                          <a:latin typeface="Cambria Math" panose="02040503050406030204" pitchFamily="18" charset="0"/>
+                        </a:rPr>
+                        <m:t>=</m:t>
+                      </m:r>
+                      <m:r>
+                        <a:rPr lang="en-US" sz="3200" i="1">
+                          <a:latin typeface="Cambria Math" panose="02040503050406030204" pitchFamily="18" charset="0"/>
+                        </a:rPr>
+                        <m:t>𝑓</m:t>
+                      </m:r>
+                      <m:d>
+                        <m:dPr>
+                          <m:ctrlPr>
+                            <a:rPr lang="en-US" sz="3200" i="1">
+                              <a:latin typeface="Cambria Math" panose="02040503050406030204" pitchFamily="18" charset="0"/>
+                            </a:rPr>
+                          </m:ctrlPr>
+                        </m:dPr>
+                        <m:e>
+                          <m:r>
+                            <a:rPr lang="en-US" sz="3200" i="1">
+                              <a:latin typeface="Cambria Math" panose="02040503050406030204" pitchFamily="18" charset="0"/>
+                            </a:rPr>
+                            <m:t>𝐾</m:t>
+                          </m:r>
+                        </m:e>
+                      </m:d>
+                    </m:oMath>
+                  </m:oMathPara>
+                </a14:m>
+                <a:endParaRPr lang="en-US" sz="3000" dirty="0"/>
+              </a:p>
+              <a:p>
+                <a:r>
+                  <a:rPr lang="en-US" sz="3000" dirty="0"/>
+                  <a:t>Same hash used for insertions and deletions in table</a:t>
+                </a:r>
+              </a:p>
+              <a:p>
+                <a:pPr marL="0" indent="0">
+                  <a:buNone/>
+                </a:pPr>
+                <a:endParaRPr lang="en-US" sz="3000" dirty="0"/>
+              </a:p>
+              <a:p>
+                <a:pPr marL="0" indent="0">
+                  <a:buNone/>
+                </a:pPr>
+                <a:r>
+                  <a:rPr lang="en-US" sz="2000" dirty="0"/>
+                  <a:t>You can find more about hash functions and hash tables in many sources online, including </a:t>
+                </a:r>
+                <a:r>
+                  <a:rPr lang="en-US" sz="2000" dirty="0">
+                    <a:hlinkClick r:id="rId2">
+                      <a:extLst>
+                        <a:ext uri="{A12FA001-AC4F-418D-AE19-62706E023703}">
+                          <ahyp:hlinkClr xmlns:ahyp="http://schemas.microsoft.com/office/drawing/2018/hyperlinkcolor" val="tx"/>
+                        </a:ext>
+                      </a:extLst>
+                    </a:hlinkClick>
+                  </a:rPr>
+                  <a:t>here</a:t>
+                </a:r>
+                <a:r>
+                  <a:rPr lang="en-US" sz="2000" dirty="0"/>
+                  <a:t> or </a:t>
+                </a:r>
+                <a:r>
+                  <a:rPr lang="en-US" sz="2000" dirty="0">
+                    <a:hlinkClick r:id="rId3">
+                      <a:extLst>
+                        <a:ext uri="{A12FA001-AC4F-418D-AE19-62706E023703}">
+                          <ahyp:hlinkClr xmlns:ahyp="http://schemas.microsoft.com/office/drawing/2018/hyperlinkcolor" val="tx"/>
+                        </a:ext>
+                      </a:extLst>
+                    </a:hlinkClick>
+                  </a:rPr>
+                  <a:t>here</a:t>
+                </a:r>
+                <a:endParaRPr lang="en-US" sz="2000" dirty="0"/>
+              </a:p>
+            </p:txBody>
+          </p:sp>
+        </mc:Choice>
+        <mc:Fallback xmlns="">
+          <p:sp>
+            <p:nvSpPr>
+              <p:cNvPr id="3" name="Content Placeholder 2">
+                <a:extLst>
+                  <a:ext uri="{FF2B5EF4-FFF2-40B4-BE49-F238E27FC236}">
+                    <a16:creationId xmlns:a16="http://schemas.microsoft.com/office/drawing/2014/main" id="{258E6AF3-7615-4BD1-878E-A94C93E98F90}"/>
+                  </a:ext>
+                </a:extLst>
+              </p:cNvPr>
+              <p:cNvSpPr>
+                <a:spLocks noGrp="1" noRot="1" noChangeAspect="1" noMove="1" noResize="1" noEditPoints="1" noAdjustHandles="1" noChangeArrowheads="1" noChangeShapeType="1" noTextEdit="1"/>
+              </p:cNvSpPr>
+              <p:nvPr>
+                <p:ph idx="1"/>
+              </p:nvPr>
+            </p:nvSpPr>
+            <p:spPr>
+              <a:xfrm>
+                <a:off x="838200" y="1324928"/>
+                <a:ext cx="10515600" cy="5133349"/>
+              </a:xfrm>
+              <a:blipFill>
+                <a:blip r:embed="rId4"/>
+                <a:stretch>
+                  <a:fillRect l="-1507" t="-2494"/>
+                </a:stretch>
+              </a:blipFill>
+            </p:spPr>
+            <p:txBody>
+              <a:bodyPr/>
+              <a:lstStyle/>
+              <a:p>
+                <a:r>
+                  <a:rPr lang="en-US">
+                    <a:noFill/>
+                  </a:rPr>
+                  <a:t> </a:t>
+                </a:r>
+              </a:p>
+            </p:txBody>
+          </p:sp>
+        </mc:Fallback>
+      </mc:AlternateContent>
+      <p:sp>
+        <p:nvSpPr>
+          <p:cNvPr id="6" name="Title 1">
+            <a:extLst>
+              <a:ext uri="{FF2B5EF4-FFF2-40B4-BE49-F238E27FC236}">
+                <a16:creationId xmlns:a16="http://schemas.microsoft.com/office/drawing/2014/main" id="{CD29F70F-B868-451B-A65D-8721F4C7A2D9}"/>
+              </a:ext>
+            </a:extLst>
+          </p:cNvPr>
+          <p:cNvSpPr txBox="1">
+            <a:spLocks/>
+          </p:cNvSpPr>
+          <p:nvPr/>
+        </p:nvSpPr>
+        <p:spPr>
+          <a:xfrm>
+            <a:off x="838200" y="-635"/>
+            <a:ext cx="10515600" cy="1325563"/>
+          </a:xfrm>
+          <a:prstGeom prst="rect">
+            <a:avLst/>
+          </a:prstGeom>
+        </p:spPr>
+        <p:txBody>
+          <a:bodyPr vert="horz" lIns="91440" tIns="45720" rIns="91440" bIns="45720" rtlCol="0" anchor="ctr">
+            <a:normAutofit/>
+          </a:bodyPr>
+          <a:lstStyle>
+            <a:lvl1pPr algn="l" defTabSz="914400" rtl="0" eaLnBrk="1" latinLnBrk="0" hangingPunct="1">
+              <a:lnSpc>
+                <a:spcPct val="90000"/>
+              </a:lnSpc>
+              <a:spcBef>
+                <a:spcPct val="0"/>
+              </a:spcBef>
+              <a:buNone/>
+              <a:defRPr sz="4400" kern="1200">
+                <a:solidFill>
+                  <a:schemeClr val="tx1"/>
+                </a:solidFill>
+                <a:latin typeface="+mj-lt"/>
+                <a:ea typeface="+mj-ea"/>
+                <a:cs typeface="+mj-cs"/>
+              </a:defRPr>
+            </a:lvl1pPr>
+          </a:lstStyle>
+          <a:p>
+            <a:r>
+              <a:rPr lang="en-US" dirty="0">
+                <a:latin typeface="+mn-lt"/>
+              </a:rPr>
+              <a:t>Introduction to Hashing</a:t>
+            </a:r>
+          </a:p>
+        </p:txBody>
+      </p:sp>
+    </p:spTree>
+    <p:extLst>
+      <p:ext uri="{BB962C8B-B14F-4D97-AF65-F5344CB8AC3E}">
+        <p14:creationId xmlns:p14="http://schemas.microsoft.com/office/powerpoint/2010/main" val="3903915400"/>
+      </p:ext>
+    </p:extLst>
+  </p:cSld>
+  <p:clrMapOvr>
+    <a:masterClrMapping/>
+  </p:clrMapOvr>
+  <p:timing>
+    <p:tnLst>
+      <p:par>
+        <p:cTn id="1" dur="indefinite" restart="never" nodeType="tmRoot">
+          <p:childTnLst>
+            <p:seq concurrent="1" nextAc="seek">
+              <p:cTn id="2" dur="indefinite" nodeType="mainSeq">
+                <p:childTnLst>
+                  <p:par>
+                    <p:cTn id="3" fill="hold">
+                      <p:stCondLst>
+                        <p:cond delay="indefinite"/>
+                      </p:stCondLst>
+                      <p:childTnLst>
+                        <p:par>
+                          <p:cTn id="4" fill="hold">
+                            <p:stCondLst>
+                              <p:cond delay="0"/>
+                            </p:stCondLst>
+                            <p:childTnLst>
+                              <p:par>
+                                <p:cTn id="5" presetID="1" presetClass="entr" presetSubtype="0" fill="hold" nodeType="clickEffect">
+                                  <p:stCondLst>
+                                    <p:cond delay="0"/>
+                                  </p:stCondLst>
+                                  <p:childTnLst>
+                                    <p:set>
+                                      <p:cBhvr>
+                                        <p:cTn id="6" dur="1" fill="hold">
+                                          <p:stCondLst>
+                                            <p:cond delay="0"/>
+                                          </p:stCondLst>
+                                        </p:cTn>
+                                        <p:tgtEl>
+                                          <p:spTgt spid="3">
+                                            <p:txEl>
+                                              <p:pRg st="0" end="0"/>
+                                            </p:txEl>
+                                          </p:spTgt>
+                                        </p:tgtEl>
+                                        <p:attrNameLst>
+                                          <p:attrName>style.visibility</p:attrName>
+                                        </p:attrNameLst>
+                                      </p:cBhvr>
+                                      <p:to>
+                                        <p:strVal val="visible"/>
+                                      </p:to>
+                                    </p:set>
+                                  </p:childTnLst>
+                                </p:cTn>
+                              </p:par>
+                            </p:childTnLst>
+                          </p:cTn>
+                        </p:par>
+                      </p:childTnLst>
+                    </p:cTn>
+                  </p:par>
+                  <p:par>
+                    <p:cTn id="7" fill="hold">
+                      <p:stCondLst>
+                        <p:cond delay="indefinite"/>
+                      </p:stCondLst>
+                      <p:childTnLst>
+                        <p:par>
+                          <p:cTn id="8" fill="hold">
+                            <p:stCondLst>
+                              <p:cond delay="0"/>
+                            </p:stCondLst>
+                            <p:childTnLst>
+                              <p:par>
+                                <p:cTn id="9" presetID="1" presetClass="entr" presetSubtype="0" fill="hold" nodeType="clickEffect">
+                                  <p:stCondLst>
+                                    <p:cond delay="0"/>
+                                  </p:stCondLst>
+                                  <p:childTnLst>
+                                    <p:set>
+                                      <p:cBhvr>
+                                        <p:cTn id="10" dur="1" fill="hold">
+                                          <p:stCondLst>
+                                            <p:cond delay="0"/>
+                                          </p:stCondLst>
+                                        </p:cTn>
+                                        <p:tgtEl>
+                                          <p:spTgt spid="3">
+                                            <p:txEl>
+                                              <p:pRg st="1" end="1"/>
+                                            </p:txEl>
+                                          </p:spTgt>
+                                        </p:tgtEl>
+                                        <p:attrNameLst>
+                                          <p:attrName>style.visibility</p:attrName>
+                                        </p:attrNameLst>
+                                      </p:cBhvr>
+                                      <p:to>
+                                        <p:strVal val="visible"/>
+                                      </p:to>
+                                    </p:set>
+                                  </p:childTnLst>
+                                </p:cTn>
+                              </p:par>
+                            </p:childTnLst>
+                          </p:cTn>
+                        </p:par>
+                      </p:childTnLst>
+                    </p:cTn>
+                  </p:par>
+                  <p:par>
+                    <p:cTn id="11" fill="hold">
+                      <p:stCondLst>
+                        <p:cond delay="indefinite"/>
+                      </p:stCondLst>
+                      <p:childTnLst>
+                        <p:par>
+                          <p:cTn id="12" fill="hold">
+                            <p:stCondLst>
+                              <p:cond delay="0"/>
+                            </p:stCondLst>
+                            <p:childTnLst>
+                              <p:par>
+                                <p:cTn id="13" presetID="1" presetClass="entr" presetSubtype="0" fill="hold" nodeType="clickEffect">
+                                  <p:stCondLst>
+                                    <p:cond delay="0"/>
+                                  </p:stCondLst>
+                                  <p:childTnLst>
+                                    <p:set>
+                                      <p:cBhvr>
+                                        <p:cTn id="14" dur="1" fill="hold">
+                                          <p:stCondLst>
+                                            <p:cond delay="0"/>
+                                          </p:stCondLst>
+                                        </p:cTn>
+                                        <p:tgtEl>
+                                          <p:spTgt spid="3">
+                                            <p:txEl>
+                                              <p:pRg st="2" end="2"/>
+                                            </p:txEl>
+                                          </p:spTgt>
+                                        </p:tgtEl>
+                                        <p:attrNameLst>
+                                          <p:attrName>style.visibility</p:attrName>
+                                        </p:attrNameLst>
+                                      </p:cBhvr>
+                                      <p:to>
+                                        <p:strVal val="visible"/>
+                                      </p:to>
+                                    </p:set>
+                                  </p:childTnLst>
+                                </p:cTn>
+                              </p:par>
+                            </p:childTnLst>
+                          </p:cTn>
+                        </p:par>
+                      </p:childTnLst>
+                    </p:cTn>
+                  </p:par>
+                  <p:par>
+                    <p:cTn id="15" fill="hold">
+                      <p:stCondLst>
+                        <p:cond delay="indefinite"/>
+                      </p:stCondLst>
+                      <p:childTnLst>
+                        <p:par>
+                          <p:cTn id="16" fill="hold">
+                            <p:stCondLst>
+                              <p:cond delay="0"/>
+                            </p:stCondLst>
+                            <p:childTnLst>
+                              <p:par>
+                                <p:cTn id="17" presetID="1" presetClass="entr" presetSubtype="0" fill="hold" nodeType="clickEffect">
+                                  <p:stCondLst>
+                                    <p:cond delay="0"/>
+                                  </p:stCondLst>
+                                  <p:childTnLst>
+                                    <p:set>
+                                      <p:cBhvr>
+                                        <p:cTn id="18" dur="1" fill="hold">
+                                          <p:stCondLst>
+                                            <p:cond delay="0"/>
+                                          </p:stCondLst>
+                                        </p:cTn>
+                                        <p:tgtEl>
+                                          <p:spTgt spid="3">
+                                            <p:txEl>
+                                              <p:pRg st="3" end="3"/>
+                                            </p:txEl>
+                                          </p:spTgt>
+                                        </p:tgtEl>
+                                        <p:attrNameLst>
+                                          <p:attrName>style.visibility</p:attrName>
+                                        </p:attrNameLst>
+                                      </p:cBhvr>
+                                      <p:to>
+                                        <p:strVal val="visible"/>
+                                      </p:to>
+                                    </p:set>
+                                  </p:childTnLst>
+                                </p:cTn>
+                              </p:par>
+                            </p:childTnLst>
+                          </p:cTn>
+                        </p:par>
+                      </p:childTnLst>
+                    </p:cTn>
+                  </p:par>
+                  <p:par>
+                    <p:cTn id="19" fill="hold">
+                      <p:stCondLst>
+                        <p:cond delay="indefinite"/>
+                      </p:stCondLst>
+                      <p:childTnLst>
+                        <p:par>
+                          <p:cTn id="20" fill="hold">
+                            <p:stCondLst>
+                              <p:cond delay="0"/>
+                            </p:stCondLst>
+                            <p:childTnLst>
+                              <p:par>
+                                <p:cTn id="21" presetID="1" presetClass="entr" presetSubtype="0" fill="hold" nodeType="clickEffect">
+                                  <p:stCondLst>
+                                    <p:cond delay="0"/>
+                                  </p:stCondLst>
+                                  <p:childTnLst>
+                                    <p:set>
+                                      <p:cBhvr>
+                                        <p:cTn id="22" dur="1" fill="hold">
+                                          <p:stCondLst>
+                                            <p:cond delay="0"/>
+                                          </p:stCondLst>
+                                        </p:cTn>
+                                        <p:tgtEl>
+                                          <p:spTgt spid="3">
+                                            <p:txEl>
+                                              <p:pRg st="4" end="4"/>
+                                            </p:txEl>
+                                          </p:spTgt>
+                                        </p:tgtEl>
+                                        <p:attrNameLst>
+                                          <p:attrName>style.visibility</p:attrName>
+                                        </p:attrNameLst>
+                                      </p:cBhvr>
+                                      <p:to>
+                                        <p:strVal val="visible"/>
+                                      </p:to>
+                                    </p:set>
+                                  </p:childTnLst>
+                                </p:cTn>
+                              </p:par>
+                            </p:childTnLst>
+                          </p:cTn>
+                        </p:par>
+                      </p:childTnLst>
+                    </p:cTn>
+                  </p:par>
+                  <p:par>
+                    <p:cTn id="23" fill="hold">
+                      <p:stCondLst>
+                        <p:cond delay="indefinite"/>
+                      </p:stCondLst>
+                      <p:childTnLst>
+                        <p:par>
+                          <p:cTn id="24" fill="hold">
+                            <p:stCondLst>
+                              <p:cond delay="0"/>
+                            </p:stCondLst>
+                            <p:childTnLst>
+                              <p:par>
+                                <p:cTn id="25" presetID="1" presetClass="entr" presetSubtype="0" fill="hold" nodeType="clickEffect">
+                                  <p:stCondLst>
+                                    <p:cond delay="0"/>
+                                  </p:stCondLst>
+                                  <p:childTnLst>
+                                    <p:set>
+                                      <p:cBhvr>
+                                        <p:cTn id="26" dur="1" fill="hold">
+                                          <p:stCondLst>
+                                            <p:cond delay="0"/>
+                                          </p:stCondLst>
+                                        </p:cTn>
+                                        <p:tgtEl>
+                                          <p:spTgt spid="3">
+                                            <p:txEl>
+                                              <p:pRg st="6" end="6"/>
+                                            </p:txEl>
+                                          </p:spTgt>
+                                        </p:tgtEl>
+                                        <p:attrNameLst>
+                                          <p:attrName>style.visibility</p:attrName>
+                                        </p:attrNameLst>
+                                      </p:cBhvr>
+                                      <p:to>
+                                        <p:strVal val="visible"/>
+                                      </p:to>
+                                    </p:set>
+                                  </p:childTnLst>
+                                </p:cTn>
+                              </p:par>
+                            </p:childTnLst>
+                          </p:cTn>
+                        </p:par>
+                      </p:childTnLst>
+                    </p:cTn>
+                  </p:par>
+                </p:childTnLst>
+              </p:cTn>
+              <p:prevCondLst>
+                <p:cond evt="onPrev" delay="0">
+                  <p:tgtEl>
+                    <p:sldTgt/>
+                  </p:tgtEl>
+                </p:cond>
+              </p:prevCondLst>
+              <p:nextCondLst>
+                <p:cond evt="onNext" delay="0">
+                  <p:tgtEl>
+                    <p:sldTgt/>
+                  </p:tgtEl>
+                </p:cond>
+              </p:nextCondLst>
+            </p:seq>
+          </p:childTnLst>
+        </p:cTn>
+      </p:par>
+    </p:tnLst>
+  </p:timing>
+</p:sld>
+</file>
+
+<file path=ppt/slides/slide21.xml><?xml version="1.0" encoding="utf-8"?>
 <p:sld xmlns:a="http://schemas.openxmlformats.org/drawingml/2006/main" xmlns:r="http://schemas.openxmlformats.org/officeDocument/2006/relationships" xmlns:p="http://schemas.openxmlformats.org/presentationml/2006/main">
   <p:cSld>
     <p:spTree>
@@ -16289,7 +16486,7 @@
 </p:sld>
 </file>
 
-<file path=ppt/slides/slide21.xml><?xml version="1.0" encoding="utf-8"?>
+<file path=ppt/slides/slide22.xml><?xml version="1.0" encoding="utf-8"?>
 <p:sld xmlns:a="http://schemas.openxmlformats.org/drawingml/2006/main" xmlns:r="http://schemas.openxmlformats.org/officeDocument/2006/relationships" xmlns:p="http://schemas.openxmlformats.org/presentationml/2006/main">
   <p:cSld>
     <p:spTree>
@@ -19164,7 +19361,7 @@
 </p:sld>
 </file>
 
-<file path=ppt/slides/slide22.xml><?xml version="1.0" encoding="utf-8"?>
+<file path=ppt/slides/slide23.xml><?xml version="1.0" encoding="utf-8"?>
 <p:sld xmlns:a="http://schemas.openxmlformats.org/drawingml/2006/main" xmlns:r="http://schemas.openxmlformats.org/officeDocument/2006/relationships" xmlns:p="http://schemas.openxmlformats.org/presentationml/2006/main">
   <p:cSld>
     <p:spTree>
@@ -20024,7 +20221,7 @@
 </p:sld>
 </file>
 
-<file path=ppt/slides/slide23.xml><?xml version="1.0" encoding="utf-8"?>
+<file path=ppt/slides/slide24.xml><?xml version="1.0" encoding="utf-8"?>
 <p:sld xmlns:a="http://schemas.openxmlformats.org/drawingml/2006/main" xmlns:r="http://schemas.openxmlformats.org/officeDocument/2006/relationships" xmlns:p="http://schemas.openxmlformats.org/presentationml/2006/main">
   <p:cSld>
     <p:spTree>
@@ -21047,7 +21244,7 @@
 </p:sld>
 </file>
 
-<file path=ppt/slides/slide24.xml><?xml version="1.0" encoding="utf-8"?>
+<file path=ppt/slides/slide25.xml><?xml version="1.0" encoding="utf-8"?>
 <p:sld xmlns:a="http://schemas.openxmlformats.org/drawingml/2006/main" xmlns:r="http://schemas.openxmlformats.org/officeDocument/2006/relationships" xmlns:p="http://schemas.openxmlformats.org/presentationml/2006/main">
   <p:cSld>
     <p:spTree>
@@ -22075,7 +22272,7 @@
 </p:sld>
 </file>
 
-<file path=ppt/slides/slide25.xml><?xml version="1.0" encoding="utf-8"?>
+<file path=ppt/slides/slide26.xml><?xml version="1.0" encoding="utf-8"?>
 <p:sld xmlns:a="http://schemas.openxmlformats.org/drawingml/2006/main" xmlns:r="http://schemas.openxmlformats.org/officeDocument/2006/relationships" xmlns:p="http://schemas.openxmlformats.org/presentationml/2006/main">
   <p:cSld>
     <p:spTree>
@@ -22738,7 +22935,7 @@
 </p:sld>
 </file>
 
-<file path=ppt/slides/slide26.xml><?xml version="1.0" encoding="utf-8"?>
+<file path=ppt/slides/slide27.xml><?xml version="1.0" encoding="utf-8"?>
 <p:sld xmlns:a="http://schemas.openxmlformats.org/drawingml/2006/main" xmlns:r="http://schemas.openxmlformats.org/officeDocument/2006/relationships" xmlns:p="http://schemas.openxmlformats.org/presentationml/2006/main">
   <p:cSld>
     <p:spTree>
@@ -23366,7 +23563,7 @@
 </p:sld>
 </file>
 
-<file path=ppt/slides/slide27.xml><?xml version="1.0" encoding="utf-8"?>
+<file path=ppt/slides/slide28.xml><?xml version="1.0" encoding="utf-8"?>
 <p:sld xmlns:a="http://schemas.openxmlformats.org/drawingml/2006/main" xmlns:r="http://schemas.openxmlformats.org/officeDocument/2006/relationships" xmlns:p="http://schemas.openxmlformats.org/presentationml/2006/main">
   <p:cSld>
     <p:spTree>
@@ -24124,7 +24321,7 @@
 </p:sld>
 </file>
 
-<file path=ppt/slides/slide28.xml><?xml version="1.0" encoding="utf-8"?>
+<file path=ppt/slides/slide29.xml><?xml version="1.0" encoding="utf-8"?>
 <p:sld xmlns:a="http://schemas.openxmlformats.org/drawingml/2006/main" xmlns:r="http://schemas.openxmlformats.org/officeDocument/2006/relationships" xmlns:p="http://schemas.openxmlformats.org/presentationml/2006/main">
   <p:cSld>
     <p:spTree>
@@ -25109,705 +25306,6 @@
 </p:sld>
 </file>
 
-<file path=ppt/slides/slide29.xml><?xml version="1.0" encoding="utf-8"?>
-<p:sld xmlns:a="http://schemas.openxmlformats.org/drawingml/2006/main" xmlns:r="http://schemas.openxmlformats.org/officeDocument/2006/relationships" xmlns:p="http://schemas.openxmlformats.org/presentationml/2006/main">
-  <p:cSld>
-    <p:spTree>
-      <p:nvGrpSpPr>
-        <p:cNvPr id="1" name=""/>
-        <p:cNvGrpSpPr/>
-        <p:nvPr/>
-      </p:nvGrpSpPr>
-      <p:grpSpPr>
-        <a:xfrm>
-          <a:off x="0" y="0"/>
-          <a:ext cx="0" cy="0"/>
-          <a:chOff x="0" y="0"/>
-          <a:chExt cx="0" cy="0"/>
-        </a:xfrm>
-      </p:grpSpPr>
-      <p:sp>
-        <p:nvSpPr>
-          <p:cNvPr id="3" name="Content Placeholder 2">
-            <a:extLst>
-              <a:ext uri="{FF2B5EF4-FFF2-40B4-BE49-F238E27FC236}">
-                <a16:creationId xmlns:a16="http://schemas.microsoft.com/office/drawing/2014/main" id="{258E6AF3-7615-4BD1-878E-A94C93E98F90}"/>
-              </a:ext>
-            </a:extLst>
-          </p:cNvPr>
-          <p:cNvSpPr>
-            <a:spLocks noGrp="1"/>
-          </p:cNvSpPr>
-          <p:nvPr>
-            <p:ph idx="1"/>
-          </p:nvPr>
-        </p:nvSpPr>
-        <p:spPr>
-          <a:xfrm>
-            <a:off x="838200" y="1091544"/>
-            <a:ext cx="10515600" cy="5364154"/>
-          </a:xfrm>
-        </p:spPr>
-        <p:txBody>
-          <a:bodyPr>
-            <a:noAutofit/>
-          </a:bodyPr>
-          <a:lstStyle/>
-          <a:p>
-            <a:pPr marL="0" indent="0">
-              <a:buNone/>
-            </a:pPr>
-            <a:r>
-              <a:rPr lang="en-US" dirty="0"/>
-              <a:t>Evaluate an hypothesis test using the </a:t>
-            </a:r>
-            <a:r>
-              <a:rPr lang="en-US" b="1" dirty="0"/>
-              <a:t>p-value </a:t>
-            </a:r>
-            <a:r>
-              <a:rPr lang="en-US" dirty="0"/>
-              <a:t> </a:t>
-            </a:r>
-          </a:p>
-          <a:p>
-            <a:pPr marL="342900" indent="-342900">
-              <a:buFont typeface="Arial" panose="020B0604020202020204" pitchFamily="34" charset="0"/>
-              <a:buChar char="•"/>
-            </a:pPr>
-            <a:r>
-              <a:rPr lang="en-US" b="0" dirty="0">
-                <a:solidFill>
-                  <a:schemeClr val="tx1">
-                    <a:lumMod val="50000"/>
-                  </a:schemeClr>
-                </a:solidFill>
-              </a:rPr>
-              <a:t>The </a:t>
-            </a:r>
-            <a:r>
-              <a:rPr lang="en-US" b="1" dirty="0">
-                <a:solidFill>
-                  <a:schemeClr val="tx1">
-                    <a:lumMod val="50000"/>
-                  </a:schemeClr>
-                </a:solidFill>
-              </a:rPr>
-              <a:t>p-value is the probability of obtaining the sample with results at least this extreme from random variation alone when the null hypothesis is true</a:t>
-            </a:r>
-            <a:endParaRPr lang="en-US" b="0" dirty="0">
-              <a:solidFill>
-                <a:schemeClr val="tx1">
-                  <a:lumMod val="50000"/>
-                </a:schemeClr>
-              </a:solidFill>
-            </a:endParaRPr>
-          </a:p>
-          <a:p>
-            <a:pPr marL="342900" indent="-342900">
-              <a:buFont typeface="Arial" panose="020B0604020202020204" pitchFamily="34" charset="0"/>
-              <a:buChar char="•"/>
-            </a:pPr>
-            <a:r>
-              <a:rPr lang="en-US" b="0" dirty="0">
-                <a:solidFill>
-                  <a:schemeClr val="tx1">
-                    <a:lumMod val="50000"/>
-                  </a:schemeClr>
-                </a:solidFill>
-              </a:rPr>
-              <a:t>In other words </a:t>
-            </a:r>
-            <a:r>
-              <a:rPr lang="en-US" b="1" dirty="0">
-                <a:solidFill>
-                  <a:schemeClr val="tx1">
-                    <a:lumMod val="50000"/>
-                  </a:schemeClr>
-                </a:solidFill>
-              </a:rPr>
-              <a:t>p-value is the probability of getting a result that extreme or greater simply from random variation (random sampling) of the null distribution</a:t>
-            </a:r>
-          </a:p>
-          <a:p>
-            <a:pPr marL="844350" lvl="1" indent="-342900"/>
-            <a:r>
-              <a:rPr lang="en-US" b="0" dirty="0">
-                <a:solidFill>
-                  <a:schemeClr val="tx1">
-                    <a:lumMod val="50000"/>
-                  </a:schemeClr>
-                </a:solidFill>
-              </a:rPr>
-              <a:t>p-values are an </a:t>
-            </a:r>
-            <a:r>
-              <a:rPr lang="en-US" b="1" dirty="0">
-                <a:solidFill>
-                  <a:schemeClr val="tx1">
-                    <a:lumMod val="50000"/>
-                  </a:schemeClr>
-                </a:solidFill>
-              </a:rPr>
-              <a:t>order statistic,</a:t>
-            </a:r>
-            <a:r>
-              <a:rPr lang="en-US" dirty="0">
-                <a:solidFill>
-                  <a:schemeClr val="tx1">
-                    <a:lumMod val="50000"/>
-                  </a:schemeClr>
-                </a:solidFill>
-              </a:rPr>
-              <a:t> we accept or reject the null hypothesis based on the p-value</a:t>
-            </a:r>
-            <a:endParaRPr lang="en-US" b="1" dirty="0">
-              <a:solidFill>
-                <a:schemeClr val="tx1">
-                  <a:lumMod val="50000"/>
-                </a:schemeClr>
-              </a:solidFill>
-            </a:endParaRPr>
-          </a:p>
-          <a:p>
-            <a:pPr marL="342900" indent="-342900">
-              <a:buFont typeface="Arial" panose="020B0604020202020204" pitchFamily="34" charset="0"/>
-              <a:buChar char="•"/>
-            </a:pPr>
-            <a:r>
-              <a:rPr lang="en-US" b="0" dirty="0">
-                <a:solidFill>
-                  <a:schemeClr val="tx1">
-                    <a:lumMod val="50000"/>
-                  </a:schemeClr>
-                </a:solidFill>
-              </a:rPr>
-              <a:t>Lots of ways to </a:t>
-            </a:r>
-            <a:r>
-              <a:rPr lang="en-US" dirty="0">
-                <a:solidFill>
-                  <a:schemeClr val="tx1">
-                    <a:lumMod val="50000"/>
-                  </a:schemeClr>
-                </a:solidFill>
-              </a:rPr>
-              <a:t>misuse</a:t>
-            </a:r>
-            <a:r>
-              <a:rPr lang="en-US" b="0" dirty="0">
-                <a:solidFill>
-                  <a:schemeClr val="tx1">
-                    <a:lumMod val="50000"/>
-                  </a:schemeClr>
-                </a:solidFill>
-              </a:rPr>
-              <a:t> the p-value; some examples: </a:t>
-            </a:r>
-          </a:p>
-          <a:p>
-            <a:pPr lvl="1">
-              <a:buFont typeface="Wingdings" panose="05000000000000000000" pitchFamily="2" charset="2"/>
-              <a:buChar char="§"/>
-            </a:pPr>
-            <a:r>
-              <a:rPr lang="en-US" b="1" dirty="0">
-                <a:solidFill>
-                  <a:schemeClr val="tx1">
-                    <a:lumMod val="50000"/>
-                  </a:schemeClr>
-                </a:solidFill>
-              </a:rPr>
-              <a:t>p-value mining:</a:t>
-            </a:r>
-            <a:r>
-              <a:rPr lang="en-US" dirty="0">
-                <a:solidFill>
-                  <a:schemeClr val="tx1">
-                    <a:lumMod val="50000"/>
-                  </a:schemeClr>
-                </a:solidFill>
-              </a:rPr>
-              <a:t> test all relationships between variables to find the ‘significant’ ones</a:t>
-            </a:r>
-          </a:p>
-          <a:p>
-            <a:pPr lvl="1">
-              <a:buFont typeface="Wingdings" panose="05000000000000000000" pitchFamily="2" charset="2"/>
-              <a:buChar char="§"/>
-            </a:pPr>
-            <a:r>
-              <a:rPr lang="en-US" b="1" dirty="0">
-                <a:solidFill>
-                  <a:schemeClr val="tx1">
-                    <a:lumMod val="50000"/>
-                  </a:schemeClr>
-                </a:solidFill>
-              </a:rPr>
-              <a:t>Assuming a smaller p-value is ‘more significant’:</a:t>
-            </a:r>
-            <a:r>
-              <a:rPr lang="en-US" dirty="0">
-                <a:solidFill>
-                  <a:schemeClr val="tx1">
-                    <a:lumMod val="50000"/>
-                  </a:schemeClr>
-                </a:solidFill>
-              </a:rPr>
-              <a:t> p-values are just indicate the probability of a value being at least this extreme</a:t>
-            </a:r>
-            <a:endParaRPr lang="en-US" sz="2000" dirty="0">
-              <a:solidFill>
-                <a:schemeClr val="tx1">
-                  <a:lumMod val="50000"/>
-                </a:schemeClr>
-              </a:solidFill>
-            </a:endParaRPr>
-          </a:p>
-        </p:txBody>
-      </p:sp>
-      <p:sp>
-        <p:nvSpPr>
-          <p:cNvPr id="6" name="Title 1">
-            <a:extLst>
-              <a:ext uri="{FF2B5EF4-FFF2-40B4-BE49-F238E27FC236}">
-                <a16:creationId xmlns:a16="http://schemas.microsoft.com/office/drawing/2014/main" id="{CD29F70F-B868-451B-A65D-8721F4C7A2D9}"/>
-              </a:ext>
-            </a:extLst>
-          </p:cNvPr>
-          <p:cNvSpPr txBox="1">
-            <a:spLocks/>
-          </p:cNvSpPr>
-          <p:nvPr/>
-        </p:nvSpPr>
-        <p:spPr>
-          <a:xfrm>
-            <a:off x="838200" y="-635"/>
-            <a:ext cx="10515600" cy="1325563"/>
-          </a:xfrm>
-          <a:prstGeom prst="rect">
-            <a:avLst/>
-          </a:prstGeom>
-        </p:spPr>
-        <p:txBody>
-          <a:bodyPr vert="horz" lIns="91440" tIns="45720" rIns="91440" bIns="45720" rtlCol="0" anchor="ctr">
-            <a:normAutofit/>
-          </a:bodyPr>
-          <a:lstStyle>
-            <a:lvl1pPr algn="l" defTabSz="914400" rtl="0" eaLnBrk="1" latinLnBrk="0" hangingPunct="1">
-              <a:lnSpc>
-                <a:spcPct val="90000"/>
-              </a:lnSpc>
-              <a:spcBef>
-                <a:spcPct val="0"/>
-              </a:spcBef>
-              <a:buNone/>
-              <a:defRPr sz="4400" kern="1200">
-                <a:solidFill>
-                  <a:schemeClr val="tx1"/>
-                </a:solidFill>
-                <a:latin typeface="+mj-lt"/>
-                <a:ea typeface="+mj-ea"/>
-                <a:cs typeface="+mj-cs"/>
-              </a:defRPr>
-            </a:lvl1pPr>
-          </a:lstStyle>
-          <a:p>
-            <a:r>
-              <a:rPr lang="en-US" dirty="0">
-                <a:latin typeface="+mn-lt"/>
-              </a:rPr>
-              <a:t>Review: Hypothesis Testing</a:t>
-            </a:r>
-          </a:p>
-        </p:txBody>
-      </p:sp>
-    </p:spTree>
-    <p:extLst>
-      <p:ext uri="{BB962C8B-B14F-4D97-AF65-F5344CB8AC3E}">
-        <p14:creationId xmlns:p14="http://schemas.microsoft.com/office/powerpoint/2010/main" val="2417656755"/>
-      </p:ext>
-    </p:extLst>
-  </p:cSld>
-  <p:clrMapOvr>
-    <a:masterClrMapping/>
-  </p:clrMapOvr>
-  <p:timing>
-    <p:tnLst>
-      <p:par>
-        <p:cTn id="1" dur="indefinite" restart="never" nodeType="tmRoot">
-          <p:childTnLst>
-            <p:seq concurrent="1" nextAc="seek">
-              <p:cTn id="2" dur="indefinite" nodeType="mainSeq">
-                <p:childTnLst>
-                  <p:par>
-                    <p:cTn id="3" fill="hold">
-                      <p:stCondLst>
-                        <p:cond delay="indefinite"/>
-                      </p:stCondLst>
-                      <p:childTnLst>
-                        <p:par>
-                          <p:cTn id="4" fill="hold">
-                            <p:stCondLst>
-                              <p:cond delay="0"/>
-                            </p:stCondLst>
-                            <p:childTnLst>
-                              <p:par>
-                                <p:cTn id="5" presetID="1" presetClass="entr" presetSubtype="0" fill="hold" nodeType="clickEffect">
-                                  <p:stCondLst>
-                                    <p:cond delay="0"/>
-                                  </p:stCondLst>
-                                  <p:childTnLst>
-                                    <p:set>
-                                      <p:cBhvr>
-                                        <p:cTn id="6" dur="1" fill="hold">
-                                          <p:stCondLst>
-                                            <p:cond delay="0"/>
-                                          </p:stCondLst>
-                                        </p:cTn>
-                                        <p:tgtEl>
-                                          <p:spTgt spid="3">
-                                            <p:txEl>
-                                              <p:pRg st="0" end="0"/>
-                                            </p:txEl>
-                                          </p:spTgt>
-                                        </p:tgtEl>
-                                        <p:attrNameLst>
-                                          <p:attrName>style.visibility</p:attrName>
-                                        </p:attrNameLst>
-                                      </p:cBhvr>
-                                      <p:to>
-                                        <p:strVal val="visible"/>
-                                      </p:to>
-                                    </p:set>
-                                  </p:childTnLst>
-                                </p:cTn>
-                              </p:par>
-                            </p:childTnLst>
-                          </p:cTn>
-                        </p:par>
-                      </p:childTnLst>
-                    </p:cTn>
-                  </p:par>
-                  <p:par>
-                    <p:cTn id="7" fill="hold">
-                      <p:stCondLst>
-                        <p:cond delay="indefinite"/>
-                      </p:stCondLst>
-                      <p:childTnLst>
-                        <p:par>
-                          <p:cTn id="8" fill="hold">
-                            <p:stCondLst>
-                              <p:cond delay="0"/>
-                            </p:stCondLst>
-                            <p:childTnLst>
-                              <p:par>
-                                <p:cTn id="9" presetID="1" presetClass="entr" presetSubtype="0" fill="hold" nodeType="clickEffect">
-                                  <p:stCondLst>
-                                    <p:cond delay="0"/>
-                                  </p:stCondLst>
-                                  <p:childTnLst>
-                                    <p:set>
-                                      <p:cBhvr>
-                                        <p:cTn id="10" dur="1" fill="hold">
-                                          <p:stCondLst>
-                                            <p:cond delay="0"/>
-                                          </p:stCondLst>
-                                        </p:cTn>
-                                        <p:tgtEl>
-                                          <p:spTgt spid="3">
-                                            <p:txEl>
-                                              <p:pRg st="1" end="1"/>
-                                            </p:txEl>
-                                          </p:spTgt>
-                                        </p:tgtEl>
-                                        <p:attrNameLst>
-                                          <p:attrName>style.visibility</p:attrName>
-                                        </p:attrNameLst>
-                                      </p:cBhvr>
-                                      <p:to>
-                                        <p:strVal val="visible"/>
-                                      </p:to>
-                                    </p:set>
-                                  </p:childTnLst>
-                                </p:cTn>
-                              </p:par>
-                            </p:childTnLst>
-                          </p:cTn>
-                        </p:par>
-                      </p:childTnLst>
-                    </p:cTn>
-                  </p:par>
-                  <p:par>
-                    <p:cTn id="11" fill="hold">
-                      <p:stCondLst>
-                        <p:cond delay="indefinite"/>
-                      </p:stCondLst>
-                      <p:childTnLst>
-                        <p:par>
-                          <p:cTn id="12" fill="hold">
-                            <p:stCondLst>
-                              <p:cond delay="0"/>
-                            </p:stCondLst>
-                            <p:childTnLst>
-                              <p:par>
-                                <p:cTn id="13" presetID="1" presetClass="entr" presetSubtype="0" fill="hold" nodeType="clickEffect">
-                                  <p:stCondLst>
-                                    <p:cond delay="0"/>
-                                  </p:stCondLst>
-                                  <p:childTnLst>
-                                    <p:set>
-                                      <p:cBhvr>
-                                        <p:cTn id="14" dur="1" fill="hold">
-                                          <p:stCondLst>
-                                            <p:cond delay="0"/>
-                                          </p:stCondLst>
-                                        </p:cTn>
-                                        <p:tgtEl>
-                                          <p:spTgt spid="3">
-                                            <p:txEl>
-                                              <p:pRg st="2" end="2"/>
-                                            </p:txEl>
-                                          </p:spTgt>
-                                        </p:tgtEl>
-                                        <p:attrNameLst>
-                                          <p:attrName>style.visibility</p:attrName>
-                                        </p:attrNameLst>
-                                      </p:cBhvr>
-                                      <p:to>
-                                        <p:strVal val="visible"/>
-                                      </p:to>
-                                    </p:set>
-                                  </p:childTnLst>
-                                </p:cTn>
-                              </p:par>
-                            </p:childTnLst>
-                          </p:cTn>
-                        </p:par>
-                      </p:childTnLst>
-                    </p:cTn>
-                  </p:par>
-                  <p:par>
-                    <p:cTn id="15" fill="hold">
-                      <p:stCondLst>
-                        <p:cond delay="indefinite"/>
-                      </p:stCondLst>
-                      <p:childTnLst>
-                        <p:par>
-                          <p:cTn id="16" fill="hold">
-                            <p:stCondLst>
-                              <p:cond delay="0"/>
-                            </p:stCondLst>
-                            <p:childTnLst>
-                              <p:par>
-                                <p:cTn id="17" presetID="1" presetClass="entr" presetSubtype="0" fill="hold" nodeType="clickEffect">
-                                  <p:stCondLst>
-                                    <p:cond delay="0"/>
-                                  </p:stCondLst>
-                                  <p:childTnLst>
-                                    <p:set>
-                                      <p:cBhvr>
-                                        <p:cTn id="18" dur="1" fill="hold">
-                                          <p:stCondLst>
-                                            <p:cond delay="0"/>
-                                          </p:stCondLst>
-                                        </p:cTn>
-                                        <p:tgtEl>
-                                          <p:spTgt spid="3">
-                                            <p:txEl>
-                                              <p:pRg st="3" end="3"/>
-                                            </p:txEl>
-                                          </p:spTgt>
-                                        </p:tgtEl>
-                                        <p:attrNameLst>
-                                          <p:attrName>style.visibility</p:attrName>
-                                        </p:attrNameLst>
-                                      </p:cBhvr>
-                                      <p:to>
-                                        <p:strVal val="visible"/>
-                                      </p:to>
-                                    </p:set>
-                                  </p:childTnLst>
-                                </p:cTn>
-                              </p:par>
-                            </p:childTnLst>
-                          </p:cTn>
-                        </p:par>
-                      </p:childTnLst>
-                    </p:cTn>
-                  </p:par>
-                  <p:par>
-                    <p:cTn id="19" fill="hold">
-                      <p:stCondLst>
-                        <p:cond delay="indefinite"/>
-                      </p:stCondLst>
-                      <p:childTnLst>
-                        <p:par>
-                          <p:cTn id="20" fill="hold">
-                            <p:stCondLst>
-                              <p:cond delay="0"/>
-                            </p:stCondLst>
-                            <p:childTnLst>
-                              <p:par>
-                                <p:cTn id="21" presetID="1" presetClass="entr" presetSubtype="0" fill="hold" nodeType="clickEffect">
-                                  <p:stCondLst>
-                                    <p:cond delay="0"/>
-                                  </p:stCondLst>
-                                  <p:childTnLst>
-                                    <p:set>
-                                      <p:cBhvr>
-                                        <p:cTn id="22" dur="1" fill="hold">
-                                          <p:stCondLst>
-                                            <p:cond delay="0"/>
-                                          </p:stCondLst>
-                                        </p:cTn>
-                                        <p:tgtEl>
-                                          <p:spTgt spid="3">
-                                            <p:txEl>
-                                              <p:pRg st="4" end="4"/>
-                                            </p:txEl>
-                                          </p:spTgt>
-                                        </p:tgtEl>
-                                        <p:attrNameLst>
-                                          <p:attrName>style.visibility</p:attrName>
-                                        </p:attrNameLst>
-                                      </p:cBhvr>
-                                      <p:to>
-                                        <p:strVal val="visible"/>
-                                      </p:to>
-                                    </p:set>
-                                  </p:childTnLst>
-                                </p:cTn>
-                              </p:par>
-                            </p:childTnLst>
-                          </p:cTn>
-                        </p:par>
-                      </p:childTnLst>
-                    </p:cTn>
-                  </p:par>
-                  <p:par>
-                    <p:cTn id="23" fill="hold">
-                      <p:stCondLst>
-                        <p:cond delay="indefinite"/>
-                      </p:stCondLst>
-                      <p:childTnLst>
-                        <p:par>
-                          <p:cTn id="24" fill="hold">
-                            <p:stCondLst>
-                              <p:cond delay="0"/>
-                            </p:stCondLst>
-                            <p:childTnLst>
-                              <p:par>
-                                <p:cTn id="25" presetID="1" presetClass="entr" presetSubtype="0" fill="hold" nodeType="clickEffect">
-                                  <p:stCondLst>
-                                    <p:cond delay="0"/>
-                                  </p:stCondLst>
-                                  <p:childTnLst>
-                                    <p:set>
-                                      <p:cBhvr>
-                                        <p:cTn id="26" dur="1" fill="hold">
-                                          <p:stCondLst>
-                                            <p:cond delay="0"/>
-                                          </p:stCondLst>
-                                        </p:cTn>
-                                        <p:tgtEl>
-                                          <p:spTgt spid="3">
-                                            <p:txEl>
-                                              <p:pRg st="5" end="5"/>
-                                            </p:txEl>
-                                          </p:spTgt>
-                                        </p:tgtEl>
-                                        <p:attrNameLst>
-                                          <p:attrName>style.visibility</p:attrName>
-                                        </p:attrNameLst>
-                                      </p:cBhvr>
-                                      <p:to>
-                                        <p:strVal val="visible"/>
-                                      </p:to>
-                                    </p:set>
-                                  </p:childTnLst>
-                                </p:cTn>
-                              </p:par>
-                            </p:childTnLst>
-                          </p:cTn>
-                        </p:par>
-                      </p:childTnLst>
-                    </p:cTn>
-                  </p:par>
-                  <p:par>
-                    <p:cTn id="27" fill="hold">
-                      <p:stCondLst>
-                        <p:cond delay="indefinite"/>
-                      </p:stCondLst>
-                      <p:childTnLst>
-                        <p:par>
-                          <p:cTn id="28" fill="hold">
-                            <p:stCondLst>
-                              <p:cond delay="0"/>
-                            </p:stCondLst>
-                            <p:childTnLst>
-                              <p:par>
-                                <p:cTn id="29" presetID="1" presetClass="entr" presetSubtype="0" fill="hold" nodeType="clickEffect">
-                                  <p:stCondLst>
-                                    <p:cond delay="0"/>
-                                  </p:stCondLst>
-                                  <p:childTnLst>
-                                    <p:set>
-                                      <p:cBhvr>
-                                        <p:cTn id="30" dur="1" fill="hold">
-                                          <p:stCondLst>
-                                            <p:cond delay="0"/>
-                                          </p:stCondLst>
-                                        </p:cTn>
-                                        <p:tgtEl>
-                                          <p:spTgt spid="3">
-                                            <p:txEl>
-                                              <p:pRg st="6" end="6"/>
-                                            </p:txEl>
-                                          </p:spTgt>
-                                        </p:tgtEl>
-                                        <p:attrNameLst>
-                                          <p:attrName>style.visibility</p:attrName>
-                                        </p:attrNameLst>
-                                      </p:cBhvr>
-                                      <p:to>
-                                        <p:strVal val="visible"/>
-                                      </p:to>
-                                    </p:set>
-                                  </p:childTnLst>
-                                </p:cTn>
-                              </p:par>
-                            </p:childTnLst>
-                          </p:cTn>
-                        </p:par>
-                      </p:childTnLst>
-                    </p:cTn>
-                  </p:par>
-                </p:childTnLst>
-              </p:cTn>
-              <p:prevCondLst>
-                <p:cond evt="onPrev" delay="0">
-                  <p:tgtEl>
-                    <p:sldTgt/>
-                  </p:tgtEl>
-                </p:cond>
-              </p:prevCondLst>
-              <p:nextCondLst>
-                <p:cond evt="onNext" delay="0">
-                  <p:tgtEl>
-                    <p:sldTgt/>
-                  </p:tgtEl>
-                </p:cond>
-              </p:nextCondLst>
-            </p:seq>
-          </p:childTnLst>
-        </p:cTn>
-      </p:par>
-    </p:tnLst>
-  </p:timing>
-</p:sld>
-</file>
-
 <file path=ppt/slides/slide3.xml><?xml version="1.0" encoding="utf-8"?>
 <p:sld xmlns:a="http://schemas.openxmlformats.org/drawingml/2006/main" xmlns:r="http://schemas.openxmlformats.org/officeDocument/2006/relationships" xmlns:p="http://schemas.openxmlformats.org/presentationml/2006/main">
   <p:cSld>
@@ -26358,6 +25856,705 @@
 </file>
 
 <file path=ppt/slides/slide30.xml><?xml version="1.0" encoding="utf-8"?>
+<p:sld xmlns:a="http://schemas.openxmlformats.org/drawingml/2006/main" xmlns:r="http://schemas.openxmlformats.org/officeDocument/2006/relationships" xmlns:p="http://schemas.openxmlformats.org/presentationml/2006/main">
+  <p:cSld>
+    <p:spTree>
+      <p:nvGrpSpPr>
+        <p:cNvPr id="1" name=""/>
+        <p:cNvGrpSpPr/>
+        <p:nvPr/>
+      </p:nvGrpSpPr>
+      <p:grpSpPr>
+        <a:xfrm>
+          <a:off x="0" y="0"/>
+          <a:ext cx="0" cy="0"/>
+          <a:chOff x="0" y="0"/>
+          <a:chExt cx="0" cy="0"/>
+        </a:xfrm>
+      </p:grpSpPr>
+      <p:sp>
+        <p:nvSpPr>
+          <p:cNvPr id="3" name="Content Placeholder 2">
+            <a:extLst>
+              <a:ext uri="{FF2B5EF4-FFF2-40B4-BE49-F238E27FC236}">
+                <a16:creationId xmlns:a16="http://schemas.microsoft.com/office/drawing/2014/main" id="{258E6AF3-7615-4BD1-878E-A94C93E98F90}"/>
+              </a:ext>
+            </a:extLst>
+          </p:cNvPr>
+          <p:cNvSpPr>
+            <a:spLocks noGrp="1"/>
+          </p:cNvSpPr>
+          <p:nvPr>
+            <p:ph idx="1"/>
+          </p:nvPr>
+        </p:nvSpPr>
+        <p:spPr>
+          <a:xfrm>
+            <a:off x="838200" y="1091544"/>
+            <a:ext cx="10515600" cy="5364154"/>
+          </a:xfrm>
+        </p:spPr>
+        <p:txBody>
+          <a:bodyPr>
+            <a:noAutofit/>
+          </a:bodyPr>
+          <a:lstStyle/>
+          <a:p>
+            <a:pPr marL="0" indent="0">
+              <a:buNone/>
+            </a:pPr>
+            <a:r>
+              <a:rPr lang="en-US" dirty="0"/>
+              <a:t>Evaluate an hypothesis test using the </a:t>
+            </a:r>
+            <a:r>
+              <a:rPr lang="en-US" b="1" dirty="0"/>
+              <a:t>p-value </a:t>
+            </a:r>
+            <a:r>
+              <a:rPr lang="en-US" dirty="0"/>
+              <a:t> </a:t>
+            </a:r>
+          </a:p>
+          <a:p>
+            <a:pPr marL="342900" indent="-342900">
+              <a:buFont typeface="Arial" panose="020B0604020202020204" pitchFamily="34" charset="0"/>
+              <a:buChar char="•"/>
+            </a:pPr>
+            <a:r>
+              <a:rPr lang="en-US" b="0" dirty="0">
+                <a:solidFill>
+                  <a:schemeClr val="tx1">
+                    <a:lumMod val="50000"/>
+                  </a:schemeClr>
+                </a:solidFill>
+              </a:rPr>
+              <a:t>The </a:t>
+            </a:r>
+            <a:r>
+              <a:rPr lang="en-US" b="1" dirty="0">
+                <a:solidFill>
+                  <a:schemeClr val="tx1">
+                    <a:lumMod val="50000"/>
+                  </a:schemeClr>
+                </a:solidFill>
+              </a:rPr>
+              <a:t>p-value is the probability of obtaining the sample with results at least this extreme from random variation alone when the null hypothesis is true</a:t>
+            </a:r>
+            <a:endParaRPr lang="en-US" b="0" dirty="0">
+              <a:solidFill>
+                <a:schemeClr val="tx1">
+                  <a:lumMod val="50000"/>
+                </a:schemeClr>
+              </a:solidFill>
+            </a:endParaRPr>
+          </a:p>
+          <a:p>
+            <a:pPr marL="342900" indent="-342900">
+              <a:buFont typeface="Arial" panose="020B0604020202020204" pitchFamily="34" charset="0"/>
+              <a:buChar char="•"/>
+            </a:pPr>
+            <a:r>
+              <a:rPr lang="en-US" b="0" dirty="0">
+                <a:solidFill>
+                  <a:schemeClr val="tx1">
+                    <a:lumMod val="50000"/>
+                  </a:schemeClr>
+                </a:solidFill>
+              </a:rPr>
+              <a:t>In other words </a:t>
+            </a:r>
+            <a:r>
+              <a:rPr lang="en-US" b="1" dirty="0">
+                <a:solidFill>
+                  <a:schemeClr val="tx1">
+                    <a:lumMod val="50000"/>
+                  </a:schemeClr>
+                </a:solidFill>
+              </a:rPr>
+              <a:t>p-value is the probability of getting a result that extreme or greater simply from random variation (random sampling) of the null distribution</a:t>
+            </a:r>
+          </a:p>
+          <a:p>
+            <a:pPr marL="844350" lvl="1" indent="-342900"/>
+            <a:r>
+              <a:rPr lang="en-US" b="0" dirty="0">
+                <a:solidFill>
+                  <a:schemeClr val="tx1">
+                    <a:lumMod val="50000"/>
+                  </a:schemeClr>
+                </a:solidFill>
+              </a:rPr>
+              <a:t>p-values are an </a:t>
+            </a:r>
+            <a:r>
+              <a:rPr lang="en-US" b="1" dirty="0">
+                <a:solidFill>
+                  <a:schemeClr val="tx1">
+                    <a:lumMod val="50000"/>
+                  </a:schemeClr>
+                </a:solidFill>
+              </a:rPr>
+              <a:t>order statistic,</a:t>
+            </a:r>
+            <a:r>
+              <a:rPr lang="en-US" dirty="0">
+                <a:solidFill>
+                  <a:schemeClr val="tx1">
+                    <a:lumMod val="50000"/>
+                  </a:schemeClr>
+                </a:solidFill>
+              </a:rPr>
+              <a:t> we accept or reject the null hypothesis based on the p-value</a:t>
+            </a:r>
+            <a:endParaRPr lang="en-US" b="1" dirty="0">
+              <a:solidFill>
+                <a:schemeClr val="tx1">
+                  <a:lumMod val="50000"/>
+                </a:schemeClr>
+              </a:solidFill>
+            </a:endParaRPr>
+          </a:p>
+          <a:p>
+            <a:pPr marL="342900" indent="-342900">
+              <a:buFont typeface="Arial" panose="020B0604020202020204" pitchFamily="34" charset="0"/>
+              <a:buChar char="•"/>
+            </a:pPr>
+            <a:r>
+              <a:rPr lang="en-US" b="0" dirty="0">
+                <a:solidFill>
+                  <a:schemeClr val="tx1">
+                    <a:lumMod val="50000"/>
+                  </a:schemeClr>
+                </a:solidFill>
+              </a:rPr>
+              <a:t>Lots of ways to </a:t>
+            </a:r>
+            <a:r>
+              <a:rPr lang="en-US" dirty="0">
+                <a:solidFill>
+                  <a:schemeClr val="tx1">
+                    <a:lumMod val="50000"/>
+                  </a:schemeClr>
+                </a:solidFill>
+              </a:rPr>
+              <a:t>misuse</a:t>
+            </a:r>
+            <a:r>
+              <a:rPr lang="en-US" b="0" dirty="0">
+                <a:solidFill>
+                  <a:schemeClr val="tx1">
+                    <a:lumMod val="50000"/>
+                  </a:schemeClr>
+                </a:solidFill>
+              </a:rPr>
+              <a:t> the p-value; some examples: </a:t>
+            </a:r>
+          </a:p>
+          <a:p>
+            <a:pPr lvl="1">
+              <a:buFont typeface="Wingdings" panose="05000000000000000000" pitchFamily="2" charset="2"/>
+              <a:buChar char="§"/>
+            </a:pPr>
+            <a:r>
+              <a:rPr lang="en-US" b="1" dirty="0">
+                <a:solidFill>
+                  <a:schemeClr val="tx1">
+                    <a:lumMod val="50000"/>
+                  </a:schemeClr>
+                </a:solidFill>
+              </a:rPr>
+              <a:t>p-value mining:</a:t>
+            </a:r>
+            <a:r>
+              <a:rPr lang="en-US" dirty="0">
+                <a:solidFill>
+                  <a:schemeClr val="tx1">
+                    <a:lumMod val="50000"/>
+                  </a:schemeClr>
+                </a:solidFill>
+              </a:rPr>
+              <a:t> test all relationships between variables to find the ‘significant’ ones</a:t>
+            </a:r>
+          </a:p>
+          <a:p>
+            <a:pPr lvl="1">
+              <a:buFont typeface="Wingdings" panose="05000000000000000000" pitchFamily="2" charset="2"/>
+              <a:buChar char="§"/>
+            </a:pPr>
+            <a:r>
+              <a:rPr lang="en-US" b="1" dirty="0">
+                <a:solidFill>
+                  <a:schemeClr val="tx1">
+                    <a:lumMod val="50000"/>
+                  </a:schemeClr>
+                </a:solidFill>
+              </a:rPr>
+              <a:t>Assuming a smaller p-value is ‘more significant’:</a:t>
+            </a:r>
+            <a:r>
+              <a:rPr lang="en-US" dirty="0">
+                <a:solidFill>
+                  <a:schemeClr val="tx1">
+                    <a:lumMod val="50000"/>
+                  </a:schemeClr>
+                </a:solidFill>
+              </a:rPr>
+              <a:t> p-values are just indicate the probability of a value being at least this extreme</a:t>
+            </a:r>
+            <a:endParaRPr lang="en-US" sz="2000" dirty="0">
+              <a:solidFill>
+                <a:schemeClr val="tx1">
+                  <a:lumMod val="50000"/>
+                </a:schemeClr>
+              </a:solidFill>
+            </a:endParaRPr>
+          </a:p>
+        </p:txBody>
+      </p:sp>
+      <p:sp>
+        <p:nvSpPr>
+          <p:cNvPr id="6" name="Title 1">
+            <a:extLst>
+              <a:ext uri="{FF2B5EF4-FFF2-40B4-BE49-F238E27FC236}">
+                <a16:creationId xmlns:a16="http://schemas.microsoft.com/office/drawing/2014/main" id="{CD29F70F-B868-451B-A65D-8721F4C7A2D9}"/>
+              </a:ext>
+            </a:extLst>
+          </p:cNvPr>
+          <p:cNvSpPr txBox="1">
+            <a:spLocks/>
+          </p:cNvSpPr>
+          <p:nvPr/>
+        </p:nvSpPr>
+        <p:spPr>
+          <a:xfrm>
+            <a:off x="838200" y="-635"/>
+            <a:ext cx="10515600" cy="1325563"/>
+          </a:xfrm>
+          <a:prstGeom prst="rect">
+            <a:avLst/>
+          </a:prstGeom>
+        </p:spPr>
+        <p:txBody>
+          <a:bodyPr vert="horz" lIns="91440" tIns="45720" rIns="91440" bIns="45720" rtlCol="0" anchor="ctr">
+            <a:normAutofit/>
+          </a:bodyPr>
+          <a:lstStyle>
+            <a:lvl1pPr algn="l" defTabSz="914400" rtl="0" eaLnBrk="1" latinLnBrk="0" hangingPunct="1">
+              <a:lnSpc>
+                <a:spcPct val="90000"/>
+              </a:lnSpc>
+              <a:spcBef>
+                <a:spcPct val="0"/>
+              </a:spcBef>
+              <a:buNone/>
+              <a:defRPr sz="4400" kern="1200">
+                <a:solidFill>
+                  <a:schemeClr val="tx1"/>
+                </a:solidFill>
+                <a:latin typeface="+mj-lt"/>
+                <a:ea typeface="+mj-ea"/>
+                <a:cs typeface="+mj-cs"/>
+              </a:defRPr>
+            </a:lvl1pPr>
+          </a:lstStyle>
+          <a:p>
+            <a:r>
+              <a:rPr lang="en-US" dirty="0">
+                <a:latin typeface="+mn-lt"/>
+              </a:rPr>
+              <a:t>Review: Hypothesis Testing</a:t>
+            </a:r>
+          </a:p>
+        </p:txBody>
+      </p:sp>
+    </p:spTree>
+    <p:extLst>
+      <p:ext uri="{BB962C8B-B14F-4D97-AF65-F5344CB8AC3E}">
+        <p14:creationId xmlns:p14="http://schemas.microsoft.com/office/powerpoint/2010/main" val="2417656755"/>
+      </p:ext>
+    </p:extLst>
+  </p:cSld>
+  <p:clrMapOvr>
+    <a:masterClrMapping/>
+  </p:clrMapOvr>
+  <p:timing>
+    <p:tnLst>
+      <p:par>
+        <p:cTn id="1" dur="indefinite" restart="never" nodeType="tmRoot">
+          <p:childTnLst>
+            <p:seq concurrent="1" nextAc="seek">
+              <p:cTn id="2" dur="indefinite" nodeType="mainSeq">
+                <p:childTnLst>
+                  <p:par>
+                    <p:cTn id="3" fill="hold">
+                      <p:stCondLst>
+                        <p:cond delay="indefinite"/>
+                      </p:stCondLst>
+                      <p:childTnLst>
+                        <p:par>
+                          <p:cTn id="4" fill="hold">
+                            <p:stCondLst>
+                              <p:cond delay="0"/>
+                            </p:stCondLst>
+                            <p:childTnLst>
+                              <p:par>
+                                <p:cTn id="5" presetID="1" presetClass="entr" presetSubtype="0" fill="hold" nodeType="clickEffect">
+                                  <p:stCondLst>
+                                    <p:cond delay="0"/>
+                                  </p:stCondLst>
+                                  <p:childTnLst>
+                                    <p:set>
+                                      <p:cBhvr>
+                                        <p:cTn id="6" dur="1" fill="hold">
+                                          <p:stCondLst>
+                                            <p:cond delay="0"/>
+                                          </p:stCondLst>
+                                        </p:cTn>
+                                        <p:tgtEl>
+                                          <p:spTgt spid="3">
+                                            <p:txEl>
+                                              <p:pRg st="0" end="0"/>
+                                            </p:txEl>
+                                          </p:spTgt>
+                                        </p:tgtEl>
+                                        <p:attrNameLst>
+                                          <p:attrName>style.visibility</p:attrName>
+                                        </p:attrNameLst>
+                                      </p:cBhvr>
+                                      <p:to>
+                                        <p:strVal val="visible"/>
+                                      </p:to>
+                                    </p:set>
+                                  </p:childTnLst>
+                                </p:cTn>
+                              </p:par>
+                            </p:childTnLst>
+                          </p:cTn>
+                        </p:par>
+                      </p:childTnLst>
+                    </p:cTn>
+                  </p:par>
+                  <p:par>
+                    <p:cTn id="7" fill="hold">
+                      <p:stCondLst>
+                        <p:cond delay="indefinite"/>
+                      </p:stCondLst>
+                      <p:childTnLst>
+                        <p:par>
+                          <p:cTn id="8" fill="hold">
+                            <p:stCondLst>
+                              <p:cond delay="0"/>
+                            </p:stCondLst>
+                            <p:childTnLst>
+                              <p:par>
+                                <p:cTn id="9" presetID="1" presetClass="entr" presetSubtype="0" fill="hold" nodeType="clickEffect">
+                                  <p:stCondLst>
+                                    <p:cond delay="0"/>
+                                  </p:stCondLst>
+                                  <p:childTnLst>
+                                    <p:set>
+                                      <p:cBhvr>
+                                        <p:cTn id="10" dur="1" fill="hold">
+                                          <p:stCondLst>
+                                            <p:cond delay="0"/>
+                                          </p:stCondLst>
+                                        </p:cTn>
+                                        <p:tgtEl>
+                                          <p:spTgt spid="3">
+                                            <p:txEl>
+                                              <p:pRg st="1" end="1"/>
+                                            </p:txEl>
+                                          </p:spTgt>
+                                        </p:tgtEl>
+                                        <p:attrNameLst>
+                                          <p:attrName>style.visibility</p:attrName>
+                                        </p:attrNameLst>
+                                      </p:cBhvr>
+                                      <p:to>
+                                        <p:strVal val="visible"/>
+                                      </p:to>
+                                    </p:set>
+                                  </p:childTnLst>
+                                </p:cTn>
+                              </p:par>
+                            </p:childTnLst>
+                          </p:cTn>
+                        </p:par>
+                      </p:childTnLst>
+                    </p:cTn>
+                  </p:par>
+                  <p:par>
+                    <p:cTn id="11" fill="hold">
+                      <p:stCondLst>
+                        <p:cond delay="indefinite"/>
+                      </p:stCondLst>
+                      <p:childTnLst>
+                        <p:par>
+                          <p:cTn id="12" fill="hold">
+                            <p:stCondLst>
+                              <p:cond delay="0"/>
+                            </p:stCondLst>
+                            <p:childTnLst>
+                              <p:par>
+                                <p:cTn id="13" presetID="1" presetClass="entr" presetSubtype="0" fill="hold" nodeType="clickEffect">
+                                  <p:stCondLst>
+                                    <p:cond delay="0"/>
+                                  </p:stCondLst>
+                                  <p:childTnLst>
+                                    <p:set>
+                                      <p:cBhvr>
+                                        <p:cTn id="14" dur="1" fill="hold">
+                                          <p:stCondLst>
+                                            <p:cond delay="0"/>
+                                          </p:stCondLst>
+                                        </p:cTn>
+                                        <p:tgtEl>
+                                          <p:spTgt spid="3">
+                                            <p:txEl>
+                                              <p:pRg st="2" end="2"/>
+                                            </p:txEl>
+                                          </p:spTgt>
+                                        </p:tgtEl>
+                                        <p:attrNameLst>
+                                          <p:attrName>style.visibility</p:attrName>
+                                        </p:attrNameLst>
+                                      </p:cBhvr>
+                                      <p:to>
+                                        <p:strVal val="visible"/>
+                                      </p:to>
+                                    </p:set>
+                                  </p:childTnLst>
+                                </p:cTn>
+                              </p:par>
+                            </p:childTnLst>
+                          </p:cTn>
+                        </p:par>
+                      </p:childTnLst>
+                    </p:cTn>
+                  </p:par>
+                  <p:par>
+                    <p:cTn id="15" fill="hold">
+                      <p:stCondLst>
+                        <p:cond delay="indefinite"/>
+                      </p:stCondLst>
+                      <p:childTnLst>
+                        <p:par>
+                          <p:cTn id="16" fill="hold">
+                            <p:stCondLst>
+                              <p:cond delay="0"/>
+                            </p:stCondLst>
+                            <p:childTnLst>
+                              <p:par>
+                                <p:cTn id="17" presetID="1" presetClass="entr" presetSubtype="0" fill="hold" nodeType="clickEffect">
+                                  <p:stCondLst>
+                                    <p:cond delay="0"/>
+                                  </p:stCondLst>
+                                  <p:childTnLst>
+                                    <p:set>
+                                      <p:cBhvr>
+                                        <p:cTn id="18" dur="1" fill="hold">
+                                          <p:stCondLst>
+                                            <p:cond delay="0"/>
+                                          </p:stCondLst>
+                                        </p:cTn>
+                                        <p:tgtEl>
+                                          <p:spTgt spid="3">
+                                            <p:txEl>
+                                              <p:pRg st="3" end="3"/>
+                                            </p:txEl>
+                                          </p:spTgt>
+                                        </p:tgtEl>
+                                        <p:attrNameLst>
+                                          <p:attrName>style.visibility</p:attrName>
+                                        </p:attrNameLst>
+                                      </p:cBhvr>
+                                      <p:to>
+                                        <p:strVal val="visible"/>
+                                      </p:to>
+                                    </p:set>
+                                  </p:childTnLst>
+                                </p:cTn>
+                              </p:par>
+                            </p:childTnLst>
+                          </p:cTn>
+                        </p:par>
+                      </p:childTnLst>
+                    </p:cTn>
+                  </p:par>
+                  <p:par>
+                    <p:cTn id="19" fill="hold">
+                      <p:stCondLst>
+                        <p:cond delay="indefinite"/>
+                      </p:stCondLst>
+                      <p:childTnLst>
+                        <p:par>
+                          <p:cTn id="20" fill="hold">
+                            <p:stCondLst>
+                              <p:cond delay="0"/>
+                            </p:stCondLst>
+                            <p:childTnLst>
+                              <p:par>
+                                <p:cTn id="21" presetID="1" presetClass="entr" presetSubtype="0" fill="hold" nodeType="clickEffect">
+                                  <p:stCondLst>
+                                    <p:cond delay="0"/>
+                                  </p:stCondLst>
+                                  <p:childTnLst>
+                                    <p:set>
+                                      <p:cBhvr>
+                                        <p:cTn id="22" dur="1" fill="hold">
+                                          <p:stCondLst>
+                                            <p:cond delay="0"/>
+                                          </p:stCondLst>
+                                        </p:cTn>
+                                        <p:tgtEl>
+                                          <p:spTgt spid="3">
+                                            <p:txEl>
+                                              <p:pRg st="4" end="4"/>
+                                            </p:txEl>
+                                          </p:spTgt>
+                                        </p:tgtEl>
+                                        <p:attrNameLst>
+                                          <p:attrName>style.visibility</p:attrName>
+                                        </p:attrNameLst>
+                                      </p:cBhvr>
+                                      <p:to>
+                                        <p:strVal val="visible"/>
+                                      </p:to>
+                                    </p:set>
+                                  </p:childTnLst>
+                                </p:cTn>
+                              </p:par>
+                            </p:childTnLst>
+                          </p:cTn>
+                        </p:par>
+                      </p:childTnLst>
+                    </p:cTn>
+                  </p:par>
+                  <p:par>
+                    <p:cTn id="23" fill="hold">
+                      <p:stCondLst>
+                        <p:cond delay="indefinite"/>
+                      </p:stCondLst>
+                      <p:childTnLst>
+                        <p:par>
+                          <p:cTn id="24" fill="hold">
+                            <p:stCondLst>
+                              <p:cond delay="0"/>
+                            </p:stCondLst>
+                            <p:childTnLst>
+                              <p:par>
+                                <p:cTn id="25" presetID="1" presetClass="entr" presetSubtype="0" fill="hold" nodeType="clickEffect">
+                                  <p:stCondLst>
+                                    <p:cond delay="0"/>
+                                  </p:stCondLst>
+                                  <p:childTnLst>
+                                    <p:set>
+                                      <p:cBhvr>
+                                        <p:cTn id="26" dur="1" fill="hold">
+                                          <p:stCondLst>
+                                            <p:cond delay="0"/>
+                                          </p:stCondLst>
+                                        </p:cTn>
+                                        <p:tgtEl>
+                                          <p:spTgt spid="3">
+                                            <p:txEl>
+                                              <p:pRg st="5" end="5"/>
+                                            </p:txEl>
+                                          </p:spTgt>
+                                        </p:tgtEl>
+                                        <p:attrNameLst>
+                                          <p:attrName>style.visibility</p:attrName>
+                                        </p:attrNameLst>
+                                      </p:cBhvr>
+                                      <p:to>
+                                        <p:strVal val="visible"/>
+                                      </p:to>
+                                    </p:set>
+                                  </p:childTnLst>
+                                </p:cTn>
+                              </p:par>
+                            </p:childTnLst>
+                          </p:cTn>
+                        </p:par>
+                      </p:childTnLst>
+                    </p:cTn>
+                  </p:par>
+                  <p:par>
+                    <p:cTn id="27" fill="hold">
+                      <p:stCondLst>
+                        <p:cond delay="indefinite"/>
+                      </p:stCondLst>
+                      <p:childTnLst>
+                        <p:par>
+                          <p:cTn id="28" fill="hold">
+                            <p:stCondLst>
+                              <p:cond delay="0"/>
+                            </p:stCondLst>
+                            <p:childTnLst>
+                              <p:par>
+                                <p:cTn id="29" presetID="1" presetClass="entr" presetSubtype="0" fill="hold" nodeType="clickEffect">
+                                  <p:stCondLst>
+                                    <p:cond delay="0"/>
+                                  </p:stCondLst>
+                                  <p:childTnLst>
+                                    <p:set>
+                                      <p:cBhvr>
+                                        <p:cTn id="30" dur="1" fill="hold">
+                                          <p:stCondLst>
+                                            <p:cond delay="0"/>
+                                          </p:stCondLst>
+                                        </p:cTn>
+                                        <p:tgtEl>
+                                          <p:spTgt spid="3">
+                                            <p:txEl>
+                                              <p:pRg st="6" end="6"/>
+                                            </p:txEl>
+                                          </p:spTgt>
+                                        </p:tgtEl>
+                                        <p:attrNameLst>
+                                          <p:attrName>style.visibility</p:attrName>
+                                        </p:attrNameLst>
+                                      </p:cBhvr>
+                                      <p:to>
+                                        <p:strVal val="visible"/>
+                                      </p:to>
+                                    </p:set>
+                                  </p:childTnLst>
+                                </p:cTn>
+                              </p:par>
+                            </p:childTnLst>
+                          </p:cTn>
+                        </p:par>
+                      </p:childTnLst>
+                    </p:cTn>
+                  </p:par>
+                </p:childTnLst>
+              </p:cTn>
+              <p:prevCondLst>
+                <p:cond evt="onPrev" delay="0">
+                  <p:tgtEl>
+                    <p:sldTgt/>
+                  </p:tgtEl>
+                </p:cond>
+              </p:prevCondLst>
+              <p:nextCondLst>
+                <p:cond evt="onNext" delay="0">
+                  <p:tgtEl>
+                    <p:sldTgt/>
+                  </p:tgtEl>
+                </p:cond>
+              </p:nextCondLst>
+            </p:seq>
+          </p:childTnLst>
+        </p:cTn>
+      </p:par>
+    </p:tnLst>
+  </p:timing>
+</p:sld>
+</file>
+
+<file path=ppt/slides/slide31.xml><?xml version="1.0" encoding="utf-8"?>
 <p:sld xmlns:a="http://schemas.openxmlformats.org/drawingml/2006/main" xmlns:r="http://schemas.openxmlformats.org/officeDocument/2006/relationships" xmlns:p="http://schemas.openxmlformats.org/presentationml/2006/main">
   <p:cSld>
     <p:spTree>
@@ -27190,7 +27387,7 @@
 </p:sld>
 </file>
 
-<file path=ppt/slides/slide31.xml><?xml version="1.0" encoding="utf-8"?>
+<file path=ppt/slides/slide32.xml><?xml version="1.0" encoding="utf-8"?>
 <p:sld xmlns:a="http://schemas.openxmlformats.org/drawingml/2006/main" xmlns:r="http://schemas.openxmlformats.org/officeDocument/2006/relationships" xmlns:p="http://schemas.openxmlformats.org/presentationml/2006/main">
   <p:cSld>
     <p:spTree>
@@ -29481,7 +29678,7 @@
 </p:sld>
 </file>
 
-<file path=ppt/slides/slide32.xml><?xml version="1.0" encoding="utf-8"?>
+<file path=ppt/slides/slide33.xml><?xml version="1.0" encoding="utf-8"?>
 <p:sld xmlns:a="http://schemas.openxmlformats.org/drawingml/2006/main" xmlns:r="http://schemas.openxmlformats.org/officeDocument/2006/relationships" xmlns:p="http://schemas.openxmlformats.org/presentationml/2006/main">
   <p:cSld>
     <p:spTree>
@@ -30793,7 +30990,7 @@
 </p:sld>
 </file>
 
-<file path=ppt/slides/slide33.xml><?xml version="1.0" encoding="utf-8"?>
+<file path=ppt/slides/slide34.xml><?xml version="1.0" encoding="utf-8"?>
 <p:sld xmlns:a="http://schemas.openxmlformats.org/drawingml/2006/main" xmlns:r="http://schemas.openxmlformats.org/officeDocument/2006/relationships" xmlns:p="http://schemas.openxmlformats.org/presentationml/2006/main">
   <p:cSld>
     <p:spTree>
@@ -31362,7 +31559,7 @@
 </p:sld>
 </file>
 
-<file path=ppt/slides/slide34.xml><?xml version="1.0" encoding="utf-8"?>
+<file path=ppt/slides/slide35.xml><?xml version="1.0" encoding="utf-8"?>
 <p:sld xmlns:a="http://schemas.openxmlformats.org/drawingml/2006/main" xmlns:r="http://schemas.openxmlformats.org/officeDocument/2006/relationships" xmlns:p="http://schemas.openxmlformats.org/presentationml/2006/main">
   <p:cSld>
     <p:spTree>
@@ -31379,8 +31576,8 @@
           <a:chExt cx="0" cy="0"/>
         </a:xfrm>
       </p:grpSpPr>
-      <mc:AlternateContent xmlns:mc="http://schemas.openxmlformats.org/markup-compatibility/2006">
-        <mc:Choice xmlns:a14="http://schemas.microsoft.com/office/drawing/2010/main" Requires="a14">
+      <mc:AlternateContent xmlns:mc="http://schemas.openxmlformats.org/markup-compatibility/2006" xmlns:a14="http://schemas.microsoft.com/office/drawing/2010/main">
+        <mc:Choice Requires="a14">
           <p:sp>
             <p:nvSpPr>
               <p:cNvPr id="3" name="Content Placeholder 2">
@@ -31553,7 +31750,7 @@
             </p:txBody>
           </p:sp>
         </mc:Choice>
-        <mc:Fallback>
+        <mc:Fallback xmlns="">
           <p:sp>
             <p:nvSpPr>
               <p:cNvPr id="3" name="Content Placeholder 2">
@@ -31941,7 +32138,7 @@
 </p:sld>
 </file>
 
-<file path=ppt/slides/slide35.xml><?xml version="1.0" encoding="utf-8"?>
+<file path=ppt/slides/slide36.xml><?xml version="1.0" encoding="utf-8"?>
 <p:sld xmlns:a="http://schemas.openxmlformats.org/drawingml/2006/main" xmlns:r="http://schemas.openxmlformats.org/officeDocument/2006/relationships" xmlns:p="http://schemas.openxmlformats.org/presentationml/2006/main">
   <p:cSld>
     <p:spTree>
@@ -32278,7 +32475,7 @@
 </p:sld>
 </file>
 
-<file path=ppt/slides/slide36.xml><?xml version="1.0" encoding="utf-8"?>
+<file path=ppt/slides/slide37.xml><?xml version="1.0" encoding="utf-8"?>
 <p:sld xmlns:a="http://schemas.openxmlformats.org/drawingml/2006/main" xmlns:r="http://schemas.openxmlformats.org/officeDocument/2006/relationships" xmlns:p="http://schemas.openxmlformats.org/presentationml/2006/main">
   <p:cSld>
     <p:spTree>
@@ -32795,7 +32992,7 @@
 </p:sld>
 </file>
 
-<file path=ppt/slides/slide37.xml><?xml version="1.0" encoding="utf-8"?>
+<file path=ppt/slides/slide38.xml><?xml version="1.0" encoding="utf-8"?>
 <p:sld xmlns:a="http://schemas.openxmlformats.org/drawingml/2006/main" xmlns:r="http://schemas.openxmlformats.org/officeDocument/2006/relationships" xmlns:p="http://schemas.openxmlformats.org/presentationml/2006/main">
   <p:cSld>
     <p:spTree>
@@ -33228,7 +33425,7 @@
 </p:sld>
 </file>
 
-<file path=ppt/slides/slide38.xml><?xml version="1.0" encoding="utf-8"?>
+<file path=ppt/slides/slide39.xml><?xml version="1.0" encoding="utf-8"?>
 <p:sld xmlns:a="http://schemas.openxmlformats.org/drawingml/2006/main" xmlns:r="http://schemas.openxmlformats.org/officeDocument/2006/relationships" xmlns:p="http://schemas.openxmlformats.org/presentationml/2006/main">
   <p:cSld>
     <p:spTree>
@@ -33563,536 +33760,6 @@
                                         </p:cTn>
                                         <p:tgtEl>
                                           <p:spTgt spid="9"/>
-                                        </p:tgtEl>
-                                        <p:attrNameLst>
-                                          <p:attrName>style.visibility</p:attrName>
-                                        </p:attrNameLst>
-                                      </p:cBhvr>
-                                      <p:to>
-                                        <p:strVal val="visible"/>
-                                      </p:to>
-                                    </p:set>
-                                  </p:childTnLst>
-                                </p:cTn>
-                              </p:par>
-                            </p:childTnLst>
-                          </p:cTn>
-                        </p:par>
-                      </p:childTnLst>
-                    </p:cTn>
-                  </p:par>
-                </p:childTnLst>
-              </p:cTn>
-              <p:prevCondLst>
-                <p:cond evt="onPrev" delay="0">
-                  <p:tgtEl>
-                    <p:sldTgt/>
-                  </p:tgtEl>
-                </p:cond>
-              </p:prevCondLst>
-              <p:nextCondLst>
-                <p:cond evt="onNext" delay="0">
-                  <p:tgtEl>
-                    <p:sldTgt/>
-                  </p:tgtEl>
-                </p:cond>
-              </p:nextCondLst>
-            </p:seq>
-          </p:childTnLst>
-        </p:cTn>
-      </p:par>
-    </p:tnLst>
-  </p:timing>
-</p:sld>
-</file>
-
-<file path=ppt/slides/slide39.xml><?xml version="1.0" encoding="utf-8"?>
-<p:sld xmlns:a="http://schemas.openxmlformats.org/drawingml/2006/main" xmlns:r="http://schemas.openxmlformats.org/officeDocument/2006/relationships" xmlns:p="http://schemas.openxmlformats.org/presentationml/2006/main">
-  <p:cSld>
-    <p:spTree>
-      <p:nvGrpSpPr>
-        <p:cNvPr id="1" name=""/>
-        <p:cNvGrpSpPr/>
-        <p:nvPr/>
-      </p:nvGrpSpPr>
-      <p:grpSpPr>
-        <a:xfrm>
-          <a:off x="0" y="0"/>
-          <a:ext cx="0" cy="0"/>
-          <a:chOff x="0" y="0"/>
-          <a:chExt cx="0" cy="0"/>
-        </a:xfrm>
-      </p:grpSpPr>
-      <p:sp>
-        <p:nvSpPr>
-          <p:cNvPr id="3" name="Content Placeholder 2">
-            <a:extLst>
-              <a:ext uri="{FF2B5EF4-FFF2-40B4-BE49-F238E27FC236}">
-                <a16:creationId xmlns:a16="http://schemas.microsoft.com/office/drawing/2014/main" id="{258E6AF3-7615-4BD1-878E-A94C93E98F90}"/>
-              </a:ext>
-            </a:extLst>
-          </p:cNvPr>
-          <p:cNvSpPr>
-            <a:spLocks noGrp="1"/>
-          </p:cNvSpPr>
-          <p:nvPr>
-            <p:ph idx="1"/>
-          </p:nvPr>
-        </p:nvSpPr>
-        <p:spPr>
-          <a:xfrm>
-            <a:off x="640237" y="1154757"/>
-            <a:ext cx="5128967" cy="5436747"/>
-          </a:xfrm>
-        </p:spPr>
-        <p:txBody>
-          <a:bodyPr>
-            <a:normAutofit/>
-          </a:bodyPr>
-          <a:lstStyle/>
-          <a:p>
-            <a:pPr marL="0" indent="0">
-              <a:buNone/>
-            </a:pPr>
-            <a:r>
-              <a:rPr lang="en-US" dirty="0"/>
-              <a:t>Correlations alone can be misleading</a:t>
-            </a:r>
-          </a:p>
-          <a:p>
-            <a:r>
-              <a:rPr lang="en-US" dirty="0"/>
-              <a:t>Log of GDP is also a good predictor of  chocolate consumption     </a:t>
-            </a:r>
-          </a:p>
-          <a:p>
-            <a:r>
-              <a:rPr lang="en-US" dirty="0"/>
-              <a:t>And with high correlation</a:t>
-            </a:r>
-          </a:p>
-          <a:p>
-            <a:r>
-              <a:rPr lang="en-US" dirty="0"/>
-              <a:t>This is an example of </a:t>
-            </a:r>
-            <a:r>
-              <a:rPr lang="en-US" b="1" dirty="0">
-                <a:hlinkClick r:id="rId2"/>
-              </a:rPr>
-              <a:t>Simpson’s </a:t>
-            </a:r>
-            <a:r>
-              <a:rPr lang="en-US" b="1" dirty="0" err="1">
-                <a:hlinkClick r:id="rId2"/>
-              </a:rPr>
-              <a:t>pardox</a:t>
-            </a:r>
-            <a:endParaRPr lang="en-US" dirty="0"/>
-          </a:p>
-          <a:p>
-            <a:pPr marL="0" indent="0">
-              <a:buNone/>
-            </a:pPr>
-            <a:r>
-              <a:rPr lang="en-US" sz="2000" dirty="0">
-                <a:solidFill>
-                  <a:schemeClr val="accent1"/>
-                </a:solidFill>
-              </a:rPr>
-              <a:t>Full example and code in </a:t>
-            </a:r>
-            <a:r>
-              <a:rPr lang="en-US" sz="2000" dirty="0" err="1">
-                <a:solidFill>
-                  <a:schemeClr val="accent1"/>
-                </a:solidFill>
-              </a:rPr>
-              <a:t>SupplementaryMaterials</a:t>
-            </a:r>
-            <a:r>
-              <a:rPr lang="en-US" sz="2000" dirty="0">
-                <a:solidFill>
-                  <a:schemeClr val="accent1"/>
-                </a:solidFill>
-              </a:rPr>
-              <a:t> directory of GitHub repositor</a:t>
-            </a:r>
-          </a:p>
-          <a:p>
-            <a:endParaRPr lang="en-US" sz="3200" b="1" dirty="0"/>
-          </a:p>
-          <a:p>
-            <a:endParaRPr lang="en-US" sz="3200" b="1" dirty="0"/>
-          </a:p>
-        </p:txBody>
-      </p:sp>
-      <p:sp>
-        <p:nvSpPr>
-          <p:cNvPr id="6" name="Title 1">
-            <a:extLst>
-              <a:ext uri="{FF2B5EF4-FFF2-40B4-BE49-F238E27FC236}">
-                <a16:creationId xmlns:a16="http://schemas.microsoft.com/office/drawing/2014/main" id="{CD29F70F-B868-451B-A65D-8721F4C7A2D9}"/>
-              </a:ext>
-            </a:extLst>
-          </p:cNvPr>
-          <p:cNvSpPr txBox="1">
-            <a:spLocks/>
-          </p:cNvSpPr>
-          <p:nvPr/>
-        </p:nvSpPr>
-        <p:spPr>
-          <a:xfrm>
-            <a:off x="838200" y="-635"/>
-            <a:ext cx="10515600" cy="1325563"/>
-          </a:xfrm>
-          <a:prstGeom prst="rect">
-            <a:avLst/>
-          </a:prstGeom>
-        </p:spPr>
-        <p:txBody>
-          <a:bodyPr vert="horz" lIns="91440" tIns="45720" rIns="91440" bIns="45720" rtlCol="0" anchor="ctr">
-            <a:normAutofit/>
-          </a:bodyPr>
-          <a:lstStyle>
-            <a:lvl1pPr algn="l" defTabSz="914400" rtl="0" eaLnBrk="1" latinLnBrk="0" hangingPunct="1">
-              <a:lnSpc>
-                <a:spcPct val="90000"/>
-              </a:lnSpc>
-              <a:spcBef>
-                <a:spcPct val="0"/>
-              </a:spcBef>
-              <a:buNone/>
-              <a:defRPr sz="4400" kern="1200">
-                <a:solidFill>
-                  <a:schemeClr val="tx1"/>
-                </a:solidFill>
-                <a:latin typeface="+mj-lt"/>
-                <a:ea typeface="+mj-ea"/>
-                <a:cs typeface="+mj-cs"/>
-              </a:defRPr>
-            </a:lvl1pPr>
-          </a:lstStyle>
-          <a:p>
-            <a:r>
-              <a:rPr lang="en-US" dirty="0">
-                <a:latin typeface="+mn-lt"/>
-              </a:rPr>
-              <a:t>Pitfalls of Data Mining </a:t>
-            </a:r>
-          </a:p>
-        </p:txBody>
-      </p:sp>
-      <p:pic>
-        <p:nvPicPr>
-          <p:cNvPr id="5" name="Picture 4">
-            <a:extLst>
-              <a:ext uri="{FF2B5EF4-FFF2-40B4-BE49-F238E27FC236}">
-                <a16:creationId xmlns:a16="http://schemas.microsoft.com/office/drawing/2014/main" id="{E16E1B14-1F1D-FEA1-B32B-C4BAAAB710A4}"/>
-              </a:ext>
-            </a:extLst>
-          </p:cNvPr>
-          <p:cNvPicPr>
-            <a:picLocks noChangeAspect="1"/>
-          </p:cNvPicPr>
-          <p:nvPr/>
-        </p:nvPicPr>
-        <p:blipFill>
-          <a:blip r:embed="rId3"/>
-          <a:stretch>
-            <a:fillRect/>
-          </a:stretch>
-        </p:blipFill>
-        <p:spPr>
-          <a:xfrm>
-            <a:off x="5715363" y="1097361"/>
-            <a:ext cx="6275532" cy="5565527"/>
-          </a:xfrm>
-          <a:prstGeom prst="rect">
-            <a:avLst/>
-          </a:prstGeom>
-        </p:spPr>
-      </p:pic>
-      <p:pic>
-        <p:nvPicPr>
-          <p:cNvPr id="8" name="Picture 7">
-            <a:extLst>
-              <a:ext uri="{FF2B5EF4-FFF2-40B4-BE49-F238E27FC236}">
-                <a16:creationId xmlns:a16="http://schemas.microsoft.com/office/drawing/2014/main" id="{32AE6293-4F1B-A5AC-D8C8-2E3FD8A4C6CC}"/>
-              </a:ext>
-            </a:extLst>
-          </p:cNvPr>
-          <p:cNvPicPr>
-            <a:picLocks noChangeAspect="1"/>
-          </p:cNvPicPr>
-          <p:nvPr/>
-        </p:nvPicPr>
-        <p:blipFill>
-          <a:blip r:embed="rId4"/>
-          <a:stretch>
-            <a:fillRect/>
-          </a:stretch>
-        </p:blipFill>
-        <p:spPr>
-          <a:xfrm>
-            <a:off x="6231197" y="1375204"/>
-            <a:ext cx="3627434" cy="666808"/>
-          </a:xfrm>
-          <a:prstGeom prst="rect">
-            <a:avLst/>
-          </a:prstGeom>
-        </p:spPr>
-      </p:pic>
-    </p:spTree>
-    <p:extLst>
-      <p:ext uri="{BB962C8B-B14F-4D97-AF65-F5344CB8AC3E}">
-        <p14:creationId xmlns:p14="http://schemas.microsoft.com/office/powerpoint/2010/main" val="759576278"/>
-      </p:ext>
-    </p:extLst>
-  </p:cSld>
-  <p:clrMapOvr>
-    <a:masterClrMapping/>
-  </p:clrMapOvr>
-  <p:timing>
-    <p:tnLst>
-      <p:par>
-        <p:cTn id="1" dur="indefinite" restart="never" nodeType="tmRoot">
-          <p:childTnLst>
-            <p:seq concurrent="1" nextAc="seek">
-              <p:cTn id="2" dur="indefinite" nodeType="mainSeq">
-                <p:childTnLst>
-                  <p:par>
-                    <p:cTn id="3" fill="hold">
-                      <p:stCondLst>
-                        <p:cond delay="indefinite"/>
-                      </p:stCondLst>
-                      <p:childTnLst>
-                        <p:par>
-                          <p:cTn id="4" fill="hold">
-                            <p:stCondLst>
-                              <p:cond delay="0"/>
-                            </p:stCondLst>
-                            <p:childTnLst>
-                              <p:par>
-                                <p:cTn id="5" presetID="1" presetClass="entr" presetSubtype="0" fill="hold" nodeType="clickEffect">
-                                  <p:stCondLst>
-                                    <p:cond delay="0"/>
-                                  </p:stCondLst>
-                                  <p:childTnLst>
-                                    <p:set>
-                                      <p:cBhvr>
-                                        <p:cTn id="6" dur="1" fill="hold">
-                                          <p:stCondLst>
-                                            <p:cond delay="0"/>
-                                          </p:stCondLst>
-                                        </p:cTn>
-                                        <p:tgtEl>
-                                          <p:spTgt spid="3">
-                                            <p:txEl>
-                                              <p:pRg st="1" end="1"/>
-                                            </p:txEl>
-                                          </p:spTgt>
-                                        </p:tgtEl>
-                                        <p:attrNameLst>
-                                          <p:attrName>style.visibility</p:attrName>
-                                        </p:attrNameLst>
-                                      </p:cBhvr>
-                                      <p:to>
-                                        <p:strVal val="visible"/>
-                                      </p:to>
-                                    </p:set>
-                                  </p:childTnLst>
-                                </p:cTn>
-                              </p:par>
-                              <p:par>
-                                <p:cTn id="7" presetID="1" presetClass="entr" presetSubtype="0" fill="hold" nodeType="withEffect">
-                                  <p:stCondLst>
-                                    <p:cond delay="0"/>
-                                  </p:stCondLst>
-                                  <p:childTnLst>
-                                    <p:set>
-                                      <p:cBhvr>
-                                        <p:cTn id="8" dur="1" fill="hold">
-                                          <p:stCondLst>
-                                            <p:cond delay="0"/>
-                                          </p:stCondLst>
-                                        </p:cTn>
-                                        <p:tgtEl>
-                                          <p:spTgt spid="5"/>
-                                        </p:tgtEl>
-                                        <p:attrNameLst>
-                                          <p:attrName>style.visibility</p:attrName>
-                                        </p:attrNameLst>
-                                      </p:cBhvr>
-                                      <p:to>
-                                        <p:strVal val="visible"/>
-                                      </p:to>
-                                    </p:set>
-                                  </p:childTnLst>
-                                </p:cTn>
-                              </p:par>
-                            </p:childTnLst>
-                          </p:cTn>
-                        </p:par>
-                      </p:childTnLst>
-                    </p:cTn>
-                  </p:par>
-                  <p:par>
-                    <p:cTn id="9" fill="hold">
-                      <p:stCondLst>
-                        <p:cond delay="indefinite"/>
-                      </p:stCondLst>
-                      <p:childTnLst>
-                        <p:par>
-                          <p:cTn id="10" fill="hold">
-                            <p:stCondLst>
-                              <p:cond delay="0"/>
-                            </p:stCondLst>
-                            <p:childTnLst>
-                              <p:par>
-                                <p:cTn id="11" presetID="1" presetClass="entr" presetSubtype="0" fill="hold" nodeType="clickEffect">
-                                  <p:stCondLst>
-                                    <p:cond delay="0"/>
-                                  </p:stCondLst>
-                                  <p:childTnLst>
-                                    <p:set>
-                                      <p:cBhvr>
-                                        <p:cTn id="12" dur="1" fill="hold">
-                                          <p:stCondLst>
-                                            <p:cond delay="0"/>
-                                          </p:stCondLst>
-                                        </p:cTn>
-                                        <p:tgtEl>
-                                          <p:spTgt spid="3">
-                                            <p:txEl>
-                                              <p:pRg st="2" end="2"/>
-                                            </p:txEl>
-                                          </p:spTgt>
-                                        </p:tgtEl>
-                                        <p:attrNameLst>
-                                          <p:attrName>style.visibility</p:attrName>
-                                        </p:attrNameLst>
-                                      </p:cBhvr>
-                                      <p:to>
-                                        <p:strVal val="visible"/>
-                                      </p:to>
-                                    </p:set>
-                                  </p:childTnLst>
-                                </p:cTn>
-                              </p:par>
-                              <p:par>
-                                <p:cTn id="13" presetID="1" presetClass="entr" presetSubtype="0" fill="hold" nodeType="withEffect">
-                                  <p:stCondLst>
-                                    <p:cond delay="0"/>
-                                  </p:stCondLst>
-                                  <p:childTnLst>
-                                    <p:set>
-                                      <p:cBhvr>
-                                        <p:cTn id="14" dur="1" fill="hold">
-                                          <p:stCondLst>
-                                            <p:cond delay="0"/>
-                                          </p:stCondLst>
-                                        </p:cTn>
-                                        <p:tgtEl>
-                                          <p:spTgt spid="8"/>
-                                        </p:tgtEl>
-                                        <p:attrNameLst>
-                                          <p:attrName>style.visibility</p:attrName>
-                                        </p:attrNameLst>
-                                      </p:cBhvr>
-                                      <p:to>
-                                        <p:strVal val="visible"/>
-                                      </p:to>
-                                    </p:set>
-                                  </p:childTnLst>
-                                </p:cTn>
-                              </p:par>
-                            </p:childTnLst>
-                          </p:cTn>
-                        </p:par>
-                      </p:childTnLst>
-                    </p:cTn>
-                  </p:par>
-                  <p:par>
-                    <p:cTn id="15" fill="hold">
-                      <p:stCondLst>
-                        <p:cond delay="indefinite"/>
-                      </p:stCondLst>
-                      <p:childTnLst>
-                        <p:par>
-                          <p:cTn id="16" fill="hold">
-                            <p:stCondLst>
-                              <p:cond delay="0"/>
-                            </p:stCondLst>
-                            <p:childTnLst>
-                              <p:par>
-                                <p:cTn id="17" presetID="1" presetClass="entr" presetSubtype="0" fill="hold" nodeType="clickEffect">
-                                  <p:stCondLst>
-                                    <p:cond delay="0"/>
-                                  </p:stCondLst>
-                                  <p:childTnLst>
-                                    <p:set>
-                                      <p:cBhvr>
-                                        <p:cTn id="18" dur="1" fill="hold">
-                                          <p:stCondLst>
-                                            <p:cond delay="0"/>
-                                          </p:stCondLst>
-                                        </p:cTn>
-                                        <p:tgtEl>
-                                          <p:spTgt spid="3">
-                                            <p:txEl>
-                                              <p:pRg st="3" end="3"/>
-                                            </p:txEl>
-                                          </p:spTgt>
-                                        </p:tgtEl>
-                                        <p:attrNameLst>
-                                          <p:attrName>style.visibility</p:attrName>
-                                        </p:attrNameLst>
-                                      </p:cBhvr>
-                                      <p:to>
-                                        <p:strVal val="visible"/>
-                                      </p:to>
-                                    </p:set>
-                                  </p:childTnLst>
-                                </p:cTn>
-                              </p:par>
-                            </p:childTnLst>
-                          </p:cTn>
-                        </p:par>
-                      </p:childTnLst>
-                    </p:cTn>
-                  </p:par>
-                  <p:par>
-                    <p:cTn id="19" fill="hold">
-                      <p:stCondLst>
-                        <p:cond delay="indefinite"/>
-                      </p:stCondLst>
-                      <p:childTnLst>
-                        <p:par>
-                          <p:cTn id="20" fill="hold">
-                            <p:stCondLst>
-                              <p:cond delay="0"/>
-                            </p:stCondLst>
-                            <p:childTnLst>
-                              <p:par>
-                                <p:cTn id="21" presetID="1" presetClass="entr" presetSubtype="0" fill="hold" nodeType="clickEffect">
-                                  <p:stCondLst>
-                                    <p:cond delay="0"/>
-                                  </p:stCondLst>
-                                  <p:childTnLst>
-                                    <p:set>
-                                      <p:cBhvr>
-                                        <p:cTn id="22" dur="1" fill="hold">
-                                          <p:stCondLst>
-                                            <p:cond delay="0"/>
-                                          </p:stCondLst>
-                                        </p:cTn>
-                                        <p:tgtEl>
-                                          <p:spTgt spid="3">
-                                            <p:txEl>
-                                              <p:pRg st="4" end="4"/>
-                                            </p:txEl>
-                                          </p:spTgt>
                                         </p:tgtEl>
                                         <p:attrNameLst>
                                           <p:attrName>style.visibility</p:attrName>
@@ -34747,6 +34414,536 @@
 </file>
 
 <file path=ppt/slides/slide40.xml><?xml version="1.0" encoding="utf-8"?>
+<p:sld xmlns:a="http://schemas.openxmlformats.org/drawingml/2006/main" xmlns:r="http://schemas.openxmlformats.org/officeDocument/2006/relationships" xmlns:p="http://schemas.openxmlformats.org/presentationml/2006/main">
+  <p:cSld>
+    <p:spTree>
+      <p:nvGrpSpPr>
+        <p:cNvPr id="1" name=""/>
+        <p:cNvGrpSpPr/>
+        <p:nvPr/>
+      </p:nvGrpSpPr>
+      <p:grpSpPr>
+        <a:xfrm>
+          <a:off x="0" y="0"/>
+          <a:ext cx="0" cy="0"/>
+          <a:chOff x="0" y="0"/>
+          <a:chExt cx="0" cy="0"/>
+        </a:xfrm>
+      </p:grpSpPr>
+      <p:sp>
+        <p:nvSpPr>
+          <p:cNvPr id="3" name="Content Placeholder 2">
+            <a:extLst>
+              <a:ext uri="{FF2B5EF4-FFF2-40B4-BE49-F238E27FC236}">
+                <a16:creationId xmlns:a16="http://schemas.microsoft.com/office/drawing/2014/main" id="{258E6AF3-7615-4BD1-878E-A94C93E98F90}"/>
+              </a:ext>
+            </a:extLst>
+          </p:cNvPr>
+          <p:cNvSpPr>
+            <a:spLocks noGrp="1"/>
+          </p:cNvSpPr>
+          <p:nvPr>
+            <p:ph idx="1"/>
+          </p:nvPr>
+        </p:nvSpPr>
+        <p:spPr>
+          <a:xfrm>
+            <a:off x="640237" y="1154757"/>
+            <a:ext cx="5128967" cy="5436747"/>
+          </a:xfrm>
+        </p:spPr>
+        <p:txBody>
+          <a:bodyPr>
+            <a:normAutofit/>
+          </a:bodyPr>
+          <a:lstStyle/>
+          <a:p>
+            <a:pPr marL="0" indent="0">
+              <a:buNone/>
+            </a:pPr>
+            <a:r>
+              <a:rPr lang="en-US" dirty="0"/>
+              <a:t>Correlations alone can be misleading</a:t>
+            </a:r>
+          </a:p>
+          <a:p>
+            <a:r>
+              <a:rPr lang="en-US" dirty="0"/>
+              <a:t>Log of GDP is also a good predictor of  chocolate consumption     </a:t>
+            </a:r>
+          </a:p>
+          <a:p>
+            <a:r>
+              <a:rPr lang="en-US" dirty="0"/>
+              <a:t>And with high correlation</a:t>
+            </a:r>
+          </a:p>
+          <a:p>
+            <a:r>
+              <a:rPr lang="en-US" dirty="0"/>
+              <a:t>This is an example of </a:t>
+            </a:r>
+            <a:r>
+              <a:rPr lang="en-US" b="1" dirty="0">
+                <a:hlinkClick r:id="rId2"/>
+              </a:rPr>
+              <a:t>Simpson’s </a:t>
+            </a:r>
+            <a:r>
+              <a:rPr lang="en-US" b="1" dirty="0" err="1">
+                <a:hlinkClick r:id="rId2"/>
+              </a:rPr>
+              <a:t>pardox</a:t>
+            </a:r>
+            <a:endParaRPr lang="en-US" dirty="0"/>
+          </a:p>
+          <a:p>
+            <a:pPr marL="0" indent="0">
+              <a:buNone/>
+            </a:pPr>
+            <a:r>
+              <a:rPr lang="en-US" sz="2000" dirty="0">
+                <a:solidFill>
+                  <a:schemeClr val="accent1"/>
+                </a:solidFill>
+              </a:rPr>
+              <a:t>Full example and code in </a:t>
+            </a:r>
+            <a:r>
+              <a:rPr lang="en-US" sz="2000" dirty="0" err="1">
+                <a:solidFill>
+                  <a:schemeClr val="accent1"/>
+                </a:solidFill>
+              </a:rPr>
+              <a:t>SupplementaryMaterials</a:t>
+            </a:r>
+            <a:r>
+              <a:rPr lang="en-US" sz="2000" dirty="0">
+                <a:solidFill>
+                  <a:schemeClr val="accent1"/>
+                </a:solidFill>
+              </a:rPr>
+              <a:t> directory of GitHub repositor</a:t>
+            </a:r>
+          </a:p>
+          <a:p>
+            <a:endParaRPr lang="en-US" sz="3200" b="1" dirty="0"/>
+          </a:p>
+          <a:p>
+            <a:endParaRPr lang="en-US" sz="3200" b="1" dirty="0"/>
+          </a:p>
+        </p:txBody>
+      </p:sp>
+      <p:sp>
+        <p:nvSpPr>
+          <p:cNvPr id="6" name="Title 1">
+            <a:extLst>
+              <a:ext uri="{FF2B5EF4-FFF2-40B4-BE49-F238E27FC236}">
+                <a16:creationId xmlns:a16="http://schemas.microsoft.com/office/drawing/2014/main" id="{CD29F70F-B868-451B-A65D-8721F4C7A2D9}"/>
+              </a:ext>
+            </a:extLst>
+          </p:cNvPr>
+          <p:cNvSpPr txBox="1">
+            <a:spLocks/>
+          </p:cNvSpPr>
+          <p:nvPr/>
+        </p:nvSpPr>
+        <p:spPr>
+          <a:xfrm>
+            <a:off x="838200" y="-635"/>
+            <a:ext cx="10515600" cy="1325563"/>
+          </a:xfrm>
+          <a:prstGeom prst="rect">
+            <a:avLst/>
+          </a:prstGeom>
+        </p:spPr>
+        <p:txBody>
+          <a:bodyPr vert="horz" lIns="91440" tIns="45720" rIns="91440" bIns="45720" rtlCol="0" anchor="ctr">
+            <a:normAutofit/>
+          </a:bodyPr>
+          <a:lstStyle>
+            <a:lvl1pPr algn="l" defTabSz="914400" rtl="0" eaLnBrk="1" latinLnBrk="0" hangingPunct="1">
+              <a:lnSpc>
+                <a:spcPct val="90000"/>
+              </a:lnSpc>
+              <a:spcBef>
+                <a:spcPct val="0"/>
+              </a:spcBef>
+              <a:buNone/>
+              <a:defRPr sz="4400" kern="1200">
+                <a:solidFill>
+                  <a:schemeClr val="tx1"/>
+                </a:solidFill>
+                <a:latin typeface="+mj-lt"/>
+                <a:ea typeface="+mj-ea"/>
+                <a:cs typeface="+mj-cs"/>
+              </a:defRPr>
+            </a:lvl1pPr>
+          </a:lstStyle>
+          <a:p>
+            <a:r>
+              <a:rPr lang="en-US" dirty="0">
+                <a:latin typeface="+mn-lt"/>
+              </a:rPr>
+              <a:t>Pitfalls of Data Mining </a:t>
+            </a:r>
+          </a:p>
+        </p:txBody>
+      </p:sp>
+      <p:pic>
+        <p:nvPicPr>
+          <p:cNvPr id="5" name="Picture 4">
+            <a:extLst>
+              <a:ext uri="{FF2B5EF4-FFF2-40B4-BE49-F238E27FC236}">
+                <a16:creationId xmlns:a16="http://schemas.microsoft.com/office/drawing/2014/main" id="{E16E1B14-1F1D-FEA1-B32B-C4BAAAB710A4}"/>
+              </a:ext>
+            </a:extLst>
+          </p:cNvPr>
+          <p:cNvPicPr>
+            <a:picLocks noChangeAspect="1"/>
+          </p:cNvPicPr>
+          <p:nvPr/>
+        </p:nvPicPr>
+        <p:blipFill>
+          <a:blip r:embed="rId3"/>
+          <a:stretch>
+            <a:fillRect/>
+          </a:stretch>
+        </p:blipFill>
+        <p:spPr>
+          <a:xfrm>
+            <a:off x="5715363" y="1097361"/>
+            <a:ext cx="6275532" cy="5565527"/>
+          </a:xfrm>
+          <a:prstGeom prst="rect">
+            <a:avLst/>
+          </a:prstGeom>
+        </p:spPr>
+      </p:pic>
+      <p:pic>
+        <p:nvPicPr>
+          <p:cNvPr id="8" name="Picture 7">
+            <a:extLst>
+              <a:ext uri="{FF2B5EF4-FFF2-40B4-BE49-F238E27FC236}">
+                <a16:creationId xmlns:a16="http://schemas.microsoft.com/office/drawing/2014/main" id="{32AE6293-4F1B-A5AC-D8C8-2E3FD8A4C6CC}"/>
+              </a:ext>
+            </a:extLst>
+          </p:cNvPr>
+          <p:cNvPicPr>
+            <a:picLocks noChangeAspect="1"/>
+          </p:cNvPicPr>
+          <p:nvPr/>
+        </p:nvPicPr>
+        <p:blipFill>
+          <a:blip r:embed="rId4"/>
+          <a:stretch>
+            <a:fillRect/>
+          </a:stretch>
+        </p:blipFill>
+        <p:spPr>
+          <a:xfrm>
+            <a:off x="6231197" y="1375204"/>
+            <a:ext cx="3627434" cy="666808"/>
+          </a:xfrm>
+          <a:prstGeom prst="rect">
+            <a:avLst/>
+          </a:prstGeom>
+        </p:spPr>
+      </p:pic>
+    </p:spTree>
+    <p:extLst>
+      <p:ext uri="{BB962C8B-B14F-4D97-AF65-F5344CB8AC3E}">
+        <p14:creationId xmlns:p14="http://schemas.microsoft.com/office/powerpoint/2010/main" val="759576278"/>
+      </p:ext>
+    </p:extLst>
+  </p:cSld>
+  <p:clrMapOvr>
+    <a:masterClrMapping/>
+  </p:clrMapOvr>
+  <p:timing>
+    <p:tnLst>
+      <p:par>
+        <p:cTn id="1" dur="indefinite" restart="never" nodeType="tmRoot">
+          <p:childTnLst>
+            <p:seq concurrent="1" nextAc="seek">
+              <p:cTn id="2" dur="indefinite" nodeType="mainSeq">
+                <p:childTnLst>
+                  <p:par>
+                    <p:cTn id="3" fill="hold">
+                      <p:stCondLst>
+                        <p:cond delay="indefinite"/>
+                      </p:stCondLst>
+                      <p:childTnLst>
+                        <p:par>
+                          <p:cTn id="4" fill="hold">
+                            <p:stCondLst>
+                              <p:cond delay="0"/>
+                            </p:stCondLst>
+                            <p:childTnLst>
+                              <p:par>
+                                <p:cTn id="5" presetID="1" presetClass="entr" presetSubtype="0" fill="hold" nodeType="clickEffect">
+                                  <p:stCondLst>
+                                    <p:cond delay="0"/>
+                                  </p:stCondLst>
+                                  <p:childTnLst>
+                                    <p:set>
+                                      <p:cBhvr>
+                                        <p:cTn id="6" dur="1" fill="hold">
+                                          <p:stCondLst>
+                                            <p:cond delay="0"/>
+                                          </p:stCondLst>
+                                        </p:cTn>
+                                        <p:tgtEl>
+                                          <p:spTgt spid="3">
+                                            <p:txEl>
+                                              <p:pRg st="1" end="1"/>
+                                            </p:txEl>
+                                          </p:spTgt>
+                                        </p:tgtEl>
+                                        <p:attrNameLst>
+                                          <p:attrName>style.visibility</p:attrName>
+                                        </p:attrNameLst>
+                                      </p:cBhvr>
+                                      <p:to>
+                                        <p:strVal val="visible"/>
+                                      </p:to>
+                                    </p:set>
+                                  </p:childTnLst>
+                                </p:cTn>
+                              </p:par>
+                              <p:par>
+                                <p:cTn id="7" presetID="1" presetClass="entr" presetSubtype="0" fill="hold" nodeType="withEffect">
+                                  <p:stCondLst>
+                                    <p:cond delay="0"/>
+                                  </p:stCondLst>
+                                  <p:childTnLst>
+                                    <p:set>
+                                      <p:cBhvr>
+                                        <p:cTn id="8" dur="1" fill="hold">
+                                          <p:stCondLst>
+                                            <p:cond delay="0"/>
+                                          </p:stCondLst>
+                                        </p:cTn>
+                                        <p:tgtEl>
+                                          <p:spTgt spid="5"/>
+                                        </p:tgtEl>
+                                        <p:attrNameLst>
+                                          <p:attrName>style.visibility</p:attrName>
+                                        </p:attrNameLst>
+                                      </p:cBhvr>
+                                      <p:to>
+                                        <p:strVal val="visible"/>
+                                      </p:to>
+                                    </p:set>
+                                  </p:childTnLst>
+                                </p:cTn>
+                              </p:par>
+                            </p:childTnLst>
+                          </p:cTn>
+                        </p:par>
+                      </p:childTnLst>
+                    </p:cTn>
+                  </p:par>
+                  <p:par>
+                    <p:cTn id="9" fill="hold">
+                      <p:stCondLst>
+                        <p:cond delay="indefinite"/>
+                      </p:stCondLst>
+                      <p:childTnLst>
+                        <p:par>
+                          <p:cTn id="10" fill="hold">
+                            <p:stCondLst>
+                              <p:cond delay="0"/>
+                            </p:stCondLst>
+                            <p:childTnLst>
+                              <p:par>
+                                <p:cTn id="11" presetID="1" presetClass="entr" presetSubtype="0" fill="hold" nodeType="clickEffect">
+                                  <p:stCondLst>
+                                    <p:cond delay="0"/>
+                                  </p:stCondLst>
+                                  <p:childTnLst>
+                                    <p:set>
+                                      <p:cBhvr>
+                                        <p:cTn id="12" dur="1" fill="hold">
+                                          <p:stCondLst>
+                                            <p:cond delay="0"/>
+                                          </p:stCondLst>
+                                        </p:cTn>
+                                        <p:tgtEl>
+                                          <p:spTgt spid="3">
+                                            <p:txEl>
+                                              <p:pRg st="2" end="2"/>
+                                            </p:txEl>
+                                          </p:spTgt>
+                                        </p:tgtEl>
+                                        <p:attrNameLst>
+                                          <p:attrName>style.visibility</p:attrName>
+                                        </p:attrNameLst>
+                                      </p:cBhvr>
+                                      <p:to>
+                                        <p:strVal val="visible"/>
+                                      </p:to>
+                                    </p:set>
+                                  </p:childTnLst>
+                                </p:cTn>
+                              </p:par>
+                              <p:par>
+                                <p:cTn id="13" presetID="1" presetClass="entr" presetSubtype="0" fill="hold" nodeType="withEffect">
+                                  <p:stCondLst>
+                                    <p:cond delay="0"/>
+                                  </p:stCondLst>
+                                  <p:childTnLst>
+                                    <p:set>
+                                      <p:cBhvr>
+                                        <p:cTn id="14" dur="1" fill="hold">
+                                          <p:stCondLst>
+                                            <p:cond delay="0"/>
+                                          </p:stCondLst>
+                                        </p:cTn>
+                                        <p:tgtEl>
+                                          <p:spTgt spid="8"/>
+                                        </p:tgtEl>
+                                        <p:attrNameLst>
+                                          <p:attrName>style.visibility</p:attrName>
+                                        </p:attrNameLst>
+                                      </p:cBhvr>
+                                      <p:to>
+                                        <p:strVal val="visible"/>
+                                      </p:to>
+                                    </p:set>
+                                  </p:childTnLst>
+                                </p:cTn>
+                              </p:par>
+                            </p:childTnLst>
+                          </p:cTn>
+                        </p:par>
+                      </p:childTnLst>
+                    </p:cTn>
+                  </p:par>
+                  <p:par>
+                    <p:cTn id="15" fill="hold">
+                      <p:stCondLst>
+                        <p:cond delay="indefinite"/>
+                      </p:stCondLst>
+                      <p:childTnLst>
+                        <p:par>
+                          <p:cTn id="16" fill="hold">
+                            <p:stCondLst>
+                              <p:cond delay="0"/>
+                            </p:stCondLst>
+                            <p:childTnLst>
+                              <p:par>
+                                <p:cTn id="17" presetID="1" presetClass="entr" presetSubtype="0" fill="hold" nodeType="clickEffect">
+                                  <p:stCondLst>
+                                    <p:cond delay="0"/>
+                                  </p:stCondLst>
+                                  <p:childTnLst>
+                                    <p:set>
+                                      <p:cBhvr>
+                                        <p:cTn id="18" dur="1" fill="hold">
+                                          <p:stCondLst>
+                                            <p:cond delay="0"/>
+                                          </p:stCondLst>
+                                        </p:cTn>
+                                        <p:tgtEl>
+                                          <p:spTgt spid="3">
+                                            <p:txEl>
+                                              <p:pRg st="3" end="3"/>
+                                            </p:txEl>
+                                          </p:spTgt>
+                                        </p:tgtEl>
+                                        <p:attrNameLst>
+                                          <p:attrName>style.visibility</p:attrName>
+                                        </p:attrNameLst>
+                                      </p:cBhvr>
+                                      <p:to>
+                                        <p:strVal val="visible"/>
+                                      </p:to>
+                                    </p:set>
+                                  </p:childTnLst>
+                                </p:cTn>
+                              </p:par>
+                            </p:childTnLst>
+                          </p:cTn>
+                        </p:par>
+                      </p:childTnLst>
+                    </p:cTn>
+                  </p:par>
+                  <p:par>
+                    <p:cTn id="19" fill="hold">
+                      <p:stCondLst>
+                        <p:cond delay="indefinite"/>
+                      </p:stCondLst>
+                      <p:childTnLst>
+                        <p:par>
+                          <p:cTn id="20" fill="hold">
+                            <p:stCondLst>
+                              <p:cond delay="0"/>
+                            </p:stCondLst>
+                            <p:childTnLst>
+                              <p:par>
+                                <p:cTn id="21" presetID="1" presetClass="entr" presetSubtype="0" fill="hold" nodeType="clickEffect">
+                                  <p:stCondLst>
+                                    <p:cond delay="0"/>
+                                  </p:stCondLst>
+                                  <p:childTnLst>
+                                    <p:set>
+                                      <p:cBhvr>
+                                        <p:cTn id="22" dur="1" fill="hold">
+                                          <p:stCondLst>
+                                            <p:cond delay="0"/>
+                                          </p:stCondLst>
+                                        </p:cTn>
+                                        <p:tgtEl>
+                                          <p:spTgt spid="3">
+                                            <p:txEl>
+                                              <p:pRg st="4" end="4"/>
+                                            </p:txEl>
+                                          </p:spTgt>
+                                        </p:tgtEl>
+                                        <p:attrNameLst>
+                                          <p:attrName>style.visibility</p:attrName>
+                                        </p:attrNameLst>
+                                      </p:cBhvr>
+                                      <p:to>
+                                        <p:strVal val="visible"/>
+                                      </p:to>
+                                    </p:set>
+                                  </p:childTnLst>
+                                </p:cTn>
+                              </p:par>
+                            </p:childTnLst>
+                          </p:cTn>
+                        </p:par>
+                      </p:childTnLst>
+                    </p:cTn>
+                  </p:par>
+                </p:childTnLst>
+              </p:cTn>
+              <p:prevCondLst>
+                <p:cond evt="onPrev" delay="0">
+                  <p:tgtEl>
+                    <p:sldTgt/>
+                  </p:tgtEl>
+                </p:cond>
+              </p:prevCondLst>
+              <p:nextCondLst>
+                <p:cond evt="onNext" delay="0">
+                  <p:tgtEl>
+                    <p:sldTgt/>
+                  </p:tgtEl>
+                </p:cond>
+              </p:nextCondLst>
+            </p:seq>
+          </p:childTnLst>
+        </p:cTn>
+      </p:par>
+    </p:tnLst>
+  </p:timing>
+</p:sld>
+</file>
+
+<file path=ppt/slides/slide41.xml><?xml version="1.0" encoding="utf-8"?>
 <p:sld xmlns:a="http://schemas.openxmlformats.org/drawingml/2006/main" xmlns:r="http://schemas.openxmlformats.org/officeDocument/2006/relationships" xmlns:p="http://schemas.openxmlformats.org/presentationml/2006/main">
   <p:cSld>
     <p:spTree>
@@ -35458,7 +35655,7 @@
 </p:sld>
 </file>
 
-<file path=ppt/slides/slide41.xml><?xml version="1.0" encoding="utf-8"?>
+<file path=ppt/slides/slide42.xml><?xml version="1.0" encoding="utf-8"?>
 <p:sld xmlns:a="http://schemas.openxmlformats.org/drawingml/2006/main" xmlns:r="http://schemas.openxmlformats.org/officeDocument/2006/relationships" xmlns:p="http://schemas.openxmlformats.org/presentationml/2006/main">
   <p:cSld>
     <p:spTree>
@@ -36377,7 +36574,7 @@
 </p:sld>
 </file>
 
-<file path=ppt/slides/slide42.xml><?xml version="1.0" encoding="utf-8"?>
+<file path=ppt/slides/slide43.xml><?xml version="1.0" encoding="utf-8"?>
 <p:sld xmlns:a="http://schemas.openxmlformats.org/drawingml/2006/main" xmlns:r="http://schemas.openxmlformats.org/officeDocument/2006/relationships" xmlns:p="http://schemas.openxmlformats.org/presentationml/2006/main">
   <p:cSld>
     <p:spTree>
@@ -37580,7 +37777,7 @@
 </p:sld>
 </file>
 
-<file path=ppt/slides/slide43.xml><?xml version="1.0" encoding="utf-8"?>
+<file path=ppt/slides/slide44.xml><?xml version="1.0" encoding="utf-8"?>
 <p:sld xmlns:a="http://schemas.openxmlformats.org/drawingml/2006/main" xmlns:r="http://schemas.openxmlformats.org/officeDocument/2006/relationships" xmlns:p="http://schemas.openxmlformats.org/presentationml/2006/main">
   <p:cSld>
     <p:spTree>
@@ -38773,7 +38970,7 @@
 </p:sld>
 </file>
 
-<file path=ppt/slides/slide44.xml><?xml version="1.0" encoding="utf-8"?>
+<file path=ppt/slides/slide45.xml><?xml version="1.0" encoding="utf-8"?>
 <p:sld xmlns:a="http://schemas.openxmlformats.org/drawingml/2006/main" xmlns:r="http://schemas.openxmlformats.org/officeDocument/2006/relationships" xmlns:p="http://schemas.openxmlformats.org/presentationml/2006/main">
   <p:cSld>
     <p:spTree>

</xml_diff>

<commit_message>
Minor edits to slides
</commit_message>
<xml_diff>
--- a/slides/1_Introduction.pptx
+++ b/slides/1_Introduction.pptx
@@ -5,7 +5,7 @@
     <p:sldMasterId id="2147483648" r:id="rId1"/>
   </p:sldMasterIdLst>
   <p:notesMasterIdLst>
-    <p:notesMasterId r:id="rId47"/>
+    <p:notesMasterId r:id="rId48"/>
   </p:notesMasterIdLst>
   <p:sldIdLst>
     <p:sldId id="256" r:id="rId2"/>
@@ -18,41 +18,42 @@
     <p:sldId id="352" r:id="rId9"/>
     <p:sldId id="351" r:id="rId10"/>
     <p:sldId id="381" r:id="rId11"/>
-    <p:sldId id="355" r:id="rId12"/>
-    <p:sldId id="388" r:id="rId13"/>
-    <p:sldId id="395" r:id="rId14"/>
-    <p:sldId id="387" r:id="rId15"/>
-    <p:sldId id="382" r:id="rId16"/>
-    <p:sldId id="357" r:id="rId17"/>
-    <p:sldId id="385" r:id="rId18"/>
-    <p:sldId id="359" r:id="rId19"/>
-    <p:sldId id="386" r:id="rId20"/>
-    <p:sldId id="360" r:id="rId21"/>
-    <p:sldId id="374" r:id="rId22"/>
-    <p:sldId id="375" r:id="rId23"/>
-    <p:sldId id="376" r:id="rId24"/>
-    <p:sldId id="377" r:id="rId25"/>
-    <p:sldId id="378" r:id="rId26"/>
-    <p:sldId id="379" r:id="rId27"/>
-    <p:sldId id="380" r:id="rId28"/>
-    <p:sldId id="362" r:id="rId29"/>
-    <p:sldId id="364" r:id="rId30"/>
-    <p:sldId id="365" r:id="rId31"/>
-    <p:sldId id="363" r:id="rId32"/>
-    <p:sldId id="366" r:id="rId33"/>
-    <p:sldId id="372" r:id="rId34"/>
-    <p:sldId id="361" r:id="rId35"/>
-    <p:sldId id="368" r:id="rId36"/>
-    <p:sldId id="390" r:id="rId37"/>
-    <p:sldId id="391" r:id="rId38"/>
-    <p:sldId id="392" r:id="rId39"/>
-    <p:sldId id="393" r:id="rId40"/>
-    <p:sldId id="394" r:id="rId41"/>
-    <p:sldId id="371" r:id="rId42"/>
-    <p:sldId id="369" r:id="rId43"/>
-    <p:sldId id="373" r:id="rId44"/>
-    <p:sldId id="370" r:id="rId45"/>
-    <p:sldId id="384" r:id="rId46"/>
+    <p:sldId id="396" r:id="rId12"/>
+    <p:sldId id="355" r:id="rId13"/>
+    <p:sldId id="388" r:id="rId14"/>
+    <p:sldId id="395" r:id="rId15"/>
+    <p:sldId id="387" r:id="rId16"/>
+    <p:sldId id="382" r:id="rId17"/>
+    <p:sldId id="357" r:id="rId18"/>
+    <p:sldId id="385" r:id="rId19"/>
+    <p:sldId id="359" r:id="rId20"/>
+    <p:sldId id="386" r:id="rId21"/>
+    <p:sldId id="360" r:id="rId22"/>
+    <p:sldId id="374" r:id="rId23"/>
+    <p:sldId id="375" r:id="rId24"/>
+    <p:sldId id="376" r:id="rId25"/>
+    <p:sldId id="377" r:id="rId26"/>
+    <p:sldId id="378" r:id="rId27"/>
+    <p:sldId id="379" r:id="rId28"/>
+    <p:sldId id="380" r:id="rId29"/>
+    <p:sldId id="362" r:id="rId30"/>
+    <p:sldId id="364" r:id="rId31"/>
+    <p:sldId id="365" r:id="rId32"/>
+    <p:sldId id="363" r:id="rId33"/>
+    <p:sldId id="366" r:id="rId34"/>
+    <p:sldId id="372" r:id="rId35"/>
+    <p:sldId id="361" r:id="rId36"/>
+    <p:sldId id="368" r:id="rId37"/>
+    <p:sldId id="390" r:id="rId38"/>
+    <p:sldId id="391" r:id="rId39"/>
+    <p:sldId id="392" r:id="rId40"/>
+    <p:sldId id="393" r:id="rId41"/>
+    <p:sldId id="394" r:id="rId42"/>
+    <p:sldId id="371" r:id="rId43"/>
+    <p:sldId id="369" r:id="rId44"/>
+    <p:sldId id="373" r:id="rId45"/>
+    <p:sldId id="370" r:id="rId46"/>
+    <p:sldId id="384" r:id="rId47"/>
   </p:sldIdLst>
   <p:sldSz cx="12192000" cy="6858000"/>
   <p:notesSz cx="6858000" cy="9144000"/>
@@ -241,7 +242,7 @@
           <a:p>
             <a:fld id="{2F3ABF1A-8818-4472-8518-E71DC7B5D2F7}" type="datetimeFigureOut">
               <a:rPr lang="en-US" smtClean="0"/>
-              <a:t>6/21/2022</a:t>
+              <a:t>6/22/2022</a:t>
             </a:fld>
             <a:endParaRPr lang="en-US"/>
           </a:p>
@@ -573,7 +574,7 @@
           <a:p>
             <a:fld id="{F33E01E3-981B-4CB5-81ED-65C622C255CB}" type="slidenum">
               <a:rPr lang="en-US" smtClean="0"/>
-              <a:t>32</a:t>
+              <a:t>33</a:t>
             </a:fld>
             <a:endParaRPr lang="en-US"/>
           </a:p>
@@ -660,7 +661,7 @@
           <a:p>
             <a:fld id="{F33E01E3-981B-4CB5-81ED-65C622C255CB}" type="slidenum">
               <a:rPr lang="en-US" smtClean="0"/>
-              <a:t>41</a:t>
+              <a:t>42</a:t>
             </a:fld>
             <a:endParaRPr lang="en-US"/>
           </a:p>
@@ -747,7 +748,7 @@
           <a:p>
             <a:fld id="{F33E01E3-981B-4CB5-81ED-65C622C255CB}" type="slidenum">
               <a:rPr lang="en-US" smtClean="0"/>
-              <a:t>42</a:t>
+              <a:t>43</a:t>
             </a:fld>
             <a:endParaRPr lang="en-US"/>
           </a:p>
@@ -834,7 +835,7 @@
           <a:p>
             <a:fld id="{F33E01E3-981B-4CB5-81ED-65C622C255CB}" type="slidenum">
               <a:rPr lang="en-US" smtClean="0"/>
-              <a:t>43</a:t>
+              <a:t>44</a:t>
             </a:fld>
             <a:endParaRPr lang="en-US"/>
           </a:p>
@@ -921,7 +922,7 @@
           <a:p>
             <a:fld id="{F33E01E3-981B-4CB5-81ED-65C622C255CB}" type="slidenum">
               <a:rPr lang="en-US" smtClean="0"/>
-              <a:t>44</a:t>
+              <a:t>45</a:t>
             </a:fld>
             <a:endParaRPr lang="en-US"/>
           </a:p>
@@ -1087,7 +1088,7 @@
           <a:p>
             <a:fld id="{6E4A31BF-7266-4BEB-918B-ADC21C630A6F}" type="datetimeFigureOut">
               <a:rPr lang="en-US" smtClean="0"/>
-              <a:t>6/21/2022</a:t>
+              <a:t>6/22/2022</a:t>
             </a:fld>
             <a:endParaRPr lang="en-US"/>
           </a:p>
@@ -1285,7 +1286,7 @@
           <a:p>
             <a:fld id="{6E4A31BF-7266-4BEB-918B-ADC21C630A6F}" type="datetimeFigureOut">
               <a:rPr lang="en-US" smtClean="0"/>
-              <a:t>6/21/2022</a:t>
+              <a:t>6/22/2022</a:t>
             </a:fld>
             <a:endParaRPr lang="en-US"/>
           </a:p>
@@ -1493,7 +1494,7 @@
           <a:p>
             <a:fld id="{6E4A31BF-7266-4BEB-918B-ADC21C630A6F}" type="datetimeFigureOut">
               <a:rPr lang="en-US" smtClean="0"/>
-              <a:t>6/21/2022</a:t>
+              <a:t>6/22/2022</a:t>
             </a:fld>
             <a:endParaRPr lang="en-US"/>
           </a:p>
@@ -1691,7 +1692,7 @@
           <a:p>
             <a:fld id="{6E4A31BF-7266-4BEB-918B-ADC21C630A6F}" type="datetimeFigureOut">
               <a:rPr lang="en-US" smtClean="0"/>
-              <a:t>6/21/2022</a:t>
+              <a:t>6/22/2022</a:t>
             </a:fld>
             <a:endParaRPr lang="en-US"/>
           </a:p>
@@ -1966,7 +1967,7 @@
           <a:p>
             <a:fld id="{6E4A31BF-7266-4BEB-918B-ADC21C630A6F}" type="datetimeFigureOut">
               <a:rPr lang="en-US" smtClean="0"/>
-              <a:t>6/21/2022</a:t>
+              <a:t>6/22/2022</a:t>
             </a:fld>
             <a:endParaRPr lang="en-US"/>
           </a:p>
@@ -2231,7 +2232,7 @@
           <a:p>
             <a:fld id="{6E4A31BF-7266-4BEB-918B-ADC21C630A6F}" type="datetimeFigureOut">
               <a:rPr lang="en-US" smtClean="0"/>
-              <a:t>6/21/2022</a:t>
+              <a:t>6/22/2022</a:t>
             </a:fld>
             <a:endParaRPr lang="en-US"/>
           </a:p>
@@ -2643,7 +2644,7 @@
           <a:p>
             <a:fld id="{6E4A31BF-7266-4BEB-918B-ADC21C630A6F}" type="datetimeFigureOut">
               <a:rPr lang="en-US" smtClean="0"/>
-              <a:t>6/21/2022</a:t>
+              <a:t>6/22/2022</a:t>
             </a:fld>
             <a:endParaRPr lang="en-US"/>
           </a:p>
@@ -2784,7 +2785,7 @@
           <a:p>
             <a:fld id="{6E4A31BF-7266-4BEB-918B-ADC21C630A6F}" type="datetimeFigureOut">
               <a:rPr lang="en-US" smtClean="0"/>
-              <a:t>6/21/2022</a:t>
+              <a:t>6/22/2022</a:t>
             </a:fld>
             <a:endParaRPr lang="en-US"/>
           </a:p>
@@ -2897,7 +2898,7 @@
           <a:p>
             <a:fld id="{6E4A31BF-7266-4BEB-918B-ADC21C630A6F}" type="datetimeFigureOut">
               <a:rPr lang="en-US" smtClean="0"/>
-              <a:t>6/21/2022</a:t>
+              <a:t>6/22/2022</a:t>
             </a:fld>
             <a:endParaRPr lang="en-US"/>
           </a:p>
@@ -3208,7 +3209,7 @@
           <a:p>
             <a:fld id="{6E4A31BF-7266-4BEB-918B-ADC21C630A6F}" type="datetimeFigureOut">
               <a:rPr lang="en-US" smtClean="0"/>
-              <a:t>6/21/2022</a:t>
+              <a:t>6/22/2022</a:t>
             </a:fld>
             <a:endParaRPr lang="en-US"/>
           </a:p>
@@ -3496,7 +3497,7 @@
           <a:p>
             <a:fld id="{6E4A31BF-7266-4BEB-918B-ADC21C630A6F}" type="datetimeFigureOut">
               <a:rPr lang="en-US" smtClean="0"/>
-              <a:t>6/21/2022</a:t>
+              <a:t>6/22/2022</a:t>
             </a:fld>
             <a:endParaRPr lang="en-US"/>
           </a:p>
@@ -3737,7 +3738,7 @@
           <a:p>
             <a:fld id="{6E4A31BF-7266-4BEB-918B-ADC21C630A6F}" type="datetimeFigureOut">
               <a:rPr lang="en-US" smtClean="0"/>
-              <a:t>6/21/2022</a:t>
+              <a:t>6/22/2022</a:t>
             </a:fld>
             <a:endParaRPr lang="en-US"/>
           </a:p>
@@ -4394,7 +4395,7 @@
         </p:spPr>
         <p:txBody>
           <a:bodyPr>
-            <a:normAutofit lnSpcReduction="10000"/>
+            <a:normAutofit/>
           </a:bodyPr>
           <a:lstStyle/>
           <a:p>
@@ -4465,15 +4466,7 @@
             </a:pPr>
             <a:r>
               <a:rPr lang="en-US" dirty="0"/>
-              <a:t>Assignment </a:t>
-            </a:r>
-            <a:r>
-              <a:rPr lang="en-US"/>
-              <a:t>due dates, submissions, </a:t>
-            </a:r>
-            <a:r>
-              <a:rPr lang="en-US" dirty="0"/>
-              <a:t>and grading in Canvas</a:t>
+              <a:t>Assignment due dates, submissions, and grading in Canvas</a:t>
             </a:r>
           </a:p>
           <a:p>
@@ -4524,26 +4517,27 @@
           <a:p>
             <a:pPr lvl="1"/>
             <a:r>
-              <a:rPr lang="en-US" dirty="0">
+              <a:rPr lang="en-US" u="sng" dirty="0">
                 <a:hlinkClick r:id="rId4"/>
               </a:rPr>
-              <a:t>Elements of Statistical Learning</a:t>
-            </a:r>
-            <a:r>
-              <a:rPr lang="en-US" dirty="0"/>
-              <a:t>, 2</a:t>
-            </a:r>
-            <a:r>
-              <a:rPr lang="en-US" baseline="30000" dirty="0"/>
+              <a:t>Networks, 2</a:t>
+            </a:r>
+            <a:r>
+              <a:rPr lang="en-US" u="sng" baseline="30000" dirty="0">
+                <a:hlinkClick r:id="rId4"/>
+              </a:rPr>
               <a:t>nd</a:t>
             </a:r>
             <a:r>
-              <a:rPr lang="en-US" dirty="0"/>
-              <a:t> Ed</a:t>
-            </a:r>
-          </a:p>
-          <a:p>
-            <a:pPr lvl="1"/>
+              <a:rPr lang="en-US" u="sng" dirty="0">
+                <a:hlinkClick r:id="rId4"/>
+              </a:rPr>
+              <a:t> edition, Mark Newman</a:t>
+            </a:r>
+            <a:r>
+              <a:rPr lang="en-US" u="sng" dirty="0"/>
+              <a:t> </a:t>
+            </a:r>
             <a:r>
               <a:rPr lang="en-US" dirty="0"/>
               <a:t>Available through the Harvard Coop</a:t>
@@ -5269,27 +5263,214 @@
                       </p:childTnLst>
                     </p:cTn>
                   </p:par>
+                </p:childTnLst>
+              </p:cTn>
+              <p:prevCondLst>
+                <p:cond evt="onPrev" delay="0">
+                  <p:tgtEl>
+                    <p:sldTgt/>
+                  </p:tgtEl>
+                </p:cond>
+              </p:prevCondLst>
+              <p:nextCondLst>
+                <p:cond evt="onNext" delay="0">
+                  <p:tgtEl>
+                    <p:sldTgt/>
+                  </p:tgtEl>
+                </p:cond>
+              </p:nextCondLst>
+            </p:seq>
+          </p:childTnLst>
+        </p:cTn>
+      </p:par>
+    </p:tnLst>
+  </p:timing>
+</p:sld>
+</file>
+
+<file path=ppt/slides/slide11.xml><?xml version="1.0" encoding="utf-8"?>
+<p:sld xmlns:a="http://schemas.openxmlformats.org/drawingml/2006/main" xmlns:r="http://schemas.openxmlformats.org/officeDocument/2006/relationships" xmlns:p="http://schemas.openxmlformats.org/presentationml/2006/main">
+  <p:cSld>
+    <p:spTree>
+      <p:nvGrpSpPr>
+        <p:cNvPr id="1" name=""/>
+        <p:cNvGrpSpPr/>
+        <p:nvPr/>
+      </p:nvGrpSpPr>
+      <p:grpSpPr>
+        <a:xfrm>
+          <a:off x="0" y="0"/>
+          <a:ext cx="0" cy="0"/>
+          <a:chOff x="0" y="0"/>
+          <a:chExt cx="0" cy="0"/>
+        </a:xfrm>
+      </p:grpSpPr>
+      <p:sp>
+        <p:nvSpPr>
+          <p:cNvPr id="3" name="Content Placeholder 2">
+            <a:extLst>
+              <a:ext uri="{FF2B5EF4-FFF2-40B4-BE49-F238E27FC236}">
+                <a16:creationId xmlns:a16="http://schemas.microsoft.com/office/drawing/2014/main" id="{258E6AF3-7615-4BD1-878E-A94C93E98F90}"/>
+              </a:ext>
+            </a:extLst>
+          </p:cNvPr>
+          <p:cNvSpPr>
+            <a:spLocks noGrp="1"/>
+          </p:cNvSpPr>
+          <p:nvPr>
+            <p:ph idx="1"/>
+          </p:nvPr>
+        </p:nvSpPr>
+        <p:spPr>
+          <a:xfrm>
+            <a:off x="838200" y="1541417"/>
+            <a:ext cx="10515600" cy="4635546"/>
+          </a:xfrm>
+        </p:spPr>
+        <p:txBody>
+          <a:bodyPr/>
+          <a:lstStyle/>
+          <a:p>
+            <a:pPr marL="0" indent="0">
+              <a:buNone/>
+            </a:pPr>
+            <a:r>
+              <a:rPr lang="en-US" dirty="0"/>
+              <a:t>Schedule for live class meetings (6:30-8:30 pm US Eastern Time)</a:t>
+            </a:r>
+            <a:endParaRPr lang="en-US" b="1" dirty="0"/>
+          </a:p>
+          <a:p>
+            <a:r>
+              <a:rPr lang="en-US" dirty="0"/>
+              <a:t>Monday and Wednesday – Lectures focused on theoretical foundations </a:t>
+            </a:r>
+          </a:p>
+          <a:p>
+            <a:r>
+              <a:rPr lang="en-US" dirty="0"/>
+              <a:t>Tuesday and Thursday – Section meeting to address questions, review and background </a:t>
+            </a:r>
+          </a:p>
+          <a:p>
+            <a:r>
+              <a:rPr lang="en-US" dirty="0"/>
+              <a:t>This Friday (June 24) only – makeup class for Monday holiday   </a:t>
+            </a:r>
+          </a:p>
+          <a:p>
+            <a:pPr marL="0" indent="0">
+              <a:buNone/>
+            </a:pPr>
+            <a:r>
+              <a:rPr lang="en-US" dirty="0">
+                <a:solidFill>
+                  <a:srgbClr val="FF0000"/>
+                </a:solidFill>
+              </a:rPr>
+              <a:t>All class meetings are recorded and available on-demand – See Panopto tab in Canvas</a:t>
+            </a:r>
+          </a:p>
+          <a:p>
+            <a:endParaRPr lang="en-US" b="1" dirty="0"/>
+          </a:p>
+        </p:txBody>
+      </p:sp>
+      <p:sp>
+        <p:nvSpPr>
+          <p:cNvPr id="6" name="Title 1">
+            <a:extLst>
+              <a:ext uri="{FF2B5EF4-FFF2-40B4-BE49-F238E27FC236}">
+                <a16:creationId xmlns:a16="http://schemas.microsoft.com/office/drawing/2014/main" id="{CD29F70F-B868-451B-A65D-8721F4C7A2D9}"/>
+              </a:ext>
+            </a:extLst>
+          </p:cNvPr>
+          <p:cNvSpPr txBox="1">
+            <a:spLocks/>
+          </p:cNvSpPr>
+          <p:nvPr/>
+        </p:nvSpPr>
+        <p:spPr>
+          <a:xfrm>
+            <a:off x="838200" y="-635"/>
+            <a:ext cx="10515600" cy="1325563"/>
+          </a:xfrm>
+          <a:prstGeom prst="rect">
+            <a:avLst/>
+          </a:prstGeom>
+        </p:spPr>
+        <p:txBody>
+          <a:bodyPr vert="horz" lIns="91440" tIns="45720" rIns="91440" bIns="45720" rtlCol="0" anchor="ctr">
+            <a:normAutofit/>
+          </a:bodyPr>
+          <a:lstStyle>
+            <a:lvl1pPr algn="l" defTabSz="914400" rtl="0" eaLnBrk="1" latinLnBrk="0" hangingPunct="1">
+              <a:lnSpc>
+                <a:spcPct val="90000"/>
+              </a:lnSpc>
+              <a:spcBef>
+                <a:spcPct val="0"/>
+              </a:spcBef>
+              <a:buNone/>
+              <a:defRPr sz="4400" kern="1200">
+                <a:solidFill>
+                  <a:schemeClr val="tx1"/>
+                </a:solidFill>
+                <a:latin typeface="+mj-lt"/>
+                <a:ea typeface="+mj-ea"/>
+                <a:cs typeface="+mj-cs"/>
+              </a:defRPr>
+            </a:lvl1pPr>
+          </a:lstStyle>
+          <a:p>
+            <a:r>
+              <a:rPr lang="en-US" dirty="0">
+                <a:latin typeface="+mn-lt"/>
+              </a:rPr>
+              <a:t>Schedule </a:t>
+            </a:r>
+          </a:p>
+        </p:txBody>
+      </p:sp>
+    </p:spTree>
+    <p:extLst>
+      <p:ext uri="{BB962C8B-B14F-4D97-AF65-F5344CB8AC3E}">
+        <p14:creationId xmlns:p14="http://schemas.microsoft.com/office/powerpoint/2010/main" val="2116158898"/>
+      </p:ext>
+    </p:extLst>
+  </p:cSld>
+  <p:clrMapOvr>
+    <a:masterClrMapping/>
+  </p:clrMapOvr>
+  <p:timing>
+    <p:tnLst>
+      <p:par>
+        <p:cTn id="1" dur="indefinite" restart="never" nodeType="tmRoot">
+          <p:childTnLst>
+            <p:seq concurrent="1" nextAc="seek">
+              <p:cTn id="2" dur="indefinite" nodeType="mainSeq">
+                <p:childTnLst>
                   <p:par>
-                    <p:cTn id="55" fill="hold">
+                    <p:cTn id="3" fill="hold">
                       <p:stCondLst>
                         <p:cond delay="indefinite"/>
                       </p:stCondLst>
                       <p:childTnLst>
                         <p:par>
-                          <p:cTn id="56" fill="hold">
+                          <p:cTn id="4" fill="hold">
                             <p:stCondLst>
                               <p:cond delay="0"/>
                             </p:stCondLst>
                             <p:childTnLst>
                               <p:par>
-                                <p:cTn id="57" presetID="1" presetClass="entr" presetSubtype="0" fill="hold" nodeType="clickEffect">
+                                <p:cTn id="5" presetID="1" presetClass="entr" presetSubtype="0" fill="hold" nodeType="clickEffect">
                                   <p:stCondLst>
                                     <p:cond delay="0"/>
                                   </p:stCondLst>
                                   <p:childTnLst>
                                     <p:set>
                                       <p:cBhvr>
-                                        <p:cTn id="58" dur="1" fill="hold">
+                                        <p:cTn id="6" dur="1" fill="hold">
                                           <p:stCondLst>
                                             <p:cond delay="0"/>
                                           </p:stCondLst>
@@ -5297,7 +5478,203 @@
                                         <p:tgtEl>
                                           <p:spTgt spid="3">
                                             <p:txEl>
-                                              <p:pRg st="13" end="13"/>
+                                              <p:pRg st="0" end="0"/>
+                                            </p:txEl>
+                                          </p:spTgt>
+                                        </p:tgtEl>
+                                        <p:attrNameLst>
+                                          <p:attrName>style.visibility</p:attrName>
+                                        </p:attrNameLst>
+                                      </p:cBhvr>
+                                      <p:to>
+                                        <p:strVal val="visible"/>
+                                      </p:to>
+                                    </p:set>
+                                  </p:childTnLst>
+                                </p:cTn>
+                              </p:par>
+                            </p:childTnLst>
+                          </p:cTn>
+                        </p:par>
+                      </p:childTnLst>
+                    </p:cTn>
+                  </p:par>
+                  <p:par>
+                    <p:cTn id="7" fill="hold">
+                      <p:stCondLst>
+                        <p:cond delay="indefinite"/>
+                      </p:stCondLst>
+                      <p:childTnLst>
+                        <p:par>
+                          <p:cTn id="8" fill="hold">
+                            <p:stCondLst>
+                              <p:cond delay="0"/>
+                            </p:stCondLst>
+                            <p:childTnLst>
+                              <p:par>
+                                <p:cTn id="9" presetID="1" presetClass="entr" presetSubtype="0" fill="hold" nodeType="clickEffect">
+                                  <p:stCondLst>
+                                    <p:cond delay="0"/>
+                                  </p:stCondLst>
+                                  <p:childTnLst>
+                                    <p:set>
+                                      <p:cBhvr>
+                                        <p:cTn id="10" dur="1" fill="hold">
+                                          <p:stCondLst>
+                                            <p:cond delay="0"/>
+                                          </p:stCondLst>
+                                        </p:cTn>
+                                        <p:tgtEl>
+                                          <p:spTgt spid="3">
+                                            <p:txEl>
+                                              <p:pRg st="1" end="1"/>
+                                            </p:txEl>
+                                          </p:spTgt>
+                                        </p:tgtEl>
+                                        <p:attrNameLst>
+                                          <p:attrName>style.visibility</p:attrName>
+                                        </p:attrNameLst>
+                                      </p:cBhvr>
+                                      <p:to>
+                                        <p:strVal val="visible"/>
+                                      </p:to>
+                                    </p:set>
+                                  </p:childTnLst>
+                                </p:cTn>
+                              </p:par>
+                            </p:childTnLst>
+                          </p:cTn>
+                        </p:par>
+                      </p:childTnLst>
+                    </p:cTn>
+                  </p:par>
+                  <p:par>
+                    <p:cTn id="11" fill="hold">
+                      <p:stCondLst>
+                        <p:cond delay="indefinite"/>
+                      </p:stCondLst>
+                      <p:childTnLst>
+                        <p:par>
+                          <p:cTn id="12" fill="hold">
+                            <p:stCondLst>
+                              <p:cond delay="0"/>
+                            </p:stCondLst>
+                            <p:childTnLst>
+                              <p:par>
+                                <p:cTn id="13" presetID="1" presetClass="entr" presetSubtype="0" fill="hold" nodeType="clickEffect">
+                                  <p:stCondLst>
+                                    <p:cond delay="0"/>
+                                  </p:stCondLst>
+                                  <p:childTnLst>
+                                    <p:set>
+                                      <p:cBhvr>
+                                        <p:cTn id="14" dur="1" fill="hold">
+                                          <p:stCondLst>
+                                            <p:cond delay="0"/>
+                                          </p:stCondLst>
+                                        </p:cTn>
+                                        <p:tgtEl>
+                                          <p:spTgt spid="3">
+                                            <p:txEl>
+                                              <p:pRg st="2" end="2"/>
+                                            </p:txEl>
+                                          </p:spTgt>
+                                        </p:tgtEl>
+                                        <p:attrNameLst>
+                                          <p:attrName>style.visibility</p:attrName>
+                                        </p:attrNameLst>
+                                      </p:cBhvr>
+                                      <p:to>
+                                        <p:strVal val="visible"/>
+                                      </p:to>
+                                    </p:set>
+                                  </p:childTnLst>
+                                </p:cTn>
+                              </p:par>
+                            </p:childTnLst>
+                          </p:cTn>
+                        </p:par>
+                      </p:childTnLst>
+                    </p:cTn>
+                  </p:par>
+                  <p:par>
+                    <p:cTn id="15" fill="hold">
+                      <p:stCondLst>
+                        <p:cond delay="indefinite"/>
+                      </p:stCondLst>
+                      <p:childTnLst>
+                        <p:par>
+                          <p:cTn id="16" fill="hold">
+                            <p:stCondLst>
+                              <p:cond delay="0"/>
+                            </p:stCondLst>
+                            <p:childTnLst>
+                              <p:par>
+                                <p:cTn id="17" presetID="1" presetClass="entr" presetSubtype="0" fill="hold" nodeType="clickEffect">
+                                  <p:stCondLst>
+                                    <p:cond delay="0"/>
+                                  </p:stCondLst>
+                                  <p:childTnLst>
+                                    <p:set>
+                                      <p:cBhvr>
+                                        <p:cTn id="18" dur="1" fill="hold">
+                                          <p:stCondLst>
+                                            <p:cond delay="0"/>
+                                          </p:stCondLst>
+                                        </p:cTn>
+                                        <p:tgtEl>
+                                          <p:spTgt spid="3">
+                                            <p:txEl>
+                                              <p:pRg st="3" end="3"/>
+                                            </p:txEl>
+                                          </p:spTgt>
+                                        </p:tgtEl>
+                                        <p:attrNameLst>
+                                          <p:attrName>style.visibility</p:attrName>
+                                        </p:attrNameLst>
+                                      </p:cBhvr>
+                                      <p:to>
+                                        <p:strVal val="visible"/>
+                                      </p:to>
+                                    </p:set>
+                                  </p:childTnLst>
+                                </p:cTn>
+                              </p:par>
+                            </p:childTnLst>
+                          </p:cTn>
+                        </p:par>
+                      </p:childTnLst>
+                    </p:cTn>
+                  </p:par>
+                  <p:par>
+                    <p:cTn id="19" fill="hold">
+                      <p:stCondLst>
+                        <p:cond delay="indefinite"/>
+                      </p:stCondLst>
+                      <p:childTnLst>
+                        <p:par>
+                          <p:cTn id="20" fill="hold">
+                            <p:stCondLst>
+                              <p:cond delay="0"/>
+                            </p:stCondLst>
+                            <p:childTnLst>
+                              <p:par>
+                                <p:cTn id="21" presetID="1" presetClass="entr" presetSubtype="0" fill="hold" nodeType="clickEffect">
+                                  <p:stCondLst>
+                                    <p:cond delay="0"/>
+                                  </p:stCondLst>
+                                  <p:childTnLst>
+                                    <p:set>
+                                      <p:cBhvr>
+                                        <p:cTn id="22" dur="1" fill="hold">
+                                          <p:stCondLst>
+                                            <p:cond delay="0"/>
+                                          </p:stCondLst>
+                                        </p:cTn>
+                                        <p:tgtEl>
+                                          <p:spTgt spid="3">
+                                            <p:txEl>
+                                              <p:pRg st="4" end="4"/>
                                             </p:txEl>
                                           </p:spTgt>
                                         </p:tgtEl>
@@ -5343,7 +5720,7 @@
 </p:sld>
 </file>
 
-<file path=ppt/slides/slide11.xml><?xml version="1.0" encoding="utf-8"?>
+<file path=ppt/slides/slide12.xml><?xml version="1.0" encoding="utf-8"?>
 <p:sld xmlns:a="http://schemas.openxmlformats.org/drawingml/2006/main" xmlns:r="http://schemas.openxmlformats.org/officeDocument/2006/relationships" xmlns:p="http://schemas.openxmlformats.org/presentationml/2006/main">
   <p:cSld>
     <p:spTree>
@@ -5726,7 +6103,7 @@
 </p:sld>
 </file>
 
-<file path=ppt/slides/slide12.xml><?xml version="1.0" encoding="utf-8"?>
+<file path=ppt/slides/slide13.xml><?xml version="1.0" encoding="utf-8"?>
 <p:sld xmlns:a="http://schemas.openxmlformats.org/drawingml/2006/main" xmlns:r="http://schemas.openxmlformats.org/officeDocument/2006/relationships" xmlns:p="http://schemas.openxmlformats.org/presentationml/2006/main">
   <p:cSld>
     <p:spTree>
@@ -6235,7 +6612,7 @@
 </p:sld>
 </file>
 
-<file path=ppt/slides/slide13.xml><?xml version="1.0" encoding="utf-8"?>
+<file path=ppt/slides/slide14.xml><?xml version="1.0" encoding="utf-8"?>
 <p:sld xmlns:a="http://schemas.openxmlformats.org/drawingml/2006/main" xmlns:r="http://schemas.openxmlformats.org/officeDocument/2006/relationships" xmlns:p="http://schemas.openxmlformats.org/presentationml/2006/main">
   <p:cSld>
     <p:spTree>
@@ -6431,7 +6808,7 @@
 </p:sld>
 </file>
 
-<file path=ppt/slides/slide14.xml><?xml version="1.0" encoding="utf-8"?>
+<file path=ppt/slides/slide15.xml><?xml version="1.0" encoding="utf-8"?>
 <p:sld xmlns:a="http://schemas.openxmlformats.org/drawingml/2006/main" xmlns:r="http://schemas.openxmlformats.org/officeDocument/2006/relationships" xmlns:p="http://schemas.openxmlformats.org/presentationml/2006/main">
   <p:cSld>
     <p:spTree>
@@ -7172,7 +7549,7 @@
 </p:sld>
 </file>
 
-<file path=ppt/slides/slide15.xml><?xml version="1.0" encoding="utf-8"?>
+<file path=ppt/slides/slide16.xml><?xml version="1.0" encoding="utf-8"?>
 <p:sld xmlns:a="http://schemas.openxmlformats.org/drawingml/2006/main" xmlns:r="http://schemas.openxmlformats.org/officeDocument/2006/relationships" xmlns:p="http://schemas.openxmlformats.org/presentationml/2006/main">
   <p:cSld>
     <p:spTree>
@@ -8048,7 +8425,7 @@
 </p:sld>
 </file>
 
-<file path=ppt/slides/slide16.xml><?xml version="1.0" encoding="utf-8"?>
+<file path=ppt/slides/slide17.xml><?xml version="1.0" encoding="utf-8"?>
 <p:sld xmlns:a="http://schemas.openxmlformats.org/drawingml/2006/main" xmlns:r="http://schemas.openxmlformats.org/officeDocument/2006/relationships" xmlns:p="http://schemas.openxmlformats.org/presentationml/2006/main">
   <p:cSld>
     <p:spTree>
@@ -8065,8 +8442,8 @@
           <a:chExt cx="0" cy="0"/>
         </a:xfrm>
       </p:grpSpPr>
-      <mc:AlternateContent xmlns:mc="http://schemas.openxmlformats.org/markup-compatibility/2006" xmlns:a14="http://schemas.microsoft.com/office/drawing/2010/main">
-        <mc:Choice Requires="a14">
+      <mc:AlternateContent xmlns:mc="http://schemas.openxmlformats.org/markup-compatibility/2006">
+        <mc:Choice xmlns:a14="http://schemas.microsoft.com/office/drawing/2010/main" Requires="a14">
           <p:sp>
             <p:nvSpPr>
               <p:cNvPr id="3" name="Content Placeholder 2">
@@ -8150,7 +8527,7 @@
               <a:p>
                 <a:r>
                   <a:rPr lang="en-US" sz="3000" dirty="0"/>
-                  <a:t>Dictionaries</a:t>
+                  <a:t>Example: In-memory dictionaries</a:t>
                 </a:r>
               </a:p>
               <a:p>
@@ -8171,13 +8548,8 @@
                 <a:pPr lvl="1"/>
                 <a:r>
                   <a:rPr lang="en-US" sz="2600" dirty="0"/>
-                  <a:t>In Python and many other </a:t>
+                  <a:t>In Python and many other languages</a:t>
                 </a:r>
-                <a:r>
-                  <a:rPr lang="en-US" sz="2600" dirty="0" err="1"/>
-                  <a:t>laguages</a:t>
-                </a:r>
-                <a:endParaRPr lang="en-US" sz="2600" dirty="0"/>
               </a:p>
               <a:p>
                 <a:r>
@@ -8200,7 +8572,7 @@
             </p:txBody>
           </p:sp>
         </mc:Choice>
-        <mc:Fallback xmlns="">
+        <mc:Fallback>
           <p:sp>
             <p:nvSpPr>
               <p:cNvPr id="3" name="Content Placeholder 2">
@@ -8735,7 +9107,7 @@
 </p:sld>
 </file>
 
-<file path=ppt/slides/slide17.xml><?xml version="1.0" encoding="utf-8"?>
+<file path=ppt/slides/slide18.xml><?xml version="1.0" encoding="utf-8"?>
 <p:sld xmlns:a="http://schemas.openxmlformats.org/drawingml/2006/main" xmlns:r="http://schemas.openxmlformats.org/officeDocument/2006/relationships" xmlns:p="http://schemas.openxmlformats.org/presentationml/2006/main">
   <p:cSld>
     <p:spTree>
@@ -8831,7 +9203,7 @@
             </a:pPr>
             <a:r>
               <a:rPr lang="en-US" sz="3000" dirty="0"/>
-              <a:t>Balanced binary trees (B-trees)</a:t>
+              <a:t>Balanced trees (B-trees)</a:t>
             </a:r>
           </a:p>
           <a:p>
@@ -9248,7 +9620,7 @@
 </p:sld>
 </file>
 
-<file path=ppt/slides/slide18.xml><?xml version="1.0" encoding="utf-8"?>
+<file path=ppt/slides/slide19.xml><?xml version="1.0" encoding="utf-8"?>
 <p:sld xmlns:a="http://schemas.openxmlformats.org/drawingml/2006/main" xmlns:r="http://schemas.openxmlformats.org/officeDocument/2006/relationships" xmlns:p="http://schemas.openxmlformats.org/presentationml/2006/main">
   <p:cSld>
     <p:spTree>
@@ -9265,8 +9637,8 @@
           <a:chExt cx="0" cy="0"/>
         </a:xfrm>
       </p:grpSpPr>
-      <mc:AlternateContent xmlns:mc="http://schemas.openxmlformats.org/markup-compatibility/2006" xmlns:a14="http://schemas.microsoft.com/office/drawing/2010/main">
-        <mc:Choice Requires="a14">
+      <mc:AlternateContent xmlns:mc="http://schemas.openxmlformats.org/markup-compatibility/2006">
+        <mc:Choice xmlns:a14="http://schemas.microsoft.com/office/drawing/2010/main" Requires="a14">
           <p:sp>
             <p:nvSpPr>
               <p:cNvPr id="3" name="Content Placeholder 2">
@@ -9451,7 +9823,7 @@
                 <a:pPr lvl="1"/>
                 <a:r>
                   <a:rPr lang="en-US" dirty="0"/>
-                  <a:t>Look up uses hashed key-value pairs as a tuple, </a:t>
+                  <a:t>Look-up uses hashed key-value pairs as a tuple, </a:t>
                 </a:r>
                 <a14:m>
                   <m:oMath xmlns:m="http://schemas.openxmlformats.org/officeDocument/2006/math">
@@ -9535,7 +9907,7 @@
             </p:txBody>
           </p:sp>
         </mc:Choice>
-        <mc:Fallback xmlns="">
+        <mc:Fallback>
           <p:sp>
             <p:nvSpPr>
               <p:cNvPr id="3" name="Content Placeholder 2">
@@ -10070,7 +10442,536 @@
 </p:sld>
 </file>
 
-<file path=ppt/slides/slide19.xml><?xml version="1.0" encoding="utf-8"?>
+<file path=ppt/slides/slide2.xml><?xml version="1.0" encoding="utf-8"?>
+<p:sld xmlns:a="http://schemas.openxmlformats.org/drawingml/2006/main" xmlns:r="http://schemas.openxmlformats.org/officeDocument/2006/relationships" xmlns:p="http://schemas.openxmlformats.org/presentationml/2006/main">
+  <p:cSld>
+    <p:spTree>
+      <p:nvGrpSpPr>
+        <p:cNvPr id="1" name=""/>
+        <p:cNvGrpSpPr/>
+        <p:nvPr/>
+      </p:nvGrpSpPr>
+      <p:grpSpPr>
+        <a:xfrm>
+          <a:off x="0" y="0"/>
+          <a:ext cx="0" cy="0"/>
+          <a:chOff x="0" y="0"/>
+          <a:chExt cx="0" cy="0"/>
+        </a:xfrm>
+      </p:grpSpPr>
+      <p:sp>
+        <p:nvSpPr>
+          <p:cNvPr id="3" name="Content Placeholder 2">
+            <a:extLst>
+              <a:ext uri="{FF2B5EF4-FFF2-40B4-BE49-F238E27FC236}">
+                <a16:creationId xmlns:a16="http://schemas.microsoft.com/office/drawing/2014/main" id="{258E6AF3-7615-4BD1-878E-A94C93E98F90}"/>
+              </a:ext>
+            </a:extLst>
+          </p:cNvPr>
+          <p:cNvSpPr>
+            <a:spLocks noGrp="1"/>
+          </p:cNvSpPr>
+          <p:nvPr>
+            <p:ph idx="1"/>
+          </p:nvPr>
+        </p:nvSpPr>
+        <p:spPr/>
+        <p:txBody>
+          <a:bodyPr/>
+          <a:lstStyle/>
+          <a:p>
+            <a:r>
+              <a:rPr lang="en-US" dirty="0"/>
+              <a:t>What is data mining? </a:t>
+            </a:r>
+          </a:p>
+          <a:p>
+            <a:pPr lvl="1"/>
+            <a:r>
+              <a:rPr lang="en-US" dirty="0"/>
+              <a:t>Data mining is the science of knowledge discovery  </a:t>
+            </a:r>
+          </a:p>
+          <a:p>
+            <a:r>
+              <a:rPr lang="en-US" dirty="0"/>
+              <a:t>About this course  </a:t>
+            </a:r>
+          </a:p>
+          <a:p>
+            <a:r>
+              <a:rPr lang="en-US" dirty="0"/>
+              <a:t>Data mining often uses massive data sets</a:t>
+            </a:r>
+          </a:p>
+          <a:p>
+            <a:pPr lvl="1"/>
+            <a:r>
+              <a:rPr lang="en-US" dirty="0"/>
+              <a:t>Manage massive data with key-values pairs and hashing</a:t>
+            </a:r>
+          </a:p>
+          <a:p>
+            <a:r>
+              <a:rPr lang="en-US" dirty="0"/>
+              <a:t>Knowledge discovery requires inference</a:t>
+            </a:r>
+          </a:p>
+          <a:p>
+            <a:pPr lvl="1"/>
+            <a:r>
+              <a:rPr lang="en-US" dirty="0"/>
+              <a:t>Inference for complex data must control false discovery rate</a:t>
+            </a:r>
+          </a:p>
+          <a:p>
+            <a:endParaRPr lang="en-US" dirty="0"/>
+          </a:p>
+        </p:txBody>
+      </p:sp>
+      <p:sp>
+        <p:nvSpPr>
+          <p:cNvPr id="6" name="Title 1">
+            <a:extLst>
+              <a:ext uri="{FF2B5EF4-FFF2-40B4-BE49-F238E27FC236}">
+                <a16:creationId xmlns:a16="http://schemas.microsoft.com/office/drawing/2014/main" id="{CD29F70F-B868-451B-A65D-8721F4C7A2D9}"/>
+              </a:ext>
+            </a:extLst>
+          </p:cNvPr>
+          <p:cNvSpPr txBox="1">
+            <a:spLocks/>
+          </p:cNvSpPr>
+          <p:nvPr/>
+        </p:nvSpPr>
+        <p:spPr>
+          <a:xfrm>
+            <a:off x="838200" y="-635"/>
+            <a:ext cx="10515600" cy="1325563"/>
+          </a:xfrm>
+          <a:prstGeom prst="rect">
+            <a:avLst/>
+          </a:prstGeom>
+        </p:spPr>
+        <p:txBody>
+          <a:bodyPr vert="horz" lIns="91440" tIns="45720" rIns="91440" bIns="45720" rtlCol="0" anchor="ctr">
+            <a:normAutofit/>
+          </a:bodyPr>
+          <a:lstStyle>
+            <a:lvl1pPr algn="l" defTabSz="914400" rtl="0" eaLnBrk="1" latinLnBrk="0" hangingPunct="1">
+              <a:lnSpc>
+                <a:spcPct val="90000"/>
+              </a:lnSpc>
+              <a:spcBef>
+                <a:spcPct val="0"/>
+              </a:spcBef>
+              <a:buNone/>
+              <a:defRPr sz="4400" kern="1200">
+                <a:solidFill>
+                  <a:schemeClr val="tx1"/>
+                </a:solidFill>
+                <a:latin typeface="+mj-lt"/>
+                <a:ea typeface="+mj-ea"/>
+                <a:cs typeface="+mj-cs"/>
+              </a:defRPr>
+            </a:lvl1pPr>
+          </a:lstStyle>
+          <a:p>
+            <a:r>
+              <a:rPr lang="en-US" dirty="0">
+                <a:latin typeface="+mn-lt"/>
+              </a:rPr>
+              <a:t>Overview of Today’s Lesson</a:t>
+            </a:r>
+          </a:p>
+        </p:txBody>
+      </p:sp>
+    </p:spTree>
+    <p:extLst>
+      <p:ext uri="{BB962C8B-B14F-4D97-AF65-F5344CB8AC3E}">
+        <p14:creationId xmlns:p14="http://schemas.microsoft.com/office/powerpoint/2010/main" val="2482426584"/>
+      </p:ext>
+    </p:extLst>
+  </p:cSld>
+  <p:clrMapOvr>
+    <a:masterClrMapping/>
+  </p:clrMapOvr>
+  <p:timing>
+    <p:tnLst>
+      <p:par>
+        <p:cTn id="1" dur="indefinite" restart="never" nodeType="tmRoot">
+          <p:childTnLst>
+            <p:seq concurrent="1" nextAc="seek">
+              <p:cTn id="2" dur="indefinite" nodeType="mainSeq">
+                <p:childTnLst>
+                  <p:par>
+                    <p:cTn id="3" fill="hold">
+                      <p:stCondLst>
+                        <p:cond delay="indefinite"/>
+                      </p:stCondLst>
+                      <p:childTnLst>
+                        <p:par>
+                          <p:cTn id="4" fill="hold">
+                            <p:stCondLst>
+                              <p:cond delay="0"/>
+                            </p:stCondLst>
+                            <p:childTnLst>
+                              <p:par>
+                                <p:cTn id="5" presetID="1" presetClass="entr" presetSubtype="0" fill="hold" nodeType="clickEffect">
+                                  <p:stCondLst>
+                                    <p:cond delay="0"/>
+                                  </p:stCondLst>
+                                  <p:childTnLst>
+                                    <p:set>
+                                      <p:cBhvr>
+                                        <p:cTn id="6" dur="1" fill="hold">
+                                          <p:stCondLst>
+                                            <p:cond delay="0"/>
+                                          </p:stCondLst>
+                                        </p:cTn>
+                                        <p:tgtEl>
+                                          <p:spTgt spid="3">
+                                            <p:txEl>
+                                              <p:pRg st="0" end="0"/>
+                                            </p:txEl>
+                                          </p:spTgt>
+                                        </p:tgtEl>
+                                        <p:attrNameLst>
+                                          <p:attrName>style.visibility</p:attrName>
+                                        </p:attrNameLst>
+                                      </p:cBhvr>
+                                      <p:to>
+                                        <p:strVal val="visible"/>
+                                      </p:to>
+                                    </p:set>
+                                  </p:childTnLst>
+                                </p:cTn>
+                              </p:par>
+                            </p:childTnLst>
+                          </p:cTn>
+                        </p:par>
+                      </p:childTnLst>
+                    </p:cTn>
+                  </p:par>
+                  <p:par>
+                    <p:cTn id="7" fill="hold">
+                      <p:stCondLst>
+                        <p:cond delay="indefinite"/>
+                      </p:stCondLst>
+                      <p:childTnLst>
+                        <p:par>
+                          <p:cTn id="8" fill="hold">
+                            <p:stCondLst>
+                              <p:cond delay="0"/>
+                            </p:stCondLst>
+                            <p:childTnLst>
+                              <p:par>
+                                <p:cTn id="9" presetID="1" presetClass="entr" presetSubtype="0" fill="hold" nodeType="clickEffect">
+                                  <p:stCondLst>
+                                    <p:cond delay="0"/>
+                                  </p:stCondLst>
+                                  <p:childTnLst>
+                                    <p:set>
+                                      <p:cBhvr>
+                                        <p:cTn id="10" dur="1" fill="hold">
+                                          <p:stCondLst>
+                                            <p:cond delay="0"/>
+                                          </p:stCondLst>
+                                        </p:cTn>
+                                        <p:tgtEl>
+                                          <p:spTgt spid="3">
+                                            <p:txEl>
+                                              <p:pRg st="1" end="1"/>
+                                            </p:txEl>
+                                          </p:spTgt>
+                                        </p:tgtEl>
+                                        <p:attrNameLst>
+                                          <p:attrName>style.visibility</p:attrName>
+                                        </p:attrNameLst>
+                                      </p:cBhvr>
+                                      <p:to>
+                                        <p:strVal val="visible"/>
+                                      </p:to>
+                                    </p:set>
+                                  </p:childTnLst>
+                                </p:cTn>
+                              </p:par>
+                            </p:childTnLst>
+                          </p:cTn>
+                        </p:par>
+                      </p:childTnLst>
+                    </p:cTn>
+                  </p:par>
+                  <p:par>
+                    <p:cTn id="11" fill="hold">
+                      <p:stCondLst>
+                        <p:cond delay="indefinite"/>
+                      </p:stCondLst>
+                      <p:childTnLst>
+                        <p:par>
+                          <p:cTn id="12" fill="hold">
+                            <p:stCondLst>
+                              <p:cond delay="0"/>
+                            </p:stCondLst>
+                            <p:childTnLst>
+                              <p:par>
+                                <p:cTn id="13" presetID="1" presetClass="entr" presetSubtype="0" fill="hold" nodeType="clickEffect">
+                                  <p:stCondLst>
+                                    <p:cond delay="0"/>
+                                  </p:stCondLst>
+                                  <p:childTnLst>
+                                    <p:set>
+                                      <p:cBhvr>
+                                        <p:cTn id="14" dur="1" fill="hold">
+                                          <p:stCondLst>
+                                            <p:cond delay="0"/>
+                                          </p:stCondLst>
+                                        </p:cTn>
+                                        <p:tgtEl>
+                                          <p:spTgt spid="3">
+                                            <p:txEl>
+                                              <p:pRg st="2" end="2"/>
+                                            </p:txEl>
+                                          </p:spTgt>
+                                        </p:tgtEl>
+                                        <p:attrNameLst>
+                                          <p:attrName>style.visibility</p:attrName>
+                                        </p:attrNameLst>
+                                      </p:cBhvr>
+                                      <p:to>
+                                        <p:strVal val="visible"/>
+                                      </p:to>
+                                    </p:set>
+                                  </p:childTnLst>
+                                </p:cTn>
+                              </p:par>
+                            </p:childTnLst>
+                          </p:cTn>
+                        </p:par>
+                      </p:childTnLst>
+                    </p:cTn>
+                  </p:par>
+                  <p:par>
+                    <p:cTn id="15" fill="hold">
+                      <p:stCondLst>
+                        <p:cond delay="indefinite"/>
+                      </p:stCondLst>
+                      <p:childTnLst>
+                        <p:par>
+                          <p:cTn id="16" fill="hold">
+                            <p:stCondLst>
+                              <p:cond delay="0"/>
+                            </p:stCondLst>
+                            <p:childTnLst>
+                              <p:par>
+                                <p:cTn id="17" presetID="1" presetClass="entr" presetSubtype="0" fill="hold" nodeType="clickEffect">
+                                  <p:stCondLst>
+                                    <p:cond delay="0"/>
+                                  </p:stCondLst>
+                                  <p:childTnLst>
+                                    <p:set>
+                                      <p:cBhvr>
+                                        <p:cTn id="18" dur="1" fill="hold">
+                                          <p:stCondLst>
+                                            <p:cond delay="0"/>
+                                          </p:stCondLst>
+                                        </p:cTn>
+                                        <p:tgtEl>
+                                          <p:spTgt spid="3">
+                                            <p:txEl>
+                                              <p:pRg st="3" end="3"/>
+                                            </p:txEl>
+                                          </p:spTgt>
+                                        </p:tgtEl>
+                                        <p:attrNameLst>
+                                          <p:attrName>style.visibility</p:attrName>
+                                        </p:attrNameLst>
+                                      </p:cBhvr>
+                                      <p:to>
+                                        <p:strVal val="visible"/>
+                                      </p:to>
+                                    </p:set>
+                                  </p:childTnLst>
+                                </p:cTn>
+                              </p:par>
+                            </p:childTnLst>
+                          </p:cTn>
+                        </p:par>
+                      </p:childTnLst>
+                    </p:cTn>
+                  </p:par>
+                  <p:par>
+                    <p:cTn id="19" fill="hold">
+                      <p:stCondLst>
+                        <p:cond delay="indefinite"/>
+                      </p:stCondLst>
+                      <p:childTnLst>
+                        <p:par>
+                          <p:cTn id="20" fill="hold">
+                            <p:stCondLst>
+                              <p:cond delay="0"/>
+                            </p:stCondLst>
+                            <p:childTnLst>
+                              <p:par>
+                                <p:cTn id="21" presetID="1" presetClass="entr" presetSubtype="0" fill="hold" nodeType="clickEffect">
+                                  <p:stCondLst>
+                                    <p:cond delay="0"/>
+                                  </p:stCondLst>
+                                  <p:childTnLst>
+                                    <p:set>
+                                      <p:cBhvr>
+                                        <p:cTn id="22" dur="1" fill="hold">
+                                          <p:stCondLst>
+                                            <p:cond delay="0"/>
+                                          </p:stCondLst>
+                                        </p:cTn>
+                                        <p:tgtEl>
+                                          <p:spTgt spid="3">
+                                            <p:txEl>
+                                              <p:pRg st="4" end="4"/>
+                                            </p:txEl>
+                                          </p:spTgt>
+                                        </p:tgtEl>
+                                        <p:attrNameLst>
+                                          <p:attrName>style.visibility</p:attrName>
+                                        </p:attrNameLst>
+                                      </p:cBhvr>
+                                      <p:to>
+                                        <p:strVal val="visible"/>
+                                      </p:to>
+                                    </p:set>
+                                  </p:childTnLst>
+                                </p:cTn>
+                              </p:par>
+                            </p:childTnLst>
+                          </p:cTn>
+                        </p:par>
+                      </p:childTnLst>
+                    </p:cTn>
+                  </p:par>
+                  <p:par>
+                    <p:cTn id="23" fill="hold">
+                      <p:stCondLst>
+                        <p:cond delay="indefinite"/>
+                      </p:stCondLst>
+                      <p:childTnLst>
+                        <p:par>
+                          <p:cTn id="24" fill="hold">
+                            <p:stCondLst>
+                              <p:cond delay="0"/>
+                            </p:stCondLst>
+                            <p:childTnLst>
+                              <p:par>
+                                <p:cTn id="25" presetID="1" presetClass="entr" presetSubtype="0" fill="hold" nodeType="clickEffect">
+                                  <p:stCondLst>
+                                    <p:cond delay="0"/>
+                                  </p:stCondLst>
+                                  <p:childTnLst>
+                                    <p:set>
+                                      <p:cBhvr>
+                                        <p:cTn id="26" dur="1" fill="hold">
+                                          <p:stCondLst>
+                                            <p:cond delay="0"/>
+                                          </p:stCondLst>
+                                        </p:cTn>
+                                        <p:tgtEl>
+                                          <p:spTgt spid="3">
+                                            <p:txEl>
+                                              <p:pRg st="5" end="5"/>
+                                            </p:txEl>
+                                          </p:spTgt>
+                                        </p:tgtEl>
+                                        <p:attrNameLst>
+                                          <p:attrName>style.visibility</p:attrName>
+                                        </p:attrNameLst>
+                                      </p:cBhvr>
+                                      <p:to>
+                                        <p:strVal val="visible"/>
+                                      </p:to>
+                                    </p:set>
+                                  </p:childTnLst>
+                                </p:cTn>
+                              </p:par>
+                            </p:childTnLst>
+                          </p:cTn>
+                        </p:par>
+                      </p:childTnLst>
+                    </p:cTn>
+                  </p:par>
+                  <p:par>
+                    <p:cTn id="27" fill="hold">
+                      <p:stCondLst>
+                        <p:cond delay="indefinite"/>
+                      </p:stCondLst>
+                      <p:childTnLst>
+                        <p:par>
+                          <p:cTn id="28" fill="hold">
+                            <p:stCondLst>
+                              <p:cond delay="0"/>
+                            </p:stCondLst>
+                            <p:childTnLst>
+                              <p:par>
+                                <p:cTn id="29" presetID="1" presetClass="entr" presetSubtype="0" fill="hold" nodeType="clickEffect">
+                                  <p:stCondLst>
+                                    <p:cond delay="0"/>
+                                  </p:stCondLst>
+                                  <p:childTnLst>
+                                    <p:set>
+                                      <p:cBhvr>
+                                        <p:cTn id="30" dur="1" fill="hold">
+                                          <p:stCondLst>
+                                            <p:cond delay="0"/>
+                                          </p:stCondLst>
+                                        </p:cTn>
+                                        <p:tgtEl>
+                                          <p:spTgt spid="3">
+                                            <p:txEl>
+                                              <p:pRg st="6" end="6"/>
+                                            </p:txEl>
+                                          </p:spTgt>
+                                        </p:tgtEl>
+                                        <p:attrNameLst>
+                                          <p:attrName>style.visibility</p:attrName>
+                                        </p:attrNameLst>
+                                      </p:cBhvr>
+                                      <p:to>
+                                        <p:strVal val="visible"/>
+                                      </p:to>
+                                    </p:set>
+                                  </p:childTnLst>
+                                </p:cTn>
+                              </p:par>
+                            </p:childTnLst>
+                          </p:cTn>
+                        </p:par>
+                      </p:childTnLst>
+                    </p:cTn>
+                  </p:par>
+                </p:childTnLst>
+              </p:cTn>
+              <p:prevCondLst>
+                <p:cond evt="onPrev" delay="0">
+                  <p:tgtEl>
+                    <p:sldTgt/>
+                  </p:tgtEl>
+                </p:cond>
+              </p:prevCondLst>
+              <p:nextCondLst>
+                <p:cond evt="onNext" delay="0">
+                  <p:tgtEl>
+                    <p:sldTgt/>
+                  </p:tgtEl>
+                </p:cond>
+              </p:nextCondLst>
+            </p:seq>
+          </p:childTnLst>
+        </p:cTn>
+      </p:par>
+    </p:tnLst>
+  </p:timing>
+</p:sld>
+</file>
+
+<file path=ppt/slides/slide20.xml><?xml version="1.0" encoding="utf-8"?>
 <p:sld xmlns:a="http://schemas.openxmlformats.org/drawingml/2006/main" xmlns:r="http://schemas.openxmlformats.org/officeDocument/2006/relationships" xmlns:p="http://schemas.openxmlformats.org/presentationml/2006/main">
   <p:cSld>
     <p:spTree>
@@ -12478,536 +13379,7 @@
 </p:sld>
 </file>
 
-<file path=ppt/slides/slide2.xml><?xml version="1.0" encoding="utf-8"?>
-<p:sld xmlns:a="http://schemas.openxmlformats.org/drawingml/2006/main" xmlns:r="http://schemas.openxmlformats.org/officeDocument/2006/relationships" xmlns:p="http://schemas.openxmlformats.org/presentationml/2006/main">
-  <p:cSld>
-    <p:spTree>
-      <p:nvGrpSpPr>
-        <p:cNvPr id="1" name=""/>
-        <p:cNvGrpSpPr/>
-        <p:nvPr/>
-      </p:nvGrpSpPr>
-      <p:grpSpPr>
-        <a:xfrm>
-          <a:off x="0" y="0"/>
-          <a:ext cx="0" cy="0"/>
-          <a:chOff x="0" y="0"/>
-          <a:chExt cx="0" cy="0"/>
-        </a:xfrm>
-      </p:grpSpPr>
-      <p:sp>
-        <p:nvSpPr>
-          <p:cNvPr id="3" name="Content Placeholder 2">
-            <a:extLst>
-              <a:ext uri="{FF2B5EF4-FFF2-40B4-BE49-F238E27FC236}">
-                <a16:creationId xmlns:a16="http://schemas.microsoft.com/office/drawing/2014/main" id="{258E6AF3-7615-4BD1-878E-A94C93E98F90}"/>
-              </a:ext>
-            </a:extLst>
-          </p:cNvPr>
-          <p:cNvSpPr>
-            <a:spLocks noGrp="1"/>
-          </p:cNvSpPr>
-          <p:nvPr>
-            <p:ph idx="1"/>
-          </p:nvPr>
-        </p:nvSpPr>
-        <p:spPr/>
-        <p:txBody>
-          <a:bodyPr/>
-          <a:lstStyle/>
-          <a:p>
-            <a:r>
-              <a:rPr lang="en-US" dirty="0"/>
-              <a:t>What is data mining? </a:t>
-            </a:r>
-          </a:p>
-          <a:p>
-            <a:pPr lvl="1"/>
-            <a:r>
-              <a:rPr lang="en-US" dirty="0"/>
-              <a:t>Data mining is the science of knowledge discovery  </a:t>
-            </a:r>
-          </a:p>
-          <a:p>
-            <a:r>
-              <a:rPr lang="en-US" dirty="0"/>
-              <a:t>About this course  </a:t>
-            </a:r>
-          </a:p>
-          <a:p>
-            <a:r>
-              <a:rPr lang="en-US" dirty="0"/>
-              <a:t>Data mining often uses massive data sets</a:t>
-            </a:r>
-          </a:p>
-          <a:p>
-            <a:pPr lvl="1"/>
-            <a:r>
-              <a:rPr lang="en-US" dirty="0"/>
-              <a:t>Manage massive data with key-values pairs and hashing</a:t>
-            </a:r>
-          </a:p>
-          <a:p>
-            <a:r>
-              <a:rPr lang="en-US" dirty="0"/>
-              <a:t>Knowledge discovery requires inference</a:t>
-            </a:r>
-          </a:p>
-          <a:p>
-            <a:pPr lvl="1"/>
-            <a:r>
-              <a:rPr lang="en-US" dirty="0"/>
-              <a:t>Inference for complex data must control false discovery rate</a:t>
-            </a:r>
-          </a:p>
-          <a:p>
-            <a:endParaRPr lang="en-US" dirty="0"/>
-          </a:p>
-        </p:txBody>
-      </p:sp>
-      <p:sp>
-        <p:nvSpPr>
-          <p:cNvPr id="6" name="Title 1">
-            <a:extLst>
-              <a:ext uri="{FF2B5EF4-FFF2-40B4-BE49-F238E27FC236}">
-                <a16:creationId xmlns:a16="http://schemas.microsoft.com/office/drawing/2014/main" id="{CD29F70F-B868-451B-A65D-8721F4C7A2D9}"/>
-              </a:ext>
-            </a:extLst>
-          </p:cNvPr>
-          <p:cNvSpPr txBox="1">
-            <a:spLocks/>
-          </p:cNvSpPr>
-          <p:nvPr/>
-        </p:nvSpPr>
-        <p:spPr>
-          <a:xfrm>
-            <a:off x="838200" y="-635"/>
-            <a:ext cx="10515600" cy="1325563"/>
-          </a:xfrm>
-          <a:prstGeom prst="rect">
-            <a:avLst/>
-          </a:prstGeom>
-        </p:spPr>
-        <p:txBody>
-          <a:bodyPr vert="horz" lIns="91440" tIns="45720" rIns="91440" bIns="45720" rtlCol="0" anchor="ctr">
-            <a:normAutofit/>
-          </a:bodyPr>
-          <a:lstStyle>
-            <a:lvl1pPr algn="l" defTabSz="914400" rtl="0" eaLnBrk="1" latinLnBrk="0" hangingPunct="1">
-              <a:lnSpc>
-                <a:spcPct val="90000"/>
-              </a:lnSpc>
-              <a:spcBef>
-                <a:spcPct val="0"/>
-              </a:spcBef>
-              <a:buNone/>
-              <a:defRPr sz="4400" kern="1200">
-                <a:solidFill>
-                  <a:schemeClr val="tx1"/>
-                </a:solidFill>
-                <a:latin typeface="+mj-lt"/>
-                <a:ea typeface="+mj-ea"/>
-                <a:cs typeface="+mj-cs"/>
-              </a:defRPr>
-            </a:lvl1pPr>
-          </a:lstStyle>
-          <a:p>
-            <a:r>
-              <a:rPr lang="en-US" dirty="0">
-                <a:latin typeface="+mn-lt"/>
-              </a:rPr>
-              <a:t>Overview of Today’s Lesson</a:t>
-            </a:r>
-          </a:p>
-        </p:txBody>
-      </p:sp>
-    </p:spTree>
-    <p:extLst>
-      <p:ext uri="{BB962C8B-B14F-4D97-AF65-F5344CB8AC3E}">
-        <p14:creationId xmlns:p14="http://schemas.microsoft.com/office/powerpoint/2010/main" val="2482426584"/>
-      </p:ext>
-    </p:extLst>
-  </p:cSld>
-  <p:clrMapOvr>
-    <a:masterClrMapping/>
-  </p:clrMapOvr>
-  <p:timing>
-    <p:tnLst>
-      <p:par>
-        <p:cTn id="1" dur="indefinite" restart="never" nodeType="tmRoot">
-          <p:childTnLst>
-            <p:seq concurrent="1" nextAc="seek">
-              <p:cTn id="2" dur="indefinite" nodeType="mainSeq">
-                <p:childTnLst>
-                  <p:par>
-                    <p:cTn id="3" fill="hold">
-                      <p:stCondLst>
-                        <p:cond delay="indefinite"/>
-                      </p:stCondLst>
-                      <p:childTnLst>
-                        <p:par>
-                          <p:cTn id="4" fill="hold">
-                            <p:stCondLst>
-                              <p:cond delay="0"/>
-                            </p:stCondLst>
-                            <p:childTnLst>
-                              <p:par>
-                                <p:cTn id="5" presetID="1" presetClass="entr" presetSubtype="0" fill="hold" nodeType="clickEffect">
-                                  <p:stCondLst>
-                                    <p:cond delay="0"/>
-                                  </p:stCondLst>
-                                  <p:childTnLst>
-                                    <p:set>
-                                      <p:cBhvr>
-                                        <p:cTn id="6" dur="1" fill="hold">
-                                          <p:stCondLst>
-                                            <p:cond delay="0"/>
-                                          </p:stCondLst>
-                                        </p:cTn>
-                                        <p:tgtEl>
-                                          <p:spTgt spid="3">
-                                            <p:txEl>
-                                              <p:pRg st="0" end="0"/>
-                                            </p:txEl>
-                                          </p:spTgt>
-                                        </p:tgtEl>
-                                        <p:attrNameLst>
-                                          <p:attrName>style.visibility</p:attrName>
-                                        </p:attrNameLst>
-                                      </p:cBhvr>
-                                      <p:to>
-                                        <p:strVal val="visible"/>
-                                      </p:to>
-                                    </p:set>
-                                  </p:childTnLst>
-                                </p:cTn>
-                              </p:par>
-                            </p:childTnLst>
-                          </p:cTn>
-                        </p:par>
-                      </p:childTnLst>
-                    </p:cTn>
-                  </p:par>
-                  <p:par>
-                    <p:cTn id="7" fill="hold">
-                      <p:stCondLst>
-                        <p:cond delay="indefinite"/>
-                      </p:stCondLst>
-                      <p:childTnLst>
-                        <p:par>
-                          <p:cTn id="8" fill="hold">
-                            <p:stCondLst>
-                              <p:cond delay="0"/>
-                            </p:stCondLst>
-                            <p:childTnLst>
-                              <p:par>
-                                <p:cTn id="9" presetID="1" presetClass="entr" presetSubtype="0" fill="hold" nodeType="clickEffect">
-                                  <p:stCondLst>
-                                    <p:cond delay="0"/>
-                                  </p:stCondLst>
-                                  <p:childTnLst>
-                                    <p:set>
-                                      <p:cBhvr>
-                                        <p:cTn id="10" dur="1" fill="hold">
-                                          <p:stCondLst>
-                                            <p:cond delay="0"/>
-                                          </p:stCondLst>
-                                        </p:cTn>
-                                        <p:tgtEl>
-                                          <p:spTgt spid="3">
-                                            <p:txEl>
-                                              <p:pRg st="1" end="1"/>
-                                            </p:txEl>
-                                          </p:spTgt>
-                                        </p:tgtEl>
-                                        <p:attrNameLst>
-                                          <p:attrName>style.visibility</p:attrName>
-                                        </p:attrNameLst>
-                                      </p:cBhvr>
-                                      <p:to>
-                                        <p:strVal val="visible"/>
-                                      </p:to>
-                                    </p:set>
-                                  </p:childTnLst>
-                                </p:cTn>
-                              </p:par>
-                            </p:childTnLst>
-                          </p:cTn>
-                        </p:par>
-                      </p:childTnLst>
-                    </p:cTn>
-                  </p:par>
-                  <p:par>
-                    <p:cTn id="11" fill="hold">
-                      <p:stCondLst>
-                        <p:cond delay="indefinite"/>
-                      </p:stCondLst>
-                      <p:childTnLst>
-                        <p:par>
-                          <p:cTn id="12" fill="hold">
-                            <p:stCondLst>
-                              <p:cond delay="0"/>
-                            </p:stCondLst>
-                            <p:childTnLst>
-                              <p:par>
-                                <p:cTn id="13" presetID="1" presetClass="entr" presetSubtype="0" fill="hold" nodeType="clickEffect">
-                                  <p:stCondLst>
-                                    <p:cond delay="0"/>
-                                  </p:stCondLst>
-                                  <p:childTnLst>
-                                    <p:set>
-                                      <p:cBhvr>
-                                        <p:cTn id="14" dur="1" fill="hold">
-                                          <p:stCondLst>
-                                            <p:cond delay="0"/>
-                                          </p:stCondLst>
-                                        </p:cTn>
-                                        <p:tgtEl>
-                                          <p:spTgt spid="3">
-                                            <p:txEl>
-                                              <p:pRg st="2" end="2"/>
-                                            </p:txEl>
-                                          </p:spTgt>
-                                        </p:tgtEl>
-                                        <p:attrNameLst>
-                                          <p:attrName>style.visibility</p:attrName>
-                                        </p:attrNameLst>
-                                      </p:cBhvr>
-                                      <p:to>
-                                        <p:strVal val="visible"/>
-                                      </p:to>
-                                    </p:set>
-                                  </p:childTnLst>
-                                </p:cTn>
-                              </p:par>
-                            </p:childTnLst>
-                          </p:cTn>
-                        </p:par>
-                      </p:childTnLst>
-                    </p:cTn>
-                  </p:par>
-                  <p:par>
-                    <p:cTn id="15" fill="hold">
-                      <p:stCondLst>
-                        <p:cond delay="indefinite"/>
-                      </p:stCondLst>
-                      <p:childTnLst>
-                        <p:par>
-                          <p:cTn id="16" fill="hold">
-                            <p:stCondLst>
-                              <p:cond delay="0"/>
-                            </p:stCondLst>
-                            <p:childTnLst>
-                              <p:par>
-                                <p:cTn id="17" presetID="1" presetClass="entr" presetSubtype="0" fill="hold" nodeType="clickEffect">
-                                  <p:stCondLst>
-                                    <p:cond delay="0"/>
-                                  </p:stCondLst>
-                                  <p:childTnLst>
-                                    <p:set>
-                                      <p:cBhvr>
-                                        <p:cTn id="18" dur="1" fill="hold">
-                                          <p:stCondLst>
-                                            <p:cond delay="0"/>
-                                          </p:stCondLst>
-                                        </p:cTn>
-                                        <p:tgtEl>
-                                          <p:spTgt spid="3">
-                                            <p:txEl>
-                                              <p:pRg st="3" end="3"/>
-                                            </p:txEl>
-                                          </p:spTgt>
-                                        </p:tgtEl>
-                                        <p:attrNameLst>
-                                          <p:attrName>style.visibility</p:attrName>
-                                        </p:attrNameLst>
-                                      </p:cBhvr>
-                                      <p:to>
-                                        <p:strVal val="visible"/>
-                                      </p:to>
-                                    </p:set>
-                                  </p:childTnLst>
-                                </p:cTn>
-                              </p:par>
-                            </p:childTnLst>
-                          </p:cTn>
-                        </p:par>
-                      </p:childTnLst>
-                    </p:cTn>
-                  </p:par>
-                  <p:par>
-                    <p:cTn id="19" fill="hold">
-                      <p:stCondLst>
-                        <p:cond delay="indefinite"/>
-                      </p:stCondLst>
-                      <p:childTnLst>
-                        <p:par>
-                          <p:cTn id="20" fill="hold">
-                            <p:stCondLst>
-                              <p:cond delay="0"/>
-                            </p:stCondLst>
-                            <p:childTnLst>
-                              <p:par>
-                                <p:cTn id="21" presetID="1" presetClass="entr" presetSubtype="0" fill="hold" nodeType="clickEffect">
-                                  <p:stCondLst>
-                                    <p:cond delay="0"/>
-                                  </p:stCondLst>
-                                  <p:childTnLst>
-                                    <p:set>
-                                      <p:cBhvr>
-                                        <p:cTn id="22" dur="1" fill="hold">
-                                          <p:stCondLst>
-                                            <p:cond delay="0"/>
-                                          </p:stCondLst>
-                                        </p:cTn>
-                                        <p:tgtEl>
-                                          <p:spTgt spid="3">
-                                            <p:txEl>
-                                              <p:pRg st="4" end="4"/>
-                                            </p:txEl>
-                                          </p:spTgt>
-                                        </p:tgtEl>
-                                        <p:attrNameLst>
-                                          <p:attrName>style.visibility</p:attrName>
-                                        </p:attrNameLst>
-                                      </p:cBhvr>
-                                      <p:to>
-                                        <p:strVal val="visible"/>
-                                      </p:to>
-                                    </p:set>
-                                  </p:childTnLst>
-                                </p:cTn>
-                              </p:par>
-                            </p:childTnLst>
-                          </p:cTn>
-                        </p:par>
-                      </p:childTnLst>
-                    </p:cTn>
-                  </p:par>
-                  <p:par>
-                    <p:cTn id="23" fill="hold">
-                      <p:stCondLst>
-                        <p:cond delay="indefinite"/>
-                      </p:stCondLst>
-                      <p:childTnLst>
-                        <p:par>
-                          <p:cTn id="24" fill="hold">
-                            <p:stCondLst>
-                              <p:cond delay="0"/>
-                            </p:stCondLst>
-                            <p:childTnLst>
-                              <p:par>
-                                <p:cTn id="25" presetID="1" presetClass="entr" presetSubtype="0" fill="hold" nodeType="clickEffect">
-                                  <p:stCondLst>
-                                    <p:cond delay="0"/>
-                                  </p:stCondLst>
-                                  <p:childTnLst>
-                                    <p:set>
-                                      <p:cBhvr>
-                                        <p:cTn id="26" dur="1" fill="hold">
-                                          <p:stCondLst>
-                                            <p:cond delay="0"/>
-                                          </p:stCondLst>
-                                        </p:cTn>
-                                        <p:tgtEl>
-                                          <p:spTgt spid="3">
-                                            <p:txEl>
-                                              <p:pRg st="5" end="5"/>
-                                            </p:txEl>
-                                          </p:spTgt>
-                                        </p:tgtEl>
-                                        <p:attrNameLst>
-                                          <p:attrName>style.visibility</p:attrName>
-                                        </p:attrNameLst>
-                                      </p:cBhvr>
-                                      <p:to>
-                                        <p:strVal val="visible"/>
-                                      </p:to>
-                                    </p:set>
-                                  </p:childTnLst>
-                                </p:cTn>
-                              </p:par>
-                            </p:childTnLst>
-                          </p:cTn>
-                        </p:par>
-                      </p:childTnLst>
-                    </p:cTn>
-                  </p:par>
-                  <p:par>
-                    <p:cTn id="27" fill="hold">
-                      <p:stCondLst>
-                        <p:cond delay="indefinite"/>
-                      </p:stCondLst>
-                      <p:childTnLst>
-                        <p:par>
-                          <p:cTn id="28" fill="hold">
-                            <p:stCondLst>
-                              <p:cond delay="0"/>
-                            </p:stCondLst>
-                            <p:childTnLst>
-                              <p:par>
-                                <p:cTn id="29" presetID="1" presetClass="entr" presetSubtype="0" fill="hold" nodeType="clickEffect">
-                                  <p:stCondLst>
-                                    <p:cond delay="0"/>
-                                  </p:stCondLst>
-                                  <p:childTnLst>
-                                    <p:set>
-                                      <p:cBhvr>
-                                        <p:cTn id="30" dur="1" fill="hold">
-                                          <p:stCondLst>
-                                            <p:cond delay="0"/>
-                                          </p:stCondLst>
-                                        </p:cTn>
-                                        <p:tgtEl>
-                                          <p:spTgt spid="3">
-                                            <p:txEl>
-                                              <p:pRg st="6" end="6"/>
-                                            </p:txEl>
-                                          </p:spTgt>
-                                        </p:tgtEl>
-                                        <p:attrNameLst>
-                                          <p:attrName>style.visibility</p:attrName>
-                                        </p:attrNameLst>
-                                      </p:cBhvr>
-                                      <p:to>
-                                        <p:strVal val="visible"/>
-                                      </p:to>
-                                    </p:set>
-                                  </p:childTnLst>
-                                </p:cTn>
-                              </p:par>
-                            </p:childTnLst>
-                          </p:cTn>
-                        </p:par>
-                      </p:childTnLst>
-                    </p:cTn>
-                  </p:par>
-                </p:childTnLst>
-              </p:cTn>
-              <p:prevCondLst>
-                <p:cond evt="onPrev" delay="0">
-                  <p:tgtEl>
-                    <p:sldTgt/>
-                  </p:tgtEl>
-                </p:cond>
-              </p:prevCondLst>
-              <p:nextCondLst>
-                <p:cond evt="onNext" delay="0">
-                  <p:tgtEl>
-                    <p:sldTgt/>
-                  </p:tgtEl>
-                </p:cond>
-              </p:nextCondLst>
-            </p:seq>
-          </p:childTnLst>
-        </p:cTn>
-      </p:par>
-    </p:tnLst>
-  </p:timing>
-</p:sld>
-</file>
-
-<file path=ppt/slides/slide20.xml><?xml version="1.0" encoding="utf-8"?>
+<file path=ppt/slides/slide21.xml><?xml version="1.0" encoding="utf-8"?>
 <p:sld xmlns:a="http://schemas.openxmlformats.org/drawingml/2006/main" xmlns:r="http://schemas.openxmlformats.org/officeDocument/2006/relationships" xmlns:p="http://schemas.openxmlformats.org/presentationml/2006/main">
   <p:cSld>
     <p:spTree>
@@ -13634,7 +14006,7 @@
 </p:sld>
 </file>
 
-<file path=ppt/slides/slide21.xml><?xml version="1.0" encoding="utf-8"?>
+<file path=ppt/slides/slide22.xml><?xml version="1.0" encoding="utf-8"?>
 <p:sld xmlns:a="http://schemas.openxmlformats.org/drawingml/2006/main" xmlns:r="http://schemas.openxmlformats.org/officeDocument/2006/relationships" xmlns:p="http://schemas.openxmlformats.org/presentationml/2006/main">
   <p:cSld>
     <p:spTree>
@@ -16486,7 +16858,7 @@
 </p:sld>
 </file>
 
-<file path=ppt/slides/slide22.xml><?xml version="1.0" encoding="utf-8"?>
+<file path=ppt/slides/slide23.xml><?xml version="1.0" encoding="utf-8"?>
 <p:sld xmlns:a="http://schemas.openxmlformats.org/drawingml/2006/main" xmlns:r="http://schemas.openxmlformats.org/officeDocument/2006/relationships" xmlns:p="http://schemas.openxmlformats.org/presentationml/2006/main">
   <p:cSld>
     <p:spTree>
@@ -19361,7 +19733,7 @@
 </p:sld>
 </file>
 
-<file path=ppt/slides/slide23.xml><?xml version="1.0" encoding="utf-8"?>
+<file path=ppt/slides/slide24.xml><?xml version="1.0" encoding="utf-8"?>
 <p:sld xmlns:a="http://schemas.openxmlformats.org/drawingml/2006/main" xmlns:r="http://schemas.openxmlformats.org/officeDocument/2006/relationships" xmlns:p="http://schemas.openxmlformats.org/presentationml/2006/main">
   <p:cSld>
     <p:spTree>
@@ -20221,7 +20593,7 @@
 </p:sld>
 </file>
 
-<file path=ppt/slides/slide24.xml><?xml version="1.0" encoding="utf-8"?>
+<file path=ppt/slides/slide25.xml><?xml version="1.0" encoding="utf-8"?>
 <p:sld xmlns:a="http://schemas.openxmlformats.org/drawingml/2006/main" xmlns:r="http://schemas.openxmlformats.org/officeDocument/2006/relationships" xmlns:p="http://schemas.openxmlformats.org/presentationml/2006/main">
   <p:cSld>
     <p:spTree>
@@ -21244,7 +21616,7 @@
 </p:sld>
 </file>
 
-<file path=ppt/slides/slide25.xml><?xml version="1.0" encoding="utf-8"?>
+<file path=ppt/slides/slide26.xml><?xml version="1.0" encoding="utf-8"?>
 <p:sld xmlns:a="http://schemas.openxmlformats.org/drawingml/2006/main" xmlns:r="http://schemas.openxmlformats.org/officeDocument/2006/relationships" xmlns:p="http://schemas.openxmlformats.org/presentationml/2006/main">
   <p:cSld>
     <p:spTree>
@@ -22272,7 +22644,7 @@
 </p:sld>
 </file>
 
-<file path=ppt/slides/slide26.xml><?xml version="1.0" encoding="utf-8"?>
+<file path=ppt/slides/slide27.xml><?xml version="1.0" encoding="utf-8"?>
 <p:sld xmlns:a="http://schemas.openxmlformats.org/drawingml/2006/main" xmlns:r="http://schemas.openxmlformats.org/officeDocument/2006/relationships" xmlns:p="http://schemas.openxmlformats.org/presentationml/2006/main">
   <p:cSld>
     <p:spTree>
@@ -22935,7 +23307,7 @@
 </p:sld>
 </file>
 
-<file path=ppt/slides/slide27.xml><?xml version="1.0" encoding="utf-8"?>
+<file path=ppt/slides/slide28.xml><?xml version="1.0" encoding="utf-8"?>
 <p:sld xmlns:a="http://schemas.openxmlformats.org/drawingml/2006/main" xmlns:r="http://schemas.openxmlformats.org/officeDocument/2006/relationships" xmlns:p="http://schemas.openxmlformats.org/presentationml/2006/main">
   <p:cSld>
     <p:spTree>
@@ -23563,7 +23935,7 @@
 </p:sld>
 </file>
 
-<file path=ppt/slides/slide28.xml><?xml version="1.0" encoding="utf-8"?>
+<file path=ppt/slides/slide29.xml><?xml version="1.0" encoding="utf-8"?>
 <p:sld xmlns:a="http://schemas.openxmlformats.org/drawingml/2006/main" xmlns:r="http://schemas.openxmlformats.org/officeDocument/2006/relationships" xmlns:p="http://schemas.openxmlformats.org/presentationml/2006/main">
   <p:cSld>
     <p:spTree>
@@ -24321,7 +24693,556 @@
 </p:sld>
 </file>
 
-<file path=ppt/slides/slide29.xml><?xml version="1.0" encoding="utf-8"?>
+<file path=ppt/slides/slide3.xml><?xml version="1.0" encoding="utf-8"?>
+<p:sld xmlns:a="http://schemas.openxmlformats.org/drawingml/2006/main" xmlns:r="http://schemas.openxmlformats.org/officeDocument/2006/relationships" xmlns:p="http://schemas.openxmlformats.org/presentationml/2006/main">
+  <p:cSld>
+    <p:spTree>
+      <p:nvGrpSpPr>
+        <p:cNvPr id="1" name=""/>
+        <p:cNvGrpSpPr/>
+        <p:nvPr/>
+      </p:nvGrpSpPr>
+      <p:grpSpPr>
+        <a:xfrm>
+          <a:off x="0" y="0"/>
+          <a:ext cx="0" cy="0"/>
+          <a:chOff x="0" y="0"/>
+          <a:chExt cx="0" cy="0"/>
+        </a:xfrm>
+      </p:grpSpPr>
+      <p:sp>
+        <p:nvSpPr>
+          <p:cNvPr id="3" name="Content Placeholder 2">
+            <a:extLst>
+              <a:ext uri="{FF2B5EF4-FFF2-40B4-BE49-F238E27FC236}">
+                <a16:creationId xmlns:a16="http://schemas.microsoft.com/office/drawing/2014/main" id="{258E6AF3-7615-4BD1-878E-A94C93E98F90}"/>
+              </a:ext>
+            </a:extLst>
+          </p:cNvPr>
+          <p:cNvSpPr>
+            <a:spLocks noGrp="1"/>
+          </p:cNvSpPr>
+          <p:nvPr>
+            <p:ph idx="1"/>
+          </p:nvPr>
+        </p:nvSpPr>
+        <p:spPr/>
+        <p:txBody>
+          <a:bodyPr/>
+          <a:lstStyle/>
+          <a:p>
+            <a:pPr marL="0" indent="0">
+              <a:buNone/>
+            </a:pPr>
+            <a:r>
+              <a:rPr lang="en-US" sz="3200" dirty="0"/>
+              <a:t>Data mining is the science of </a:t>
+            </a:r>
+            <a:r>
+              <a:rPr lang="en-US" sz="3200" b="1" dirty="0"/>
+              <a:t>knowledge discovery</a:t>
+            </a:r>
+            <a:r>
+              <a:rPr lang="en-US" sz="3200" dirty="0"/>
+              <a:t> from inferences on data </a:t>
+            </a:r>
+            <a:endParaRPr lang="en-US" sz="3200" b="1" dirty="0"/>
+          </a:p>
+          <a:p>
+            <a:r>
+              <a:rPr lang="en-US" dirty="0"/>
+              <a:t>Known as </a:t>
+            </a:r>
+            <a:r>
+              <a:rPr lang="en-US" b="1" dirty="0"/>
+              <a:t>knowledge discovery and data mining (KDD) </a:t>
+            </a:r>
+          </a:p>
+          <a:p>
+            <a:r>
+              <a:rPr lang="en-US" dirty="0"/>
+              <a:t>Data mining is a </a:t>
+            </a:r>
+            <a:r>
+              <a:rPr lang="en-US" b="1" dirty="0"/>
+              <a:t>process of exploration   </a:t>
+            </a:r>
+          </a:p>
+          <a:p>
+            <a:r>
+              <a:rPr lang="en-US" dirty="0"/>
+              <a:t>Exploration is difficult   </a:t>
+            </a:r>
+          </a:p>
+          <a:p>
+            <a:pPr lvl="1"/>
+            <a:r>
+              <a:rPr lang="en-US" dirty="0"/>
+              <a:t>Many steps</a:t>
+            </a:r>
+          </a:p>
+          <a:p>
+            <a:pPr lvl="1"/>
+            <a:r>
+              <a:rPr lang="en-US" dirty="0"/>
+              <a:t>Only some attempts work </a:t>
+            </a:r>
+          </a:p>
+          <a:p>
+            <a:r>
+              <a:rPr lang="en-US" b="1" dirty="0">
+                <a:solidFill>
+                  <a:srgbClr val="C00000"/>
+                </a:solidFill>
+              </a:rPr>
+              <a:t>Try lots of ideas, fail fast, keep the ones that work! </a:t>
+            </a:r>
+          </a:p>
+        </p:txBody>
+      </p:sp>
+      <p:sp>
+        <p:nvSpPr>
+          <p:cNvPr id="6" name="Title 1">
+            <a:extLst>
+              <a:ext uri="{FF2B5EF4-FFF2-40B4-BE49-F238E27FC236}">
+                <a16:creationId xmlns:a16="http://schemas.microsoft.com/office/drawing/2014/main" id="{CD29F70F-B868-451B-A65D-8721F4C7A2D9}"/>
+              </a:ext>
+            </a:extLst>
+          </p:cNvPr>
+          <p:cNvSpPr txBox="1">
+            <a:spLocks/>
+          </p:cNvSpPr>
+          <p:nvPr/>
+        </p:nvSpPr>
+        <p:spPr>
+          <a:xfrm>
+            <a:off x="838200" y="-635"/>
+            <a:ext cx="10515600" cy="1325563"/>
+          </a:xfrm>
+          <a:prstGeom prst="rect">
+            <a:avLst/>
+          </a:prstGeom>
+        </p:spPr>
+        <p:txBody>
+          <a:bodyPr vert="horz" lIns="91440" tIns="45720" rIns="91440" bIns="45720" rtlCol="0" anchor="ctr">
+            <a:normAutofit/>
+          </a:bodyPr>
+          <a:lstStyle>
+            <a:lvl1pPr algn="l" defTabSz="914400" rtl="0" eaLnBrk="1" latinLnBrk="0" hangingPunct="1">
+              <a:lnSpc>
+                <a:spcPct val="90000"/>
+              </a:lnSpc>
+              <a:spcBef>
+                <a:spcPct val="0"/>
+              </a:spcBef>
+              <a:buNone/>
+              <a:defRPr sz="4400" kern="1200">
+                <a:solidFill>
+                  <a:schemeClr val="tx1"/>
+                </a:solidFill>
+                <a:latin typeface="+mj-lt"/>
+                <a:ea typeface="+mj-ea"/>
+                <a:cs typeface="+mj-cs"/>
+              </a:defRPr>
+            </a:lvl1pPr>
+          </a:lstStyle>
+          <a:p>
+            <a:r>
+              <a:rPr lang="en-US" dirty="0">
+                <a:latin typeface="+mn-lt"/>
+              </a:rPr>
+              <a:t>What is data mining?</a:t>
+            </a:r>
+          </a:p>
+        </p:txBody>
+      </p:sp>
+    </p:spTree>
+    <p:extLst>
+      <p:ext uri="{BB962C8B-B14F-4D97-AF65-F5344CB8AC3E}">
+        <p14:creationId xmlns:p14="http://schemas.microsoft.com/office/powerpoint/2010/main" val="115420158"/>
+      </p:ext>
+    </p:extLst>
+  </p:cSld>
+  <p:clrMapOvr>
+    <a:masterClrMapping/>
+  </p:clrMapOvr>
+  <p:timing>
+    <p:tnLst>
+      <p:par>
+        <p:cTn id="1" dur="indefinite" restart="never" nodeType="tmRoot">
+          <p:childTnLst>
+            <p:seq concurrent="1" nextAc="seek">
+              <p:cTn id="2" dur="indefinite" nodeType="mainSeq">
+                <p:childTnLst>
+                  <p:par>
+                    <p:cTn id="3" fill="hold">
+                      <p:stCondLst>
+                        <p:cond delay="indefinite"/>
+                      </p:stCondLst>
+                      <p:childTnLst>
+                        <p:par>
+                          <p:cTn id="4" fill="hold">
+                            <p:stCondLst>
+                              <p:cond delay="0"/>
+                            </p:stCondLst>
+                            <p:childTnLst>
+                              <p:par>
+                                <p:cTn id="5" presetID="1" presetClass="entr" presetSubtype="0" fill="hold" nodeType="clickEffect">
+                                  <p:stCondLst>
+                                    <p:cond delay="0"/>
+                                  </p:stCondLst>
+                                  <p:childTnLst>
+                                    <p:set>
+                                      <p:cBhvr>
+                                        <p:cTn id="6" dur="1" fill="hold">
+                                          <p:stCondLst>
+                                            <p:cond delay="0"/>
+                                          </p:stCondLst>
+                                        </p:cTn>
+                                        <p:tgtEl>
+                                          <p:spTgt spid="3">
+                                            <p:txEl>
+                                              <p:pRg st="0" end="0"/>
+                                            </p:txEl>
+                                          </p:spTgt>
+                                        </p:tgtEl>
+                                        <p:attrNameLst>
+                                          <p:attrName>style.visibility</p:attrName>
+                                        </p:attrNameLst>
+                                      </p:cBhvr>
+                                      <p:to>
+                                        <p:strVal val="visible"/>
+                                      </p:to>
+                                    </p:set>
+                                  </p:childTnLst>
+                                </p:cTn>
+                              </p:par>
+                            </p:childTnLst>
+                          </p:cTn>
+                        </p:par>
+                      </p:childTnLst>
+                    </p:cTn>
+                  </p:par>
+                  <p:par>
+                    <p:cTn id="7" fill="hold">
+                      <p:stCondLst>
+                        <p:cond delay="indefinite"/>
+                      </p:stCondLst>
+                      <p:childTnLst>
+                        <p:par>
+                          <p:cTn id="8" fill="hold">
+                            <p:stCondLst>
+                              <p:cond delay="0"/>
+                            </p:stCondLst>
+                            <p:childTnLst>
+                              <p:par>
+                                <p:cTn id="9" presetID="1" presetClass="entr" presetSubtype="0" fill="hold" nodeType="clickEffect">
+                                  <p:stCondLst>
+                                    <p:cond delay="0"/>
+                                  </p:stCondLst>
+                                  <p:childTnLst>
+                                    <p:set>
+                                      <p:cBhvr>
+                                        <p:cTn id="10" dur="1" fill="hold">
+                                          <p:stCondLst>
+                                            <p:cond delay="0"/>
+                                          </p:stCondLst>
+                                        </p:cTn>
+                                        <p:tgtEl>
+                                          <p:spTgt spid="3">
+                                            <p:txEl>
+                                              <p:pRg st="1" end="1"/>
+                                            </p:txEl>
+                                          </p:spTgt>
+                                        </p:tgtEl>
+                                        <p:attrNameLst>
+                                          <p:attrName>style.visibility</p:attrName>
+                                        </p:attrNameLst>
+                                      </p:cBhvr>
+                                      <p:to>
+                                        <p:strVal val="visible"/>
+                                      </p:to>
+                                    </p:set>
+                                  </p:childTnLst>
+                                </p:cTn>
+                              </p:par>
+                            </p:childTnLst>
+                          </p:cTn>
+                        </p:par>
+                      </p:childTnLst>
+                    </p:cTn>
+                  </p:par>
+                  <p:par>
+                    <p:cTn id="11" fill="hold">
+                      <p:stCondLst>
+                        <p:cond delay="indefinite"/>
+                      </p:stCondLst>
+                      <p:childTnLst>
+                        <p:par>
+                          <p:cTn id="12" fill="hold">
+                            <p:stCondLst>
+                              <p:cond delay="0"/>
+                            </p:stCondLst>
+                            <p:childTnLst>
+                              <p:par>
+                                <p:cTn id="13" presetID="1" presetClass="entr" presetSubtype="0" fill="hold" nodeType="clickEffect">
+                                  <p:stCondLst>
+                                    <p:cond delay="0"/>
+                                  </p:stCondLst>
+                                  <p:childTnLst>
+                                    <p:set>
+                                      <p:cBhvr>
+                                        <p:cTn id="14" dur="1" fill="hold">
+                                          <p:stCondLst>
+                                            <p:cond delay="0"/>
+                                          </p:stCondLst>
+                                        </p:cTn>
+                                        <p:tgtEl>
+                                          <p:spTgt spid="3">
+                                            <p:txEl>
+                                              <p:pRg st="2" end="2"/>
+                                            </p:txEl>
+                                          </p:spTgt>
+                                        </p:tgtEl>
+                                        <p:attrNameLst>
+                                          <p:attrName>style.visibility</p:attrName>
+                                        </p:attrNameLst>
+                                      </p:cBhvr>
+                                      <p:to>
+                                        <p:strVal val="visible"/>
+                                      </p:to>
+                                    </p:set>
+                                  </p:childTnLst>
+                                </p:cTn>
+                              </p:par>
+                            </p:childTnLst>
+                          </p:cTn>
+                        </p:par>
+                      </p:childTnLst>
+                    </p:cTn>
+                  </p:par>
+                  <p:par>
+                    <p:cTn id="15" fill="hold">
+                      <p:stCondLst>
+                        <p:cond delay="indefinite"/>
+                      </p:stCondLst>
+                      <p:childTnLst>
+                        <p:par>
+                          <p:cTn id="16" fill="hold">
+                            <p:stCondLst>
+                              <p:cond delay="0"/>
+                            </p:stCondLst>
+                            <p:childTnLst>
+                              <p:par>
+                                <p:cTn id="17" presetID="1" presetClass="entr" presetSubtype="0" fill="hold" nodeType="clickEffect">
+                                  <p:stCondLst>
+                                    <p:cond delay="0"/>
+                                  </p:stCondLst>
+                                  <p:childTnLst>
+                                    <p:set>
+                                      <p:cBhvr>
+                                        <p:cTn id="18" dur="1" fill="hold">
+                                          <p:stCondLst>
+                                            <p:cond delay="0"/>
+                                          </p:stCondLst>
+                                        </p:cTn>
+                                        <p:tgtEl>
+                                          <p:spTgt spid="3">
+                                            <p:txEl>
+                                              <p:pRg st="3" end="3"/>
+                                            </p:txEl>
+                                          </p:spTgt>
+                                        </p:tgtEl>
+                                        <p:attrNameLst>
+                                          <p:attrName>style.visibility</p:attrName>
+                                        </p:attrNameLst>
+                                      </p:cBhvr>
+                                      <p:to>
+                                        <p:strVal val="visible"/>
+                                      </p:to>
+                                    </p:set>
+                                  </p:childTnLst>
+                                </p:cTn>
+                              </p:par>
+                            </p:childTnLst>
+                          </p:cTn>
+                        </p:par>
+                      </p:childTnLst>
+                    </p:cTn>
+                  </p:par>
+                  <p:par>
+                    <p:cTn id="19" fill="hold">
+                      <p:stCondLst>
+                        <p:cond delay="indefinite"/>
+                      </p:stCondLst>
+                      <p:childTnLst>
+                        <p:par>
+                          <p:cTn id="20" fill="hold">
+                            <p:stCondLst>
+                              <p:cond delay="0"/>
+                            </p:stCondLst>
+                            <p:childTnLst>
+                              <p:par>
+                                <p:cTn id="21" presetID="1" presetClass="entr" presetSubtype="0" fill="hold" nodeType="clickEffect">
+                                  <p:stCondLst>
+                                    <p:cond delay="0"/>
+                                  </p:stCondLst>
+                                  <p:childTnLst>
+                                    <p:set>
+                                      <p:cBhvr>
+                                        <p:cTn id="22" dur="1" fill="hold">
+                                          <p:stCondLst>
+                                            <p:cond delay="0"/>
+                                          </p:stCondLst>
+                                        </p:cTn>
+                                        <p:tgtEl>
+                                          <p:spTgt spid="3">
+                                            <p:txEl>
+                                              <p:pRg st="4" end="4"/>
+                                            </p:txEl>
+                                          </p:spTgt>
+                                        </p:tgtEl>
+                                        <p:attrNameLst>
+                                          <p:attrName>style.visibility</p:attrName>
+                                        </p:attrNameLst>
+                                      </p:cBhvr>
+                                      <p:to>
+                                        <p:strVal val="visible"/>
+                                      </p:to>
+                                    </p:set>
+                                  </p:childTnLst>
+                                </p:cTn>
+                              </p:par>
+                            </p:childTnLst>
+                          </p:cTn>
+                        </p:par>
+                      </p:childTnLst>
+                    </p:cTn>
+                  </p:par>
+                  <p:par>
+                    <p:cTn id="23" fill="hold">
+                      <p:stCondLst>
+                        <p:cond delay="indefinite"/>
+                      </p:stCondLst>
+                      <p:childTnLst>
+                        <p:par>
+                          <p:cTn id="24" fill="hold">
+                            <p:stCondLst>
+                              <p:cond delay="0"/>
+                            </p:stCondLst>
+                            <p:childTnLst>
+                              <p:par>
+                                <p:cTn id="25" presetID="1" presetClass="entr" presetSubtype="0" fill="hold" nodeType="clickEffect">
+                                  <p:stCondLst>
+                                    <p:cond delay="0"/>
+                                  </p:stCondLst>
+                                  <p:childTnLst>
+                                    <p:set>
+                                      <p:cBhvr>
+                                        <p:cTn id="26" dur="1" fill="hold">
+                                          <p:stCondLst>
+                                            <p:cond delay="0"/>
+                                          </p:stCondLst>
+                                        </p:cTn>
+                                        <p:tgtEl>
+                                          <p:spTgt spid="3">
+                                            <p:txEl>
+                                              <p:pRg st="5" end="5"/>
+                                            </p:txEl>
+                                          </p:spTgt>
+                                        </p:tgtEl>
+                                        <p:attrNameLst>
+                                          <p:attrName>style.visibility</p:attrName>
+                                        </p:attrNameLst>
+                                      </p:cBhvr>
+                                      <p:to>
+                                        <p:strVal val="visible"/>
+                                      </p:to>
+                                    </p:set>
+                                  </p:childTnLst>
+                                </p:cTn>
+                              </p:par>
+                            </p:childTnLst>
+                          </p:cTn>
+                        </p:par>
+                      </p:childTnLst>
+                    </p:cTn>
+                  </p:par>
+                  <p:par>
+                    <p:cTn id="27" fill="hold">
+                      <p:stCondLst>
+                        <p:cond delay="indefinite"/>
+                      </p:stCondLst>
+                      <p:childTnLst>
+                        <p:par>
+                          <p:cTn id="28" fill="hold">
+                            <p:stCondLst>
+                              <p:cond delay="0"/>
+                            </p:stCondLst>
+                            <p:childTnLst>
+                              <p:par>
+                                <p:cTn id="29" presetID="1" presetClass="entr" presetSubtype="0" fill="hold" nodeType="clickEffect">
+                                  <p:stCondLst>
+                                    <p:cond delay="0"/>
+                                  </p:stCondLst>
+                                  <p:childTnLst>
+                                    <p:set>
+                                      <p:cBhvr>
+                                        <p:cTn id="30" dur="1" fill="hold">
+                                          <p:stCondLst>
+                                            <p:cond delay="0"/>
+                                          </p:stCondLst>
+                                        </p:cTn>
+                                        <p:tgtEl>
+                                          <p:spTgt spid="3">
+                                            <p:txEl>
+                                              <p:pRg st="6" end="6"/>
+                                            </p:txEl>
+                                          </p:spTgt>
+                                        </p:tgtEl>
+                                        <p:attrNameLst>
+                                          <p:attrName>style.visibility</p:attrName>
+                                        </p:attrNameLst>
+                                      </p:cBhvr>
+                                      <p:to>
+                                        <p:strVal val="visible"/>
+                                      </p:to>
+                                    </p:set>
+                                  </p:childTnLst>
+                                </p:cTn>
+                              </p:par>
+                            </p:childTnLst>
+                          </p:cTn>
+                        </p:par>
+                      </p:childTnLst>
+                    </p:cTn>
+                  </p:par>
+                </p:childTnLst>
+              </p:cTn>
+              <p:prevCondLst>
+                <p:cond evt="onPrev" delay="0">
+                  <p:tgtEl>
+                    <p:sldTgt/>
+                  </p:tgtEl>
+                </p:cond>
+              </p:prevCondLst>
+              <p:nextCondLst>
+                <p:cond evt="onNext" delay="0">
+                  <p:tgtEl>
+                    <p:sldTgt/>
+                  </p:tgtEl>
+                </p:cond>
+              </p:nextCondLst>
+            </p:seq>
+          </p:childTnLst>
+        </p:cTn>
+      </p:par>
+    </p:tnLst>
+  </p:timing>
+</p:sld>
+</file>
+
+<file path=ppt/slides/slide30.xml><?xml version="1.0" encoding="utf-8"?>
 <p:sld xmlns:a="http://schemas.openxmlformats.org/drawingml/2006/main" xmlns:r="http://schemas.openxmlformats.org/officeDocument/2006/relationships" xmlns:p="http://schemas.openxmlformats.org/presentationml/2006/main">
   <p:cSld>
     <p:spTree>
@@ -25306,556 +26227,7 @@
 </p:sld>
 </file>
 
-<file path=ppt/slides/slide3.xml><?xml version="1.0" encoding="utf-8"?>
-<p:sld xmlns:a="http://schemas.openxmlformats.org/drawingml/2006/main" xmlns:r="http://schemas.openxmlformats.org/officeDocument/2006/relationships" xmlns:p="http://schemas.openxmlformats.org/presentationml/2006/main">
-  <p:cSld>
-    <p:spTree>
-      <p:nvGrpSpPr>
-        <p:cNvPr id="1" name=""/>
-        <p:cNvGrpSpPr/>
-        <p:nvPr/>
-      </p:nvGrpSpPr>
-      <p:grpSpPr>
-        <a:xfrm>
-          <a:off x="0" y="0"/>
-          <a:ext cx="0" cy="0"/>
-          <a:chOff x="0" y="0"/>
-          <a:chExt cx="0" cy="0"/>
-        </a:xfrm>
-      </p:grpSpPr>
-      <p:sp>
-        <p:nvSpPr>
-          <p:cNvPr id="3" name="Content Placeholder 2">
-            <a:extLst>
-              <a:ext uri="{FF2B5EF4-FFF2-40B4-BE49-F238E27FC236}">
-                <a16:creationId xmlns:a16="http://schemas.microsoft.com/office/drawing/2014/main" id="{258E6AF3-7615-4BD1-878E-A94C93E98F90}"/>
-              </a:ext>
-            </a:extLst>
-          </p:cNvPr>
-          <p:cNvSpPr>
-            <a:spLocks noGrp="1"/>
-          </p:cNvSpPr>
-          <p:nvPr>
-            <p:ph idx="1"/>
-          </p:nvPr>
-        </p:nvSpPr>
-        <p:spPr/>
-        <p:txBody>
-          <a:bodyPr/>
-          <a:lstStyle/>
-          <a:p>
-            <a:pPr marL="0" indent="0">
-              <a:buNone/>
-            </a:pPr>
-            <a:r>
-              <a:rPr lang="en-US" sz="3200" dirty="0"/>
-              <a:t>Data mining is the science of </a:t>
-            </a:r>
-            <a:r>
-              <a:rPr lang="en-US" sz="3200" b="1" dirty="0"/>
-              <a:t>knowledge discovery</a:t>
-            </a:r>
-            <a:r>
-              <a:rPr lang="en-US" sz="3200" dirty="0"/>
-              <a:t> from inferences on data </a:t>
-            </a:r>
-            <a:endParaRPr lang="en-US" sz="3200" b="1" dirty="0"/>
-          </a:p>
-          <a:p>
-            <a:r>
-              <a:rPr lang="en-US" dirty="0"/>
-              <a:t>Known as </a:t>
-            </a:r>
-            <a:r>
-              <a:rPr lang="en-US" b="1" dirty="0"/>
-              <a:t>knowledge discovery and data mining (KDD) </a:t>
-            </a:r>
-          </a:p>
-          <a:p>
-            <a:r>
-              <a:rPr lang="en-US" dirty="0"/>
-              <a:t>Data mining is a </a:t>
-            </a:r>
-            <a:r>
-              <a:rPr lang="en-US" b="1" dirty="0"/>
-              <a:t>process of exploration   </a:t>
-            </a:r>
-          </a:p>
-          <a:p>
-            <a:r>
-              <a:rPr lang="en-US" dirty="0"/>
-              <a:t>Exploration is difficult   </a:t>
-            </a:r>
-          </a:p>
-          <a:p>
-            <a:pPr lvl="1"/>
-            <a:r>
-              <a:rPr lang="en-US" dirty="0"/>
-              <a:t>Many steps</a:t>
-            </a:r>
-          </a:p>
-          <a:p>
-            <a:pPr lvl="1"/>
-            <a:r>
-              <a:rPr lang="en-US" dirty="0"/>
-              <a:t>Only some attempts work </a:t>
-            </a:r>
-          </a:p>
-          <a:p>
-            <a:r>
-              <a:rPr lang="en-US" b="1" dirty="0">
-                <a:solidFill>
-                  <a:srgbClr val="C00000"/>
-                </a:solidFill>
-              </a:rPr>
-              <a:t>Try lots of ideas, fail fast, keep the ones that work! </a:t>
-            </a:r>
-          </a:p>
-        </p:txBody>
-      </p:sp>
-      <p:sp>
-        <p:nvSpPr>
-          <p:cNvPr id="6" name="Title 1">
-            <a:extLst>
-              <a:ext uri="{FF2B5EF4-FFF2-40B4-BE49-F238E27FC236}">
-                <a16:creationId xmlns:a16="http://schemas.microsoft.com/office/drawing/2014/main" id="{CD29F70F-B868-451B-A65D-8721F4C7A2D9}"/>
-              </a:ext>
-            </a:extLst>
-          </p:cNvPr>
-          <p:cNvSpPr txBox="1">
-            <a:spLocks/>
-          </p:cNvSpPr>
-          <p:nvPr/>
-        </p:nvSpPr>
-        <p:spPr>
-          <a:xfrm>
-            <a:off x="838200" y="-635"/>
-            <a:ext cx="10515600" cy="1325563"/>
-          </a:xfrm>
-          <a:prstGeom prst="rect">
-            <a:avLst/>
-          </a:prstGeom>
-        </p:spPr>
-        <p:txBody>
-          <a:bodyPr vert="horz" lIns="91440" tIns="45720" rIns="91440" bIns="45720" rtlCol="0" anchor="ctr">
-            <a:normAutofit/>
-          </a:bodyPr>
-          <a:lstStyle>
-            <a:lvl1pPr algn="l" defTabSz="914400" rtl="0" eaLnBrk="1" latinLnBrk="0" hangingPunct="1">
-              <a:lnSpc>
-                <a:spcPct val="90000"/>
-              </a:lnSpc>
-              <a:spcBef>
-                <a:spcPct val="0"/>
-              </a:spcBef>
-              <a:buNone/>
-              <a:defRPr sz="4400" kern="1200">
-                <a:solidFill>
-                  <a:schemeClr val="tx1"/>
-                </a:solidFill>
-                <a:latin typeface="+mj-lt"/>
-                <a:ea typeface="+mj-ea"/>
-                <a:cs typeface="+mj-cs"/>
-              </a:defRPr>
-            </a:lvl1pPr>
-          </a:lstStyle>
-          <a:p>
-            <a:r>
-              <a:rPr lang="en-US" dirty="0">
-                <a:latin typeface="+mn-lt"/>
-              </a:rPr>
-              <a:t>What is data mining?</a:t>
-            </a:r>
-          </a:p>
-        </p:txBody>
-      </p:sp>
-    </p:spTree>
-    <p:extLst>
-      <p:ext uri="{BB962C8B-B14F-4D97-AF65-F5344CB8AC3E}">
-        <p14:creationId xmlns:p14="http://schemas.microsoft.com/office/powerpoint/2010/main" val="115420158"/>
-      </p:ext>
-    </p:extLst>
-  </p:cSld>
-  <p:clrMapOvr>
-    <a:masterClrMapping/>
-  </p:clrMapOvr>
-  <p:timing>
-    <p:tnLst>
-      <p:par>
-        <p:cTn id="1" dur="indefinite" restart="never" nodeType="tmRoot">
-          <p:childTnLst>
-            <p:seq concurrent="1" nextAc="seek">
-              <p:cTn id="2" dur="indefinite" nodeType="mainSeq">
-                <p:childTnLst>
-                  <p:par>
-                    <p:cTn id="3" fill="hold">
-                      <p:stCondLst>
-                        <p:cond delay="indefinite"/>
-                      </p:stCondLst>
-                      <p:childTnLst>
-                        <p:par>
-                          <p:cTn id="4" fill="hold">
-                            <p:stCondLst>
-                              <p:cond delay="0"/>
-                            </p:stCondLst>
-                            <p:childTnLst>
-                              <p:par>
-                                <p:cTn id="5" presetID="1" presetClass="entr" presetSubtype="0" fill="hold" nodeType="clickEffect">
-                                  <p:stCondLst>
-                                    <p:cond delay="0"/>
-                                  </p:stCondLst>
-                                  <p:childTnLst>
-                                    <p:set>
-                                      <p:cBhvr>
-                                        <p:cTn id="6" dur="1" fill="hold">
-                                          <p:stCondLst>
-                                            <p:cond delay="0"/>
-                                          </p:stCondLst>
-                                        </p:cTn>
-                                        <p:tgtEl>
-                                          <p:spTgt spid="3">
-                                            <p:txEl>
-                                              <p:pRg st="0" end="0"/>
-                                            </p:txEl>
-                                          </p:spTgt>
-                                        </p:tgtEl>
-                                        <p:attrNameLst>
-                                          <p:attrName>style.visibility</p:attrName>
-                                        </p:attrNameLst>
-                                      </p:cBhvr>
-                                      <p:to>
-                                        <p:strVal val="visible"/>
-                                      </p:to>
-                                    </p:set>
-                                  </p:childTnLst>
-                                </p:cTn>
-                              </p:par>
-                            </p:childTnLst>
-                          </p:cTn>
-                        </p:par>
-                      </p:childTnLst>
-                    </p:cTn>
-                  </p:par>
-                  <p:par>
-                    <p:cTn id="7" fill="hold">
-                      <p:stCondLst>
-                        <p:cond delay="indefinite"/>
-                      </p:stCondLst>
-                      <p:childTnLst>
-                        <p:par>
-                          <p:cTn id="8" fill="hold">
-                            <p:stCondLst>
-                              <p:cond delay="0"/>
-                            </p:stCondLst>
-                            <p:childTnLst>
-                              <p:par>
-                                <p:cTn id="9" presetID="1" presetClass="entr" presetSubtype="0" fill="hold" nodeType="clickEffect">
-                                  <p:stCondLst>
-                                    <p:cond delay="0"/>
-                                  </p:stCondLst>
-                                  <p:childTnLst>
-                                    <p:set>
-                                      <p:cBhvr>
-                                        <p:cTn id="10" dur="1" fill="hold">
-                                          <p:stCondLst>
-                                            <p:cond delay="0"/>
-                                          </p:stCondLst>
-                                        </p:cTn>
-                                        <p:tgtEl>
-                                          <p:spTgt spid="3">
-                                            <p:txEl>
-                                              <p:pRg st="1" end="1"/>
-                                            </p:txEl>
-                                          </p:spTgt>
-                                        </p:tgtEl>
-                                        <p:attrNameLst>
-                                          <p:attrName>style.visibility</p:attrName>
-                                        </p:attrNameLst>
-                                      </p:cBhvr>
-                                      <p:to>
-                                        <p:strVal val="visible"/>
-                                      </p:to>
-                                    </p:set>
-                                  </p:childTnLst>
-                                </p:cTn>
-                              </p:par>
-                            </p:childTnLst>
-                          </p:cTn>
-                        </p:par>
-                      </p:childTnLst>
-                    </p:cTn>
-                  </p:par>
-                  <p:par>
-                    <p:cTn id="11" fill="hold">
-                      <p:stCondLst>
-                        <p:cond delay="indefinite"/>
-                      </p:stCondLst>
-                      <p:childTnLst>
-                        <p:par>
-                          <p:cTn id="12" fill="hold">
-                            <p:stCondLst>
-                              <p:cond delay="0"/>
-                            </p:stCondLst>
-                            <p:childTnLst>
-                              <p:par>
-                                <p:cTn id="13" presetID="1" presetClass="entr" presetSubtype="0" fill="hold" nodeType="clickEffect">
-                                  <p:stCondLst>
-                                    <p:cond delay="0"/>
-                                  </p:stCondLst>
-                                  <p:childTnLst>
-                                    <p:set>
-                                      <p:cBhvr>
-                                        <p:cTn id="14" dur="1" fill="hold">
-                                          <p:stCondLst>
-                                            <p:cond delay="0"/>
-                                          </p:stCondLst>
-                                        </p:cTn>
-                                        <p:tgtEl>
-                                          <p:spTgt spid="3">
-                                            <p:txEl>
-                                              <p:pRg st="2" end="2"/>
-                                            </p:txEl>
-                                          </p:spTgt>
-                                        </p:tgtEl>
-                                        <p:attrNameLst>
-                                          <p:attrName>style.visibility</p:attrName>
-                                        </p:attrNameLst>
-                                      </p:cBhvr>
-                                      <p:to>
-                                        <p:strVal val="visible"/>
-                                      </p:to>
-                                    </p:set>
-                                  </p:childTnLst>
-                                </p:cTn>
-                              </p:par>
-                            </p:childTnLst>
-                          </p:cTn>
-                        </p:par>
-                      </p:childTnLst>
-                    </p:cTn>
-                  </p:par>
-                  <p:par>
-                    <p:cTn id="15" fill="hold">
-                      <p:stCondLst>
-                        <p:cond delay="indefinite"/>
-                      </p:stCondLst>
-                      <p:childTnLst>
-                        <p:par>
-                          <p:cTn id="16" fill="hold">
-                            <p:stCondLst>
-                              <p:cond delay="0"/>
-                            </p:stCondLst>
-                            <p:childTnLst>
-                              <p:par>
-                                <p:cTn id="17" presetID="1" presetClass="entr" presetSubtype="0" fill="hold" nodeType="clickEffect">
-                                  <p:stCondLst>
-                                    <p:cond delay="0"/>
-                                  </p:stCondLst>
-                                  <p:childTnLst>
-                                    <p:set>
-                                      <p:cBhvr>
-                                        <p:cTn id="18" dur="1" fill="hold">
-                                          <p:stCondLst>
-                                            <p:cond delay="0"/>
-                                          </p:stCondLst>
-                                        </p:cTn>
-                                        <p:tgtEl>
-                                          <p:spTgt spid="3">
-                                            <p:txEl>
-                                              <p:pRg st="3" end="3"/>
-                                            </p:txEl>
-                                          </p:spTgt>
-                                        </p:tgtEl>
-                                        <p:attrNameLst>
-                                          <p:attrName>style.visibility</p:attrName>
-                                        </p:attrNameLst>
-                                      </p:cBhvr>
-                                      <p:to>
-                                        <p:strVal val="visible"/>
-                                      </p:to>
-                                    </p:set>
-                                  </p:childTnLst>
-                                </p:cTn>
-                              </p:par>
-                            </p:childTnLst>
-                          </p:cTn>
-                        </p:par>
-                      </p:childTnLst>
-                    </p:cTn>
-                  </p:par>
-                  <p:par>
-                    <p:cTn id="19" fill="hold">
-                      <p:stCondLst>
-                        <p:cond delay="indefinite"/>
-                      </p:stCondLst>
-                      <p:childTnLst>
-                        <p:par>
-                          <p:cTn id="20" fill="hold">
-                            <p:stCondLst>
-                              <p:cond delay="0"/>
-                            </p:stCondLst>
-                            <p:childTnLst>
-                              <p:par>
-                                <p:cTn id="21" presetID="1" presetClass="entr" presetSubtype="0" fill="hold" nodeType="clickEffect">
-                                  <p:stCondLst>
-                                    <p:cond delay="0"/>
-                                  </p:stCondLst>
-                                  <p:childTnLst>
-                                    <p:set>
-                                      <p:cBhvr>
-                                        <p:cTn id="22" dur="1" fill="hold">
-                                          <p:stCondLst>
-                                            <p:cond delay="0"/>
-                                          </p:stCondLst>
-                                        </p:cTn>
-                                        <p:tgtEl>
-                                          <p:spTgt spid="3">
-                                            <p:txEl>
-                                              <p:pRg st="4" end="4"/>
-                                            </p:txEl>
-                                          </p:spTgt>
-                                        </p:tgtEl>
-                                        <p:attrNameLst>
-                                          <p:attrName>style.visibility</p:attrName>
-                                        </p:attrNameLst>
-                                      </p:cBhvr>
-                                      <p:to>
-                                        <p:strVal val="visible"/>
-                                      </p:to>
-                                    </p:set>
-                                  </p:childTnLst>
-                                </p:cTn>
-                              </p:par>
-                            </p:childTnLst>
-                          </p:cTn>
-                        </p:par>
-                      </p:childTnLst>
-                    </p:cTn>
-                  </p:par>
-                  <p:par>
-                    <p:cTn id="23" fill="hold">
-                      <p:stCondLst>
-                        <p:cond delay="indefinite"/>
-                      </p:stCondLst>
-                      <p:childTnLst>
-                        <p:par>
-                          <p:cTn id="24" fill="hold">
-                            <p:stCondLst>
-                              <p:cond delay="0"/>
-                            </p:stCondLst>
-                            <p:childTnLst>
-                              <p:par>
-                                <p:cTn id="25" presetID="1" presetClass="entr" presetSubtype="0" fill="hold" nodeType="clickEffect">
-                                  <p:stCondLst>
-                                    <p:cond delay="0"/>
-                                  </p:stCondLst>
-                                  <p:childTnLst>
-                                    <p:set>
-                                      <p:cBhvr>
-                                        <p:cTn id="26" dur="1" fill="hold">
-                                          <p:stCondLst>
-                                            <p:cond delay="0"/>
-                                          </p:stCondLst>
-                                        </p:cTn>
-                                        <p:tgtEl>
-                                          <p:spTgt spid="3">
-                                            <p:txEl>
-                                              <p:pRg st="5" end="5"/>
-                                            </p:txEl>
-                                          </p:spTgt>
-                                        </p:tgtEl>
-                                        <p:attrNameLst>
-                                          <p:attrName>style.visibility</p:attrName>
-                                        </p:attrNameLst>
-                                      </p:cBhvr>
-                                      <p:to>
-                                        <p:strVal val="visible"/>
-                                      </p:to>
-                                    </p:set>
-                                  </p:childTnLst>
-                                </p:cTn>
-                              </p:par>
-                            </p:childTnLst>
-                          </p:cTn>
-                        </p:par>
-                      </p:childTnLst>
-                    </p:cTn>
-                  </p:par>
-                  <p:par>
-                    <p:cTn id="27" fill="hold">
-                      <p:stCondLst>
-                        <p:cond delay="indefinite"/>
-                      </p:stCondLst>
-                      <p:childTnLst>
-                        <p:par>
-                          <p:cTn id="28" fill="hold">
-                            <p:stCondLst>
-                              <p:cond delay="0"/>
-                            </p:stCondLst>
-                            <p:childTnLst>
-                              <p:par>
-                                <p:cTn id="29" presetID="1" presetClass="entr" presetSubtype="0" fill="hold" nodeType="clickEffect">
-                                  <p:stCondLst>
-                                    <p:cond delay="0"/>
-                                  </p:stCondLst>
-                                  <p:childTnLst>
-                                    <p:set>
-                                      <p:cBhvr>
-                                        <p:cTn id="30" dur="1" fill="hold">
-                                          <p:stCondLst>
-                                            <p:cond delay="0"/>
-                                          </p:stCondLst>
-                                        </p:cTn>
-                                        <p:tgtEl>
-                                          <p:spTgt spid="3">
-                                            <p:txEl>
-                                              <p:pRg st="6" end="6"/>
-                                            </p:txEl>
-                                          </p:spTgt>
-                                        </p:tgtEl>
-                                        <p:attrNameLst>
-                                          <p:attrName>style.visibility</p:attrName>
-                                        </p:attrNameLst>
-                                      </p:cBhvr>
-                                      <p:to>
-                                        <p:strVal val="visible"/>
-                                      </p:to>
-                                    </p:set>
-                                  </p:childTnLst>
-                                </p:cTn>
-                              </p:par>
-                            </p:childTnLst>
-                          </p:cTn>
-                        </p:par>
-                      </p:childTnLst>
-                    </p:cTn>
-                  </p:par>
-                </p:childTnLst>
-              </p:cTn>
-              <p:prevCondLst>
-                <p:cond evt="onPrev" delay="0">
-                  <p:tgtEl>
-                    <p:sldTgt/>
-                  </p:tgtEl>
-                </p:cond>
-              </p:prevCondLst>
-              <p:nextCondLst>
-                <p:cond evt="onNext" delay="0">
-                  <p:tgtEl>
-                    <p:sldTgt/>
-                  </p:tgtEl>
-                </p:cond>
-              </p:nextCondLst>
-            </p:seq>
-          </p:childTnLst>
-        </p:cTn>
-      </p:par>
-    </p:tnLst>
-  </p:timing>
-</p:sld>
-</file>
-
-<file path=ppt/slides/slide30.xml><?xml version="1.0" encoding="utf-8"?>
+<file path=ppt/slides/slide31.xml><?xml version="1.0" encoding="utf-8"?>
 <p:sld xmlns:a="http://schemas.openxmlformats.org/drawingml/2006/main" xmlns:r="http://schemas.openxmlformats.org/officeDocument/2006/relationships" xmlns:p="http://schemas.openxmlformats.org/presentationml/2006/main">
   <p:cSld>
     <p:spTree>
@@ -26554,7 +26926,7 @@
 </p:sld>
 </file>
 
-<file path=ppt/slides/slide31.xml><?xml version="1.0" encoding="utf-8"?>
+<file path=ppt/slides/slide32.xml><?xml version="1.0" encoding="utf-8"?>
 <p:sld xmlns:a="http://schemas.openxmlformats.org/drawingml/2006/main" xmlns:r="http://schemas.openxmlformats.org/officeDocument/2006/relationships" xmlns:p="http://schemas.openxmlformats.org/presentationml/2006/main">
   <p:cSld>
     <p:spTree>
@@ -26571,8 +26943,8 @@
           <a:chExt cx="0" cy="0"/>
         </a:xfrm>
       </p:grpSpPr>
-      <mc:AlternateContent xmlns:mc="http://schemas.openxmlformats.org/markup-compatibility/2006" xmlns:a14="http://schemas.microsoft.com/office/drawing/2010/main">
-        <mc:Choice Requires="a14">
+      <mc:AlternateContent xmlns:mc="http://schemas.openxmlformats.org/markup-compatibility/2006">
+        <mc:Choice xmlns:a14="http://schemas.microsoft.com/office/drawing/2010/main" Requires="a14">
           <p:sp>
             <p:nvSpPr>
               <p:cNvPr id="3" name="Content Placeholder 2">
@@ -26648,25 +27020,8 @@
                       </a:schemeClr>
                     </a:solidFill>
                   </a:rPr>
-                  <a:t>But, other significance levels can be chosen – need to consider </a:t>
+                  <a:t>But, other significance levels can be chosen – need to consider alternatives</a:t>
                 </a:r>
-                <a:r>
-                  <a:rPr lang="en-US" dirty="0" err="1">
-                    <a:solidFill>
-                      <a:schemeClr val="tx1">
-                        <a:lumMod val="50000"/>
-                      </a:schemeClr>
-                    </a:solidFill>
-                  </a:rPr>
-                  <a:t>alterinatives</a:t>
-                </a:r>
-                <a:endParaRPr lang="en-US" dirty="0">
-                  <a:solidFill>
-                    <a:schemeClr val="tx1">
-                      <a:lumMod val="50000"/>
-                    </a:schemeClr>
-                  </a:solidFill>
-                </a:endParaRPr>
               </a:p>
               <a:p>
                 <a:r>
@@ -26803,7 +27158,7 @@
             </p:txBody>
           </p:sp>
         </mc:Choice>
-        <mc:Fallback xmlns="">
+        <mc:Fallback>
           <p:sp>
             <p:nvSpPr>
               <p:cNvPr id="3" name="Content Placeholder 2">
@@ -27387,7 +27742,7 @@
 </p:sld>
 </file>
 
-<file path=ppt/slides/slide32.xml><?xml version="1.0" encoding="utf-8"?>
+<file path=ppt/slides/slide33.xml><?xml version="1.0" encoding="utf-8"?>
 <p:sld xmlns:a="http://schemas.openxmlformats.org/drawingml/2006/main" xmlns:r="http://schemas.openxmlformats.org/officeDocument/2006/relationships" xmlns:p="http://schemas.openxmlformats.org/presentationml/2006/main">
   <p:cSld>
     <p:spTree>
@@ -29678,7 +30033,7 @@
 </p:sld>
 </file>
 
-<file path=ppt/slides/slide33.xml><?xml version="1.0" encoding="utf-8"?>
+<file path=ppt/slides/slide34.xml><?xml version="1.0" encoding="utf-8"?>
 <p:sld xmlns:a="http://schemas.openxmlformats.org/drawingml/2006/main" xmlns:r="http://schemas.openxmlformats.org/officeDocument/2006/relationships" xmlns:p="http://schemas.openxmlformats.org/presentationml/2006/main">
   <p:cSld>
     <p:spTree>
@@ -30990,7 +31345,7 @@
 </p:sld>
 </file>
 
-<file path=ppt/slides/slide34.xml><?xml version="1.0" encoding="utf-8"?>
+<file path=ppt/slides/slide35.xml><?xml version="1.0" encoding="utf-8"?>
 <p:sld xmlns:a="http://schemas.openxmlformats.org/drawingml/2006/main" xmlns:r="http://schemas.openxmlformats.org/officeDocument/2006/relationships" xmlns:p="http://schemas.openxmlformats.org/presentationml/2006/main">
   <p:cSld>
     <p:spTree>
@@ -31007,8 +31362,8 @@
           <a:chExt cx="0" cy="0"/>
         </a:xfrm>
       </p:grpSpPr>
-      <mc:AlternateContent xmlns:mc="http://schemas.openxmlformats.org/markup-compatibility/2006" xmlns:a14="http://schemas.microsoft.com/office/drawing/2010/main">
-        <mc:Choice Requires="a14">
+      <mc:AlternateContent xmlns:mc="http://schemas.openxmlformats.org/markup-compatibility/2006">
+        <mc:Choice xmlns:a14="http://schemas.microsoft.com/office/drawing/2010/main" Requires="a14">
           <p:sp>
             <p:nvSpPr>
               <p:cNvPr id="3" name="Content Placeholder 2">
@@ -31068,149 +31423,159 @@
               <a:p>
                 <a:r>
                   <a:rPr lang="en-US" sz="3200" dirty="0"/>
-                  <a:t>There are </a:t>
-                </a:r>
-                <a:r>
-                  <a:rPr lang="en-US" sz="3200" b="1" dirty="0"/>
-                  <a:t>n choose 2 </a:t>
-                </a:r>
-                <a:r>
-                  <a:rPr lang="en-US" sz="3200" dirty="0"/>
-                  <a:t>pairs </a:t>
+                  <a:t>Compute the number of pairs, </a:t>
                 </a:r>
                 <a14:m>
                   <m:oMath xmlns:m="http://schemas.openxmlformats.org/officeDocument/2006/math">
                     <m:r>
-                      <a:rPr lang="en-US" sz="3200" i="1" smtClean="0">
+                      <a:rPr lang="en-US" sz="3200" b="0" i="1" smtClean="0">
                         <a:latin typeface="Cambria Math" panose="02040503050406030204" pitchFamily="18" charset="0"/>
-                        <a:ea typeface="Cambria Math" panose="02040503050406030204" pitchFamily="18" charset="0"/>
                       </a:rPr>
-                      <m:t>=</m:t>
+                      <m:t>𝑘</m:t>
                     </m:r>
-                    <m:d>
-                      <m:dPr>
-                        <m:ctrlPr>
-                          <a:rPr lang="en-US" sz="3200" i="1" smtClean="0">
-                            <a:latin typeface="Cambria Math" panose="02040503050406030204" pitchFamily="18" charset="0"/>
-                            <a:ea typeface="Cambria Math" panose="02040503050406030204" pitchFamily="18" charset="0"/>
-                          </a:rPr>
-                        </m:ctrlPr>
-                      </m:dPr>
-                      <m:e>
-                        <m:m>
-                          <m:mPr>
-                            <m:mcs>
-                              <m:mc>
-                                <m:mcPr>
-                                  <m:count m:val="1"/>
-                                  <m:mcJc m:val="center"/>
-                                </m:mcPr>
-                              </m:mc>
-                            </m:mcs>
-                            <m:ctrlPr>
-                              <a:rPr lang="en-US" sz="3200" i="1" smtClean="0">
-                                <a:latin typeface="Cambria Math" panose="02040503050406030204" pitchFamily="18" charset="0"/>
-                                <a:ea typeface="Cambria Math" panose="02040503050406030204" pitchFamily="18" charset="0"/>
-                              </a:rPr>
-                            </m:ctrlPr>
-                          </m:mPr>
-                          <m:mr>
+                    <m:r>
+                      <a:rPr lang="en-US" sz="3200" b="0" i="1" smtClean="0">
+                        <a:latin typeface="Cambria Math" panose="02040503050406030204" pitchFamily="18" charset="0"/>
+                      </a:rPr>
+                      <m:t>=2</m:t>
+                    </m:r>
+                  </m:oMath>
+                </a14:m>
+                <a:r>
+                  <a:rPr lang="en-US" sz="3200" dirty="0"/>
+                  <a:t>, or </a:t>
+                </a:r>
+                <a:r>
+                  <a:rPr lang="en-US" sz="3200" b="1" dirty="0"/>
+                  <a:t>combinations,</a:t>
+                </a:r>
+                <a:r>
+                  <a:rPr lang="en-US" sz="3200" dirty="0"/>
+                  <a:t> </a:t>
+                </a:r>
+              </a:p>
+              <a:p>
+                <a:pPr marL="0" indent="0">
+                  <a:buNone/>
+                </a:pPr>
+                <a14:m>
+                  <m:oMathPara xmlns:m="http://schemas.openxmlformats.org/officeDocument/2006/math">
+                    <m:oMathParaPr>
+                      <m:jc m:val="centerGroup"/>
+                    </m:oMathParaPr>
+                    <m:oMath xmlns:m="http://schemas.openxmlformats.org/officeDocument/2006/math">
+                      <m:r>
+                        <a:rPr lang="en-US" sz="3200" i="1" smtClean="0">
+                          <a:latin typeface="Cambria Math" panose="02040503050406030204" pitchFamily="18" charset="0"/>
+                          <a:ea typeface="Cambria Math" panose="02040503050406030204" pitchFamily="18" charset="0"/>
+                        </a:rPr>
+                        <m:t>=</m:t>
+                      </m:r>
+                      <m:f>
+                        <m:fPr>
+                          <m:ctrlPr>
+                            <a:rPr lang="en-US" sz="3200" i="1" smtClean="0">
+                              <a:latin typeface="Cambria Math" panose="02040503050406030204" pitchFamily="18" charset="0"/>
+                              <a:ea typeface="Cambria Math" panose="02040503050406030204" pitchFamily="18" charset="0"/>
+                            </a:rPr>
+                          </m:ctrlPr>
+                        </m:fPr>
+                        <m:num>
+                          <m:r>
+                            <a:rPr lang="en-US" sz="3200" b="0" i="1" smtClean="0">
+                              <a:latin typeface="Cambria Math" panose="02040503050406030204" pitchFamily="18" charset="0"/>
+                              <a:ea typeface="Cambria Math" panose="02040503050406030204" pitchFamily="18" charset="0"/>
+                            </a:rPr>
+                            <m:t>𝑛</m:t>
+                          </m:r>
+                          <m:r>
+                            <a:rPr lang="en-US" sz="3200" b="0" i="1" smtClean="0">
+                              <a:latin typeface="Cambria Math" panose="02040503050406030204" pitchFamily="18" charset="0"/>
+                              <a:ea typeface="Cambria Math" panose="02040503050406030204" pitchFamily="18" charset="0"/>
+                            </a:rPr>
+                            <m:t>!</m:t>
+                          </m:r>
+                        </m:num>
+                        <m:den>
+                          <m:r>
+                            <a:rPr lang="en-US" sz="3200" b="0" i="1" smtClean="0">
+                              <a:latin typeface="Cambria Math" panose="02040503050406030204" pitchFamily="18" charset="0"/>
+                              <a:ea typeface="Cambria Math" panose="02040503050406030204" pitchFamily="18" charset="0"/>
+                            </a:rPr>
+                            <m:t>𝑘</m:t>
+                          </m:r>
+                          <m:r>
+                            <a:rPr lang="en-US" sz="3200" b="0" i="1" smtClean="0">
+                              <a:latin typeface="Cambria Math" panose="02040503050406030204" pitchFamily="18" charset="0"/>
+                              <a:ea typeface="Cambria Math" panose="02040503050406030204" pitchFamily="18" charset="0"/>
+                            </a:rPr>
+                            <m:t>!</m:t>
+                          </m:r>
+                          <m:d>
+                            <m:dPr>
+                              <m:ctrlPr>
+                                <a:rPr lang="en-US" sz="3200" b="0" i="1" smtClean="0">
+                                  <a:latin typeface="Cambria Math" panose="02040503050406030204" pitchFamily="18" charset="0"/>
+                                  <a:ea typeface="Cambria Math" panose="02040503050406030204" pitchFamily="18" charset="0"/>
+                                </a:rPr>
+                              </m:ctrlPr>
+                            </m:dPr>
                             <m:e>
                               <m:r>
-                                <m:rPr>
-                                  <m:brk m:alnAt="7"/>
-                                </m:rPr>
                                 <a:rPr lang="en-US" sz="3200" b="0" i="1" smtClean="0">
                                   <a:latin typeface="Cambria Math" panose="02040503050406030204" pitchFamily="18" charset="0"/>
                                   <a:ea typeface="Cambria Math" panose="02040503050406030204" pitchFamily="18" charset="0"/>
                                 </a:rPr>
                                 <m:t>𝑛</m:t>
                               </m:r>
-                            </m:e>
-                          </m:mr>
-                          <m:mr>
-                            <m:e>
                               <m:r>
                                 <a:rPr lang="en-US" sz="3200" b="0" i="1" smtClean="0">
                                   <a:latin typeface="Cambria Math" panose="02040503050406030204" pitchFamily="18" charset="0"/>
                                   <a:ea typeface="Cambria Math" panose="02040503050406030204" pitchFamily="18" charset="0"/>
                                 </a:rPr>
-                                <m:t>2</m:t>
+                                <m:t>−</m:t>
+                              </m:r>
+                              <m:r>
+                                <a:rPr lang="en-US" sz="3200" b="0" i="1" smtClean="0">
+                                  <a:latin typeface="Cambria Math" panose="02040503050406030204" pitchFamily="18" charset="0"/>
+                                  <a:ea typeface="Cambria Math" panose="02040503050406030204" pitchFamily="18" charset="0"/>
+                                </a:rPr>
+                                <m:t>𝑘</m:t>
                               </m:r>
                             </m:e>
-                          </m:mr>
-                        </m:m>
-                      </m:e>
-                    </m:d>
-                    <m:r>
-                      <a:rPr lang="en-US" sz="3200" b="0" i="1" smtClean="0">
-                        <a:latin typeface="Cambria Math" panose="02040503050406030204" pitchFamily="18" charset="0"/>
-                        <a:ea typeface="Cambria Math" panose="02040503050406030204" pitchFamily="18" charset="0"/>
-                      </a:rPr>
-                      <m:t>=</m:t>
-                    </m:r>
-                    <m:f>
-                      <m:fPr>
-                        <m:ctrlPr>
-                          <a:rPr lang="en-US" sz="3200" b="0" i="1" smtClean="0">
-                            <a:latin typeface="Cambria Math" panose="02040503050406030204" pitchFamily="18" charset="0"/>
-                            <a:ea typeface="Cambria Math" panose="02040503050406030204" pitchFamily="18" charset="0"/>
-                          </a:rPr>
-                        </m:ctrlPr>
-                      </m:fPr>
-                      <m:num>
-                        <m:r>
-                          <a:rPr lang="en-US" sz="3200" b="0" i="1" smtClean="0">
-                            <a:latin typeface="Cambria Math" panose="02040503050406030204" pitchFamily="18" charset="0"/>
-                            <a:ea typeface="Cambria Math" panose="02040503050406030204" pitchFamily="18" charset="0"/>
-                          </a:rPr>
-                          <m:t>𝑛</m:t>
-                        </m:r>
-                        <m:d>
-                          <m:dPr>
-                            <m:ctrlPr>
-                              <a:rPr lang="en-US" sz="3200" b="0" i="1" smtClean="0">
-                                <a:latin typeface="Cambria Math" panose="02040503050406030204" pitchFamily="18" charset="0"/>
-                                <a:ea typeface="Cambria Math" panose="02040503050406030204" pitchFamily="18" charset="0"/>
-                              </a:rPr>
-                            </m:ctrlPr>
-                          </m:dPr>
-                          <m:e>
-                            <m:r>
-                              <a:rPr lang="en-US" sz="3200" b="0" i="1" smtClean="0">
-                                <a:latin typeface="Cambria Math" panose="02040503050406030204" pitchFamily="18" charset="0"/>
-                                <a:ea typeface="Cambria Math" panose="02040503050406030204" pitchFamily="18" charset="0"/>
-                              </a:rPr>
-                              <m:t>𝑛</m:t>
-                            </m:r>
-                            <m:r>
-                              <a:rPr lang="en-US" sz="3200" b="0" i="1" smtClean="0">
-                                <a:latin typeface="Cambria Math" panose="02040503050406030204" pitchFamily="18" charset="0"/>
-                                <a:ea typeface="Cambria Math" panose="02040503050406030204" pitchFamily="18" charset="0"/>
-                              </a:rPr>
-                              <m:t>−1</m:t>
-                            </m:r>
-                          </m:e>
-                        </m:d>
-                      </m:num>
-                      <m:den>
-                        <m:r>
-                          <a:rPr lang="en-US" sz="3200" b="0" i="1" smtClean="0">
-                            <a:latin typeface="Cambria Math" panose="02040503050406030204" pitchFamily="18" charset="0"/>
-                            <a:ea typeface="Cambria Math" panose="02040503050406030204" pitchFamily="18" charset="0"/>
-                          </a:rPr>
-                          <m:t>2</m:t>
-                        </m:r>
-                      </m:den>
-                    </m:f>
-                    <m:r>
-                      <a:rPr lang="en-US" sz="3200" b="0" i="1" smtClean="0">
-                        <a:latin typeface="Cambria Math" panose="02040503050406030204" pitchFamily="18" charset="0"/>
-                        <a:ea typeface="Cambria Math" panose="02040503050406030204" pitchFamily="18" charset="0"/>
-                      </a:rPr>
-                      <m:t>=495,000</m:t>
-                    </m:r>
-                  </m:oMath>
+                          </m:d>
+                          <m:r>
+                            <a:rPr lang="en-US" sz="3200" b="0" i="1" smtClean="0">
+                              <a:latin typeface="Cambria Math" panose="02040503050406030204" pitchFamily="18" charset="0"/>
+                              <a:ea typeface="Cambria Math" panose="02040503050406030204" pitchFamily="18" charset="0"/>
+                            </a:rPr>
+                            <m:t>!</m:t>
+                          </m:r>
+                        </m:den>
+                      </m:f>
+                      <m:r>
+                        <a:rPr lang="en-US" sz="3200" b="0" i="1" smtClean="0">
+                          <a:latin typeface="Cambria Math" panose="02040503050406030204" pitchFamily="18" charset="0"/>
+                          <a:ea typeface="Cambria Math" panose="02040503050406030204" pitchFamily="18" charset="0"/>
+                        </a:rPr>
+                        <m:t>=49</m:t>
+                      </m:r>
+                      <m:r>
+                        <a:rPr lang="en-US" sz="3200" b="0" i="1" smtClean="0">
+                          <a:latin typeface="Cambria Math" panose="02040503050406030204" pitchFamily="18" charset="0"/>
+                          <a:ea typeface="Cambria Math" panose="02040503050406030204" pitchFamily="18" charset="0"/>
+                        </a:rPr>
+                        <m:t>9,5</m:t>
+                      </m:r>
+                      <m:r>
+                        <a:rPr lang="en-US" sz="3200" b="0" i="1" smtClean="0">
+                          <a:latin typeface="Cambria Math" panose="02040503050406030204" pitchFamily="18" charset="0"/>
+                          <a:ea typeface="Cambria Math" panose="02040503050406030204" pitchFamily="18" charset="0"/>
+                        </a:rPr>
+                        <m:t>00</m:t>
+                      </m:r>
+                    </m:oMath>
+                  </m:oMathPara>
                 </a14:m>
                 <a:endParaRPr lang="en-US" sz="3200" dirty="0"/>
               </a:p>
@@ -31220,7 +31585,7 @@
             </p:txBody>
           </p:sp>
         </mc:Choice>
-        <mc:Fallback xmlns="">
+        <mc:Fallback>
           <p:sp>
             <p:nvSpPr>
               <p:cNvPr id="3" name="Content Placeholder 2">
@@ -31534,6 +31899,55 @@
                       </p:childTnLst>
                     </p:cTn>
                   </p:par>
+                  <p:par>
+                    <p:cTn id="19" fill="hold">
+                      <p:stCondLst>
+                        <p:cond delay="indefinite"/>
+                      </p:stCondLst>
+                      <p:childTnLst>
+                        <p:par>
+                          <p:cTn id="20" fill="hold">
+                            <p:stCondLst>
+                              <p:cond delay="0"/>
+                            </p:stCondLst>
+                            <p:childTnLst>
+                              <p:par>
+                                <p:cTn id="21" presetID="1" presetClass="entr" presetSubtype="0" fill="hold" nodeType="clickEffect">
+                                  <p:stCondLst>
+                                    <p:cond delay="0"/>
+                                  </p:stCondLst>
+                                  <p:childTnLst>
+                                    <p:set>
+                                      <p:cBhvr>
+                                        <p:cTn id="22" dur="1" fill="hold">
+                                          <p:stCondLst>
+                                            <p:cond delay="0"/>
+                                          </p:stCondLst>
+                                        </p:cTn>
+                                        <p:tgtEl>
+                                          <p:spTgt spid="3">
+                                            <p:txEl>
+                                              <p:pRg st="4" end="4"/>
+                                            </p:txEl>
+                                          </p:spTgt>
+                                        </p:tgtEl>
+                                        <p:attrNameLst>
+                                          <p:attrName>style.visibility</p:attrName>
+                                        </p:attrNameLst>
+                                      </p:cBhvr>
+                                      <p:to>
+                                        <p:strVal val="visible"/>
+                                      </p:to>
+                                    </p:set>
+                                  </p:childTnLst>
+                                </p:cTn>
+                              </p:par>
+                            </p:childTnLst>
+                          </p:cTn>
+                        </p:par>
+                      </p:childTnLst>
+                    </p:cTn>
+                  </p:par>
                 </p:childTnLst>
               </p:cTn>
               <p:prevCondLst>
@@ -31559,7 +31973,7 @@
 </p:sld>
 </file>
 
-<file path=ppt/slides/slide35.xml><?xml version="1.0" encoding="utf-8"?>
+<file path=ppt/slides/slide36.xml><?xml version="1.0" encoding="utf-8"?>
 <p:sld xmlns:a="http://schemas.openxmlformats.org/drawingml/2006/main" xmlns:r="http://schemas.openxmlformats.org/officeDocument/2006/relationships" xmlns:p="http://schemas.openxmlformats.org/presentationml/2006/main">
   <p:cSld>
     <p:spTree>
@@ -31576,8 +31990,8 @@
           <a:chExt cx="0" cy="0"/>
         </a:xfrm>
       </p:grpSpPr>
-      <mc:AlternateContent xmlns:mc="http://schemas.openxmlformats.org/markup-compatibility/2006" xmlns:a14="http://schemas.microsoft.com/office/drawing/2010/main">
-        <mc:Choice Requires="a14">
+      <mc:AlternateContent xmlns:mc="http://schemas.openxmlformats.org/markup-compatibility/2006">
+        <mc:Choice xmlns:a14="http://schemas.microsoft.com/office/drawing/2010/main" Requires="a14">
           <p:sp>
             <p:nvSpPr>
               <p:cNvPr id="3" name="Content Placeholder 2">
@@ -31725,7 +32139,7 @@
                         <a:rPr lang="en-US" sz="3200" b="0" i="1" smtClean="0">
                           <a:latin typeface="Cambria Math" panose="02040503050406030204" pitchFamily="18" charset="0"/>
                         </a:rPr>
-                        <m:t>=0.05∗495000=24975</m:t>
+                        <m:t>=0.05∗499500=24975</m:t>
                       </m:r>
                     </m:oMath>
                   </m:oMathPara>
@@ -31750,7 +32164,7 @@
             </p:txBody>
           </p:sp>
         </mc:Choice>
-        <mc:Fallback xmlns="">
+        <mc:Fallback>
           <p:sp>
             <p:nvSpPr>
               <p:cNvPr id="3" name="Content Placeholder 2">
@@ -31860,285 +32274,10 @@
   <p:clrMapOvr>
     <a:masterClrMapping/>
   </p:clrMapOvr>
-  <p:timing>
-    <p:tnLst>
-      <p:par>
-        <p:cTn id="1" dur="indefinite" restart="never" nodeType="tmRoot">
-          <p:childTnLst>
-            <p:seq concurrent="1" nextAc="seek">
-              <p:cTn id="2" dur="indefinite" nodeType="mainSeq">
-                <p:childTnLst>
-                  <p:par>
-                    <p:cTn id="3" fill="hold">
-                      <p:stCondLst>
-                        <p:cond delay="indefinite"/>
-                      </p:stCondLst>
-                      <p:childTnLst>
-                        <p:par>
-                          <p:cTn id="4" fill="hold">
-                            <p:stCondLst>
-                              <p:cond delay="0"/>
-                            </p:stCondLst>
-                            <p:childTnLst>
-                              <p:par>
-                                <p:cTn id="5" presetID="1" presetClass="entr" presetSubtype="0" fill="hold" nodeType="clickEffect">
-                                  <p:stCondLst>
-                                    <p:cond delay="0"/>
-                                  </p:stCondLst>
-                                  <p:childTnLst>
-                                    <p:set>
-                                      <p:cBhvr>
-                                        <p:cTn id="6" dur="1" fill="hold">
-                                          <p:stCondLst>
-                                            <p:cond delay="0"/>
-                                          </p:stCondLst>
-                                        </p:cTn>
-                                        <p:tgtEl>
-                                          <p:spTgt spid="3">
-                                            <p:txEl>
-                                              <p:pRg st="1" end="1"/>
-                                            </p:txEl>
-                                          </p:spTgt>
-                                        </p:tgtEl>
-                                        <p:attrNameLst>
-                                          <p:attrName>style.visibility</p:attrName>
-                                        </p:attrNameLst>
-                                      </p:cBhvr>
-                                      <p:to>
-                                        <p:strVal val="visible"/>
-                                      </p:to>
-                                    </p:set>
-                                  </p:childTnLst>
-                                </p:cTn>
-                              </p:par>
-                            </p:childTnLst>
-                          </p:cTn>
-                        </p:par>
-                      </p:childTnLst>
-                    </p:cTn>
-                  </p:par>
-                  <p:par>
-                    <p:cTn id="7" fill="hold">
-                      <p:stCondLst>
-                        <p:cond delay="indefinite"/>
-                      </p:stCondLst>
-                      <p:childTnLst>
-                        <p:par>
-                          <p:cTn id="8" fill="hold">
-                            <p:stCondLst>
-                              <p:cond delay="0"/>
-                            </p:stCondLst>
-                            <p:childTnLst>
-                              <p:par>
-                                <p:cTn id="9" presetID="1" presetClass="entr" presetSubtype="0" fill="hold" nodeType="clickEffect">
-                                  <p:stCondLst>
-                                    <p:cond delay="0"/>
-                                  </p:stCondLst>
-                                  <p:childTnLst>
-                                    <p:set>
-                                      <p:cBhvr>
-                                        <p:cTn id="10" dur="1" fill="hold">
-                                          <p:stCondLst>
-                                            <p:cond delay="0"/>
-                                          </p:stCondLst>
-                                        </p:cTn>
-                                        <p:tgtEl>
-                                          <p:spTgt spid="3">
-                                            <p:txEl>
-                                              <p:pRg st="2" end="2"/>
-                                            </p:txEl>
-                                          </p:spTgt>
-                                        </p:tgtEl>
-                                        <p:attrNameLst>
-                                          <p:attrName>style.visibility</p:attrName>
-                                        </p:attrNameLst>
-                                      </p:cBhvr>
-                                      <p:to>
-                                        <p:strVal val="visible"/>
-                                      </p:to>
-                                    </p:set>
-                                  </p:childTnLst>
-                                </p:cTn>
-                              </p:par>
-                            </p:childTnLst>
-                          </p:cTn>
-                        </p:par>
-                      </p:childTnLst>
-                    </p:cTn>
-                  </p:par>
-                  <p:par>
-                    <p:cTn id="11" fill="hold">
-                      <p:stCondLst>
-                        <p:cond delay="indefinite"/>
-                      </p:stCondLst>
-                      <p:childTnLst>
-                        <p:par>
-                          <p:cTn id="12" fill="hold">
-                            <p:stCondLst>
-                              <p:cond delay="0"/>
-                            </p:stCondLst>
-                            <p:childTnLst>
-                              <p:par>
-                                <p:cTn id="13" presetID="1" presetClass="entr" presetSubtype="0" fill="hold" nodeType="clickEffect">
-                                  <p:stCondLst>
-                                    <p:cond delay="0"/>
-                                  </p:stCondLst>
-                                  <p:childTnLst>
-                                    <p:set>
-                                      <p:cBhvr>
-                                        <p:cTn id="14" dur="1" fill="hold">
-                                          <p:stCondLst>
-                                            <p:cond delay="0"/>
-                                          </p:stCondLst>
-                                        </p:cTn>
-                                        <p:tgtEl>
-                                          <p:spTgt spid="3">
-                                            <p:txEl>
-                                              <p:pRg st="3" end="3"/>
-                                            </p:txEl>
-                                          </p:spTgt>
-                                        </p:tgtEl>
-                                        <p:attrNameLst>
-                                          <p:attrName>style.visibility</p:attrName>
-                                        </p:attrNameLst>
-                                      </p:cBhvr>
-                                      <p:to>
-                                        <p:strVal val="visible"/>
-                                      </p:to>
-                                    </p:set>
-                                  </p:childTnLst>
-                                </p:cTn>
-                              </p:par>
-                            </p:childTnLst>
-                          </p:cTn>
-                        </p:par>
-                      </p:childTnLst>
-                    </p:cTn>
-                  </p:par>
-                  <p:par>
-                    <p:cTn id="15" fill="hold">
-                      <p:stCondLst>
-                        <p:cond delay="indefinite"/>
-                      </p:stCondLst>
-                      <p:childTnLst>
-                        <p:par>
-                          <p:cTn id="16" fill="hold">
-                            <p:stCondLst>
-                              <p:cond delay="0"/>
-                            </p:stCondLst>
-                            <p:childTnLst>
-                              <p:par>
-                                <p:cTn id="17" presetID="1" presetClass="entr" presetSubtype="0" fill="hold" nodeType="clickEffect">
-                                  <p:stCondLst>
-                                    <p:cond delay="0"/>
-                                  </p:stCondLst>
-                                  <p:childTnLst>
-                                    <p:set>
-                                      <p:cBhvr>
-                                        <p:cTn id="18" dur="1" fill="hold">
-                                          <p:stCondLst>
-                                            <p:cond delay="0"/>
-                                          </p:stCondLst>
-                                        </p:cTn>
-                                        <p:tgtEl>
-                                          <p:spTgt spid="3">
-                                            <p:txEl>
-                                              <p:pRg st="4" end="4"/>
-                                            </p:txEl>
-                                          </p:spTgt>
-                                        </p:tgtEl>
-                                        <p:attrNameLst>
-                                          <p:attrName>style.visibility</p:attrName>
-                                        </p:attrNameLst>
-                                      </p:cBhvr>
-                                      <p:to>
-                                        <p:strVal val="visible"/>
-                                      </p:to>
-                                    </p:set>
-                                  </p:childTnLst>
-                                </p:cTn>
-                              </p:par>
-                            </p:childTnLst>
-                          </p:cTn>
-                        </p:par>
-                      </p:childTnLst>
-                    </p:cTn>
-                  </p:par>
-                  <p:par>
-                    <p:cTn id="19" fill="hold">
-                      <p:stCondLst>
-                        <p:cond delay="indefinite"/>
-                      </p:stCondLst>
-                      <p:childTnLst>
-                        <p:par>
-                          <p:cTn id="20" fill="hold">
-                            <p:stCondLst>
-                              <p:cond delay="0"/>
-                            </p:stCondLst>
-                            <p:childTnLst>
-                              <p:par>
-                                <p:cTn id="21" presetID="1" presetClass="entr" presetSubtype="0" fill="hold" nodeType="clickEffect">
-                                  <p:stCondLst>
-                                    <p:cond delay="0"/>
-                                  </p:stCondLst>
-                                  <p:childTnLst>
-                                    <p:set>
-                                      <p:cBhvr>
-                                        <p:cTn id="22" dur="1" fill="hold">
-                                          <p:stCondLst>
-                                            <p:cond delay="0"/>
-                                          </p:stCondLst>
-                                        </p:cTn>
-                                        <p:tgtEl>
-                                          <p:spTgt spid="3">
-                                            <p:txEl>
-                                              <p:pRg st="5" end="5"/>
-                                            </p:txEl>
-                                          </p:spTgt>
-                                        </p:tgtEl>
-                                        <p:attrNameLst>
-                                          <p:attrName>style.visibility</p:attrName>
-                                        </p:attrNameLst>
-                                      </p:cBhvr>
-                                      <p:to>
-                                        <p:strVal val="visible"/>
-                                      </p:to>
-                                    </p:set>
-                                  </p:childTnLst>
-                                </p:cTn>
-                              </p:par>
-                            </p:childTnLst>
-                          </p:cTn>
-                        </p:par>
-                      </p:childTnLst>
-                    </p:cTn>
-                  </p:par>
-                </p:childTnLst>
-              </p:cTn>
-              <p:prevCondLst>
-                <p:cond evt="onPrev" delay="0">
-                  <p:tgtEl>
-                    <p:sldTgt/>
-                  </p:tgtEl>
-                </p:cond>
-              </p:prevCondLst>
-              <p:nextCondLst>
-                <p:cond evt="onNext" delay="0">
-                  <p:tgtEl>
-                    <p:sldTgt/>
-                  </p:tgtEl>
-                </p:cond>
-              </p:nextCondLst>
-            </p:seq>
-          </p:childTnLst>
-        </p:cTn>
-      </p:par>
-    </p:tnLst>
-  </p:timing>
 </p:sld>
 </file>
 
-<file path=ppt/slides/slide36.xml><?xml version="1.0" encoding="utf-8"?>
+<file path=ppt/slides/slide37.xml><?xml version="1.0" encoding="utf-8"?>
 <p:sld xmlns:a="http://schemas.openxmlformats.org/drawingml/2006/main" xmlns:r="http://schemas.openxmlformats.org/officeDocument/2006/relationships" xmlns:p="http://schemas.openxmlformats.org/presentationml/2006/main">
   <p:cSld>
     <p:spTree>
@@ -32475,7 +32614,7 @@
 </p:sld>
 </file>
 
-<file path=ppt/slides/slide37.xml><?xml version="1.0" encoding="utf-8"?>
+<file path=ppt/slides/slide38.xml><?xml version="1.0" encoding="utf-8"?>
 <p:sld xmlns:a="http://schemas.openxmlformats.org/drawingml/2006/main" xmlns:r="http://schemas.openxmlformats.org/officeDocument/2006/relationships" xmlns:p="http://schemas.openxmlformats.org/presentationml/2006/main">
   <p:cSld>
     <p:spTree>
@@ -32992,7 +33131,7 @@
 </p:sld>
 </file>
 
-<file path=ppt/slides/slide38.xml><?xml version="1.0" encoding="utf-8"?>
+<file path=ppt/slides/slide39.xml><?xml version="1.0" encoding="utf-8"?>
 <p:sld xmlns:a="http://schemas.openxmlformats.org/drawingml/2006/main" xmlns:r="http://schemas.openxmlformats.org/officeDocument/2006/relationships" xmlns:p="http://schemas.openxmlformats.org/presentationml/2006/main">
   <p:cSld>
     <p:spTree>
@@ -33382,384 +33521,6 @@
                                         </p:cTn>
                                         <p:tgtEl>
                                           <p:spTgt spid="8"/>
-                                        </p:tgtEl>
-                                        <p:attrNameLst>
-                                          <p:attrName>style.visibility</p:attrName>
-                                        </p:attrNameLst>
-                                      </p:cBhvr>
-                                      <p:to>
-                                        <p:strVal val="visible"/>
-                                      </p:to>
-                                    </p:set>
-                                  </p:childTnLst>
-                                </p:cTn>
-                              </p:par>
-                            </p:childTnLst>
-                          </p:cTn>
-                        </p:par>
-                      </p:childTnLst>
-                    </p:cTn>
-                  </p:par>
-                </p:childTnLst>
-              </p:cTn>
-              <p:prevCondLst>
-                <p:cond evt="onPrev" delay="0">
-                  <p:tgtEl>
-                    <p:sldTgt/>
-                  </p:tgtEl>
-                </p:cond>
-              </p:prevCondLst>
-              <p:nextCondLst>
-                <p:cond evt="onNext" delay="0">
-                  <p:tgtEl>
-                    <p:sldTgt/>
-                  </p:tgtEl>
-                </p:cond>
-              </p:nextCondLst>
-            </p:seq>
-          </p:childTnLst>
-        </p:cTn>
-      </p:par>
-    </p:tnLst>
-  </p:timing>
-</p:sld>
-</file>
-
-<file path=ppt/slides/slide39.xml><?xml version="1.0" encoding="utf-8"?>
-<p:sld xmlns:a="http://schemas.openxmlformats.org/drawingml/2006/main" xmlns:r="http://schemas.openxmlformats.org/officeDocument/2006/relationships" xmlns:p="http://schemas.openxmlformats.org/presentationml/2006/main">
-  <p:cSld>
-    <p:spTree>
-      <p:nvGrpSpPr>
-        <p:cNvPr id="1" name=""/>
-        <p:cNvGrpSpPr/>
-        <p:nvPr/>
-      </p:nvGrpSpPr>
-      <p:grpSpPr>
-        <a:xfrm>
-          <a:off x="0" y="0"/>
-          <a:ext cx="0" cy="0"/>
-          <a:chOff x="0" y="0"/>
-          <a:chExt cx="0" cy="0"/>
-        </a:xfrm>
-      </p:grpSpPr>
-      <p:sp>
-        <p:nvSpPr>
-          <p:cNvPr id="3" name="Content Placeholder 2">
-            <a:extLst>
-              <a:ext uri="{FF2B5EF4-FFF2-40B4-BE49-F238E27FC236}">
-                <a16:creationId xmlns:a16="http://schemas.microsoft.com/office/drawing/2014/main" id="{258E6AF3-7615-4BD1-878E-A94C93E98F90}"/>
-              </a:ext>
-            </a:extLst>
-          </p:cNvPr>
-          <p:cNvSpPr>
-            <a:spLocks noGrp="1"/>
-          </p:cNvSpPr>
-          <p:nvPr>
-            <p:ph idx="1"/>
-          </p:nvPr>
-        </p:nvSpPr>
-        <p:spPr>
-          <a:xfrm>
-            <a:off x="640237" y="1154757"/>
-            <a:ext cx="5128967" cy="5436747"/>
-          </a:xfrm>
-        </p:spPr>
-        <p:txBody>
-          <a:bodyPr>
-            <a:normAutofit/>
-          </a:bodyPr>
-          <a:lstStyle/>
-          <a:p>
-            <a:pPr marL="0" indent="0">
-              <a:buNone/>
-            </a:pPr>
-            <a:r>
-              <a:rPr lang="en-US" dirty="0"/>
-              <a:t>Correlations alone can be misleading</a:t>
-            </a:r>
-          </a:p>
-          <a:p>
-            <a:r>
-              <a:rPr lang="en-US" dirty="0"/>
-              <a:t>Log of GDP is also a good predictor of  winning Nobel prizes    </a:t>
-            </a:r>
-          </a:p>
-          <a:p>
-            <a:r>
-              <a:rPr lang="en-US" dirty="0"/>
-              <a:t>And with a high correlation</a:t>
-            </a:r>
-          </a:p>
-        </p:txBody>
-      </p:sp>
-      <p:sp>
-        <p:nvSpPr>
-          <p:cNvPr id="6" name="Title 1">
-            <a:extLst>
-              <a:ext uri="{FF2B5EF4-FFF2-40B4-BE49-F238E27FC236}">
-                <a16:creationId xmlns:a16="http://schemas.microsoft.com/office/drawing/2014/main" id="{CD29F70F-B868-451B-A65D-8721F4C7A2D9}"/>
-              </a:ext>
-            </a:extLst>
-          </p:cNvPr>
-          <p:cNvSpPr txBox="1">
-            <a:spLocks/>
-          </p:cNvSpPr>
-          <p:nvPr/>
-        </p:nvSpPr>
-        <p:spPr>
-          <a:xfrm>
-            <a:off x="838200" y="-635"/>
-            <a:ext cx="10515600" cy="1325563"/>
-          </a:xfrm>
-          <a:prstGeom prst="rect">
-            <a:avLst/>
-          </a:prstGeom>
-        </p:spPr>
-        <p:txBody>
-          <a:bodyPr vert="horz" lIns="91440" tIns="45720" rIns="91440" bIns="45720" rtlCol="0" anchor="ctr">
-            <a:normAutofit/>
-          </a:bodyPr>
-          <a:lstStyle>
-            <a:lvl1pPr algn="l" defTabSz="914400" rtl="0" eaLnBrk="1" latinLnBrk="0" hangingPunct="1">
-              <a:lnSpc>
-                <a:spcPct val="90000"/>
-              </a:lnSpc>
-              <a:spcBef>
-                <a:spcPct val="0"/>
-              </a:spcBef>
-              <a:buNone/>
-              <a:defRPr sz="4400" kern="1200">
-                <a:solidFill>
-                  <a:schemeClr val="tx1"/>
-                </a:solidFill>
-                <a:latin typeface="+mj-lt"/>
-                <a:ea typeface="+mj-ea"/>
-                <a:cs typeface="+mj-cs"/>
-              </a:defRPr>
-            </a:lvl1pPr>
-          </a:lstStyle>
-          <a:p>
-            <a:r>
-              <a:rPr lang="en-US" dirty="0">
-                <a:latin typeface="+mn-lt"/>
-              </a:rPr>
-              <a:t>Pitfalls of Data Mining </a:t>
-            </a:r>
-          </a:p>
-        </p:txBody>
-      </p:sp>
-      <p:pic>
-        <p:nvPicPr>
-          <p:cNvPr id="4" name="Picture 3">
-            <a:extLst>
-              <a:ext uri="{FF2B5EF4-FFF2-40B4-BE49-F238E27FC236}">
-                <a16:creationId xmlns:a16="http://schemas.microsoft.com/office/drawing/2014/main" id="{F84BEE28-3651-C39F-DB99-013247C132EC}"/>
-              </a:ext>
-            </a:extLst>
-          </p:cNvPr>
-          <p:cNvPicPr>
-            <a:picLocks noChangeAspect="1"/>
-          </p:cNvPicPr>
-          <p:nvPr/>
-        </p:nvPicPr>
-        <p:blipFill>
-          <a:blip r:embed="rId2"/>
-          <a:stretch>
-            <a:fillRect/>
-          </a:stretch>
-        </p:blipFill>
-        <p:spPr>
-          <a:xfrm>
-            <a:off x="5820426" y="1036948"/>
-            <a:ext cx="6210253" cy="5476973"/>
-          </a:xfrm>
-          <a:prstGeom prst="rect">
-            <a:avLst/>
-          </a:prstGeom>
-        </p:spPr>
-      </p:pic>
-      <p:pic>
-        <p:nvPicPr>
-          <p:cNvPr id="9" name="Picture 8">
-            <a:extLst>
-              <a:ext uri="{FF2B5EF4-FFF2-40B4-BE49-F238E27FC236}">
-                <a16:creationId xmlns:a16="http://schemas.microsoft.com/office/drawing/2014/main" id="{457DC88A-6B3E-6B20-44EA-5D2B0F437810}"/>
-              </a:ext>
-            </a:extLst>
-          </p:cNvPr>
-          <p:cNvPicPr>
-            <a:picLocks noChangeAspect="1"/>
-          </p:cNvPicPr>
-          <p:nvPr/>
-        </p:nvPicPr>
-        <p:blipFill>
-          <a:blip r:embed="rId3"/>
-          <a:stretch>
-            <a:fillRect/>
-          </a:stretch>
-        </p:blipFill>
-        <p:spPr>
-          <a:xfrm>
-            <a:off x="7390615" y="5076772"/>
-            <a:ext cx="4582760" cy="838548"/>
-          </a:xfrm>
-          <a:prstGeom prst="rect">
-            <a:avLst/>
-          </a:prstGeom>
-        </p:spPr>
-      </p:pic>
-    </p:spTree>
-    <p:extLst>
-      <p:ext uri="{BB962C8B-B14F-4D97-AF65-F5344CB8AC3E}">
-        <p14:creationId xmlns:p14="http://schemas.microsoft.com/office/powerpoint/2010/main" val="277908670"/>
-      </p:ext>
-    </p:extLst>
-  </p:cSld>
-  <p:clrMapOvr>
-    <a:masterClrMapping/>
-  </p:clrMapOvr>
-  <p:timing>
-    <p:tnLst>
-      <p:par>
-        <p:cTn id="1" dur="indefinite" restart="never" nodeType="tmRoot">
-          <p:childTnLst>
-            <p:seq concurrent="1" nextAc="seek">
-              <p:cTn id="2" dur="indefinite" nodeType="mainSeq">
-                <p:childTnLst>
-                  <p:par>
-                    <p:cTn id="3" fill="hold">
-                      <p:stCondLst>
-                        <p:cond delay="indefinite"/>
-                      </p:stCondLst>
-                      <p:childTnLst>
-                        <p:par>
-                          <p:cTn id="4" fill="hold">
-                            <p:stCondLst>
-                              <p:cond delay="0"/>
-                            </p:stCondLst>
-                            <p:childTnLst>
-                              <p:par>
-                                <p:cTn id="5" presetID="1" presetClass="entr" presetSubtype="0" fill="hold" nodeType="clickEffect">
-                                  <p:stCondLst>
-                                    <p:cond delay="0"/>
-                                  </p:stCondLst>
-                                  <p:childTnLst>
-                                    <p:set>
-                                      <p:cBhvr>
-                                        <p:cTn id="6" dur="1" fill="hold">
-                                          <p:stCondLst>
-                                            <p:cond delay="0"/>
-                                          </p:stCondLst>
-                                        </p:cTn>
-                                        <p:tgtEl>
-                                          <p:spTgt spid="3">
-                                            <p:txEl>
-                                              <p:pRg st="1" end="1"/>
-                                            </p:txEl>
-                                          </p:spTgt>
-                                        </p:tgtEl>
-                                        <p:attrNameLst>
-                                          <p:attrName>style.visibility</p:attrName>
-                                        </p:attrNameLst>
-                                      </p:cBhvr>
-                                      <p:to>
-                                        <p:strVal val="visible"/>
-                                      </p:to>
-                                    </p:set>
-                                  </p:childTnLst>
-                                </p:cTn>
-                              </p:par>
-                              <p:par>
-                                <p:cTn id="7" presetID="1" presetClass="entr" presetSubtype="0" fill="hold" nodeType="withEffect">
-                                  <p:stCondLst>
-                                    <p:cond delay="0"/>
-                                  </p:stCondLst>
-                                  <p:childTnLst>
-                                    <p:set>
-                                      <p:cBhvr>
-                                        <p:cTn id="8" dur="1" fill="hold">
-                                          <p:stCondLst>
-                                            <p:cond delay="0"/>
-                                          </p:stCondLst>
-                                        </p:cTn>
-                                        <p:tgtEl>
-                                          <p:spTgt spid="4"/>
-                                        </p:tgtEl>
-                                        <p:attrNameLst>
-                                          <p:attrName>style.visibility</p:attrName>
-                                        </p:attrNameLst>
-                                      </p:cBhvr>
-                                      <p:to>
-                                        <p:strVal val="visible"/>
-                                      </p:to>
-                                    </p:set>
-                                  </p:childTnLst>
-                                </p:cTn>
-                              </p:par>
-                            </p:childTnLst>
-                          </p:cTn>
-                        </p:par>
-                      </p:childTnLst>
-                    </p:cTn>
-                  </p:par>
-                  <p:par>
-                    <p:cTn id="9" fill="hold">
-                      <p:stCondLst>
-                        <p:cond delay="indefinite"/>
-                      </p:stCondLst>
-                      <p:childTnLst>
-                        <p:par>
-                          <p:cTn id="10" fill="hold">
-                            <p:stCondLst>
-                              <p:cond delay="0"/>
-                            </p:stCondLst>
-                            <p:childTnLst>
-                              <p:par>
-                                <p:cTn id="11" presetID="1" presetClass="entr" presetSubtype="0" fill="hold" nodeType="clickEffect">
-                                  <p:stCondLst>
-                                    <p:cond delay="0"/>
-                                  </p:stCondLst>
-                                  <p:childTnLst>
-                                    <p:set>
-                                      <p:cBhvr>
-                                        <p:cTn id="12" dur="1" fill="hold">
-                                          <p:stCondLst>
-                                            <p:cond delay="0"/>
-                                          </p:stCondLst>
-                                        </p:cTn>
-                                        <p:tgtEl>
-                                          <p:spTgt spid="3">
-                                            <p:txEl>
-                                              <p:pRg st="2" end="2"/>
-                                            </p:txEl>
-                                          </p:spTgt>
-                                        </p:tgtEl>
-                                        <p:attrNameLst>
-                                          <p:attrName>style.visibility</p:attrName>
-                                        </p:attrNameLst>
-                                      </p:cBhvr>
-                                      <p:to>
-                                        <p:strVal val="visible"/>
-                                      </p:to>
-                                    </p:set>
-                                  </p:childTnLst>
-                                </p:cTn>
-                              </p:par>
-                              <p:par>
-                                <p:cTn id="13" presetID="1" presetClass="entr" presetSubtype="0" fill="hold" nodeType="withEffect">
-                                  <p:stCondLst>
-                                    <p:cond delay="0"/>
-                                  </p:stCondLst>
-                                  <p:childTnLst>
-                                    <p:set>
-                                      <p:cBhvr>
-                                        <p:cTn id="14" dur="1" fill="hold">
-                                          <p:stCondLst>
-                                            <p:cond delay="0"/>
-                                          </p:stCondLst>
-                                        </p:cTn>
-                                        <p:tgtEl>
-                                          <p:spTgt spid="9"/>
                                         </p:tgtEl>
                                         <p:attrNameLst>
                                           <p:attrName>style.visibility</p:attrName>
@@ -34469,6 +34230,384 @@
           <a:p>
             <a:r>
               <a:rPr lang="en-US" dirty="0"/>
+              <a:t>Log of GDP is also a good predictor of  winning Nobel prizes    </a:t>
+            </a:r>
+          </a:p>
+          <a:p>
+            <a:r>
+              <a:rPr lang="en-US" dirty="0"/>
+              <a:t>And with a high correlation</a:t>
+            </a:r>
+          </a:p>
+        </p:txBody>
+      </p:sp>
+      <p:sp>
+        <p:nvSpPr>
+          <p:cNvPr id="6" name="Title 1">
+            <a:extLst>
+              <a:ext uri="{FF2B5EF4-FFF2-40B4-BE49-F238E27FC236}">
+                <a16:creationId xmlns:a16="http://schemas.microsoft.com/office/drawing/2014/main" id="{CD29F70F-B868-451B-A65D-8721F4C7A2D9}"/>
+              </a:ext>
+            </a:extLst>
+          </p:cNvPr>
+          <p:cNvSpPr txBox="1">
+            <a:spLocks/>
+          </p:cNvSpPr>
+          <p:nvPr/>
+        </p:nvSpPr>
+        <p:spPr>
+          <a:xfrm>
+            <a:off x="838200" y="-635"/>
+            <a:ext cx="10515600" cy="1325563"/>
+          </a:xfrm>
+          <a:prstGeom prst="rect">
+            <a:avLst/>
+          </a:prstGeom>
+        </p:spPr>
+        <p:txBody>
+          <a:bodyPr vert="horz" lIns="91440" tIns="45720" rIns="91440" bIns="45720" rtlCol="0" anchor="ctr">
+            <a:normAutofit/>
+          </a:bodyPr>
+          <a:lstStyle>
+            <a:lvl1pPr algn="l" defTabSz="914400" rtl="0" eaLnBrk="1" latinLnBrk="0" hangingPunct="1">
+              <a:lnSpc>
+                <a:spcPct val="90000"/>
+              </a:lnSpc>
+              <a:spcBef>
+                <a:spcPct val="0"/>
+              </a:spcBef>
+              <a:buNone/>
+              <a:defRPr sz="4400" kern="1200">
+                <a:solidFill>
+                  <a:schemeClr val="tx1"/>
+                </a:solidFill>
+                <a:latin typeface="+mj-lt"/>
+                <a:ea typeface="+mj-ea"/>
+                <a:cs typeface="+mj-cs"/>
+              </a:defRPr>
+            </a:lvl1pPr>
+          </a:lstStyle>
+          <a:p>
+            <a:r>
+              <a:rPr lang="en-US" dirty="0">
+                <a:latin typeface="+mn-lt"/>
+              </a:rPr>
+              <a:t>Pitfalls of Data Mining </a:t>
+            </a:r>
+          </a:p>
+        </p:txBody>
+      </p:sp>
+      <p:pic>
+        <p:nvPicPr>
+          <p:cNvPr id="4" name="Picture 3">
+            <a:extLst>
+              <a:ext uri="{FF2B5EF4-FFF2-40B4-BE49-F238E27FC236}">
+                <a16:creationId xmlns:a16="http://schemas.microsoft.com/office/drawing/2014/main" id="{F84BEE28-3651-C39F-DB99-013247C132EC}"/>
+              </a:ext>
+            </a:extLst>
+          </p:cNvPr>
+          <p:cNvPicPr>
+            <a:picLocks noChangeAspect="1"/>
+          </p:cNvPicPr>
+          <p:nvPr/>
+        </p:nvPicPr>
+        <p:blipFill>
+          <a:blip r:embed="rId2"/>
+          <a:stretch>
+            <a:fillRect/>
+          </a:stretch>
+        </p:blipFill>
+        <p:spPr>
+          <a:xfrm>
+            <a:off x="5820426" y="1036948"/>
+            <a:ext cx="6210253" cy="5476973"/>
+          </a:xfrm>
+          <a:prstGeom prst="rect">
+            <a:avLst/>
+          </a:prstGeom>
+        </p:spPr>
+      </p:pic>
+      <p:pic>
+        <p:nvPicPr>
+          <p:cNvPr id="9" name="Picture 8">
+            <a:extLst>
+              <a:ext uri="{FF2B5EF4-FFF2-40B4-BE49-F238E27FC236}">
+                <a16:creationId xmlns:a16="http://schemas.microsoft.com/office/drawing/2014/main" id="{457DC88A-6B3E-6B20-44EA-5D2B0F437810}"/>
+              </a:ext>
+            </a:extLst>
+          </p:cNvPr>
+          <p:cNvPicPr>
+            <a:picLocks noChangeAspect="1"/>
+          </p:cNvPicPr>
+          <p:nvPr/>
+        </p:nvPicPr>
+        <p:blipFill>
+          <a:blip r:embed="rId3"/>
+          <a:stretch>
+            <a:fillRect/>
+          </a:stretch>
+        </p:blipFill>
+        <p:spPr>
+          <a:xfrm>
+            <a:off x="7390615" y="5076772"/>
+            <a:ext cx="4582760" cy="838548"/>
+          </a:xfrm>
+          <a:prstGeom prst="rect">
+            <a:avLst/>
+          </a:prstGeom>
+        </p:spPr>
+      </p:pic>
+    </p:spTree>
+    <p:extLst>
+      <p:ext uri="{BB962C8B-B14F-4D97-AF65-F5344CB8AC3E}">
+        <p14:creationId xmlns:p14="http://schemas.microsoft.com/office/powerpoint/2010/main" val="277908670"/>
+      </p:ext>
+    </p:extLst>
+  </p:cSld>
+  <p:clrMapOvr>
+    <a:masterClrMapping/>
+  </p:clrMapOvr>
+  <p:timing>
+    <p:tnLst>
+      <p:par>
+        <p:cTn id="1" dur="indefinite" restart="never" nodeType="tmRoot">
+          <p:childTnLst>
+            <p:seq concurrent="1" nextAc="seek">
+              <p:cTn id="2" dur="indefinite" nodeType="mainSeq">
+                <p:childTnLst>
+                  <p:par>
+                    <p:cTn id="3" fill="hold">
+                      <p:stCondLst>
+                        <p:cond delay="indefinite"/>
+                      </p:stCondLst>
+                      <p:childTnLst>
+                        <p:par>
+                          <p:cTn id="4" fill="hold">
+                            <p:stCondLst>
+                              <p:cond delay="0"/>
+                            </p:stCondLst>
+                            <p:childTnLst>
+                              <p:par>
+                                <p:cTn id="5" presetID="1" presetClass="entr" presetSubtype="0" fill="hold" nodeType="clickEffect">
+                                  <p:stCondLst>
+                                    <p:cond delay="0"/>
+                                  </p:stCondLst>
+                                  <p:childTnLst>
+                                    <p:set>
+                                      <p:cBhvr>
+                                        <p:cTn id="6" dur="1" fill="hold">
+                                          <p:stCondLst>
+                                            <p:cond delay="0"/>
+                                          </p:stCondLst>
+                                        </p:cTn>
+                                        <p:tgtEl>
+                                          <p:spTgt spid="3">
+                                            <p:txEl>
+                                              <p:pRg st="1" end="1"/>
+                                            </p:txEl>
+                                          </p:spTgt>
+                                        </p:tgtEl>
+                                        <p:attrNameLst>
+                                          <p:attrName>style.visibility</p:attrName>
+                                        </p:attrNameLst>
+                                      </p:cBhvr>
+                                      <p:to>
+                                        <p:strVal val="visible"/>
+                                      </p:to>
+                                    </p:set>
+                                  </p:childTnLst>
+                                </p:cTn>
+                              </p:par>
+                              <p:par>
+                                <p:cTn id="7" presetID="1" presetClass="entr" presetSubtype="0" fill="hold" nodeType="withEffect">
+                                  <p:stCondLst>
+                                    <p:cond delay="0"/>
+                                  </p:stCondLst>
+                                  <p:childTnLst>
+                                    <p:set>
+                                      <p:cBhvr>
+                                        <p:cTn id="8" dur="1" fill="hold">
+                                          <p:stCondLst>
+                                            <p:cond delay="0"/>
+                                          </p:stCondLst>
+                                        </p:cTn>
+                                        <p:tgtEl>
+                                          <p:spTgt spid="4"/>
+                                        </p:tgtEl>
+                                        <p:attrNameLst>
+                                          <p:attrName>style.visibility</p:attrName>
+                                        </p:attrNameLst>
+                                      </p:cBhvr>
+                                      <p:to>
+                                        <p:strVal val="visible"/>
+                                      </p:to>
+                                    </p:set>
+                                  </p:childTnLst>
+                                </p:cTn>
+                              </p:par>
+                            </p:childTnLst>
+                          </p:cTn>
+                        </p:par>
+                      </p:childTnLst>
+                    </p:cTn>
+                  </p:par>
+                  <p:par>
+                    <p:cTn id="9" fill="hold">
+                      <p:stCondLst>
+                        <p:cond delay="indefinite"/>
+                      </p:stCondLst>
+                      <p:childTnLst>
+                        <p:par>
+                          <p:cTn id="10" fill="hold">
+                            <p:stCondLst>
+                              <p:cond delay="0"/>
+                            </p:stCondLst>
+                            <p:childTnLst>
+                              <p:par>
+                                <p:cTn id="11" presetID="1" presetClass="entr" presetSubtype="0" fill="hold" nodeType="clickEffect">
+                                  <p:stCondLst>
+                                    <p:cond delay="0"/>
+                                  </p:stCondLst>
+                                  <p:childTnLst>
+                                    <p:set>
+                                      <p:cBhvr>
+                                        <p:cTn id="12" dur="1" fill="hold">
+                                          <p:stCondLst>
+                                            <p:cond delay="0"/>
+                                          </p:stCondLst>
+                                        </p:cTn>
+                                        <p:tgtEl>
+                                          <p:spTgt spid="3">
+                                            <p:txEl>
+                                              <p:pRg st="2" end="2"/>
+                                            </p:txEl>
+                                          </p:spTgt>
+                                        </p:tgtEl>
+                                        <p:attrNameLst>
+                                          <p:attrName>style.visibility</p:attrName>
+                                        </p:attrNameLst>
+                                      </p:cBhvr>
+                                      <p:to>
+                                        <p:strVal val="visible"/>
+                                      </p:to>
+                                    </p:set>
+                                  </p:childTnLst>
+                                </p:cTn>
+                              </p:par>
+                              <p:par>
+                                <p:cTn id="13" presetID="1" presetClass="entr" presetSubtype="0" fill="hold" nodeType="withEffect">
+                                  <p:stCondLst>
+                                    <p:cond delay="0"/>
+                                  </p:stCondLst>
+                                  <p:childTnLst>
+                                    <p:set>
+                                      <p:cBhvr>
+                                        <p:cTn id="14" dur="1" fill="hold">
+                                          <p:stCondLst>
+                                            <p:cond delay="0"/>
+                                          </p:stCondLst>
+                                        </p:cTn>
+                                        <p:tgtEl>
+                                          <p:spTgt spid="9"/>
+                                        </p:tgtEl>
+                                        <p:attrNameLst>
+                                          <p:attrName>style.visibility</p:attrName>
+                                        </p:attrNameLst>
+                                      </p:cBhvr>
+                                      <p:to>
+                                        <p:strVal val="visible"/>
+                                      </p:to>
+                                    </p:set>
+                                  </p:childTnLst>
+                                </p:cTn>
+                              </p:par>
+                            </p:childTnLst>
+                          </p:cTn>
+                        </p:par>
+                      </p:childTnLst>
+                    </p:cTn>
+                  </p:par>
+                </p:childTnLst>
+              </p:cTn>
+              <p:prevCondLst>
+                <p:cond evt="onPrev" delay="0">
+                  <p:tgtEl>
+                    <p:sldTgt/>
+                  </p:tgtEl>
+                </p:cond>
+              </p:prevCondLst>
+              <p:nextCondLst>
+                <p:cond evt="onNext" delay="0">
+                  <p:tgtEl>
+                    <p:sldTgt/>
+                  </p:tgtEl>
+                </p:cond>
+              </p:nextCondLst>
+            </p:seq>
+          </p:childTnLst>
+        </p:cTn>
+      </p:par>
+    </p:tnLst>
+  </p:timing>
+</p:sld>
+</file>
+
+<file path=ppt/slides/slide41.xml><?xml version="1.0" encoding="utf-8"?>
+<p:sld xmlns:a="http://schemas.openxmlformats.org/drawingml/2006/main" xmlns:r="http://schemas.openxmlformats.org/officeDocument/2006/relationships" xmlns:p="http://schemas.openxmlformats.org/presentationml/2006/main">
+  <p:cSld>
+    <p:spTree>
+      <p:nvGrpSpPr>
+        <p:cNvPr id="1" name=""/>
+        <p:cNvGrpSpPr/>
+        <p:nvPr/>
+      </p:nvGrpSpPr>
+      <p:grpSpPr>
+        <a:xfrm>
+          <a:off x="0" y="0"/>
+          <a:ext cx="0" cy="0"/>
+          <a:chOff x="0" y="0"/>
+          <a:chExt cx="0" cy="0"/>
+        </a:xfrm>
+      </p:grpSpPr>
+      <p:sp>
+        <p:nvSpPr>
+          <p:cNvPr id="3" name="Content Placeholder 2">
+            <a:extLst>
+              <a:ext uri="{FF2B5EF4-FFF2-40B4-BE49-F238E27FC236}">
+                <a16:creationId xmlns:a16="http://schemas.microsoft.com/office/drawing/2014/main" id="{258E6AF3-7615-4BD1-878E-A94C93E98F90}"/>
+              </a:ext>
+            </a:extLst>
+          </p:cNvPr>
+          <p:cNvSpPr>
+            <a:spLocks noGrp="1"/>
+          </p:cNvSpPr>
+          <p:nvPr>
+            <p:ph idx="1"/>
+          </p:nvPr>
+        </p:nvSpPr>
+        <p:spPr>
+          <a:xfrm>
+            <a:off x="640237" y="1154757"/>
+            <a:ext cx="5128967" cy="5436747"/>
+          </a:xfrm>
+        </p:spPr>
+        <p:txBody>
+          <a:bodyPr>
+            <a:normAutofit/>
+          </a:bodyPr>
+          <a:lstStyle/>
+          <a:p>
+            <a:pPr marL="0" indent="0">
+              <a:buNone/>
+            </a:pPr>
+            <a:r>
+              <a:rPr lang="en-US" dirty="0"/>
+              <a:t>Correlations alone can be misleading</a:t>
+            </a:r>
+          </a:p>
+          <a:p>
+            <a:r>
+              <a:rPr lang="en-US" dirty="0"/>
               <a:t>Log of GDP is also a good predictor of  chocolate consumption     </a:t>
             </a:r>
           </a:p>
@@ -34943,7 +35082,7 @@
 </p:sld>
 </file>
 
-<file path=ppt/slides/slide41.xml><?xml version="1.0" encoding="utf-8"?>
+<file path=ppt/slides/slide42.xml><?xml version="1.0" encoding="utf-8"?>
 <p:sld xmlns:a="http://schemas.openxmlformats.org/drawingml/2006/main" xmlns:r="http://schemas.openxmlformats.org/officeDocument/2006/relationships" xmlns:p="http://schemas.openxmlformats.org/presentationml/2006/main">
   <p:cSld>
     <p:spTree>
@@ -35655,7 +35794,7 @@
 </p:sld>
 </file>
 
-<file path=ppt/slides/slide42.xml><?xml version="1.0" encoding="utf-8"?>
+<file path=ppt/slides/slide43.xml><?xml version="1.0" encoding="utf-8"?>
 <p:sld xmlns:a="http://schemas.openxmlformats.org/drawingml/2006/main" xmlns:r="http://schemas.openxmlformats.org/officeDocument/2006/relationships" xmlns:p="http://schemas.openxmlformats.org/presentationml/2006/main">
   <p:cSld>
     <p:spTree>
@@ -36574,7 +36713,7 @@
 </p:sld>
 </file>
 
-<file path=ppt/slides/slide43.xml><?xml version="1.0" encoding="utf-8"?>
+<file path=ppt/slides/slide44.xml><?xml version="1.0" encoding="utf-8"?>
 <p:sld xmlns:a="http://schemas.openxmlformats.org/drawingml/2006/main" xmlns:r="http://schemas.openxmlformats.org/officeDocument/2006/relationships" xmlns:p="http://schemas.openxmlformats.org/presentationml/2006/main">
   <p:cSld>
     <p:spTree>
@@ -37777,7 +37916,7 @@
 </p:sld>
 </file>
 
-<file path=ppt/slides/slide44.xml><?xml version="1.0" encoding="utf-8"?>
+<file path=ppt/slides/slide45.xml><?xml version="1.0" encoding="utf-8"?>
 <p:sld xmlns:a="http://schemas.openxmlformats.org/drawingml/2006/main" xmlns:r="http://schemas.openxmlformats.org/officeDocument/2006/relationships" xmlns:p="http://schemas.openxmlformats.org/presentationml/2006/main">
   <p:cSld>
     <p:spTree>
@@ -38970,7 +39109,7 @@
 </p:sld>
 </file>
 
-<file path=ppt/slides/slide45.xml><?xml version="1.0" encoding="utf-8"?>
+<file path=ppt/slides/slide46.xml><?xml version="1.0" encoding="utf-8"?>
 <p:sld xmlns:a="http://schemas.openxmlformats.org/drawingml/2006/main" xmlns:r="http://schemas.openxmlformats.org/officeDocument/2006/relationships" xmlns:p="http://schemas.openxmlformats.org/presentationml/2006/main">
   <p:cSld>
     <p:spTree>
@@ -40861,6 +41000,13 @@
             </a:r>
           </a:p>
           <a:p>
+            <a:pPr lvl="1"/>
+            <a:r>
+              <a:rPr lang="en-US" dirty="0"/>
+              <a:t>Expect 7-8 assignments </a:t>
+            </a:r>
+          </a:p>
+          <a:p>
             <a:endParaRPr lang="en-US" b="1" dirty="0"/>
           </a:p>
         </p:txBody>
@@ -41262,6 +41408,55 @@
                                           <p:spTgt spid="3">
                                             <p:txEl>
                                               <p:pRg st="6" end="6"/>
+                                            </p:txEl>
+                                          </p:spTgt>
+                                        </p:tgtEl>
+                                        <p:attrNameLst>
+                                          <p:attrName>style.visibility</p:attrName>
+                                        </p:attrNameLst>
+                                      </p:cBhvr>
+                                      <p:to>
+                                        <p:strVal val="visible"/>
+                                      </p:to>
+                                    </p:set>
+                                  </p:childTnLst>
+                                </p:cTn>
+                              </p:par>
+                            </p:childTnLst>
+                          </p:cTn>
+                        </p:par>
+                      </p:childTnLst>
+                    </p:cTn>
+                  </p:par>
+                  <p:par>
+                    <p:cTn id="31" fill="hold">
+                      <p:stCondLst>
+                        <p:cond delay="indefinite"/>
+                      </p:stCondLst>
+                      <p:childTnLst>
+                        <p:par>
+                          <p:cTn id="32" fill="hold">
+                            <p:stCondLst>
+                              <p:cond delay="0"/>
+                            </p:stCondLst>
+                            <p:childTnLst>
+                              <p:par>
+                                <p:cTn id="33" presetID="1" presetClass="entr" presetSubtype="0" fill="hold" nodeType="clickEffect">
+                                  <p:stCondLst>
+                                    <p:cond delay="0"/>
+                                  </p:stCondLst>
+                                  <p:childTnLst>
+                                    <p:set>
+                                      <p:cBhvr>
+                                        <p:cTn id="34" dur="1" fill="hold">
+                                          <p:stCondLst>
+                                            <p:cond delay="0"/>
+                                          </p:stCondLst>
+                                        </p:cTn>
+                                        <p:tgtEl>
+                                          <p:spTgt spid="3">
+                                            <p:txEl>
+                                              <p:pRg st="7" end="7"/>
                                             </p:txEl>
                                           </p:spTgt>
                                         </p:tgtEl>

</xml_diff>

<commit_message>
Corrected and updated slides
</commit_message>
<xml_diff>
--- a/slides/1_Introduction.pptx
+++ b/slides/1_Introduction.pptx
@@ -17,9 +17,9 @@
     <p:sldId id="288" r:id="rId8"/>
     <p:sldId id="352" r:id="rId9"/>
     <p:sldId id="351" r:id="rId10"/>
-    <p:sldId id="381" r:id="rId11"/>
-    <p:sldId id="396" r:id="rId12"/>
-    <p:sldId id="355" r:id="rId13"/>
+    <p:sldId id="397" r:id="rId11"/>
+    <p:sldId id="381" r:id="rId12"/>
+    <p:sldId id="396" r:id="rId13"/>
     <p:sldId id="388" r:id="rId14"/>
     <p:sldId id="395" r:id="rId15"/>
     <p:sldId id="387" r:id="rId16"/>
@@ -242,7 +242,7 @@
           <a:p>
             <a:fld id="{2F3ABF1A-8818-4472-8518-E71DC7B5D2F7}" type="datetimeFigureOut">
               <a:rPr lang="en-US" smtClean="0"/>
-              <a:t>6/22/2022</a:t>
+              <a:t>1/22/2023</a:t>
             </a:fld>
             <a:endParaRPr lang="en-US"/>
           </a:p>
@@ -1088,7 +1088,7 @@
           <a:p>
             <a:fld id="{6E4A31BF-7266-4BEB-918B-ADC21C630A6F}" type="datetimeFigureOut">
               <a:rPr lang="en-US" smtClean="0"/>
-              <a:t>6/22/2022</a:t>
+              <a:t>1/22/2023</a:t>
             </a:fld>
             <a:endParaRPr lang="en-US"/>
           </a:p>
@@ -1286,7 +1286,7 @@
           <a:p>
             <a:fld id="{6E4A31BF-7266-4BEB-918B-ADC21C630A6F}" type="datetimeFigureOut">
               <a:rPr lang="en-US" smtClean="0"/>
-              <a:t>6/22/2022</a:t>
+              <a:t>1/22/2023</a:t>
             </a:fld>
             <a:endParaRPr lang="en-US"/>
           </a:p>
@@ -1494,7 +1494,7 @@
           <a:p>
             <a:fld id="{6E4A31BF-7266-4BEB-918B-ADC21C630A6F}" type="datetimeFigureOut">
               <a:rPr lang="en-US" smtClean="0"/>
-              <a:t>6/22/2022</a:t>
+              <a:t>1/22/2023</a:t>
             </a:fld>
             <a:endParaRPr lang="en-US"/>
           </a:p>
@@ -1692,7 +1692,7 @@
           <a:p>
             <a:fld id="{6E4A31BF-7266-4BEB-918B-ADC21C630A6F}" type="datetimeFigureOut">
               <a:rPr lang="en-US" smtClean="0"/>
-              <a:t>6/22/2022</a:t>
+              <a:t>1/22/2023</a:t>
             </a:fld>
             <a:endParaRPr lang="en-US"/>
           </a:p>
@@ -1967,7 +1967,7 @@
           <a:p>
             <a:fld id="{6E4A31BF-7266-4BEB-918B-ADC21C630A6F}" type="datetimeFigureOut">
               <a:rPr lang="en-US" smtClean="0"/>
-              <a:t>6/22/2022</a:t>
+              <a:t>1/22/2023</a:t>
             </a:fld>
             <a:endParaRPr lang="en-US"/>
           </a:p>
@@ -2232,7 +2232,7 @@
           <a:p>
             <a:fld id="{6E4A31BF-7266-4BEB-918B-ADC21C630A6F}" type="datetimeFigureOut">
               <a:rPr lang="en-US" smtClean="0"/>
-              <a:t>6/22/2022</a:t>
+              <a:t>1/22/2023</a:t>
             </a:fld>
             <a:endParaRPr lang="en-US"/>
           </a:p>
@@ -2644,7 +2644,7 @@
           <a:p>
             <a:fld id="{6E4A31BF-7266-4BEB-918B-ADC21C630A6F}" type="datetimeFigureOut">
               <a:rPr lang="en-US" smtClean="0"/>
-              <a:t>6/22/2022</a:t>
+              <a:t>1/22/2023</a:t>
             </a:fld>
             <a:endParaRPr lang="en-US"/>
           </a:p>
@@ -2785,7 +2785,7 @@
           <a:p>
             <a:fld id="{6E4A31BF-7266-4BEB-918B-ADC21C630A6F}" type="datetimeFigureOut">
               <a:rPr lang="en-US" smtClean="0"/>
-              <a:t>6/22/2022</a:t>
+              <a:t>1/22/2023</a:t>
             </a:fld>
             <a:endParaRPr lang="en-US"/>
           </a:p>
@@ -2898,7 +2898,7 @@
           <a:p>
             <a:fld id="{6E4A31BF-7266-4BEB-918B-ADC21C630A6F}" type="datetimeFigureOut">
               <a:rPr lang="en-US" smtClean="0"/>
-              <a:t>6/22/2022</a:t>
+              <a:t>1/22/2023</a:t>
             </a:fld>
             <a:endParaRPr lang="en-US"/>
           </a:p>
@@ -3209,7 +3209,7 @@
           <a:p>
             <a:fld id="{6E4A31BF-7266-4BEB-918B-ADC21C630A6F}" type="datetimeFigureOut">
               <a:rPr lang="en-US" smtClean="0"/>
-              <a:t>6/22/2022</a:t>
+              <a:t>1/22/2023</a:t>
             </a:fld>
             <a:endParaRPr lang="en-US"/>
           </a:p>
@@ -3497,7 +3497,7 @@
           <a:p>
             <a:fld id="{6E4A31BF-7266-4BEB-918B-ADC21C630A6F}" type="datetimeFigureOut">
               <a:rPr lang="en-US" smtClean="0"/>
-              <a:t>6/22/2022</a:t>
+              <a:t>1/22/2023</a:t>
             </a:fld>
             <a:endParaRPr lang="en-US"/>
           </a:p>
@@ -3738,7 +3738,7 @@
           <a:p>
             <a:fld id="{6E4A31BF-7266-4BEB-918B-ADC21C630A6F}" type="datetimeFigureOut">
               <a:rPr lang="en-US" smtClean="0"/>
-              <a:t>6/22/2022</a:t>
+              <a:t>1/22/2023</a:t>
             </a:fld>
             <a:endParaRPr lang="en-US"/>
           </a:p>
@@ -4187,7 +4187,7 @@
               <a:rPr lang="en-US" dirty="0">
                 <a:latin typeface="+mn-lt"/>
               </a:rPr>
-              <a:t>CSCI E-96</a:t>
+              <a:t>CSCI E-108</a:t>
             </a:r>
             <a:br>
               <a:rPr lang="en-US" dirty="0">
@@ -4327,12 +4327,8 @@
           <a:p>
             <a:pPr algn="ctr"/>
             <a:r>
-              <a:rPr lang="en-US" sz="1100"/>
-              <a:t>Copyright 2021, 2022, </a:t>
-            </a:r>
-            <a:r>
               <a:rPr lang="en-US" sz="1100" dirty="0"/>
-              <a:t>Stephen F Elston. All rights reserved</a:t>
+              <a:t>Copyright 2021, 2022, 2023, Stephen F Elston. All rights reserved</a:t>
             </a:r>
             <a:r>
               <a:rPr lang="en-US" dirty="0"/>
@@ -4355,6 +4351,728 @@
 </file>
 
 <file path=ppt/slides/slide10.xml><?xml version="1.0" encoding="utf-8"?>
+<p:sld xmlns:a="http://schemas.openxmlformats.org/drawingml/2006/main" xmlns:r="http://schemas.openxmlformats.org/officeDocument/2006/relationships" xmlns:p="http://schemas.openxmlformats.org/presentationml/2006/main">
+  <p:cSld>
+    <p:spTree>
+      <p:nvGrpSpPr>
+        <p:cNvPr id="1" name=""/>
+        <p:cNvGrpSpPr/>
+        <p:nvPr/>
+      </p:nvGrpSpPr>
+      <p:grpSpPr>
+        <a:xfrm>
+          <a:off x="0" y="0"/>
+          <a:ext cx="0" cy="0"/>
+          <a:chOff x="0" y="0"/>
+          <a:chExt cx="0" cy="0"/>
+        </a:xfrm>
+      </p:grpSpPr>
+      <p:sp>
+        <p:nvSpPr>
+          <p:cNvPr id="3" name="Content Placeholder 2">
+            <a:extLst>
+              <a:ext uri="{FF2B5EF4-FFF2-40B4-BE49-F238E27FC236}">
+                <a16:creationId xmlns:a16="http://schemas.microsoft.com/office/drawing/2014/main" id="{258E6AF3-7615-4BD1-878E-A94C93E98F90}"/>
+              </a:ext>
+            </a:extLst>
+          </p:cNvPr>
+          <p:cNvSpPr>
+            <a:spLocks noGrp="1"/>
+          </p:cNvSpPr>
+          <p:nvPr>
+            <p:ph idx="1"/>
+          </p:nvPr>
+        </p:nvSpPr>
+        <p:spPr>
+          <a:xfrm>
+            <a:off x="838200" y="1154002"/>
+            <a:ext cx="10515600" cy="5581207"/>
+          </a:xfrm>
+        </p:spPr>
+        <p:txBody>
+          <a:bodyPr>
+            <a:normAutofit/>
+          </a:bodyPr>
+          <a:lstStyle/>
+          <a:p>
+            <a:pPr marL="0" indent="0">
+              <a:buNone/>
+            </a:pPr>
+            <a:r>
+              <a:rPr lang="en-US" sz="3200" dirty="0"/>
+              <a:t>Data mining is often </a:t>
+            </a:r>
+            <a:r>
+              <a:rPr lang="en-US" sz="3200" b="1" dirty="0"/>
+              <a:t>Unsupervised  </a:t>
+            </a:r>
+          </a:p>
+          <a:p>
+            <a:r>
+              <a:rPr lang="en-US" dirty="0"/>
+              <a:t>Our focus is on unsupervised learning  </a:t>
+            </a:r>
+          </a:p>
+          <a:p>
+            <a:pPr lvl="1"/>
+            <a:r>
+              <a:rPr lang="en-US" dirty="0"/>
+              <a:t>Unsupervised learning enables knowledge discovery  </a:t>
+            </a:r>
+            <a:r>
+              <a:rPr lang="en-US" b="1" dirty="0"/>
+              <a:t>   </a:t>
+            </a:r>
+          </a:p>
+          <a:p>
+            <a:pPr lvl="1"/>
+            <a:r>
+              <a:rPr lang="en-US" dirty="0"/>
+              <a:t>We deliberately avoid supervised machine learning methods </a:t>
+            </a:r>
+          </a:p>
+          <a:p>
+            <a:r>
+              <a:rPr lang="en-US" dirty="0"/>
+              <a:t>Statistical Inference methods  </a:t>
+            </a:r>
+          </a:p>
+          <a:p>
+            <a:pPr lvl="1"/>
+            <a:r>
+              <a:rPr lang="en-US" dirty="0"/>
+              <a:t>How can we perform inference at massive scale? </a:t>
+            </a:r>
+          </a:p>
+          <a:p>
+            <a:r>
+              <a:rPr lang="en-US" dirty="0"/>
+              <a:t>Clustering algorithms</a:t>
+            </a:r>
+          </a:p>
+          <a:p>
+            <a:pPr lvl="1"/>
+            <a:r>
+              <a:rPr lang="en-US" dirty="0"/>
+              <a:t>How can we find related groups in complex data ?</a:t>
+            </a:r>
+          </a:p>
+          <a:p>
+            <a:r>
+              <a:rPr lang="en-US" dirty="0"/>
+              <a:t>Graph models</a:t>
+            </a:r>
+          </a:p>
+          <a:p>
+            <a:pPr lvl="1"/>
+            <a:r>
+              <a:rPr lang="en-US" dirty="0"/>
+              <a:t>How to apply efficient graph representations </a:t>
+            </a:r>
+            <a:r>
+              <a:rPr lang="en-US"/>
+              <a:t>and algorithms?  </a:t>
+            </a:r>
+            <a:endParaRPr lang="en-US" dirty="0"/>
+          </a:p>
+          <a:p>
+            <a:pPr marL="0" indent="0">
+              <a:buNone/>
+            </a:pPr>
+            <a:endParaRPr lang="en-US" b="1" dirty="0"/>
+          </a:p>
+        </p:txBody>
+      </p:sp>
+      <p:sp>
+        <p:nvSpPr>
+          <p:cNvPr id="6" name="Title 1">
+            <a:extLst>
+              <a:ext uri="{FF2B5EF4-FFF2-40B4-BE49-F238E27FC236}">
+                <a16:creationId xmlns:a16="http://schemas.microsoft.com/office/drawing/2014/main" id="{CD29F70F-B868-451B-A65D-8721F4C7A2D9}"/>
+              </a:ext>
+            </a:extLst>
+          </p:cNvPr>
+          <p:cNvSpPr txBox="1">
+            <a:spLocks/>
+          </p:cNvSpPr>
+          <p:nvPr/>
+        </p:nvSpPr>
+        <p:spPr>
+          <a:xfrm>
+            <a:off x="838200" y="-635"/>
+            <a:ext cx="10515600" cy="1325563"/>
+          </a:xfrm>
+          <a:prstGeom prst="rect">
+            <a:avLst/>
+          </a:prstGeom>
+        </p:spPr>
+        <p:txBody>
+          <a:bodyPr vert="horz" lIns="91440" tIns="45720" rIns="91440" bIns="45720" rtlCol="0" anchor="ctr">
+            <a:normAutofit/>
+          </a:bodyPr>
+          <a:lstStyle>
+            <a:lvl1pPr algn="l" defTabSz="914400" rtl="0" eaLnBrk="1" latinLnBrk="0" hangingPunct="1">
+              <a:lnSpc>
+                <a:spcPct val="90000"/>
+              </a:lnSpc>
+              <a:spcBef>
+                <a:spcPct val="0"/>
+              </a:spcBef>
+              <a:buNone/>
+              <a:defRPr sz="4400" kern="1200">
+                <a:solidFill>
+                  <a:schemeClr val="tx1"/>
+                </a:solidFill>
+                <a:latin typeface="+mj-lt"/>
+                <a:ea typeface="+mj-ea"/>
+                <a:cs typeface="+mj-cs"/>
+              </a:defRPr>
+            </a:lvl1pPr>
+          </a:lstStyle>
+          <a:p>
+            <a:r>
+              <a:rPr lang="en-US" dirty="0">
+                <a:latin typeface="+mn-lt"/>
+              </a:rPr>
+              <a:t>What is the focus of this course?</a:t>
+            </a:r>
+          </a:p>
+        </p:txBody>
+      </p:sp>
+    </p:spTree>
+    <p:extLst>
+      <p:ext uri="{BB962C8B-B14F-4D97-AF65-F5344CB8AC3E}">
+        <p14:creationId xmlns:p14="http://schemas.microsoft.com/office/powerpoint/2010/main" val="1802065706"/>
+      </p:ext>
+    </p:extLst>
+  </p:cSld>
+  <p:clrMapOvr>
+    <a:masterClrMapping/>
+  </p:clrMapOvr>
+  <p:timing>
+    <p:tnLst>
+      <p:par>
+        <p:cTn id="1" dur="indefinite" restart="never" nodeType="tmRoot">
+          <p:childTnLst>
+            <p:seq concurrent="1" nextAc="seek">
+              <p:cTn id="2" dur="indefinite" nodeType="mainSeq">
+                <p:childTnLst>
+                  <p:par>
+                    <p:cTn id="3" fill="hold">
+                      <p:stCondLst>
+                        <p:cond delay="indefinite"/>
+                      </p:stCondLst>
+                      <p:childTnLst>
+                        <p:par>
+                          <p:cTn id="4" fill="hold">
+                            <p:stCondLst>
+                              <p:cond delay="0"/>
+                            </p:stCondLst>
+                            <p:childTnLst>
+                              <p:par>
+                                <p:cTn id="5" presetID="1" presetClass="entr" presetSubtype="0" fill="hold" nodeType="clickEffect">
+                                  <p:stCondLst>
+                                    <p:cond delay="0"/>
+                                  </p:stCondLst>
+                                  <p:childTnLst>
+                                    <p:set>
+                                      <p:cBhvr>
+                                        <p:cTn id="6" dur="1" fill="hold">
+                                          <p:stCondLst>
+                                            <p:cond delay="0"/>
+                                          </p:stCondLst>
+                                        </p:cTn>
+                                        <p:tgtEl>
+                                          <p:spTgt spid="3">
+                                            <p:txEl>
+                                              <p:pRg st="0" end="0"/>
+                                            </p:txEl>
+                                          </p:spTgt>
+                                        </p:tgtEl>
+                                        <p:attrNameLst>
+                                          <p:attrName>style.visibility</p:attrName>
+                                        </p:attrNameLst>
+                                      </p:cBhvr>
+                                      <p:to>
+                                        <p:strVal val="visible"/>
+                                      </p:to>
+                                    </p:set>
+                                  </p:childTnLst>
+                                </p:cTn>
+                              </p:par>
+                            </p:childTnLst>
+                          </p:cTn>
+                        </p:par>
+                      </p:childTnLst>
+                    </p:cTn>
+                  </p:par>
+                  <p:par>
+                    <p:cTn id="7" fill="hold">
+                      <p:stCondLst>
+                        <p:cond delay="indefinite"/>
+                      </p:stCondLst>
+                      <p:childTnLst>
+                        <p:par>
+                          <p:cTn id="8" fill="hold">
+                            <p:stCondLst>
+                              <p:cond delay="0"/>
+                            </p:stCondLst>
+                            <p:childTnLst>
+                              <p:par>
+                                <p:cTn id="9" presetID="1" presetClass="entr" presetSubtype="0" fill="hold" nodeType="clickEffect">
+                                  <p:stCondLst>
+                                    <p:cond delay="0"/>
+                                  </p:stCondLst>
+                                  <p:childTnLst>
+                                    <p:set>
+                                      <p:cBhvr>
+                                        <p:cTn id="10" dur="1" fill="hold">
+                                          <p:stCondLst>
+                                            <p:cond delay="0"/>
+                                          </p:stCondLst>
+                                        </p:cTn>
+                                        <p:tgtEl>
+                                          <p:spTgt spid="3">
+                                            <p:txEl>
+                                              <p:pRg st="1" end="1"/>
+                                            </p:txEl>
+                                          </p:spTgt>
+                                        </p:tgtEl>
+                                        <p:attrNameLst>
+                                          <p:attrName>style.visibility</p:attrName>
+                                        </p:attrNameLst>
+                                      </p:cBhvr>
+                                      <p:to>
+                                        <p:strVal val="visible"/>
+                                      </p:to>
+                                    </p:set>
+                                  </p:childTnLst>
+                                </p:cTn>
+                              </p:par>
+                            </p:childTnLst>
+                          </p:cTn>
+                        </p:par>
+                      </p:childTnLst>
+                    </p:cTn>
+                  </p:par>
+                  <p:par>
+                    <p:cTn id="11" fill="hold">
+                      <p:stCondLst>
+                        <p:cond delay="indefinite"/>
+                      </p:stCondLst>
+                      <p:childTnLst>
+                        <p:par>
+                          <p:cTn id="12" fill="hold">
+                            <p:stCondLst>
+                              <p:cond delay="0"/>
+                            </p:stCondLst>
+                            <p:childTnLst>
+                              <p:par>
+                                <p:cTn id="13" presetID="1" presetClass="entr" presetSubtype="0" fill="hold" nodeType="clickEffect">
+                                  <p:stCondLst>
+                                    <p:cond delay="0"/>
+                                  </p:stCondLst>
+                                  <p:childTnLst>
+                                    <p:set>
+                                      <p:cBhvr>
+                                        <p:cTn id="14" dur="1" fill="hold">
+                                          <p:stCondLst>
+                                            <p:cond delay="0"/>
+                                          </p:stCondLst>
+                                        </p:cTn>
+                                        <p:tgtEl>
+                                          <p:spTgt spid="3">
+                                            <p:txEl>
+                                              <p:pRg st="2" end="2"/>
+                                            </p:txEl>
+                                          </p:spTgt>
+                                        </p:tgtEl>
+                                        <p:attrNameLst>
+                                          <p:attrName>style.visibility</p:attrName>
+                                        </p:attrNameLst>
+                                      </p:cBhvr>
+                                      <p:to>
+                                        <p:strVal val="visible"/>
+                                      </p:to>
+                                    </p:set>
+                                  </p:childTnLst>
+                                </p:cTn>
+                              </p:par>
+                            </p:childTnLst>
+                          </p:cTn>
+                        </p:par>
+                      </p:childTnLst>
+                    </p:cTn>
+                  </p:par>
+                  <p:par>
+                    <p:cTn id="15" fill="hold">
+                      <p:stCondLst>
+                        <p:cond delay="indefinite"/>
+                      </p:stCondLst>
+                      <p:childTnLst>
+                        <p:par>
+                          <p:cTn id="16" fill="hold">
+                            <p:stCondLst>
+                              <p:cond delay="0"/>
+                            </p:stCondLst>
+                            <p:childTnLst>
+                              <p:par>
+                                <p:cTn id="17" presetID="1" presetClass="entr" presetSubtype="0" fill="hold" nodeType="clickEffect">
+                                  <p:stCondLst>
+                                    <p:cond delay="0"/>
+                                  </p:stCondLst>
+                                  <p:childTnLst>
+                                    <p:set>
+                                      <p:cBhvr>
+                                        <p:cTn id="18" dur="1" fill="hold">
+                                          <p:stCondLst>
+                                            <p:cond delay="0"/>
+                                          </p:stCondLst>
+                                        </p:cTn>
+                                        <p:tgtEl>
+                                          <p:spTgt spid="3">
+                                            <p:txEl>
+                                              <p:pRg st="3" end="3"/>
+                                            </p:txEl>
+                                          </p:spTgt>
+                                        </p:tgtEl>
+                                        <p:attrNameLst>
+                                          <p:attrName>style.visibility</p:attrName>
+                                        </p:attrNameLst>
+                                      </p:cBhvr>
+                                      <p:to>
+                                        <p:strVal val="visible"/>
+                                      </p:to>
+                                    </p:set>
+                                  </p:childTnLst>
+                                </p:cTn>
+                              </p:par>
+                            </p:childTnLst>
+                          </p:cTn>
+                        </p:par>
+                      </p:childTnLst>
+                    </p:cTn>
+                  </p:par>
+                  <p:par>
+                    <p:cTn id="19" fill="hold">
+                      <p:stCondLst>
+                        <p:cond delay="indefinite"/>
+                      </p:stCondLst>
+                      <p:childTnLst>
+                        <p:par>
+                          <p:cTn id="20" fill="hold">
+                            <p:stCondLst>
+                              <p:cond delay="0"/>
+                            </p:stCondLst>
+                            <p:childTnLst>
+                              <p:par>
+                                <p:cTn id="21" presetID="1" presetClass="entr" presetSubtype="0" fill="hold" nodeType="clickEffect">
+                                  <p:stCondLst>
+                                    <p:cond delay="0"/>
+                                  </p:stCondLst>
+                                  <p:childTnLst>
+                                    <p:set>
+                                      <p:cBhvr>
+                                        <p:cTn id="22" dur="1" fill="hold">
+                                          <p:stCondLst>
+                                            <p:cond delay="0"/>
+                                          </p:stCondLst>
+                                        </p:cTn>
+                                        <p:tgtEl>
+                                          <p:spTgt spid="3">
+                                            <p:txEl>
+                                              <p:pRg st="4" end="4"/>
+                                            </p:txEl>
+                                          </p:spTgt>
+                                        </p:tgtEl>
+                                        <p:attrNameLst>
+                                          <p:attrName>style.visibility</p:attrName>
+                                        </p:attrNameLst>
+                                      </p:cBhvr>
+                                      <p:to>
+                                        <p:strVal val="visible"/>
+                                      </p:to>
+                                    </p:set>
+                                  </p:childTnLst>
+                                </p:cTn>
+                              </p:par>
+                            </p:childTnLst>
+                          </p:cTn>
+                        </p:par>
+                      </p:childTnLst>
+                    </p:cTn>
+                  </p:par>
+                  <p:par>
+                    <p:cTn id="23" fill="hold">
+                      <p:stCondLst>
+                        <p:cond delay="indefinite"/>
+                      </p:stCondLst>
+                      <p:childTnLst>
+                        <p:par>
+                          <p:cTn id="24" fill="hold">
+                            <p:stCondLst>
+                              <p:cond delay="0"/>
+                            </p:stCondLst>
+                            <p:childTnLst>
+                              <p:par>
+                                <p:cTn id="25" presetID="1" presetClass="entr" presetSubtype="0" fill="hold" nodeType="clickEffect">
+                                  <p:stCondLst>
+                                    <p:cond delay="0"/>
+                                  </p:stCondLst>
+                                  <p:childTnLst>
+                                    <p:set>
+                                      <p:cBhvr>
+                                        <p:cTn id="26" dur="1" fill="hold">
+                                          <p:stCondLst>
+                                            <p:cond delay="0"/>
+                                          </p:stCondLst>
+                                        </p:cTn>
+                                        <p:tgtEl>
+                                          <p:spTgt spid="3">
+                                            <p:txEl>
+                                              <p:pRg st="5" end="5"/>
+                                            </p:txEl>
+                                          </p:spTgt>
+                                        </p:tgtEl>
+                                        <p:attrNameLst>
+                                          <p:attrName>style.visibility</p:attrName>
+                                        </p:attrNameLst>
+                                      </p:cBhvr>
+                                      <p:to>
+                                        <p:strVal val="visible"/>
+                                      </p:to>
+                                    </p:set>
+                                  </p:childTnLst>
+                                </p:cTn>
+                              </p:par>
+                            </p:childTnLst>
+                          </p:cTn>
+                        </p:par>
+                      </p:childTnLst>
+                    </p:cTn>
+                  </p:par>
+                  <p:par>
+                    <p:cTn id="27" fill="hold">
+                      <p:stCondLst>
+                        <p:cond delay="indefinite"/>
+                      </p:stCondLst>
+                      <p:childTnLst>
+                        <p:par>
+                          <p:cTn id="28" fill="hold">
+                            <p:stCondLst>
+                              <p:cond delay="0"/>
+                            </p:stCondLst>
+                            <p:childTnLst>
+                              <p:par>
+                                <p:cTn id="29" presetID="1" presetClass="entr" presetSubtype="0" fill="hold" nodeType="clickEffect">
+                                  <p:stCondLst>
+                                    <p:cond delay="0"/>
+                                  </p:stCondLst>
+                                  <p:childTnLst>
+                                    <p:set>
+                                      <p:cBhvr>
+                                        <p:cTn id="30" dur="1" fill="hold">
+                                          <p:stCondLst>
+                                            <p:cond delay="0"/>
+                                          </p:stCondLst>
+                                        </p:cTn>
+                                        <p:tgtEl>
+                                          <p:spTgt spid="3">
+                                            <p:txEl>
+                                              <p:pRg st="6" end="6"/>
+                                            </p:txEl>
+                                          </p:spTgt>
+                                        </p:tgtEl>
+                                        <p:attrNameLst>
+                                          <p:attrName>style.visibility</p:attrName>
+                                        </p:attrNameLst>
+                                      </p:cBhvr>
+                                      <p:to>
+                                        <p:strVal val="visible"/>
+                                      </p:to>
+                                    </p:set>
+                                  </p:childTnLst>
+                                </p:cTn>
+                              </p:par>
+                            </p:childTnLst>
+                          </p:cTn>
+                        </p:par>
+                      </p:childTnLst>
+                    </p:cTn>
+                  </p:par>
+                  <p:par>
+                    <p:cTn id="31" fill="hold">
+                      <p:stCondLst>
+                        <p:cond delay="indefinite"/>
+                      </p:stCondLst>
+                      <p:childTnLst>
+                        <p:par>
+                          <p:cTn id="32" fill="hold">
+                            <p:stCondLst>
+                              <p:cond delay="0"/>
+                            </p:stCondLst>
+                            <p:childTnLst>
+                              <p:par>
+                                <p:cTn id="33" presetID="1" presetClass="entr" presetSubtype="0" fill="hold" nodeType="clickEffect">
+                                  <p:stCondLst>
+                                    <p:cond delay="0"/>
+                                  </p:stCondLst>
+                                  <p:childTnLst>
+                                    <p:set>
+                                      <p:cBhvr>
+                                        <p:cTn id="34" dur="1" fill="hold">
+                                          <p:stCondLst>
+                                            <p:cond delay="0"/>
+                                          </p:stCondLst>
+                                        </p:cTn>
+                                        <p:tgtEl>
+                                          <p:spTgt spid="3">
+                                            <p:txEl>
+                                              <p:pRg st="7" end="7"/>
+                                            </p:txEl>
+                                          </p:spTgt>
+                                        </p:tgtEl>
+                                        <p:attrNameLst>
+                                          <p:attrName>style.visibility</p:attrName>
+                                        </p:attrNameLst>
+                                      </p:cBhvr>
+                                      <p:to>
+                                        <p:strVal val="visible"/>
+                                      </p:to>
+                                    </p:set>
+                                  </p:childTnLst>
+                                </p:cTn>
+                              </p:par>
+                            </p:childTnLst>
+                          </p:cTn>
+                        </p:par>
+                      </p:childTnLst>
+                    </p:cTn>
+                  </p:par>
+                  <p:par>
+                    <p:cTn id="35" fill="hold">
+                      <p:stCondLst>
+                        <p:cond delay="indefinite"/>
+                      </p:stCondLst>
+                      <p:childTnLst>
+                        <p:par>
+                          <p:cTn id="36" fill="hold">
+                            <p:stCondLst>
+                              <p:cond delay="0"/>
+                            </p:stCondLst>
+                            <p:childTnLst>
+                              <p:par>
+                                <p:cTn id="37" presetID="1" presetClass="entr" presetSubtype="0" fill="hold" nodeType="clickEffect">
+                                  <p:stCondLst>
+                                    <p:cond delay="0"/>
+                                  </p:stCondLst>
+                                  <p:childTnLst>
+                                    <p:set>
+                                      <p:cBhvr>
+                                        <p:cTn id="38" dur="1" fill="hold">
+                                          <p:stCondLst>
+                                            <p:cond delay="0"/>
+                                          </p:stCondLst>
+                                        </p:cTn>
+                                        <p:tgtEl>
+                                          <p:spTgt spid="3">
+                                            <p:txEl>
+                                              <p:pRg st="8" end="8"/>
+                                            </p:txEl>
+                                          </p:spTgt>
+                                        </p:tgtEl>
+                                        <p:attrNameLst>
+                                          <p:attrName>style.visibility</p:attrName>
+                                        </p:attrNameLst>
+                                      </p:cBhvr>
+                                      <p:to>
+                                        <p:strVal val="visible"/>
+                                      </p:to>
+                                    </p:set>
+                                  </p:childTnLst>
+                                </p:cTn>
+                              </p:par>
+                            </p:childTnLst>
+                          </p:cTn>
+                        </p:par>
+                      </p:childTnLst>
+                    </p:cTn>
+                  </p:par>
+                  <p:par>
+                    <p:cTn id="39" fill="hold">
+                      <p:stCondLst>
+                        <p:cond delay="indefinite"/>
+                      </p:stCondLst>
+                      <p:childTnLst>
+                        <p:par>
+                          <p:cTn id="40" fill="hold">
+                            <p:stCondLst>
+                              <p:cond delay="0"/>
+                            </p:stCondLst>
+                            <p:childTnLst>
+                              <p:par>
+                                <p:cTn id="41" presetID="1" presetClass="entr" presetSubtype="0" fill="hold" nodeType="clickEffect">
+                                  <p:stCondLst>
+                                    <p:cond delay="0"/>
+                                  </p:stCondLst>
+                                  <p:childTnLst>
+                                    <p:set>
+                                      <p:cBhvr>
+                                        <p:cTn id="42" dur="1" fill="hold">
+                                          <p:stCondLst>
+                                            <p:cond delay="0"/>
+                                          </p:stCondLst>
+                                        </p:cTn>
+                                        <p:tgtEl>
+                                          <p:spTgt spid="3">
+                                            <p:txEl>
+                                              <p:pRg st="9" end="9"/>
+                                            </p:txEl>
+                                          </p:spTgt>
+                                        </p:tgtEl>
+                                        <p:attrNameLst>
+                                          <p:attrName>style.visibility</p:attrName>
+                                        </p:attrNameLst>
+                                      </p:cBhvr>
+                                      <p:to>
+                                        <p:strVal val="visible"/>
+                                      </p:to>
+                                    </p:set>
+                                  </p:childTnLst>
+                                </p:cTn>
+                              </p:par>
+                            </p:childTnLst>
+                          </p:cTn>
+                        </p:par>
+                      </p:childTnLst>
+                    </p:cTn>
+                  </p:par>
+                </p:childTnLst>
+              </p:cTn>
+              <p:prevCondLst>
+                <p:cond evt="onPrev" delay="0">
+                  <p:tgtEl>
+                    <p:sldTgt/>
+                  </p:tgtEl>
+                </p:cond>
+              </p:prevCondLst>
+              <p:nextCondLst>
+                <p:cond evt="onNext" delay="0">
+                  <p:tgtEl>
+                    <p:sldTgt/>
+                  </p:tgtEl>
+                </p:cond>
+              </p:nextCondLst>
+            </p:seq>
+          </p:childTnLst>
+        </p:cTn>
+      </p:par>
+    </p:tnLst>
+  </p:timing>
+</p:sld>
+</file>
+
+<file path=ppt/slides/slide11.xml><?xml version="1.0" encoding="utf-8"?>
 <p:sld xmlns:a="http://schemas.openxmlformats.org/drawingml/2006/main" xmlns:r="http://schemas.openxmlformats.org/officeDocument/2006/relationships" xmlns:p="http://schemas.openxmlformats.org/presentationml/2006/main">
   <p:cSld>
     <p:spTree>
@@ -5288,7 +6006,7 @@
 </p:sld>
 </file>
 
-<file path=ppt/slides/slide11.xml><?xml version="1.0" encoding="utf-8"?>
+<file path=ppt/slides/slide12.xml><?xml version="1.0" encoding="utf-8"?>
 <p:sld xmlns:a="http://schemas.openxmlformats.org/drawingml/2006/main" xmlns:r="http://schemas.openxmlformats.org/officeDocument/2006/relationships" xmlns:p="http://schemas.openxmlformats.org/presentationml/2006/main">
   <p:cSld>
     <p:spTree>
@@ -5336,26 +6054,19 @@
             </a:pPr>
             <a:r>
               <a:rPr lang="en-US" dirty="0"/>
-              <a:t>Schedule for live class meetings (6:30-8:30 pm US Eastern Time)</a:t>
-            </a:r>
-            <a:endParaRPr lang="en-US" b="1" dirty="0"/>
+              <a:t>Schedule for live class meetings </a:t>
+            </a:r>
           </a:p>
           <a:p>
             <a:r>
               <a:rPr lang="en-US" dirty="0"/>
-              <a:t>Monday and Wednesday – Lectures focused on theoretical foundations </a:t>
+              <a:t>Tuesdays – Lectures focused on theoretical foundations - 5:30-7:30 pm US Eastern Time</a:t>
             </a:r>
           </a:p>
           <a:p>
             <a:r>
               <a:rPr lang="en-US" dirty="0"/>
-              <a:t>Tuesday and Thursday – Section meeting to address questions, review and background </a:t>
-            </a:r>
-          </a:p>
-          <a:p>
-            <a:r>
-              <a:rPr lang="en-US" dirty="0"/>
-              <a:t>This Friday (June 24) only – makeup class for Monday holiday   </a:t>
+              <a:t>Wednesdays – Section meeting to address questions, review and background – starting at 7 pm US Eastern Time?  </a:t>
             </a:r>
           </a:p>
           <a:p>
@@ -5436,6 +6147,396 @@
     <p:extLst>
       <p:ext uri="{BB962C8B-B14F-4D97-AF65-F5344CB8AC3E}">
         <p14:creationId xmlns:p14="http://schemas.microsoft.com/office/powerpoint/2010/main" val="2116158898"/>
+      </p:ext>
+    </p:extLst>
+  </p:cSld>
+  <p:clrMapOvr>
+    <a:masterClrMapping/>
+  </p:clrMapOvr>
+  <p:timing>
+    <p:tnLst>
+      <p:par>
+        <p:cTn id="1" dur="indefinite" restart="never" nodeType="tmRoot">
+          <p:childTnLst>
+            <p:seq concurrent="1" nextAc="seek">
+              <p:cTn id="2" dur="indefinite" nodeType="mainSeq">
+                <p:childTnLst>
+                  <p:par>
+                    <p:cTn id="3" fill="hold">
+                      <p:stCondLst>
+                        <p:cond delay="indefinite"/>
+                      </p:stCondLst>
+                      <p:childTnLst>
+                        <p:par>
+                          <p:cTn id="4" fill="hold">
+                            <p:stCondLst>
+                              <p:cond delay="0"/>
+                            </p:stCondLst>
+                            <p:childTnLst>
+                              <p:par>
+                                <p:cTn id="5" presetID="1" presetClass="entr" presetSubtype="0" fill="hold" nodeType="clickEffect">
+                                  <p:stCondLst>
+                                    <p:cond delay="0"/>
+                                  </p:stCondLst>
+                                  <p:childTnLst>
+                                    <p:set>
+                                      <p:cBhvr>
+                                        <p:cTn id="6" dur="1" fill="hold">
+                                          <p:stCondLst>
+                                            <p:cond delay="0"/>
+                                          </p:stCondLst>
+                                        </p:cTn>
+                                        <p:tgtEl>
+                                          <p:spTgt spid="3">
+                                            <p:txEl>
+                                              <p:pRg st="0" end="0"/>
+                                            </p:txEl>
+                                          </p:spTgt>
+                                        </p:tgtEl>
+                                        <p:attrNameLst>
+                                          <p:attrName>style.visibility</p:attrName>
+                                        </p:attrNameLst>
+                                      </p:cBhvr>
+                                      <p:to>
+                                        <p:strVal val="visible"/>
+                                      </p:to>
+                                    </p:set>
+                                  </p:childTnLst>
+                                </p:cTn>
+                              </p:par>
+                            </p:childTnLst>
+                          </p:cTn>
+                        </p:par>
+                      </p:childTnLst>
+                    </p:cTn>
+                  </p:par>
+                  <p:par>
+                    <p:cTn id="7" fill="hold">
+                      <p:stCondLst>
+                        <p:cond delay="indefinite"/>
+                      </p:stCondLst>
+                      <p:childTnLst>
+                        <p:par>
+                          <p:cTn id="8" fill="hold">
+                            <p:stCondLst>
+                              <p:cond delay="0"/>
+                            </p:stCondLst>
+                            <p:childTnLst>
+                              <p:par>
+                                <p:cTn id="9" presetID="1" presetClass="entr" presetSubtype="0" fill="hold" nodeType="clickEffect">
+                                  <p:stCondLst>
+                                    <p:cond delay="0"/>
+                                  </p:stCondLst>
+                                  <p:childTnLst>
+                                    <p:set>
+                                      <p:cBhvr>
+                                        <p:cTn id="10" dur="1" fill="hold">
+                                          <p:stCondLst>
+                                            <p:cond delay="0"/>
+                                          </p:stCondLst>
+                                        </p:cTn>
+                                        <p:tgtEl>
+                                          <p:spTgt spid="3">
+                                            <p:txEl>
+                                              <p:pRg st="1" end="1"/>
+                                            </p:txEl>
+                                          </p:spTgt>
+                                        </p:tgtEl>
+                                        <p:attrNameLst>
+                                          <p:attrName>style.visibility</p:attrName>
+                                        </p:attrNameLst>
+                                      </p:cBhvr>
+                                      <p:to>
+                                        <p:strVal val="visible"/>
+                                      </p:to>
+                                    </p:set>
+                                  </p:childTnLst>
+                                </p:cTn>
+                              </p:par>
+                            </p:childTnLst>
+                          </p:cTn>
+                        </p:par>
+                      </p:childTnLst>
+                    </p:cTn>
+                  </p:par>
+                  <p:par>
+                    <p:cTn id="11" fill="hold">
+                      <p:stCondLst>
+                        <p:cond delay="indefinite"/>
+                      </p:stCondLst>
+                      <p:childTnLst>
+                        <p:par>
+                          <p:cTn id="12" fill="hold">
+                            <p:stCondLst>
+                              <p:cond delay="0"/>
+                            </p:stCondLst>
+                            <p:childTnLst>
+                              <p:par>
+                                <p:cTn id="13" presetID="1" presetClass="entr" presetSubtype="0" fill="hold" nodeType="clickEffect">
+                                  <p:stCondLst>
+                                    <p:cond delay="0"/>
+                                  </p:stCondLst>
+                                  <p:childTnLst>
+                                    <p:set>
+                                      <p:cBhvr>
+                                        <p:cTn id="14" dur="1" fill="hold">
+                                          <p:stCondLst>
+                                            <p:cond delay="0"/>
+                                          </p:stCondLst>
+                                        </p:cTn>
+                                        <p:tgtEl>
+                                          <p:spTgt spid="3">
+                                            <p:txEl>
+                                              <p:pRg st="2" end="2"/>
+                                            </p:txEl>
+                                          </p:spTgt>
+                                        </p:tgtEl>
+                                        <p:attrNameLst>
+                                          <p:attrName>style.visibility</p:attrName>
+                                        </p:attrNameLst>
+                                      </p:cBhvr>
+                                      <p:to>
+                                        <p:strVal val="visible"/>
+                                      </p:to>
+                                    </p:set>
+                                  </p:childTnLst>
+                                </p:cTn>
+                              </p:par>
+                            </p:childTnLst>
+                          </p:cTn>
+                        </p:par>
+                      </p:childTnLst>
+                    </p:cTn>
+                  </p:par>
+                  <p:par>
+                    <p:cTn id="15" fill="hold">
+                      <p:stCondLst>
+                        <p:cond delay="indefinite"/>
+                      </p:stCondLst>
+                      <p:childTnLst>
+                        <p:par>
+                          <p:cTn id="16" fill="hold">
+                            <p:stCondLst>
+                              <p:cond delay="0"/>
+                            </p:stCondLst>
+                            <p:childTnLst>
+                              <p:par>
+                                <p:cTn id="17" presetID="1" presetClass="entr" presetSubtype="0" fill="hold" nodeType="clickEffect">
+                                  <p:stCondLst>
+                                    <p:cond delay="0"/>
+                                  </p:stCondLst>
+                                  <p:childTnLst>
+                                    <p:set>
+                                      <p:cBhvr>
+                                        <p:cTn id="18" dur="1" fill="hold">
+                                          <p:stCondLst>
+                                            <p:cond delay="0"/>
+                                          </p:stCondLst>
+                                        </p:cTn>
+                                        <p:tgtEl>
+                                          <p:spTgt spid="3">
+                                            <p:txEl>
+                                              <p:pRg st="3" end="3"/>
+                                            </p:txEl>
+                                          </p:spTgt>
+                                        </p:tgtEl>
+                                        <p:attrNameLst>
+                                          <p:attrName>style.visibility</p:attrName>
+                                        </p:attrNameLst>
+                                      </p:cBhvr>
+                                      <p:to>
+                                        <p:strVal val="visible"/>
+                                      </p:to>
+                                    </p:set>
+                                  </p:childTnLst>
+                                </p:cTn>
+                              </p:par>
+                            </p:childTnLst>
+                          </p:cTn>
+                        </p:par>
+                      </p:childTnLst>
+                    </p:cTn>
+                  </p:par>
+                </p:childTnLst>
+              </p:cTn>
+              <p:prevCondLst>
+                <p:cond evt="onPrev" delay="0">
+                  <p:tgtEl>
+                    <p:sldTgt/>
+                  </p:tgtEl>
+                </p:cond>
+              </p:prevCondLst>
+              <p:nextCondLst>
+                <p:cond evt="onNext" delay="0">
+                  <p:tgtEl>
+                    <p:sldTgt/>
+                  </p:tgtEl>
+                </p:cond>
+              </p:nextCondLst>
+            </p:seq>
+          </p:childTnLst>
+        </p:cTn>
+      </p:par>
+    </p:tnLst>
+  </p:timing>
+</p:sld>
+</file>
+
+<file path=ppt/slides/slide13.xml><?xml version="1.0" encoding="utf-8"?>
+<p:sld xmlns:a="http://schemas.openxmlformats.org/drawingml/2006/main" xmlns:r="http://schemas.openxmlformats.org/officeDocument/2006/relationships" xmlns:p="http://schemas.openxmlformats.org/presentationml/2006/main">
+  <p:cSld>
+    <p:spTree>
+      <p:nvGrpSpPr>
+        <p:cNvPr id="1" name=""/>
+        <p:cNvGrpSpPr/>
+        <p:nvPr/>
+      </p:nvGrpSpPr>
+      <p:grpSpPr>
+        <a:xfrm>
+          <a:off x="0" y="0"/>
+          <a:ext cx="0" cy="0"/>
+          <a:chOff x="0" y="0"/>
+          <a:chExt cx="0" cy="0"/>
+        </a:xfrm>
+      </p:grpSpPr>
+      <p:sp>
+        <p:nvSpPr>
+          <p:cNvPr id="3" name="Content Placeholder 2">
+            <a:extLst>
+              <a:ext uri="{FF2B5EF4-FFF2-40B4-BE49-F238E27FC236}">
+                <a16:creationId xmlns:a16="http://schemas.microsoft.com/office/drawing/2014/main" id="{258E6AF3-7615-4BD1-878E-A94C93E98F90}"/>
+              </a:ext>
+            </a:extLst>
+          </p:cNvPr>
+          <p:cNvSpPr>
+            <a:spLocks noGrp="1"/>
+          </p:cNvSpPr>
+          <p:nvPr>
+            <p:ph idx="1"/>
+          </p:nvPr>
+        </p:nvSpPr>
+        <p:spPr>
+          <a:xfrm>
+            <a:off x="838200" y="1324927"/>
+            <a:ext cx="10515600" cy="4898217"/>
+          </a:xfrm>
+        </p:spPr>
+        <p:txBody>
+          <a:bodyPr>
+            <a:normAutofit/>
+          </a:bodyPr>
+          <a:lstStyle/>
+          <a:p>
+            <a:pPr marL="0" indent="0">
+              <a:buNone/>
+            </a:pPr>
+            <a:r>
+              <a:rPr lang="en-US" dirty="0"/>
+              <a:t>Students enrolled for graduate credit are evaluated by the following weights: </a:t>
+            </a:r>
+          </a:p>
+          <a:p>
+            <a:r>
+              <a:rPr lang="en-US" b="1" dirty="0"/>
+              <a:t>10% Class Participation </a:t>
+            </a:r>
+            <a:r>
+              <a:rPr lang="en-US" dirty="0"/>
+              <a:t>– Class participation in online discussions</a:t>
+            </a:r>
+          </a:p>
+          <a:p>
+            <a:r>
+              <a:rPr lang="en-US" b="1" dirty="0"/>
+              <a:t>60%	Assignments </a:t>
+            </a:r>
+            <a:r>
+              <a:rPr lang="en-US" dirty="0"/>
+              <a:t>– Hands-on assignments for most lessons – Expect 9-10</a:t>
+            </a:r>
+          </a:p>
+          <a:p>
+            <a:r>
+              <a:rPr lang="en-US" b="1" dirty="0"/>
+              <a:t>5% Project proposal </a:t>
+            </a:r>
+            <a:r>
+              <a:rPr lang="en-US" dirty="0"/>
+              <a:t>– Proposal describing the problem you wish to address and methods you plan to apply. Based on your proposal, your instructor will approve your project as appropriate for the course. </a:t>
+            </a:r>
+          </a:p>
+          <a:p>
+            <a:r>
+              <a:rPr lang="en-US" b="1" dirty="0"/>
+              <a:t>25%	Project </a:t>
+            </a:r>
+            <a:r>
+              <a:rPr lang="en-US" dirty="0"/>
+              <a:t>– Independent data mining project report – More on this next week</a:t>
+            </a:r>
+          </a:p>
+        </p:txBody>
+      </p:sp>
+      <p:sp>
+        <p:nvSpPr>
+          <p:cNvPr id="6" name="Title 1">
+            <a:extLst>
+              <a:ext uri="{FF2B5EF4-FFF2-40B4-BE49-F238E27FC236}">
+                <a16:creationId xmlns:a16="http://schemas.microsoft.com/office/drawing/2014/main" id="{CD29F70F-B868-451B-A65D-8721F4C7A2D9}"/>
+              </a:ext>
+            </a:extLst>
+          </p:cNvPr>
+          <p:cNvSpPr txBox="1">
+            <a:spLocks/>
+          </p:cNvSpPr>
+          <p:nvPr/>
+        </p:nvSpPr>
+        <p:spPr>
+          <a:xfrm>
+            <a:off x="838200" y="-635"/>
+            <a:ext cx="10515600" cy="1325563"/>
+          </a:xfrm>
+          <a:prstGeom prst="rect">
+            <a:avLst/>
+          </a:prstGeom>
+        </p:spPr>
+        <p:txBody>
+          <a:bodyPr vert="horz" lIns="91440" tIns="45720" rIns="91440" bIns="45720" rtlCol="0" anchor="ctr">
+            <a:normAutofit/>
+          </a:bodyPr>
+          <a:lstStyle>
+            <a:lvl1pPr algn="l" defTabSz="914400" rtl="0" eaLnBrk="1" latinLnBrk="0" hangingPunct="1">
+              <a:lnSpc>
+                <a:spcPct val="90000"/>
+              </a:lnSpc>
+              <a:spcBef>
+                <a:spcPct val="0"/>
+              </a:spcBef>
+              <a:buNone/>
+              <a:defRPr sz="4400" kern="1200">
+                <a:solidFill>
+                  <a:schemeClr val="tx1"/>
+                </a:solidFill>
+                <a:latin typeface="+mj-lt"/>
+                <a:ea typeface="+mj-ea"/>
+                <a:cs typeface="+mj-cs"/>
+              </a:defRPr>
+            </a:lvl1pPr>
+          </a:lstStyle>
+          <a:p>
+            <a:r>
+              <a:rPr lang="en-US" dirty="0">
+                <a:latin typeface="+mn-lt"/>
+              </a:rPr>
+              <a:t>Graduate Credit Grades</a:t>
+            </a:r>
+          </a:p>
+        </p:txBody>
+      </p:sp>
+    </p:spTree>
+    <p:extLst>
+      <p:ext uri="{BB962C8B-B14F-4D97-AF65-F5344CB8AC3E}">
+        <p14:creationId xmlns:p14="http://schemas.microsoft.com/office/powerpoint/2010/main" val="3245357042"/>
       </p:ext>
     </p:extLst>
   </p:cSld>
@@ -5720,898 +6821,6 @@
 </p:sld>
 </file>
 
-<file path=ppt/slides/slide12.xml><?xml version="1.0" encoding="utf-8"?>
-<p:sld xmlns:a="http://schemas.openxmlformats.org/drawingml/2006/main" xmlns:r="http://schemas.openxmlformats.org/officeDocument/2006/relationships" xmlns:p="http://schemas.openxmlformats.org/presentationml/2006/main">
-  <p:cSld>
-    <p:spTree>
-      <p:nvGrpSpPr>
-        <p:cNvPr id="1" name=""/>
-        <p:cNvGrpSpPr/>
-        <p:nvPr/>
-      </p:nvGrpSpPr>
-      <p:grpSpPr>
-        <a:xfrm>
-          <a:off x="0" y="0"/>
-          <a:ext cx="0" cy="0"/>
-          <a:chOff x="0" y="0"/>
-          <a:chExt cx="0" cy="0"/>
-        </a:xfrm>
-      </p:grpSpPr>
-      <p:sp>
-        <p:nvSpPr>
-          <p:cNvPr id="3" name="Content Placeholder 2">
-            <a:extLst>
-              <a:ext uri="{FF2B5EF4-FFF2-40B4-BE49-F238E27FC236}">
-                <a16:creationId xmlns:a16="http://schemas.microsoft.com/office/drawing/2014/main" id="{258E6AF3-7615-4BD1-878E-A94C93E98F90}"/>
-              </a:ext>
-            </a:extLst>
-          </p:cNvPr>
-          <p:cNvSpPr>
-            <a:spLocks noGrp="1"/>
-          </p:cNvSpPr>
-          <p:nvPr>
-            <p:ph idx="1"/>
-          </p:nvPr>
-        </p:nvSpPr>
-        <p:spPr>
-          <a:xfrm>
-            <a:off x="838200" y="1324927"/>
-            <a:ext cx="10515600" cy="4898217"/>
-          </a:xfrm>
-        </p:spPr>
-        <p:txBody>
-          <a:bodyPr>
-            <a:normAutofit/>
-          </a:bodyPr>
-          <a:lstStyle/>
-          <a:p>
-            <a:pPr marL="0" indent="0">
-              <a:buNone/>
-            </a:pPr>
-            <a:r>
-              <a:rPr lang="en-US" dirty="0"/>
-              <a:t>Students enrolled for undergraduate credit are evaluated by the following weights: </a:t>
-            </a:r>
-          </a:p>
-          <a:p>
-            <a:r>
-              <a:rPr lang="en-US" b="1" dirty="0"/>
-              <a:t>10% Class Participation </a:t>
-            </a:r>
-            <a:r>
-              <a:rPr lang="en-US" dirty="0"/>
-              <a:t>– Class participation in online discussions</a:t>
-            </a:r>
-          </a:p>
-          <a:p>
-            <a:r>
-              <a:rPr lang="en-US" b="1" dirty="0"/>
-              <a:t>90%	Assignments </a:t>
-            </a:r>
-            <a:r>
-              <a:rPr lang="en-US" dirty="0"/>
-              <a:t>– Hands-on assignments for most lessons – may be several per week!</a:t>
-            </a:r>
-          </a:p>
-          <a:p>
-            <a:pPr marL="0" indent="0">
-              <a:buNone/>
-            </a:pPr>
-            <a:r>
-              <a:rPr lang="en-US" dirty="0">
-                <a:solidFill>
-                  <a:srgbClr val="C00000"/>
-                </a:solidFill>
-              </a:rPr>
-              <a:t>Make sure you are registered for the correct status!</a:t>
-            </a:r>
-          </a:p>
-        </p:txBody>
-      </p:sp>
-      <p:sp>
-        <p:nvSpPr>
-          <p:cNvPr id="6" name="Title 1">
-            <a:extLst>
-              <a:ext uri="{FF2B5EF4-FFF2-40B4-BE49-F238E27FC236}">
-                <a16:creationId xmlns:a16="http://schemas.microsoft.com/office/drawing/2014/main" id="{CD29F70F-B868-451B-A65D-8721F4C7A2D9}"/>
-              </a:ext>
-            </a:extLst>
-          </p:cNvPr>
-          <p:cNvSpPr txBox="1">
-            <a:spLocks/>
-          </p:cNvSpPr>
-          <p:nvPr/>
-        </p:nvSpPr>
-        <p:spPr>
-          <a:xfrm>
-            <a:off x="838200" y="-635"/>
-            <a:ext cx="10515600" cy="1325563"/>
-          </a:xfrm>
-          <a:prstGeom prst="rect">
-            <a:avLst/>
-          </a:prstGeom>
-        </p:spPr>
-        <p:txBody>
-          <a:bodyPr vert="horz" lIns="91440" tIns="45720" rIns="91440" bIns="45720" rtlCol="0" anchor="ctr">
-            <a:normAutofit/>
-          </a:bodyPr>
-          <a:lstStyle>
-            <a:lvl1pPr algn="l" defTabSz="914400" rtl="0" eaLnBrk="1" latinLnBrk="0" hangingPunct="1">
-              <a:lnSpc>
-                <a:spcPct val="90000"/>
-              </a:lnSpc>
-              <a:spcBef>
-                <a:spcPct val="0"/>
-              </a:spcBef>
-              <a:buNone/>
-              <a:defRPr sz="4400" kern="1200">
-                <a:solidFill>
-                  <a:schemeClr val="tx1"/>
-                </a:solidFill>
-                <a:latin typeface="+mj-lt"/>
-                <a:ea typeface="+mj-ea"/>
-                <a:cs typeface="+mj-cs"/>
-              </a:defRPr>
-            </a:lvl1pPr>
-          </a:lstStyle>
-          <a:p>
-            <a:r>
-              <a:rPr lang="en-US" dirty="0">
-                <a:latin typeface="+mn-lt"/>
-              </a:rPr>
-              <a:t>Undergraduate Credit Grades</a:t>
-            </a:r>
-          </a:p>
-        </p:txBody>
-      </p:sp>
-    </p:spTree>
-    <p:extLst>
-      <p:ext uri="{BB962C8B-B14F-4D97-AF65-F5344CB8AC3E}">
-        <p14:creationId xmlns:p14="http://schemas.microsoft.com/office/powerpoint/2010/main" val="4016463822"/>
-      </p:ext>
-    </p:extLst>
-  </p:cSld>
-  <p:clrMapOvr>
-    <a:masterClrMapping/>
-  </p:clrMapOvr>
-  <p:timing>
-    <p:tnLst>
-      <p:par>
-        <p:cTn id="1" dur="indefinite" restart="never" nodeType="tmRoot">
-          <p:childTnLst>
-            <p:seq concurrent="1" nextAc="seek">
-              <p:cTn id="2" dur="indefinite" nodeType="mainSeq">
-                <p:childTnLst>
-                  <p:par>
-                    <p:cTn id="3" fill="hold">
-                      <p:stCondLst>
-                        <p:cond delay="indefinite"/>
-                      </p:stCondLst>
-                      <p:childTnLst>
-                        <p:par>
-                          <p:cTn id="4" fill="hold">
-                            <p:stCondLst>
-                              <p:cond delay="0"/>
-                            </p:stCondLst>
-                            <p:childTnLst>
-                              <p:par>
-                                <p:cTn id="5" presetID="1" presetClass="entr" presetSubtype="0" fill="hold" nodeType="clickEffect">
-                                  <p:stCondLst>
-                                    <p:cond delay="0"/>
-                                  </p:stCondLst>
-                                  <p:childTnLst>
-                                    <p:set>
-                                      <p:cBhvr>
-                                        <p:cTn id="6" dur="1" fill="hold">
-                                          <p:stCondLst>
-                                            <p:cond delay="0"/>
-                                          </p:stCondLst>
-                                        </p:cTn>
-                                        <p:tgtEl>
-                                          <p:spTgt spid="3">
-                                            <p:txEl>
-                                              <p:pRg st="0" end="0"/>
-                                            </p:txEl>
-                                          </p:spTgt>
-                                        </p:tgtEl>
-                                        <p:attrNameLst>
-                                          <p:attrName>style.visibility</p:attrName>
-                                        </p:attrNameLst>
-                                      </p:cBhvr>
-                                      <p:to>
-                                        <p:strVal val="visible"/>
-                                      </p:to>
-                                    </p:set>
-                                  </p:childTnLst>
-                                </p:cTn>
-                              </p:par>
-                            </p:childTnLst>
-                          </p:cTn>
-                        </p:par>
-                      </p:childTnLst>
-                    </p:cTn>
-                  </p:par>
-                  <p:par>
-                    <p:cTn id="7" fill="hold">
-                      <p:stCondLst>
-                        <p:cond delay="indefinite"/>
-                      </p:stCondLst>
-                      <p:childTnLst>
-                        <p:par>
-                          <p:cTn id="8" fill="hold">
-                            <p:stCondLst>
-                              <p:cond delay="0"/>
-                            </p:stCondLst>
-                            <p:childTnLst>
-                              <p:par>
-                                <p:cTn id="9" presetID="1" presetClass="entr" presetSubtype="0" fill="hold" nodeType="clickEffect">
-                                  <p:stCondLst>
-                                    <p:cond delay="0"/>
-                                  </p:stCondLst>
-                                  <p:childTnLst>
-                                    <p:set>
-                                      <p:cBhvr>
-                                        <p:cTn id="10" dur="1" fill="hold">
-                                          <p:stCondLst>
-                                            <p:cond delay="0"/>
-                                          </p:stCondLst>
-                                        </p:cTn>
-                                        <p:tgtEl>
-                                          <p:spTgt spid="3">
-                                            <p:txEl>
-                                              <p:pRg st="1" end="1"/>
-                                            </p:txEl>
-                                          </p:spTgt>
-                                        </p:tgtEl>
-                                        <p:attrNameLst>
-                                          <p:attrName>style.visibility</p:attrName>
-                                        </p:attrNameLst>
-                                      </p:cBhvr>
-                                      <p:to>
-                                        <p:strVal val="visible"/>
-                                      </p:to>
-                                    </p:set>
-                                  </p:childTnLst>
-                                </p:cTn>
-                              </p:par>
-                            </p:childTnLst>
-                          </p:cTn>
-                        </p:par>
-                      </p:childTnLst>
-                    </p:cTn>
-                  </p:par>
-                  <p:par>
-                    <p:cTn id="11" fill="hold">
-                      <p:stCondLst>
-                        <p:cond delay="indefinite"/>
-                      </p:stCondLst>
-                      <p:childTnLst>
-                        <p:par>
-                          <p:cTn id="12" fill="hold">
-                            <p:stCondLst>
-                              <p:cond delay="0"/>
-                            </p:stCondLst>
-                            <p:childTnLst>
-                              <p:par>
-                                <p:cTn id="13" presetID="1" presetClass="entr" presetSubtype="0" fill="hold" nodeType="clickEffect">
-                                  <p:stCondLst>
-                                    <p:cond delay="0"/>
-                                  </p:stCondLst>
-                                  <p:childTnLst>
-                                    <p:set>
-                                      <p:cBhvr>
-                                        <p:cTn id="14" dur="1" fill="hold">
-                                          <p:stCondLst>
-                                            <p:cond delay="0"/>
-                                          </p:stCondLst>
-                                        </p:cTn>
-                                        <p:tgtEl>
-                                          <p:spTgt spid="3">
-                                            <p:txEl>
-                                              <p:pRg st="2" end="2"/>
-                                            </p:txEl>
-                                          </p:spTgt>
-                                        </p:tgtEl>
-                                        <p:attrNameLst>
-                                          <p:attrName>style.visibility</p:attrName>
-                                        </p:attrNameLst>
-                                      </p:cBhvr>
-                                      <p:to>
-                                        <p:strVal val="visible"/>
-                                      </p:to>
-                                    </p:set>
-                                  </p:childTnLst>
-                                </p:cTn>
-                              </p:par>
-                            </p:childTnLst>
-                          </p:cTn>
-                        </p:par>
-                      </p:childTnLst>
-                    </p:cTn>
-                  </p:par>
-                  <p:par>
-                    <p:cTn id="15" fill="hold">
-                      <p:stCondLst>
-                        <p:cond delay="indefinite"/>
-                      </p:stCondLst>
-                      <p:childTnLst>
-                        <p:par>
-                          <p:cTn id="16" fill="hold">
-                            <p:stCondLst>
-                              <p:cond delay="0"/>
-                            </p:stCondLst>
-                            <p:childTnLst>
-                              <p:par>
-                                <p:cTn id="17" presetID="1" presetClass="entr" presetSubtype="0" fill="hold" nodeType="clickEffect">
-                                  <p:stCondLst>
-                                    <p:cond delay="0"/>
-                                  </p:stCondLst>
-                                  <p:childTnLst>
-                                    <p:set>
-                                      <p:cBhvr>
-                                        <p:cTn id="18" dur="1" fill="hold">
-                                          <p:stCondLst>
-                                            <p:cond delay="0"/>
-                                          </p:stCondLst>
-                                        </p:cTn>
-                                        <p:tgtEl>
-                                          <p:spTgt spid="3">
-                                            <p:txEl>
-                                              <p:pRg st="3" end="3"/>
-                                            </p:txEl>
-                                          </p:spTgt>
-                                        </p:tgtEl>
-                                        <p:attrNameLst>
-                                          <p:attrName>style.visibility</p:attrName>
-                                        </p:attrNameLst>
-                                      </p:cBhvr>
-                                      <p:to>
-                                        <p:strVal val="visible"/>
-                                      </p:to>
-                                    </p:set>
-                                  </p:childTnLst>
-                                </p:cTn>
-                              </p:par>
-                            </p:childTnLst>
-                          </p:cTn>
-                        </p:par>
-                      </p:childTnLst>
-                    </p:cTn>
-                  </p:par>
-                </p:childTnLst>
-              </p:cTn>
-              <p:prevCondLst>
-                <p:cond evt="onPrev" delay="0">
-                  <p:tgtEl>
-                    <p:sldTgt/>
-                  </p:tgtEl>
-                </p:cond>
-              </p:prevCondLst>
-              <p:nextCondLst>
-                <p:cond evt="onNext" delay="0">
-                  <p:tgtEl>
-                    <p:sldTgt/>
-                  </p:tgtEl>
-                </p:cond>
-              </p:nextCondLst>
-            </p:seq>
-          </p:childTnLst>
-        </p:cTn>
-      </p:par>
-    </p:tnLst>
-  </p:timing>
-</p:sld>
-</file>
-
-<file path=ppt/slides/slide13.xml><?xml version="1.0" encoding="utf-8"?>
-<p:sld xmlns:a="http://schemas.openxmlformats.org/drawingml/2006/main" xmlns:r="http://schemas.openxmlformats.org/officeDocument/2006/relationships" xmlns:p="http://schemas.openxmlformats.org/presentationml/2006/main">
-  <p:cSld>
-    <p:spTree>
-      <p:nvGrpSpPr>
-        <p:cNvPr id="1" name=""/>
-        <p:cNvGrpSpPr/>
-        <p:nvPr/>
-      </p:nvGrpSpPr>
-      <p:grpSpPr>
-        <a:xfrm>
-          <a:off x="0" y="0"/>
-          <a:ext cx="0" cy="0"/>
-          <a:chOff x="0" y="0"/>
-          <a:chExt cx="0" cy="0"/>
-        </a:xfrm>
-      </p:grpSpPr>
-      <p:sp>
-        <p:nvSpPr>
-          <p:cNvPr id="3" name="Content Placeholder 2">
-            <a:extLst>
-              <a:ext uri="{FF2B5EF4-FFF2-40B4-BE49-F238E27FC236}">
-                <a16:creationId xmlns:a16="http://schemas.microsoft.com/office/drawing/2014/main" id="{258E6AF3-7615-4BD1-878E-A94C93E98F90}"/>
-              </a:ext>
-            </a:extLst>
-          </p:cNvPr>
-          <p:cNvSpPr>
-            <a:spLocks noGrp="1"/>
-          </p:cNvSpPr>
-          <p:nvPr>
-            <p:ph idx="1"/>
-          </p:nvPr>
-        </p:nvSpPr>
-        <p:spPr>
-          <a:xfrm>
-            <a:off x="838200" y="1324927"/>
-            <a:ext cx="10515600" cy="4898217"/>
-          </a:xfrm>
-        </p:spPr>
-        <p:txBody>
-          <a:bodyPr>
-            <a:normAutofit lnSpcReduction="10000"/>
-          </a:bodyPr>
-          <a:lstStyle/>
-          <a:p>
-            <a:pPr marL="0" indent="0">
-              <a:buNone/>
-            </a:pPr>
-            <a:r>
-              <a:rPr lang="en-US" dirty="0"/>
-              <a:t>Students enrolled for graduate credit are evaluated by the following weights: </a:t>
-            </a:r>
-          </a:p>
-          <a:p>
-            <a:r>
-              <a:rPr lang="en-US" b="1" dirty="0"/>
-              <a:t>10% Class Participation </a:t>
-            </a:r>
-            <a:r>
-              <a:rPr lang="en-US" dirty="0"/>
-              <a:t>– Class participation in online discussions</a:t>
-            </a:r>
-          </a:p>
-          <a:p>
-            <a:r>
-              <a:rPr lang="en-US" b="1" dirty="0"/>
-              <a:t>6</a:t>
-            </a:r>
-            <a:r>
-              <a:rPr lang="en-US" b="1"/>
-              <a:t>0</a:t>
-            </a:r>
-            <a:r>
-              <a:rPr lang="en-US" b="1" dirty="0"/>
-              <a:t>%	Assignments </a:t>
-            </a:r>
-            <a:r>
-              <a:rPr lang="en-US" dirty="0"/>
-              <a:t>– Hands-on assignments for most lessons – may be several per week!</a:t>
-            </a:r>
-          </a:p>
-          <a:p>
-            <a:r>
-              <a:rPr lang="en-US" b="1" dirty="0"/>
-              <a:t>5% Project proposal </a:t>
-            </a:r>
-            <a:r>
-              <a:rPr lang="en-US" dirty="0"/>
-              <a:t>– Proposal describing the problem you wish to address and methods you plan to apply. Based on your proposal, your instructor will approve your project as appropriate for the course. </a:t>
-            </a:r>
-          </a:p>
-          <a:p>
-            <a:r>
-              <a:rPr lang="en-US" b="1" dirty="0"/>
-              <a:t>25%	Project </a:t>
-            </a:r>
-            <a:r>
-              <a:rPr lang="en-US" dirty="0"/>
-              <a:t>– Independent data mining project report – More on this Friday</a:t>
-            </a:r>
-          </a:p>
-          <a:p>
-            <a:pPr marL="0" indent="0">
-              <a:buNone/>
-            </a:pPr>
-            <a:r>
-              <a:rPr lang="en-US" dirty="0">
-                <a:solidFill>
-                  <a:srgbClr val="C00000"/>
-                </a:solidFill>
-              </a:rPr>
-              <a:t>Make sure you are registered for the correct status!</a:t>
-            </a:r>
-          </a:p>
-        </p:txBody>
-      </p:sp>
-      <p:sp>
-        <p:nvSpPr>
-          <p:cNvPr id="6" name="Title 1">
-            <a:extLst>
-              <a:ext uri="{FF2B5EF4-FFF2-40B4-BE49-F238E27FC236}">
-                <a16:creationId xmlns:a16="http://schemas.microsoft.com/office/drawing/2014/main" id="{CD29F70F-B868-451B-A65D-8721F4C7A2D9}"/>
-              </a:ext>
-            </a:extLst>
-          </p:cNvPr>
-          <p:cNvSpPr txBox="1">
-            <a:spLocks/>
-          </p:cNvSpPr>
-          <p:nvPr/>
-        </p:nvSpPr>
-        <p:spPr>
-          <a:xfrm>
-            <a:off x="838200" y="-635"/>
-            <a:ext cx="10515600" cy="1325563"/>
-          </a:xfrm>
-          <a:prstGeom prst="rect">
-            <a:avLst/>
-          </a:prstGeom>
-        </p:spPr>
-        <p:txBody>
-          <a:bodyPr vert="horz" lIns="91440" tIns="45720" rIns="91440" bIns="45720" rtlCol="0" anchor="ctr">
-            <a:normAutofit/>
-          </a:bodyPr>
-          <a:lstStyle>
-            <a:lvl1pPr algn="l" defTabSz="914400" rtl="0" eaLnBrk="1" latinLnBrk="0" hangingPunct="1">
-              <a:lnSpc>
-                <a:spcPct val="90000"/>
-              </a:lnSpc>
-              <a:spcBef>
-                <a:spcPct val="0"/>
-              </a:spcBef>
-              <a:buNone/>
-              <a:defRPr sz="4400" kern="1200">
-                <a:solidFill>
-                  <a:schemeClr val="tx1"/>
-                </a:solidFill>
-                <a:latin typeface="+mj-lt"/>
-                <a:ea typeface="+mj-ea"/>
-                <a:cs typeface="+mj-cs"/>
-              </a:defRPr>
-            </a:lvl1pPr>
-          </a:lstStyle>
-          <a:p>
-            <a:r>
-              <a:rPr lang="en-US" dirty="0">
-                <a:latin typeface="+mn-lt"/>
-              </a:rPr>
-              <a:t>Graduate Credit Grades</a:t>
-            </a:r>
-          </a:p>
-        </p:txBody>
-      </p:sp>
-    </p:spTree>
-    <p:extLst>
-      <p:ext uri="{BB962C8B-B14F-4D97-AF65-F5344CB8AC3E}">
-        <p14:creationId xmlns:p14="http://schemas.microsoft.com/office/powerpoint/2010/main" val="3245357042"/>
-      </p:ext>
-    </p:extLst>
-  </p:cSld>
-  <p:clrMapOvr>
-    <a:masterClrMapping/>
-  </p:clrMapOvr>
-  <p:timing>
-    <p:tnLst>
-      <p:par>
-        <p:cTn id="1" dur="indefinite" restart="never" nodeType="tmRoot">
-          <p:childTnLst>
-            <p:seq concurrent="1" nextAc="seek">
-              <p:cTn id="2" dur="indefinite" nodeType="mainSeq">
-                <p:childTnLst>
-                  <p:par>
-                    <p:cTn id="3" fill="hold">
-                      <p:stCondLst>
-                        <p:cond delay="indefinite"/>
-                      </p:stCondLst>
-                      <p:childTnLst>
-                        <p:par>
-                          <p:cTn id="4" fill="hold">
-                            <p:stCondLst>
-                              <p:cond delay="0"/>
-                            </p:stCondLst>
-                            <p:childTnLst>
-                              <p:par>
-                                <p:cTn id="5" presetID="1" presetClass="entr" presetSubtype="0" fill="hold" nodeType="clickEffect">
-                                  <p:stCondLst>
-                                    <p:cond delay="0"/>
-                                  </p:stCondLst>
-                                  <p:childTnLst>
-                                    <p:set>
-                                      <p:cBhvr>
-                                        <p:cTn id="6" dur="1" fill="hold">
-                                          <p:stCondLst>
-                                            <p:cond delay="0"/>
-                                          </p:stCondLst>
-                                        </p:cTn>
-                                        <p:tgtEl>
-                                          <p:spTgt spid="3">
-                                            <p:txEl>
-                                              <p:pRg st="0" end="0"/>
-                                            </p:txEl>
-                                          </p:spTgt>
-                                        </p:tgtEl>
-                                        <p:attrNameLst>
-                                          <p:attrName>style.visibility</p:attrName>
-                                        </p:attrNameLst>
-                                      </p:cBhvr>
-                                      <p:to>
-                                        <p:strVal val="visible"/>
-                                      </p:to>
-                                    </p:set>
-                                  </p:childTnLst>
-                                </p:cTn>
-                              </p:par>
-                            </p:childTnLst>
-                          </p:cTn>
-                        </p:par>
-                      </p:childTnLst>
-                    </p:cTn>
-                  </p:par>
-                  <p:par>
-                    <p:cTn id="7" fill="hold">
-                      <p:stCondLst>
-                        <p:cond delay="indefinite"/>
-                      </p:stCondLst>
-                      <p:childTnLst>
-                        <p:par>
-                          <p:cTn id="8" fill="hold">
-                            <p:stCondLst>
-                              <p:cond delay="0"/>
-                            </p:stCondLst>
-                            <p:childTnLst>
-                              <p:par>
-                                <p:cTn id="9" presetID="1" presetClass="entr" presetSubtype="0" fill="hold" nodeType="clickEffect">
-                                  <p:stCondLst>
-                                    <p:cond delay="0"/>
-                                  </p:stCondLst>
-                                  <p:childTnLst>
-                                    <p:set>
-                                      <p:cBhvr>
-                                        <p:cTn id="10" dur="1" fill="hold">
-                                          <p:stCondLst>
-                                            <p:cond delay="0"/>
-                                          </p:stCondLst>
-                                        </p:cTn>
-                                        <p:tgtEl>
-                                          <p:spTgt spid="3">
-                                            <p:txEl>
-                                              <p:pRg st="1" end="1"/>
-                                            </p:txEl>
-                                          </p:spTgt>
-                                        </p:tgtEl>
-                                        <p:attrNameLst>
-                                          <p:attrName>style.visibility</p:attrName>
-                                        </p:attrNameLst>
-                                      </p:cBhvr>
-                                      <p:to>
-                                        <p:strVal val="visible"/>
-                                      </p:to>
-                                    </p:set>
-                                  </p:childTnLst>
-                                </p:cTn>
-                              </p:par>
-                            </p:childTnLst>
-                          </p:cTn>
-                        </p:par>
-                      </p:childTnLst>
-                    </p:cTn>
-                  </p:par>
-                  <p:par>
-                    <p:cTn id="11" fill="hold">
-                      <p:stCondLst>
-                        <p:cond delay="indefinite"/>
-                      </p:stCondLst>
-                      <p:childTnLst>
-                        <p:par>
-                          <p:cTn id="12" fill="hold">
-                            <p:stCondLst>
-                              <p:cond delay="0"/>
-                            </p:stCondLst>
-                            <p:childTnLst>
-                              <p:par>
-                                <p:cTn id="13" presetID="1" presetClass="entr" presetSubtype="0" fill="hold" nodeType="clickEffect">
-                                  <p:stCondLst>
-                                    <p:cond delay="0"/>
-                                  </p:stCondLst>
-                                  <p:childTnLst>
-                                    <p:set>
-                                      <p:cBhvr>
-                                        <p:cTn id="14" dur="1" fill="hold">
-                                          <p:stCondLst>
-                                            <p:cond delay="0"/>
-                                          </p:stCondLst>
-                                        </p:cTn>
-                                        <p:tgtEl>
-                                          <p:spTgt spid="3">
-                                            <p:txEl>
-                                              <p:pRg st="2" end="2"/>
-                                            </p:txEl>
-                                          </p:spTgt>
-                                        </p:tgtEl>
-                                        <p:attrNameLst>
-                                          <p:attrName>style.visibility</p:attrName>
-                                        </p:attrNameLst>
-                                      </p:cBhvr>
-                                      <p:to>
-                                        <p:strVal val="visible"/>
-                                      </p:to>
-                                    </p:set>
-                                  </p:childTnLst>
-                                </p:cTn>
-                              </p:par>
-                            </p:childTnLst>
-                          </p:cTn>
-                        </p:par>
-                      </p:childTnLst>
-                    </p:cTn>
-                  </p:par>
-                  <p:par>
-                    <p:cTn id="15" fill="hold">
-                      <p:stCondLst>
-                        <p:cond delay="indefinite"/>
-                      </p:stCondLst>
-                      <p:childTnLst>
-                        <p:par>
-                          <p:cTn id="16" fill="hold">
-                            <p:stCondLst>
-                              <p:cond delay="0"/>
-                            </p:stCondLst>
-                            <p:childTnLst>
-                              <p:par>
-                                <p:cTn id="17" presetID="1" presetClass="entr" presetSubtype="0" fill="hold" nodeType="clickEffect">
-                                  <p:stCondLst>
-                                    <p:cond delay="0"/>
-                                  </p:stCondLst>
-                                  <p:childTnLst>
-                                    <p:set>
-                                      <p:cBhvr>
-                                        <p:cTn id="18" dur="1" fill="hold">
-                                          <p:stCondLst>
-                                            <p:cond delay="0"/>
-                                          </p:stCondLst>
-                                        </p:cTn>
-                                        <p:tgtEl>
-                                          <p:spTgt spid="3">
-                                            <p:txEl>
-                                              <p:pRg st="3" end="3"/>
-                                            </p:txEl>
-                                          </p:spTgt>
-                                        </p:tgtEl>
-                                        <p:attrNameLst>
-                                          <p:attrName>style.visibility</p:attrName>
-                                        </p:attrNameLst>
-                                      </p:cBhvr>
-                                      <p:to>
-                                        <p:strVal val="visible"/>
-                                      </p:to>
-                                    </p:set>
-                                  </p:childTnLst>
-                                </p:cTn>
-                              </p:par>
-                            </p:childTnLst>
-                          </p:cTn>
-                        </p:par>
-                      </p:childTnLst>
-                    </p:cTn>
-                  </p:par>
-                  <p:par>
-                    <p:cTn id="19" fill="hold">
-                      <p:stCondLst>
-                        <p:cond delay="indefinite"/>
-                      </p:stCondLst>
-                      <p:childTnLst>
-                        <p:par>
-                          <p:cTn id="20" fill="hold">
-                            <p:stCondLst>
-                              <p:cond delay="0"/>
-                            </p:stCondLst>
-                            <p:childTnLst>
-                              <p:par>
-                                <p:cTn id="21" presetID="1" presetClass="entr" presetSubtype="0" fill="hold" nodeType="clickEffect">
-                                  <p:stCondLst>
-                                    <p:cond delay="0"/>
-                                  </p:stCondLst>
-                                  <p:childTnLst>
-                                    <p:set>
-                                      <p:cBhvr>
-                                        <p:cTn id="22" dur="1" fill="hold">
-                                          <p:stCondLst>
-                                            <p:cond delay="0"/>
-                                          </p:stCondLst>
-                                        </p:cTn>
-                                        <p:tgtEl>
-                                          <p:spTgt spid="3">
-                                            <p:txEl>
-                                              <p:pRg st="4" end="4"/>
-                                            </p:txEl>
-                                          </p:spTgt>
-                                        </p:tgtEl>
-                                        <p:attrNameLst>
-                                          <p:attrName>style.visibility</p:attrName>
-                                        </p:attrNameLst>
-                                      </p:cBhvr>
-                                      <p:to>
-                                        <p:strVal val="visible"/>
-                                      </p:to>
-                                    </p:set>
-                                  </p:childTnLst>
-                                </p:cTn>
-                              </p:par>
-                            </p:childTnLst>
-                          </p:cTn>
-                        </p:par>
-                      </p:childTnLst>
-                    </p:cTn>
-                  </p:par>
-                  <p:par>
-                    <p:cTn id="23" fill="hold">
-                      <p:stCondLst>
-                        <p:cond delay="indefinite"/>
-                      </p:stCondLst>
-                      <p:childTnLst>
-                        <p:par>
-                          <p:cTn id="24" fill="hold">
-                            <p:stCondLst>
-                              <p:cond delay="0"/>
-                            </p:stCondLst>
-                            <p:childTnLst>
-                              <p:par>
-                                <p:cTn id="25" presetID="1" presetClass="entr" presetSubtype="0" fill="hold" nodeType="clickEffect">
-                                  <p:stCondLst>
-                                    <p:cond delay="0"/>
-                                  </p:stCondLst>
-                                  <p:childTnLst>
-                                    <p:set>
-                                      <p:cBhvr>
-                                        <p:cTn id="26" dur="1" fill="hold">
-                                          <p:stCondLst>
-                                            <p:cond delay="0"/>
-                                          </p:stCondLst>
-                                        </p:cTn>
-                                        <p:tgtEl>
-                                          <p:spTgt spid="3">
-                                            <p:txEl>
-                                              <p:pRg st="5" end="5"/>
-                                            </p:txEl>
-                                          </p:spTgt>
-                                        </p:tgtEl>
-                                        <p:attrNameLst>
-                                          <p:attrName>style.visibility</p:attrName>
-                                        </p:attrNameLst>
-                                      </p:cBhvr>
-                                      <p:to>
-                                        <p:strVal val="visible"/>
-                                      </p:to>
-                                    </p:set>
-                                  </p:childTnLst>
-                                </p:cTn>
-                              </p:par>
-                            </p:childTnLst>
-                          </p:cTn>
-                        </p:par>
-                      </p:childTnLst>
-                    </p:cTn>
-                  </p:par>
-                </p:childTnLst>
-              </p:cTn>
-              <p:prevCondLst>
-                <p:cond evt="onPrev" delay="0">
-                  <p:tgtEl>
-                    <p:sldTgt/>
-                  </p:tgtEl>
-                </p:cond>
-              </p:prevCondLst>
-              <p:nextCondLst>
-                <p:cond evt="onNext" delay="0">
-                  <p:tgtEl>
-                    <p:sldTgt/>
-                  </p:tgtEl>
-                </p:cond>
-              </p:nextCondLst>
-            </p:seq>
-          </p:childTnLst>
-        </p:cTn>
-      </p:par>
-    </p:tnLst>
-  </p:timing>
-</p:sld>
-</file>
-
 <file path=ppt/slides/slide14.xml><?xml version="1.0" encoding="utf-8"?>
 <p:sld xmlns:a="http://schemas.openxmlformats.org/drawingml/2006/main" xmlns:r="http://schemas.openxmlformats.org/officeDocument/2006/relationships" xmlns:p="http://schemas.openxmlformats.org/presentationml/2006/main">
   <p:cSld>
@@ -6672,7 +6881,7 @@
             </a:r>
             <a:r>
               <a:rPr lang="en-US" dirty="0"/>
-              <a:t>In a 7 week session there is very </a:t>
+              <a:t>With 9-10 assignments and a project, there is very </a:t>
             </a:r>
             <a:r>
               <a:rPr lang="en-US" b="1" dirty="0"/>
@@ -6697,14 +6906,14 @@
             <a:pPr lvl="1"/>
             <a:r>
               <a:rPr lang="en-US" dirty="0"/>
-              <a:t>Up to 4 days late - less 20% </a:t>
+              <a:t>Up to 6 days late - less 20% </a:t>
             </a:r>
           </a:p>
           <a:p>
             <a:pPr lvl="1"/>
             <a:r>
               <a:rPr lang="en-US" dirty="0"/>
-              <a:t>More than 4 days late - no credit   </a:t>
+              <a:t>More than 6 days late - no credit   </a:t>
             </a:r>
           </a:p>
           <a:p>
@@ -6721,21 +6930,8 @@
                   <a:srgbClr val="C00000"/>
                 </a:solidFill>
               </a:rPr>
-              <a:t>Make sure you turn in work </a:t>
-            </a:r>
-            <a:r>
-              <a:rPr lang="en-US">
-                <a:solidFill>
-                  <a:srgbClr val="C00000"/>
-                </a:solidFill>
-              </a:rPr>
-              <a:t>on time!</a:t>
-            </a:r>
-            <a:endParaRPr lang="en-US" dirty="0">
-              <a:solidFill>
-                <a:srgbClr val="C00000"/>
-              </a:solidFill>
-            </a:endParaRPr>
+              <a:t>Make sure you turn in work on time!</a:t>
+            </a:r>
           </a:p>
         </p:txBody>
       </p:sp>
@@ -8442,8 +8638,8 @@
           <a:chExt cx="0" cy="0"/>
         </a:xfrm>
       </p:grpSpPr>
-      <mc:AlternateContent xmlns:mc="http://schemas.openxmlformats.org/markup-compatibility/2006">
-        <mc:Choice xmlns:a14="http://schemas.microsoft.com/office/drawing/2010/main" Requires="a14">
+      <mc:AlternateContent xmlns:mc="http://schemas.openxmlformats.org/markup-compatibility/2006" xmlns:a14="http://schemas.microsoft.com/office/drawing/2010/main">
+        <mc:Choice Requires="a14">
           <p:sp>
             <p:nvSpPr>
               <p:cNvPr id="3" name="Content Placeholder 2">
@@ -8572,7 +8768,7 @@
             </p:txBody>
           </p:sp>
         </mc:Choice>
-        <mc:Fallback>
+        <mc:Fallback xmlns="">
           <p:sp>
             <p:nvSpPr>
               <p:cNvPr id="3" name="Content Placeholder 2">
@@ -9637,8 +9833,8 @@
           <a:chExt cx="0" cy="0"/>
         </a:xfrm>
       </p:grpSpPr>
-      <mc:AlternateContent xmlns:mc="http://schemas.openxmlformats.org/markup-compatibility/2006">
-        <mc:Choice xmlns:a14="http://schemas.microsoft.com/office/drawing/2010/main" Requires="a14">
+      <mc:AlternateContent xmlns:mc="http://schemas.openxmlformats.org/markup-compatibility/2006" xmlns:a14="http://schemas.microsoft.com/office/drawing/2010/main">
+        <mc:Choice Requires="a14">
           <p:sp>
             <p:nvSpPr>
               <p:cNvPr id="3" name="Content Placeholder 2">
@@ -9907,7 +10103,7 @@
             </p:txBody>
           </p:sp>
         </mc:Choice>
-        <mc:Fallback>
+        <mc:Fallback xmlns="">
           <p:sp>
             <p:nvSpPr>
               <p:cNvPr id="3" name="Content Placeholder 2">
@@ -10489,7 +10685,11 @@
             <a:pPr lvl="1"/>
             <a:r>
               <a:rPr lang="en-US" dirty="0"/>
-              <a:t>Data mining is the science of knowledge discovery  </a:t>
+              <a:t>Data mining is the science of </a:t>
+            </a:r>
+            <a:r>
+              <a:rPr lang="en-US" b="1" dirty="0"/>
+              <a:t>knowledge discovery  </a:t>
             </a:r>
           </a:p>
           <a:p>
@@ -26943,8 +27143,8 @@
           <a:chExt cx="0" cy="0"/>
         </a:xfrm>
       </p:grpSpPr>
-      <mc:AlternateContent xmlns:mc="http://schemas.openxmlformats.org/markup-compatibility/2006">
-        <mc:Choice xmlns:a14="http://schemas.microsoft.com/office/drawing/2010/main" Requires="a14">
+      <mc:AlternateContent xmlns:mc="http://schemas.openxmlformats.org/markup-compatibility/2006" xmlns:a14="http://schemas.microsoft.com/office/drawing/2010/main">
+        <mc:Choice Requires="a14">
           <p:sp>
             <p:nvSpPr>
               <p:cNvPr id="3" name="Content Placeholder 2">
@@ -27158,7 +27358,7 @@
             </p:txBody>
           </p:sp>
         </mc:Choice>
-        <mc:Fallback>
+        <mc:Fallback xmlns="">
           <p:sp>
             <p:nvSpPr>
               <p:cNvPr id="3" name="Content Placeholder 2">
@@ -31362,8 +31562,8 @@
           <a:chExt cx="0" cy="0"/>
         </a:xfrm>
       </p:grpSpPr>
-      <mc:AlternateContent xmlns:mc="http://schemas.openxmlformats.org/markup-compatibility/2006">
-        <mc:Choice xmlns:a14="http://schemas.microsoft.com/office/drawing/2010/main" Requires="a14">
+      <mc:AlternateContent xmlns:mc="http://schemas.openxmlformats.org/markup-compatibility/2006" xmlns:a14="http://schemas.microsoft.com/office/drawing/2010/main">
+        <mc:Choice Requires="a14">
           <p:sp>
             <p:nvSpPr>
               <p:cNvPr id="3" name="Content Placeholder 2">
@@ -31558,21 +31758,7 @@
                           <a:latin typeface="Cambria Math" panose="02040503050406030204" pitchFamily="18" charset="0"/>
                           <a:ea typeface="Cambria Math" panose="02040503050406030204" pitchFamily="18" charset="0"/>
                         </a:rPr>
-                        <m:t>=49</m:t>
-                      </m:r>
-                      <m:r>
-                        <a:rPr lang="en-US" sz="3200" b="0" i="1" smtClean="0">
-                          <a:latin typeface="Cambria Math" panose="02040503050406030204" pitchFamily="18" charset="0"/>
-                          <a:ea typeface="Cambria Math" panose="02040503050406030204" pitchFamily="18" charset="0"/>
-                        </a:rPr>
-                        <m:t>9,5</m:t>
-                      </m:r>
-                      <m:r>
-                        <a:rPr lang="en-US" sz="3200" b="0" i="1" smtClean="0">
-                          <a:latin typeface="Cambria Math" panose="02040503050406030204" pitchFamily="18" charset="0"/>
-                          <a:ea typeface="Cambria Math" panose="02040503050406030204" pitchFamily="18" charset="0"/>
-                        </a:rPr>
-                        <m:t>00</m:t>
+                        <m:t>=499,500</m:t>
                       </m:r>
                     </m:oMath>
                   </m:oMathPara>
@@ -31585,7 +31771,7 @@
             </p:txBody>
           </p:sp>
         </mc:Choice>
-        <mc:Fallback>
+        <mc:Fallback xmlns="">
           <p:sp>
             <p:nvSpPr>
               <p:cNvPr id="3" name="Content Placeholder 2">
@@ -31990,8 +32176,8 @@
           <a:chExt cx="0" cy="0"/>
         </a:xfrm>
       </p:grpSpPr>
-      <mc:AlternateContent xmlns:mc="http://schemas.openxmlformats.org/markup-compatibility/2006">
-        <mc:Choice xmlns:a14="http://schemas.microsoft.com/office/drawing/2010/main" Requires="a14">
+      <mc:AlternateContent xmlns:mc="http://schemas.openxmlformats.org/markup-compatibility/2006" xmlns:a14="http://schemas.microsoft.com/office/drawing/2010/main">
+        <mc:Choice Requires="a14">
           <p:sp>
             <p:nvSpPr>
               <p:cNvPr id="3" name="Content Placeholder 2">
@@ -32164,7 +32350,7 @@
             </p:txBody>
           </p:sp>
         </mc:Choice>
-        <mc:Fallback>
+        <mc:Fallback xmlns="">
           <p:sp>
             <p:nvSpPr>
               <p:cNvPr id="3" name="Content Placeholder 2">
@@ -40327,7 +40513,7 @@
           <a:p>
             <a:r>
               <a:rPr lang="en-US" sz="3200" dirty="0"/>
-              <a:t>No!</a:t>
+              <a:t>Perhaps? </a:t>
             </a:r>
           </a:p>
           <a:p>
@@ -40896,7 +41082,7 @@
 </file>
 
 <file path=ppt/slides/slide8.xml><?xml version="1.0" encoding="utf-8"?>
-<p:sld xmlns:a="http://schemas.openxmlformats.org/drawingml/2006/main" xmlns:r="http://schemas.openxmlformats.org/officeDocument/2006/relationships" xmlns:p="http://schemas.openxmlformats.org/presentationml/2006/main">
+<p:sld xmlns:a="http://schemas.openxmlformats.org/drawingml/2006/main" xmlns:r="http://schemas.openxmlformats.org/officeDocument/2006/relationships" xmlns:p="http://schemas.openxmlformats.org/presentationml/2006/main" show="0">
   <p:cSld>
     <p:spTree>
       <p:nvGrpSpPr>
@@ -41003,7 +41189,7 @@
             <a:pPr lvl="1"/>
             <a:r>
               <a:rPr lang="en-US" dirty="0"/>
-              <a:t>Expect 7-8 assignments </a:t>
+              <a:t>Expect 9-10 assignments </a:t>
             </a:r>
           </a:p>
           <a:p>

</xml_diff>

<commit_message>
Updated and corrected slides
</commit_message>
<xml_diff>
--- a/slides/1_Introduction.pptx
+++ b/slides/1_Introduction.pptx
@@ -5,7 +5,7 @@
     <p:sldMasterId id="2147483648" r:id="rId1"/>
   </p:sldMasterIdLst>
   <p:notesMasterIdLst>
-    <p:notesMasterId r:id="rId48"/>
+    <p:notesMasterId r:id="rId49"/>
   </p:notesMasterIdLst>
   <p:sldIdLst>
     <p:sldId id="256" r:id="rId2"/>
@@ -53,7 +53,8 @@
     <p:sldId id="369" r:id="rId44"/>
     <p:sldId id="373" r:id="rId45"/>
     <p:sldId id="370" r:id="rId46"/>
-    <p:sldId id="384" r:id="rId47"/>
+    <p:sldId id="398" r:id="rId47"/>
+    <p:sldId id="384" r:id="rId48"/>
   </p:sldIdLst>
   <p:sldSz cx="12192000" cy="6858000"/>
   <p:notesSz cx="6858000" cy="9144000"/>
@@ -932,6 +933,93 @@
     <p:extLst>
       <p:ext uri="{BB962C8B-B14F-4D97-AF65-F5344CB8AC3E}">
         <p14:creationId xmlns:p14="http://schemas.microsoft.com/office/powerpoint/2010/main" val="567326122"/>
+      </p:ext>
+    </p:extLst>
+  </p:cSld>
+  <p:clrMapOvr>
+    <a:masterClrMapping/>
+  </p:clrMapOvr>
+</p:notes>
+</file>
+
+<file path=ppt/notesSlides/notesSlide6.xml><?xml version="1.0" encoding="utf-8"?>
+<p:notes xmlns:a="http://schemas.openxmlformats.org/drawingml/2006/main" xmlns:r="http://schemas.openxmlformats.org/officeDocument/2006/relationships" xmlns:p="http://schemas.openxmlformats.org/presentationml/2006/main">
+  <p:cSld>
+    <p:spTree>
+      <p:nvGrpSpPr>
+        <p:cNvPr id="1" name=""/>
+        <p:cNvGrpSpPr/>
+        <p:nvPr/>
+      </p:nvGrpSpPr>
+      <p:grpSpPr>
+        <a:xfrm>
+          <a:off x="0" y="0"/>
+          <a:ext cx="0" cy="0"/>
+          <a:chOff x="0" y="0"/>
+          <a:chExt cx="0" cy="0"/>
+        </a:xfrm>
+      </p:grpSpPr>
+      <p:sp>
+        <p:nvSpPr>
+          <p:cNvPr id="2" name="Slide Image Placeholder 1"/>
+          <p:cNvSpPr>
+            <a:spLocks noGrp="1" noRot="1" noChangeAspect="1"/>
+          </p:cNvSpPr>
+          <p:nvPr>
+            <p:ph type="sldImg"/>
+          </p:nvPr>
+        </p:nvSpPr>
+        <p:spPr/>
+      </p:sp>
+      <p:sp>
+        <p:nvSpPr>
+          <p:cNvPr id="3" name="Notes Placeholder 2"/>
+          <p:cNvSpPr>
+            <a:spLocks noGrp="1"/>
+          </p:cNvSpPr>
+          <p:nvPr>
+            <p:ph type="body" idx="1"/>
+          </p:nvPr>
+        </p:nvSpPr>
+        <p:spPr/>
+        <p:txBody>
+          <a:bodyPr/>
+          <a:lstStyle/>
+          <a:p>
+            <a:r>
+              <a:rPr lang="en-US" dirty="0"/>
+              <a:t>The cu</a:t>
+            </a:r>
+          </a:p>
+        </p:txBody>
+      </p:sp>
+      <p:sp>
+        <p:nvSpPr>
+          <p:cNvPr id="4" name="Slide Number Placeholder 3"/>
+          <p:cNvSpPr>
+            <a:spLocks noGrp="1"/>
+          </p:cNvSpPr>
+          <p:nvPr>
+            <p:ph type="sldNum" sz="quarter" idx="5"/>
+          </p:nvPr>
+        </p:nvSpPr>
+        <p:spPr/>
+        <p:txBody>
+          <a:bodyPr/>
+          <a:lstStyle/>
+          <a:p>
+            <a:fld id="{F33E01E3-981B-4CB5-81ED-65C622C255CB}" type="slidenum">
+              <a:rPr lang="en-US" smtClean="0"/>
+              <a:t>46</a:t>
+            </a:fld>
+            <a:endParaRPr lang="en-US"/>
+          </a:p>
+        </p:txBody>
+      </p:sp>
+    </p:spTree>
+    <p:extLst>
+      <p:ext uri="{BB962C8B-B14F-4D97-AF65-F5344CB8AC3E}">
+        <p14:creationId xmlns:p14="http://schemas.microsoft.com/office/powerpoint/2010/main" val="988212183"/>
       </p:ext>
     </p:extLst>
   </p:cSld>
@@ -4467,13 +4555,23 @@
             <a:pPr lvl="1"/>
             <a:r>
               <a:rPr lang="en-US" dirty="0"/>
-              <a:t>How to apply efficient graph representations </a:t>
-            </a:r>
-            <a:r>
-              <a:rPr lang="en-US"/>
-              <a:t>and algorithms?  </a:t>
-            </a:r>
-            <a:endParaRPr lang="en-US" dirty="0"/>
+              <a:t>How to apply efficient graph representations and algorithms?</a:t>
+            </a:r>
+          </a:p>
+          <a:p>
+            <a:pPr marL="0" indent="0">
+              <a:buNone/>
+            </a:pPr>
+            <a:r>
+              <a:rPr lang="en-US" dirty="0">
+                <a:solidFill>
+                  <a:schemeClr val="accent1">
+                    <a:lumMod val="75000"/>
+                  </a:schemeClr>
+                </a:solidFill>
+              </a:rPr>
+              <a:t>Data engineering is not our focus – c.f. CSCI E-88  </a:t>
+            </a:r>
           </a:p>
           <a:p>
             <a:pPr marL="0" indent="0">
@@ -5047,6 +5145,55 @@
                       </p:childTnLst>
                     </p:cTn>
                   </p:par>
+                  <p:par>
+                    <p:cTn id="43" fill="hold">
+                      <p:stCondLst>
+                        <p:cond delay="indefinite"/>
+                      </p:stCondLst>
+                      <p:childTnLst>
+                        <p:par>
+                          <p:cTn id="44" fill="hold">
+                            <p:stCondLst>
+                              <p:cond delay="0"/>
+                            </p:stCondLst>
+                            <p:childTnLst>
+                              <p:par>
+                                <p:cTn id="45" presetID="1" presetClass="entr" presetSubtype="0" fill="hold" nodeType="clickEffect">
+                                  <p:stCondLst>
+                                    <p:cond delay="0"/>
+                                  </p:stCondLst>
+                                  <p:childTnLst>
+                                    <p:set>
+                                      <p:cBhvr>
+                                        <p:cTn id="46" dur="1" fill="hold">
+                                          <p:stCondLst>
+                                            <p:cond delay="0"/>
+                                          </p:stCondLst>
+                                        </p:cTn>
+                                        <p:tgtEl>
+                                          <p:spTgt spid="3">
+                                            <p:txEl>
+                                              <p:pRg st="10" end="10"/>
+                                            </p:txEl>
+                                          </p:spTgt>
+                                        </p:tgtEl>
+                                        <p:attrNameLst>
+                                          <p:attrName>style.visibility</p:attrName>
+                                        </p:attrNameLst>
+                                      </p:cBhvr>
+                                      <p:to>
+                                        <p:strVal val="visible"/>
+                                      </p:to>
+                                    </p:set>
+                                  </p:childTnLst>
+                                </p:cTn>
+                              </p:par>
+                            </p:childTnLst>
+                          </p:cTn>
+                        </p:par>
+                      </p:childTnLst>
+                    </p:cTn>
+                  </p:par>
                 </p:childTnLst>
               </p:cTn>
               <p:prevCondLst>
@@ -5208,7 +5355,7 @@
             </a:pPr>
             <a:r>
               <a:rPr lang="en-US" dirty="0"/>
-              <a:t>Required reading primarily from two texts: </a:t>
+              <a:t>Recommended reading primarily from two texts: </a:t>
             </a:r>
           </a:p>
           <a:p>
@@ -8638,8 +8785,8 @@
           <a:chExt cx="0" cy="0"/>
         </a:xfrm>
       </p:grpSpPr>
-      <mc:AlternateContent xmlns:mc="http://schemas.openxmlformats.org/markup-compatibility/2006" xmlns:a14="http://schemas.microsoft.com/office/drawing/2010/main">
-        <mc:Choice Requires="a14">
+      <mc:AlternateContent xmlns:mc="http://schemas.openxmlformats.org/markup-compatibility/2006">
+        <mc:Choice xmlns:a14="http://schemas.microsoft.com/office/drawing/2010/main" Requires="a14">
           <p:sp>
             <p:nvSpPr>
               <p:cNvPr id="3" name="Content Placeholder 2">
@@ -8756,7 +8903,7 @@
               <a:p>
                 <a:r>
                   <a:rPr lang="en-US" sz="3000" dirty="0"/>
-                  <a:t>Map-reduce – scalable parallel processing </a:t>
+                  <a:t>Map-reduce, scalable parallel processing – Next lesson</a:t>
                 </a:r>
               </a:p>
               <a:p>
@@ -8768,7 +8915,7 @@
             </p:txBody>
           </p:sp>
         </mc:Choice>
-        <mc:Fallback xmlns="">
+        <mc:Fallback>
           <p:sp>
             <p:nvSpPr>
               <p:cNvPr id="3" name="Content Placeholder 2">
@@ -13596,8 +13743,8 @@
           <a:chExt cx="0" cy="0"/>
         </a:xfrm>
       </p:grpSpPr>
-      <mc:AlternateContent xmlns:mc="http://schemas.openxmlformats.org/markup-compatibility/2006" xmlns:a14="http://schemas.microsoft.com/office/drawing/2010/main">
-        <mc:Choice Requires="a14">
+      <mc:AlternateContent xmlns:mc="http://schemas.openxmlformats.org/markup-compatibility/2006">
+        <mc:Choice xmlns:a14="http://schemas.microsoft.com/office/drawing/2010/main" Requires="a14">
           <p:sp>
             <p:nvSpPr>
               <p:cNvPr id="3" name="Content Placeholder 2">
@@ -13659,7 +13806,35 @@
               <a:p>
                 <a:r>
                   <a:rPr lang="en-US" sz="3000" dirty="0"/>
-                  <a:t>Hash index is computed from a key using a </a:t>
+                  <a:t>Hash index, </a:t>
+                </a:r>
+                <a14:m>
+                  <m:oMath xmlns:m="http://schemas.openxmlformats.org/officeDocument/2006/math">
+                    <m:r>
+                      <a:rPr lang="en-US" sz="3000" b="0" i="1" smtClean="0">
+                        <a:latin typeface="Cambria Math" panose="02040503050406030204" pitchFamily="18" charset="0"/>
+                      </a:rPr>
+                      <m:t>h</m:t>
+                    </m:r>
+                  </m:oMath>
+                </a14:m>
+                <a:r>
+                  <a:rPr lang="en-US" sz="3000" dirty="0"/>
+                  <a:t>, is computed from a key, </a:t>
+                </a:r>
+                <a14:m>
+                  <m:oMath xmlns:m="http://schemas.openxmlformats.org/officeDocument/2006/math">
+                    <m:r>
+                      <a:rPr lang="en-US" sz="3000" b="0" i="1" smtClean="0">
+                        <a:latin typeface="Cambria Math" panose="02040503050406030204" pitchFamily="18" charset="0"/>
+                      </a:rPr>
+                      <m:t>𝐾</m:t>
+                    </m:r>
+                  </m:oMath>
+                </a14:m>
+                <a:r>
+                  <a:rPr lang="en-US" sz="3000" dirty="0"/>
+                  <a:t>, using a </a:t>
                 </a:r>
                 <a:r>
                   <a:rPr lang="en-US" sz="3000" b="1" dirty="0"/>
@@ -13769,7 +13944,7 @@
             </p:txBody>
           </p:sp>
         </mc:Choice>
-        <mc:Fallback xmlns="">
+        <mc:Fallback>
           <p:sp>
             <p:nvSpPr>
               <p:cNvPr id="3" name="Content Placeholder 2">
@@ -25459,8 +25634,8 @@
           <a:chExt cx="0" cy="0"/>
         </a:xfrm>
       </p:grpSpPr>
-      <mc:AlternateContent xmlns:mc="http://schemas.openxmlformats.org/markup-compatibility/2006" xmlns:a14="http://schemas.microsoft.com/office/drawing/2010/main">
-        <mc:Choice Requires="a14">
+      <mc:AlternateContent xmlns:mc="http://schemas.openxmlformats.org/markup-compatibility/2006">
+        <mc:Choice xmlns:a14="http://schemas.microsoft.com/office/drawing/2010/main" Requires="a14">
           <p:sp>
             <p:nvSpPr>
               <p:cNvPr id="3" name="Content Placeholder 2">
@@ -25661,7 +25836,7 @@
                       </a:schemeClr>
                     </a:solidFill>
                   </a:rPr>
-                  <a:t>: there is a </a:t>
+                  <a:t>: e.g. there is a </a:t>
                 </a:r>
                 <a:r>
                   <a:rPr lang="en-US" b="1" dirty="0">
@@ -25843,7 +26018,7 @@
             </p:txBody>
           </p:sp>
         </mc:Choice>
-        <mc:Fallback xmlns="">
+        <mc:Fallback>
           <p:sp>
             <p:nvSpPr>
               <p:cNvPr id="3" name="Content Placeholder 2">
@@ -25868,7 +26043,7 @@
               <a:blipFill>
                 <a:blip r:embed="rId2"/>
                 <a:stretch>
-                  <a:fillRect l="-1217" t="-1818"/>
+                  <a:fillRect l="-1217" t="-1818" r="-290"/>
                 </a:stretch>
               </a:blipFill>
             </p:spPr>
@@ -26577,7 +26752,27 @@
                   </a:schemeClr>
                 </a:solidFill>
               </a:rPr>
-              <a:t> we accept or reject the null hypothesis based on the p-value</a:t>
+              <a:t> we can </a:t>
+            </a:r>
+            <a:r>
+              <a:rPr lang="en-US" b="1" dirty="0">
+                <a:solidFill>
+                  <a:schemeClr val="tx1">
+                    <a:lumMod val="50000"/>
+                  </a:schemeClr>
+                </a:solidFill>
+              </a:rPr>
+              <a:t>only reject the null hypothesis</a:t>
+            </a:r>
+            <a:r>
+              <a:rPr lang="en-US" dirty="0">
+                <a:solidFill>
+                  <a:schemeClr val="tx1">
+                    <a:lumMod val="50000"/>
+                  </a:schemeClr>
+                </a:solidFill>
+              </a:rPr>
+              <a:t> based on the p-value</a:t>
             </a:r>
             <a:endParaRPr lang="en-US" b="1" dirty="0">
               <a:solidFill>
@@ -29233,8 +29428,8 @@
           </a:p>
         </p:txBody>
       </p:sp>
-      <mc:AlternateContent xmlns:mc="http://schemas.openxmlformats.org/markup-compatibility/2006" xmlns:a14="http://schemas.microsoft.com/office/drawing/2010/main">
-        <mc:Choice Requires="a14">
+      <mc:AlternateContent xmlns:mc="http://schemas.openxmlformats.org/markup-compatibility/2006">
+        <mc:Choice xmlns:a14="http://schemas.microsoft.com/office/drawing/2010/main" Requires="a14">
           <p:sp>
             <p:nvSpPr>
               <p:cNvPr id="16" name="Content Placeholder 2">
@@ -29440,8 +29635,12 @@
               </a:p>
               <a:p>
                 <a:r>
+                  <a:rPr lang="en-US" b="1" dirty="0"/>
+                  <a:t>Reject the null hypothesis </a:t>
+                </a:r>
+                <a:r>
                   <a:rPr lang="en-US" dirty="0"/>
-                  <a:t>Reject the null hypothesis at 0.9 confidence </a:t>
+                  <a:t>at 0.9 confidence </a:t>
                 </a:r>
                 <a14:m>
                   <m:oMath xmlns:m="http://schemas.openxmlformats.org/officeDocument/2006/math">
@@ -29496,7 +29695,7 @@
             </p:txBody>
           </p:sp>
         </mc:Choice>
-        <mc:Fallback xmlns="">
+        <mc:Fallback>
           <p:sp>
             <p:nvSpPr>
               <p:cNvPr id="16" name="Content Placeholder 2">
@@ -35335,7 +35534,7 @@
             <a:pPr lvl="1"/>
             <a:r>
               <a:rPr lang="en-US" sz="2800" dirty="0"/>
-              <a:t>Want to limit Type II errors – non-discovery   </a:t>
+              <a:t>Must limit Type II errors – non-discovery   </a:t>
             </a:r>
           </a:p>
           <a:p>
@@ -35361,7 +35560,7 @@
           <a:p>
             <a:pPr lvl="1"/>
             <a:r>
-              <a:rPr lang="en-US" sz="2800"/>
+              <a:rPr lang="en-US" sz="2800" dirty="0" err="1"/>
               <a:t>Benjamini</a:t>
             </a:r>
             <a:r>
@@ -39328,6 +39527,244 @@
             <p:ph idx="1"/>
           </p:nvPr>
         </p:nvSpPr>
+        <p:spPr>
+          <a:xfrm>
+            <a:off x="838200" y="1154757"/>
+            <a:ext cx="10515600" cy="565555"/>
+          </a:xfrm>
+        </p:spPr>
+        <p:txBody>
+          <a:bodyPr>
+            <a:normAutofit/>
+          </a:bodyPr>
+          <a:lstStyle/>
+          <a:p>
+            <a:pPr marL="0" indent="0">
+              <a:buNone/>
+            </a:pPr>
+            <a:r>
+              <a:rPr lang="en-US" sz="3200" dirty="0"/>
+              <a:t>Benamini-Hochberg FDR Control</a:t>
+            </a:r>
+            <a:r>
+              <a:rPr lang="en-US" sz="3200"/>
+              <a:t>: Example </a:t>
+            </a:r>
+            <a:endParaRPr lang="en-US" sz="3200" dirty="0"/>
+          </a:p>
+        </p:txBody>
+      </p:sp>
+      <p:sp>
+        <p:nvSpPr>
+          <p:cNvPr id="6" name="Title 1">
+            <a:extLst>
+              <a:ext uri="{FF2B5EF4-FFF2-40B4-BE49-F238E27FC236}">
+                <a16:creationId xmlns:a16="http://schemas.microsoft.com/office/drawing/2014/main" id="{CD29F70F-B868-451B-A65D-8721F4C7A2D9}"/>
+              </a:ext>
+            </a:extLst>
+          </p:cNvPr>
+          <p:cNvSpPr txBox="1">
+            <a:spLocks/>
+          </p:cNvSpPr>
+          <p:nvPr/>
+        </p:nvSpPr>
+        <p:spPr>
+          <a:xfrm>
+            <a:off x="665769" y="0"/>
+            <a:ext cx="11353800" cy="1325563"/>
+          </a:xfrm>
+          <a:prstGeom prst="rect">
+            <a:avLst/>
+          </a:prstGeom>
+        </p:spPr>
+        <p:txBody>
+          <a:bodyPr vert="horz" lIns="91440" tIns="45720" rIns="91440" bIns="45720" rtlCol="0" anchor="ctr">
+            <a:normAutofit/>
+          </a:bodyPr>
+          <a:lstStyle>
+            <a:lvl1pPr algn="l" defTabSz="914400" rtl="0" eaLnBrk="1" latinLnBrk="0" hangingPunct="1">
+              <a:lnSpc>
+                <a:spcPct val="90000"/>
+              </a:lnSpc>
+              <a:spcBef>
+                <a:spcPct val="0"/>
+              </a:spcBef>
+              <a:buNone/>
+              <a:defRPr sz="4400" kern="1200">
+                <a:solidFill>
+                  <a:schemeClr val="tx1"/>
+                </a:solidFill>
+                <a:latin typeface="+mj-lt"/>
+                <a:ea typeface="+mj-ea"/>
+                <a:cs typeface="+mj-cs"/>
+              </a:defRPr>
+            </a:lvl1pPr>
+          </a:lstStyle>
+          <a:p>
+            <a:r>
+              <a:rPr lang="en-US" dirty="0">
+                <a:latin typeface="+mn-lt"/>
+              </a:rPr>
+              <a:t>Large-Scale Comparison Methods</a:t>
+            </a:r>
+          </a:p>
+        </p:txBody>
+      </p:sp>
+      <p:pic>
+        <p:nvPicPr>
+          <p:cNvPr id="4" name="Picture 3">
+            <a:extLst>
+              <a:ext uri="{FF2B5EF4-FFF2-40B4-BE49-F238E27FC236}">
+                <a16:creationId xmlns:a16="http://schemas.microsoft.com/office/drawing/2014/main" id="{4FC56F0B-9A19-8FB2-E4DB-367B2EA0C60A}"/>
+              </a:ext>
+            </a:extLst>
+          </p:cNvPr>
+          <p:cNvPicPr>
+            <a:picLocks noChangeAspect="1"/>
+          </p:cNvPicPr>
+          <p:nvPr/>
+        </p:nvPicPr>
+        <p:blipFill>
+          <a:blip r:embed="rId3"/>
+          <a:stretch>
+            <a:fillRect/>
+          </a:stretch>
+        </p:blipFill>
+        <p:spPr>
+          <a:xfrm>
+            <a:off x="2256117" y="1720312"/>
+            <a:ext cx="6287045" cy="5048688"/>
+          </a:xfrm>
+          <a:prstGeom prst="rect">
+            <a:avLst/>
+          </a:prstGeom>
+        </p:spPr>
+      </p:pic>
+    </p:spTree>
+    <p:extLst>
+      <p:ext uri="{BB962C8B-B14F-4D97-AF65-F5344CB8AC3E}">
+        <p14:creationId xmlns:p14="http://schemas.microsoft.com/office/powerpoint/2010/main" val="299402614"/>
+      </p:ext>
+    </p:extLst>
+  </p:cSld>
+  <p:clrMapOvr>
+    <a:masterClrMapping/>
+  </p:clrMapOvr>
+  <p:timing>
+    <p:tnLst>
+      <p:par>
+        <p:cTn id="1" dur="indefinite" restart="never" nodeType="tmRoot">
+          <p:childTnLst>
+            <p:seq concurrent="1" nextAc="seek">
+              <p:cTn id="2" dur="indefinite" nodeType="mainSeq">
+                <p:childTnLst>
+                  <p:par>
+                    <p:cTn id="3" fill="hold">
+                      <p:stCondLst>
+                        <p:cond delay="indefinite"/>
+                      </p:stCondLst>
+                      <p:childTnLst>
+                        <p:par>
+                          <p:cTn id="4" fill="hold">
+                            <p:stCondLst>
+                              <p:cond delay="0"/>
+                            </p:stCondLst>
+                            <p:childTnLst>
+                              <p:par>
+                                <p:cTn id="5" presetID="1" presetClass="entr" presetSubtype="0" fill="hold" nodeType="clickEffect">
+                                  <p:stCondLst>
+                                    <p:cond delay="0"/>
+                                  </p:stCondLst>
+                                  <p:childTnLst>
+                                    <p:set>
+                                      <p:cBhvr>
+                                        <p:cTn id="6" dur="1" fill="hold">
+                                          <p:stCondLst>
+                                            <p:cond delay="0"/>
+                                          </p:stCondLst>
+                                        </p:cTn>
+                                        <p:tgtEl>
+                                          <p:spTgt spid="3">
+                                            <p:txEl>
+                                              <p:pRg st="0" end="0"/>
+                                            </p:txEl>
+                                          </p:spTgt>
+                                        </p:tgtEl>
+                                        <p:attrNameLst>
+                                          <p:attrName>style.visibility</p:attrName>
+                                        </p:attrNameLst>
+                                      </p:cBhvr>
+                                      <p:to>
+                                        <p:strVal val="visible"/>
+                                      </p:to>
+                                    </p:set>
+                                  </p:childTnLst>
+                                </p:cTn>
+                              </p:par>
+                            </p:childTnLst>
+                          </p:cTn>
+                        </p:par>
+                      </p:childTnLst>
+                    </p:cTn>
+                  </p:par>
+                </p:childTnLst>
+              </p:cTn>
+              <p:prevCondLst>
+                <p:cond evt="onPrev" delay="0">
+                  <p:tgtEl>
+                    <p:sldTgt/>
+                  </p:tgtEl>
+                </p:cond>
+              </p:prevCondLst>
+              <p:nextCondLst>
+                <p:cond evt="onNext" delay="0">
+                  <p:tgtEl>
+                    <p:sldTgt/>
+                  </p:tgtEl>
+                </p:cond>
+              </p:nextCondLst>
+            </p:seq>
+          </p:childTnLst>
+        </p:cTn>
+      </p:par>
+    </p:tnLst>
+  </p:timing>
+</p:sld>
+</file>
+
+<file path=ppt/slides/slide47.xml><?xml version="1.0" encoding="utf-8"?>
+<p:sld xmlns:a="http://schemas.openxmlformats.org/drawingml/2006/main" xmlns:r="http://schemas.openxmlformats.org/officeDocument/2006/relationships" xmlns:p="http://schemas.openxmlformats.org/presentationml/2006/main">
+  <p:cSld>
+    <p:spTree>
+      <p:nvGrpSpPr>
+        <p:cNvPr id="1" name=""/>
+        <p:cNvGrpSpPr/>
+        <p:nvPr/>
+      </p:nvGrpSpPr>
+      <p:grpSpPr>
+        <a:xfrm>
+          <a:off x="0" y="0"/>
+          <a:ext cx="0" cy="0"/>
+          <a:chOff x="0" y="0"/>
+          <a:chExt cx="0" cy="0"/>
+        </a:xfrm>
+      </p:grpSpPr>
+      <p:sp>
+        <p:nvSpPr>
+          <p:cNvPr id="3" name="Content Placeholder 2">
+            <a:extLst>
+              <a:ext uri="{FF2B5EF4-FFF2-40B4-BE49-F238E27FC236}">
+                <a16:creationId xmlns:a16="http://schemas.microsoft.com/office/drawing/2014/main" id="{258E6AF3-7615-4BD1-878E-A94C93E98F90}"/>
+              </a:ext>
+            </a:extLst>
+          </p:cNvPr>
+          <p:cNvSpPr>
+            <a:spLocks noGrp="1"/>
+          </p:cNvSpPr>
+          <p:nvPr>
+            <p:ph idx="1"/>
+          </p:nvPr>
+        </p:nvSpPr>
         <p:spPr/>
         <p:txBody>
           <a:bodyPr/>

</xml_diff>

<commit_message>
Corrected spelling of Benjamini
</commit_message>
<xml_diff>
--- a/slides/1_Introduction.pptx
+++ b/slides/1_Introduction.pptx
@@ -254,7 +254,7 @@
           <a:p>
             <a:fld id="{2F3ABF1A-8818-4472-8518-E71DC7B5D2F7}" type="datetimeFigureOut">
               <a:rPr lang="en-US" smtClean="0"/>
-              <a:t>6/20/2023</a:t>
+              <a:t>6/28/2023</a:t>
             </a:fld>
             <a:endParaRPr lang="en-US"/>
           </a:p>
@@ -1274,7 +1274,7 @@
           <a:p>
             <a:fld id="{6E4A31BF-7266-4BEB-918B-ADC21C630A6F}" type="datetimeFigureOut">
               <a:rPr lang="en-US" smtClean="0"/>
-              <a:t>6/20/2023</a:t>
+              <a:t>6/28/2023</a:t>
             </a:fld>
             <a:endParaRPr lang="en-US"/>
           </a:p>
@@ -1472,7 +1472,7 @@
           <a:p>
             <a:fld id="{6E4A31BF-7266-4BEB-918B-ADC21C630A6F}" type="datetimeFigureOut">
               <a:rPr lang="en-US" smtClean="0"/>
-              <a:t>6/20/2023</a:t>
+              <a:t>6/28/2023</a:t>
             </a:fld>
             <a:endParaRPr lang="en-US"/>
           </a:p>
@@ -1680,7 +1680,7 @@
           <a:p>
             <a:fld id="{6E4A31BF-7266-4BEB-918B-ADC21C630A6F}" type="datetimeFigureOut">
               <a:rPr lang="en-US" smtClean="0"/>
-              <a:t>6/20/2023</a:t>
+              <a:t>6/28/2023</a:t>
             </a:fld>
             <a:endParaRPr lang="en-US"/>
           </a:p>
@@ -1878,7 +1878,7 @@
           <a:p>
             <a:fld id="{6E4A31BF-7266-4BEB-918B-ADC21C630A6F}" type="datetimeFigureOut">
               <a:rPr lang="en-US" smtClean="0"/>
-              <a:t>6/20/2023</a:t>
+              <a:t>6/28/2023</a:t>
             </a:fld>
             <a:endParaRPr lang="en-US"/>
           </a:p>
@@ -2153,7 +2153,7 @@
           <a:p>
             <a:fld id="{6E4A31BF-7266-4BEB-918B-ADC21C630A6F}" type="datetimeFigureOut">
               <a:rPr lang="en-US" smtClean="0"/>
-              <a:t>6/20/2023</a:t>
+              <a:t>6/28/2023</a:t>
             </a:fld>
             <a:endParaRPr lang="en-US"/>
           </a:p>
@@ -2418,7 +2418,7 @@
           <a:p>
             <a:fld id="{6E4A31BF-7266-4BEB-918B-ADC21C630A6F}" type="datetimeFigureOut">
               <a:rPr lang="en-US" smtClean="0"/>
-              <a:t>6/20/2023</a:t>
+              <a:t>6/28/2023</a:t>
             </a:fld>
             <a:endParaRPr lang="en-US"/>
           </a:p>
@@ -2830,7 +2830,7 @@
           <a:p>
             <a:fld id="{6E4A31BF-7266-4BEB-918B-ADC21C630A6F}" type="datetimeFigureOut">
               <a:rPr lang="en-US" smtClean="0"/>
-              <a:t>6/20/2023</a:t>
+              <a:t>6/28/2023</a:t>
             </a:fld>
             <a:endParaRPr lang="en-US"/>
           </a:p>
@@ -2971,7 +2971,7 @@
           <a:p>
             <a:fld id="{6E4A31BF-7266-4BEB-918B-ADC21C630A6F}" type="datetimeFigureOut">
               <a:rPr lang="en-US" smtClean="0"/>
-              <a:t>6/20/2023</a:t>
+              <a:t>6/28/2023</a:t>
             </a:fld>
             <a:endParaRPr lang="en-US"/>
           </a:p>
@@ -3084,7 +3084,7 @@
           <a:p>
             <a:fld id="{6E4A31BF-7266-4BEB-918B-ADC21C630A6F}" type="datetimeFigureOut">
               <a:rPr lang="en-US" smtClean="0"/>
-              <a:t>6/20/2023</a:t>
+              <a:t>6/28/2023</a:t>
             </a:fld>
             <a:endParaRPr lang="en-US"/>
           </a:p>
@@ -3395,7 +3395,7 @@
           <a:p>
             <a:fld id="{6E4A31BF-7266-4BEB-918B-ADC21C630A6F}" type="datetimeFigureOut">
               <a:rPr lang="en-US" smtClean="0"/>
-              <a:t>6/20/2023</a:t>
+              <a:t>6/28/2023</a:t>
             </a:fld>
             <a:endParaRPr lang="en-US"/>
           </a:p>
@@ -3683,7 +3683,7 @@
           <a:p>
             <a:fld id="{6E4A31BF-7266-4BEB-918B-ADC21C630A6F}" type="datetimeFigureOut">
               <a:rPr lang="en-US" smtClean="0"/>
-              <a:t>6/20/2023</a:t>
+              <a:t>6/28/2023</a:t>
             </a:fld>
             <a:endParaRPr lang="en-US"/>
           </a:p>
@@ -3924,7 +3924,7 @@
           <a:p>
             <a:fld id="{6E4A31BF-7266-4BEB-918B-ADC21C630A6F}" type="datetimeFigureOut">
               <a:rPr lang="en-US" smtClean="0"/>
-              <a:t>6/20/2023</a:t>
+              <a:t>6/28/2023</a:t>
             </a:fld>
             <a:endParaRPr lang="en-US"/>
           </a:p>
@@ -38254,8 +38254,12 @@
                   <a:buNone/>
                 </a:pPr>
                 <a:r>
+                  <a:rPr lang="en-US" sz="3200" dirty="0" err="1"/>
+                  <a:t>Benjamini</a:t>
+                </a:r>
+                <a:r>
                   <a:rPr lang="en-US" sz="3200" dirty="0"/>
-                  <a:t>Benamini-Hochberg FDR Control </a:t>
+                  <a:t>-Hochberg FDR Control </a:t>
                 </a:r>
               </a:p>
               <a:p>
@@ -39310,14 +39314,13 @@
               <a:buNone/>
             </a:pPr>
             <a:r>
+              <a:rPr lang="en-US" sz="3200" dirty="0" err="1"/>
+              <a:t>Benjamini</a:t>
+            </a:r>
+            <a:r>
               <a:rPr lang="en-US" sz="3200" dirty="0"/>
-              <a:t>Benamini-Hochberg FDR Control</a:t>
-            </a:r>
-            <a:r>
-              <a:rPr lang="en-US" sz="3200"/>
-              <a:t>: Example </a:t>
-            </a:r>
-            <a:endParaRPr lang="en-US" sz="3200" dirty="0"/>
+              <a:t>-Hochberg FDR Control: Example </a:t>
+            </a:r>
           </a:p>
         </p:txBody>
       </p:sp>

</xml_diff>

<commit_message>
Corrected typo on truth table slide
</commit_message>
<xml_diff>
--- a/slides/1_Introduction.pptx
+++ b/slides/1_Introduction.pptx
@@ -256,7 +256,7 @@
           <a:p>
             <a:fld id="{2F3ABF1A-8818-4472-8518-E71DC7B5D2F7}" type="datetimeFigureOut">
               <a:rPr lang="en-US" smtClean="0"/>
-              <a:t>1/21/2024</a:t>
+              <a:t>1/23/2024</a:t>
             </a:fld>
             <a:endParaRPr lang="en-US"/>
           </a:p>
@@ -1276,7 +1276,7 @@
           <a:p>
             <a:fld id="{6E4A31BF-7266-4BEB-918B-ADC21C630A6F}" type="datetimeFigureOut">
               <a:rPr lang="en-US" smtClean="0"/>
-              <a:t>1/21/2024</a:t>
+              <a:t>1/23/2024</a:t>
             </a:fld>
             <a:endParaRPr lang="en-US"/>
           </a:p>
@@ -1474,7 +1474,7 @@
           <a:p>
             <a:fld id="{6E4A31BF-7266-4BEB-918B-ADC21C630A6F}" type="datetimeFigureOut">
               <a:rPr lang="en-US" smtClean="0"/>
-              <a:t>1/21/2024</a:t>
+              <a:t>1/23/2024</a:t>
             </a:fld>
             <a:endParaRPr lang="en-US"/>
           </a:p>
@@ -1682,7 +1682,7 @@
           <a:p>
             <a:fld id="{6E4A31BF-7266-4BEB-918B-ADC21C630A6F}" type="datetimeFigureOut">
               <a:rPr lang="en-US" smtClean="0"/>
-              <a:t>1/21/2024</a:t>
+              <a:t>1/23/2024</a:t>
             </a:fld>
             <a:endParaRPr lang="en-US"/>
           </a:p>
@@ -1880,7 +1880,7 @@
           <a:p>
             <a:fld id="{6E4A31BF-7266-4BEB-918B-ADC21C630A6F}" type="datetimeFigureOut">
               <a:rPr lang="en-US" smtClean="0"/>
-              <a:t>1/21/2024</a:t>
+              <a:t>1/23/2024</a:t>
             </a:fld>
             <a:endParaRPr lang="en-US"/>
           </a:p>
@@ -2155,7 +2155,7 @@
           <a:p>
             <a:fld id="{6E4A31BF-7266-4BEB-918B-ADC21C630A6F}" type="datetimeFigureOut">
               <a:rPr lang="en-US" smtClean="0"/>
-              <a:t>1/21/2024</a:t>
+              <a:t>1/23/2024</a:t>
             </a:fld>
             <a:endParaRPr lang="en-US"/>
           </a:p>
@@ -2420,7 +2420,7 @@
           <a:p>
             <a:fld id="{6E4A31BF-7266-4BEB-918B-ADC21C630A6F}" type="datetimeFigureOut">
               <a:rPr lang="en-US" smtClean="0"/>
-              <a:t>1/21/2024</a:t>
+              <a:t>1/23/2024</a:t>
             </a:fld>
             <a:endParaRPr lang="en-US"/>
           </a:p>
@@ -2832,7 +2832,7 @@
           <a:p>
             <a:fld id="{6E4A31BF-7266-4BEB-918B-ADC21C630A6F}" type="datetimeFigureOut">
               <a:rPr lang="en-US" smtClean="0"/>
-              <a:t>1/21/2024</a:t>
+              <a:t>1/23/2024</a:t>
             </a:fld>
             <a:endParaRPr lang="en-US"/>
           </a:p>
@@ -2973,7 +2973,7 @@
           <a:p>
             <a:fld id="{6E4A31BF-7266-4BEB-918B-ADC21C630A6F}" type="datetimeFigureOut">
               <a:rPr lang="en-US" smtClean="0"/>
-              <a:t>1/21/2024</a:t>
+              <a:t>1/23/2024</a:t>
             </a:fld>
             <a:endParaRPr lang="en-US"/>
           </a:p>
@@ -3086,7 +3086,7 @@
           <a:p>
             <a:fld id="{6E4A31BF-7266-4BEB-918B-ADC21C630A6F}" type="datetimeFigureOut">
               <a:rPr lang="en-US" smtClean="0"/>
-              <a:t>1/21/2024</a:t>
+              <a:t>1/23/2024</a:t>
             </a:fld>
             <a:endParaRPr lang="en-US"/>
           </a:p>
@@ -3397,7 +3397,7 @@
           <a:p>
             <a:fld id="{6E4A31BF-7266-4BEB-918B-ADC21C630A6F}" type="datetimeFigureOut">
               <a:rPr lang="en-US" smtClean="0"/>
-              <a:t>1/21/2024</a:t>
+              <a:t>1/23/2024</a:t>
             </a:fld>
             <a:endParaRPr lang="en-US"/>
           </a:p>
@@ -3685,7 +3685,7 @@
           <a:p>
             <a:fld id="{6E4A31BF-7266-4BEB-918B-ADC21C630A6F}" type="datetimeFigureOut">
               <a:rPr lang="en-US" smtClean="0"/>
-              <a:t>1/21/2024</a:t>
+              <a:t>1/23/2024</a:t>
             </a:fld>
             <a:endParaRPr lang="en-US"/>
           </a:p>
@@ -3926,7 +3926,7 @@
           <a:p>
             <a:fld id="{6E4A31BF-7266-4BEB-918B-ADC21C630A6F}" type="datetimeFigureOut">
               <a:rPr lang="en-US" smtClean="0"/>
-              <a:t>1/21/2024</a:t>
+              <a:t>1/23/2024</a:t>
             </a:fld>
             <a:endParaRPr lang="en-US"/>
           </a:p>
@@ -6339,7 +6339,23 @@
                   <a:srgbClr val="FF0000"/>
                 </a:solidFill>
               </a:rPr>
-              <a:t>All class meetings are recorded and available on-demand – See Panopto tab in Canvas</a:t>
+              <a:t>All class meetings are recorded and available on-demand – See </a:t>
+            </a:r>
+            <a:r>
+              <a:rPr lang="en-US">
+                <a:solidFill>
+                  <a:srgbClr val="FF0000"/>
+                </a:solidFill>
+              </a:rPr>
+              <a:t>Class Recordings </a:t>
+            </a:r>
+            <a:r>
+              <a:rPr lang="en-US" dirty="0">
+                <a:solidFill>
+                  <a:srgbClr val="FF0000"/>
+                </a:solidFill>
+              </a:rPr>
+              <a:t>tab in Canvas</a:t>
             </a:r>
           </a:p>
           <a:p>
@@ -10820,8 +10836,8 @@
           <a:chExt cx="0" cy="0"/>
         </a:xfrm>
       </p:grpSpPr>
-      <mc:AlternateContent xmlns:mc="http://schemas.openxmlformats.org/markup-compatibility/2006">
-        <mc:Choice xmlns:a14="http://schemas.microsoft.com/office/drawing/2010/main" Requires="a14">
+      <mc:AlternateContent xmlns:mc="http://schemas.openxmlformats.org/markup-compatibility/2006" xmlns:a14="http://schemas.microsoft.com/office/drawing/2010/main">
+        <mc:Choice Requires="a14">
           <p:sp>
             <p:nvSpPr>
               <p:cNvPr id="3" name="Content Placeholder 2">
@@ -10986,7 +11002,7 @@
             </p:txBody>
           </p:sp>
         </mc:Choice>
-        <mc:Fallback>
+        <mc:Fallback xmlns="">
           <p:sp>
             <p:nvSpPr>
               <p:cNvPr id="3" name="Content Placeholder 2">
@@ -11629,8 +11645,8 @@
           <a:chExt cx="0" cy="0"/>
         </a:xfrm>
       </p:grpSpPr>
-      <mc:AlternateContent xmlns:mc="http://schemas.openxmlformats.org/markup-compatibility/2006">
-        <mc:Choice xmlns:a14="http://schemas.microsoft.com/office/drawing/2010/main" Requires="a14">
+      <mc:AlternateContent xmlns:mc="http://schemas.openxmlformats.org/markup-compatibility/2006" xmlns:a14="http://schemas.microsoft.com/office/drawing/2010/main">
+        <mc:Choice Requires="a14">
           <p:sp>
             <p:nvSpPr>
               <p:cNvPr id="3" name="Content Placeholder 2">
@@ -11907,7 +11923,7 @@
             </p:txBody>
           </p:sp>
         </mc:Choice>
-        <mc:Fallback>
+        <mc:Fallback xmlns="">
           <p:sp>
             <p:nvSpPr>
               <p:cNvPr id="3" name="Content Placeholder 2">
@@ -15337,8 +15353,8 @@
           <a:chExt cx="0" cy="0"/>
         </a:xfrm>
       </p:grpSpPr>
-      <mc:AlternateContent xmlns:mc="http://schemas.openxmlformats.org/markup-compatibility/2006">
-        <mc:Choice xmlns:a14="http://schemas.microsoft.com/office/drawing/2010/main" Requires="a14">
+      <mc:AlternateContent xmlns:mc="http://schemas.openxmlformats.org/markup-compatibility/2006" xmlns:a14="http://schemas.microsoft.com/office/drawing/2010/main">
+        <mc:Choice Requires="a14">
           <p:sp>
             <p:nvSpPr>
               <p:cNvPr id="3" name="Content Placeholder 2">
@@ -15534,7 +15550,7 @@
             </p:txBody>
           </p:sp>
         </mc:Choice>
-        <mc:Fallback>
+        <mc:Fallback xmlns="">
           <p:sp>
             <p:nvSpPr>
               <p:cNvPr id="3" name="Content Placeholder 2">
@@ -17235,8 +17251,8 @@
           </a:p>
         </p:txBody>
       </p:sp>
-      <mc:AlternateContent xmlns:mc="http://schemas.openxmlformats.org/markup-compatibility/2006">
-        <mc:Choice xmlns:a14="http://schemas.microsoft.com/office/drawing/2010/main" Requires="a14">
+      <mc:AlternateContent xmlns:mc="http://schemas.openxmlformats.org/markup-compatibility/2006" xmlns:a14="http://schemas.microsoft.com/office/drawing/2010/main">
+        <mc:Choice Requires="a14">
           <p:sp>
             <p:nvSpPr>
               <p:cNvPr id="42" name="Content Placeholder 2">
@@ -17521,7 +17537,7 @@
             </p:txBody>
           </p:sp>
         </mc:Choice>
-        <mc:Fallback>
+        <mc:Fallback xmlns="">
           <p:sp>
             <p:nvSpPr>
               <p:cNvPr id="42" name="Content Placeholder 2">
@@ -21715,8 +21731,8 @@
           <a:chExt cx="0" cy="0"/>
         </a:xfrm>
       </p:grpSpPr>
-      <mc:AlternateContent xmlns:mc="http://schemas.openxmlformats.org/markup-compatibility/2006">
-        <mc:Choice xmlns:a14="http://schemas.microsoft.com/office/drawing/2010/main" Requires="a14">
+      <mc:AlternateContent xmlns:mc="http://schemas.openxmlformats.org/markup-compatibility/2006" xmlns:a14="http://schemas.microsoft.com/office/drawing/2010/main">
+        <mc:Choice Requires="a14">
           <p:sp>
             <p:nvSpPr>
               <p:cNvPr id="3" name="Content Placeholder 2">
@@ -21876,7 +21892,7 @@
             </p:txBody>
           </p:sp>
         </mc:Choice>
-        <mc:Fallback>
+        <mc:Fallback xmlns="">
           <p:sp>
             <p:nvSpPr>
               <p:cNvPr id="3" name="Content Placeholder 2">
@@ -31149,8 +31165,8 @@
           </a:p>
         </p:txBody>
       </p:sp>
-      <mc:AlternateContent xmlns:mc="http://schemas.openxmlformats.org/markup-compatibility/2006" xmlns:a14="http://schemas.microsoft.com/office/drawing/2010/main">
-        <mc:Choice Requires="a14">
+      <mc:AlternateContent xmlns:mc="http://schemas.openxmlformats.org/markup-compatibility/2006">
+        <mc:Choice xmlns:a14="http://schemas.microsoft.com/office/drawing/2010/main" Requires="a14">
           <p:graphicFrame>
             <p:nvGraphicFramePr>
               <p:cNvPr id="2" name="Table 3">
@@ -31166,7 +31182,7 @@
               <p:nvPr>
                 <p:extLst>
                   <p:ext uri="{D42A27DB-BD31-4B8C-83A1-F6EECF244321}">
-                    <p14:modId xmlns:p14="http://schemas.microsoft.com/office/powerpoint/2010/main" val="4121587635"/>
+                    <p14:modId xmlns:p14="http://schemas.microsoft.com/office/powerpoint/2010/main" val="1493759359"/>
                   </p:ext>
                 </p:extLst>
               </p:nvPr>
@@ -31232,7 +31248,15 @@
                                 <a:schemeClr val="tx1"/>
                               </a:solidFill>
                             </a:rPr>
-                            <a:t>Accept </a:t>
+                            <a:t>Fail </a:t>
+                          </a:r>
+                          <a:r>
+                            <a:rPr lang="en-US" sz="2400">
+                              <a:solidFill>
+                                <a:schemeClr val="tx1"/>
+                              </a:solidFill>
+                            </a:rPr>
+                            <a:t>to Reject </a:t>
                           </a:r>
                           <a14:m>
                             <m:oMath xmlns:m="http://schemas.openxmlformats.org/officeDocument/2006/math">
@@ -31552,7 +31576,7 @@
             </a:graphic>
           </p:graphicFrame>
         </mc:Choice>
-        <mc:Fallback xmlns="">
+        <mc:Fallback>
           <p:graphicFrame>
             <p:nvGraphicFramePr>
               <p:cNvPr id="2" name="Table 3">
@@ -31568,7 +31592,7 @@
               <p:nvPr>
                 <p:extLst>
                   <p:ext uri="{D42A27DB-BD31-4B8C-83A1-F6EECF244321}">
-                    <p14:modId xmlns:p14="http://schemas.microsoft.com/office/powerpoint/2010/main" val="4121587635"/>
+                    <p14:modId xmlns:p14="http://schemas.microsoft.com/office/powerpoint/2010/main" val="1493759359"/>
                   </p:ext>
                 </p:extLst>
               </p:nvPr>
@@ -32384,8 +32408,8 @@
           <a:chExt cx="0" cy="0"/>
         </a:xfrm>
       </p:grpSpPr>
-      <mc:AlternateContent xmlns:mc="http://schemas.openxmlformats.org/markup-compatibility/2006">
-        <mc:Choice xmlns:a14="http://schemas.microsoft.com/office/drawing/2010/main" Requires="a14">
+      <mc:AlternateContent xmlns:mc="http://schemas.openxmlformats.org/markup-compatibility/2006" xmlns:a14="http://schemas.microsoft.com/office/drawing/2010/main">
+        <mc:Choice Requires="a14">
           <p:sp>
             <p:nvSpPr>
               <p:cNvPr id="3" name="Content Placeholder 2">
@@ -32593,7 +32617,7 @@
             </p:txBody>
           </p:sp>
         </mc:Choice>
-        <mc:Fallback>
+        <mc:Fallback xmlns="">
           <p:sp>
             <p:nvSpPr>
               <p:cNvPr id="3" name="Content Placeholder 2">
@@ -32949,8 +32973,8 @@
           <a:chExt cx="0" cy="0"/>
         </a:xfrm>
       </p:grpSpPr>
-      <mc:AlternateContent xmlns:mc="http://schemas.openxmlformats.org/markup-compatibility/2006">
-        <mc:Choice xmlns:a14="http://schemas.microsoft.com/office/drawing/2010/main" Requires="a14">
+      <mc:AlternateContent xmlns:mc="http://schemas.openxmlformats.org/markup-compatibility/2006" xmlns:a14="http://schemas.microsoft.com/office/drawing/2010/main">
+        <mc:Choice Requires="a14">
           <p:sp>
             <p:nvSpPr>
               <p:cNvPr id="3" name="Content Placeholder 2">
@@ -33123,7 +33147,7 @@
             </p:txBody>
           </p:sp>
         </mc:Choice>
-        <mc:Fallback>
+        <mc:Fallback xmlns="">
           <p:sp>
             <p:nvSpPr>
               <p:cNvPr id="3" name="Content Placeholder 2">
@@ -36696,8 +36720,8 @@
           <a:chExt cx="0" cy="0"/>
         </a:xfrm>
       </p:grpSpPr>
-      <mc:AlternateContent xmlns:mc="http://schemas.openxmlformats.org/markup-compatibility/2006">
-        <mc:Choice xmlns:a14="http://schemas.microsoft.com/office/drawing/2010/main" Requires="a14">
+      <mc:AlternateContent xmlns:mc="http://schemas.openxmlformats.org/markup-compatibility/2006" xmlns:a14="http://schemas.microsoft.com/office/drawing/2010/main">
+        <mc:Choice Requires="a14">
           <p:sp>
             <p:nvSpPr>
               <p:cNvPr id="3" name="Content Placeholder 2">
@@ -37063,7 +37087,7 @@
             </p:txBody>
           </p:sp>
         </mc:Choice>
-        <mc:Fallback>
+        <mc:Fallback xmlns="">
           <p:sp>
             <p:nvSpPr>
               <p:cNvPr id="3" name="Content Placeholder 2">
@@ -37494,8 +37518,8 @@
           <a:chExt cx="0" cy="0"/>
         </a:xfrm>
       </p:grpSpPr>
-      <mc:AlternateContent xmlns:mc="http://schemas.openxmlformats.org/markup-compatibility/2006">
-        <mc:Choice xmlns:a14="http://schemas.microsoft.com/office/drawing/2010/main" Requires="a14">
+      <mc:AlternateContent xmlns:mc="http://schemas.openxmlformats.org/markup-compatibility/2006" xmlns:a14="http://schemas.microsoft.com/office/drawing/2010/main">
+        <mc:Choice Requires="a14">
           <p:sp>
             <p:nvSpPr>
               <p:cNvPr id="3" name="Content Placeholder 2">
@@ -38096,7 +38120,7 @@
             </p:txBody>
           </p:sp>
         </mc:Choice>
-        <mc:Fallback>
+        <mc:Fallback xmlns="">
           <p:sp>
             <p:nvSpPr>
               <p:cNvPr id="3" name="Content Placeholder 2">
@@ -38730,8 +38754,8 @@
           <a:chExt cx="0" cy="0"/>
         </a:xfrm>
       </p:grpSpPr>
-      <mc:AlternateContent xmlns:mc="http://schemas.openxmlformats.org/markup-compatibility/2006">
-        <mc:Choice xmlns:a14="http://schemas.microsoft.com/office/drawing/2010/main" Requires="a14">
+      <mc:AlternateContent xmlns:mc="http://schemas.openxmlformats.org/markup-compatibility/2006" xmlns:a14="http://schemas.microsoft.com/office/drawing/2010/main">
+        <mc:Choice Requires="a14">
           <p:sp>
             <p:nvSpPr>
               <p:cNvPr id="3" name="Content Placeholder 2">
@@ -39281,7 +39305,7 @@
             </p:txBody>
           </p:sp>
         </mc:Choice>
-        <mc:Fallback>
+        <mc:Fallback xmlns="">
           <p:sp>
             <p:nvSpPr>
               <p:cNvPr id="3" name="Content Placeholder 2">

</xml_diff>

<commit_message>
Minor correction to slides
</commit_message>
<xml_diff>
--- a/slides/1_Introduction.pptx
+++ b/slides/1_Introduction.pptx
@@ -256,7 +256,7 @@
           <a:p>
             <a:fld id="{2F3ABF1A-8818-4472-8518-E71DC7B5D2F7}" type="datetimeFigureOut">
               <a:rPr lang="en-US" smtClean="0"/>
-              <a:t>1/23/2024</a:t>
+              <a:t>1/30/2024</a:t>
             </a:fld>
             <a:endParaRPr lang="en-US"/>
           </a:p>
@@ -1276,7 +1276,7 @@
           <a:p>
             <a:fld id="{6E4A31BF-7266-4BEB-918B-ADC21C630A6F}" type="datetimeFigureOut">
               <a:rPr lang="en-US" smtClean="0"/>
-              <a:t>1/23/2024</a:t>
+              <a:t>1/30/2024</a:t>
             </a:fld>
             <a:endParaRPr lang="en-US"/>
           </a:p>
@@ -1474,7 +1474,7 @@
           <a:p>
             <a:fld id="{6E4A31BF-7266-4BEB-918B-ADC21C630A6F}" type="datetimeFigureOut">
               <a:rPr lang="en-US" smtClean="0"/>
-              <a:t>1/23/2024</a:t>
+              <a:t>1/30/2024</a:t>
             </a:fld>
             <a:endParaRPr lang="en-US"/>
           </a:p>
@@ -1682,7 +1682,7 @@
           <a:p>
             <a:fld id="{6E4A31BF-7266-4BEB-918B-ADC21C630A6F}" type="datetimeFigureOut">
               <a:rPr lang="en-US" smtClean="0"/>
-              <a:t>1/23/2024</a:t>
+              <a:t>1/30/2024</a:t>
             </a:fld>
             <a:endParaRPr lang="en-US"/>
           </a:p>
@@ -1880,7 +1880,7 @@
           <a:p>
             <a:fld id="{6E4A31BF-7266-4BEB-918B-ADC21C630A6F}" type="datetimeFigureOut">
               <a:rPr lang="en-US" smtClean="0"/>
-              <a:t>1/23/2024</a:t>
+              <a:t>1/30/2024</a:t>
             </a:fld>
             <a:endParaRPr lang="en-US"/>
           </a:p>
@@ -2155,7 +2155,7 @@
           <a:p>
             <a:fld id="{6E4A31BF-7266-4BEB-918B-ADC21C630A6F}" type="datetimeFigureOut">
               <a:rPr lang="en-US" smtClean="0"/>
-              <a:t>1/23/2024</a:t>
+              <a:t>1/30/2024</a:t>
             </a:fld>
             <a:endParaRPr lang="en-US"/>
           </a:p>
@@ -2420,7 +2420,7 @@
           <a:p>
             <a:fld id="{6E4A31BF-7266-4BEB-918B-ADC21C630A6F}" type="datetimeFigureOut">
               <a:rPr lang="en-US" smtClean="0"/>
-              <a:t>1/23/2024</a:t>
+              <a:t>1/30/2024</a:t>
             </a:fld>
             <a:endParaRPr lang="en-US"/>
           </a:p>
@@ -2832,7 +2832,7 @@
           <a:p>
             <a:fld id="{6E4A31BF-7266-4BEB-918B-ADC21C630A6F}" type="datetimeFigureOut">
               <a:rPr lang="en-US" smtClean="0"/>
-              <a:t>1/23/2024</a:t>
+              <a:t>1/30/2024</a:t>
             </a:fld>
             <a:endParaRPr lang="en-US"/>
           </a:p>
@@ -2973,7 +2973,7 @@
           <a:p>
             <a:fld id="{6E4A31BF-7266-4BEB-918B-ADC21C630A6F}" type="datetimeFigureOut">
               <a:rPr lang="en-US" smtClean="0"/>
-              <a:t>1/23/2024</a:t>
+              <a:t>1/30/2024</a:t>
             </a:fld>
             <a:endParaRPr lang="en-US"/>
           </a:p>
@@ -3086,7 +3086,7 @@
           <a:p>
             <a:fld id="{6E4A31BF-7266-4BEB-918B-ADC21C630A6F}" type="datetimeFigureOut">
               <a:rPr lang="en-US" smtClean="0"/>
-              <a:t>1/23/2024</a:t>
+              <a:t>1/30/2024</a:t>
             </a:fld>
             <a:endParaRPr lang="en-US"/>
           </a:p>
@@ -3397,7 +3397,7 @@
           <a:p>
             <a:fld id="{6E4A31BF-7266-4BEB-918B-ADC21C630A6F}" type="datetimeFigureOut">
               <a:rPr lang="en-US" smtClean="0"/>
-              <a:t>1/23/2024</a:t>
+              <a:t>1/30/2024</a:t>
             </a:fld>
             <a:endParaRPr lang="en-US"/>
           </a:p>
@@ -3685,7 +3685,7 @@
           <a:p>
             <a:fld id="{6E4A31BF-7266-4BEB-918B-ADC21C630A6F}" type="datetimeFigureOut">
               <a:rPr lang="en-US" smtClean="0"/>
-              <a:t>1/23/2024</a:t>
+              <a:t>1/30/2024</a:t>
             </a:fld>
             <a:endParaRPr lang="en-US"/>
           </a:p>
@@ -3926,7 +3926,7 @@
           <a:p>
             <a:fld id="{6E4A31BF-7266-4BEB-918B-ADC21C630A6F}" type="datetimeFigureOut">
               <a:rPr lang="en-US" smtClean="0"/>
-              <a:t>1/23/2024</a:t>
+              <a:t>1/30/2024</a:t>
             </a:fld>
             <a:endParaRPr lang="en-US"/>
           </a:p>
@@ -4516,7 +4516,7 @@
             <a:pPr algn="ctr"/>
             <a:r>
               <a:rPr lang="en-US" sz="1100" dirty="0"/>
-              <a:t>Copyright 2021, 2022, 2023, Stephen F Elston. All rights reserved</a:t>
+              <a:t>Copyright 2021, 2022, 2023 2024, Stephen F Elston. All rights reserved</a:t>
             </a:r>
             <a:r>
               <a:rPr lang="en-US" dirty="0"/>
@@ -31165,8 +31165,8 @@
           </a:p>
         </p:txBody>
       </p:sp>
-      <mc:AlternateContent xmlns:mc="http://schemas.openxmlformats.org/markup-compatibility/2006">
-        <mc:Choice xmlns:a14="http://schemas.microsoft.com/office/drawing/2010/main" Requires="a14">
+      <mc:AlternateContent xmlns:mc="http://schemas.openxmlformats.org/markup-compatibility/2006" xmlns:a14="http://schemas.microsoft.com/office/drawing/2010/main">
+        <mc:Choice Requires="a14">
           <p:graphicFrame>
             <p:nvGraphicFramePr>
               <p:cNvPr id="2" name="Table 3">
@@ -31576,7 +31576,7 @@
             </a:graphic>
           </p:graphicFrame>
         </mc:Choice>
-        <mc:Fallback>
+        <mc:Fallback xmlns="">
           <p:graphicFrame>
             <p:nvGraphicFramePr>
               <p:cNvPr id="2" name="Table 3">

</xml_diff>

<commit_message>
Small corrections to sldies from lecture
</commit_message>
<xml_diff>
--- a/slides/1_Introduction.pptx
+++ b/slides/1_Introduction.pptx
@@ -258,7 +258,7 @@
           <a:p>
             <a:fld id="{2F3ABF1A-8818-4472-8518-E71DC7B5D2F7}" type="datetimeFigureOut">
               <a:rPr lang="en-US" smtClean="0"/>
-              <a:t>6/23/2024</a:t>
+              <a:t>6/24/2024</a:t>
             </a:fld>
             <a:endParaRPr lang="en-US"/>
           </a:p>
@@ -1278,7 +1278,7 @@
           <a:p>
             <a:fld id="{6E4A31BF-7266-4BEB-918B-ADC21C630A6F}" type="datetimeFigureOut">
               <a:rPr lang="en-US" smtClean="0"/>
-              <a:t>6/23/2024</a:t>
+              <a:t>6/24/2024</a:t>
             </a:fld>
             <a:endParaRPr lang="en-US"/>
           </a:p>
@@ -1476,7 +1476,7 @@
           <a:p>
             <a:fld id="{6E4A31BF-7266-4BEB-918B-ADC21C630A6F}" type="datetimeFigureOut">
               <a:rPr lang="en-US" smtClean="0"/>
-              <a:t>6/23/2024</a:t>
+              <a:t>6/24/2024</a:t>
             </a:fld>
             <a:endParaRPr lang="en-US"/>
           </a:p>
@@ -1684,7 +1684,7 @@
           <a:p>
             <a:fld id="{6E4A31BF-7266-4BEB-918B-ADC21C630A6F}" type="datetimeFigureOut">
               <a:rPr lang="en-US" smtClean="0"/>
-              <a:t>6/23/2024</a:t>
+              <a:t>6/24/2024</a:t>
             </a:fld>
             <a:endParaRPr lang="en-US"/>
           </a:p>
@@ -1882,7 +1882,7 @@
           <a:p>
             <a:fld id="{6E4A31BF-7266-4BEB-918B-ADC21C630A6F}" type="datetimeFigureOut">
               <a:rPr lang="en-US" smtClean="0"/>
-              <a:t>6/23/2024</a:t>
+              <a:t>6/24/2024</a:t>
             </a:fld>
             <a:endParaRPr lang="en-US"/>
           </a:p>
@@ -2157,7 +2157,7 @@
           <a:p>
             <a:fld id="{6E4A31BF-7266-4BEB-918B-ADC21C630A6F}" type="datetimeFigureOut">
               <a:rPr lang="en-US" smtClean="0"/>
-              <a:t>6/23/2024</a:t>
+              <a:t>6/24/2024</a:t>
             </a:fld>
             <a:endParaRPr lang="en-US"/>
           </a:p>
@@ -2422,7 +2422,7 @@
           <a:p>
             <a:fld id="{6E4A31BF-7266-4BEB-918B-ADC21C630A6F}" type="datetimeFigureOut">
               <a:rPr lang="en-US" smtClean="0"/>
-              <a:t>6/23/2024</a:t>
+              <a:t>6/24/2024</a:t>
             </a:fld>
             <a:endParaRPr lang="en-US"/>
           </a:p>
@@ -2834,7 +2834,7 @@
           <a:p>
             <a:fld id="{6E4A31BF-7266-4BEB-918B-ADC21C630A6F}" type="datetimeFigureOut">
               <a:rPr lang="en-US" smtClean="0"/>
-              <a:t>6/23/2024</a:t>
+              <a:t>6/24/2024</a:t>
             </a:fld>
             <a:endParaRPr lang="en-US"/>
           </a:p>
@@ -2975,7 +2975,7 @@
           <a:p>
             <a:fld id="{6E4A31BF-7266-4BEB-918B-ADC21C630A6F}" type="datetimeFigureOut">
               <a:rPr lang="en-US" smtClean="0"/>
-              <a:t>6/23/2024</a:t>
+              <a:t>6/24/2024</a:t>
             </a:fld>
             <a:endParaRPr lang="en-US"/>
           </a:p>
@@ -3088,7 +3088,7 @@
           <a:p>
             <a:fld id="{6E4A31BF-7266-4BEB-918B-ADC21C630A6F}" type="datetimeFigureOut">
               <a:rPr lang="en-US" smtClean="0"/>
-              <a:t>6/23/2024</a:t>
+              <a:t>6/24/2024</a:t>
             </a:fld>
             <a:endParaRPr lang="en-US"/>
           </a:p>
@@ -3399,7 +3399,7 @@
           <a:p>
             <a:fld id="{6E4A31BF-7266-4BEB-918B-ADC21C630A6F}" type="datetimeFigureOut">
               <a:rPr lang="en-US" smtClean="0"/>
-              <a:t>6/23/2024</a:t>
+              <a:t>6/24/2024</a:t>
             </a:fld>
             <a:endParaRPr lang="en-US"/>
           </a:p>
@@ -3687,7 +3687,7 @@
           <a:p>
             <a:fld id="{6E4A31BF-7266-4BEB-918B-ADC21C630A6F}" type="datetimeFigureOut">
               <a:rPr lang="en-US" smtClean="0"/>
-              <a:t>6/23/2024</a:t>
+              <a:t>6/24/2024</a:t>
             </a:fld>
             <a:endParaRPr lang="en-US"/>
           </a:p>
@@ -3928,7 +3928,7 @@
           <a:p>
             <a:fld id="{6E4A31BF-7266-4BEB-918B-ADC21C630A6F}" type="datetimeFigureOut">
               <a:rPr lang="en-US" smtClean="0"/>
-              <a:t>6/23/2024</a:t>
+              <a:t>6/24/2024</a:t>
             </a:fld>
             <a:endParaRPr lang="en-US"/>
           </a:p>
@@ -4848,7 +4848,11 @@
           <a:p>
             <a:r>
               <a:rPr lang="en-US" dirty="0"/>
-              <a:t>Our focus is on highly scalable analytic KDD methods and algorithms    </a:t>
+              <a:t>Our focus is on </a:t>
+            </a:r>
+            <a:r>
+              <a:rPr lang="en-US" b="1" dirty="0"/>
+              <a:t>highly scalable analytic KDD methods and algorithms    </a:t>
             </a:r>
           </a:p>
           <a:p>
@@ -4879,7 +4883,11 @@
             <a:pPr lvl="1"/>
             <a:r>
               <a:rPr lang="en-US" dirty="0"/>
-              <a:t>Good algorithm can scale analysis by orders of magnitude  </a:t>
+              <a:t>Good algorithm can </a:t>
+            </a:r>
+            <a:r>
+              <a:rPr lang="en-US" b="1" dirty="0"/>
+              <a:t>scale analysis by orders of magnitude  </a:t>
             </a:r>
           </a:p>
           <a:p>
@@ -5454,6 +5462,12 @@
           <a:p>
             <a:r>
               <a:rPr lang="en-US" dirty="0"/>
+              <a:t>Algorithms for infinite data – streaming data </a:t>
+            </a:r>
+          </a:p>
+          <a:p>
+            <a:r>
+              <a:rPr lang="en-US" dirty="0"/>
               <a:t>Clustering and dimensionality reduction algorithms</a:t>
             </a:r>
           </a:p>
@@ -5467,7 +5481,7 @@
           <a:p>
             <a:r>
               <a:rPr lang="en-US" dirty="0"/>
-              <a:t>Network models</a:t>
+              <a:t>Graphs models</a:t>
             </a:r>
           </a:p>
           <a:p>
@@ -5759,33 +5773,15 @@
                                   </p:childTnLst>
                                 </p:cTn>
                               </p:par>
-                            </p:childTnLst>
-                          </p:cTn>
-                        </p:par>
-                      </p:childTnLst>
-                    </p:cTn>
-                  </p:par>
-                  <p:par>
-                    <p:cTn id="17" fill="hold">
-                      <p:stCondLst>
-                        <p:cond delay="indefinite"/>
-                      </p:stCondLst>
-                      <p:childTnLst>
-                        <p:par>
-                          <p:cTn id="18" fill="hold">
-                            <p:stCondLst>
-                              <p:cond delay="0"/>
-                            </p:stCondLst>
-                            <p:childTnLst>
                               <p:par>
-                                <p:cTn id="19" presetID="1" presetClass="entr" presetSubtype="0" fill="hold" nodeType="clickEffect">
+                                <p:cTn id="17" presetID="1" presetClass="entr" presetSubtype="0" fill="hold" nodeType="withEffect">
                                   <p:stCondLst>
                                     <p:cond delay="0"/>
                                   </p:stCondLst>
                                   <p:childTnLst>
                                     <p:set>
                                       <p:cBhvr>
-                                        <p:cTn id="20" dur="1" fill="hold">
+                                        <p:cTn id="18" dur="1" fill="hold">
                                           <p:stCondLst>
                                             <p:cond delay="0"/>
                                           </p:stCondLst>
@@ -5808,8 +5804,26 @@
                                   </p:childTnLst>
                                 </p:cTn>
                               </p:par>
+                            </p:childTnLst>
+                          </p:cTn>
+                        </p:par>
+                      </p:childTnLst>
+                    </p:cTn>
+                  </p:par>
+                  <p:par>
+                    <p:cTn id="19" fill="hold">
+                      <p:stCondLst>
+                        <p:cond delay="indefinite"/>
+                      </p:stCondLst>
+                      <p:childTnLst>
+                        <p:par>
+                          <p:cTn id="20" fill="hold">
+                            <p:stCondLst>
+                              <p:cond delay="0"/>
+                            </p:stCondLst>
+                            <p:childTnLst>
                               <p:par>
-                                <p:cTn id="21" presetID="1" presetClass="entr" presetSubtype="0" fill="hold" nodeType="withEffect">
+                                <p:cTn id="21" presetID="1" presetClass="entr" presetSubtype="0" fill="hold" nodeType="clickEffect">
                                   <p:stCondLst>
                                     <p:cond delay="0"/>
                                   </p:stCondLst>
@@ -5839,33 +5853,15 @@
                                   </p:childTnLst>
                                 </p:cTn>
                               </p:par>
-                            </p:childTnLst>
-                          </p:cTn>
-                        </p:par>
-                      </p:childTnLst>
-                    </p:cTn>
-                  </p:par>
-                  <p:par>
-                    <p:cTn id="23" fill="hold">
-                      <p:stCondLst>
-                        <p:cond delay="indefinite"/>
-                      </p:stCondLst>
-                      <p:childTnLst>
-                        <p:par>
-                          <p:cTn id="24" fill="hold">
-                            <p:stCondLst>
-                              <p:cond delay="0"/>
-                            </p:stCondLst>
-                            <p:childTnLst>
                               <p:par>
-                                <p:cTn id="25" presetID="1" presetClass="entr" presetSubtype="0" fill="hold" nodeType="clickEffect">
+                                <p:cTn id="23" presetID="1" presetClass="entr" presetSubtype="0" fill="hold" nodeType="withEffect">
                                   <p:stCondLst>
                                     <p:cond delay="0"/>
                                   </p:stCondLst>
                                   <p:childTnLst>
                                     <p:set>
                                       <p:cBhvr>
-                                        <p:cTn id="26" dur="1" fill="hold">
+                                        <p:cTn id="24" dur="1" fill="hold">
                                           <p:stCondLst>
                                             <p:cond delay="0"/>
                                           </p:stCondLst>
@@ -5888,8 +5884,26 @@
                                   </p:childTnLst>
                                 </p:cTn>
                               </p:par>
+                            </p:childTnLst>
+                          </p:cTn>
+                        </p:par>
+                      </p:childTnLst>
+                    </p:cTn>
+                  </p:par>
+                  <p:par>
+                    <p:cTn id="25" fill="hold">
+                      <p:stCondLst>
+                        <p:cond delay="indefinite"/>
+                      </p:stCondLst>
+                      <p:childTnLst>
+                        <p:par>
+                          <p:cTn id="26" fill="hold">
+                            <p:stCondLst>
+                              <p:cond delay="0"/>
+                            </p:stCondLst>
+                            <p:childTnLst>
                               <p:par>
-                                <p:cTn id="27" presetID="1" presetClass="entr" presetSubtype="0" fill="hold" nodeType="withEffect">
+                                <p:cTn id="27" presetID="1" presetClass="entr" presetSubtype="0" fill="hold" nodeType="clickEffect">
                                   <p:stCondLst>
                                     <p:cond delay="0"/>
                                   </p:stCondLst>
@@ -5919,33 +5933,15 @@
                                   </p:childTnLst>
                                 </p:cTn>
                               </p:par>
-                            </p:childTnLst>
-                          </p:cTn>
-                        </p:par>
-                      </p:childTnLst>
-                    </p:cTn>
-                  </p:par>
-                  <p:par>
-                    <p:cTn id="29" fill="hold">
-                      <p:stCondLst>
-                        <p:cond delay="indefinite"/>
-                      </p:stCondLst>
-                      <p:childTnLst>
-                        <p:par>
-                          <p:cTn id="30" fill="hold">
-                            <p:stCondLst>
-                              <p:cond delay="0"/>
-                            </p:stCondLst>
-                            <p:childTnLst>
                               <p:par>
-                                <p:cTn id="31" presetID="1" presetClass="entr" presetSubtype="0" fill="hold" nodeType="clickEffect">
+                                <p:cTn id="29" presetID="1" presetClass="entr" presetSubtype="0" fill="hold" nodeType="withEffect">
                                   <p:stCondLst>
                                     <p:cond delay="0"/>
                                   </p:stCondLst>
                                   <p:childTnLst>
                                     <p:set>
                                       <p:cBhvr>
-                                        <p:cTn id="32" dur="1" fill="hold">
+                                        <p:cTn id="30" dur="1" fill="hold">
                                           <p:stCondLst>
                                             <p:cond delay="0"/>
                                           </p:stCondLst>
@@ -5954,6 +5950,55 @@
                                           <p:spTgt spid="3">
                                             <p:txEl>
                                               <p:pRg st="10" end="10"/>
+                                            </p:txEl>
+                                          </p:spTgt>
+                                        </p:tgtEl>
+                                        <p:attrNameLst>
+                                          <p:attrName>style.visibility</p:attrName>
+                                        </p:attrNameLst>
+                                      </p:cBhvr>
+                                      <p:to>
+                                        <p:strVal val="visible"/>
+                                      </p:to>
+                                    </p:set>
+                                  </p:childTnLst>
+                                </p:cTn>
+                              </p:par>
+                            </p:childTnLst>
+                          </p:cTn>
+                        </p:par>
+                      </p:childTnLst>
+                    </p:cTn>
+                  </p:par>
+                  <p:par>
+                    <p:cTn id="31" fill="hold">
+                      <p:stCondLst>
+                        <p:cond delay="indefinite"/>
+                      </p:stCondLst>
+                      <p:childTnLst>
+                        <p:par>
+                          <p:cTn id="32" fill="hold">
+                            <p:stCondLst>
+                              <p:cond delay="0"/>
+                            </p:stCondLst>
+                            <p:childTnLst>
+                              <p:par>
+                                <p:cTn id="33" presetID="1" presetClass="entr" presetSubtype="0" fill="hold" nodeType="clickEffect">
+                                  <p:stCondLst>
+                                    <p:cond delay="0"/>
+                                  </p:stCondLst>
+                                  <p:childTnLst>
+                                    <p:set>
+                                      <p:cBhvr>
+                                        <p:cTn id="34" dur="1" fill="hold">
+                                          <p:stCondLst>
+                                            <p:cond delay="0"/>
+                                          </p:stCondLst>
+                                        </p:cTn>
+                                        <p:tgtEl>
+                                          <p:spTgt spid="3">
+                                            <p:txEl>
+                                              <p:pRg st="11" end="11"/>
                                             </p:txEl>
                                           </p:spTgt>
                                         </p:tgtEl>
@@ -7937,7 +7982,7 @@
             </a:pPr>
             <a:r>
               <a:rPr lang="en-US" dirty="0"/>
-              <a:t>Students enrolled for under graduate credit are evaluated by the following weights: </a:t>
+              <a:t>Students enrolled for undergraduate credit are evaluated by the following weights: </a:t>
             </a:r>
           </a:p>
           <a:p>
@@ -8020,7 +8065,7 @@
               <a:rPr lang="en-US" dirty="0">
                 <a:latin typeface="+mn-lt"/>
               </a:rPr>
-              <a:t>Under Graduate Credit Grades</a:t>
+              <a:t>Undergraduate Credit Grades</a:t>
             </a:r>
           </a:p>
         </p:txBody>
@@ -9051,8 +9096,12 @@
           <a:p>
             <a:pPr lvl="1"/>
             <a:r>
-              <a:rPr lang="en-US" dirty="0"/>
-              <a:t>Post complete exception messages if you are dealing with an error</a:t>
+              <a:rPr lang="en-US" b="1" dirty="0">
+                <a:solidFill>
+                  <a:srgbClr val="FF0000"/>
+                </a:solidFill>
+              </a:rPr>
+              <a:t>Post complete exception messages if you are dealing with an error!</a:t>
             </a:r>
           </a:p>
           <a:p>
@@ -9071,7 +9120,7 @@
             <a:pPr lvl="1"/>
             <a:r>
               <a:rPr lang="en-US" dirty="0"/>
-              <a:t>Use private messages in Ed Discussion for fastest repones</a:t>
+              <a:t>Use private messages in Ed Discussion for fastest response </a:t>
             </a:r>
           </a:p>
           <a:p>
@@ -11110,7 +11159,7 @@
                 <a:pPr lvl="1"/>
                 <a:r>
                   <a:rPr lang="en-US" dirty="0"/>
-                  <a:t>In Python and many other languages</a:t>
+                  <a:t>Supported in Python and many other languages</a:t>
                 </a:r>
               </a:p>
               <a:p>
@@ -12096,8 +12145,8 @@
           <a:chExt cx="0" cy="0"/>
         </a:xfrm>
       </p:grpSpPr>
-      <mc:AlternateContent xmlns:mc="http://schemas.openxmlformats.org/markup-compatibility/2006">
-        <mc:Choice xmlns:a14="http://schemas.microsoft.com/office/drawing/2010/main" Requires="a14">
+      <mc:AlternateContent xmlns:mc="http://schemas.openxmlformats.org/markup-compatibility/2006" xmlns:a14="http://schemas.microsoft.com/office/drawing/2010/main">
+        <mc:Choice Requires="a14">
           <p:sp>
             <p:nvSpPr>
               <p:cNvPr id="3" name="Content Placeholder 2">
@@ -12397,7 +12446,7 @@
             </p:txBody>
           </p:sp>
         </mc:Choice>
-        <mc:Fallback>
+        <mc:Fallback xmlns="">
           <p:sp>
             <p:nvSpPr>
               <p:cNvPr id="3" name="Content Placeholder 2">
@@ -12956,11 +13005,11 @@
             </a:r>
             <a:r>
               <a:rPr lang="en-US" b="1" dirty="0"/>
-              <a:t>knowledge discovery</a:t>
+              <a:t>actionable knowledge discovery</a:t>
             </a:r>
             <a:r>
               <a:rPr lang="en-US" dirty="0"/>
-              <a:t> from inferences on data </a:t>
+              <a:t> from inferences on massive datasets </a:t>
             </a:r>
             <a:endParaRPr lang="en-US" b="1" dirty="0"/>
           </a:p>
@@ -12977,11 +13026,11 @@
           <a:p>
             <a:r>
               <a:rPr lang="en-US" dirty="0"/>
-              <a:t>Data mining is a </a:t>
+              <a:t>Data mining is an </a:t>
             </a:r>
             <a:r>
               <a:rPr lang="en-US" b="1" dirty="0"/>
-              <a:t>process of exploration   </a:t>
+              <a:t>iterative process of exploration   </a:t>
             </a:r>
           </a:p>
           <a:p>
@@ -13484,8 +13533,8 @@
           </a:p>
         </p:txBody>
       </p:sp>
-      <mc:AlternateContent xmlns:mc="http://schemas.openxmlformats.org/markup-compatibility/2006">
-        <mc:Choice xmlns:a14="http://schemas.microsoft.com/office/drawing/2010/main" Requires="a14">
+      <mc:AlternateContent xmlns:mc="http://schemas.openxmlformats.org/markup-compatibility/2006" xmlns:a14="http://schemas.microsoft.com/office/drawing/2010/main">
+        <mc:Choice Requires="a14">
           <p:graphicFrame>
             <p:nvGraphicFramePr>
               <p:cNvPr id="2" name="Table 3">
@@ -15101,7 +15150,7 @@
             </a:graphic>
           </p:graphicFrame>
         </mc:Choice>
-        <mc:Fallback>
+        <mc:Fallback xmlns="">
           <p:graphicFrame>
             <p:nvGraphicFramePr>
               <p:cNvPr id="2" name="Table 3">
@@ -15822,8 +15871,8 @@
           <a:chExt cx="0" cy="0"/>
         </a:xfrm>
       </p:grpSpPr>
-      <mc:AlternateContent xmlns:mc="http://schemas.openxmlformats.org/markup-compatibility/2006">
-        <mc:Choice xmlns:a14="http://schemas.microsoft.com/office/drawing/2010/main" Requires="a14">
+      <mc:AlternateContent xmlns:mc="http://schemas.openxmlformats.org/markup-compatibility/2006" xmlns:a14="http://schemas.microsoft.com/office/drawing/2010/main">
+        <mc:Choice Requires="a14">
           <p:sp>
             <p:nvSpPr>
               <p:cNvPr id="3" name="Content Placeholder 2">
@@ -16019,7 +16068,7 @@
             </p:txBody>
           </p:sp>
         </mc:Choice>
-        <mc:Fallback>
+        <mc:Fallback xmlns="">
           <p:sp>
             <p:nvSpPr>
               <p:cNvPr id="3" name="Content Placeholder 2">
@@ -22200,8 +22249,8 @@
           <a:chExt cx="0" cy="0"/>
         </a:xfrm>
       </p:grpSpPr>
-      <mc:AlternateContent xmlns:mc="http://schemas.openxmlformats.org/markup-compatibility/2006" xmlns:a14="http://schemas.microsoft.com/office/drawing/2010/main">
-        <mc:Choice Requires="a14">
+      <mc:AlternateContent xmlns:mc="http://schemas.openxmlformats.org/markup-compatibility/2006">
+        <mc:Choice xmlns:a14="http://schemas.microsoft.com/office/drawing/2010/main" Requires="a14">
           <p:sp>
             <p:nvSpPr>
               <p:cNvPr id="3" name="Content Placeholder 2">
@@ -22286,8 +22335,121 @@
                 </a:pPr>
                 <a:r>
                   <a:rPr lang="en-US" dirty="0"/>
-                  <a:t>Have a uniform distribution of hash values</a:t>
+                  <a:t>For key values, </a:t>
                 </a:r>
+                <a14:m>
+                  <m:oMath xmlns:m="http://schemas.openxmlformats.org/officeDocument/2006/math">
+                    <m:r>
+                      <a:rPr lang="en-US" b="0" i="1" smtClean="0">
+                        <a:latin typeface="Cambria Math" panose="02040503050406030204" pitchFamily="18" charset="0"/>
+                      </a:rPr>
+                      <m:t>𝐾</m:t>
+                    </m:r>
+                  </m:oMath>
+                </a14:m>
+                <a:r>
+                  <a:rPr lang="en-US" dirty="0"/>
+                  <a:t>, want a </a:t>
+                </a:r>
+                <a:r>
+                  <a:rPr lang="en-US" b="1" dirty="0"/>
+                  <a:t>uniform distribution over </a:t>
+                </a:r>
+                <a14:m>
+                  <m:oMath xmlns:m="http://schemas.openxmlformats.org/officeDocument/2006/math">
+                    <m:r>
+                      <a:rPr lang="en-US" b="1" i="1" smtClean="0">
+                        <a:latin typeface="Cambria Math" panose="02040503050406030204" pitchFamily="18" charset="0"/>
+                      </a:rPr>
+                      <m:t>𝒏</m:t>
+                    </m:r>
+                  </m:oMath>
+                </a14:m>
+                <a:r>
+                  <a:rPr lang="en-US" b="1" dirty="0"/>
+                  <a:t> hash values</a:t>
+                </a:r>
+              </a:p>
+              <a:p>
+                <a:pPr marL="457200" lvl="1" indent="0">
+                  <a:buNone/>
+                </a:pPr>
+                <a14:m>
+                  <m:oMathPara xmlns:m="http://schemas.openxmlformats.org/officeDocument/2006/math">
+                    <m:oMathParaPr>
+                      <m:jc m:val="centerGroup"/>
+                    </m:oMathParaPr>
+                    <m:oMath xmlns:m="http://schemas.openxmlformats.org/officeDocument/2006/math">
+                      <m:r>
+                        <a:rPr lang="en-US" b="1" i="1" smtClean="0">
+                          <a:latin typeface="Cambria Math" panose="02040503050406030204" pitchFamily="18" charset="0"/>
+                        </a:rPr>
+                        <m:t>𝒌</m:t>
+                      </m:r>
+                      <m:r>
+                        <a:rPr lang="en-US" b="1" i="1" smtClean="0">
+                          <a:latin typeface="Cambria Math" panose="02040503050406030204" pitchFamily="18" charset="0"/>
+                        </a:rPr>
+                        <m:t>(</m:t>
+                      </m:r>
+                      <m:r>
+                        <a:rPr lang="en-US" b="1" i="1" smtClean="0">
+                          <a:latin typeface="Cambria Math" panose="02040503050406030204" pitchFamily="18" charset="0"/>
+                        </a:rPr>
+                        <m:t>𝑲</m:t>
+                      </m:r>
+                      <m:r>
+                        <a:rPr lang="en-US" b="1" i="1" smtClean="0">
+                          <a:latin typeface="Cambria Math" panose="02040503050406030204" pitchFamily="18" charset="0"/>
+                        </a:rPr>
+                        <m:t>)~</m:t>
+                      </m:r>
+                      <m:r>
+                        <a:rPr lang="en-US" b="1" i="1" smtClean="0">
+                          <a:latin typeface="Cambria Math" panose="02040503050406030204" pitchFamily="18" charset="0"/>
+                          <a:ea typeface="Cambria Math" panose="02040503050406030204" pitchFamily="18" charset="0"/>
+                        </a:rPr>
+                        <m:t>𝑼</m:t>
+                      </m:r>
+                      <m:r>
+                        <a:rPr lang="en-US" b="1" i="1" smtClean="0">
+                          <a:latin typeface="Cambria Math" panose="02040503050406030204" pitchFamily="18" charset="0"/>
+                          <a:ea typeface="Cambria Math" panose="02040503050406030204" pitchFamily="18" charset="0"/>
+                        </a:rPr>
+                        <m:t>(</m:t>
+                      </m:r>
+                      <m:r>
+                        <a:rPr lang="en-US" b="1" i="1" smtClean="0">
+                          <a:latin typeface="Cambria Math" panose="02040503050406030204" pitchFamily="18" charset="0"/>
+                          <a:ea typeface="Cambria Math" panose="02040503050406030204" pitchFamily="18" charset="0"/>
+                        </a:rPr>
+                        <m:t>𝟎</m:t>
+                      </m:r>
+                      <m:r>
+                        <a:rPr lang="en-US" b="1" i="1" smtClean="0">
+                          <a:latin typeface="Cambria Math" panose="02040503050406030204" pitchFamily="18" charset="0"/>
+                          <a:ea typeface="Cambria Math" panose="02040503050406030204" pitchFamily="18" charset="0"/>
+                        </a:rPr>
+                        <m:t>,</m:t>
+                      </m:r>
+                      <m:r>
+                        <a:rPr lang="en-US" b="1" i="1" smtClean="0">
+                          <a:latin typeface="Cambria Math" panose="02040503050406030204" pitchFamily="18" charset="0"/>
+                          <a:ea typeface="Cambria Math" panose="02040503050406030204" pitchFamily="18" charset="0"/>
+                        </a:rPr>
+                        <m:t>𝒏</m:t>
+                      </m:r>
+                      <m:r>
+                        <a:rPr lang="en-US" b="1" i="1" smtClean="0">
+                          <a:latin typeface="Cambria Math" panose="02040503050406030204" pitchFamily="18" charset="0"/>
+                          <a:ea typeface="Cambria Math" panose="02040503050406030204" pitchFamily="18" charset="0"/>
+                        </a:rPr>
+                        <m:t>)</m:t>
+                      </m:r>
+                    </m:oMath>
+                  </m:oMathPara>
+                </a14:m>
+                <a:endParaRPr lang="en-US" b="1" dirty="0"/>
               </a:p>
               <a:p>
                 <a:pPr lvl="1"/>
@@ -22361,7 +22523,7 @@
             </p:txBody>
           </p:sp>
         </mc:Choice>
-        <mc:Fallback xmlns="">
+        <mc:Fallback>
           <p:sp>
             <p:nvSpPr>
               <p:cNvPr id="3" name="Content Placeholder 2">
@@ -22471,418 +22633,6 @@
   <p:clrMapOvr>
     <a:masterClrMapping/>
   </p:clrMapOvr>
-  <p:timing>
-    <p:tnLst>
-      <p:par>
-        <p:cTn id="1" dur="indefinite" restart="never" nodeType="tmRoot">
-          <p:childTnLst>
-            <p:seq concurrent="1" nextAc="seek">
-              <p:cTn id="2" dur="indefinite" nodeType="mainSeq">
-                <p:childTnLst>
-                  <p:par>
-                    <p:cTn id="3" fill="hold">
-                      <p:stCondLst>
-                        <p:cond delay="indefinite"/>
-                      </p:stCondLst>
-                      <p:childTnLst>
-                        <p:par>
-                          <p:cTn id="4" fill="hold">
-                            <p:stCondLst>
-                              <p:cond delay="0"/>
-                            </p:stCondLst>
-                            <p:childTnLst>
-                              <p:par>
-                                <p:cTn id="5" presetID="1" presetClass="entr" presetSubtype="0" fill="hold" nodeType="clickEffect">
-                                  <p:stCondLst>
-                                    <p:cond delay="0"/>
-                                  </p:stCondLst>
-                                  <p:childTnLst>
-                                    <p:set>
-                                      <p:cBhvr>
-                                        <p:cTn id="6" dur="1" fill="hold">
-                                          <p:stCondLst>
-                                            <p:cond delay="0"/>
-                                          </p:stCondLst>
-                                        </p:cTn>
-                                        <p:tgtEl>
-                                          <p:spTgt spid="3">
-                                            <p:txEl>
-                                              <p:pRg st="1" end="1"/>
-                                            </p:txEl>
-                                          </p:spTgt>
-                                        </p:tgtEl>
-                                        <p:attrNameLst>
-                                          <p:attrName>style.visibility</p:attrName>
-                                        </p:attrNameLst>
-                                      </p:cBhvr>
-                                      <p:to>
-                                        <p:strVal val="visible"/>
-                                      </p:to>
-                                    </p:set>
-                                  </p:childTnLst>
-                                </p:cTn>
-                              </p:par>
-                            </p:childTnLst>
-                          </p:cTn>
-                        </p:par>
-                      </p:childTnLst>
-                    </p:cTn>
-                  </p:par>
-                  <p:par>
-                    <p:cTn id="7" fill="hold">
-                      <p:stCondLst>
-                        <p:cond delay="indefinite"/>
-                      </p:stCondLst>
-                      <p:childTnLst>
-                        <p:par>
-                          <p:cTn id="8" fill="hold">
-                            <p:stCondLst>
-                              <p:cond delay="0"/>
-                            </p:stCondLst>
-                            <p:childTnLst>
-                              <p:par>
-                                <p:cTn id="9" presetID="1" presetClass="entr" presetSubtype="0" fill="hold" nodeType="clickEffect">
-                                  <p:stCondLst>
-                                    <p:cond delay="0"/>
-                                  </p:stCondLst>
-                                  <p:childTnLst>
-                                    <p:set>
-                                      <p:cBhvr>
-                                        <p:cTn id="10" dur="1" fill="hold">
-                                          <p:stCondLst>
-                                            <p:cond delay="0"/>
-                                          </p:stCondLst>
-                                        </p:cTn>
-                                        <p:tgtEl>
-                                          <p:spTgt spid="3">
-                                            <p:txEl>
-                                              <p:pRg st="2" end="2"/>
-                                            </p:txEl>
-                                          </p:spTgt>
-                                        </p:tgtEl>
-                                        <p:attrNameLst>
-                                          <p:attrName>style.visibility</p:attrName>
-                                        </p:attrNameLst>
-                                      </p:cBhvr>
-                                      <p:to>
-                                        <p:strVal val="visible"/>
-                                      </p:to>
-                                    </p:set>
-                                  </p:childTnLst>
-                                </p:cTn>
-                              </p:par>
-                              <p:par>
-                                <p:cTn id="11" presetID="1" presetClass="entr" presetSubtype="0" fill="hold" nodeType="withEffect">
-                                  <p:stCondLst>
-                                    <p:cond delay="0"/>
-                                  </p:stCondLst>
-                                  <p:childTnLst>
-                                    <p:set>
-                                      <p:cBhvr>
-                                        <p:cTn id="12" dur="1" fill="hold">
-                                          <p:stCondLst>
-                                            <p:cond delay="0"/>
-                                          </p:stCondLst>
-                                        </p:cTn>
-                                        <p:tgtEl>
-                                          <p:spTgt spid="3">
-                                            <p:txEl>
-                                              <p:pRg st="3" end="3"/>
-                                            </p:txEl>
-                                          </p:spTgt>
-                                        </p:tgtEl>
-                                        <p:attrNameLst>
-                                          <p:attrName>style.visibility</p:attrName>
-                                        </p:attrNameLst>
-                                      </p:cBhvr>
-                                      <p:to>
-                                        <p:strVal val="visible"/>
-                                      </p:to>
-                                    </p:set>
-                                  </p:childTnLst>
-                                </p:cTn>
-                              </p:par>
-                              <p:par>
-                                <p:cTn id="13" presetID="1" presetClass="entr" presetSubtype="0" fill="hold" nodeType="withEffect">
-                                  <p:stCondLst>
-                                    <p:cond delay="0"/>
-                                  </p:stCondLst>
-                                  <p:childTnLst>
-                                    <p:set>
-                                      <p:cBhvr>
-                                        <p:cTn id="14" dur="1" fill="hold">
-                                          <p:stCondLst>
-                                            <p:cond delay="0"/>
-                                          </p:stCondLst>
-                                        </p:cTn>
-                                        <p:tgtEl>
-                                          <p:spTgt spid="3">
-                                            <p:txEl>
-                                              <p:pRg st="4" end="4"/>
-                                            </p:txEl>
-                                          </p:spTgt>
-                                        </p:tgtEl>
-                                        <p:attrNameLst>
-                                          <p:attrName>style.visibility</p:attrName>
-                                        </p:attrNameLst>
-                                      </p:cBhvr>
-                                      <p:to>
-                                        <p:strVal val="visible"/>
-                                      </p:to>
-                                    </p:set>
-                                  </p:childTnLst>
-                                </p:cTn>
-                              </p:par>
-                              <p:par>
-                                <p:cTn id="15" presetID="1" presetClass="entr" presetSubtype="0" fill="hold" nodeType="withEffect">
-                                  <p:stCondLst>
-                                    <p:cond delay="0"/>
-                                  </p:stCondLst>
-                                  <p:childTnLst>
-                                    <p:set>
-                                      <p:cBhvr>
-                                        <p:cTn id="16" dur="1" fill="hold">
-                                          <p:stCondLst>
-                                            <p:cond delay="0"/>
-                                          </p:stCondLst>
-                                        </p:cTn>
-                                        <p:tgtEl>
-                                          <p:spTgt spid="3">
-                                            <p:txEl>
-                                              <p:pRg st="5" end="5"/>
-                                            </p:txEl>
-                                          </p:spTgt>
-                                        </p:tgtEl>
-                                        <p:attrNameLst>
-                                          <p:attrName>style.visibility</p:attrName>
-                                        </p:attrNameLst>
-                                      </p:cBhvr>
-                                      <p:to>
-                                        <p:strVal val="visible"/>
-                                      </p:to>
-                                    </p:set>
-                                  </p:childTnLst>
-                                </p:cTn>
-                              </p:par>
-                            </p:childTnLst>
-                          </p:cTn>
-                        </p:par>
-                      </p:childTnLst>
-                    </p:cTn>
-                  </p:par>
-                  <p:par>
-                    <p:cTn id="17" fill="hold">
-                      <p:stCondLst>
-                        <p:cond delay="indefinite"/>
-                      </p:stCondLst>
-                      <p:childTnLst>
-                        <p:par>
-                          <p:cTn id="18" fill="hold">
-                            <p:stCondLst>
-                              <p:cond delay="0"/>
-                            </p:stCondLst>
-                            <p:childTnLst>
-                              <p:par>
-                                <p:cTn id="19" presetID="1" presetClass="entr" presetSubtype="0" fill="hold" nodeType="clickEffect">
-                                  <p:stCondLst>
-                                    <p:cond delay="0"/>
-                                  </p:stCondLst>
-                                  <p:childTnLst>
-                                    <p:set>
-                                      <p:cBhvr>
-                                        <p:cTn id="20" dur="1" fill="hold">
-                                          <p:stCondLst>
-                                            <p:cond delay="0"/>
-                                          </p:stCondLst>
-                                        </p:cTn>
-                                        <p:tgtEl>
-                                          <p:spTgt spid="3">
-                                            <p:txEl>
-                                              <p:pRg st="6" end="6"/>
-                                            </p:txEl>
-                                          </p:spTgt>
-                                        </p:tgtEl>
-                                        <p:attrNameLst>
-                                          <p:attrName>style.visibility</p:attrName>
-                                        </p:attrNameLst>
-                                      </p:cBhvr>
-                                      <p:to>
-                                        <p:strVal val="visible"/>
-                                      </p:to>
-                                    </p:set>
-                                  </p:childTnLst>
-                                </p:cTn>
-                              </p:par>
-                              <p:par>
-                                <p:cTn id="21" presetID="1" presetClass="entr" presetSubtype="0" fill="hold" nodeType="withEffect">
-                                  <p:stCondLst>
-                                    <p:cond delay="0"/>
-                                  </p:stCondLst>
-                                  <p:childTnLst>
-                                    <p:set>
-                                      <p:cBhvr>
-                                        <p:cTn id="22" dur="1" fill="hold">
-                                          <p:stCondLst>
-                                            <p:cond delay="0"/>
-                                          </p:stCondLst>
-                                        </p:cTn>
-                                        <p:tgtEl>
-                                          <p:spTgt spid="3">
-                                            <p:txEl>
-                                              <p:pRg st="7" end="7"/>
-                                            </p:txEl>
-                                          </p:spTgt>
-                                        </p:tgtEl>
-                                        <p:attrNameLst>
-                                          <p:attrName>style.visibility</p:attrName>
-                                        </p:attrNameLst>
-                                      </p:cBhvr>
-                                      <p:to>
-                                        <p:strVal val="visible"/>
-                                      </p:to>
-                                    </p:set>
-                                  </p:childTnLst>
-                                </p:cTn>
-                              </p:par>
-                              <p:par>
-                                <p:cTn id="23" presetID="1" presetClass="entr" presetSubtype="0" fill="hold" nodeType="withEffect">
-                                  <p:stCondLst>
-                                    <p:cond delay="0"/>
-                                  </p:stCondLst>
-                                  <p:childTnLst>
-                                    <p:set>
-                                      <p:cBhvr>
-                                        <p:cTn id="24" dur="1" fill="hold">
-                                          <p:stCondLst>
-                                            <p:cond delay="0"/>
-                                          </p:stCondLst>
-                                        </p:cTn>
-                                        <p:tgtEl>
-                                          <p:spTgt spid="3">
-                                            <p:txEl>
-                                              <p:pRg st="8" end="8"/>
-                                            </p:txEl>
-                                          </p:spTgt>
-                                        </p:tgtEl>
-                                        <p:attrNameLst>
-                                          <p:attrName>style.visibility</p:attrName>
-                                        </p:attrNameLst>
-                                      </p:cBhvr>
-                                      <p:to>
-                                        <p:strVal val="visible"/>
-                                      </p:to>
-                                    </p:set>
-                                  </p:childTnLst>
-                                </p:cTn>
-                              </p:par>
-                            </p:childTnLst>
-                          </p:cTn>
-                        </p:par>
-                      </p:childTnLst>
-                    </p:cTn>
-                  </p:par>
-                  <p:par>
-                    <p:cTn id="25" fill="hold">
-                      <p:stCondLst>
-                        <p:cond delay="indefinite"/>
-                      </p:stCondLst>
-                      <p:childTnLst>
-                        <p:par>
-                          <p:cTn id="26" fill="hold">
-                            <p:stCondLst>
-                              <p:cond delay="0"/>
-                            </p:stCondLst>
-                            <p:childTnLst>
-                              <p:par>
-                                <p:cTn id="27" presetID="1" presetClass="entr" presetSubtype="0" fill="hold" nodeType="clickEffect">
-                                  <p:stCondLst>
-                                    <p:cond delay="0"/>
-                                  </p:stCondLst>
-                                  <p:childTnLst>
-                                    <p:set>
-                                      <p:cBhvr>
-                                        <p:cTn id="28" dur="1" fill="hold">
-                                          <p:stCondLst>
-                                            <p:cond delay="0"/>
-                                          </p:stCondLst>
-                                        </p:cTn>
-                                        <p:tgtEl>
-                                          <p:spTgt spid="3">
-                                            <p:txEl>
-                                              <p:pRg st="9" end="9"/>
-                                            </p:txEl>
-                                          </p:spTgt>
-                                        </p:tgtEl>
-                                        <p:attrNameLst>
-                                          <p:attrName>style.visibility</p:attrName>
-                                        </p:attrNameLst>
-                                      </p:cBhvr>
-                                      <p:to>
-                                        <p:strVal val="visible"/>
-                                      </p:to>
-                                    </p:set>
-                                  </p:childTnLst>
-                                </p:cTn>
-                              </p:par>
-                              <p:par>
-                                <p:cTn id="29" presetID="1" presetClass="entr" presetSubtype="0" fill="hold" nodeType="withEffect">
-                                  <p:stCondLst>
-                                    <p:cond delay="0"/>
-                                  </p:stCondLst>
-                                  <p:childTnLst>
-                                    <p:set>
-                                      <p:cBhvr>
-                                        <p:cTn id="30" dur="1" fill="hold">
-                                          <p:stCondLst>
-                                            <p:cond delay="0"/>
-                                          </p:stCondLst>
-                                        </p:cTn>
-                                        <p:tgtEl>
-                                          <p:spTgt spid="3">
-                                            <p:txEl>
-                                              <p:pRg st="10" end="10"/>
-                                            </p:txEl>
-                                          </p:spTgt>
-                                        </p:tgtEl>
-                                        <p:attrNameLst>
-                                          <p:attrName>style.visibility</p:attrName>
-                                        </p:attrNameLst>
-                                      </p:cBhvr>
-                                      <p:to>
-                                        <p:strVal val="visible"/>
-                                      </p:to>
-                                    </p:set>
-                                  </p:childTnLst>
-                                </p:cTn>
-                              </p:par>
-                            </p:childTnLst>
-                          </p:cTn>
-                        </p:par>
-                      </p:childTnLst>
-                    </p:cTn>
-                  </p:par>
-                </p:childTnLst>
-              </p:cTn>
-              <p:prevCondLst>
-                <p:cond evt="onPrev" delay="0">
-                  <p:tgtEl>
-                    <p:sldTgt/>
-                  </p:tgtEl>
-                </p:cond>
-              </p:prevCondLst>
-              <p:nextCondLst>
-                <p:cond evt="onNext" delay="0">
-                  <p:tgtEl>
-                    <p:sldTgt/>
-                  </p:tgtEl>
-                </p:cond>
-              </p:nextCondLst>
-            </p:seq>
-          </p:childTnLst>
-        </p:cTn>
-      </p:par>
-    </p:tnLst>
-  </p:timing>
 </p:sld>
 </file>
 
@@ -22903,8 +22653,8 @@
           <a:chExt cx="0" cy="0"/>
         </a:xfrm>
       </p:grpSpPr>
-      <mc:AlternateContent xmlns:mc="http://schemas.openxmlformats.org/markup-compatibility/2006">
-        <mc:Choice xmlns:a14="http://schemas.microsoft.com/office/drawing/2010/main" Requires="a14">
+      <mc:AlternateContent xmlns:mc="http://schemas.openxmlformats.org/markup-compatibility/2006" xmlns:a14="http://schemas.microsoft.com/office/drawing/2010/main">
+        <mc:Choice Requires="a14">
           <p:sp>
             <p:nvSpPr>
               <p:cNvPr id="3" name="Content Placeholder 2">
@@ -23227,7 +22977,7 @@
             </p:txBody>
           </p:sp>
         </mc:Choice>
-        <mc:Fallback>
+        <mc:Fallback xmlns="">
           <p:sp>
             <p:nvSpPr>
               <p:cNvPr id="3" name="Content Placeholder 2">
@@ -25033,33 +24783,15 @@
                                   </p:childTnLst>
                                 </p:cTn>
                               </p:par>
-                            </p:childTnLst>
-                          </p:cTn>
-                        </p:par>
-                      </p:childTnLst>
-                    </p:cTn>
-                  </p:par>
-                  <p:par>
-                    <p:cTn id="11" fill="hold">
-                      <p:stCondLst>
-                        <p:cond delay="indefinite"/>
-                      </p:stCondLst>
-                      <p:childTnLst>
-                        <p:par>
-                          <p:cTn id="12" fill="hold">
-                            <p:stCondLst>
-                              <p:cond delay="0"/>
-                            </p:stCondLst>
-                            <p:childTnLst>
                               <p:par>
-                                <p:cTn id="13" presetID="1" presetClass="entr" presetSubtype="0" fill="hold" nodeType="clickEffect">
+                                <p:cTn id="11" presetID="1" presetClass="entr" presetSubtype="0" fill="hold" nodeType="withEffect">
                                   <p:stCondLst>
                                     <p:cond delay="0"/>
                                   </p:stCondLst>
                                   <p:childTnLst>
                                     <p:set>
                                       <p:cBhvr>
-                                        <p:cTn id="14" dur="1" fill="hold">
+                                        <p:cTn id="12" dur="1" fill="hold">
                                           <p:stCondLst>
                                             <p:cond delay="0"/>
                                           </p:stCondLst>
@@ -25079,14 +24811,14 @@
                                 </p:cTn>
                               </p:par>
                               <p:par>
-                                <p:cTn id="15" presetID="1" presetClass="entr" presetSubtype="0" fill="hold" grpId="0" nodeType="withEffect">
+                                <p:cTn id="13" presetID="1" presetClass="entr" presetSubtype="0" fill="hold" grpId="0" nodeType="withEffect">
                                   <p:stCondLst>
                                     <p:cond delay="0"/>
                                   </p:stCondLst>
                                   <p:childTnLst>
                                     <p:set>
                                       <p:cBhvr>
-                                        <p:cTn id="16" dur="1" fill="hold">
+                                        <p:cTn id="14" dur="1" fill="hold">
                                           <p:stCondLst>
                                             <p:cond delay="0"/>
                                           </p:stCondLst>
@@ -25112,26 +24844,26 @@
                     </p:cTn>
                   </p:par>
                   <p:par>
-                    <p:cTn id="17" fill="hold">
+                    <p:cTn id="15" fill="hold">
                       <p:stCondLst>
                         <p:cond delay="indefinite"/>
                       </p:stCondLst>
                       <p:childTnLst>
                         <p:par>
-                          <p:cTn id="18" fill="hold">
+                          <p:cTn id="16" fill="hold">
                             <p:stCondLst>
                               <p:cond delay="0"/>
                             </p:stCondLst>
                             <p:childTnLst>
                               <p:par>
-                                <p:cTn id="19" presetID="1" presetClass="entr" presetSubtype="0" fill="hold" nodeType="clickEffect">
+                                <p:cTn id="17" presetID="1" presetClass="entr" presetSubtype="0" fill="hold" nodeType="clickEffect">
                                   <p:stCondLst>
                                     <p:cond delay="0"/>
                                   </p:stCondLst>
                                   <p:childTnLst>
                                     <p:set>
                                       <p:cBhvr>
-                                        <p:cTn id="20" dur="1" fill="hold">
+                                        <p:cTn id="18" dur="1" fill="hold">
                                           <p:stCondLst>
                                             <p:cond delay="0"/>
                                           </p:stCondLst>
@@ -25161,26 +24893,26 @@
                     </p:cTn>
                   </p:par>
                   <p:par>
-                    <p:cTn id="21" fill="hold">
+                    <p:cTn id="19" fill="hold">
                       <p:stCondLst>
                         <p:cond delay="indefinite"/>
                       </p:stCondLst>
                       <p:childTnLst>
                         <p:par>
-                          <p:cTn id="22" fill="hold">
+                          <p:cTn id="20" fill="hold">
                             <p:stCondLst>
                               <p:cond delay="0"/>
                             </p:stCondLst>
                             <p:childTnLst>
                               <p:par>
-                                <p:cTn id="23" presetID="1" presetClass="entr" presetSubtype="0" fill="hold" nodeType="clickEffect">
+                                <p:cTn id="21" presetID="1" presetClass="entr" presetSubtype="0" fill="hold" nodeType="clickEffect">
                                   <p:stCondLst>
                                     <p:cond delay="0"/>
                                   </p:stCondLst>
                                   <p:childTnLst>
                                     <p:set>
                                       <p:cBhvr>
-                                        <p:cTn id="24" dur="1" fill="hold">
+                                        <p:cTn id="22" dur="1" fill="hold">
                                           <p:stCondLst>
                                             <p:cond delay="0"/>
                                           </p:stCondLst>
@@ -25913,7 +25645,7 @@
             </a:r>
             <a:r>
               <a:rPr lang="en-US" dirty="0"/>
-              <a:t>How do we efficiently find important relationships in large datasets? </a:t>
+              <a:t>How do we efficiently find important relationships in massive datasets? </a:t>
             </a:r>
           </a:p>
           <a:p>
@@ -30831,8 +30563,8 @@
           <a:chExt cx="0" cy="0"/>
         </a:xfrm>
       </p:grpSpPr>
-      <mc:AlternateContent xmlns:mc="http://schemas.openxmlformats.org/markup-compatibility/2006">
-        <mc:Choice xmlns:a14="http://schemas.microsoft.com/office/drawing/2010/main" Requires="a14">
+      <mc:AlternateContent xmlns:mc="http://schemas.openxmlformats.org/markup-compatibility/2006" xmlns:a14="http://schemas.microsoft.com/office/drawing/2010/main">
+        <mc:Choice Requires="a14">
           <p:sp>
             <p:nvSpPr>
               <p:cNvPr id="3" name="Content Placeholder 2">
@@ -31046,7 +30778,7 @@
             </p:txBody>
           </p:sp>
         </mc:Choice>
-        <mc:Fallback>
+        <mc:Fallback xmlns="">
           <p:sp>
             <p:nvSpPr>
               <p:cNvPr id="3" name="Content Placeholder 2">
@@ -41182,7 +40914,15 @@
           <a:p>
             <a:r>
               <a:rPr lang="en-US" dirty="0"/>
-              <a:t>Data mining often uses massive data sets</a:t>
+              <a:t>Data mining uses </a:t>
+            </a:r>
+            <a:r>
+              <a:rPr lang="en-US" b="1" dirty="0"/>
+              <a:t>massive data sets</a:t>
+            </a:r>
+            <a:r>
+              <a:rPr lang="en-US" dirty="0"/>
+              <a:t>!</a:t>
             </a:r>
           </a:p>
           <a:p>
@@ -41202,7 +40942,11 @@
           <a:p>
             <a:r>
               <a:rPr lang="en-US" dirty="0"/>
-              <a:t>Knowledge discovery requires inference</a:t>
+              <a:t>Knowledge discovery requires </a:t>
+            </a:r>
+            <a:r>
+              <a:rPr lang="en-US" b="1" dirty="0"/>
+              <a:t>inference</a:t>
             </a:r>
           </a:p>
           <a:p>

</xml_diff>

<commit_message>
Small updates to slides
</commit_message>
<xml_diff>
--- a/slides/1_Introduction.pptx
+++ b/slides/1_Introduction.pptx
@@ -258,7 +258,7 @@
           <a:p>
             <a:fld id="{2F3ABF1A-8818-4472-8518-E71DC7B5D2F7}" type="datetimeFigureOut">
               <a:rPr lang="en-US" smtClean="0"/>
-              <a:t>6/24/2024</a:t>
+              <a:t>1/26/2025</a:t>
             </a:fld>
             <a:endParaRPr lang="en-US"/>
           </a:p>
@@ -1278,7 +1278,7 @@
           <a:p>
             <a:fld id="{6E4A31BF-7266-4BEB-918B-ADC21C630A6F}" type="datetimeFigureOut">
               <a:rPr lang="en-US" smtClean="0"/>
-              <a:t>6/24/2024</a:t>
+              <a:t>1/26/2025</a:t>
             </a:fld>
             <a:endParaRPr lang="en-US"/>
           </a:p>
@@ -1476,7 +1476,7 @@
           <a:p>
             <a:fld id="{6E4A31BF-7266-4BEB-918B-ADC21C630A6F}" type="datetimeFigureOut">
               <a:rPr lang="en-US" smtClean="0"/>
-              <a:t>6/24/2024</a:t>
+              <a:t>1/26/2025</a:t>
             </a:fld>
             <a:endParaRPr lang="en-US"/>
           </a:p>
@@ -1684,7 +1684,7 @@
           <a:p>
             <a:fld id="{6E4A31BF-7266-4BEB-918B-ADC21C630A6F}" type="datetimeFigureOut">
               <a:rPr lang="en-US" smtClean="0"/>
-              <a:t>6/24/2024</a:t>
+              <a:t>1/26/2025</a:t>
             </a:fld>
             <a:endParaRPr lang="en-US"/>
           </a:p>
@@ -1882,7 +1882,7 @@
           <a:p>
             <a:fld id="{6E4A31BF-7266-4BEB-918B-ADC21C630A6F}" type="datetimeFigureOut">
               <a:rPr lang="en-US" smtClean="0"/>
-              <a:t>6/24/2024</a:t>
+              <a:t>1/26/2025</a:t>
             </a:fld>
             <a:endParaRPr lang="en-US"/>
           </a:p>
@@ -2157,7 +2157,7 @@
           <a:p>
             <a:fld id="{6E4A31BF-7266-4BEB-918B-ADC21C630A6F}" type="datetimeFigureOut">
               <a:rPr lang="en-US" smtClean="0"/>
-              <a:t>6/24/2024</a:t>
+              <a:t>1/26/2025</a:t>
             </a:fld>
             <a:endParaRPr lang="en-US"/>
           </a:p>
@@ -2422,7 +2422,7 @@
           <a:p>
             <a:fld id="{6E4A31BF-7266-4BEB-918B-ADC21C630A6F}" type="datetimeFigureOut">
               <a:rPr lang="en-US" smtClean="0"/>
-              <a:t>6/24/2024</a:t>
+              <a:t>1/26/2025</a:t>
             </a:fld>
             <a:endParaRPr lang="en-US"/>
           </a:p>
@@ -2834,7 +2834,7 @@
           <a:p>
             <a:fld id="{6E4A31BF-7266-4BEB-918B-ADC21C630A6F}" type="datetimeFigureOut">
               <a:rPr lang="en-US" smtClean="0"/>
-              <a:t>6/24/2024</a:t>
+              <a:t>1/26/2025</a:t>
             </a:fld>
             <a:endParaRPr lang="en-US"/>
           </a:p>
@@ -2975,7 +2975,7 @@
           <a:p>
             <a:fld id="{6E4A31BF-7266-4BEB-918B-ADC21C630A6F}" type="datetimeFigureOut">
               <a:rPr lang="en-US" smtClean="0"/>
-              <a:t>6/24/2024</a:t>
+              <a:t>1/26/2025</a:t>
             </a:fld>
             <a:endParaRPr lang="en-US"/>
           </a:p>
@@ -3088,7 +3088,7 @@
           <a:p>
             <a:fld id="{6E4A31BF-7266-4BEB-918B-ADC21C630A6F}" type="datetimeFigureOut">
               <a:rPr lang="en-US" smtClean="0"/>
-              <a:t>6/24/2024</a:t>
+              <a:t>1/26/2025</a:t>
             </a:fld>
             <a:endParaRPr lang="en-US"/>
           </a:p>
@@ -3399,7 +3399,7 @@
           <a:p>
             <a:fld id="{6E4A31BF-7266-4BEB-918B-ADC21C630A6F}" type="datetimeFigureOut">
               <a:rPr lang="en-US" smtClean="0"/>
-              <a:t>6/24/2024</a:t>
+              <a:t>1/26/2025</a:t>
             </a:fld>
             <a:endParaRPr lang="en-US"/>
           </a:p>
@@ -3687,7 +3687,7 @@
           <a:p>
             <a:fld id="{6E4A31BF-7266-4BEB-918B-ADC21C630A6F}" type="datetimeFigureOut">
               <a:rPr lang="en-US" smtClean="0"/>
-              <a:t>6/24/2024</a:t>
+              <a:t>1/26/2025</a:t>
             </a:fld>
             <a:endParaRPr lang="en-US"/>
           </a:p>
@@ -3928,7 +3928,7 @@
           <a:p>
             <a:fld id="{6E4A31BF-7266-4BEB-918B-ADC21C630A6F}" type="datetimeFigureOut">
               <a:rPr lang="en-US" smtClean="0"/>
-              <a:t>6/24/2024</a:t>
+              <a:t>1/26/2025</a:t>
             </a:fld>
             <a:endParaRPr lang="en-US"/>
           </a:p>
@@ -4518,7 +4518,7 @@
             <a:pPr algn="ctr"/>
             <a:r>
               <a:rPr lang="en-US" sz="1100" dirty="0"/>
-              <a:t>Copyright 2021, 2022, 2023 2024, Stephen F Elston. All rights reserved</a:t>
+              <a:t>Copyright 2021, 2022, 2023 2024, 2025 Stephen F Elston. All rights reserved</a:t>
             </a:r>
             <a:r>
               <a:rPr lang="en-US" dirty="0"/>
@@ -4588,7 +4588,7 @@
                 <a:effectLst/>
                 <a:latin typeface="+mn-lt"/>
               </a:rPr>
-              <a:t>Teaching Assistant: Tatyana Boland</a:t>
+              <a:t>Teaching Assistant: George Cruz</a:t>
             </a:r>
             <a:br>
               <a:rPr lang="en-US" sz="4000" b="1" i="0" dirty="0">
@@ -4622,122 +4622,11 @@
         <p:spPr/>
         <p:txBody>
           <a:bodyPr>
-            <a:normAutofit fontScale="92500" lnSpcReduction="10000"/>
+            <a:normAutofit/>
           </a:bodyPr>
           <a:lstStyle/>
           <a:p>
-            <a:pPr algn="l">
-              <a:buFont typeface="Arial" panose="020B0604020202020204" pitchFamily="34" charset="0"/>
-              <a:buChar char="•"/>
-            </a:pPr>
-            <a:r>
-              <a:rPr lang="en-US" b="0" i="0" dirty="0">
-                <a:solidFill>
-                  <a:srgbClr val="000000"/>
-                </a:solidFill>
-                <a:effectLst/>
-                <a:latin typeface="Gill Sans MT" panose="020B0502020104020203" pitchFamily="34" charset="0"/>
-              </a:rPr>
-              <a:t>MBA in Finance from Texas A&amp;M</a:t>
-            </a:r>
-          </a:p>
-          <a:p>
-            <a:pPr algn="l">
-              <a:buFont typeface="Arial" panose="020B0604020202020204" pitchFamily="34" charset="0"/>
-              <a:buChar char="•"/>
-            </a:pPr>
-            <a:r>
-              <a:rPr lang="en-US" b="0" i="0" dirty="0">
-                <a:solidFill>
-                  <a:srgbClr val="000000"/>
-                </a:solidFill>
-                <a:effectLst/>
-                <a:latin typeface="Gill Sans MT" panose="020B0502020104020203" pitchFamily="34" charset="0"/>
-              </a:rPr>
-              <a:t>MLA from Harvard Extension School in Sustainability &amp; Environmental Management</a:t>
-            </a:r>
-          </a:p>
-          <a:p>
-            <a:pPr algn="l">
-              <a:buFont typeface="Arial" panose="020B0604020202020204" pitchFamily="34" charset="0"/>
-              <a:buChar char="•"/>
-            </a:pPr>
-            <a:r>
-              <a:rPr lang="en-US" b="0" i="0" dirty="0">
-                <a:solidFill>
-                  <a:srgbClr val="000000"/>
-                </a:solidFill>
-                <a:effectLst/>
-                <a:latin typeface="Gill Sans MT" panose="020B0502020104020203" pitchFamily="34" charset="0"/>
-              </a:rPr>
-              <a:t>BA in Political Science from University of Washington</a:t>
-            </a:r>
-          </a:p>
-          <a:p>
-            <a:pPr algn="l">
-              <a:buFont typeface="Arial" panose="020B0604020202020204" pitchFamily="34" charset="0"/>
-              <a:buChar char="•"/>
-            </a:pPr>
-            <a:r>
-              <a:rPr lang="en-US" b="0" i="0" dirty="0">
-                <a:solidFill>
-                  <a:srgbClr val="222222"/>
-                </a:solidFill>
-                <a:effectLst/>
-                <a:highlight>
-                  <a:srgbClr val="FFFFFF"/>
-                </a:highlight>
-                <a:latin typeface="Arial" panose="020B0604020202020204" pitchFamily="34" charset="0"/>
-              </a:rPr>
-              <a:t>Sr Technical Program Manager working on DGX Cloud for Nvidia </a:t>
-            </a:r>
-            <a:endParaRPr lang="en-US" b="0" i="0" dirty="0">
-              <a:solidFill>
-                <a:srgbClr val="000000"/>
-              </a:solidFill>
-              <a:effectLst/>
-              <a:latin typeface="Gill Sans MT" panose="020B0502020104020203" pitchFamily="34" charset="0"/>
-            </a:endParaRPr>
-          </a:p>
-          <a:p>
-            <a:pPr algn="l">
-              <a:buFont typeface="Arial" panose="020B0604020202020204" pitchFamily="34" charset="0"/>
-              <a:buChar char="•"/>
-            </a:pPr>
-            <a:r>
-              <a:rPr lang="en-US" dirty="0">
-                <a:solidFill>
-                  <a:srgbClr val="000000"/>
-                </a:solidFill>
-                <a:latin typeface="Gill Sans MT" panose="020B0502020104020203" pitchFamily="34" charset="0"/>
-              </a:rPr>
-              <a:t>P</a:t>
-            </a:r>
-            <a:r>
-              <a:rPr lang="en-US" b="0" i="0" dirty="0">
-                <a:solidFill>
-                  <a:srgbClr val="000000"/>
-                </a:solidFill>
-                <a:effectLst/>
-                <a:latin typeface="Gill Sans MT" panose="020B0502020104020203" pitchFamily="34" charset="0"/>
-              </a:rPr>
-              <a:t>reviously at Oracle OCI as Principal Technical Program Manager in Physical Networking team</a:t>
-            </a:r>
-          </a:p>
-          <a:p>
-            <a:pPr algn="l">
-              <a:buFont typeface="Arial" panose="020B0604020202020204" pitchFamily="34" charset="0"/>
-              <a:buChar char="•"/>
-            </a:pPr>
-            <a:r>
-              <a:rPr lang="en-US" dirty="0">
-                <a:solidFill>
-                  <a:srgbClr val="222222"/>
-                </a:solidFill>
-                <a:latin typeface="Arial" panose="020B0604020202020204" pitchFamily="34" charset="0"/>
-              </a:rPr>
-              <a:t>L</a:t>
-            </a:r>
+            <a:pPr algn="l"/>
             <a:r>
               <a:rPr lang="en-US" b="0" i="0" dirty="0">
                 <a:solidFill>
@@ -4746,23 +4635,66 @@
                 <a:effectLst/>
                 <a:latin typeface="Arial" panose="020B0604020202020204" pitchFamily="34" charset="0"/>
               </a:rPr>
-              <a:t>oves playing the piano and playing and with her cats</a:t>
-            </a:r>
-            <a:endParaRPr lang="en-US" b="0" i="0" dirty="0">
-              <a:solidFill>
-                <a:srgbClr val="000000"/>
-              </a:solidFill>
-              <a:effectLst/>
-              <a:latin typeface="Gill Sans MT" panose="020B0502020104020203" pitchFamily="34" charset="0"/>
-            </a:endParaRPr>
-          </a:p>
-          <a:p>
-            <a:pPr marL="0" indent="0">
-              <a:buNone/>
+              <a:t>MBA and DBA in Business Administration from Westcliff University in Irvine, CA</a:t>
+            </a:r>
+          </a:p>
+          <a:p>
+            <a:pPr algn="l"/>
+            <a:r>
+              <a:rPr lang="en-US" b="0" i="0" dirty="0">
+                <a:solidFill>
+                  <a:srgbClr val="222222"/>
+                </a:solidFill>
+                <a:effectLst/>
+                <a:latin typeface="Arial" panose="020B0604020202020204" pitchFamily="34" charset="0"/>
+              </a:rPr>
+              <a:t>Master of Data Science graduate from Harvard Extension School</a:t>
+            </a:r>
+          </a:p>
+          <a:p>
+            <a:pPr algn="l"/>
+            <a:r>
+              <a:rPr lang="en-US" b="0" i="0" dirty="0">
+                <a:solidFill>
+                  <a:srgbClr val="222222"/>
+                </a:solidFill>
+                <a:effectLst/>
+                <a:latin typeface="Arial" panose="020B0604020202020204" pitchFamily="34" charset="0"/>
+              </a:rPr>
+              <a:t>Worked as a Data Scientist consultant in analytics roles at Comerica Bank, Best Buy, and DirecTV</a:t>
+            </a:r>
+          </a:p>
+          <a:p>
+            <a:pPr algn="l"/>
+            <a:r>
+              <a:rPr lang="en-US" b="0" i="0" dirty="0">
+                <a:solidFill>
+                  <a:srgbClr val="222222"/>
+                </a:solidFill>
+                <a:effectLst/>
+                <a:latin typeface="Arial" panose="020B0604020202020204" pitchFamily="34" charset="0"/>
+              </a:rPr>
+              <a:t>Currently living in San Diego, California</a:t>
+            </a:r>
+          </a:p>
+          <a:p>
+            <a:pPr algn="l"/>
+            <a:r>
+              <a:rPr lang="en-US" b="0" i="0" dirty="0">
+                <a:solidFill>
+                  <a:srgbClr val="222222"/>
+                </a:solidFill>
+                <a:effectLst/>
+                <a:latin typeface="Arial" panose="020B0604020202020204" pitchFamily="34" charset="0"/>
+              </a:rPr>
+              <a:t>Loves playing basketball in my free time. </a:t>
+            </a:r>
+          </a:p>
+          <a:p>
+            <a:pPr algn="l">
+              <a:buFont typeface="Arial" panose="020B0604020202020204" pitchFamily="34" charset="0"/>
+              <a:buChar char="•"/>
             </a:pPr>
-            <a:br>
-              <a:rPr lang="en-US" dirty="0"/>
-            </a:br>
             <a:endParaRPr lang="en-US" dirty="0"/>
           </a:p>
         </p:txBody>
@@ -6554,7 +6486,7 @@
 </file>
 
 <file path=ppt/slides/slide14.xml><?xml version="1.0" encoding="utf-8"?>
-<p:sld xmlns:a="http://schemas.openxmlformats.org/drawingml/2006/main" xmlns:r="http://schemas.openxmlformats.org/officeDocument/2006/relationships" xmlns:p="http://schemas.openxmlformats.org/presentationml/2006/main" show="0">
+<p:sld xmlns:a="http://schemas.openxmlformats.org/drawingml/2006/main" xmlns:r="http://schemas.openxmlformats.org/officeDocument/2006/relationships" xmlns:p="http://schemas.openxmlformats.org/presentationml/2006/main">
   <p:cSld>
     <p:spTree>
       <p:nvGrpSpPr>
@@ -6607,13 +6539,13 @@
           <a:p>
             <a:r>
               <a:rPr lang="en-US" dirty="0"/>
-              <a:t>Tuesdays – Lectures focused on theoretical foundations – 6:00 to 8:00 pm US Eastern Time</a:t>
+              <a:t>Wednesdays – Lectures focused on theoretical foundations – 6:00 to 8:00 pm US Eastern Time</a:t>
             </a:r>
           </a:p>
           <a:p>
             <a:r>
               <a:rPr lang="en-US" dirty="0"/>
-              <a:t>Wednesdays – Section meeting to address questions, review and background – starting at 6:00 pm US Eastern Time  </a:t>
+              <a:t>Tuesdays – Section meeting to address questions, review and background – starting at 6:00 pm US Eastern Time  </a:t>
             </a:r>
           </a:p>
           <a:p>
@@ -6626,23 +6558,7 @@
                   <a:srgbClr val="FF0000"/>
                 </a:solidFill>
               </a:rPr>
-              <a:t>All class meetings are recorded and available on-demand – See </a:t>
-            </a:r>
-            <a:r>
-              <a:rPr lang="en-US">
-                <a:solidFill>
-                  <a:srgbClr val="FF0000"/>
-                </a:solidFill>
-              </a:rPr>
-              <a:t>Class Recordings </a:t>
-            </a:r>
-            <a:r>
-              <a:rPr lang="en-US" dirty="0">
-                <a:solidFill>
-                  <a:srgbClr val="FF0000"/>
-                </a:solidFill>
-              </a:rPr>
-              <a:t>tab in Canvas</a:t>
+              <a:t>All class meetings are recorded and available on-demand – See Class Recordings tab in Canvas</a:t>
             </a:r>
           </a:p>
           <a:p>
@@ -6946,7 +6862,7 @@
 </file>
 
 <file path=ppt/slides/slide15.xml><?xml version="1.0" encoding="utf-8"?>
-<p:sld xmlns:a="http://schemas.openxmlformats.org/drawingml/2006/main" xmlns:r="http://schemas.openxmlformats.org/officeDocument/2006/relationships" xmlns:p="http://schemas.openxmlformats.org/presentationml/2006/main">
+<p:sld xmlns:a="http://schemas.openxmlformats.org/drawingml/2006/main" xmlns:r="http://schemas.openxmlformats.org/officeDocument/2006/relationships" xmlns:p="http://schemas.openxmlformats.org/presentationml/2006/main" show="0">
   <p:cSld>
     <p:spTree>
       <p:nvGrpSpPr>
@@ -7389,7 +7305,7 @@
 </file>
 
 <file path=ppt/slides/slide16.xml><?xml version="1.0" encoding="utf-8"?>
-<p:sld xmlns:a="http://schemas.openxmlformats.org/drawingml/2006/main" xmlns:r="http://schemas.openxmlformats.org/officeDocument/2006/relationships" xmlns:p="http://schemas.openxmlformats.org/presentationml/2006/main">
+<p:sld xmlns:a="http://schemas.openxmlformats.org/drawingml/2006/main" xmlns:r="http://schemas.openxmlformats.org/officeDocument/2006/relationships" xmlns:p="http://schemas.openxmlformats.org/presentationml/2006/main" show="0">
   <p:cSld>
     <p:spTree>
       <p:nvGrpSpPr>
@@ -8065,7 +7981,7 @@
               <a:rPr lang="en-US" dirty="0">
                 <a:latin typeface="+mn-lt"/>
               </a:rPr>
-              <a:t>Undergraduate Credit Grades</a:t>
+              <a:t>Undergraduate Credit Grading</a:t>
             </a:r>
           </a:p>
         </p:txBody>
@@ -8236,7 +8152,7 @@
               <a:rPr lang="en-US" dirty="0">
                 <a:latin typeface="+mn-lt"/>
               </a:rPr>
-              <a:t>Graduate Credit Grades</a:t>
+              <a:t>Graduate Credit Grading</a:t>
             </a:r>
           </a:p>
         </p:txBody>
@@ -9101,7 +9017,7 @@
                   <a:srgbClr val="FF0000"/>
                 </a:solidFill>
               </a:rPr>
-              <a:t>Post complete exception messages if you are dealing with an error!</a:t>
+              <a:t>Post code and complete exception messages if you are dealing with an error!</a:t>
             </a:r>
           </a:p>
           <a:p>
@@ -9135,7 +9051,15 @@
             </a:r>
             <a:r>
               <a:rPr lang="en-US" dirty="0"/>
-              <a:t> at g dot Harvard dot </a:t>
+              <a:t> at g dot </a:t>
+            </a:r>
+            <a:r>
+              <a:rPr lang="en-US"/>
+              <a:t>harvard</a:t>
+            </a:r>
+            <a:r>
+              <a:rPr lang="en-US" dirty="0"/>
+              <a:t> dot </a:t>
             </a:r>
             <a:r>
               <a:rPr lang="en-US" dirty="0" err="1"/>
@@ -9143,7 +9067,17 @@
             </a:r>
             <a:r>
               <a:rPr lang="en-US" dirty="0"/>
-              <a:t>, </a:t>
+              <a:t>, Eric </a:t>
+            </a:r>
+            <a:r>
+              <a:rPr lang="en-US" dirty="0" err="1">
+                <a:latin typeface="+mn-lt"/>
+              </a:rPr>
+              <a:t>Trucksess</a:t>
+            </a:r>
+            <a:r>
+              <a:rPr lang="en-US" dirty="0"/>
+              <a:t> </a:t>
             </a:r>
             <a:r>
               <a:rPr lang="en-US" b="0" i="0" dirty="0">
@@ -9173,7 +9107,7 @@
                 <a:effectLst/>
                 <a:latin typeface="Google Sans"/>
               </a:rPr>
-              <a:t>, tab840 at g dot Harvard dot </a:t>
+              <a:t>, George Cruz, </a:t>
             </a:r>
             <a:r>
               <a:rPr lang="en-US" b="0" i="0" dirty="0" err="1">
@@ -9183,9 +9117,18 @@
                 <a:effectLst/>
                 <a:latin typeface="Google Sans"/>
               </a:rPr>
-              <a:t>edu</a:t>
-            </a:r>
-            <a:endParaRPr lang="en-US" dirty="0"/>
+              <a:t>George_crz</a:t>
+            </a:r>
+            <a:r>
+              <a:rPr lang="en-US" b="0" i="0" dirty="0">
+                <a:solidFill>
+                  <a:srgbClr val="5E5E5E"/>
+                </a:solidFill>
+                <a:effectLst/>
+                <a:latin typeface="Google Sans"/>
+              </a:rPr>
+              <a:t> at outlook dot com</a:t>
+            </a:r>
           </a:p>
           <a:p>
             <a:r>
@@ -9265,7 +9208,7 @@
 </file>
 
 <file path=ppt/slides/slide21.xml><?xml version="1.0" encoding="utf-8"?>
-<p:sld xmlns:a="http://schemas.openxmlformats.org/drawingml/2006/main" xmlns:r="http://schemas.openxmlformats.org/officeDocument/2006/relationships" xmlns:p="http://schemas.openxmlformats.org/presentationml/2006/main">
+<p:sld xmlns:a="http://schemas.openxmlformats.org/drawingml/2006/main" xmlns:r="http://schemas.openxmlformats.org/officeDocument/2006/relationships" xmlns:p="http://schemas.openxmlformats.org/presentationml/2006/main" show="0">
   <p:cSld>
     <p:spTree>
       <p:nvGrpSpPr>
@@ -9439,7 +9382,7 @@
 </file>
 
 <file path=ppt/slides/slide22.xml><?xml version="1.0" encoding="utf-8"?>
-<p:sld xmlns:a="http://schemas.openxmlformats.org/drawingml/2006/main" xmlns:r="http://schemas.openxmlformats.org/officeDocument/2006/relationships" xmlns:p="http://schemas.openxmlformats.org/presentationml/2006/main" show="0">
+<p:sld xmlns:a="http://schemas.openxmlformats.org/drawingml/2006/main" xmlns:r="http://schemas.openxmlformats.org/officeDocument/2006/relationships" xmlns:p="http://schemas.openxmlformats.org/presentationml/2006/main">
   <p:cSld>
     <p:spTree>
       <p:nvGrpSpPr>
@@ -22249,8 +22192,8 @@
           <a:chExt cx="0" cy="0"/>
         </a:xfrm>
       </p:grpSpPr>
-      <mc:AlternateContent xmlns:mc="http://schemas.openxmlformats.org/markup-compatibility/2006">
-        <mc:Choice xmlns:a14="http://schemas.microsoft.com/office/drawing/2010/main" Requires="a14">
+      <mc:AlternateContent xmlns:mc="http://schemas.openxmlformats.org/markup-compatibility/2006" xmlns:a14="http://schemas.microsoft.com/office/drawing/2010/main">
+        <mc:Choice Requires="a14">
           <p:sp>
             <p:nvSpPr>
               <p:cNvPr id="3" name="Content Placeholder 2">
@@ -22523,7 +22466,7 @@
             </p:txBody>
           </p:sp>
         </mc:Choice>
-        <mc:Fallback>
+        <mc:Fallback xmlns="">
           <p:sp>
             <p:nvSpPr>
               <p:cNvPr id="3" name="Content Placeholder 2">

</xml_diff>

<commit_message>
Corrected annimation and small text changes
</commit_message>
<xml_diff>
--- a/slides/1_Introduction.pptx
+++ b/slides/1_Introduction.pptx
@@ -259,7 +259,7 @@
           <a:p>
             <a:fld id="{2F3ABF1A-8818-4472-8518-E71DC7B5D2F7}" type="datetimeFigureOut">
               <a:rPr lang="en-US" smtClean="0"/>
-              <a:t>1/27/2025</a:t>
+              <a:t>1/29/2025</a:t>
             </a:fld>
             <a:endParaRPr lang="en-US"/>
           </a:p>
@@ -1279,7 +1279,7 @@
           <a:p>
             <a:fld id="{6E4A31BF-7266-4BEB-918B-ADC21C630A6F}" type="datetimeFigureOut">
               <a:rPr lang="en-US" smtClean="0"/>
-              <a:t>1/27/2025</a:t>
+              <a:t>1/29/2025</a:t>
             </a:fld>
             <a:endParaRPr lang="en-US"/>
           </a:p>
@@ -1477,7 +1477,7 @@
           <a:p>
             <a:fld id="{6E4A31BF-7266-4BEB-918B-ADC21C630A6F}" type="datetimeFigureOut">
               <a:rPr lang="en-US" smtClean="0"/>
-              <a:t>1/27/2025</a:t>
+              <a:t>1/29/2025</a:t>
             </a:fld>
             <a:endParaRPr lang="en-US"/>
           </a:p>
@@ -1685,7 +1685,7 @@
           <a:p>
             <a:fld id="{6E4A31BF-7266-4BEB-918B-ADC21C630A6F}" type="datetimeFigureOut">
               <a:rPr lang="en-US" smtClean="0"/>
-              <a:t>1/27/2025</a:t>
+              <a:t>1/29/2025</a:t>
             </a:fld>
             <a:endParaRPr lang="en-US"/>
           </a:p>
@@ -1883,7 +1883,7 @@
           <a:p>
             <a:fld id="{6E4A31BF-7266-4BEB-918B-ADC21C630A6F}" type="datetimeFigureOut">
               <a:rPr lang="en-US" smtClean="0"/>
-              <a:t>1/27/2025</a:t>
+              <a:t>1/29/2025</a:t>
             </a:fld>
             <a:endParaRPr lang="en-US"/>
           </a:p>
@@ -2158,7 +2158,7 @@
           <a:p>
             <a:fld id="{6E4A31BF-7266-4BEB-918B-ADC21C630A6F}" type="datetimeFigureOut">
               <a:rPr lang="en-US" smtClean="0"/>
-              <a:t>1/27/2025</a:t>
+              <a:t>1/29/2025</a:t>
             </a:fld>
             <a:endParaRPr lang="en-US"/>
           </a:p>
@@ -2423,7 +2423,7 @@
           <a:p>
             <a:fld id="{6E4A31BF-7266-4BEB-918B-ADC21C630A6F}" type="datetimeFigureOut">
               <a:rPr lang="en-US" smtClean="0"/>
-              <a:t>1/27/2025</a:t>
+              <a:t>1/29/2025</a:t>
             </a:fld>
             <a:endParaRPr lang="en-US"/>
           </a:p>
@@ -2835,7 +2835,7 @@
           <a:p>
             <a:fld id="{6E4A31BF-7266-4BEB-918B-ADC21C630A6F}" type="datetimeFigureOut">
               <a:rPr lang="en-US" smtClean="0"/>
-              <a:t>1/27/2025</a:t>
+              <a:t>1/29/2025</a:t>
             </a:fld>
             <a:endParaRPr lang="en-US"/>
           </a:p>
@@ -2976,7 +2976,7 @@
           <a:p>
             <a:fld id="{6E4A31BF-7266-4BEB-918B-ADC21C630A6F}" type="datetimeFigureOut">
               <a:rPr lang="en-US" smtClean="0"/>
-              <a:t>1/27/2025</a:t>
+              <a:t>1/29/2025</a:t>
             </a:fld>
             <a:endParaRPr lang="en-US"/>
           </a:p>
@@ -3089,7 +3089,7 @@
           <a:p>
             <a:fld id="{6E4A31BF-7266-4BEB-918B-ADC21C630A6F}" type="datetimeFigureOut">
               <a:rPr lang="en-US" smtClean="0"/>
-              <a:t>1/27/2025</a:t>
+              <a:t>1/29/2025</a:t>
             </a:fld>
             <a:endParaRPr lang="en-US"/>
           </a:p>
@@ -3400,7 +3400,7 @@
           <a:p>
             <a:fld id="{6E4A31BF-7266-4BEB-918B-ADC21C630A6F}" type="datetimeFigureOut">
               <a:rPr lang="en-US" smtClean="0"/>
-              <a:t>1/27/2025</a:t>
+              <a:t>1/29/2025</a:t>
             </a:fld>
             <a:endParaRPr lang="en-US"/>
           </a:p>
@@ -3688,7 +3688,7 @@
           <a:p>
             <a:fld id="{6E4A31BF-7266-4BEB-918B-ADC21C630A6F}" type="datetimeFigureOut">
               <a:rPr lang="en-US" smtClean="0"/>
-              <a:t>1/27/2025</a:t>
+              <a:t>1/29/2025</a:t>
             </a:fld>
             <a:endParaRPr lang="en-US"/>
           </a:p>
@@ -3929,7 +3929,7 @@
           <a:p>
             <a:fld id="{6E4A31BF-7266-4BEB-918B-ADC21C630A6F}" type="datetimeFigureOut">
               <a:rPr lang="en-US" smtClean="0"/>
-              <a:t>1/27/2025</a:t>
+              <a:t>1/29/2025</a:t>
             </a:fld>
             <a:endParaRPr lang="en-US"/>
           </a:p>
@@ -6165,26 +6165,39 @@
                                   </p:childTnLst>
                                 </p:cTn>
                               </p:par>
-                            </p:childTnLst>
-                          </p:cTn>
-                        </p:par>
-                      </p:childTnLst>
-                    </p:cTn>
-                  </p:par>
-                  <p:par>
-                    <p:cTn id="7" fill="hold">
-                      <p:stCondLst>
-                        <p:cond delay="indefinite"/>
-                      </p:stCondLst>
-                      <p:childTnLst>
-                        <p:par>
-                          <p:cTn id="8" fill="hold">
-                            <p:stCondLst>
-                              <p:cond delay="0"/>
-                            </p:stCondLst>
-                            <p:childTnLst>
                               <p:par>
-                                <p:cTn id="9" presetID="1" presetClass="entr" presetSubtype="0" fill="hold" nodeType="clickEffect">
+                                <p:cTn id="7" presetID="1" presetClass="entr" presetSubtype="0" fill="hold" nodeType="withEffect">
+                                  <p:stCondLst>
+                                    <p:cond delay="0"/>
+                                  </p:stCondLst>
+                                  <p:childTnLst>
+                                    <p:set>
+                                      <p:cBhvr>
+                                        <p:cTn id="8" dur="1" fill="hold">
+                                          <p:stCondLst>
+                                            <p:cond delay="0"/>
+                                          </p:stCondLst>
+                                        </p:cTn>
+                                        <p:tgtEl>
+                                          <p:spTgt spid="3">
+                                            <p:txEl>
+                                              <p:pRg st="2" end="2"/>
+                                            </p:txEl>
+                                          </p:spTgt>
+                                        </p:tgtEl>
+                                        <p:attrNameLst>
+                                          <p:attrName>style.visibility</p:attrName>
+                                        </p:attrNameLst>
+                                      </p:cBhvr>
+                                      <p:to>
+                                        <p:strVal val="visible"/>
+                                      </p:to>
+                                    </p:set>
+                                  </p:childTnLst>
+                                </p:cTn>
+                              </p:par>
+                              <p:par>
+                                <p:cTn id="9" presetID="1" presetClass="entr" presetSubtype="0" fill="hold" nodeType="withEffect">
                                   <p:stCondLst>
                                     <p:cond delay="0"/>
                                   </p:stCondLst>
@@ -6199,7 +6212,7 @@
                                         <p:tgtEl>
                                           <p:spTgt spid="3">
                                             <p:txEl>
-                                              <p:pRg st="2" end="2"/>
+                                              <p:pRg st="3" end="3"/>
                                             </p:txEl>
                                           </p:spTgt>
                                         </p:tgtEl>
@@ -6230,37 +6243,6 @@
                                         <p:tgtEl>
                                           <p:spTgt spid="3">
                                             <p:txEl>
-                                              <p:pRg st="3" end="3"/>
-                                            </p:txEl>
-                                          </p:spTgt>
-                                        </p:tgtEl>
-                                        <p:attrNameLst>
-                                          <p:attrName>style.visibility</p:attrName>
-                                        </p:attrNameLst>
-                                      </p:cBhvr>
-                                      <p:to>
-                                        <p:strVal val="visible"/>
-                                      </p:to>
-                                    </p:set>
-                                  </p:childTnLst>
-                                </p:cTn>
-                              </p:par>
-                              <p:par>
-                                <p:cTn id="13" presetID="1" presetClass="entr" presetSubtype="0" fill="hold" nodeType="withEffect">
-                                  <p:stCondLst>
-                                    <p:cond delay="0"/>
-                                  </p:stCondLst>
-                                  <p:childTnLst>
-                                    <p:set>
-                                      <p:cBhvr>
-                                        <p:cTn id="14" dur="1" fill="hold">
-                                          <p:stCondLst>
-                                            <p:cond delay="0"/>
-                                          </p:stCondLst>
-                                        </p:cTn>
-                                        <p:tgtEl>
-                                          <p:spTgt spid="3">
-                                            <p:txEl>
                                               <p:pRg st="4" end="4"/>
                                             </p:txEl>
                                           </p:spTgt>
@@ -6283,19 +6265,50 @@
                     </p:cTn>
                   </p:par>
                   <p:par>
-                    <p:cTn id="15" fill="hold">
+                    <p:cTn id="13" fill="hold">
                       <p:stCondLst>
                         <p:cond delay="indefinite"/>
                       </p:stCondLst>
                       <p:childTnLst>
                         <p:par>
-                          <p:cTn id="16" fill="hold">
+                          <p:cTn id="14" fill="hold">
                             <p:stCondLst>
                               <p:cond delay="0"/>
                             </p:stCondLst>
                             <p:childTnLst>
                               <p:par>
-                                <p:cTn id="17" presetID="1" presetClass="entr" presetSubtype="0" fill="hold" nodeType="clickEffect">
+                                <p:cTn id="15" presetID="1" presetClass="entr" presetSubtype="0" fill="hold" nodeType="clickEffect">
+                                  <p:stCondLst>
+                                    <p:cond delay="0"/>
+                                  </p:stCondLst>
+                                  <p:childTnLst>
+                                    <p:set>
+                                      <p:cBhvr>
+                                        <p:cTn id="16" dur="1" fill="hold">
+                                          <p:stCondLst>
+                                            <p:cond delay="0"/>
+                                          </p:stCondLst>
+                                        </p:cTn>
+                                        <p:tgtEl>
+                                          <p:spTgt spid="3">
+                                            <p:txEl>
+                                              <p:pRg st="5" end="5"/>
+                                            </p:txEl>
+                                          </p:spTgt>
+                                        </p:tgtEl>
+                                        <p:attrNameLst>
+                                          <p:attrName>style.visibility</p:attrName>
+                                        </p:attrNameLst>
+                                      </p:cBhvr>
+                                      <p:to>
+                                        <p:strVal val="visible"/>
+                                      </p:to>
+                                    </p:set>
+                                  </p:childTnLst>
+                                </p:cTn>
+                              </p:par>
+                              <p:par>
+                                <p:cTn id="17" presetID="1" presetClass="entr" presetSubtype="0" fill="hold" nodeType="withEffect">
                                   <p:stCondLst>
                                     <p:cond delay="0"/>
                                   </p:stCondLst>
@@ -6310,7 +6323,7 @@
                                         <p:tgtEl>
                                           <p:spTgt spid="3">
                                             <p:txEl>
-                                              <p:pRg st="5" end="5"/>
+                                              <p:pRg st="6" end="6"/>
                                             </p:txEl>
                                           </p:spTgt>
                                         </p:tgtEl>
@@ -6341,7 +6354,7 @@
                                         <p:tgtEl>
                                           <p:spTgt spid="3">
                                             <p:txEl>
-                                              <p:pRg st="6" end="6"/>
+                                              <p:pRg st="7" end="7"/>
                                             </p:txEl>
                                           </p:spTgt>
                                         </p:tgtEl>
@@ -6372,7 +6385,7 @@
                                         <p:tgtEl>
                                           <p:spTgt spid="3">
                                             <p:txEl>
-                                              <p:pRg st="7" end="7"/>
+                                              <p:pRg st="8" end="8"/>
                                             </p:txEl>
                                           </p:spTgt>
                                         </p:tgtEl>
@@ -6396,37 +6409,6 @@
                                     <p:set>
                                       <p:cBhvr>
                                         <p:cTn id="24" dur="1" fill="hold">
-                                          <p:stCondLst>
-                                            <p:cond delay="0"/>
-                                          </p:stCondLst>
-                                        </p:cTn>
-                                        <p:tgtEl>
-                                          <p:spTgt spid="3">
-                                            <p:txEl>
-                                              <p:pRg st="8" end="8"/>
-                                            </p:txEl>
-                                          </p:spTgt>
-                                        </p:tgtEl>
-                                        <p:attrNameLst>
-                                          <p:attrName>style.visibility</p:attrName>
-                                        </p:attrNameLst>
-                                      </p:cBhvr>
-                                      <p:to>
-                                        <p:strVal val="visible"/>
-                                      </p:to>
-                                    </p:set>
-                                  </p:childTnLst>
-                                </p:cTn>
-                              </p:par>
-                              <p:par>
-                                <p:cTn id="25" presetID="1" presetClass="entr" presetSubtype="0" fill="hold" nodeType="withEffect">
-                                  <p:stCondLst>
-                                    <p:cond delay="0"/>
-                                  </p:stCondLst>
-                                  <p:childTnLst>
-                                    <p:set>
-                                      <p:cBhvr>
-                                        <p:cTn id="26" dur="1" fill="hold">
                                           <p:stCondLst>
                                             <p:cond delay="0"/>
                                           </p:stCondLst>
@@ -7920,7 +7902,7 @@
             <a:pPr lvl="1"/>
             <a:r>
               <a:rPr lang="en-US" dirty="0"/>
-              <a:t>Expect 9</a:t>
+              <a:t>Expect 9 assignments</a:t>
             </a:r>
           </a:p>
         </p:txBody>
@@ -8071,7 +8053,7 @@
             <a:pPr lvl="1"/>
             <a:r>
               <a:rPr lang="en-US" dirty="0"/>
-              <a:t>Expect 9</a:t>
+              <a:t>Expect 9 assignments</a:t>
             </a:r>
           </a:p>
           <a:p>
@@ -9338,6 +9320,25 @@
             </a:r>
           </a:p>
           <a:p>
+            <a:pPr lvl="1"/>
+            <a:r>
+              <a:rPr lang="en-US" b="1" dirty="0">
+                <a:solidFill>
+                  <a:srgbClr val="5E5E5E"/>
+                </a:solidFill>
+                <a:latin typeface="Google Sans"/>
+              </a:rPr>
+              <a:t>Private one-on-one appointments on request</a:t>
+            </a:r>
+            <a:endParaRPr lang="en-US" b="1" i="0" dirty="0">
+              <a:solidFill>
+                <a:srgbClr val="5E5E5E"/>
+              </a:solidFill>
+              <a:effectLst/>
+              <a:latin typeface="Google Sans"/>
+            </a:endParaRPr>
+          </a:p>
+          <a:p>
             <a:r>
               <a:rPr lang="en-US" b="1" dirty="0"/>
               <a:t>Do not use Canvas messages, unless you want a delayed response!   </a:t>
@@ -9681,16 +9682,6 @@
             <a:r>
               <a:rPr lang="en-US" dirty="0"/>
               <a:t>More than 6 days late - no credit   </a:t>
-            </a:r>
-          </a:p>
-          <a:p>
-            <a:r>
-              <a:rPr lang="en-US" dirty="0"/>
-              <a:t>With 9-10 assignments plus a project for graduate credit, there is </a:t>
-            </a:r>
-            <a:r>
-              <a:rPr lang="en-US" b="1" dirty="0"/>
-              <a:t>no time to ‘catch up’</a:t>
             </a:r>
           </a:p>
           <a:p>
@@ -10517,7 +10508,7 @@
               <a:p>
                 <a:r>
                   <a:rPr lang="en-US" dirty="0"/>
-                  <a:t>Look up uses key-value pairs as a tuple, </a:t>
+                  <a:t>Manage with key-value pairs as a tuple, </a:t>
                 </a:r>
                 <a14:m>
                   <m:oMath xmlns:m="http://schemas.openxmlformats.org/officeDocument/2006/math">
@@ -11222,7 +11213,7 @@
               <a:p>
                 <a:r>
                   <a:rPr lang="en-US" dirty="0"/>
-                  <a:t>Index values, </a:t>
+                  <a:t>Address values, </a:t>
                 </a:r>
                 <a14:m>
                   <m:oMath xmlns:m="http://schemas.openxmlformats.org/officeDocument/2006/math">
@@ -12367,6 +12358,13 @@
               <a:t>Try lots of ideas, fail fast, keep the ones that work! </a:t>
             </a:r>
           </a:p>
+          <a:p>
+            <a:pPr lvl="1"/>
+            <a:r>
+              <a:rPr lang="en-US" b="1" dirty="0"/>
+              <a:t>Keep this in mind when doing your graduate project!</a:t>
+            </a:r>
+          </a:p>
         </p:txBody>
       </p:sp>
       <p:sp>
@@ -12695,6 +12693,37 @@
                                   </p:childTnLst>
                                 </p:cTn>
                               </p:par>
+                              <p:par>
+                                <p:cTn id="23" presetID="1" presetClass="entr" presetSubtype="0" fill="hold" nodeType="withEffect">
+                                  <p:stCondLst>
+                                    <p:cond delay="0"/>
+                                  </p:stCondLst>
+                                  <p:childTnLst>
+                                    <p:set>
+                                      <p:cBhvr>
+                                        <p:cTn id="24" dur="1" fill="hold">
+                                          <p:stCondLst>
+                                            <p:cond delay="0"/>
+                                          </p:stCondLst>
+                                        </p:cTn>
+                                        <p:tgtEl>
+                                          <p:spTgt spid="3">
+                                            <p:txEl>
+                                              <p:pRg st="7" end="7"/>
+                                            </p:txEl>
+                                          </p:spTgt>
+                                        </p:tgtEl>
+                                        <p:attrNameLst>
+                                          <p:attrName>style.visibility</p:attrName>
+                                        </p:attrNameLst>
+                                      </p:cBhvr>
+                                      <p:to>
+                                        <p:strVal val="visible"/>
+                                      </p:to>
+                                    </p:set>
+                                  </p:childTnLst>
+                                </p:cTn>
+                              </p:par>
                             </p:childTnLst>
                           </p:cTn>
                         </p:par>
@@ -12743,8 +12772,8 @@
           <a:chExt cx="0" cy="0"/>
         </a:xfrm>
       </p:grpSpPr>
-      <mc:AlternateContent xmlns:mc="http://schemas.openxmlformats.org/markup-compatibility/2006" xmlns:a14="http://schemas.microsoft.com/office/drawing/2010/main">
-        <mc:Choice Requires="a14">
+      <mc:AlternateContent xmlns:mc="http://schemas.openxmlformats.org/markup-compatibility/2006">
+        <mc:Choice xmlns:a14="http://schemas.microsoft.com/office/drawing/2010/main" Requires="a14">
           <p:sp>
             <p:nvSpPr>
               <p:cNvPr id="3" name="Content Placeholder 2">
@@ -12790,7 +12819,7 @@
               <a:p>
                 <a:r>
                   <a:rPr lang="en-US" dirty="0"/>
-                  <a:t>Linear search on this large number of keys is slow  </a:t>
+                  <a:t>Linear search on large set of keys is slow  </a:t>
                 </a:r>
               </a:p>
               <a:p>
@@ -13050,7 +13079,7 @@
             </p:txBody>
           </p:sp>
         </mc:Choice>
-        <mc:Fallback xmlns="">
+        <mc:Fallback>
           <p:sp>
             <p:nvSpPr>
               <p:cNvPr id="3" name="Content Placeholder 2">
@@ -13469,33 +13498,15 @@
                                   </p:childTnLst>
                                 </p:cTn>
                               </p:par>
-                            </p:childTnLst>
-                          </p:cTn>
-                        </p:par>
-                      </p:childTnLst>
-                    </p:cTn>
-                  </p:par>
-                  <p:par>
-                    <p:cTn id="27" fill="hold">
-                      <p:stCondLst>
-                        <p:cond delay="indefinite"/>
-                      </p:stCondLst>
-                      <p:childTnLst>
-                        <p:par>
-                          <p:cTn id="28" fill="hold">
-                            <p:stCondLst>
-                              <p:cond delay="0"/>
-                            </p:stCondLst>
-                            <p:childTnLst>
                               <p:par>
-                                <p:cTn id="29" presetID="1" presetClass="entr" presetSubtype="0" fill="hold" nodeType="clickEffect">
+                                <p:cTn id="27" presetID="1" presetClass="entr" presetSubtype="0" fill="hold" nodeType="withEffect">
                                   <p:stCondLst>
                                     <p:cond delay="0"/>
                                   </p:stCondLst>
                                   <p:childTnLst>
                                     <p:set>
                                       <p:cBhvr>
-                                        <p:cTn id="30" dur="1" fill="hold">
+                                        <p:cTn id="28" dur="1" fill="hold">
                                           <p:stCondLst>
                                             <p:cond delay="0"/>
                                           </p:stCondLst>
@@ -13518,33 +13529,15 @@
                                   </p:childTnLst>
                                 </p:cTn>
                               </p:par>
-                            </p:childTnLst>
-                          </p:cTn>
-                        </p:par>
-                      </p:childTnLst>
-                    </p:cTn>
-                  </p:par>
-                  <p:par>
-                    <p:cTn id="31" fill="hold">
-                      <p:stCondLst>
-                        <p:cond delay="indefinite"/>
-                      </p:stCondLst>
-                      <p:childTnLst>
-                        <p:par>
-                          <p:cTn id="32" fill="hold">
-                            <p:stCondLst>
-                              <p:cond delay="0"/>
-                            </p:stCondLst>
-                            <p:childTnLst>
                               <p:par>
-                                <p:cTn id="33" presetID="1" presetClass="entr" presetSubtype="0" fill="hold" nodeType="clickEffect">
+                                <p:cTn id="29" presetID="1" presetClass="entr" presetSubtype="0" fill="hold" nodeType="withEffect">
                                   <p:stCondLst>
                                     <p:cond delay="0"/>
                                   </p:stCondLst>
                                   <p:childTnLst>
                                     <p:set>
                                       <p:cBhvr>
-                                        <p:cTn id="34" dur="1" fill="hold">
+                                        <p:cTn id="30" dur="1" fill="hold">
                                           <p:stCondLst>
                                             <p:cond delay="0"/>
                                           </p:stCondLst>
@@ -16047,8 +16040,8 @@
           <a:chExt cx="0" cy="0"/>
         </a:xfrm>
       </p:grpSpPr>
-      <mc:AlternateContent xmlns:mc="http://schemas.openxmlformats.org/markup-compatibility/2006" xmlns:a14="http://schemas.microsoft.com/office/drawing/2010/main">
-        <mc:Choice Requires="a14">
+      <mc:AlternateContent xmlns:mc="http://schemas.openxmlformats.org/markup-compatibility/2006">
+        <mc:Choice xmlns:a14="http://schemas.microsoft.com/office/drawing/2010/main" Requires="a14">
           <p:sp>
             <p:nvSpPr>
               <p:cNvPr id="3" name="Content Placeholder 2">
@@ -16106,7 +16099,7 @@
               <a:p>
                 <a:r>
                   <a:rPr lang="en-US" dirty="0"/>
-                  <a:t>Hash index, </a:t>
+                  <a:t>Hash address index, </a:t>
                 </a:r>
                 <a14:m>
                   <m:oMath xmlns:m="http://schemas.openxmlformats.org/officeDocument/2006/math">
@@ -16200,7 +16193,15 @@
               <a:p>
                 <a:r>
                   <a:rPr lang="en-US" dirty="0"/>
-                  <a:t>Same hash used for insertions and deletions in table</a:t>
+                  <a:t>Same </a:t>
+                </a:r>
+                <a:r>
+                  <a:rPr lang="en-US"/>
+                  <a:t>hash function used </a:t>
+                </a:r>
+                <a:r>
+                  <a:rPr lang="en-US" dirty="0"/>
+                  <a:t>for insertions and deletions in table</a:t>
                 </a:r>
               </a:p>
               <a:p>
@@ -16266,7 +16267,7 @@
             </p:txBody>
           </p:sp>
         </mc:Choice>
-        <mc:Fallback xmlns="">
+        <mc:Fallback>
           <p:sp>
             <p:nvSpPr>
               <p:cNvPr id="3" name="Content Placeholder 2">
@@ -18228,7 +18229,12 @@
                   <a:rPr lang="en-US" b="1" dirty="0"/>
                   <a:t>hash table</a:t>
                 </a:r>
-                <a:endParaRPr lang="en-US" dirty="0"/>
+              </a:p>
+              <a:p>
+                <a:r>
+                  <a:rPr lang="en-US" dirty="0"/>
+                  <a:t>Values held in buckets</a:t>
+                </a:r>
               </a:p>
               <a:p>
                 <a:r>
@@ -18244,13 +18250,6 @@
                 <a:r>
                   <a:rPr lang="en-US" dirty="0"/>
                   <a:t>Hash the key to an address in the table</a:t>
-                </a:r>
-                <a:endParaRPr lang="en-US" b="1" dirty="0"/>
-              </a:p>
-              <a:p>
-                <a:r>
-                  <a:rPr lang="en-US" dirty="0"/>
-                  <a:t>Values held in buckets</a:t>
                 </a:r>
               </a:p>
               <a:p>
@@ -18749,26 +18748,35 @@
                                   </p:childTnLst>
                                 </p:cTn>
                               </p:par>
-                            </p:childTnLst>
-                          </p:cTn>
-                        </p:par>
-                      </p:childTnLst>
-                    </p:cTn>
-                  </p:par>
-                  <p:par>
-                    <p:cTn id="15" fill="hold">
-                      <p:stCondLst>
-                        <p:cond delay="indefinite"/>
-                      </p:stCondLst>
-                      <p:childTnLst>
-                        <p:par>
-                          <p:cTn id="16" fill="hold">
-                            <p:stCondLst>
-                              <p:cond delay="0"/>
-                            </p:stCondLst>
-                            <p:childTnLst>
                               <p:par>
-                                <p:cTn id="17" presetID="1" presetClass="entr" presetSubtype="0" fill="hold" grpId="0" nodeType="clickEffect">
+                                <p:cTn id="15" presetID="1" presetClass="entr" presetSubtype="0" fill="hold" grpId="0" nodeType="withEffect">
+                                  <p:stCondLst>
+                                    <p:cond delay="0"/>
+                                  </p:stCondLst>
+                                  <p:childTnLst>
+                                    <p:set>
+                                      <p:cBhvr>
+                                        <p:cTn id="16" dur="1" fill="hold">
+                                          <p:stCondLst>
+                                            <p:cond delay="0"/>
+                                          </p:stCondLst>
+                                        </p:cTn>
+                                        <p:tgtEl>
+                                          <p:spTgt spid="23"/>
+                                        </p:tgtEl>
+                                        <p:attrNameLst>
+                                          <p:attrName>style.visibility</p:attrName>
+                                        </p:attrNameLst>
+                                      </p:cBhvr>
+                                      <p:to>
+                                        <p:strVal val="visible"/>
+                                      </p:to>
+                                    </p:set>
+                                  </p:childTnLst>
+                                </p:cTn>
+                              </p:par>
+                              <p:par>
+                                <p:cTn id="17" presetID="1" presetClass="entr" presetSubtype="0" fill="hold" grpId="0" nodeType="withEffect">
                                   <p:stCondLst>
                                     <p:cond delay="0"/>
                                   </p:stCondLst>
@@ -18943,7 +18951,7 @@
                                           </p:stCondLst>
                                         </p:cTn>
                                         <p:tgtEl>
-                                          <p:spTgt spid="23"/>
+                                          <p:spTgt spid="24"/>
                                         </p:tgtEl>
                                         <p:attrNameLst>
                                           <p:attrName>style.visibility</p:attrName>
@@ -18970,7 +18978,7 @@
                                           </p:stCondLst>
                                         </p:cTn>
                                         <p:tgtEl>
-                                          <p:spTgt spid="24"/>
+                                          <p:spTgt spid="29"/>
                                         </p:tgtEl>
                                         <p:attrNameLst>
                                           <p:attrName>style.visibility</p:attrName>
@@ -18997,7 +19005,7 @@
                                           </p:stCondLst>
                                         </p:cTn>
                                         <p:tgtEl>
-                                          <p:spTgt spid="29"/>
+                                          <p:spTgt spid="30"/>
                                         </p:tgtEl>
                                         <p:attrNameLst>
                                           <p:attrName>style.visibility</p:attrName>
@@ -19024,7 +19032,7 @@
                                           </p:stCondLst>
                                         </p:cTn>
                                         <p:tgtEl>
-                                          <p:spTgt spid="30"/>
+                                          <p:spTgt spid="31"/>
                                         </p:tgtEl>
                                         <p:attrNameLst>
                                           <p:attrName>style.visibility</p:attrName>
@@ -19051,7 +19059,7 @@
                                           </p:stCondLst>
                                         </p:cTn>
                                         <p:tgtEl>
-                                          <p:spTgt spid="31"/>
+                                          <p:spTgt spid="32"/>
                                         </p:tgtEl>
                                         <p:attrNameLst>
                                           <p:attrName>style.visibility</p:attrName>
@@ -19078,7 +19086,7 @@
                                           </p:stCondLst>
                                         </p:cTn>
                                         <p:tgtEl>
-                                          <p:spTgt spid="32"/>
+                                          <p:spTgt spid="33"/>
                                         </p:tgtEl>
                                         <p:attrNameLst>
                                           <p:attrName>style.visibility</p:attrName>
@@ -19105,7 +19113,7 @@
                                           </p:stCondLst>
                                         </p:cTn>
                                         <p:tgtEl>
-                                          <p:spTgt spid="33"/>
+                                          <p:spTgt spid="36"/>
                                         </p:tgtEl>
                                         <p:attrNameLst>
                                           <p:attrName>style.visibility</p:attrName>
@@ -19132,7 +19140,7 @@
                                           </p:stCondLst>
                                         </p:cTn>
                                         <p:tgtEl>
-                                          <p:spTgt spid="36"/>
+                                          <p:spTgt spid="37"/>
                                         </p:tgtEl>
                                         <p:attrNameLst>
                                           <p:attrName>style.visibility</p:attrName>
@@ -19159,7 +19167,7 @@
                                           </p:stCondLst>
                                         </p:cTn>
                                         <p:tgtEl>
-                                          <p:spTgt spid="37"/>
+                                          <p:spTgt spid="38"/>
                                         </p:tgtEl>
                                         <p:attrNameLst>
                                           <p:attrName>style.visibility</p:attrName>
@@ -19186,33 +19194,6 @@
                                           </p:stCondLst>
                                         </p:cTn>
                                         <p:tgtEl>
-                                          <p:spTgt spid="38"/>
-                                        </p:tgtEl>
-                                        <p:attrNameLst>
-                                          <p:attrName>style.visibility</p:attrName>
-                                        </p:attrNameLst>
-                                      </p:cBhvr>
-                                      <p:to>
-                                        <p:strVal val="visible"/>
-                                      </p:to>
-                                    </p:set>
-                                  </p:childTnLst>
-                                </p:cTn>
-                              </p:par>
-                              <p:par>
-                                <p:cTn id="49" presetID="1" presetClass="entr" presetSubtype="0" fill="hold" grpId="0" nodeType="withEffect">
-                                  <p:stCondLst>
-                                    <p:cond delay="0"/>
-                                  </p:stCondLst>
-                                  <p:childTnLst>
-                                    <p:set>
-                                      <p:cBhvr>
-                                        <p:cTn id="50" dur="1" fill="hold">
-                                          <p:stCondLst>
-                                            <p:cond delay="0"/>
-                                          </p:stCondLst>
-                                        </p:cTn>
-                                        <p:tgtEl>
                                           <p:spTgt spid="41"/>
                                         </p:tgtEl>
                                         <p:attrNameLst>
@@ -19233,26 +19214,26 @@
                     </p:cTn>
                   </p:par>
                   <p:par>
-                    <p:cTn id="51" fill="hold">
+                    <p:cTn id="49" fill="hold">
                       <p:stCondLst>
                         <p:cond delay="indefinite"/>
                       </p:stCondLst>
                       <p:childTnLst>
                         <p:par>
-                          <p:cTn id="52" fill="hold">
+                          <p:cTn id="50" fill="hold">
                             <p:stCondLst>
                               <p:cond delay="0"/>
                             </p:stCondLst>
                             <p:childTnLst>
                               <p:par>
-                                <p:cTn id="53" presetID="1" presetClass="entr" presetSubtype="0" fill="hold" nodeType="clickEffect">
+                                <p:cTn id="51" presetID="1" presetClass="entr" presetSubtype="0" fill="hold" nodeType="clickEffect">
                                   <p:stCondLst>
                                     <p:cond delay="0"/>
                                   </p:stCondLst>
                                   <p:childTnLst>
                                     <p:set>
                                       <p:cBhvr>
-                                        <p:cTn id="54" dur="1" fill="hold">
+                                        <p:cTn id="52" dur="1" fill="hold">
                                           <p:stCondLst>
                                             <p:cond delay="0"/>
                                           </p:stCondLst>
@@ -19282,26 +19263,26 @@
                     </p:cTn>
                   </p:par>
                   <p:par>
-                    <p:cTn id="55" fill="hold">
+                    <p:cTn id="53" fill="hold">
                       <p:stCondLst>
                         <p:cond delay="indefinite"/>
                       </p:stCondLst>
                       <p:childTnLst>
                         <p:par>
-                          <p:cTn id="56" fill="hold">
+                          <p:cTn id="54" fill="hold">
                             <p:stCondLst>
                               <p:cond delay="0"/>
                             </p:stCondLst>
                             <p:childTnLst>
                               <p:par>
-                                <p:cTn id="57" presetID="1" presetClass="entr" presetSubtype="0" fill="hold" nodeType="clickEffect">
+                                <p:cTn id="55" presetID="1" presetClass="entr" presetSubtype="0" fill="hold" nodeType="clickEffect">
                                   <p:stCondLst>
                                     <p:cond delay="0"/>
                                   </p:stCondLst>
                                   <p:childTnLst>
                                     <p:set>
                                       <p:cBhvr>
-                                        <p:cTn id="58" dur="1" fill="hold">
+                                        <p:cTn id="56" dur="1" fill="hold">
                                           <p:stCondLst>
                                             <p:cond delay="0"/>
                                           </p:stCondLst>
@@ -19324,8 +19305,26 @@
                                   </p:childTnLst>
                                 </p:cTn>
                               </p:par>
+                            </p:childTnLst>
+                          </p:cTn>
+                        </p:par>
+                      </p:childTnLst>
+                    </p:cTn>
+                  </p:par>
+                  <p:par>
+                    <p:cTn id="57" fill="hold">
+                      <p:stCondLst>
+                        <p:cond delay="indefinite"/>
+                      </p:stCondLst>
+                      <p:childTnLst>
+                        <p:par>
+                          <p:cTn id="58" fill="hold">
+                            <p:stCondLst>
+                              <p:cond delay="0"/>
+                            </p:stCondLst>
+                            <p:childTnLst>
                               <p:par>
-                                <p:cTn id="59" presetID="1" presetClass="entr" presetSubtype="0" fill="hold" nodeType="withEffect">
+                                <p:cTn id="59" presetID="1" presetClass="entr" presetSubtype="0" fill="hold" nodeType="clickEffect">
                                   <p:stCondLst>
                                     <p:cond delay="0"/>
                                   </p:stCondLst>
@@ -19333,6 +19332,37 @@
                                     <p:set>
                                       <p:cBhvr>
                                         <p:cTn id="60" dur="1" fill="hold">
+                                          <p:stCondLst>
+                                            <p:cond delay="0"/>
+                                          </p:stCondLst>
+                                        </p:cTn>
+                                        <p:tgtEl>
+                                          <p:spTgt spid="42">
+                                            <p:txEl>
+                                              <p:pRg st="4" end="4"/>
+                                            </p:txEl>
+                                          </p:spTgt>
+                                        </p:tgtEl>
+                                        <p:attrNameLst>
+                                          <p:attrName>style.visibility</p:attrName>
+                                        </p:attrNameLst>
+                                      </p:cBhvr>
+                                      <p:to>
+                                        <p:strVal val="visible"/>
+                                      </p:to>
+                                    </p:set>
+                                  </p:childTnLst>
+                                </p:cTn>
+                              </p:par>
+                              <p:par>
+                                <p:cTn id="61" presetID="1" presetClass="entr" presetSubtype="0" fill="hold" nodeType="withEffect">
+                                  <p:stCondLst>
+                                    <p:cond delay="0"/>
+                                  </p:stCondLst>
+                                  <p:childTnLst>
+                                    <p:set>
+                                      <p:cBhvr>
+                                        <p:cTn id="62" dur="1" fill="hold">
                                           <p:stCondLst>
                                             <p:cond delay="0"/>
                                           </p:stCondLst>
@@ -19352,14 +19382,14 @@
                                 </p:cTn>
                               </p:par>
                               <p:par>
-                                <p:cTn id="61" presetID="1" presetClass="entr" presetSubtype="0" fill="hold" grpId="0" nodeType="withEffect">
+                                <p:cTn id="63" presetID="1" presetClass="entr" presetSubtype="0" fill="hold" grpId="0" nodeType="withEffect">
                                   <p:stCondLst>
                                     <p:cond delay="0"/>
                                   </p:stCondLst>
                                   <p:childTnLst>
                                     <p:set>
                                       <p:cBhvr>
-                                        <p:cTn id="62" dur="1" fill="hold">
+                                        <p:cTn id="64" dur="1" fill="hold">
                                           <p:stCondLst>
                                             <p:cond delay="0"/>
                                           </p:stCondLst>
@@ -19385,75 +19415,26 @@
                     </p:cTn>
                   </p:par>
                   <p:par>
-                    <p:cTn id="63" fill="hold">
+                    <p:cTn id="65" fill="hold">
                       <p:stCondLst>
                         <p:cond delay="indefinite"/>
                       </p:stCondLst>
                       <p:childTnLst>
                         <p:par>
-                          <p:cTn id="64" fill="hold">
+                          <p:cTn id="66" fill="hold">
                             <p:stCondLst>
                               <p:cond delay="0"/>
                             </p:stCondLst>
                             <p:childTnLst>
                               <p:par>
-                                <p:cTn id="65" presetID="1" presetClass="entr" presetSubtype="0" fill="hold" nodeType="clickEffect">
+                                <p:cTn id="67" presetID="1" presetClass="entr" presetSubtype="0" fill="hold" nodeType="clickEffect">
                                   <p:stCondLst>
                                     <p:cond delay="0"/>
                                   </p:stCondLst>
                                   <p:childTnLst>
                                     <p:set>
                                       <p:cBhvr>
-                                        <p:cTn id="66" dur="1" fill="hold">
-                                          <p:stCondLst>
-                                            <p:cond delay="0"/>
-                                          </p:stCondLst>
-                                        </p:cTn>
-                                        <p:tgtEl>
-                                          <p:spTgt spid="42">
-                                            <p:txEl>
-                                              <p:pRg st="4" end="4"/>
-                                            </p:txEl>
-                                          </p:spTgt>
-                                        </p:tgtEl>
-                                        <p:attrNameLst>
-                                          <p:attrName>style.visibility</p:attrName>
-                                        </p:attrNameLst>
-                                      </p:cBhvr>
-                                      <p:to>
-                                        <p:strVal val="visible"/>
-                                      </p:to>
-                                    </p:set>
-                                  </p:childTnLst>
-                                </p:cTn>
-                              </p:par>
-                            </p:childTnLst>
-                          </p:cTn>
-                        </p:par>
-                      </p:childTnLst>
-                    </p:cTn>
-                  </p:par>
-                  <p:par>
-                    <p:cTn id="67" fill="hold">
-                      <p:stCondLst>
-                        <p:cond delay="indefinite"/>
-                      </p:stCondLst>
-                      <p:childTnLst>
-                        <p:par>
-                          <p:cTn id="68" fill="hold">
-                            <p:stCondLst>
-                              <p:cond delay="0"/>
-                            </p:stCondLst>
-                            <p:childTnLst>
-                              <p:par>
-                                <p:cTn id="69" presetID="1" presetClass="entr" presetSubtype="0" fill="hold" nodeType="clickEffect">
-                                  <p:stCondLst>
-                                    <p:cond delay="0"/>
-                                  </p:stCondLst>
-                                  <p:childTnLst>
-                                    <p:set>
-                                      <p:cBhvr>
-                                        <p:cTn id="70" dur="1" fill="hold">
+                                        <p:cTn id="68" dur="1" fill="hold">
                                           <p:stCondLst>
                                             <p:cond delay="0"/>
                                           </p:stCondLst>
@@ -19477,14 +19458,14 @@
                                 </p:cTn>
                               </p:par>
                               <p:par>
-                                <p:cTn id="71" presetID="1" presetClass="entr" presetSubtype="0" fill="hold" nodeType="withEffect">
+                                <p:cTn id="69" presetID="1" presetClass="entr" presetSubtype="0" fill="hold" nodeType="withEffect">
                                   <p:stCondLst>
                                     <p:cond delay="0"/>
                                   </p:stCondLst>
                                   <p:childTnLst>
                                     <p:set>
                                       <p:cBhvr>
-                                        <p:cTn id="72" dur="1" fill="hold">
+                                        <p:cTn id="70" dur="1" fill="hold">
                                           <p:stCondLst>
                                             <p:cond delay="0"/>
                                           </p:stCondLst>
@@ -19510,26 +19491,26 @@
                     </p:cTn>
                   </p:par>
                   <p:par>
-                    <p:cTn id="73" fill="hold">
+                    <p:cTn id="71" fill="hold">
                       <p:stCondLst>
                         <p:cond delay="indefinite"/>
                       </p:stCondLst>
                       <p:childTnLst>
                         <p:par>
-                          <p:cTn id="74" fill="hold">
+                          <p:cTn id="72" fill="hold">
                             <p:stCondLst>
                               <p:cond delay="0"/>
                             </p:stCondLst>
                             <p:childTnLst>
                               <p:par>
-                                <p:cTn id="75" presetID="1" presetClass="entr" presetSubtype="0" fill="hold" nodeType="clickEffect">
+                                <p:cTn id="73" presetID="1" presetClass="entr" presetSubtype="0" fill="hold" nodeType="clickEffect">
                                   <p:stCondLst>
                                     <p:cond delay="0"/>
                                   </p:stCondLst>
                                   <p:childTnLst>
                                     <p:set>
                                       <p:cBhvr>
-                                        <p:cTn id="76" dur="1" fill="hold">
+                                        <p:cTn id="74" dur="1" fill="hold">
                                           <p:stCondLst>
                                             <p:cond delay="0"/>
                                           </p:stCondLst>
@@ -21634,26 +21615,35 @@
                                   </p:childTnLst>
                                 </p:cTn>
                               </p:par>
-                            </p:childTnLst>
-                          </p:cTn>
-                        </p:par>
-                      </p:childTnLst>
-                    </p:cTn>
-                  </p:par>
-                  <p:par>
-                    <p:cTn id="7" fill="hold">
-                      <p:stCondLst>
-                        <p:cond delay="indefinite"/>
-                      </p:stCondLst>
-                      <p:childTnLst>
-                        <p:par>
-                          <p:cTn id="8" fill="hold">
-                            <p:stCondLst>
-                              <p:cond delay="0"/>
-                            </p:stCondLst>
-                            <p:childTnLst>
                               <p:par>
-                                <p:cTn id="9" presetID="1" presetClass="entr" presetSubtype="0" fill="hold" nodeType="clickEffect">
+                                <p:cTn id="7" presetID="1" presetClass="entr" presetSubtype="0" fill="hold" grpId="0" nodeType="withEffect">
+                                  <p:stCondLst>
+                                    <p:cond delay="0"/>
+                                  </p:stCondLst>
+                                  <p:childTnLst>
+                                    <p:set>
+                                      <p:cBhvr>
+                                        <p:cTn id="8" dur="1" fill="hold">
+                                          <p:stCondLst>
+                                            <p:cond delay="0"/>
+                                          </p:stCondLst>
+                                        </p:cTn>
+                                        <p:tgtEl>
+                                          <p:spTgt spid="2"/>
+                                        </p:tgtEl>
+                                        <p:attrNameLst>
+                                          <p:attrName>style.visibility</p:attrName>
+                                        </p:attrNameLst>
+                                      </p:cBhvr>
+                                      <p:to>
+                                        <p:strVal val="visible"/>
+                                      </p:to>
+                                    </p:set>
+                                  </p:childTnLst>
+                                </p:cTn>
+                              </p:par>
+                              <p:par>
+                                <p:cTn id="9" presetID="1" presetClass="entr" presetSubtype="0" fill="hold" grpId="0" nodeType="withEffect">
                                   <p:stCondLst>
                                     <p:cond delay="0"/>
                                   </p:stCondLst>
@@ -21666,11 +21656,7 @@
                                           </p:stCondLst>
                                         </p:cTn>
                                         <p:tgtEl>
-                                          <p:spTgt spid="42">
-                                            <p:txEl>
-                                              <p:pRg st="1" end="1"/>
-                                            </p:txEl>
-                                          </p:spTgt>
+                                          <p:spTgt spid="5"/>
                                         </p:tgtEl>
                                         <p:attrNameLst>
                                           <p:attrName>style.visibility</p:attrName>
@@ -21697,7 +21683,7 @@
                                           </p:stCondLst>
                                         </p:cTn>
                                         <p:tgtEl>
-                                          <p:spTgt spid="34"/>
+                                          <p:spTgt spid="11"/>
                                         </p:tgtEl>
                                         <p:attrNameLst>
                                           <p:attrName>style.visibility</p:attrName>
@@ -21710,26 +21696,35 @@
                                   </p:childTnLst>
                                 </p:cTn>
                               </p:par>
-                            </p:childTnLst>
-                          </p:cTn>
-                        </p:par>
-                      </p:childTnLst>
-                    </p:cTn>
-                  </p:par>
-                  <p:par>
-                    <p:cTn id="13" fill="hold">
-                      <p:stCondLst>
-                        <p:cond delay="indefinite"/>
-                      </p:stCondLst>
-                      <p:childTnLst>
-                        <p:par>
-                          <p:cTn id="14" fill="hold">
-                            <p:stCondLst>
-                              <p:cond delay="0"/>
-                            </p:stCondLst>
-                            <p:childTnLst>
                               <p:par>
-                                <p:cTn id="15" presetID="1" presetClass="entr" presetSubtype="0" fill="hold" nodeType="clickEffect">
+                                <p:cTn id="13" presetID="1" presetClass="entr" presetSubtype="0" fill="hold" grpId="0" nodeType="withEffect">
+                                  <p:stCondLst>
+                                    <p:cond delay="0"/>
+                                  </p:stCondLst>
+                                  <p:childTnLst>
+                                    <p:set>
+                                      <p:cBhvr>
+                                        <p:cTn id="14" dur="1" fill="hold">
+                                          <p:stCondLst>
+                                            <p:cond delay="0"/>
+                                          </p:stCondLst>
+                                        </p:cTn>
+                                        <p:tgtEl>
+                                          <p:spTgt spid="12"/>
+                                        </p:tgtEl>
+                                        <p:attrNameLst>
+                                          <p:attrName>style.visibility</p:attrName>
+                                        </p:attrNameLst>
+                                      </p:cBhvr>
+                                      <p:to>
+                                        <p:strVal val="visible"/>
+                                      </p:to>
+                                    </p:set>
+                                  </p:childTnLst>
+                                </p:cTn>
+                              </p:par>
+                              <p:par>
+                                <p:cTn id="15" presetID="1" presetClass="entr" presetSubtype="0" fill="hold" grpId="0" nodeType="withEffect">
                                   <p:stCondLst>
                                     <p:cond delay="0"/>
                                   </p:stCondLst>
@@ -21742,11 +21737,7 @@
                                           </p:stCondLst>
                                         </p:cTn>
                                         <p:tgtEl>
-                                          <p:spTgt spid="42">
-                                            <p:txEl>
-                                              <p:pRg st="2" end="2"/>
-                                            </p:txEl>
-                                          </p:spTgt>
+                                          <p:spTgt spid="14"/>
                                         </p:tgtEl>
                                         <p:attrNameLst>
                                           <p:attrName>style.visibility</p:attrName>
@@ -21773,7 +21764,7 @@
                                           </p:stCondLst>
                                         </p:cTn>
                                         <p:tgtEl>
-                                          <p:spTgt spid="16"/>
+                                          <p:spTgt spid="15"/>
                                         </p:tgtEl>
                                         <p:attrNameLst>
                                           <p:attrName>style.visibility</p:attrName>
@@ -21786,26 +21777,35 @@
                                   </p:childTnLst>
                                 </p:cTn>
                               </p:par>
-                            </p:childTnLst>
-                          </p:cTn>
-                        </p:par>
-                      </p:childTnLst>
-                    </p:cTn>
-                  </p:par>
-                  <p:par>
-                    <p:cTn id="19" fill="hold">
-                      <p:stCondLst>
-                        <p:cond delay="indefinite"/>
-                      </p:stCondLst>
-                      <p:childTnLst>
-                        <p:par>
-                          <p:cTn id="20" fill="hold">
-                            <p:stCondLst>
-                              <p:cond delay="0"/>
-                            </p:stCondLst>
-                            <p:childTnLst>
                               <p:par>
-                                <p:cTn id="21" presetID="1" presetClass="entr" presetSubtype="0" fill="hold" nodeType="clickEffect">
+                                <p:cTn id="19" presetID="1" presetClass="entr" presetSubtype="0" fill="hold" grpId="0" nodeType="withEffect">
+                                  <p:stCondLst>
+                                    <p:cond delay="0"/>
+                                  </p:stCondLst>
+                                  <p:childTnLst>
+                                    <p:set>
+                                      <p:cBhvr>
+                                        <p:cTn id="20" dur="1" fill="hold">
+                                          <p:stCondLst>
+                                            <p:cond delay="0"/>
+                                          </p:stCondLst>
+                                        </p:cTn>
+                                        <p:tgtEl>
+                                          <p:spTgt spid="23"/>
+                                        </p:tgtEl>
+                                        <p:attrNameLst>
+                                          <p:attrName>style.visibility</p:attrName>
+                                        </p:attrNameLst>
+                                      </p:cBhvr>
+                                      <p:to>
+                                        <p:strVal val="visible"/>
+                                      </p:to>
+                                    </p:set>
+                                  </p:childTnLst>
+                                </p:cTn>
+                              </p:par>
+                              <p:par>
+                                <p:cTn id="21" presetID="1" presetClass="entr" presetSubtype="0" fill="hold" grpId="0" nodeType="withEffect">
                                   <p:stCondLst>
                                     <p:cond delay="0"/>
                                   </p:stCondLst>
@@ -21818,11 +21818,7 @@
                                           </p:stCondLst>
                                         </p:cTn>
                                         <p:tgtEl>
-                                          <p:spTgt spid="42">
-                                            <p:txEl>
-                                              <p:pRg st="3" end="3"/>
-                                            </p:txEl>
-                                          </p:spTgt>
+                                          <p:spTgt spid="24"/>
                                         </p:tgtEl>
                                         <p:attrNameLst>
                                           <p:attrName>style.visibility</p:attrName>
@@ -21849,7 +21845,7 @@
                                           </p:stCondLst>
                                         </p:cTn>
                                         <p:tgtEl>
-                                          <p:spTgt spid="39"/>
+                                          <p:spTgt spid="29"/>
                                         </p:tgtEl>
                                         <p:attrNameLst>
                                           <p:attrName>style.visibility</p:attrName>
@@ -21876,7 +21872,7 @@
                                           </p:stCondLst>
                                         </p:cTn>
                                         <p:tgtEl>
-                                          <p:spTgt spid="2"/>
+                                          <p:spTgt spid="30"/>
                                         </p:tgtEl>
                                         <p:attrNameLst>
                                           <p:attrName>style.visibility</p:attrName>
@@ -21903,7 +21899,7 @@
                                           </p:stCondLst>
                                         </p:cTn>
                                         <p:tgtEl>
-                                          <p:spTgt spid="5"/>
+                                          <p:spTgt spid="31"/>
                                         </p:tgtEl>
                                         <p:attrNameLst>
                                           <p:attrName>style.visibility</p:attrName>
@@ -21930,7 +21926,7 @@
                                           </p:stCondLst>
                                         </p:cTn>
                                         <p:tgtEl>
-                                          <p:spTgt spid="11"/>
+                                          <p:spTgt spid="32"/>
                                         </p:tgtEl>
                                         <p:attrNameLst>
                                           <p:attrName>style.visibility</p:attrName>
@@ -21957,7 +21953,7 @@
                                           </p:stCondLst>
                                         </p:cTn>
                                         <p:tgtEl>
-                                          <p:spTgt spid="12"/>
+                                          <p:spTgt spid="33"/>
                                         </p:tgtEl>
                                         <p:attrNameLst>
                                           <p:attrName>style.visibility</p:attrName>
@@ -21984,7 +21980,7 @@
                                           </p:stCondLst>
                                         </p:cTn>
                                         <p:tgtEl>
-                                          <p:spTgt spid="14"/>
+                                          <p:spTgt spid="36"/>
                                         </p:tgtEl>
                                         <p:attrNameLst>
                                           <p:attrName>style.visibility</p:attrName>
@@ -22011,7 +22007,7 @@
                                           </p:stCondLst>
                                         </p:cTn>
                                         <p:tgtEl>
-                                          <p:spTgt spid="15"/>
+                                          <p:spTgt spid="37"/>
                                         </p:tgtEl>
                                         <p:attrNameLst>
                                           <p:attrName>style.visibility</p:attrName>
@@ -22038,7 +22034,7 @@
                                           </p:stCondLst>
                                         </p:cTn>
                                         <p:tgtEl>
-                                          <p:spTgt spid="23"/>
+                                          <p:spTgt spid="38"/>
                                         </p:tgtEl>
                                         <p:attrNameLst>
                                           <p:attrName>style.visibility</p:attrName>
@@ -22065,7 +22061,7 @@
                                           </p:stCondLst>
                                         </p:cTn>
                                         <p:tgtEl>
-                                          <p:spTgt spid="24"/>
+                                          <p:spTgt spid="41"/>
                                         </p:tgtEl>
                                         <p:attrNameLst>
                                           <p:attrName>style.visibility</p:attrName>
@@ -22078,35 +22074,26 @@
                                   </p:childTnLst>
                                 </p:cTn>
                               </p:par>
+                            </p:childTnLst>
+                          </p:cTn>
+                        </p:par>
+                      </p:childTnLst>
+                    </p:cTn>
+                  </p:par>
+                  <p:par>
+                    <p:cTn id="41" fill="hold">
+                      <p:stCondLst>
+                        <p:cond delay="indefinite"/>
+                      </p:stCondLst>
+                      <p:childTnLst>
+                        <p:par>
+                          <p:cTn id="42" fill="hold">
+                            <p:stCondLst>
+                              <p:cond delay="0"/>
+                            </p:stCondLst>
+                            <p:childTnLst>
                               <p:par>
-                                <p:cTn id="41" presetID="1" presetClass="entr" presetSubtype="0" fill="hold" grpId="0" nodeType="withEffect">
-                                  <p:stCondLst>
-                                    <p:cond delay="0"/>
-                                  </p:stCondLst>
-                                  <p:childTnLst>
-                                    <p:set>
-                                      <p:cBhvr>
-                                        <p:cTn id="42" dur="1" fill="hold">
-                                          <p:stCondLst>
-                                            <p:cond delay="0"/>
-                                          </p:stCondLst>
-                                        </p:cTn>
-                                        <p:tgtEl>
-                                          <p:spTgt spid="29"/>
-                                        </p:tgtEl>
-                                        <p:attrNameLst>
-                                          <p:attrName>style.visibility</p:attrName>
-                                        </p:attrNameLst>
-                                      </p:cBhvr>
-                                      <p:to>
-                                        <p:strVal val="visible"/>
-                                      </p:to>
-                                    </p:set>
-                                  </p:childTnLst>
-                                </p:cTn>
-                              </p:par>
-                              <p:par>
-                                <p:cTn id="43" presetID="1" presetClass="entr" presetSubtype="0" fill="hold" grpId="0" nodeType="withEffect">
+                                <p:cTn id="43" presetID="1" presetClass="entr" presetSubtype="0" fill="hold" nodeType="clickEffect">
                                   <p:stCondLst>
                                     <p:cond delay="0"/>
                                   </p:stCondLst>
@@ -22119,7 +22106,11 @@
                                           </p:stCondLst>
                                         </p:cTn>
                                         <p:tgtEl>
-                                          <p:spTgt spid="30"/>
+                                          <p:spTgt spid="42">
+                                            <p:txEl>
+                                              <p:pRg st="1" end="1"/>
+                                            </p:txEl>
+                                          </p:spTgt>
                                         </p:tgtEl>
                                         <p:attrNameLst>
                                           <p:attrName>style.visibility</p:attrName>
@@ -22146,7 +22137,7 @@
                                           </p:stCondLst>
                                         </p:cTn>
                                         <p:tgtEl>
-                                          <p:spTgt spid="31"/>
+                                          <p:spTgt spid="34"/>
                                         </p:tgtEl>
                                         <p:attrNameLst>
                                           <p:attrName>style.visibility</p:attrName>
@@ -22159,35 +22150,26 @@
                                   </p:childTnLst>
                                 </p:cTn>
                               </p:par>
+                            </p:childTnLst>
+                          </p:cTn>
+                        </p:par>
+                      </p:childTnLst>
+                    </p:cTn>
+                  </p:par>
+                  <p:par>
+                    <p:cTn id="47" fill="hold">
+                      <p:stCondLst>
+                        <p:cond delay="indefinite"/>
+                      </p:stCondLst>
+                      <p:childTnLst>
+                        <p:par>
+                          <p:cTn id="48" fill="hold">
+                            <p:stCondLst>
+                              <p:cond delay="0"/>
+                            </p:stCondLst>
+                            <p:childTnLst>
                               <p:par>
-                                <p:cTn id="47" presetID="1" presetClass="entr" presetSubtype="0" fill="hold" grpId="0" nodeType="withEffect">
-                                  <p:stCondLst>
-                                    <p:cond delay="0"/>
-                                  </p:stCondLst>
-                                  <p:childTnLst>
-                                    <p:set>
-                                      <p:cBhvr>
-                                        <p:cTn id="48" dur="1" fill="hold">
-                                          <p:stCondLst>
-                                            <p:cond delay="0"/>
-                                          </p:stCondLst>
-                                        </p:cTn>
-                                        <p:tgtEl>
-                                          <p:spTgt spid="32"/>
-                                        </p:tgtEl>
-                                        <p:attrNameLst>
-                                          <p:attrName>style.visibility</p:attrName>
-                                        </p:attrNameLst>
-                                      </p:cBhvr>
-                                      <p:to>
-                                        <p:strVal val="visible"/>
-                                      </p:to>
-                                    </p:set>
-                                  </p:childTnLst>
-                                </p:cTn>
-                              </p:par>
-                              <p:par>
-                                <p:cTn id="49" presetID="1" presetClass="entr" presetSubtype="0" fill="hold" grpId="0" nodeType="withEffect">
+                                <p:cTn id="49" presetID="1" presetClass="entr" presetSubtype="0" fill="hold" nodeType="clickEffect">
                                   <p:stCondLst>
                                     <p:cond delay="0"/>
                                   </p:stCondLst>
@@ -22200,7 +22182,11 @@
                                           </p:stCondLst>
                                         </p:cTn>
                                         <p:tgtEl>
-                                          <p:spTgt spid="33"/>
+                                          <p:spTgt spid="42">
+                                            <p:txEl>
+                                              <p:pRg st="2" end="2"/>
+                                            </p:txEl>
+                                          </p:spTgt>
                                         </p:tgtEl>
                                         <p:attrNameLst>
                                           <p:attrName>style.visibility</p:attrName>
@@ -22227,7 +22213,7 @@
                                           </p:stCondLst>
                                         </p:cTn>
                                         <p:tgtEl>
-                                          <p:spTgt spid="36"/>
+                                          <p:spTgt spid="16"/>
                                         </p:tgtEl>
                                         <p:attrNameLst>
                                           <p:attrName>style.visibility</p:attrName>
@@ -22254,7 +22240,7 @@
                                           </p:stCondLst>
                                         </p:cTn>
                                         <p:tgtEl>
-                                          <p:spTgt spid="37"/>
+                                          <p:spTgt spid="39"/>
                                         </p:tgtEl>
                                         <p:attrNameLst>
                                           <p:attrName>style.visibility</p:attrName>
@@ -22267,35 +22253,26 @@
                                   </p:childTnLst>
                                 </p:cTn>
                               </p:par>
+                            </p:childTnLst>
+                          </p:cTn>
+                        </p:par>
+                      </p:childTnLst>
+                    </p:cTn>
+                  </p:par>
+                  <p:par>
+                    <p:cTn id="55" fill="hold">
+                      <p:stCondLst>
+                        <p:cond delay="indefinite"/>
+                      </p:stCondLst>
+                      <p:childTnLst>
+                        <p:par>
+                          <p:cTn id="56" fill="hold">
+                            <p:stCondLst>
+                              <p:cond delay="0"/>
+                            </p:stCondLst>
+                            <p:childTnLst>
                               <p:par>
-                                <p:cTn id="55" presetID="1" presetClass="entr" presetSubtype="0" fill="hold" grpId="0" nodeType="withEffect">
-                                  <p:stCondLst>
-                                    <p:cond delay="0"/>
-                                  </p:stCondLst>
-                                  <p:childTnLst>
-                                    <p:set>
-                                      <p:cBhvr>
-                                        <p:cTn id="56" dur="1" fill="hold">
-                                          <p:stCondLst>
-                                            <p:cond delay="0"/>
-                                          </p:stCondLst>
-                                        </p:cTn>
-                                        <p:tgtEl>
-                                          <p:spTgt spid="38"/>
-                                        </p:tgtEl>
-                                        <p:attrNameLst>
-                                          <p:attrName>style.visibility</p:attrName>
-                                        </p:attrNameLst>
-                                      </p:cBhvr>
-                                      <p:to>
-                                        <p:strVal val="visible"/>
-                                      </p:to>
-                                    </p:set>
-                                  </p:childTnLst>
-                                </p:cTn>
-                              </p:par>
-                              <p:par>
-                                <p:cTn id="57" presetID="1" presetClass="entr" presetSubtype="0" fill="hold" grpId="0" nodeType="withEffect">
+                                <p:cTn id="57" presetID="1" presetClass="entr" presetSubtype="0" fill="hold" nodeType="clickEffect">
                                   <p:stCondLst>
                                     <p:cond delay="0"/>
                                   </p:stCondLst>
@@ -22308,7 +22285,11 @@
                                           </p:stCondLst>
                                         </p:cTn>
                                         <p:tgtEl>
-                                          <p:spTgt spid="41"/>
+                                          <p:spTgt spid="42">
+                                            <p:txEl>
+                                              <p:pRg st="3" end="3"/>
+                                            </p:txEl>
+                                          </p:spTgt>
                                         </p:tgtEl>
                                         <p:attrNameLst>
                                           <p:attrName>style.visibility</p:attrName>
@@ -22496,8 +22477,8 @@
           <a:chExt cx="0" cy="0"/>
         </a:xfrm>
       </p:grpSpPr>
-      <mc:AlternateContent xmlns:mc="http://schemas.openxmlformats.org/markup-compatibility/2006">
-        <mc:Choice xmlns:a14="http://schemas.microsoft.com/office/drawing/2010/main" Requires="a14">
+      <mc:AlternateContent xmlns:mc="http://schemas.openxmlformats.org/markup-compatibility/2006" xmlns:a14="http://schemas.microsoft.com/office/drawing/2010/main">
+        <mc:Choice Requires="a14">
           <p:sp>
             <p:nvSpPr>
               <p:cNvPr id="3" name="Content Placeholder 2">
@@ -22774,7 +22755,7 @@
             </p:txBody>
           </p:sp>
         </mc:Choice>
-        <mc:Fallback>
+        <mc:Fallback xmlns="">
           <p:sp>
             <p:nvSpPr>
               <p:cNvPr id="3" name="Content Placeholder 2">
@@ -22884,6 +22865,449 @@
   <p:clrMapOvr>
     <a:masterClrMapping/>
   </p:clrMapOvr>
+  <p:timing>
+    <p:tnLst>
+      <p:par>
+        <p:cTn id="1" dur="indefinite" restart="never" nodeType="tmRoot">
+          <p:childTnLst>
+            <p:seq concurrent="1" nextAc="seek">
+              <p:cTn id="2" dur="indefinite" nodeType="mainSeq">
+                <p:childTnLst>
+                  <p:par>
+                    <p:cTn id="3" fill="hold">
+                      <p:stCondLst>
+                        <p:cond delay="indefinite"/>
+                      </p:stCondLst>
+                      <p:childTnLst>
+                        <p:par>
+                          <p:cTn id="4" fill="hold">
+                            <p:stCondLst>
+                              <p:cond delay="0"/>
+                            </p:stCondLst>
+                            <p:childTnLst>
+                              <p:par>
+                                <p:cTn id="5" presetID="1" presetClass="entr" presetSubtype="0" fill="hold" nodeType="clickEffect">
+                                  <p:stCondLst>
+                                    <p:cond delay="0"/>
+                                  </p:stCondLst>
+                                  <p:childTnLst>
+                                    <p:set>
+                                      <p:cBhvr>
+                                        <p:cTn id="6" dur="1" fill="hold">
+                                          <p:stCondLst>
+                                            <p:cond delay="0"/>
+                                          </p:stCondLst>
+                                        </p:cTn>
+                                        <p:tgtEl>
+                                          <p:spTgt spid="3">
+                                            <p:txEl>
+                                              <p:pRg st="1" end="1"/>
+                                            </p:txEl>
+                                          </p:spTgt>
+                                        </p:tgtEl>
+                                        <p:attrNameLst>
+                                          <p:attrName>style.visibility</p:attrName>
+                                        </p:attrNameLst>
+                                      </p:cBhvr>
+                                      <p:to>
+                                        <p:strVal val="visible"/>
+                                      </p:to>
+                                    </p:set>
+                                  </p:childTnLst>
+                                </p:cTn>
+                              </p:par>
+                            </p:childTnLst>
+                          </p:cTn>
+                        </p:par>
+                      </p:childTnLst>
+                    </p:cTn>
+                  </p:par>
+                  <p:par>
+                    <p:cTn id="7" fill="hold">
+                      <p:stCondLst>
+                        <p:cond delay="indefinite"/>
+                      </p:stCondLst>
+                      <p:childTnLst>
+                        <p:par>
+                          <p:cTn id="8" fill="hold">
+                            <p:stCondLst>
+                              <p:cond delay="0"/>
+                            </p:stCondLst>
+                            <p:childTnLst>
+                              <p:par>
+                                <p:cTn id="9" presetID="1" presetClass="entr" presetSubtype="0" fill="hold" nodeType="clickEffect">
+                                  <p:stCondLst>
+                                    <p:cond delay="0"/>
+                                  </p:stCondLst>
+                                  <p:childTnLst>
+                                    <p:set>
+                                      <p:cBhvr>
+                                        <p:cTn id="10" dur="1" fill="hold">
+                                          <p:stCondLst>
+                                            <p:cond delay="0"/>
+                                          </p:stCondLst>
+                                        </p:cTn>
+                                        <p:tgtEl>
+                                          <p:spTgt spid="3">
+                                            <p:txEl>
+                                              <p:pRg st="2" end="2"/>
+                                            </p:txEl>
+                                          </p:spTgt>
+                                        </p:tgtEl>
+                                        <p:attrNameLst>
+                                          <p:attrName>style.visibility</p:attrName>
+                                        </p:attrNameLst>
+                                      </p:cBhvr>
+                                      <p:to>
+                                        <p:strVal val="visible"/>
+                                      </p:to>
+                                    </p:set>
+                                  </p:childTnLst>
+                                </p:cTn>
+                              </p:par>
+                              <p:par>
+                                <p:cTn id="11" presetID="1" presetClass="entr" presetSubtype="0" fill="hold" nodeType="withEffect">
+                                  <p:stCondLst>
+                                    <p:cond delay="0"/>
+                                  </p:stCondLst>
+                                  <p:childTnLst>
+                                    <p:set>
+                                      <p:cBhvr>
+                                        <p:cTn id="12" dur="1" fill="hold">
+                                          <p:stCondLst>
+                                            <p:cond delay="0"/>
+                                          </p:stCondLst>
+                                        </p:cTn>
+                                        <p:tgtEl>
+                                          <p:spTgt spid="3">
+                                            <p:txEl>
+                                              <p:pRg st="3" end="3"/>
+                                            </p:txEl>
+                                          </p:spTgt>
+                                        </p:tgtEl>
+                                        <p:attrNameLst>
+                                          <p:attrName>style.visibility</p:attrName>
+                                        </p:attrNameLst>
+                                      </p:cBhvr>
+                                      <p:to>
+                                        <p:strVal val="visible"/>
+                                      </p:to>
+                                    </p:set>
+                                  </p:childTnLst>
+                                </p:cTn>
+                              </p:par>
+                              <p:par>
+                                <p:cTn id="13" presetID="1" presetClass="entr" presetSubtype="0" fill="hold" nodeType="withEffect">
+                                  <p:stCondLst>
+                                    <p:cond delay="0"/>
+                                  </p:stCondLst>
+                                  <p:childTnLst>
+                                    <p:set>
+                                      <p:cBhvr>
+                                        <p:cTn id="14" dur="1" fill="hold">
+                                          <p:stCondLst>
+                                            <p:cond delay="0"/>
+                                          </p:stCondLst>
+                                        </p:cTn>
+                                        <p:tgtEl>
+                                          <p:spTgt spid="3">
+                                            <p:txEl>
+                                              <p:pRg st="4" end="4"/>
+                                            </p:txEl>
+                                          </p:spTgt>
+                                        </p:tgtEl>
+                                        <p:attrNameLst>
+                                          <p:attrName>style.visibility</p:attrName>
+                                        </p:attrNameLst>
+                                      </p:cBhvr>
+                                      <p:to>
+                                        <p:strVal val="visible"/>
+                                      </p:to>
+                                    </p:set>
+                                  </p:childTnLst>
+                                </p:cTn>
+                              </p:par>
+                              <p:par>
+                                <p:cTn id="15" presetID="1" presetClass="entr" presetSubtype="0" fill="hold" nodeType="withEffect">
+                                  <p:stCondLst>
+                                    <p:cond delay="0"/>
+                                  </p:stCondLst>
+                                  <p:childTnLst>
+                                    <p:set>
+                                      <p:cBhvr>
+                                        <p:cTn id="16" dur="1" fill="hold">
+                                          <p:stCondLst>
+                                            <p:cond delay="0"/>
+                                          </p:stCondLst>
+                                        </p:cTn>
+                                        <p:tgtEl>
+                                          <p:spTgt spid="3">
+                                            <p:txEl>
+                                              <p:pRg st="5" end="5"/>
+                                            </p:txEl>
+                                          </p:spTgt>
+                                        </p:tgtEl>
+                                        <p:attrNameLst>
+                                          <p:attrName>style.visibility</p:attrName>
+                                        </p:attrNameLst>
+                                      </p:cBhvr>
+                                      <p:to>
+                                        <p:strVal val="visible"/>
+                                      </p:to>
+                                    </p:set>
+                                  </p:childTnLst>
+                                </p:cTn>
+                              </p:par>
+                            </p:childTnLst>
+                          </p:cTn>
+                        </p:par>
+                      </p:childTnLst>
+                    </p:cTn>
+                  </p:par>
+                  <p:par>
+                    <p:cTn id="17" fill="hold">
+                      <p:stCondLst>
+                        <p:cond delay="indefinite"/>
+                      </p:stCondLst>
+                      <p:childTnLst>
+                        <p:par>
+                          <p:cTn id="18" fill="hold">
+                            <p:stCondLst>
+                              <p:cond delay="0"/>
+                            </p:stCondLst>
+                            <p:childTnLst>
+                              <p:par>
+                                <p:cTn id="19" presetID="1" presetClass="entr" presetSubtype="0" fill="hold" nodeType="clickEffect">
+                                  <p:stCondLst>
+                                    <p:cond delay="0"/>
+                                  </p:stCondLst>
+                                  <p:childTnLst>
+                                    <p:set>
+                                      <p:cBhvr>
+                                        <p:cTn id="20" dur="1" fill="hold">
+                                          <p:stCondLst>
+                                            <p:cond delay="0"/>
+                                          </p:stCondLst>
+                                        </p:cTn>
+                                        <p:tgtEl>
+                                          <p:spTgt spid="3">
+                                            <p:txEl>
+                                              <p:pRg st="6" end="6"/>
+                                            </p:txEl>
+                                          </p:spTgt>
+                                        </p:tgtEl>
+                                        <p:attrNameLst>
+                                          <p:attrName>style.visibility</p:attrName>
+                                        </p:attrNameLst>
+                                      </p:cBhvr>
+                                      <p:to>
+                                        <p:strVal val="visible"/>
+                                      </p:to>
+                                    </p:set>
+                                  </p:childTnLst>
+                                </p:cTn>
+                              </p:par>
+                              <p:par>
+                                <p:cTn id="21" presetID="1" presetClass="entr" presetSubtype="0" fill="hold" nodeType="withEffect">
+                                  <p:stCondLst>
+                                    <p:cond delay="0"/>
+                                  </p:stCondLst>
+                                  <p:childTnLst>
+                                    <p:set>
+                                      <p:cBhvr>
+                                        <p:cTn id="22" dur="1" fill="hold">
+                                          <p:stCondLst>
+                                            <p:cond delay="0"/>
+                                          </p:stCondLst>
+                                        </p:cTn>
+                                        <p:tgtEl>
+                                          <p:spTgt spid="3">
+                                            <p:txEl>
+                                              <p:pRg st="7" end="7"/>
+                                            </p:txEl>
+                                          </p:spTgt>
+                                        </p:tgtEl>
+                                        <p:attrNameLst>
+                                          <p:attrName>style.visibility</p:attrName>
+                                        </p:attrNameLst>
+                                      </p:cBhvr>
+                                      <p:to>
+                                        <p:strVal val="visible"/>
+                                      </p:to>
+                                    </p:set>
+                                  </p:childTnLst>
+                                </p:cTn>
+                              </p:par>
+                              <p:par>
+                                <p:cTn id="23" presetID="1" presetClass="entr" presetSubtype="0" fill="hold" nodeType="withEffect">
+                                  <p:stCondLst>
+                                    <p:cond delay="0"/>
+                                  </p:stCondLst>
+                                  <p:childTnLst>
+                                    <p:set>
+                                      <p:cBhvr>
+                                        <p:cTn id="24" dur="1" fill="hold">
+                                          <p:stCondLst>
+                                            <p:cond delay="0"/>
+                                          </p:stCondLst>
+                                        </p:cTn>
+                                        <p:tgtEl>
+                                          <p:spTgt spid="3">
+                                            <p:txEl>
+                                              <p:pRg st="8" end="8"/>
+                                            </p:txEl>
+                                          </p:spTgt>
+                                        </p:tgtEl>
+                                        <p:attrNameLst>
+                                          <p:attrName>style.visibility</p:attrName>
+                                        </p:attrNameLst>
+                                      </p:cBhvr>
+                                      <p:to>
+                                        <p:strVal val="visible"/>
+                                      </p:to>
+                                    </p:set>
+                                  </p:childTnLst>
+                                </p:cTn>
+                              </p:par>
+                              <p:par>
+                                <p:cTn id="25" presetID="1" presetClass="entr" presetSubtype="0" fill="hold" nodeType="withEffect">
+                                  <p:stCondLst>
+                                    <p:cond delay="0"/>
+                                  </p:stCondLst>
+                                  <p:childTnLst>
+                                    <p:set>
+                                      <p:cBhvr>
+                                        <p:cTn id="26" dur="1" fill="hold">
+                                          <p:stCondLst>
+                                            <p:cond delay="0"/>
+                                          </p:stCondLst>
+                                        </p:cTn>
+                                        <p:tgtEl>
+                                          <p:spTgt spid="3">
+                                            <p:txEl>
+                                              <p:pRg st="9" end="9"/>
+                                            </p:txEl>
+                                          </p:spTgt>
+                                        </p:tgtEl>
+                                        <p:attrNameLst>
+                                          <p:attrName>style.visibility</p:attrName>
+                                        </p:attrNameLst>
+                                      </p:cBhvr>
+                                      <p:to>
+                                        <p:strVal val="visible"/>
+                                      </p:to>
+                                    </p:set>
+                                  </p:childTnLst>
+                                </p:cTn>
+                              </p:par>
+                            </p:childTnLst>
+                          </p:cTn>
+                        </p:par>
+                      </p:childTnLst>
+                    </p:cTn>
+                  </p:par>
+                  <p:par>
+                    <p:cTn id="27" fill="hold">
+                      <p:stCondLst>
+                        <p:cond delay="indefinite"/>
+                      </p:stCondLst>
+                      <p:childTnLst>
+                        <p:par>
+                          <p:cTn id="28" fill="hold">
+                            <p:stCondLst>
+                              <p:cond delay="0"/>
+                            </p:stCondLst>
+                            <p:childTnLst>
+                              <p:par>
+                                <p:cTn id="29" presetID="1" presetClass="entr" presetSubtype="0" fill="hold" nodeType="clickEffect">
+                                  <p:stCondLst>
+                                    <p:cond delay="0"/>
+                                  </p:stCondLst>
+                                  <p:childTnLst>
+                                    <p:set>
+                                      <p:cBhvr>
+                                        <p:cTn id="30" dur="1" fill="hold">
+                                          <p:stCondLst>
+                                            <p:cond delay="0"/>
+                                          </p:stCondLst>
+                                        </p:cTn>
+                                        <p:tgtEl>
+                                          <p:spTgt spid="3">
+                                            <p:txEl>
+                                              <p:pRg st="10" end="10"/>
+                                            </p:txEl>
+                                          </p:spTgt>
+                                        </p:tgtEl>
+                                        <p:attrNameLst>
+                                          <p:attrName>style.visibility</p:attrName>
+                                        </p:attrNameLst>
+                                      </p:cBhvr>
+                                      <p:to>
+                                        <p:strVal val="visible"/>
+                                      </p:to>
+                                    </p:set>
+                                  </p:childTnLst>
+                                </p:cTn>
+                              </p:par>
+                              <p:par>
+                                <p:cTn id="31" presetID="1" presetClass="entr" presetSubtype="0" fill="hold" nodeType="withEffect">
+                                  <p:stCondLst>
+                                    <p:cond delay="0"/>
+                                  </p:stCondLst>
+                                  <p:childTnLst>
+                                    <p:set>
+                                      <p:cBhvr>
+                                        <p:cTn id="32" dur="1" fill="hold">
+                                          <p:stCondLst>
+                                            <p:cond delay="0"/>
+                                          </p:stCondLst>
+                                        </p:cTn>
+                                        <p:tgtEl>
+                                          <p:spTgt spid="3">
+                                            <p:txEl>
+                                              <p:pRg st="11" end="11"/>
+                                            </p:txEl>
+                                          </p:spTgt>
+                                        </p:tgtEl>
+                                        <p:attrNameLst>
+                                          <p:attrName>style.visibility</p:attrName>
+                                        </p:attrNameLst>
+                                      </p:cBhvr>
+                                      <p:to>
+                                        <p:strVal val="visible"/>
+                                      </p:to>
+                                    </p:set>
+                                  </p:childTnLst>
+                                </p:cTn>
+                              </p:par>
+                            </p:childTnLst>
+                          </p:cTn>
+                        </p:par>
+                      </p:childTnLst>
+                    </p:cTn>
+                  </p:par>
+                </p:childTnLst>
+              </p:cTn>
+              <p:prevCondLst>
+                <p:cond evt="onPrev" delay="0">
+                  <p:tgtEl>
+                    <p:sldTgt/>
+                  </p:tgtEl>
+                </p:cond>
+              </p:prevCondLst>
+              <p:nextCondLst>
+                <p:cond evt="onNext" delay="0">
+                  <p:tgtEl>
+                    <p:sldTgt/>
+                  </p:tgtEl>
+                </p:cond>
+              </p:nextCondLst>
+            </p:seq>
+          </p:childTnLst>
+        </p:cTn>
+      </p:par>
+    </p:tnLst>
+  </p:timing>
 </p:sld>
 </file>
 
@@ -22904,8 +23328,8 @@
           <a:chExt cx="0" cy="0"/>
         </a:xfrm>
       </p:grpSpPr>
-      <mc:AlternateContent xmlns:mc="http://schemas.openxmlformats.org/markup-compatibility/2006">
-        <mc:Choice xmlns:a14="http://schemas.microsoft.com/office/drawing/2010/main" Requires="a14">
+      <mc:AlternateContent xmlns:mc="http://schemas.openxmlformats.org/markup-compatibility/2006" xmlns:a14="http://schemas.microsoft.com/office/drawing/2010/main">
+        <mc:Choice Requires="a14">
           <p:sp>
             <p:nvSpPr>
               <p:cNvPr id="3" name="Content Placeholder 2">
@@ -22973,7 +23397,7 @@
                 <a:pPr lvl="1"/>
                 <a:r>
                   <a:rPr lang="en-US" sz="2600" dirty="0"/>
-                  <a:t>Binary representation of strings  </a:t>
+                  <a:t>Binary representation of strings, e.g. Unicode  </a:t>
                 </a:r>
               </a:p>
               <a:p>
@@ -23234,7 +23658,7 @@
             </p:txBody>
           </p:sp>
         </mc:Choice>
-        <mc:Fallback>
+        <mc:Fallback xmlns="">
           <p:sp>
             <p:nvSpPr>
               <p:cNvPr id="3" name="Content Placeholder 2">
@@ -23344,6 +23768,400 @@
   <p:clrMapOvr>
     <a:masterClrMapping/>
   </p:clrMapOvr>
+  <p:timing>
+    <p:tnLst>
+      <p:par>
+        <p:cTn id="1" dur="indefinite" restart="never" nodeType="tmRoot">
+          <p:childTnLst>
+            <p:seq concurrent="1" nextAc="seek">
+              <p:cTn id="2" dur="indefinite" nodeType="mainSeq">
+                <p:childTnLst>
+                  <p:par>
+                    <p:cTn id="3" fill="hold">
+                      <p:stCondLst>
+                        <p:cond delay="indefinite"/>
+                      </p:stCondLst>
+                      <p:childTnLst>
+                        <p:par>
+                          <p:cTn id="4" fill="hold">
+                            <p:stCondLst>
+                              <p:cond delay="0"/>
+                            </p:stCondLst>
+                            <p:childTnLst>
+                              <p:par>
+                                <p:cTn id="5" presetID="1" presetClass="entr" presetSubtype="0" fill="hold" nodeType="clickEffect">
+                                  <p:stCondLst>
+                                    <p:cond delay="0"/>
+                                  </p:stCondLst>
+                                  <p:childTnLst>
+                                    <p:set>
+                                      <p:cBhvr>
+                                        <p:cTn id="6" dur="1" fill="hold">
+                                          <p:stCondLst>
+                                            <p:cond delay="0"/>
+                                          </p:stCondLst>
+                                        </p:cTn>
+                                        <p:tgtEl>
+                                          <p:spTgt spid="3">
+                                            <p:txEl>
+                                              <p:pRg st="1" end="1"/>
+                                            </p:txEl>
+                                          </p:spTgt>
+                                        </p:tgtEl>
+                                        <p:attrNameLst>
+                                          <p:attrName>style.visibility</p:attrName>
+                                        </p:attrNameLst>
+                                      </p:cBhvr>
+                                      <p:to>
+                                        <p:strVal val="visible"/>
+                                      </p:to>
+                                    </p:set>
+                                  </p:childTnLst>
+                                </p:cTn>
+                              </p:par>
+                            </p:childTnLst>
+                          </p:cTn>
+                        </p:par>
+                      </p:childTnLst>
+                    </p:cTn>
+                  </p:par>
+                  <p:par>
+                    <p:cTn id="7" fill="hold">
+                      <p:stCondLst>
+                        <p:cond delay="indefinite"/>
+                      </p:stCondLst>
+                      <p:childTnLst>
+                        <p:par>
+                          <p:cTn id="8" fill="hold">
+                            <p:stCondLst>
+                              <p:cond delay="0"/>
+                            </p:stCondLst>
+                            <p:childTnLst>
+                              <p:par>
+                                <p:cTn id="9" presetID="1" presetClass="entr" presetSubtype="0" fill="hold" nodeType="clickEffect">
+                                  <p:stCondLst>
+                                    <p:cond delay="0"/>
+                                  </p:stCondLst>
+                                  <p:childTnLst>
+                                    <p:set>
+                                      <p:cBhvr>
+                                        <p:cTn id="10" dur="1" fill="hold">
+                                          <p:stCondLst>
+                                            <p:cond delay="0"/>
+                                          </p:stCondLst>
+                                        </p:cTn>
+                                        <p:tgtEl>
+                                          <p:spTgt spid="3">
+                                            <p:txEl>
+                                              <p:pRg st="2" end="2"/>
+                                            </p:txEl>
+                                          </p:spTgt>
+                                        </p:tgtEl>
+                                        <p:attrNameLst>
+                                          <p:attrName>style.visibility</p:attrName>
+                                        </p:attrNameLst>
+                                      </p:cBhvr>
+                                      <p:to>
+                                        <p:strVal val="visible"/>
+                                      </p:to>
+                                    </p:set>
+                                  </p:childTnLst>
+                                </p:cTn>
+                              </p:par>
+                              <p:par>
+                                <p:cTn id="11" presetID="1" presetClass="entr" presetSubtype="0" fill="hold" nodeType="withEffect">
+                                  <p:stCondLst>
+                                    <p:cond delay="0"/>
+                                  </p:stCondLst>
+                                  <p:childTnLst>
+                                    <p:set>
+                                      <p:cBhvr>
+                                        <p:cTn id="12" dur="1" fill="hold">
+                                          <p:stCondLst>
+                                            <p:cond delay="0"/>
+                                          </p:stCondLst>
+                                        </p:cTn>
+                                        <p:tgtEl>
+                                          <p:spTgt spid="3">
+                                            <p:txEl>
+                                              <p:pRg st="3" end="3"/>
+                                            </p:txEl>
+                                          </p:spTgt>
+                                        </p:tgtEl>
+                                        <p:attrNameLst>
+                                          <p:attrName>style.visibility</p:attrName>
+                                        </p:attrNameLst>
+                                      </p:cBhvr>
+                                      <p:to>
+                                        <p:strVal val="visible"/>
+                                      </p:to>
+                                    </p:set>
+                                  </p:childTnLst>
+                                </p:cTn>
+                              </p:par>
+                              <p:par>
+                                <p:cTn id="13" presetID="1" presetClass="entr" presetSubtype="0" fill="hold" nodeType="withEffect">
+                                  <p:stCondLst>
+                                    <p:cond delay="0"/>
+                                  </p:stCondLst>
+                                  <p:childTnLst>
+                                    <p:set>
+                                      <p:cBhvr>
+                                        <p:cTn id="14" dur="1" fill="hold">
+                                          <p:stCondLst>
+                                            <p:cond delay="0"/>
+                                          </p:stCondLst>
+                                        </p:cTn>
+                                        <p:tgtEl>
+                                          <p:spTgt spid="3">
+                                            <p:txEl>
+                                              <p:pRg st="4" end="4"/>
+                                            </p:txEl>
+                                          </p:spTgt>
+                                        </p:tgtEl>
+                                        <p:attrNameLst>
+                                          <p:attrName>style.visibility</p:attrName>
+                                        </p:attrNameLst>
+                                      </p:cBhvr>
+                                      <p:to>
+                                        <p:strVal val="visible"/>
+                                      </p:to>
+                                    </p:set>
+                                  </p:childTnLst>
+                                </p:cTn>
+                              </p:par>
+                            </p:childTnLst>
+                          </p:cTn>
+                        </p:par>
+                      </p:childTnLst>
+                    </p:cTn>
+                  </p:par>
+                  <p:par>
+                    <p:cTn id="15" fill="hold">
+                      <p:stCondLst>
+                        <p:cond delay="indefinite"/>
+                      </p:stCondLst>
+                      <p:childTnLst>
+                        <p:par>
+                          <p:cTn id="16" fill="hold">
+                            <p:stCondLst>
+                              <p:cond delay="0"/>
+                            </p:stCondLst>
+                            <p:childTnLst>
+                              <p:par>
+                                <p:cTn id="17" presetID="1" presetClass="entr" presetSubtype="0" fill="hold" nodeType="clickEffect">
+                                  <p:stCondLst>
+                                    <p:cond delay="0"/>
+                                  </p:stCondLst>
+                                  <p:childTnLst>
+                                    <p:set>
+                                      <p:cBhvr>
+                                        <p:cTn id="18" dur="1" fill="hold">
+                                          <p:stCondLst>
+                                            <p:cond delay="0"/>
+                                          </p:stCondLst>
+                                        </p:cTn>
+                                        <p:tgtEl>
+                                          <p:spTgt spid="3">
+                                            <p:txEl>
+                                              <p:pRg st="5" end="5"/>
+                                            </p:txEl>
+                                          </p:spTgt>
+                                        </p:tgtEl>
+                                        <p:attrNameLst>
+                                          <p:attrName>style.visibility</p:attrName>
+                                        </p:attrNameLst>
+                                      </p:cBhvr>
+                                      <p:to>
+                                        <p:strVal val="visible"/>
+                                      </p:to>
+                                    </p:set>
+                                  </p:childTnLst>
+                                </p:cTn>
+                              </p:par>
+                              <p:par>
+                                <p:cTn id="19" presetID="1" presetClass="entr" presetSubtype="0" fill="hold" nodeType="withEffect">
+                                  <p:stCondLst>
+                                    <p:cond delay="0"/>
+                                  </p:stCondLst>
+                                  <p:childTnLst>
+                                    <p:set>
+                                      <p:cBhvr>
+                                        <p:cTn id="20" dur="1" fill="hold">
+                                          <p:stCondLst>
+                                            <p:cond delay="0"/>
+                                          </p:stCondLst>
+                                        </p:cTn>
+                                        <p:tgtEl>
+                                          <p:spTgt spid="3">
+                                            <p:txEl>
+                                              <p:pRg st="6" end="6"/>
+                                            </p:txEl>
+                                          </p:spTgt>
+                                        </p:tgtEl>
+                                        <p:attrNameLst>
+                                          <p:attrName>style.visibility</p:attrName>
+                                        </p:attrNameLst>
+                                      </p:cBhvr>
+                                      <p:to>
+                                        <p:strVal val="visible"/>
+                                      </p:to>
+                                    </p:set>
+                                  </p:childTnLst>
+                                </p:cTn>
+                              </p:par>
+                              <p:par>
+                                <p:cTn id="21" presetID="1" presetClass="entr" presetSubtype="0" fill="hold" nodeType="withEffect">
+                                  <p:stCondLst>
+                                    <p:cond delay="0"/>
+                                  </p:stCondLst>
+                                  <p:childTnLst>
+                                    <p:set>
+                                      <p:cBhvr>
+                                        <p:cTn id="22" dur="1" fill="hold">
+                                          <p:stCondLst>
+                                            <p:cond delay="0"/>
+                                          </p:stCondLst>
+                                        </p:cTn>
+                                        <p:tgtEl>
+                                          <p:spTgt spid="3">
+                                            <p:txEl>
+                                              <p:pRg st="7" end="7"/>
+                                            </p:txEl>
+                                          </p:spTgt>
+                                        </p:tgtEl>
+                                        <p:attrNameLst>
+                                          <p:attrName>style.visibility</p:attrName>
+                                        </p:attrNameLst>
+                                      </p:cBhvr>
+                                      <p:to>
+                                        <p:strVal val="visible"/>
+                                      </p:to>
+                                    </p:set>
+                                  </p:childTnLst>
+                                </p:cTn>
+                              </p:par>
+                              <p:par>
+                                <p:cTn id="23" presetID="1" presetClass="entr" presetSubtype="0" fill="hold" nodeType="withEffect">
+                                  <p:stCondLst>
+                                    <p:cond delay="0"/>
+                                  </p:stCondLst>
+                                  <p:childTnLst>
+                                    <p:set>
+                                      <p:cBhvr>
+                                        <p:cTn id="24" dur="1" fill="hold">
+                                          <p:stCondLst>
+                                            <p:cond delay="0"/>
+                                          </p:stCondLst>
+                                        </p:cTn>
+                                        <p:tgtEl>
+                                          <p:spTgt spid="3">
+                                            <p:txEl>
+                                              <p:pRg st="8" end="8"/>
+                                            </p:txEl>
+                                          </p:spTgt>
+                                        </p:tgtEl>
+                                        <p:attrNameLst>
+                                          <p:attrName>style.visibility</p:attrName>
+                                        </p:attrNameLst>
+                                      </p:cBhvr>
+                                      <p:to>
+                                        <p:strVal val="visible"/>
+                                      </p:to>
+                                    </p:set>
+                                  </p:childTnLst>
+                                </p:cTn>
+                              </p:par>
+                              <p:par>
+                                <p:cTn id="25" presetID="1" presetClass="entr" presetSubtype="0" fill="hold" nodeType="withEffect">
+                                  <p:stCondLst>
+                                    <p:cond delay="0"/>
+                                  </p:stCondLst>
+                                  <p:childTnLst>
+                                    <p:set>
+                                      <p:cBhvr>
+                                        <p:cTn id="26" dur="1" fill="hold">
+                                          <p:stCondLst>
+                                            <p:cond delay="0"/>
+                                          </p:stCondLst>
+                                        </p:cTn>
+                                        <p:tgtEl>
+                                          <p:spTgt spid="3">
+                                            <p:txEl>
+                                              <p:pRg st="9" end="9"/>
+                                            </p:txEl>
+                                          </p:spTgt>
+                                        </p:tgtEl>
+                                        <p:attrNameLst>
+                                          <p:attrName>style.visibility</p:attrName>
+                                        </p:attrNameLst>
+                                      </p:cBhvr>
+                                      <p:to>
+                                        <p:strVal val="visible"/>
+                                      </p:to>
+                                    </p:set>
+                                  </p:childTnLst>
+                                </p:cTn>
+                              </p:par>
+                              <p:par>
+                                <p:cTn id="27" presetID="1" presetClass="entr" presetSubtype="0" fill="hold" nodeType="withEffect">
+                                  <p:stCondLst>
+                                    <p:cond delay="0"/>
+                                  </p:stCondLst>
+                                  <p:childTnLst>
+                                    <p:set>
+                                      <p:cBhvr>
+                                        <p:cTn id="28" dur="1" fill="hold">
+                                          <p:stCondLst>
+                                            <p:cond delay="0"/>
+                                          </p:stCondLst>
+                                        </p:cTn>
+                                        <p:tgtEl>
+                                          <p:spTgt spid="3">
+                                            <p:txEl>
+                                              <p:pRg st="10" end="10"/>
+                                            </p:txEl>
+                                          </p:spTgt>
+                                        </p:tgtEl>
+                                        <p:attrNameLst>
+                                          <p:attrName>style.visibility</p:attrName>
+                                        </p:attrNameLst>
+                                      </p:cBhvr>
+                                      <p:to>
+                                        <p:strVal val="visible"/>
+                                      </p:to>
+                                    </p:set>
+                                  </p:childTnLst>
+                                </p:cTn>
+                              </p:par>
+                            </p:childTnLst>
+                          </p:cTn>
+                        </p:par>
+                      </p:childTnLst>
+                    </p:cTn>
+                  </p:par>
+                </p:childTnLst>
+              </p:cTn>
+              <p:prevCondLst>
+                <p:cond evt="onPrev" delay="0">
+                  <p:tgtEl>
+                    <p:sldTgt/>
+                  </p:tgtEl>
+                </p:cond>
+              </p:prevCondLst>
+              <p:nextCondLst>
+                <p:cond evt="onNext" delay="0">
+                  <p:tgtEl>
+                    <p:sldTgt/>
+                  </p:tgtEl>
+                </p:cond>
+              </p:nextCondLst>
+            </p:seq>
+          </p:childTnLst>
+        </p:cTn>
+      </p:par>
+    </p:tnLst>
+  </p:timing>
 </p:sld>
 </file>
 
@@ -23364,8 +24182,8 @@
           <a:chExt cx="0" cy="0"/>
         </a:xfrm>
       </p:grpSpPr>
-      <mc:AlternateContent xmlns:mc="http://schemas.openxmlformats.org/markup-compatibility/2006">
-        <mc:Choice xmlns:a14="http://schemas.microsoft.com/office/drawing/2010/main" Requires="a14">
+      <mc:AlternateContent xmlns:mc="http://schemas.openxmlformats.org/markup-compatibility/2006" xmlns:a14="http://schemas.microsoft.com/office/drawing/2010/main">
+        <mc:Choice Requires="a14">
           <p:sp>
             <p:nvSpPr>
               <p:cNvPr id="3" name="Content Placeholder 2">
@@ -23465,13 +24283,7 @@
                         <a:rPr lang="en-US" i="1">
                           <a:latin typeface="Cambria Math" panose="02040503050406030204" pitchFamily="18" charset="0"/>
                         </a:rPr>
-                        <m:t>=</m:t>
-                      </m:r>
-                      <m:r>
-                        <a:rPr lang="en-US" i="1">
-                          <a:latin typeface="Cambria Math" panose="02040503050406030204" pitchFamily="18" charset="0"/>
-                        </a:rPr>
-                        <m:t>(</m:t>
+                        <m:t>=(</m:t>
                       </m:r>
                       <m:r>
                         <a:rPr lang="en-US" i="1">
@@ -23667,7 +24479,7 @@
             </p:txBody>
           </p:sp>
         </mc:Choice>
-        <mc:Fallback>
+        <mc:Fallback xmlns="">
           <p:sp>
             <p:nvSpPr>
               <p:cNvPr id="3" name="Content Placeholder 2">
@@ -23926,6 +24738,37 @@
                                   </p:childTnLst>
                                 </p:cTn>
                               </p:par>
+                              <p:par>
+                                <p:cTn id="15" presetID="1" presetClass="entr" presetSubtype="0" fill="hold" nodeType="withEffect">
+                                  <p:stCondLst>
+                                    <p:cond delay="0"/>
+                                  </p:stCondLst>
+                                  <p:childTnLst>
+                                    <p:set>
+                                      <p:cBhvr>
+                                        <p:cTn id="16" dur="1" fill="hold">
+                                          <p:stCondLst>
+                                            <p:cond delay="0"/>
+                                          </p:stCondLst>
+                                        </p:cTn>
+                                        <p:tgtEl>
+                                          <p:spTgt spid="3">
+                                            <p:txEl>
+                                              <p:pRg st="4" end="4"/>
+                                            </p:txEl>
+                                          </p:spTgt>
+                                        </p:tgtEl>
+                                        <p:attrNameLst>
+                                          <p:attrName>style.visibility</p:attrName>
+                                        </p:attrNameLst>
+                                      </p:cBhvr>
+                                      <p:to>
+                                        <p:strVal val="visible"/>
+                                      </p:to>
+                                    </p:set>
+                                  </p:childTnLst>
+                                </p:cTn>
+                              </p:par>
                             </p:childTnLst>
                           </p:cTn>
                         </p:par>
@@ -23933,26 +24776,26 @@
                     </p:cTn>
                   </p:par>
                   <p:par>
-                    <p:cTn id="15" fill="hold">
+                    <p:cTn id="17" fill="hold">
                       <p:stCondLst>
                         <p:cond delay="indefinite"/>
                       </p:stCondLst>
                       <p:childTnLst>
                         <p:par>
-                          <p:cTn id="16" fill="hold">
+                          <p:cTn id="18" fill="hold">
                             <p:stCondLst>
                               <p:cond delay="0"/>
                             </p:stCondLst>
                             <p:childTnLst>
                               <p:par>
-                                <p:cTn id="17" presetID="1" presetClass="entr" presetSubtype="0" fill="hold" nodeType="clickEffect">
+                                <p:cTn id="19" presetID="1" presetClass="entr" presetSubtype="0" fill="hold" nodeType="clickEffect">
                                   <p:stCondLst>
                                     <p:cond delay="0"/>
                                   </p:stCondLst>
                                   <p:childTnLst>
                                     <p:set>
                                       <p:cBhvr>
-                                        <p:cTn id="18" dur="1" fill="hold">
+                                        <p:cTn id="20" dur="1" fill="hold">
                                           <p:stCondLst>
                                             <p:cond delay="0"/>
                                           </p:stCondLst>
@@ -23982,75 +24825,26 @@
                     </p:cTn>
                   </p:par>
                   <p:par>
-                    <p:cTn id="19" fill="hold">
+                    <p:cTn id="21" fill="hold">
                       <p:stCondLst>
                         <p:cond delay="indefinite"/>
                       </p:stCondLst>
                       <p:childTnLst>
                         <p:par>
-                          <p:cTn id="20" fill="hold">
+                          <p:cTn id="22" fill="hold">
                             <p:stCondLst>
                               <p:cond delay="0"/>
                             </p:stCondLst>
                             <p:childTnLst>
                               <p:par>
-                                <p:cTn id="21" presetID="1" presetClass="entr" presetSubtype="0" fill="hold" nodeType="clickEffect">
+                                <p:cTn id="23" presetID="1" presetClass="entr" presetSubtype="0" fill="hold" nodeType="clickEffect">
                                   <p:stCondLst>
                                     <p:cond delay="0"/>
                                   </p:stCondLst>
                                   <p:childTnLst>
                                     <p:set>
                                       <p:cBhvr>
-                                        <p:cTn id="22" dur="1" fill="hold">
-                                          <p:stCondLst>
-                                            <p:cond delay="0"/>
-                                          </p:stCondLst>
-                                        </p:cTn>
-                                        <p:tgtEl>
-                                          <p:spTgt spid="3">
-                                            <p:txEl>
-                                              <p:pRg st="4" end="4"/>
-                                            </p:txEl>
-                                          </p:spTgt>
-                                        </p:tgtEl>
-                                        <p:attrNameLst>
-                                          <p:attrName>style.visibility</p:attrName>
-                                        </p:attrNameLst>
-                                      </p:cBhvr>
-                                      <p:to>
-                                        <p:strVal val="visible"/>
-                                      </p:to>
-                                    </p:set>
-                                  </p:childTnLst>
-                                </p:cTn>
-                              </p:par>
-                            </p:childTnLst>
-                          </p:cTn>
-                        </p:par>
-                      </p:childTnLst>
-                    </p:cTn>
-                  </p:par>
-                  <p:par>
-                    <p:cTn id="23" fill="hold">
-                      <p:stCondLst>
-                        <p:cond delay="indefinite"/>
-                      </p:stCondLst>
-                      <p:childTnLst>
-                        <p:par>
-                          <p:cTn id="24" fill="hold">
-                            <p:stCondLst>
-                              <p:cond delay="0"/>
-                            </p:stCondLst>
-                            <p:childTnLst>
-                              <p:par>
-                                <p:cTn id="25" presetID="1" presetClass="entr" presetSubtype="0" fill="hold" nodeType="clickEffect">
-                                  <p:stCondLst>
-                                    <p:cond delay="0"/>
-                                  </p:stCondLst>
-                                  <p:childTnLst>
-                                    <p:set>
-                                      <p:cBhvr>
-                                        <p:cTn id="26" dur="1" fill="hold">
+                                        <p:cTn id="24" dur="1" fill="hold">
                                           <p:stCondLst>
                                             <p:cond delay="0"/>
                                           </p:stCondLst>
@@ -24074,14 +24868,14 @@
                                 </p:cTn>
                               </p:par>
                               <p:par>
-                                <p:cTn id="27" presetID="1" presetClass="entr" presetSubtype="0" fill="hold" nodeType="withEffect">
+                                <p:cTn id="25" presetID="1" presetClass="entr" presetSubtype="0" fill="hold" nodeType="withEffect">
                                   <p:stCondLst>
                                     <p:cond delay="0"/>
                                   </p:stCondLst>
                                   <p:childTnLst>
                                     <p:set>
                                       <p:cBhvr>
-                                        <p:cTn id="28" dur="1" fill="hold">
+                                        <p:cTn id="26" dur="1" fill="hold">
                                           <p:stCondLst>
                                             <p:cond delay="0"/>
                                           </p:stCondLst>
@@ -24111,19 +24905,50 @@
                     </p:cTn>
                   </p:par>
                   <p:par>
-                    <p:cTn id="29" fill="hold">
+                    <p:cTn id="27" fill="hold">
                       <p:stCondLst>
                         <p:cond delay="indefinite"/>
                       </p:stCondLst>
                       <p:childTnLst>
                         <p:par>
-                          <p:cTn id="30" fill="hold">
+                          <p:cTn id="28" fill="hold">
                             <p:stCondLst>
                               <p:cond delay="0"/>
                             </p:stCondLst>
                             <p:childTnLst>
                               <p:par>
-                                <p:cTn id="31" presetID="1" presetClass="entr" presetSubtype="0" fill="hold" nodeType="clickEffect">
+                                <p:cTn id="29" presetID="1" presetClass="entr" presetSubtype="0" fill="hold" nodeType="clickEffect">
+                                  <p:stCondLst>
+                                    <p:cond delay="0"/>
+                                  </p:stCondLst>
+                                  <p:childTnLst>
+                                    <p:set>
+                                      <p:cBhvr>
+                                        <p:cTn id="30" dur="1" fill="hold">
+                                          <p:stCondLst>
+                                            <p:cond delay="0"/>
+                                          </p:stCondLst>
+                                        </p:cTn>
+                                        <p:tgtEl>
+                                          <p:spTgt spid="3">
+                                            <p:txEl>
+                                              <p:pRg st="8" end="8"/>
+                                            </p:txEl>
+                                          </p:spTgt>
+                                        </p:tgtEl>
+                                        <p:attrNameLst>
+                                          <p:attrName>style.visibility</p:attrName>
+                                        </p:attrNameLst>
+                                      </p:cBhvr>
+                                      <p:to>
+                                        <p:strVal val="visible"/>
+                                      </p:to>
+                                    </p:set>
+                                  </p:childTnLst>
+                                </p:cTn>
+                              </p:par>
+                              <p:par>
+                                <p:cTn id="31" presetID="1" presetClass="entr" presetSubtype="0" fill="hold" nodeType="withEffect">
                                   <p:stCondLst>
                                     <p:cond delay="0"/>
                                   </p:stCondLst>
@@ -24138,7 +24963,7 @@
                                         <p:tgtEl>
                                           <p:spTgt spid="3">
                                             <p:txEl>
-                                              <p:pRg st="8" end="8"/>
+                                              <p:pRg st="9" end="9"/>
                                             </p:txEl>
                                           </p:spTgt>
                                         </p:tgtEl>
@@ -24169,7 +24994,7 @@
                                         <p:tgtEl>
                                           <p:spTgt spid="3">
                                             <p:txEl>
-                                              <p:pRg st="9" end="9"/>
+                                              <p:pRg st="10" end="10"/>
                                             </p:txEl>
                                           </p:spTgt>
                                         </p:tgtEl>
@@ -24193,37 +25018,6 @@
                                     <p:set>
                                       <p:cBhvr>
                                         <p:cTn id="36" dur="1" fill="hold">
-                                          <p:stCondLst>
-                                            <p:cond delay="0"/>
-                                          </p:stCondLst>
-                                        </p:cTn>
-                                        <p:tgtEl>
-                                          <p:spTgt spid="3">
-                                            <p:txEl>
-                                              <p:pRg st="10" end="10"/>
-                                            </p:txEl>
-                                          </p:spTgt>
-                                        </p:tgtEl>
-                                        <p:attrNameLst>
-                                          <p:attrName>style.visibility</p:attrName>
-                                        </p:attrNameLst>
-                                      </p:cBhvr>
-                                      <p:to>
-                                        <p:strVal val="visible"/>
-                                      </p:to>
-                                    </p:set>
-                                  </p:childTnLst>
-                                </p:cTn>
-                              </p:par>
-                              <p:par>
-                                <p:cTn id="37" presetID="1" presetClass="entr" presetSubtype="0" fill="hold" nodeType="withEffect">
-                                  <p:stCondLst>
-                                    <p:cond delay="0"/>
-                                  </p:stCondLst>
-                                  <p:childTnLst>
-                                    <p:set>
-                                      <p:cBhvr>
-                                        <p:cTn id="38" dur="1" fill="hold">
                                           <p:stCondLst>
                                             <p:cond delay="0"/>
                                           </p:stCondLst>
@@ -24294,8 +25088,8 @@
           <a:chExt cx="0" cy="0"/>
         </a:xfrm>
       </p:grpSpPr>
-      <mc:AlternateContent xmlns:mc="http://schemas.openxmlformats.org/markup-compatibility/2006">
-        <mc:Choice xmlns:a14="http://schemas.microsoft.com/office/drawing/2010/main" Requires="a14">
+      <mc:AlternateContent xmlns:mc="http://schemas.openxmlformats.org/markup-compatibility/2006" xmlns:a14="http://schemas.microsoft.com/office/drawing/2010/main">
+        <mc:Choice Requires="a14">
           <p:sp>
             <p:nvSpPr>
               <p:cNvPr id="3" name="Content Placeholder 2">
@@ -24408,7 +25202,7 @@
             </p:txBody>
           </p:sp>
         </mc:Choice>
-        <mc:Fallback>
+        <mc:Fallback xmlns="">
           <p:sp>
             <p:nvSpPr>
               <p:cNvPr id="3" name="Content Placeholder 2">
@@ -24599,9 +25393,6 @@
                     <p:cTn id="3" fill="hold">
                       <p:stCondLst>
                         <p:cond delay="indefinite"/>
-                        <p:cond evt="onBegin" delay="0">
-                          <p:tn val="2"/>
-                        </p:cond>
                       </p:stCondLst>
                       <p:childTnLst>
                         <p:par>
@@ -24611,7 +25402,7 @@
                             </p:stCondLst>
                             <p:childTnLst>
                               <p:par>
-                                <p:cTn id="5" presetID="1" presetClass="entr" presetSubtype="0" fill="hold" nodeType="withEffect">
+                                <p:cTn id="5" presetID="1" presetClass="entr" presetSubtype="0" fill="hold" nodeType="clickEffect">
                                   <p:stCondLst>
                                     <p:cond delay="0"/>
                                   </p:stCondLst>
@@ -24619,6 +25410,86 @@
                                     <p:set>
                                       <p:cBhvr>
                                         <p:cTn id="6" dur="1" fill="hold">
+                                          <p:stCondLst>
+                                            <p:cond delay="0"/>
+                                          </p:stCondLst>
+                                        </p:cTn>
+                                        <p:tgtEl>
+                                          <p:spTgt spid="3">
+                                            <p:txEl>
+                                              <p:pRg st="1" end="1"/>
+                                            </p:txEl>
+                                          </p:spTgt>
+                                        </p:tgtEl>
+                                        <p:attrNameLst>
+                                          <p:attrName>style.visibility</p:attrName>
+                                        </p:attrNameLst>
+                                      </p:cBhvr>
+                                      <p:to>
+                                        <p:strVal val="visible"/>
+                                      </p:to>
+                                    </p:set>
+                                  </p:childTnLst>
+                                </p:cTn>
+                              </p:par>
+                            </p:childTnLst>
+                          </p:cTn>
+                        </p:par>
+                      </p:childTnLst>
+                    </p:cTn>
+                  </p:par>
+                  <p:par>
+                    <p:cTn id="7" fill="hold">
+                      <p:stCondLst>
+                        <p:cond delay="indefinite"/>
+                      </p:stCondLst>
+                      <p:childTnLst>
+                        <p:par>
+                          <p:cTn id="8" fill="hold">
+                            <p:stCondLst>
+                              <p:cond delay="0"/>
+                            </p:stCondLst>
+                            <p:childTnLst>
+                              <p:par>
+                                <p:cTn id="9" presetID="1" presetClass="entr" presetSubtype="0" fill="hold" nodeType="clickEffect">
+                                  <p:stCondLst>
+                                    <p:cond delay="0"/>
+                                  </p:stCondLst>
+                                  <p:childTnLst>
+                                    <p:set>
+                                      <p:cBhvr>
+                                        <p:cTn id="10" dur="1" fill="hold">
+                                          <p:stCondLst>
+                                            <p:cond delay="0"/>
+                                          </p:stCondLst>
+                                        </p:cTn>
+                                        <p:tgtEl>
+                                          <p:spTgt spid="3">
+                                            <p:txEl>
+                                              <p:pRg st="2" end="2"/>
+                                            </p:txEl>
+                                          </p:spTgt>
+                                        </p:tgtEl>
+                                        <p:attrNameLst>
+                                          <p:attrName>style.visibility</p:attrName>
+                                        </p:attrNameLst>
+                                      </p:cBhvr>
+                                      <p:to>
+                                        <p:strVal val="visible"/>
+                                      </p:to>
+                                    </p:set>
+                                  </p:childTnLst>
+                                </p:cTn>
+                              </p:par>
+                              <p:par>
+                                <p:cTn id="11" presetID="1" presetClass="entr" presetSubtype="0" fill="hold" nodeType="withEffect">
+                                  <p:stCondLst>
+                                    <p:cond delay="0"/>
+                                  </p:stCondLst>
+                                  <p:childTnLst>
+                                    <p:set>
+                                      <p:cBhvr>
+                                        <p:cTn id="12" dur="1" fill="hold">
                                           <p:stCondLst>
                                             <p:cond delay="0"/>
                                           </p:stCondLst>
@@ -24637,21 +25508,92 @@
                                   </p:childTnLst>
                                 </p:cTn>
                               </p:par>
+                            </p:childTnLst>
+                          </p:cTn>
+                        </p:par>
+                      </p:childTnLst>
+                    </p:cTn>
+                  </p:par>
+                  <p:par>
+                    <p:cTn id="13" fill="hold">
+                      <p:stCondLst>
+                        <p:cond delay="indefinite"/>
+                      </p:stCondLst>
+                      <p:childTnLst>
+                        <p:par>
+                          <p:cTn id="14" fill="hold">
+                            <p:stCondLst>
+                              <p:cond delay="0"/>
+                            </p:stCondLst>
+                            <p:childTnLst>
                               <p:par>
-                                <p:cTn id="7" presetID="1" presetClass="entr" presetSubtype="0" fill="hold" grpId="0" nodeType="withEffect">
+                                <p:cTn id="15" presetID="1" presetClass="entr" presetSubtype="0" fill="hold" nodeType="clickEffect">
                                   <p:stCondLst>
                                     <p:cond delay="0"/>
                                   </p:stCondLst>
                                   <p:childTnLst>
                                     <p:set>
                                       <p:cBhvr>
-                                        <p:cTn id="8" dur="1" fill="hold">
+                                        <p:cTn id="16" dur="1" fill="hold">
                                           <p:stCondLst>
                                             <p:cond delay="0"/>
                                           </p:stCondLst>
                                         </p:cTn>
                                         <p:tgtEl>
-                                          <p:spTgt spid="5"/>
+                                          <p:spTgt spid="3">
+                                            <p:txEl>
+                                              <p:pRg st="3" end="3"/>
+                                            </p:txEl>
+                                          </p:spTgt>
+                                        </p:tgtEl>
+                                        <p:attrNameLst>
+                                          <p:attrName>style.visibility</p:attrName>
+                                        </p:attrNameLst>
+                                      </p:cBhvr>
+                                      <p:to>
+                                        <p:strVal val="visible"/>
+                                      </p:to>
+                                    </p:set>
+                                  </p:childTnLst>
+                                </p:cTn>
+                              </p:par>
+                            </p:childTnLst>
+                          </p:cTn>
+                        </p:par>
+                      </p:childTnLst>
+                    </p:cTn>
+                  </p:par>
+                  <p:par>
+                    <p:cTn id="17" fill="hold">
+                      <p:stCondLst>
+                        <p:cond delay="indefinite"/>
+                      </p:stCondLst>
+                      <p:childTnLst>
+                        <p:par>
+                          <p:cTn id="18" fill="hold">
+                            <p:stCondLst>
+                              <p:cond delay="0"/>
+                            </p:stCondLst>
+                            <p:childTnLst>
+                              <p:par>
+                                <p:cTn id="19" presetID="1" presetClass="entr" presetSubtype="0" fill="hold" nodeType="clickEffect">
+                                  <p:stCondLst>
+                                    <p:cond delay="0"/>
+                                  </p:stCondLst>
+                                  <p:childTnLst>
+                                    <p:set>
+                                      <p:cBhvr>
+                                        <p:cTn id="20" dur="1" fill="hold">
+                                          <p:stCondLst>
+                                            <p:cond delay="0"/>
+                                          </p:stCondLst>
+                                        </p:cTn>
+                                        <p:tgtEl>
+                                          <p:spTgt spid="3">
+                                            <p:txEl>
+                                              <p:pRg st="4" end="4"/>
+                                            </p:txEl>
+                                          </p:spTgt>
                                         </p:tgtEl>
                                         <p:attrNameLst>
                                           <p:attrName>style.visibility</p:attrName>
@@ -24691,9 +25633,6 @@
         </p:cTn>
       </p:par>
     </p:tnLst>
-    <p:bldLst>
-      <p:bldP spid="5" grpId="0"/>
-    </p:bldLst>
   </p:timing>
 </p:sld>
 </file>
@@ -29792,14 +30731,14 @@
               <a:t>Lots of ways to </a:t>
             </a:r>
             <a:r>
-              <a:rPr lang="en-US" dirty="0">
+              <a:rPr lang="en-US" b="1" dirty="0">
                 <a:solidFill>
                   <a:schemeClr val="tx1">
                     <a:lumMod val="50000"/>
                   </a:schemeClr>
                 </a:solidFill>
               </a:rPr>
-              <a:t>misuse</a:t>
+              <a:t>misuse the p-value</a:t>
             </a:r>
             <a:r>
               <a:rPr lang="en-US" b="0" dirty="0">
@@ -29809,7 +30748,7 @@
                   </a:schemeClr>
                 </a:solidFill>
               </a:rPr>
-              <a:t> the p-value; some examples: </a:t>
+              <a:t>; some examples: </a:t>
             </a:r>
           </a:p>
           <a:p>
@@ -30292,8 +31231,8 @@
           <a:chExt cx="0" cy="0"/>
         </a:xfrm>
       </p:grpSpPr>
-      <mc:AlternateContent xmlns:mc="http://schemas.openxmlformats.org/markup-compatibility/2006">
-        <mc:Choice xmlns:a14="http://schemas.microsoft.com/office/drawing/2010/main" Requires="a14">
+      <mc:AlternateContent xmlns:mc="http://schemas.openxmlformats.org/markup-compatibility/2006" xmlns:a14="http://schemas.microsoft.com/office/drawing/2010/main">
+        <mc:Choice Requires="a14">
           <p:sp>
             <p:nvSpPr>
               <p:cNvPr id="3" name="Content Placeholder 2">
@@ -30507,7 +31446,7 @@
             </p:txBody>
           </p:sp>
         </mc:Choice>
-        <mc:Fallback>
+        <mc:Fallback xmlns="">
           <p:sp>
             <p:nvSpPr>
               <p:cNvPr id="3" name="Content Placeholder 2">
@@ -32049,6 +32988,33 @@
                                   </p:childTnLst>
                                 </p:cTn>
                               </p:par>
+                              <p:par>
+                                <p:cTn id="7" presetID="1" presetClass="entr" presetSubtype="0" fill="hold" nodeType="withEffect">
+                                  <p:stCondLst>
+                                    <p:cond delay="0"/>
+                                  </p:stCondLst>
+                                  <p:childTnLst>
+                                    <p:set>
+                                      <p:cBhvr>
+                                        <p:cTn id="8" dur="1" fill="hold">
+                                          <p:stCondLst>
+                                            <p:cond delay="0"/>
+                                          </p:stCondLst>
+                                        </p:cTn>
+                                        <p:tgtEl>
+                                          <p:spTgt spid="2"/>
+                                        </p:tgtEl>
+                                        <p:attrNameLst>
+                                          <p:attrName>style.visibility</p:attrName>
+                                        </p:attrNameLst>
+                                      </p:cBhvr>
+                                      <p:to>
+                                        <p:strVal val="visible"/>
+                                      </p:to>
+                                    </p:set>
+                                  </p:childTnLst>
+                                </p:cTn>
+                              </p:par>
                             </p:childTnLst>
                           </p:cTn>
                         </p:par>
@@ -32056,26 +33022,26 @@
                     </p:cTn>
                   </p:par>
                   <p:par>
-                    <p:cTn id="7" fill="hold">
+                    <p:cTn id="9" fill="hold">
                       <p:stCondLst>
                         <p:cond delay="indefinite"/>
                       </p:stCondLst>
                       <p:childTnLst>
                         <p:par>
-                          <p:cTn id="8" fill="hold">
+                          <p:cTn id="10" fill="hold">
                             <p:stCondLst>
                               <p:cond delay="0"/>
                             </p:stCondLst>
                             <p:childTnLst>
                               <p:par>
-                                <p:cTn id="9" presetID="1" presetClass="entr" presetSubtype="0" fill="hold" nodeType="clickEffect">
+                                <p:cTn id="11" presetID="1" presetClass="entr" presetSubtype="0" fill="hold" nodeType="clickEffect">
                                   <p:stCondLst>
                                     <p:cond delay="0"/>
                                   </p:stCondLst>
                                   <p:childTnLst>
                                     <p:set>
                                       <p:cBhvr>
-                                        <p:cTn id="10" dur="1" fill="hold">
+                                        <p:cTn id="12" dur="1" fill="hold">
                                           <p:stCondLst>
                                             <p:cond delay="0"/>
                                           </p:stCondLst>
@@ -32105,26 +33071,26 @@
                     </p:cTn>
                   </p:par>
                   <p:par>
-                    <p:cTn id="11" fill="hold">
+                    <p:cTn id="13" fill="hold">
                       <p:stCondLst>
                         <p:cond delay="indefinite"/>
                       </p:stCondLst>
                       <p:childTnLst>
                         <p:par>
-                          <p:cTn id="12" fill="hold">
+                          <p:cTn id="14" fill="hold">
                             <p:stCondLst>
                               <p:cond delay="0"/>
                             </p:stCondLst>
                             <p:childTnLst>
                               <p:par>
-                                <p:cTn id="13" presetID="1" presetClass="entr" presetSubtype="0" fill="hold" nodeType="clickEffect">
+                                <p:cTn id="15" presetID="1" presetClass="entr" presetSubtype="0" fill="hold" nodeType="clickEffect">
                                   <p:stCondLst>
                                     <p:cond delay="0"/>
                                   </p:stCondLst>
                                   <p:childTnLst>
                                     <p:set>
                                       <p:cBhvr>
-                                        <p:cTn id="14" dur="1" fill="hold">
+                                        <p:cTn id="16" dur="1" fill="hold">
                                           <p:stCondLst>
                                             <p:cond delay="0"/>
                                           </p:stCondLst>
@@ -32154,50 +33120,19 @@
                     </p:cTn>
                   </p:par>
                   <p:par>
-                    <p:cTn id="15" fill="hold">
+                    <p:cTn id="17" fill="hold">
                       <p:stCondLst>
                         <p:cond delay="indefinite"/>
                       </p:stCondLst>
                       <p:childTnLst>
                         <p:par>
-                          <p:cTn id="16" fill="hold">
+                          <p:cTn id="18" fill="hold">
                             <p:stCondLst>
                               <p:cond delay="0"/>
                             </p:stCondLst>
                             <p:childTnLst>
                               <p:par>
-                                <p:cTn id="17" presetID="1" presetClass="entr" presetSubtype="0" fill="hold" nodeType="clickEffect">
-                                  <p:stCondLst>
-                                    <p:cond delay="0"/>
-                                  </p:stCondLst>
-                                  <p:childTnLst>
-                                    <p:set>
-                                      <p:cBhvr>
-                                        <p:cTn id="18" dur="1" fill="hold">
-                                          <p:stCondLst>
-                                            <p:cond delay="0"/>
-                                          </p:stCondLst>
-                                        </p:cTn>
-                                        <p:tgtEl>
-                                          <p:spTgt spid="5">
-                                            <p:txEl>
-                                              <p:pRg st="3" end="3"/>
-                                            </p:txEl>
-                                          </p:spTgt>
-                                        </p:tgtEl>
-                                        <p:attrNameLst>
-                                          <p:attrName>style.visibility</p:attrName>
-                                        </p:attrNameLst>
-                                      </p:cBhvr>
-                                      <p:to>
-                                        <p:strVal val="visible"/>
-                                      </p:to>
-                                    </p:set>
-                                  </p:childTnLst>
-                                </p:cTn>
-                              </p:par>
-                              <p:par>
-                                <p:cTn id="19" presetID="1" presetClass="entr" presetSubtype="0" fill="hold" nodeType="withEffect">
+                                <p:cTn id="19" presetID="1" presetClass="entr" presetSubtype="0" fill="hold" nodeType="clickEffect">
                                   <p:stCondLst>
                                     <p:cond delay="0"/>
                                   </p:stCondLst>
@@ -32210,7 +33145,11 @@
                                           </p:stCondLst>
                                         </p:cTn>
                                         <p:tgtEl>
-                                          <p:spTgt spid="2"/>
+                                          <p:spTgt spid="5">
+                                            <p:txEl>
+                                              <p:pRg st="3" end="3"/>
+                                            </p:txEl>
+                                          </p:spTgt>
                                         </p:tgtEl>
                                         <p:attrNameLst>
                                           <p:attrName>style.visibility</p:attrName>
@@ -32809,33 +33748,15 @@
                                   </p:childTnLst>
                                 </p:cTn>
                               </p:par>
-                            </p:childTnLst>
-                          </p:cTn>
-                        </p:par>
-                      </p:childTnLst>
-                    </p:cTn>
-                  </p:par>
-                  <p:par>
-                    <p:cTn id="15" fill="hold">
-                      <p:stCondLst>
-                        <p:cond delay="indefinite"/>
-                      </p:stCondLst>
-                      <p:childTnLst>
-                        <p:par>
-                          <p:cTn id="16" fill="hold">
-                            <p:stCondLst>
-                              <p:cond delay="0"/>
-                            </p:stCondLst>
-                            <p:childTnLst>
                               <p:par>
-                                <p:cTn id="17" presetID="1" presetClass="entr" presetSubtype="0" fill="hold" nodeType="clickEffect">
+                                <p:cTn id="15" presetID="1" presetClass="entr" presetSubtype="0" fill="hold" nodeType="withEffect">
                                   <p:stCondLst>
                                     <p:cond delay="0"/>
                                   </p:stCondLst>
                                   <p:childTnLst>
                                     <p:set>
                                       <p:cBhvr>
-                                        <p:cTn id="18" dur="1" fill="hold">
+                                        <p:cTn id="16" dur="1" fill="hold">
                                           <p:stCondLst>
                                             <p:cond delay="0"/>
                                           </p:stCondLst>
@@ -33300,8 +34221,8 @@
           <a:chExt cx="0" cy="0"/>
         </a:xfrm>
       </p:grpSpPr>
-      <mc:AlternateContent xmlns:mc="http://schemas.openxmlformats.org/markup-compatibility/2006">
-        <mc:Choice xmlns:a14="http://schemas.microsoft.com/office/drawing/2010/main" Requires="a14">
+      <mc:AlternateContent xmlns:mc="http://schemas.openxmlformats.org/markup-compatibility/2006" xmlns:a14="http://schemas.microsoft.com/office/drawing/2010/main">
+        <mc:Choice Requires="a14">
           <p:sp>
             <p:nvSpPr>
               <p:cNvPr id="3" name="Content Placeholder 2">
@@ -33474,7 +34395,7 @@
             </p:txBody>
           </p:sp>
         </mc:Choice>
-        <mc:Fallback>
+        <mc:Fallback xmlns="">
           <p:sp>
             <p:nvSpPr>
               <p:cNvPr id="3" name="Content Placeholder 2">
@@ -36255,12 +37176,8 @@
           </a:p>
           <a:p>
             <a:r>
-              <a:rPr lang="en-US"/>
-              <a:t>Resampling </a:t>
-            </a:r>
-            <a:r>
               <a:rPr lang="en-US" dirty="0"/>
-              <a:t>based methods  </a:t>
+              <a:t>Resampling based methods  </a:t>
             </a:r>
           </a:p>
           <a:p>
@@ -38942,7 +39859,7 @@
           <a:p>
             <a:r>
               <a:rPr lang="en-US" dirty="0"/>
-              <a:t>Must have an clear idea of goal!</a:t>
+              <a:t>Must have a clear idea of goal!</a:t>
             </a:r>
           </a:p>
           <a:p>
@@ -40900,7 +41817,7 @@
         <p:spPr>
           <a:xfrm>
             <a:off x="672105" y="1478300"/>
-            <a:ext cx="10515600" cy="4538867"/>
+            <a:ext cx="10515600" cy="4814924"/>
           </a:xfrm>
         </p:spPr>
         <p:txBody>
@@ -41011,6 +41928,22 @@
               </a:rPr>
               <a:t>MS and PhD, geophysics, Princeton University – John von Neuman Supercomputing Fellow</a:t>
             </a:r>
+          </a:p>
+          <a:p>
+            <a:pPr>
+              <a:spcBef>
+                <a:spcPts val="300"/>
+              </a:spcBef>
+            </a:pPr>
+            <a:r>
+              <a:rPr lang="en-US" dirty="0">
+                <a:cs typeface="Arial" panose="020B0604020202020204" pitchFamily="34" charset="0"/>
+              </a:rPr>
+              <a:t>I love anything to do with natural history and the outdoors</a:t>
+            </a:r>
+            <a:endParaRPr lang="en-US" sz="2800" b="0" dirty="0">
+              <a:cs typeface="Arial" panose="020B0604020202020204" pitchFamily="34" charset="0"/>
+            </a:endParaRPr>
           </a:p>
         </p:txBody>
       </p:sp>

</xml_diff>

<commit_message>
Notation updates from lecture
</commit_message>
<xml_diff>
--- a/slides/1_Introduction.pptx
+++ b/slides/1_Introduction.pptx
@@ -16193,15 +16193,7 @@
               <a:p>
                 <a:r>
                   <a:rPr lang="en-US" dirty="0"/>
-                  <a:t>Same </a:t>
-                </a:r>
-                <a:r>
-                  <a:rPr lang="en-US"/>
-                  <a:t>hash function used </a:t>
-                </a:r>
-                <a:r>
-                  <a:rPr lang="en-US" dirty="0"/>
-                  <a:t>for insertions and deletions in table</a:t>
+                  <a:t>Same hash function used for insertions and deletions in table</a:t>
                 </a:r>
               </a:p>
               <a:p>
@@ -22477,8 +22469,8 @@
           <a:chExt cx="0" cy="0"/>
         </a:xfrm>
       </p:grpSpPr>
-      <mc:AlternateContent xmlns:mc="http://schemas.openxmlformats.org/markup-compatibility/2006" xmlns:a14="http://schemas.microsoft.com/office/drawing/2010/main">
-        <mc:Choice Requires="a14">
+      <mc:AlternateContent xmlns:mc="http://schemas.openxmlformats.org/markup-compatibility/2006">
+        <mc:Choice xmlns:a14="http://schemas.microsoft.com/office/drawing/2010/main" Requires="a14">
           <p:sp>
             <p:nvSpPr>
               <p:cNvPr id="3" name="Content Placeholder 2">
@@ -22616,7 +22608,7 @@
                         <a:rPr lang="en-US" b="1" i="1" smtClean="0">
                           <a:latin typeface="Cambria Math" panose="02040503050406030204" pitchFamily="18" charset="0"/>
                         </a:rPr>
-                        <m:t>𝒌</m:t>
+                        <m:t>𝒇</m:t>
                       </m:r>
                       <m:r>
                         <a:rPr lang="en-US" b="1" i="1" smtClean="0">
@@ -22628,7 +22620,7 @@
                         <a:rPr lang="en-US" b="1" i="1" smtClean="0">
                           <a:latin typeface="Cambria Math" panose="02040503050406030204" pitchFamily="18" charset="0"/>
                         </a:rPr>
-                        <m:t>𝑲</m:t>
+                        <m:t>𝒌</m:t>
                       </m:r>
                       <m:r>
                         <a:rPr lang="en-US" b="1" i="1" smtClean="0">
@@ -22755,7 +22747,7 @@
             </p:txBody>
           </p:sp>
         </mc:Choice>
-        <mc:Fallback xmlns="">
+        <mc:Fallback>
           <p:sp>
             <p:nvSpPr>
               <p:cNvPr id="3" name="Content Placeholder 2">
@@ -22865,449 +22857,6 @@
   <p:clrMapOvr>
     <a:masterClrMapping/>
   </p:clrMapOvr>
-  <p:timing>
-    <p:tnLst>
-      <p:par>
-        <p:cTn id="1" dur="indefinite" restart="never" nodeType="tmRoot">
-          <p:childTnLst>
-            <p:seq concurrent="1" nextAc="seek">
-              <p:cTn id="2" dur="indefinite" nodeType="mainSeq">
-                <p:childTnLst>
-                  <p:par>
-                    <p:cTn id="3" fill="hold">
-                      <p:stCondLst>
-                        <p:cond delay="indefinite"/>
-                      </p:stCondLst>
-                      <p:childTnLst>
-                        <p:par>
-                          <p:cTn id="4" fill="hold">
-                            <p:stCondLst>
-                              <p:cond delay="0"/>
-                            </p:stCondLst>
-                            <p:childTnLst>
-                              <p:par>
-                                <p:cTn id="5" presetID="1" presetClass="entr" presetSubtype="0" fill="hold" nodeType="clickEffect">
-                                  <p:stCondLst>
-                                    <p:cond delay="0"/>
-                                  </p:stCondLst>
-                                  <p:childTnLst>
-                                    <p:set>
-                                      <p:cBhvr>
-                                        <p:cTn id="6" dur="1" fill="hold">
-                                          <p:stCondLst>
-                                            <p:cond delay="0"/>
-                                          </p:stCondLst>
-                                        </p:cTn>
-                                        <p:tgtEl>
-                                          <p:spTgt spid="3">
-                                            <p:txEl>
-                                              <p:pRg st="1" end="1"/>
-                                            </p:txEl>
-                                          </p:spTgt>
-                                        </p:tgtEl>
-                                        <p:attrNameLst>
-                                          <p:attrName>style.visibility</p:attrName>
-                                        </p:attrNameLst>
-                                      </p:cBhvr>
-                                      <p:to>
-                                        <p:strVal val="visible"/>
-                                      </p:to>
-                                    </p:set>
-                                  </p:childTnLst>
-                                </p:cTn>
-                              </p:par>
-                            </p:childTnLst>
-                          </p:cTn>
-                        </p:par>
-                      </p:childTnLst>
-                    </p:cTn>
-                  </p:par>
-                  <p:par>
-                    <p:cTn id="7" fill="hold">
-                      <p:stCondLst>
-                        <p:cond delay="indefinite"/>
-                      </p:stCondLst>
-                      <p:childTnLst>
-                        <p:par>
-                          <p:cTn id="8" fill="hold">
-                            <p:stCondLst>
-                              <p:cond delay="0"/>
-                            </p:stCondLst>
-                            <p:childTnLst>
-                              <p:par>
-                                <p:cTn id="9" presetID="1" presetClass="entr" presetSubtype="0" fill="hold" nodeType="clickEffect">
-                                  <p:stCondLst>
-                                    <p:cond delay="0"/>
-                                  </p:stCondLst>
-                                  <p:childTnLst>
-                                    <p:set>
-                                      <p:cBhvr>
-                                        <p:cTn id="10" dur="1" fill="hold">
-                                          <p:stCondLst>
-                                            <p:cond delay="0"/>
-                                          </p:stCondLst>
-                                        </p:cTn>
-                                        <p:tgtEl>
-                                          <p:spTgt spid="3">
-                                            <p:txEl>
-                                              <p:pRg st="2" end="2"/>
-                                            </p:txEl>
-                                          </p:spTgt>
-                                        </p:tgtEl>
-                                        <p:attrNameLst>
-                                          <p:attrName>style.visibility</p:attrName>
-                                        </p:attrNameLst>
-                                      </p:cBhvr>
-                                      <p:to>
-                                        <p:strVal val="visible"/>
-                                      </p:to>
-                                    </p:set>
-                                  </p:childTnLst>
-                                </p:cTn>
-                              </p:par>
-                              <p:par>
-                                <p:cTn id="11" presetID="1" presetClass="entr" presetSubtype="0" fill="hold" nodeType="withEffect">
-                                  <p:stCondLst>
-                                    <p:cond delay="0"/>
-                                  </p:stCondLst>
-                                  <p:childTnLst>
-                                    <p:set>
-                                      <p:cBhvr>
-                                        <p:cTn id="12" dur="1" fill="hold">
-                                          <p:stCondLst>
-                                            <p:cond delay="0"/>
-                                          </p:stCondLst>
-                                        </p:cTn>
-                                        <p:tgtEl>
-                                          <p:spTgt spid="3">
-                                            <p:txEl>
-                                              <p:pRg st="3" end="3"/>
-                                            </p:txEl>
-                                          </p:spTgt>
-                                        </p:tgtEl>
-                                        <p:attrNameLst>
-                                          <p:attrName>style.visibility</p:attrName>
-                                        </p:attrNameLst>
-                                      </p:cBhvr>
-                                      <p:to>
-                                        <p:strVal val="visible"/>
-                                      </p:to>
-                                    </p:set>
-                                  </p:childTnLst>
-                                </p:cTn>
-                              </p:par>
-                              <p:par>
-                                <p:cTn id="13" presetID="1" presetClass="entr" presetSubtype="0" fill="hold" nodeType="withEffect">
-                                  <p:stCondLst>
-                                    <p:cond delay="0"/>
-                                  </p:stCondLst>
-                                  <p:childTnLst>
-                                    <p:set>
-                                      <p:cBhvr>
-                                        <p:cTn id="14" dur="1" fill="hold">
-                                          <p:stCondLst>
-                                            <p:cond delay="0"/>
-                                          </p:stCondLst>
-                                        </p:cTn>
-                                        <p:tgtEl>
-                                          <p:spTgt spid="3">
-                                            <p:txEl>
-                                              <p:pRg st="4" end="4"/>
-                                            </p:txEl>
-                                          </p:spTgt>
-                                        </p:tgtEl>
-                                        <p:attrNameLst>
-                                          <p:attrName>style.visibility</p:attrName>
-                                        </p:attrNameLst>
-                                      </p:cBhvr>
-                                      <p:to>
-                                        <p:strVal val="visible"/>
-                                      </p:to>
-                                    </p:set>
-                                  </p:childTnLst>
-                                </p:cTn>
-                              </p:par>
-                              <p:par>
-                                <p:cTn id="15" presetID="1" presetClass="entr" presetSubtype="0" fill="hold" nodeType="withEffect">
-                                  <p:stCondLst>
-                                    <p:cond delay="0"/>
-                                  </p:stCondLst>
-                                  <p:childTnLst>
-                                    <p:set>
-                                      <p:cBhvr>
-                                        <p:cTn id="16" dur="1" fill="hold">
-                                          <p:stCondLst>
-                                            <p:cond delay="0"/>
-                                          </p:stCondLst>
-                                        </p:cTn>
-                                        <p:tgtEl>
-                                          <p:spTgt spid="3">
-                                            <p:txEl>
-                                              <p:pRg st="5" end="5"/>
-                                            </p:txEl>
-                                          </p:spTgt>
-                                        </p:tgtEl>
-                                        <p:attrNameLst>
-                                          <p:attrName>style.visibility</p:attrName>
-                                        </p:attrNameLst>
-                                      </p:cBhvr>
-                                      <p:to>
-                                        <p:strVal val="visible"/>
-                                      </p:to>
-                                    </p:set>
-                                  </p:childTnLst>
-                                </p:cTn>
-                              </p:par>
-                            </p:childTnLst>
-                          </p:cTn>
-                        </p:par>
-                      </p:childTnLst>
-                    </p:cTn>
-                  </p:par>
-                  <p:par>
-                    <p:cTn id="17" fill="hold">
-                      <p:stCondLst>
-                        <p:cond delay="indefinite"/>
-                      </p:stCondLst>
-                      <p:childTnLst>
-                        <p:par>
-                          <p:cTn id="18" fill="hold">
-                            <p:stCondLst>
-                              <p:cond delay="0"/>
-                            </p:stCondLst>
-                            <p:childTnLst>
-                              <p:par>
-                                <p:cTn id="19" presetID="1" presetClass="entr" presetSubtype="0" fill="hold" nodeType="clickEffect">
-                                  <p:stCondLst>
-                                    <p:cond delay="0"/>
-                                  </p:stCondLst>
-                                  <p:childTnLst>
-                                    <p:set>
-                                      <p:cBhvr>
-                                        <p:cTn id="20" dur="1" fill="hold">
-                                          <p:stCondLst>
-                                            <p:cond delay="0"/>
-                                          </p:stCondLst>
-                                        </p:cTn>
-                                        <p:tgtEl>
-                                          <p:spTgt spid="3">
-                                            <p:txEl>
-                                              <p:pRg st="6" end="6"/>
-                                            </p:txEl>
-                                          </p:spTgt>
-                                        </p:tgtEl>
-                                        <p:attrNameLst>
-                                          <p:attrName>style.visibility</p:attrName>
-                                        </p:attrNameLst>
-                                      </p:cBhvr>
-                                      <p:to>
-                                        <p:strVal val="visible"/>
-                                      </p:to>
-                                    </p:set>
-                                  </p:childTnLst>
-                                </p:cTn>
-                              </p:par>
-                              <p:par>
-                                <p:cTn id="21" presetID="1" presetClass="entr" presetSubtype="0" fill="hold" nodeType="withEffect">
-                                  <p:stCondLst>
-                                    <p:cond delay="0"/>
-                                  </p:stCondLst>
-                                  <p:childTnLst>
-                                    <p:set>
-                                      <p:cBhvr>
-                                        <p:cTn id="22" dur="1" fill="hold">
-                                          <p:stCondLst>
-                                            <p:cond delay="0"/>
-                                          </p:stCondLst>
-                                        </p:cTn>
-                                        <p:tgtEl>
-                                          <p:spTgt spid="3">
-                                            <p:txEl>
-                                              <p:pRg st="7" end="7"/>
-                                            </p:txEl>
-                                          </p:spTgt>
-                                        </p:tgtEl>
-                                        <p:attrNameLst>
-                                          <p:attrName>style.visibility</p:attrName>
-                                        </p:attrNameLst>
-                                      </p:cBhvr>
-                                      <p:to>
-                                        <p:strVal val="visible"/>
-                                      </p:to>
-                                    </p:set>
-                                  </p:childTnLst>
-                                </p:cTn>
-                              </p:par>
-                              <p:par>
-                                <p:cTn id="23" presetID="1" presetClass="entr" presetSubtype="0" fill="hold" nodeType="withEffect">
-                                  <p:stCondLst>
-                                    <p:cond delay="0"/>
-                                  </p:stCondLst>
-                                  <p:childTnLst>
-                                    <p:set>
-                                      <p:cBhvr>
-                                        <p:cTn id="24" dur="1" fill="hold">
-                                          <p:stCondLst>
-                                            <p:cond delay="0"/>
-                                          </p:stCondLst>
-                                        </p:cTn>
-                                        <p:tgtEl>
-                                          <p:spTgt spid="3">
-                                            <p:txEl>
-                                              <p:pRg st="8" end="8"/>
-                                            </p:txEl>
-                                          </p:spTgt>
-                                        </p:tgtEl>
-                                        <p:attrNameLst>
-                                          <p:attrName>style.visibility</p:attrName>
-                                        </p:attrNameLst>
-                                      </p:cBhvr>
-                                      <p:to>
-                                        <p:strVal val="visible"/>
-                                      </p:to>
-                                    </p:set>
-                                  </p:childTnLst>
-                                </p:cTn>
-                              </p:par>
-                              <p:par>
-                                <p:cTn id="25" presetID="1" presetClass="entr" presetSubtype="0" fill="hold" nodeType="withEffect">
-                                  <p:stCondLst>
-                                    <p:cond delay="0"/>
-                                  </p:stCondLst>
-                                  <p:childTnLst>
-                                    <p:set>
-                                      <p:cBhvr>
-                                        <p:cTn id="26" dur="1" fill="hold">
-                                          <p:stCondLst>
-                                            <p:cond delay="0"/>
-                                          </p:stCondLst>
-                                        </p:cTn>
-                                        <p:tgtEl>
-                                          <p:spTgt spid="3">
-                                            <p:txEl>
-                                              <p:pRg st="9" end="9"/>
-                                            </p:txEl>
-                                          </p:spTgt>
-                                        </p:tgtEl>
-                                        <p:attrNameLst>
-                                          <p:attrName>style.visibility</p:attrName>
-                                        </p:attrNameLst>
-                                      </p:cBhvr>
-                                      <p:to>
-                                        <p:strVal val="visible"/>
-                                      </p:to>
-                                    </p:set>
-                                  </p:childTnLst>
-                                </p:cTn>
-                              </p:par>
-                            </p:childTnLst>
-                          </p:cTn>
-                        </p:par>
-                      </p:childTnLst>
-                    </p:cTn>
-                  </p:par>
-                  <p:par>
-                    <p:cTn id="27" fill="hold">
-                      <p:stCondLst>
-                        <p:cond delay="indefinite"/>
-                      </p:stCondLst>
-                      <p:childTnLst>
-                        <p:par>
-                          <p:cTn id="28" fill="hold">
-                            <p:stCondLst>
-                              <p:cond delay="0"/>
-                            </p:stCondLst>
-                            <p:childTnLst>
-                              <p:par>
-                                <p:cTn id="29" presetID="1" presetClass="entr" presetSubtype="0" fill="hold" nodeType="clickEffect">
-                                  <p:stCondLst>
-                                    <p:cond delay="0"/>
-                                  </p:stCondLst>
-                                  <p:childTnLst>
-                                    <p:set>
-                                      <p:cBhvr>
-                                        <p:cTn id="30" dur="1" fill="hold">
-                                          <p:stCondLst>
-                                            <p:cond delay="0"/>
-                                          </p:stCondLst>
-                                        </p:cTn>
-                                        <p:tgtEl>
-                                          <p:spTgt spid="3">
-                                            <p:txEl>
-                                              <p:pRg st="10" end="10"/>
-                                            </p:txEl>
-                                          </p:spTgt>
-                                        </p:tgtEl>
-                                        <p:attrNameLst>
-                                          <p:attrName>style.visibility</p:attrName>
-                                        </p:attrNameLst>
-                                      </p:cBhvr>
-                                      <p:to>
-                                        <p:strVal val="visible"/>
-                                      </p:to>
-                                    </p:set>
-                                  </p:childTnLst>
-                                </p:cTn>
-                              </p:par>
-                              <p:par>
-                                <p:cTn id="31" presetID="1" presetClass="entr" presetSubtype="0" fill="hold" nodeType="withEffect">
-                                  <p:stCondLst>
-                                    <p:cond delay="0"/>
-                                  </p:stCondLst>
-                                  <p:childTnLst>
-                                    <p:set>
-                                      <p:cBhvr>
-                                        <p:cTn id="32" dur="1" fill="hold">
-                                          <p:stCondLst>
-                                            <p:cond delay="0"/>
-                                          </p:stCondLst>
-                                        </p:cTn>
-                                        <p:tgtEl>
-                                          <p:spTgt spid="3">
-                                            <p:txEl>
-                                              <p:pRg st="11" end="11"/>
-                                            </p:txEl>
-                                          </p:spTgt>
-                                        </p:tgtEl>
-                                        <p:attrNameLst>
-                                          <p:attrName>style.visibility</p:attrName>
-                                        </p:attrNameLst>
-                                      </p:cBhvr>
-                                      <p:to>
-                                        <p:strVal val="visible"/>
-                                      </p:to>
-                                    </p:set>
-                                  </p:childTnLst>
-                                </p:cTn>
-                              </p:par>
-                            </p:childTnLst>
-                          </p:cTn>
-                        </p:par>
-                      </p:childTnLst>
-                    </p:cTn>
-                  </p:par>
-                </p:childTnLst>
-              </p:cTn>
-              <p:prevCondLst>
-                <p:cond evt="onPrev" delay="0">
-                  <p:tgtEl>
-                    <p:sldTgt/>
-                  </p:tgtEl>
-                </p:cond>
-              </p:prevCondLst>
-              <p:nextCondLst>
-                <p:cond evt="onNext" delay="0">
-                  <p:tgtEl>
-                    <p:sldTgt/>
-                  </p:tgtEl>
-                </p:cond>
-              </p:nextCondLst>
-            </p:seq>
-          </p:childTnLst>
-        </p:cTn>
-      </p:par>
-    </p:tnLst>
-  </p:timing>
 </p:sld>
 </file>
 
@@ -23328,8 +22877,8 @@
           <a:chExt cx="0" cy="0"/>
         </a:xfrm>
       </p:grpSpPr>
-      <mc:AlternateContent xmlns:mc="http://schemas.openxmlformats.org/markup-compatibility/2006" xmlns:a14="http://schemas.microsoft.com/office/drawing/2010/main">
-        <mc:Choice Requires="a14">
+      <mc:AlternateContent xmlns:mc="http://schemas.openxmlformats.org/markup-compatibility/2006">
+        <mc:Choice xmlns:a14="http://schemas.microsoft.com/office/drawing/2010/main" Requires="a14">
           <p:sp>
             <p:nvSpPr>
               <p:cNvPr id="3" name="Content Placeholder 2">
@@ -23421,7 +22970,7 @@
                 </a14:m>
                 <a:r>
                   <a:rPr lang="en-US" sz="3000" dirty="0"/>
-                  <a:t>, with key (multiplier), </a:t>
+                  <a:t>, and key (multiplier), </a:t>
                 </a:r>
                 <a14:m>
                   <m:oMath xmlns:m="http://schemas.openxmlformats.org/officeDocument/2006/math">
@@ -23449,10 +22998,13 @@
                     </m:oMathParaPr>
                     <m:oMath xmlns:m="http://schemas.openxmlformats.org/officeDocument/2006/math">
                       <m:r>
+                        <m:rPr>
+                          <m:sty m:val="p"/>
+                        </m:rPr>
                         <a:rPr lang="en-US" sz="3000" i="1">
                           <a:latin typeface="Cambria Math" panose="02040503050406030204" pitchFamily="18" charset="0"/>
                         </a:rPr>
-                        <m:t>h</m:t>
+                        <m:t>f</m:t>
                       </m:r>
                       <m:d>
                         <m:dPr>
@@ -23467,7 +23019,7 @@
                             <a:rPr lang="en-US" sz="3000" b="0" i="1" smtClean="0">
                               <a:latin typeface="Cambria Math" panose="02040503050406030204" pitchFamily="18" charset="0"/>
                             </a:rPr>
-                            <m:t>𝑣</m:t>
+                            <m:t>𝑘</m:t>
                           </m:r>
                         </m:e>
                       </m:d>
@@ -23658,7 +23210,7 @@
             </p:txBody>
           </p:sp>
         </mc:Choice>
-        <mc:Fallback xmlns="">
+        <mc:Fallback>
           <p:sp>
             <p:nvSpPr>
               <p:cNvPr id="3" name="Content Placeholder 2">
@@ -23683,7 +23235,7 @@
               <a:blipFill>
                 <a:blip r:embed="rId2"/>
                 <a:stretch>
-                  <a:fillRect l="-1507" t="-2993"/>
+                  <a:fillRect l="-1507" t="-2993" r="-1217"/>
                 </a:stretch>
               </a:blipFill>
             </p:spPr>
@@ -23768,400 +23320,6 @@
   <p:clrMapOvr>
     <a:masterClrMapping/>
   </p:clrMapOvr>
-  <p:timing>
-    <p:tnLst>
-      <p:par>
-        <p:cTn id="1" dur="indefinite" restart="never" nodeType="tmRoot">
-          <p:childTnLst>
-            <p:seq concurrent="1" nextAc="seek">
-              <p:cTn id="2" dur="indefinite" nodeType="mainSeq">
-                <p:childTnLst>
-                  <p:par>
-                    <p:cTn id="3" fill="hold">
-                      <p:stCondLst>
-                        <p:cond delay="indefinite"/>
-                      </p:stCondLst>
-                      <p:childTnLst>
-                        <p:par>
-                          <p:cTn id="4" fill="hold">
-                            <p:stCondLst>
-                              <p:cond delay="0"/>
-                            </p:stCondLst>
-                            <p:childTnLst>
-                              <p:par>
-                                <p:cTn id="5" presetID="1" presetClass="entr" presetSubtype="0" fill="hold" nodeType="clickEffect">
-                                  <p:stCondLst>
-                                    <p:cond delay="0"/>
-                                  </p:stCondLst>
-                                  <p:childTnLst>
-                                    <p:set>
-                                      <p:cBhvr>
-                                        <p:cTn id="6" dur="1" fill="hold">
-                                          <p:stCondLst>
-                                            <p:cond delay="0"/>
-                                          </p:stCondLst>
-                                        </p:cTn>
-                                        <p:tgtEl>
-                                          <p:spTgt spid="3">
-                                            <p:txEl>
-                                              <p:pRg st="1" end="1"/>
-                                            </p:txEl>
-                                          </p:spTgt>
-                                        </p:tgtEl>
-                                        <p:attrNameLst>
-                                          <p:attrName>style.visibility</p:attrName>
-                                        </p:attrNameLst>
-                                      </p:cBhvr>
-                                      <p:to>
-                                        <p:strVal val="visible"/>
-                                      </p:to>
-                                    </p:set>
-                                  </p:childTnLst>
-                                </p:cTn>
-                              </p:par>
-                            </p:childTnLst>
-                          </p:cTn>
-                        </p:par>
-                      </p:childTnLst>
-                    </p:cTn>
-                  </p:par>
-                  <p:par>
-                    <p:cTn id="7" fill="hold">
-                      <p:stCondLst>
-                        <p:cond delay="indefinite"/>
-                      </p:stCondLst>
-                      <p:childTnLst>
-                        <p:par>
-                          <p:cTn id="8" fill="hold">
-                            <p:stCondLst>
-                              <p:cond delay="0"/>
-                            </p:stCondLst>
-                            <p:childTnLst>
-                              <p:par>
-                                <p:cTn id="9" presetID="1" presetClass="entr" presetSubtype="0" fill="hold" nodeType="clickEffect">
-                                  <p:stCondLst>
-                                    <p:cond delay="0"/>
-                                  </p:stCondLst>
-                                  <p:childTnLst>
-                                    <p:set>
-                                      <p:cBhvr>
-                                        <p:cTn id="10" dur="1" fill="hold">
-                                          <p:stCondLst>
-                                            <p:cond delay="0"/>
-                                          </p:stCondLst>
-                                        </p:cTn>
-                                        <p:tgtEl>
-                                          <p:spTgt spid="3">
-                                            <p:txEl>
-                                              <p:pRg st="2" end="2"/>
-                                            </p:txEl>
-                                          </p:spTgt>
-                                        </p:tgtEl>
-                                        <p:attrNameLst>
-                                          <p:attrName>style.visibility</p:attrName>
-                                        </p:attrNameLst>
-                                      </p:cBhvr>
-                                      <p:to>
-                                        <p:strVal val="visible"/>
-                                      </p:to>
-                                    </p:set>
-                                  </p:childTnLst>
-                                </p:cTn>
-                              </p:par>
-                              <p:par>
-                                <p:cTn id="11" presetID="1" presetClass="entr" presetSubtype="0" fill="hold" nodeType="withEffect">
-                                  <p:stCondLst>
-                                    <p:cond delay="0"/>
-                                  </p:stCondLst>
-                                  <p:childTnLst>
-                                    <p:set>
-                                      <p:cBhvr>
-                                        <p:cTn id="12" dur="1" fill="hold">
-                                          <p:stCondLst>
-                                            <p:cond delay="0"/>
-                                          </p:stCondLst>
-                                        </p:cTn>
-                                        <p:tgtEl>
-                                          <p:spTgt spid="3">
-                                            <p:txEl>
-                                              <p:pRg st="3" end="3"/>
-                                            </p:txEl>
-                                          </p:spTgt>
-                                        </p:tgtEl>
-                                        <p:attrNameLst>
-                                          <p:attrName>style.visibility</p:attrName>
-                                        </p:attrNameLst>
-                                      </p:cBhvr>
-                                      <p:to>
-                                        <p:strVal val="visible"/>
-                                      </p:to>
-                                    </p:set>
-                                  </p:childTnLst>
-                                </p:cTn>
-                              </p:par>
-                              <p:par>
-                                <p:cTn id="13" presetID="1" presetClass="entr" presetSubtype="0" fill="hold" nodeType="withEffect">
-                                  <p:stCondLst>
-                                    <p:cond delay="0"/>
-                                  </p:stCondLst>
-                                  <p:childTnLst>
-                                    <p:set>
-                                      <p:cBhvr>
-                                        <p:cTn id="14" dur="1" fill="hold">
-                                          <p:stCondLst>
-                                            <p:cond delay="0"/>
-                                          </p:stCondLst>
-                                        </p:cTn>
-                                        <p:tgtEl>
-                                          <p:spTgt spid="3">
-                                            <p:txEl>
-                                              <p:pRg st="4" end="4"/>
-                                            </p:txEl>
-                                          </p:spTgt>
-                                        </p:tgtEl>
-                                        <p:attrNameLst>
-                                          <p:attrName>style.visibility</p:attrName>
-                                        </p:attrNameLst>
-                                      </p:cBhvr>
-                                      <p:to>
-                                        <p:strVal val="visible"/>
-                                      </p:to>
-                                    </p:set>
-                                  </p:childTnLst>
-                                </p:cTn>
-                              </p:par>
-                            </p:childTnLst>
-                          </p:cTn>
-                        </p:par>
-                      </p:childTnLst>
-                    </p:cTn>
-                  </p:par>
-                  <p:par>
-                    <p:cTn id="15" fill="hold">
-                      <p:stCondLst>
-                        <p:cond delay="indefinite"/>
-                      </p:stCondLst>
-                      <p:childTnLst>
-                        <p:par>
-                          <p:cTn id="16" fill="hold">
-                            <p:stCondLst>
-                              <p:cond delay="0"/>
-                            </p:stCondLst>
-                            <p:childTnLst>
-                              <p:par>
-                                <p:cTn id="17" presetID="1" presetClass="entr" presetSubtype="0" fill="hold" nodeType="clickEffect">
-                                  <p:stCondLst>
-                                    <p:cond delay="0"/>
-                                  </p:stCondLst>
-                                  <p:childTnLst>
-                                    <p:set>
-                                      <p:cBhvr>
-                                        <p:cTn id="18" dur="1" fill="hold">
-                                          <p:stCondLst>
-                                            <p:cond delay="0"/>
-                                          </p:stCondLst>
-                                        </p:cTn>
-                                        <p:tgtEl>
-                                          <p:spTgt spid="3">
-                                            <p:txEl>
-                                              <p:pRg st="5" end="5"/>
-                                            </p:txEl>
-                                          </p:spTgt>
-                                        </p:tgtEl>
-                                        <p:attrNameLst>
-                                          <p:attrName>style.visibility</p:attrName>
-                                        </p:attrNameLst>
-                                      </p:cBhvr>
-                                      <p:to>
-                                        <p:strVal val="visible"/>
-                                      </p:to>
-                                    </p:set>
-                                  </p:childTnLst>
-                                </p:cTn>
-                              </p:par>
-                              <p:par>
-                                <p:cTn id="19" presetID="1" presetClass="entr" presetSubtype="0" fill="hold" nodeType="withEffect">
-                                  <p:stCondLst>
-                                    <p:cond delay="0"/>
-                                  </p:stCondLst>
-                                  <p:childTnLst>
-                                    <p:set>
-                                      <p:cBhvr>
-                                        <p:cTn id="20" dur="1" fill="hold">
-                                          <p:stCondLst>
-                                            <p:cond delay="0"/>
-                                          </p:stCondLst>
-                                        </p:cTn>
-                                        <p:tgtEl>
-                                          <p:spTgt spid="3">
-                                            <p:txEl>
-                                              <p:pRg st="6" end="6"/>
-                                            </p:txEl>
-                                          </p:spTgt>
-                                        </p:tgtEl>
-                                        <p:attrNameLst>
-                                          <p:attrName>style.visibility</p:attrName>
-                                        </p:attrNameLst>
-                                      </p:cBhvr>
-                                      <p:to>
-                                        <p:strVal val="visible"/>
-                                      </p:to>
-                                    </p:set>
-                                  </p:childTnLst>
-                                </p:cTn>
-                              </p:par>
-                              <p:par>
-                                <p:cTn id="21" presetID="1" presetClass="entr" presetSubtype="0" fill="hold" nodeType="withEffect">
-                                  <p:stCondLst>
-                                    <p:cond delay="0"/>
-                                  </p:stCondLst>
-                                  <p:childTnLst>
-                                    <p:set>
-                                      <p:cBhvr>
-                                        <p:cTn id="22" dur="1" fill="hold">
-                                          <p:stCondLst>
-                                            <p:cond delay="0"/>
-                                          </p:stCondLst>
-                                        </p:cTn>
-                                        <p:tgtEl>
-                                          <p:spTgt spid="3">
-                                            <p:txEl>
-                                              <p:pRg st="7" end="7"/>
-                                            </p:txEl>
-                                          </p:spTgt>
-                                        </p:tgtEl>
-                                        <p:attrNameLst>
-                                          <p:attrName>style.visibility</p:attrName>
-                                        </p:attrNameLst>
-                                      </p:cBhvr>
-                                      <p:to>
-                                        <p:strVal val="visible"/>
-                                      </p:to>
-                                    </p:set>
-                                  </p:childTnLst>
-                                </p:cTn>
-                              </p:par>
-                              <p:par>
-                                <p:cTn id="23" presetID="1" presetClass="entr" presetSubtype="0" fill="hold" nodeType="withEffect">
-                                  <p:stCondLst>
-                                    <p:cond delay="0"/>
-                                  </p:stCondLst>
-                                  <p:childTnLst>
-                                    <p:set>
-                                      <p:cBhvr>
-                                        <p:cTn id="24" dur="1" fill="hold">
-                                          <p:stCondLst>
-                                            <p:cond delay="0"/>
-                                          </p:stCondLst>
-                                        </p:cTn>
-                                        <p:tgtEl>
-                                          <p:spTgt spid="3">
-                                            <p:txEl>
-                                              <p:pRg st="8" end="8"/>
-                                            </p:txEl>
-                                          </p:spTgt>
-                                        </p:tgtEl>
-                                        <p:attrNameLst>
-                                          <p:attrName>style.visibility</p:attrName>
-                                        </p:attrNameLst>
-                                      </p:cBhvr>
-                                      <p:to>
-                                        <p:strVal val="visible"/>
-                                      </p:to>
-                                    </p:set>
-                                  </p:childTnLst>
-                                </p:cTn>
-                              </p:par>
-                              <p:par>
-                                <p:cTn id="25" presetID="1" presetClass="entr" presetSubtype="0" fill="hold" nodeType="withEffect">
-                                  <p:stCondLst>
-                                    <p:cond delay="0"/>
-                                  </p:stCondLst>
-                                  <p:childTnLst>
-                                    <p:set>
-                                      <p:cBhvr>
-                                        <p:cTn id="26" dur="1" fill="hold">
-                                          <p:stCondLst>
-                                            <p:cond delay="0"/>
-                                          </p:stCondLst>
-                                        </p:cTn>
-                                        <p:tgtEl>
-                                          <p:spTgt spid="3">
-                                            <p:txEl>
-                                              <p:pRg st="9" end="9"/>
-                                            </p:txEl>
-                                          </p:spTgt>
-                                        </p:tgtEl>
-                                        <p:attrNameLst>
-                                          <p:attrName>style.visibility</p:attrName>
-                                        </p:attrNameLst>
-                                      </p:cBhvr>
-                                      <p:to>
-                                        <p:strVal val="visible"/>
-                                      </p:to>
-                                    </p:set>
-                                  </p:childTnLst>
-                                </p:cTn>
-                              </p:par>
-                              <p:par>
-                                <p:cTn id="27" presetID="1" presetClass="entr" presetSubtype="0" fill="hold" nodeType="withEffect">
-                                  <p:stCondLst>
-                                    <p:cond delay="0"/>
-                                  </p:stCondLst>
-                                  <p:childTnLst>
-                                    <p:set>
-                                      <p:cBhvr>
-                                        <p:cTn id="28" dur="1" fill="hold">
-                                          <p:stCondLst>
-                                            <p:cond delay="0"/>
-                                          </p:stCondLst>
-                                        </p:cTn>
-                                        <p:tgtEl>
-                                          <p:spTgt spid="3">
-                                            <p:txEl>
-                                              <p:pRg st="10" end="10"/>
-                                            </p:txEl>
-                                          </p:spTgt>
-                                        </p:tgtEl>
-                                        <p:attrNameLst>
-                                          <p:attrName>style.visibility</p:attrName>
-                                        </p:attrNameLst>
-                                      </p:cBhvr>
-                                      <p:to>
-                                        <p:strVal val="visible"/>
-                                      </p:to>
-                                    </p:set>
-                                  </p:childTnLst>
-                                </p:cTn>
-                              </p:par>
-                            </p:childTnLst>
-                          </p:cTn>
-                        </p:par>
-                      </p:childTnLst>
-                    </p:cTn>
-                  </p:par>
-                </p:childTnLst>
-              </p:cTn>
-              <p:prevCondLst>
-                <p:cond evt="onPrev" delay="0">
-                  <p:tgtEl>
-                    <p:sldTgt/>
-                  </p:tgtEl>
-                </p:cond>
-              </p:prevCondLst>
-              <p:nextCondLst>
-                <p:cond evt="onNext" delay="0">
-                  <p:tgtEl>
-                    <p:sldTgt/>
-                  </p:tgtEl>
-                </p:cond>
-              </p:nextCondLst>
-            </p:seq>
-          </p:childTnLst>
-        </p:cTn>
-      </p:par>
-    </p:tnLst>
-  </p:timing>
 </p:sld>
 </file>
 
@@ -24182,8 +23340,8 @@
           <a:chExt cx="0" cy="0"/>
         </a:xfrm>
       </p:grpSpPr>
-      <mc:AlternateContent xmlns:mc="http://schemas.openxmlformats.org/markup-compatibility/2006" xmlns:a14="http://schemas.microsoft.com/office/drawing/2010/main">
-        <mc:Choice Requires="a14">
+      <mc:AlternateContent xmlns:mc="http://schemas.openxmlformats.org/markup-compatibility/2006">
+        <mc:Choice xmlns:a14="http://schemas.microsoft.com/office/drawing/2010/main" Requires="a14">
           <p:sp>
             <p:nvSpPr>
               <p:cNvPr id="3" name="Content Placeholder 2">
@@ -24257,10 +23415,13 @@
                     </m:oMathParaPr>
                     <m:oMath xmlns:m="http://schemas.openxmlformats.org/officeDocument/2006/math">
                       <m:r>
+                        <m:rPr>
+                          <m:sty m:val="p"/>
+                        </m:rPr>
                         <a:rPr lang="en-US" i="1">
                           <a:latin typeface="Cambria Math" panose="02040503050406030204" pitchFamily="18" charset="0"/>
                         </a:rPr>
-                        <m:t>h</m:t>
+                        <m:t>f</m:t>
                       </m:r>
                       <m:d>
                         <m:dPr>
@@ -24378,10 +23539,10 @@
                       </m:dPr>
                       <m:e>
                         <m:r>
-                          <a:rPr lang="en-US" i="1">
+                          <a:rPr lang="en-US" b="0" i="1" smtClean="0">
                             <a:latin typeface="Cambria Math" panose="02040503050406030204" pitchFamily="18" charset="0"/>
                           </a:rPr>
-                          <m:t>h</m:t>
+                          <m:t>𝑓</m:t>
                         </m:r>
                         <m:d>
                           <m:dPr>
@@ -24479,7 +23640,7 @@
             </p:txBody>
           </p:sp>
         </mc:Choice>
-        <mc:Fallback xmlns="">
+        <mc:Fallback>
           <p:sp>
             <p:nvSpPr>
               <p:cNvPr id="3" name="Content Placeholder 2">
@@ -24504,7 +23665,7 @@
               <a:blipFill>
                 <a:blip r:embed="rId3"/>
                 <a:stretch>
-                  <a:fillRect l="-1217" t="-2450" r="-1333"/>
+                  <a:fillRect l="-1217" t="-2450" r="-1391"/>
                 </a:stretch>
               </a:blipFill>
             </p:spPr>
@@ -24589,485 +23750,6 @@
   <p:clrMapOvr>
     <a:masterClrMapping/>
   </p:clrMapOvr>
-  <p:timing>
-    <p:tnLst>
-      <p:par>
-        <p:cTn id="1" dur="indefinite" restart="never" nodeType="tmRoot">
-          <p:childTnLst>
-            <p:seq concurrent="1" nextAc="seek">
-              <p:cTn id="2" dur="indefinite" nodeType="mainSeq">
-                <p:childTnLst>
-                  <p:par>
-                    <p:cTn id="3" fill="hold">
-                      <p:stCondLst>
-                        <p:cond delay="indefinite"/>
-                      </p:stCondLst>
-                      <p:childTnLst>
-                        <p:par>
-                          <p:cTn id="4" fill="hold">
-                            <p:stCondLst>
-                              <p:cond delay="0"/>
-                            </p:stCondLst>
-                            <p:childTnLst>
-                              <p:par>
-                                <p:cTn id="5" presetID="1" presetClass="entr" presetSubtype="0" fill="hold" nodeType="clickEffect">
-                                  <p:stCondLst>
-                                    <p:cond delay="0"/>
-                                  </p:stCondLst>
-                                  <p:childTnLst>
-                                    <p:set>
-                                      <p:cBhvr>
-                                        <p:cTn id="6" dur="1" fill="hold">
-                                          <p:stCondLst>
-                                            <p:cond delay="0"/>
-                                          </p:stCondLst>
-                                        </p:cTn>
-                                        <p:tgtEl>
-                                          <p:spTgt spid="3">
-                                            <p:txEl>
-                                              <p:pRg st="1" end="1"/>
-                                            </p:txEl>
-                                          </p:spTgt>
-                                        </p:tgtEl>
-                                        <p:attrNameLst>
-                                          <p:attrName>style.visibility</p:attrName>
-                                        </p:attrNameLst>
-                                      </p:cBhvr>
-                                      <p:to>
-                                        <p:strVal val="visible"/>
-                                      </p:to>
-                                    </p:set>
-                                  </p:childTnLst>
-                                </p:cTn>
-                              </p:par>
-                            </p:childTnLst>
-                          </p:cTn>
-                        </p:par>
-                      </p:childTnLst>
-                    </p:cTn>
-                  </p:par>
-                  <p:par>
-                    <p:cTn id="7" fill="hold">
-                      <p:stCondLst>
-                        <p:cond delay="indefinite"/>
-                      </p:stCondLst>
-                      <p:childTnLst>
-                        <p:par>
-                          <p:cTn id="8" fill="hold">
-                            <p:stCondLst>
-                              <p:cond delay="0"/>
-                            </p:stCondLst>
-                            <p:childTnLst>
-                              <p:par>
-                                <p:cTn id="9" presetID="1" presetClass="entr" presetSubtype="0" fill="hold" nodeType="clickEffect">
-                                  <p:stCondLst>
-                                    <p:cond delay="0"/>
-                                  </p:stCondLst>
-                                  <p:childTnLst>
-                                    <p:set>
-                                      <p:cBhvr>
-                                        <p:cTn id="10" dur="1" fill="hold">
-                                          <p:stCondLst>
-                                            <p:cond delay="0"/>
-                                          </p:stCondLst>
-                                        </p:cTn>
-                                        <p:tgtEl>
-                                          <p:spTgt spid="3">
-                                            <p:txEl>
-                                              <p:pRg st="2" end="2"/>
-                                            </p:txEl>
-                                          </p:spTgt>
-                                        </p:tgtEl>
-                                        <p:attrNameLst>
-                                          <p:attrName>style.visibility</p:attrName>
-                                        </p:attrNameLst>
-                                      </p:cBhvr>
-                                      <p:to>
-                                        <p:strVal val="visible"/>
-                                      </p:to>
-                                    </p:set>
-                                  </p:childTnLst>
-                                </p:cTn>
-                              </p:par>
-                            </p:childTnLst>
-                          </p:cTn>
-                        </p:par>
-                      </p:childTnLst>
-                    </p:cTn>
-                  </p:par>
-                  <p:par>
-                    <p:cTn id="11" fill="hold">
-                      <p:stCondLst>
-                        <p:cond delay="indefinite"/>
-                      </p:stCondLst>
-                      <p:childTnLst>
-                        <p:par>
-                          <p:cTn id="12" fill="hold">
-                            <p:stCondLst>
-                              <p:cond delay="0"/>
-                            </p:stCondLst>
-                            <p:childTnLst>
-                              <p:par>
-                                <p:cTn id="13" presetID="1" presetClass="entr" presetSubtype="0" fill="hold" nodeType="clickEffect">
-                                  <p:stCondLst>
-                                    <p:cond delay="0"/>
-                                  </p:stCondLst>
-                                  <p:childTnLst>
-                                    <p:set>
-                                      <p:cBhvr>
-                                        <p:cTn id="14" dur="1" fill="hold">
-                                          <p:stCondLst>
-                                            <p:cond delay="0"/>
-                                          </p:stCondLst>
-                                        </p:cTn>
-                                        <p:tgtEl>
-                                          <p:spTgt spid="3">
-                                            <p:txEl>
-                                              <p:pRg st="3" end="3"/>
-                                            </p:txEl>
-                                          </p:spTgt>
-                                        </p:tgtEl>
-                                        <p:attrNameLst>
-                                          <p:attrName>style.visibility</p:attrName>
-                                        </p:attrNameLst>
-                                      </p:cBhvr>
-                                      <p:to>
-                                        <p:strVal val="visible"/>
-                                      </p:to>
-                                    </p:set>
-                                  </p:childTnLst>
-                                </p:cTn>
-                              </p:par>
-                              <p:par>
-                                <p:cTn id="15" presetID="1" presetClass="entr" presetSubtype="0" fill="hold" nodeType="withEffect">
-                                  <p:stCondLst>
-                                    <p:cond delay="0"/>
-                                  </p:stCondLst>
-                                  <p:childTnLst>
-                                    <p:set>
-                                      <p:cBhvr>
-                                        <p:cTn id="16" dur="1" fill="hold">
-                                          <p:stCondLst>
-                                            <p:cond delay="0"/>
-                                          </p:stCondLst>
-                                        </p:cTn>
-                                        <p:tgtEl>
-                                          <p:spTgt spid="3">
-                                            <p:txEl>
-                                              <p:pRg st="4" end="4"/>
-                                            </p:txEl>
-                                          </p:spTgt>
-                                        </p:tgtEl>
-                                        <p:attrNameLst>
-                                          <p:attrName>style.visibility</p:attrName>
-                                        </p:attrNameLst>
-                                      </p:cBhvr>
-                                      <p:to>
-                                        <p:strVal val="visible"/>
-                                      </p:to>
-                                    </p:set>
-                                  </p:childTnLst>
-                                </p:cTn>
-                              </p:par>
-                            </p:childTnLst>
-                          </p:cTn>
-                        </p:par>
-                      </p:childTnLst>
-                    </p:cTn>
-                  </p:par>
-                  <p:par>
-                    <p:cTn id="17" fill="hold">
-                      <p:stCondLst>
-                        <p:cond delay="indefinite"/>
-                      </p:stCondLst>
-                      <p:childTnLst>
-                        <p:par>
-                          <p:cTn id="18" fill="hold">
-                            <p:stCondLst>
-                              <p:cond delay="0"/>
-                            </p:stCondLst>
-                            <p:childTnLst>
-                              <p:par>
-                                <p:cTn id="19" presetID="1" presetClass="entr" presetSubtype="0" fill="hold" nodeType="clickEffect">
-                                  <p:stCondLst>
-                                    <p:cond delay="0"/>
-                                  </p:stCondLst>
-                                  <p:childTnLst>
-                                    <p:set>
-                                      <p:cBhvr>
-                                        <p:cTn id="20" dur="1" fill="hold">
-                                          <p:stCondLst>
-                                            <p:cond delay="0"/>
-                                          </p:stCondLst>
-                                        </p:cTn>
-                                        <p:tgtEl>
-                                          <p:spTgt spid="3">
-                                            <p:txEl>
-                                              <p:pRg st="5" end="5"/>
-                                            </p:txEl>
-                                          </p:spTgt>
-                                        </p:tgtEl>
-                                        <p:attrNameLst>
-                                          <p:attrName>style.visibility</p:attrName>
-                                        </p:attrNameLst>
-                                      </p:cBhvr>
-                                      <p:to>
-                                        <p:strVal val="visible"/>
-                                      </p:to>
-                                    </p:set>
-                                  </p:childTnLst>
-                                </p:cTn>
-                              </p:par>
-                            </p:childTnLst>
-                          </p:cTn>
-                        </p:par>
-                      </p:childTnLst>
-                    </p:cTn>
-                  </p:par>
-                  <p:par>
-                    <p:cTn id="21" fill="hold">
-                      <p:stCondLst>
-                        <p:cond delay="indefinite"/>
-                      </p:stCondLst>
-                      <p:childTnLst>
-                        <p:par>
-                          <p:cTn id="22" fill="hold">
-                            <p:stCondLst>
-                              <p:cond delay="0"/>
-                            </p:stCondLst>
-                            <p:childTnLst>
-                              <p:par>
-                                <p:cTn id="23" presetID="1" presetClass="entr" presetSubtype="0" fill="hold" nodeType="clickEffect">
-                                  <p:stCondLst>
-                                    <p:cond delay="0"/>
-                                  </p:stCondLst>
-                                  <p:childTnLst>
-                                    <p:set>
-                                      <p:cBhvr>
-                                        <p:cTn id="24" dur="1" fill="hold">
-                                          <p:stCondLst>
-                                            <p:cond delay="0"/>
-                                          </p:stCondLst>
-                                        </p:cTn>
-                                        <p:tgtEl>
-                                          <p:spTgt spid="3">
-                                            <p:txEl>
-                                              <p:pRg st="6" end="6"/>
-                                            </p:txEl>
-                                          </p:spTgt>
-                                        </p:tgtEl>
-                                        <p:attrNameLst>
-                                          <p:attrName>style.visibility</p:attrName>
-                                        </p:attrNameLst>
-                                      </p:cBhvr>
-                                      <p:to>
-                                        <p:strVal val="visible"/>
-                                      </p:to>
-                                    </p:set>
-                                  </p:childTnLst>
-                                </p:cTn>
-                              </p:par>
-                              <p:par>
-                                <p:cTn id="25" presetID="1" presetClass="entr" presetSubtype="0" fill="hold" nodeType="withEffect">
-                                  <p:stCondLst>
-                                    <p:cond delay="0"/>
-                                  </p:stCondLst>
-                                  <p:childTnLst>
-                                    <p:set>
-                                      <p:cBhvr>
-                                        <p:cTn id="26" dur="1" fill="hold">
-                                          <p:stCondLst>
-                                            <p:cond delay="0"/>
-                                          </p:stCondLst>
-                                        </p:cTn>
-                                        <p:tgtEl>
-                                          <p:spTgt spid="3">
-                                            <p:txEl>
-                                              <p:pRg st="7" end="7"/>
-                                            </p:txEl>
-                                          </p:spTgt>
-                                        </p:tgtEl>
-                                        <p:attrNameLst>
-                                          <p:attrName>style.visibility</p:attrName>
-                                        </p:attrNameLst>
-                                      </p:cBhvr>
-                                      <p:to>
-                                        <p:strVal val="visible"/>
-                                      </p:to>
-                                    </p:set>
-                                  </p:childTnLst>
-                                </p:cTn>
-                              </p:par>
-                            </p:childTnLst>
-                          </p:cTn>
-                        </p:par>
-                      </p:childTnLst>
-                    </p:cTn>
-                  </p:par>
-                  <p:par>
-                    <p:cTn id="27" fill="hold">
-                      <p:stCondLst>
-                        <p:cond delay="indefinite"/>
-                      </p:stCondLst>
-                      <p:childTnLst>
-                        <p:par>
-                          <p:cTn id="28" fill="hold">
-                            <p:stCondLst>
-                              <p:cond delay="0"/>
-                            </p:stCondLst>
-                            <p:childTnLst>
-                              <p:par>
-                                <p:cTn id="29" presetID="1" presetClass="entr" presetSubtype="0" fill="hold" nodeType="clickEffect">
-                                  <p:stCondLst>
-                                    <p:cond delay="0"/>
-                                  </p:stCondLst>
-                                  <p:childTnLst>
-                                    <p:set>
-                                      <p:cBhvr>
-                                        <p:cTn id="30" dur="1" fill="hold">
-                                          <p:stCondLst>
-                                            <p:cond delay="0"/>
-                                          </p:stCondLst>
-                                        </p:cTn>
-                                        <p:tgtEl>
-                                          <p:spTgt spid="3">
-                                            <p:txEl>
-                                              <p:pRg st="8" end="8"/>
-                                            </p:txEl>
-                                          </p:spTgt>
-                                        </p:tgtEl>
-                                        <p:attrNameLst>
-                                          <p:attrName>style.visibility</p:attrName>
-                                        </p:attrNameLst>
-                                      </p:cBhvr>
-                                      <p:to>
-                                        <p:strVal val="visible"/>
-                                      </p:to>
-                                    </p:set>
-                                  </p:childTnLst>
-                                </p:cTn>
-                              </p:par>
-                              <p:par>
-                                <p:cTn id="31" presetID="1" presetClass="entr" presetSubtype="0" fill="hold" nodeType="withEffect">
-                                  <p:stCondLst>
-                                    <p:cond delay="0"/>
-                                  </p:stCondLst>
-                                  <p:childTnLst>
-                                    <p:set>
-                                      <p:cBhvr>
-                                        <p:cTn id="32" dur="1" fill="hold">
-                                          <p:stCondLst>
-                                            <p:cond delay="0"/>
-                                          </p:stCondLst>
-                                        </p:cTn>
-                                        <p:tgtEl>
-                                          <p:spTgt spid="3">
-                                            <p:txEl>
-                                              <p:pRg st="9" end="9"/>
-                                            </p:txEl>
-                                          </p:spTgt>
-                                        </p:tgtEl>
-                                        <p:attrNameLst>
-                                          <p:attrName>style.visibility</p:attrName>
-                                        </p:attrNameLst>
-                                      </p:cBhvr>
-                                      <p:to>
-                                        <p:strVal val="visible"/>
-                                      </p:to>
-                                    </p:set>
-                                  </p:childTnLst>
-                                </p:cTn>
-                              </p:par>
-                              <p:par>
-                                <p:cTn id="33" presetID="1" presetClass="entr" presetSubtype="0" fill="hold" nodeType="withEffect">
-                                  <p:stCondLst>
-                                    <p:cond delay="0"/>
-                                  </p:stCondLst>
-                                  <p:childTnLst>
-                                    <p:set>
-                                      <p:cBhvr>
-                                        <p:cTn id="34" dur="1" fill="hold">
-                                          <p:stCondLst>
-                                            <p:cond delay="0"/>
-                                          </p:stCondLst>
-                                        </p:cTn>
-                                        <p:tgtEl>
-                                          <p:spTgt spid="3">
-                                            <p:txEl>
-                                              <p:pRg st="10" end="10"/>
-                                            </p:txEl>
-                                          </p:spTgt>
-                                        </p:tgtEl>
-                                        <p:attrNameLst>
-                                          <p:attrName>style.visibility</p:attrName>
-                                        </p:attrNameLst>
-                                      </p:cBhvr>
-                                      <p:to>
-                                        <p:strVal val="visible"/>
-                                      </p:to>
-                                    </p:set>
-                                  </p:childTnLst>
-                                </p:cTn>
-                              </p:par>
-                              <p:par>
-                                <p:cTn id="35" presetID="1" presetClass="entr" presetSubtype="0" fill="hold" nodeType="withEffect">
-                                  <p:stCondLst>
-                                    <p:cond delay="0"/>
-                                  </p:stCondLst>
-                                  <p:childTnLst>
-                                    <p:set>
-                                      <p:cBhvr>
-                                        <p:cTn id="36" dur="1" fill="hold">
-                                          <p:stCondLst>
-                                            <p:cond delay="0"/>
-                                          </p:stCondLst>
-                                        </p:cTn>
-                                        <p:tgtEl>
-                                          <p:spTgt spid="3">
-                                            <p:txEl>
-                                              <p:pRg st="11" end="11"/>
-                                            </p:txEl>
-                                          </p:spTgt>
-                                        </p:tgtEl>
-                                        <p:attrNameLst>
-                                          <p:attrName>style.visibility</p:attrName>
-                                        </p:attrNameLst>
-                                      </p:cBhvr>
-                                      <p:to>
-                                        <p:strVal val="visible"/>
-                                      </p:to>
-                                    </p:set>
-                                  </p:childTnLst>
-                                </p:cTn>
-                              </p:par>
-                            </p:childTnLst>
-                          </p:cTn>
-                        </p:par>
-                      </p:childTnLst>
-                    </p:cTn>
-                  </p:par>
-                </p:childTnLst>
-              </p:cTn>
-              <p:prevCondLst>
-                <p:cond evt="onPrev" delay="0">
-                  <p:tgtEl>
-                    <p:sldTgt/>
-                  </p:tgtEl>
-                </p:cond>
-              </p:prevCondLst>
-              <p:nextCondLst>
-                <p:cond evt="onNext" delay="0">
-                  <p:tgtEl>
-                    <p:sldTgt/>
-                  </p:tgtEl>
-                </p:cond>
-              </p:nextCondLst>
-            </p:seq>
-          </p:childTnLst>
-        </p:cTn>
-      </p:par>
-    </p:tnLst>
-  </p:timing>
 </p:sld>
 </file>
 

</xml_diff>